<commit_message>
Move advanced data I/O tutorials to their own section and move parallel I/O tutorial
</commit_message>
<xml_diff>
--- a/docs/source/figures/gallery_thumbnails.pptx
+++ b/docs/source/figures/gallery_thumbnails.pptx
@@ -14,9 +14,9 @@
     <p:sldId id="348" r:id="rId5"/>
     <p:sldId id="349" r:id="rId6"/>
     <p:sldId id="350" r:id="rId7"/>
-    <p:sldId id="356" r:id="rId8"/>
-    <p:sldId id="357" r:id="rId9"/>
-    <p:sldId id="352" r:id="rId10"/>
+    <p:sldId id="357" r:id="rId8"/>
+    <p:sldId id="352" r:id="rId9"/>
+    <p:sldId id="361" r:id="rId10"/>
     <p:sldId id="353" r:id="rId11"/>
     <p:sldId id="354" r:id="rId12"/>
     <p:sldId id="355" r:id="rId13"/>
@@ -122,7 +122,7 @@
   </p:defaultTextStyle>
   <p:extLst>
     <p:ext uri="{EFAFB233-063F-42B5-8137-9DF3F51BA10A}">
-      <p15:sldGuideLst xmlns:p15="http://schemas.microsoft.com/office/powerpoint/2012/main" xmlns=""/>
+      <p15:sldGuideLst xmlns="" xmlns:p15="http://schemas.microsoft.com/office/powerpoint/2012/main"/>
     </p:ext>
   </p:extLst>
 </p:presentation>
@@ -210,7 +210,7 @@
           <a:p>
             <a:fld id="{4D6A40B9-902A-4E0E-AF39-1C357549AEE0}" type="datetimeFigureOut">
               <a:rPr lang="en-US" smtClean="0"/>
-              <a:t>4/14/21</a:t>
+              <a:t>7/7/21</a:t>
             </a:fld>
             <a:endParaRPr lang="en-US"/>
           </a:p>
@@ -542,6 +542,90 @@
           <a:p>
             <a:fld id="{88156F16-9966-4EDC-933D-6170A05B6017}" type="slidenum">
               <a:rPr lang="en-US" smtClean="0"/>
+              <a:t>9</a:t>
+            </a:fld>
+            <a:endParaRPr lang="en-US"/>
+          </a:p>
+        </p:txBody>
+      </p:sp>
+    </p:spTree>
+    <p:extLst>
+      <p:ext uri="{BB962C8B-B14F-4D97-AF65-F5344CB8AC3E}">
+        <p14:creationId xmlns:p14="http://schemas.microsoft.com/office/powerpoint/2010/main" val="550268687"/>
+      </p:ext>
+    </p:extLst>
+  </p:cSld>
+  <p:clrMapOvr>
+    <a:masterClrMapping/>
+  </p:clrMapOvr>
+</p:notes>
+</file>
+
+<file path=ppt/notesSlides/notesSlide2.xml><?xml version="1.0" encoding="utf-8"?>
+<p:notes xmlns:a="http://schemas.openxmlformats.org/drawingml/2006/main" xmlns:r="http://schemas.openxmlformats.org/officeDocument/2006/relationships" xmlns:p="http://schemas.openxmlformats.org/presentationml/2006/main">
+  <p:cSld>
+    <p:spTree>
+      <p:nvGrpSpPr>
+        <p:cNvPr id="1" name=""/>
+        <p:cNvGrpSpPr/>
+        <p:nvPr/>
+      </p:nvGrpSpPr>
+      <p:grpSpPr>
+        <a:xfrm>
+          <a:off x="0" y="0"/>
+          <a:ext cx="0" cy="0"/>
+          <a:chOff x="0" y="0"/>
+          <a:chExt cx="0" cy="0"/>
+        </a:xfrm>
+      </p:grpSpPr>
+      <p:sp>
+        <p:nvSpPr>
+          <p:cNvPr id="2" name="Slide Image Placeholder 1"/>
+          <p:cNvSpPr>
+            <a:spLocks noGrp="1" noRot="1" noChangeAspect="1"/>
+          </p:cNvSpPr>
+          <p:nvPr>
+            <p:ph type="sldImg"/>
+          </p:nvPr>
+        </p:nvSpPr>
+        <p:spPr/>
+      </p:sp>
+      <p:sp>
+        <p:nvSpPr>
+          <p:cNvPr id="3" name="Notes Placeholder 2"/>
+          <p:cNvSpPr>
+            <a:spLocks noGrp="1"/>
+          </p:cNvSpPr>
+          <p:nvPr>
+            <p:ph type="body" idx="1"/>
+          </p:nvPr>
+        </p:nvSpPr>
+        <p:spPr/>
+        <p:txBody>
+          <a:bodyPr/>
+          <a:lstStyle/>
+          <a:p>
+            <a:endParaRPr lang="en-US" dirty="0"/>
+          </a:p>
+        </p:txBody>
+      </p:sp>
+      <p:sp>
+        <p:nvSpPr>
+          <p:cNvPr id="4" name="Slide Number Placeholder 3"/>
+          <p:cNvSpPr>
+            <a:spLocks noGrp="1"/>
+          </p:cNvSpPr>
+          <p:nvPr>
+            <p:ph type="sldNum" sz="quarter" idx="10"/>
+          </p:nvPr>
+        </p:nvSpPr>
+        <p:spPr/>
+        <p:txBody>
+          <a:bodyPr/>
+          <a:lstStyle/>
+          <a:p>
+            <a:fld id="{88156F16-9966-4EDC-933D-6170A05B6017}" type="slidenum">
+              <a:rPr lang="en-US" smtClean="0"/>
               <a:t>14</a:t>
             </a:fld>
             <a:endParaRPr lang="en-US"/>
@@ -1374,7 +1458,7 @@
           <p:cNvPr id="4" name="Text Placeholder 3">
             <a:extLst>
               <a:ext uri="{FF2B5EF4-FFF2-40B4-BE49-F238E27FC236}">
-                <a16:creationId xmlns:a16="http://schemas.microsoft.com/office/drawing/2014/main" xmlns="" id="{8850B379-F419-41FB-9123-96081B074583}"/>
+                <a16:creationId xmlns="" xmlns:a16="http://schemas.microsoft.com/office/drawing/2014/main" id="{8850B379-F419-41FB-9123-96081B074583}"/>
               </a:ext>
             </a:extLst>
           </p:cNvPr>
@@ -1665,7 +1749,7 @@
           <p:cNvPr id="5" name="Picture 4">
             <a:extLst>
               <a:ext uri="{FF2B5EF4-FFF2-40B4-BE49-F238E27FC236}">
-                <a16:creationId xmlns:a16="http://schemas.microsoft.com/office/drawing/2014/main" xmlns="" id="{A5059957-9534-4FB9-8820-2343C3BF0E8F}"/>
+                <a16:creationId xmlns="" xmlns:a16="http://schemas.microsoft.com/office/drawing/2014/main" id="{A5059957-9534-4FB9-8820-2343C3BF0E8F}"/>
               </a:ext>
             </a:extLst>
           </p:cNvPr>
@@ -1695,7 +1779,7 @@
           <p:cNvPr id="4" name="Text Placeholder 3">
             <a:extLst>
               <a:ext uri="{FF2B5EF4-FFF2-40B4-BE49-F238E27FC236}">
-                <a16:creationId xmlns:a16="http://schemas.microsoft.com/office/drawing/2014/main" xmlns="" id="{8850B379-F419-41FB-9123-96081B074583}"/>
+                <a16:creationId xmlns="" xmlns:a16="http://schemas.microsoft.com/office/drawing/2014/main" id="{8850B379-F419-41FB-9123-96081B074583}"/>
               </a:ext>
             </a:extLst>
           </p:cNvPr>
@@ -2052,7 +2136,7 @@
           <p:cNvPr id="7" name="Google Shape;20;p4">
             <a:extLst>
               <a:ext uri="{FF2B5EF4-FFF2-40B4-BE49-F238E27FC236}">
-                <a16:creationId xmlns:a16="http://schemas.microsoft.com/office/drawing/2014/main" xmlns="" id="{537643E4-B983-42CC-9421-9C4C107A5DA4}"/>
+                <a16:creationId xmlns="" xmlns:a16="http://schemas.microsoft.com/office/drawing/2014/main" id="{537643E4-B983-42CC-9421-9C4C107A5DA4}"/>
               </a:ext>
             </a:extLst>
           </p:cNvPr>
@@ -3481,7 +3565,7 @@
           <p:cNvPr id="5" name="Picture 4" descr="A screenshot of a cell phone&#10;&#10;Description automatically generated">
             <a:extLst>
               <a:ext uri="{FF2B5EF4-FFF2-40B4-BE49-F238E27FC236}">
-                <a16:creationId xmlns="" xmlns:a16="http://schemas.microsoft.com/office/drawing/2014/main" id="{8C303482-C4AE-E049-A13A-50CE832D1F2A}"/>
+                <a16:creationId xmlns:a16="http://schemas.microsoft.com/office/drawing/2014/main" xmlns="" id="{8C303482-C4AE-E049-A13A-50CE832D1F2A}"/>
               </a:ext>
             </a:extLst>
           </p:cNvPr>
@@ -4183,11 +4267,6 @@
               </a:rPr>
               <a:t>-</a:t>
             </a:r>
-            <a:endParaRPr lang="en-US" sz="5400" b="1" dirty="0">
-              <a:solidFill>
-                <a:schemeClr val="bg1"/>
-              </a:solidFill>
-            </a:endParaRPr>
           </a:p>
         </p:txBody>
       </p:sp>
@@ -4267,11 +4346,6 @@
               </a:rPr>
               <a:t>+</a:t>
             </a:r>
-            <a:endParaRPr lang="en-US" sz="4400" b="1" dirty="0">
-              <a:solidFill>
-                <a:schemeClr val="bg1"/>
-              </a:solidFill>
-            </a:endParaRPr>
           </a:p>
         </p:txBody>
       </p:sp>
@@ -4634,17 +4708,7 @@
                 <a:latin typeface="Calibri"/>
                 <a:cs typeface="Calibri"/>
               </a:rPr>
-              <a:t>Exploratory Data Analysis </a:t>
-            </a:r>
-            <a:r>
-              <a:rPr lang="en-US" sz="5400" b="1" dirty="0" smtClean="0">
-                <a:solidFill>
-                  <a:srgbClr val="052B48"/>
-                </a:solidFill>
-                <a:latin typeface="Calibri"/>
-                <a:cs typeface="Calibri"/>
-              </a:rPr>
-              <a:t>with NWB</a:t>
+              <a:t>Exploratory Data Analysis with NWB</a:t>
             </a:r>
             <a:endParaRPr lang="en-US" sz="5400" b="1" dirty="0">
               <a:solidFill>
@@ -5984,7 +6048,17 @@
                 <a:latin typeface="Calibri"/>
                 <a:cs typeface="Calibri"/>
               </a:rPr>
-              <a:t>Advanced HDF5 I/O</a:t>
+              <a:t>HDF5 Dataset </a:t>
+            </a:r>
+            <a:r>
+              <a:rPr lang="en-US" sz="5400" b="1" dirty="0" smtClean="0">
+                <a:solidFill>
+                  <a:srgbClr val="052B48"/>
+                </a:solidFill>
+                <a:latin typeface="Calibri"/>
+                <a:cs typeface="Calibri"/>
+              </a:rPr>
+              <a:t>I/O</a:t>
             </a:r>
             <a:endParaRPr lang="en-US" sz="5400" b="1" dirty="0">
               <a:solidFill>
@@ -6011,11 +6085,11 @@
             <a:avLst/>
           </a:prstGeom>
           <a:solidFill>
-            <a:schemeClr val="tx1"/>
+            <a:srgbClr val="052A48"/>
           </a:solidFill>
-          <a:ln w="9525" cap="flat" cmpd="sng" algn="ctr">
+          <a:ln w="28575" cap="flat" cmpd="sng" algn="ctr">
             <a:solidFill>
-              <a:sysClr val="windowText" lastClr="000000"/>
+              <a:srgbClr val="FFFFFF"/>
             </a:solidFill>
             <a:prstDash val="solid"/>
           </a:ln>
@@ -6074,11 +6148,11 @@
             <a:avLst/>
           </a:prstGeom>
           <a:solidFill>
-            <a:srgbClr val="08436D"/>
+            <a:srgbClr val="052A48"/>
           </a:solidFill>
-          <a:ln w="9525" cap="flat" cmpd="sng" algn="ctr">
+          <a:ln w="28575" cap="flat" cmpd="sng" algn="ctr">
             <a:solidFill>
-              <a:sysClr val="windowText" lastClr="000000"/>
+              <a:srgbClr val="FFFFFF"/>
             </a:solidFill>
             <a:prstDash val="solid"/>
           </a:ln>
@@ -6137,14 +6211,11 @@
             <a:avLst/>
           </a:prstGeom>
           <a:solidFill>
-            <a:schemeClr val="accent1">
-              <a:lumMod val="60000"/>
-              <a:lumOff val="40000"/>
-            </a:schemeClr>
+            <a:srgbClr val="052A48"/>
           </a:solidFill>
-          <a:ln w="9525" cap="flat" cmpd="sng" algn="ctr">
+          <a:ln w="28575" cap="flat" cmpd="sng" algn="ctr">
             <a:solidFill>
-              <a:sysClr val="windowText" lastClr="000000"/>
+              <a:srgbClr val="FFFFFF"/>
             </a:solidFill>
             <a:prstDash val="solid"/>
           </a:ln>
@@ -6203,13 +6274,11 @@
             <a:avLst/>
           </a:prstGeom>
           <a:solidFill>
-            <a:schemeClr val="accent5">
-              <a:lumMod val="75000"/>
-            </a:schemeClr>
+            <a:srgbClr val="052A48"/>
           </a:solidFill>
-          <a:ln w="9525" cap="flat" cmpd="sng" algn="ctr">
+          <a:ln w="28575" cap="flat" cmpd="sng" algn="ctr">
             <a:solidFill>
-              <a:sysClr val="windowText" lastClr="000000"/>
+              <a:srgbClr val="FFFFFF"/>
             </a:solidFill>
             <a:prstDash val="solid"/>
           </a:ln>
@@ -6268,13 +6337,11 @@
             <a:avLst/>
           </a:prstGeom>
           <a:solidFill>
-            <a:schemeClr val="accent5">
-              <a:lumMod val="75000"/>
-            </a:schemeClr>
+            <a:srgbClr val="052A48"/>
           </a:solidFill>
-          <a:ln w="9525" cap="flat" cmpd="sng" algn="ctr">
+          <a:ln w="28575" cap="flat" cmpd="sng" algn="ctr">
             <a:solidFill>
-              <a:sysClr val="windowText" lastClr="000000"/>
+              <a:srgbClr val="FFFFFF"/>
             </a:solidFill>
             <a:prstDash val="solid"/>
           </a:ln>
@@ -6333,11 +6400,11 @@
             <a:avLst/>
           </a:prstGeom>
           <a:solidFill>
-            <a:srgbClr val="4472C4"/>
+            <a:srgbClr val="052A48"/>
           </a:solidFill>
-          <a:ln w="9525" cap="flat" cmpd="sng" algn="ctr">
+          <a:ln w="28575" cap="flat" cmpd="sng" algn="ctr">
             <a:solidFill>
-              <a:sysClr val="windowText" lastClr="000000"/>
+              <a:srgbClr val="FFFFFF"/>
             </a:solidFill>
             <a:prstDash val="solid"/>
           </a:ln>
@@ -6398,9 +6465,9 @@
           <a:solidFill>
             <a:srgbClr val="052A48"/>
           </a:solidFill>
-          <a:ln w="9525" cap="flat" cmpd="sng" algn="ctr">
+          <a:ln w="28575" cap="flat" cmpd="sng" algn="ctr">
             <a:solidFill>
-              <a:sysClr val="windowText" lastClr="000000"/>
+              <a:srgbClr val="FFFFFF"/>
             </a:solidFill>
             <a:prstDash val="solid"/>
           </a:ln>
@@ -6459,14 +6526,11 @@
             <a:avLst/>
           </a:prstGeom>
           <a:solidFill>
-            <a:schemeClr val="accent1">
-              <a:lumMod val="60000"/>
-              <a:lumOff val="40000"/>
-            </a:schemeClr>
+            <a:srgbClr val="052A48"/>
           </a:solidFill>
-          <a:ln w="9525" cap="flat" cmpd="sng" algn="ctr">
+          <a:ln w="28575" cap="flat" cmpd="sng" algn="ctr">
             <a:solidFill>
-              <a:sysClr val="windowText" lastClr="000000"/>
+              <a:srgbClr val="FFFFFF"/>
             </a:solidFill>
             <a:prstDash val="solid"/>
           </a:ln>
@@ -6513,7 +6577,7 @@
     </p:spTree>
     <p:extLst>
       <p:ext uri="{BB962C8B-B14F-4D97-AF65-F5344CB8AC3E}">
-        <p14:creationId xmlns:p14="http://schemas.microsoft.com/office/powerpoint/2010/main" val="1945216172"/>
+        <p14:creationId xmlns:p14="http://schemas.microsoft.com/office/powerpoint/2010/main" val="782906587"/>
       </p:ext>
     </p:extLst>
   </p:cSld>
@@ -6598,631 +6662,6 @@
         <p:spPr>
           <a:xfrm>
             <a:off x="863980" y="855015"/>
-            <a:ext cx="7213708" cy="923330"/>
-          </a:xfrm>
-          <a:prstGeom prst="rect">
-            <a:avLst/>
-          </a:prstGeom>
-        </p:spPr>
-        <p:txBody>
-          <a:bodyPr wrap="square">
-            <a:spAutoFit/>
-          </a:bodyPr>
-          <a:lstStyle/>
-          <a:p>
-            <a:pPr algn="ctr"/>
-            <a:r>
-              <a:rPr lang="en-US" sz="5400" b="1" dirty="0" smtClean="0">
-                <a:solidFill>
-                  <a:srgbClr val="052B48"/>
-                </a:solidFill>
-                <a:latin typeface="Calibri"/>
-                <a:cs typeface="Calibri"/>
-              </a:rPr>
-              <a:t>Advanced HDF5 I/O</a:t>
-            </a:r>
-            <a:endParaRPr lang="en-US" sz="5400" b="1" dirty="0">
-              <a:solidFill>
-                <a:srgbClr val="052B48"/>
-              </a:solidFill>
-              <a:latin typeface="Calibri"/>
-              <a:cs typeface="Calibri"/>
-            </a:endParaRPr>
-          </a:p>
-        </p:txBody>
-      </p:sp>
-      <p:sp>
-        <p:nvSpPr>
-          <p:cNvPr id="20" name="Cube 19"/>
-          <p:cNvSpPr/>
-          <p:nvPr/>
-        </p:nvSpPr>
-        <p:spPr>
-          <a:xfrm>
-            <a:off x="2828954" y="3371304"/>
-            <a:ext cx="1901188" cy="1633887"/>
-          </a:xfrm>
-          <a:prstGeom prst="cube">
-            <a:avLst/>
-          </a:prstGeom>
-          <a:solidFill>
-            <a:srgbClr val="052A48"/>
-          </a:solidFill>
-          <a:ln w="28575" cap="flat" cmpd="sng" algn="ctr">
-            <a:solidFill>
-              <a:srgbClr val="FFFFFF"/>
-            </a:solidFill>
-            <a:prstDash val="solid"/>
-          </a:ln>
-          <a:effectLst/>
-        </p:spPr>
-        <p:txBody>
-          <a:bodyPr rtlCol="0" anchor="ctr"/>
-          <a:lstStyle/>
-          <a:p>
-            <a:pPr marL="0" marR="0" lvl="0" indent="0" algn="ctr" defTabSz="914400" eaLnBrk="1" fontAlgn="auto" latinLnBrk="0" hangingPunct="1">
-              <a:lnSpc>
-                <a:spcPct val="100000"/>
-              </a:lnSpc>
-              <a:spcBef>
-                <a:spcPts val="0"/>
-              </a:spcBef>
-              <a:spcAft>
-                <a:spcPts val="0"/>
-              </a:spcAft>
-              <a:buClrTx/>
-              <a:buSzTx/>
-              <a:buFontTx/>
-              <a:buNone/>
-              <a:tabLst/>
-              <a:defRPr/>
-            </a:pPr>
-            <a:endParaRPr kumimoji="0" lang="en-US" sz="1800" b="0" i="0" u="none" strike="noStrike" kern="0" cap="none" spc="0" normalizeH="0" baseline="0" noProof="0">
-              <a:ln>
-                <a:noFill/>
-              </a:ln>
-              <a:solidFill>
-                <a:sysClr val="window" lastClr="FFFFFF"/>
-              </a:solidFill>
-              <a:effectLst/>
-              <a:uLnTx/>
-              <a:uFillTx/>
-              <a:latin typeface="Calibri"/>
-              <a:ea typeface="+mn-ea"/>
-              <a:cs typeface="+mn-cs"/>
-            </a:endParaRPr>
-          </a:p>
-        </p:txBody>
-      </p:sp>
-      <p:sp>
-        <p:nvSpPr>
-          <p:cNvPr id="21" name="Cube 20"/>
-          <p:cNvSpPr/>
-          <p:nvPr/>
-        </p:nvSpPr>
-        <p:spPr>
-          <a:xfrm>
-            <a:off x="4414903" y="3371304"/>
-            <a:ext cx="1901188" cy="1633887"/>
-          </a:xfrm>
-          <a:prstGeom prst="cube">
-            <a:avLst/>
-          </a:prstGeom>
-          <a:solidFill>
-            <a:srgbClr val="052A48"/>
-          </a:solidFill>
-          <a:ln w="28575" cap="flat" cmpd="sng" algn="ctr">
-            <a:solidFill>
-              <a:srgbClr val="FFFFFF"/>
-            </a:solidFill>
-            <a:prstDash val="solid"/>
-          </a:ln>
-          <a:effectLst/>
-        </p:spPr>
-        <p:txBody>
-          <a:bodyPr rtlCol="0" anchor="ctr"/>
-          <a:lstStyle/>
-          <a:p>
-            <a:pPr marL="0" marR="0" lvl="0" indent="0" algn="ctr" defTabSz="914400" eaLnBrk="1" fontAlgn="auto" latinLnBrk="0" hangingPunct="1">
-              <a:lnSpc>
-                <a:spcPct val="100000"/>
-              </a:lnSpc>
-              <a:spcBef>
-                <a:spcPts val="0"/>
-              </a:spcBef>
-              <a:spcAft>
-                <a:spcPts val="0"/>
-              </a:spcAft>
-              <a:buClrTx/>
-              <a:buSzTx/>
-              <a:buFontTx/>
-              <a:buNone/>
-              <a:tabLst/>
-              <a:defRPr/>
-            </a:pPr>
-            <a:endParaRPr kumimoji="0" lang="en-US" sz="1800" b="0" i="0" u="none" strike="noStrike" kern="0" cap="none" spc="0" normalizeH="0" baseline="0" noProof="0">
-              <a:ln>
-                <a:noFill/>
-              </a:ln>
-              <a:solidFill>
-                <a:sysClr val="window" lastClr="FFFFFF"/>
-              </a:solidFill>
-              <a:effectLst/>
-              <a:uLnTx/>
-              <a:uFillTx/>
-              <a:latin typeface="Calibri"/>
-              <a:ea typeface="+mn-ea"/>
-              <a:cs typeface="+mn-cs"/>
-            </a:endParaRPr>
-          </a:p>
-        </p:txBody>
-      </p:sp>
-      <p:sp>
-        <p:nvSpPr>
-          <p:cNvPr id="22" name="Cube 21"/>
-          <p:cNvSpPr/>
-          <p:nvPr/>
-        </p:nvSpPr>
-        <p:spPr>
-          <a:xfrm>
-            <a:off x="2828954" y="2080151"/>
-            <a:ext cx="1901188" cy="1633887"/>
-          </a:xfrm>
-          <a:prstGeom prst="cube">
-            <a:avLst/>
-          </a:prstGeom>
-          <a:solidFill>
-            <a:srgbClr val="052A48"/>
-          </a:solidFill>
-          <a:ln w="28575" cap="flat" cmpd="sng" algn="ctr">
-            <a:solidFill>
-              <a:srgbClr val="FFFFFF"/>
-            </a:solidFill>
-            <a:prstDash val="solid"/>
-          </a:ln>
-          <a:effectLst/>
-        </p:spPr>
-        <p:txBody>
-          <a:bodyPr rtlCol="0" anchor="ctr"/>
-          <a:lstStyle/>
-          <a:p>
-            <a:pPr marL="0" marR="0" lvl="0" indent="0" algn="ctr" defTabSz="914400" eaLnBrk="1" fontAlgn="auto" latinLnBrk="0" hangingPunct="1">
-              <a:lnSpc>
-                <a:spcPct val="100000"/>
-              </a:lnSpc>
-              <a:spcBef>
-                <a:spcPts val="0"/>
-              </a:spcBef>
-              <a:spcAft>
-                <a:spcPts val="0"/>
-              </a:spcAft>
-              <a:buClrTx/>
-              <a:buSzTx/>
-              <a:buFontTx/>
-              <a:buNone/>
-              <a:tabLst/>
-              <a:defRPr/>
-            </a:pPr>
-            <a:endParaRPr kumimoji="0" lang="en-US" sz="1800" b="0" i="0" u="none" strike="noStrike" kern="0" cap="none" spc="0" normalizeH="0" baseline="0" noProof="0">
-              <a:ln>
-                <a:noFill/>
-              </a:ln>
-              <a:solidFill>
-                <a:sysClr val="window" lastClr="FFFFFF"/>
-              </a:solidFill>
-              <a:effectLst/>
-              <a:uLnTx/>
-              <a:uFillTx/>
-              <a:latin typeface="Calibri"/>
-              <a:ea typeface="+mn-ea"/>
-              <a:cs typeface="+mn-cs"/>
-            </a:endParaRPr>
-          </a:p>
-        </p:txBody>
-      </p:sp>
-      <p:sp>
-        <p:nvSpPr>
-          <p:cNvPr id="23" name="Cube 22"/>
-          <p:cNvSpPr/>
-          <p:nvPr/>
-        </p:nvSpPr>
-        <p:spPr>
-          <a:xfrm>
-            <a:off x="4414903" y="2080151"/>
-            <a:ext cx="1901188" cy="1633887"/>
-          </a:xfrm>
-          <a:prstGeom prst="cube">
-            <a:avLst/>
-          </a:prstGeom>
-          <a:solidFill>
-            <a:srgbClr val="052A48"/>
-          </a:solidFill>
-          <a:ln w="28575" cap="flat" cmpd="sng" algn="ctr">
-            <a:solidFill>
-              <a:srgbClr val="FFFFFF"/>
-            </a:solidFill>
-            <a:prstDash val="solid"/>
-          </a:ln>
-          <a:effectLst/>
-        </p:spPr>
-        <p:txBody>
-          <a:bodyPr rtlCol="0" anchor="ctr"/>
-          <a:lstStyle/>
-          <a:p>
-            <a:pPr marL="0" marR="0" lvl="0" indent="0" algn="ctr" defTabSz="914400" eaLnBrk="1" fontAlgn="auto" latinLnBrk="0" hangingPunct="1">
-              <a:lnSpc>
-                <a:spcPct val="100000"/>
-              </a:lnSpc>
-              <a:spcBef>
-                <a:spcPts val="0"/>
-              </a:spcBef>
-              <a:spcAft>
-                <a:spcPts val="0"/>
-              </a:spcAft>
-              <a:buClrTx/>
-              <a:buSzTx/>
-              <a:buFontTx/>
-              <a:buNone/>
-              <a:tabLst/>
-              <a:defRPr/>
-            </a:pPr>
-            <a:endParaRPr kumimoji="0" lang="en-US" sz="1800" b="0" i="0" u="none" strike="noStrike" kern="0" cap="none" spc="0" normalizeH="0" baseline="0" noProof="0">
-              <a:ln>
-                <a:noFill/>
-              </a:ln>
-              <a:solidFill>
-                <a:sysClr val="window" lastClr="FFFFFF"/>
-              </a:solidFill>
-              <a:effectLst/>
-              <a:uLnTx/>
-              <a:uFillTx/>
-              <a:latin typeface="Calibri"/>
-              <a:ea typeface="+mn-ea"/>
-              <a:cs typeface="+mn-cs"/>
-            </a:endParaRPr>
-          </a:p>
-        </p:txBody>
-      </p:sp>
-      <p:sp>
-        <p:nvSpPr>
-          <p:cNvPr id="24" name="Cube 23"/>
-          <p:cNvSpPr/>
-          <p:nvPr/>
-        </p:nvSpPr>
-        <p:spPr>
-          <a:xfrm>
-            <a:off x="2398343" y="3845513"/>
-            <a:ext cx="1901188" cy="1633887"/>
-          </a:xfrm>
-          <a:prstGeom prst="cube">
-            <a:avLst/>
-          </a:prstGeom>
-          <a:solidFill>
-            <a:srgbClr val="052A48"/>
-          </a:solidFill>
-          <a:ln w="28575" cap="flat" cmpd="sng" algn="ctr">
-            <a:solidFill>
-              <a:srgbClr val="FFFFFF"/>
-            </a:solidFill>
-            <a:prstDash val="solid"/>
-          </a:ln>
-          <a:effectLst/>
-        </p:spPr>
-        <p:txBody>
-          <a:bodyPr rtlCol="0" anchor="ctr"/>
-          <a:lstStyle/>
-          <a:p>
-            <a:pPr marL="0" marR="0" lvl="0" indent="0" algn="ctr" defTabSz="914400" eaLnBrk="1" fontAlgn="auto" latinLnBrk="0" hangingPunct="1">
-              <a:lnSpc>
-                <a:spcPct val="100000"/>
-              </a:lnSpc>
-              <a:spcBef>
-                <a:spcPts val="0"/>
-              </a:spcBef>
-              <a:spcAft>
-                <a:spcPts val="0"/>
-              </a:spcAft>
-              <a:buClrTx/>
-              <a:buSzTx/>
-              <a:buFontTx/>
-              <a:buNone/>
-              <a:tabLst/>
-              <a:defRPr/>
-            </a:pPr>
-            <a:endParaRPr kumimoji="0" lang="en-US" sz="1800" b="0" i="0" u="none" strike="noStrike" kern="0" cap="none" spc="0" normalizeH="0" baseline="0" noProof="0">
-              <a:ln>
-                <a:noFill/>
-              </a:ln>
-              <a:solidFill>
-                <a:sysClr val="window" lastClr="FFFFFF"/>
-              </a:solidFill>
-              <a:effectLst/>
-              <a:uLnTx/>
-              <a:uFillTx/>
-              <a:latin typeface="Calibri"/>
-              <a:ea typeface="+mn-ea"/>
-              <a:cs typeface="+mn-cs"/>
-            </a:endParaRPr>
-          </a:p>
-        </p:txBody>
-      </p:sp>
-      <p:sp>
-        <p:nvSpPr>
-          <p:cNvPr id="25" name="Cube 24"/>
-          <p:cNvSpPr/>
-          <p:nvPr/>
-        </p:nvSpPr>
-        <p:spPr>
-          <a:xfrm>
-            <a:off x="3984291" y="3845513"/>
-            <a:ext cx="1901188" cy="1633887"/>
-          </a:xfrm>
-          <a:prstGeom prst="cube">
-            <a:avLst/>
-          </a:prstGeom>
-          <a:solidFill>
-            <a:srgbClr val="052A48"/>
-          </a:solidFill>
-          <a:ln w="28575" cap="flat" cmpd="sng" algn="ctr">
-            <a:solidFill>
-              <a:srgbClr val="FFFFFF"/>
-            </a:solidFill>
-            <a:prstDash val="solid"/>
-          </a:ln>
-          <a:effectLst/>
-        </p:spPr>
-        <p:txBody>
-          <a:bodyPr rtlCol="0" anchor="ctr"/>
-          <a:lstStyle/>
-          <a:p>
-            <a:pPr marL="0" marR="0" lvl="0" indent="0" algn="ctr" defTabSz="914400" eaLnBrk="1" fontAlgn="auto" latinLnBrk="0" hangingPunct="1">
-              <a:lnSpc>
-                <a:spcPct val="100000"/>
-              </a:lnSpc>
-              <a:spcBef>
-                <a:spcPts val="0"/>
-              </a:spcBef>
-              <a:spcAft>
-                <a:spcPts val="0"/>
-              </a:spcAft>
-              <a:buClrTx/>
-              <a:buSzTx/>
-              <a:buFontTx/>
-              <a:buNone/>
-              <a:tabLst/>
-              <a:defRPr/>
-            </a:pPr>
-            <a:endParaRPr kumimoji="0" lang="en-US" sz="1800" b="0" i="0" u="none" strike="noStrike" kern="0" cap="none" spc="0" normalizeH="0" baseline="0" noProof="0">
-              <a:ln>
-                <a:noFill/>
-              </a:ln>
-              <a:solidFill>
-                <a:sysClr val="window" lastClr="FFFFFF"/>
-              </a:solidFill>
-              <a:effectLst/>
-              <a:uLnTx/>
-              <a:uFillTx/>
-              <a:latin typeface="Calibri"/>
-              <a:ea typeface="+mn-ea"/>
-              <a:cs typeface="+mn-cs"/>
-            </a:endParaRPr>
-          </a:p>
-        </p:txBody>
-      </p:sp>
-      <p:sp>
-        <p:nvSpPr>
-          <p:cNvPr id="28" name="Cube 27"/>
-          <p:cNvSpPr/>
-          <p:nvPr/>
-        </p:nvSpPr>
-        <p:spPr>
-          <a:xfrm>
-            <a:off x="2398343" y="2554360"/>
-            <a:ext cx="1901188" cy="1633887"/>
-          </a:xfrm>
-          <a:prstGeom prst="cube">
-            <a:avLst/>
-          </a:prstGeom>
-          <a:solidFill>
-            <a:srgbClr val="052A48"/>
-          </a:solidFill>
-          <a:ln w="28575" cap="flat" cmpd="sng" algn="ctr">
-            <a:solidFill>
-              <a:srgbClr val="FFFFFF"/>
-            </a:solidFill>
-            <a:prstDash val="solid"/>
-          </a:ln>
-          <a:effectLst/>
-        </p:spPr>
-        <p:txBody>
-          <a:bodyPr rtlCol="0" anchor="ctr"/>
-          <a:lstStyle/>
-          <a:p>
-            <a:pPr marL="0" marR="0" lvl="0" indent="0" algn="ctr" defTabSz="914400" eaLnBrk="1" fontAlgn="auto" latinLnBrk="0" hangingPunct="1">
-              <a:lnSpc>
-                <a:spcPct val="100000"/>
-              </a:lnSpc>
-              <a:spcBef>
-                <a:spcPts val="0"/>
-              </a:spcBef>
-              <a:spcAft>
-                <a:spcPts val="0"/>
-              </a:spcAft>
-              <a:buClrTx/>
-              <a:buSzTx/>
-              <a:buFontTx/>
-              <a:buNone/>
-              <a:tabLst/>
-              <a:defRPr/>
-            </a:pPr>
-            <a:endParaRPr kumimoji="0" lang="en-US" sz="1800" b="0" i="0" u="none" strike="noStrike" kern="0" cap="none" spc="0" normalizeH="0" baseline="0" noProof="0">
-              <a:ln>
-                <a:noFill/>
-              </a:ln>
-              <a:solidFill>
-                <a:sysClr val="window" lastClr="FFFFFF"/>
-              </a:solidFill>
-              <a:effectLst/>
-              <a:uLnTx/>
-              <a:uFillTx/>
-              <a:latin typeface="Calibri"/>
-              <a:ea typeface="+mn-ea"/>
-              <a:cs typeface="+mn-cs"/>
-            </a:endParaRPr>
-          </a:p>
-        </p:txBody>
-      </p:sp>
-      <p:sp>
-        <p:nvSpPr>
-          <p:cNvPr id="29" name="Cube 28"/>
-          <p:cNvSpPr/>
-          <p:nvPr/>
-        </p:nvSpPr>
-        <p:spPr>
-          <a:xfrm>
-            <a:off x="3984291" y="2554360"/>
-            <a:ext cx="1901188" cy="1633887"/>
-          </a:xfrm>
-          <a:prstGeom prst="cube">
-            <a:avLst/>
-          </a:prstGeom>
-          <a:solidFill>
-            <a:srgbClr val="052A48"/>
-          </a:solidFill>
-          <a:ln w="28575" cap="flat" cmpd="sng" algn="ctr">
-            <a:solidFill>
-              <a:srgbClr val="FFFFFF"/>
-            </a:solidFill>
-            <a:prstDash val="solid"/>
-          </a:ln>
-          <a:effectLst/>
-        </p:spPr>
-        <p:txBody>
-          <a:bodyPr rtlCol="0" anchor="ctr"/>
-          <a:lstStyle/>
-          <a:p>
-            <a:pPr marL="0" marR="0" lvl="0" indent="0" algn="ctr" defTabSz="914400" eaLnBrk="1" fontAlgn="auto" latinLnBrk="0" hangingPunct="1">
-              <a:lnSpc>
-                <a:spcPct val="100000"/>
-              </a:lnSpc>
-              <a:spcBef>
-                <a:spcPts val="0"/>
-              </a:spcBef>
-              <a:spcAft>
-                <a:spcPts val="0"/>
-              </a:spcAft>
-              <a:buClrTx/>
-              <a:buSzTx/>
-              <a:buFontTx/>
-              <a:buNone/>
-              <a:tabLst/>
-              <a:defRPr/>
-            </a:pPr>
-            <a:endParaRPr kumimoji="0" lang="en-US" sz="1800" b="0" i="0" u="none" strike="noStrike" kern="0" cap="none" spc="0" normalizeH="0" baseline="0" noProof="0">
-              <a:ln>
-                <a:noFill/>
-              </a:ln>
-              <a:solidFill>
-                <a:sysClr val="window" lastClr="FFFFFF"/>
-              </a:solidFill>
-              <a:effectLst/>
-              <a:uLnTx/>
-              <a:uFillTx/>
-              <a:latin typeface="Calibri"/>
-              <a:ea typeface="+mn-ea"/>
-              <a:cs typeface="+mn-cs"/>
-            </a:endParaRPr>
-          </a:p>
-        </p:txBody>
-      </p:sp>
-    </p:spTree>
-    <p:extLst>
-      <p:ext uri="{BB962C8B-B14F-4D97-AF65-F5344CB8AC3E}">
-        <p14:creationId xmlns:p14="http://schemas.microsoft.com/office/powerpoint/2010/main" val="782906587"/>
-      </p:ext>
-    </p:extLst>
-  </p:cSld>
-  <p:clrMapOvr>
-    <a:masterClrMapping/>
-  </p:clrMapOvr>
-</p:sld>
-</file>
-
-<file path=ppt/slides/slide9.xml><?xml version="1.0" encoding="utf-8"?>
-<p:sld xmlns:a="http://schemas.openxmlformats.org/drawingml/2006/main" xmlns:r="http://schemas.openxmlformats.org/officeDocument/2006/relationships" xmlns:p="http://schemas.openxmlformats.org/presentationml/2006/main">
-  <p:cSld>
-    <p:spTree>
-      <p:nvGrpSpPr>
-        <p:cNvPr id="1" name=""/>
-        <p:cNvGrpSpPr/>
-        <p:nvPr/>
-      </p:nvGrpSpPr>
-      <p:grpSpPr>
-        <a:xfrm>
-          <a:off x="0" y="0"/>
-          <a:ext cx="0" cy="0"/>
-          <a:chOff x="0" y="0"/>
-          <a:chExt cx="0" cy="0"/>
-        </a:xfrm>
-      </p:grpSpPr>
-      <p:sp>
-        <p:nvSpPr>
-          <p:cNvPr id="27" name="Rounded Rectangle 26"/>
-          <p:cNvSpPr/>
-          <p:nvPr/>
-        </p:nvSpPr>
-        <p:spPr>
-          <a:xfrm>
-            <a:off x="853570" y="853671"/>
-            <a:ext cx="7234527" cy="4851352"/>
-          </a:xfrm>
-          <a:prstGeom prst="roundRect">
-            <a:avLst>
-              <a:gd name="adj" fmla="val 4437"/>
-            </a:avLst>
-          </a:prstGeom>
-          <a:solidFill>
-            <a:srgbClr val="EDEDED"/>
-          </a:solidFill>
-          <a:ln>
-            <a:solidFill>
-              <a:srgbClr val="000000"/>
-            </a:solidFill>
-          </a:ln>
-          <a:effectLst/>
-        </p:spPr>
-        <p:style>
-          <a:lnRef idx="1">
-            <a:schemeClr val="accent1"/>
-          </a:lnRef>
-          <a:fillRef idx="3">
-            <a:schemeClr val="accent1"/>
-          </a:fillRef>
-          <a:effectRef idx="2">
-            <a:schemeClr val="accent1"/>
-          </a:effectRef>
-          <a:fontRef idx="minor">
-            <a:schemeClr val="lt1"/>
-          </a:fontRef>
-        </p:style>
-        <p:txBody>
-          <a:bodyPr rtlCol="0" anchor="ctr"/>
-          <a:lstStyle/>
-          <a:p>
-            <a:pPr algn="ctr"/>
-            <a:endParaRPr lang="en-US"/>
-          </a:p>
-        </p:txBody>
-      </p:sp>
-      <p:sp>
-        <p:nvSpPr>
-          <p:cNvPr id="26" name="Rectangle 25"/>
-          <p:cNvSpPr/>
-          <p:nvPr/>
-        </p:nvSpPr>
-        <p:spPr>
-          <a:xfrm>
-            <a:off x="863980" y="855015"/>
             <a:ext cx="7213708" cy="1754327"/>
           </a:xfrm>
           <a:prstGeom prst="rect">
@@ -7258,66 +6697,13 @@
       </p:sp>
       <p:sp>
         <p:nvSpPr>
-          <p:cNvPr id="8" name="Folded Corner 7"/>
-          <p:cNvSpPr/>
-          <p:nvPr/>
-        </p:nvSpPr>
-        <p:spPr>
-          <a:xfrm rot="10800000" flipH="1">
-            <a:off x="3899840" y="3720272"/>
-            <a:ext cx="1419941" cy="1900138"/>
-          </a:xfrm>
-          <a:prstGeom prst="foldedCorner">
-            <a:avLst>
-              <a:gd name="adj" fmla="val 26556"/>
-            </a:avLst>
-          </a:prstGeom>
-          <a:solidFill>
-            <a:srgbClr val="052A48"/>
-          </a:solidFill>
-          <a:ln w="28575" cmpd="sng">
-            <a:solidFill>
-              <a:schemeClr val="bg1"/>
-            </a:solidFill>
-          </a:ln>
-          <a:effectLst/>
-        </p:spPr>
-        <p:style>
-          <a:lnRef idx="1">
-            <a:schemeClr val="accent1"/>
-          </a:lnRef>
-          <a:fillRef idx="3">
-            <a:schemeClr val="accent1"/>
-          </a:fillRef>
-          <a:effectRef idx="2">
-            <a:schemeClr val="accent1"/>
-          </a:effectRef>
-          <a:fontRef idx="minor">
-            <a:schemeClr val="lt1"/>
-          </a:fontRef>
-        </p:style>
-        <p:txBody>
-          <a:bodyPr rtlCol="0" anchor="ctr"/>
-          <a:lstStyle/>
-          <a:p>
-            <a:pPr algn="ctr"/>
-            <a:r>
-              <a:rPr lang="en-US" u="sng" dirty="0" smtClean="0"/>
-              <a:t>																			   </a:t>
-            </a:r>
-            <a:endParaRPr lang="en-US" u="sng" dirty="0"/>
-          </a:p>
-        </p:txBody>
-      </p:sp>
-      <p:sp>
-        <p:nvSpPr>
           <p:cNvPr id="15" name="Left Arrow 14"/>
           <p:cNvSpPr/>
           <p:nvPr/>
         </p:nvSpPr>
         <p:spPr>
-          <a:xfrm rot="16200000">
-            <a:off x="4274700" y="3295352"/>
+          <a:xfrm rot="5400000" flipV="1">
+            <a:off x="4274700" y="3528909"/>
             <a:ext cx="550232" cy="279992"/>
           </a:xfrm>
           <a:prstGeom prst="leftArrow">
@@ -7375,9 +6761,9 @@
           <p:nvPr/>
         </p:nvSpPr>
         <p:spPr>
-          <a:xfrm rot="13268425">
-            <a:off x="2953003" y="4388290"/>
-            <a:ext cx="1024292" cy="425306"/>
+          <a:xfrm rot="2734356">
+            <a:off x="3061789" y="4549986"/>
+            <a:ext cx="1096849" cy="425306"/>
           </a:xfrm>
           <a:prstGeom prst="leftArrow">
             <a:avLst>
@@ -7478,14 +6864,63 @@
       </p:sp>
       <p:sp>
         <p:nvSpPr>
-          <p:cNvPr id="17" name="Left Arrow 16"/>
+          <p:cNvPr id="14" name="Folded Corner 13"/>
           <p:cNvSpPr/>
           <p:nvPr/>
         </p:nvSpPr>
         <p:spPr>
-          <a:xfrm rot="8331575" flipH="1">
-            <a:off x="5205317" y="4460685"/>
-            <a:ext cx="1024292" cy="425306"/>
+          <a:xfrm rot="10800000" flipH="1">
+            <a:off x="4267044" y="2617358"/>
+            <a:ext cx="572757" cy="762891"/>
+          </a:xfrm>
+          <a:prstGeom prst="foldedCorner">
+            <a:avLst>
+              <a:gd name="adj" fmla="val 26556"/>
+            </a:avLst>
+          </a:prstGeom>
+          <a:solidFill>
+            <a:srgbClr val="052A48"/>
+          </a:solidFill>
+          <a:ln w="28575" cmpd="sng">
+            <a:solidFill>
+              <a:schemeClr val="bg1"/>
+            </a:solidFill>
+          </a:ln>
+          <a:effectLst/>
+        </p:spPr>
+        <p:style>
+          <a:lnRef idx="1">
+            <a:schemeClr val="accent1"/>
+          </a:lnRef>
+          <a:fillRef idx="3">
+            <a:schemeClr val="accent1"/>
+          </a:fillRef>
+          <a:effectRef idx="2">
+            <a:schemeClr val="accent1"/>
+          </a:effectRef>
+          <a:fontRef idx="minor">
+            <a:schemeClr val="lt1"/>
+          </a:fontRef>
+        </p:style>
+        <p:txBody>
+          <a:bodyPr rtlCol="0" anchor="ctr"/>
+          <a:lstStyle/>
+          <a:p>
+            <a:pPr algn="ctr"/>
+            <a:endParaRPr lang="en-US" sz="1000" u="sng" dirty="0"/>
+          </a:p>
+        </p:txBody>
+      </p:sp>
+      <p:sp>
+        <p:nvSpPr>
+          <p:cNvPr id="20" name="Left Arrow 19"/>
+          <p:cNvSpPr/>
+          <p:nvPr/>
+        </p:nvSpPr>
+        <p:spPr>
+          <a:xfrm rot="18865644" flipH="1">
+            <a:off x="5072927" y="4550292"/>
+            <a:ext cx="1096849" cy="425306"/>
           </a:xfrm>
           <a:prstGeom prst="leftArrow">
             <a:avLst>
@@ -7537,14 +6972,14 @@
       </p:sp>
       <p:sp>
         <p:nvSpPr>
-          <p:cNvPr id="13" name="Folded Corner 12"/>
+          <p:cNvPr id="8" name="Folded Corner 7"/>
           <p:cNvSpPr/>
           <p:nvPr/>
         </p:nvSpPr>
         <p:spPr>
           <a:xfrm rot="10800000" flipH="1">
-            <a:off x="5804575" y="3095004"/>
-            <a:ext cx="1037552" cy="1327710"/>
+            <a:off x="3899840" y="3720272"/>
+            <a:ext cx="1419941" cy="1900138"/>
           </a:xfrm>
           <a:prstGeom prst="foldedCorner">
             <a:avLst>
@@ -7580,20 +7015,117 @@
           <a:lstStyle/>
           <a:p>
             <a:pPr algn="ctr"/>
-            <a:endParaRPr lang="en-US" sz="1000" u="sng" dirty="0"/>
+            <a:r>
+              <a:rPr lang="en-US" u="sng" dirty="0" smtClean="0"/>
+              <a:t>																			   </a:t>
+            </a:r>
+            <a:endParaRPr lang="en-US" u="sng" dirty="0"/>
           </a:p>
         </p:txBody>
       </p:sp>
-      <p:sp>
-        <p:nvSpPr>
-          <p:cNvPr id="14" name="Folded Corner 13"/>
+      <p:grpSp>
+        <p:nvGrpSpPr>
+          <p:cNvPr id="11" name="Group 10"/>
+          <p:cNvGrpSpPr>
+            <a:grpSpLocks noChangeAspect="1"/>
+          </p:cNvGrpSpPr>
+          <p:nvPr/>
+        </p:nvGrpSpPr>
+        <p:grpSpPr>
+          <a:xfrm>
+            <a:off x="3606582" y="3649328"/>
+            <a:ext cx="947929" cy="947929"/>
+            <a:chOff x="2259923" y="2660201"/>
+            <a:chExt cx="1959561" cy="1962561"/>
+          </a:xfrm>
+        </p:grpSpPr>
+        <p:sp>
+          <p:nvSpPr>
+            <p:cNvPr id="18" name="Oval 17"/>
+            <p:cNvSpPr/>
+            <p:nvPr/>
+          </p:nvSpPr>
+          <p:spPr>
+            <a:xfrm>
+              <a:off x="2259923" y="2660201"/>
+              <a:ext cx="1959561" cy="1962561"/>
+            </a:xfrm>
+            <a:prstGeom prst="ellipse">
+              <a:avLst/>
+            </a:prstGeom>
+            <a:solidFill>
+              <a:schemeClr val="bg1"/>
+            </a:solidFill>
+            <a:ln w="76200" cmpd="sng">
+              <a:solidFill>
+                <a:srgbClr val="052A48"/>
+              </a:solidFill>
+            </a:ln>
+            <a:effectLst/>
+          </p:spPr>
+          <p:style>
+            <a:lnRef idx="1">
+              <a:schemeClr val="accent1"/>
+            </a:lnRef>
+            <a:fillRef idx="3">
+              <a:schemeClr val="accent1"/>
+            </a:fillRef>
+            <a:effectRef idx="2">
+              <a:schemeClr val="accent1"/>
+            </a:effectRef>
+            <a:fontRef idx="minor">
+              <a:schemeClr val="lt1"/>
+            </a:fontRef>
+          </p:style>
+          <p:txBody>
+            <a:bodyPr rtlCol="0" anchor="ctr"/>
+            <a:lstStyle/>
+            <a:p>
+              <a:endParaRPr lang="en-US" sz="4400" dirty="0"/>
+            </a:p>
+          </p:txBody>
+        </p:sp>
+        <p:pic>
+          <p:nvPicPr>
+            <p:cNvPr id="19" name="Picture 18" descr="logo_brain_transp_512x512.png"/>
+            <p:cNvPicPr>
+              <a:picLocks noChangeAspect="1"/>
+            </p:cNvPicPr>
+            <p:nvPr/>
+          </p:nvPicPr>
+          <p:blipFill>
+            <a:blip r:embed="rId2">
+              <a:extLst>
+                <a:ext uri="{28A0092B-C50C-407E-A947-70E740481C1C}">
+                  <a14:useLocalDpi xmlns:a14="http://schemas.microsoft.com/office/drawing/2010/main" val="0"/>
+                </a:ext>
+              </a:extLst>
+            </a:blip>
+            <a:stretch>
+              <a:fillRect/>
+            </a:stretch>
+          </p:blipFill>
+          <p:spPr>
+            <a:xfrm>
+              <a:off x="2393887" y="2838486"/>
+              <a:ext cx="1703898" cy="1703898"/>
+            </a:xfrm>
+            <a:prstGeom prst="rect">
+              <a:avLst/>
+            </a:prstGeom>
+          </p:spPr>
+        </p:pic>
+      </p:grpSp>
+      <p:sp>
+        <p:nvSpPr>
+          <p:cNvPr id="13" name="Folded Corner 12"/>
           <p:cNvSpPr/>
           <p:nvPr/>
         </p:nvSpPr>
         <p:spPr>
           <a:xfrm rot="10800000" flipH="1">
-            <a:off x="4267044" y="2617358"/>
-            <a:ext cx="572757" cy="762891"/>
+            <a:off x="6002435" y="3075348"/>
+            <a:ext cx="1037552" cy="1327710"/>
           </a:xfrm>
           <a:prstGeom prst="foldedCorner">
             <a:avLst>
@@ -7637,6 +7169,1433 @@
     <p:extLst>
       <p:ext uri="{BB962C8B-B14F-4D97-AF65-F5344CB8AC3E}">
         <p14:creationId xmlns:p14="http://schemas.microsoft.com/office/powerpoint/2010/main" val="1333564583"/>
+      </p:ext>
+    </p:extLst>
+  </p:cSld>
+  <p:clrMapOvr>
+    <a:masterClrMapping/>
+  </p:clrMapOvr>
+</p:sld>
+</file>
+
+<file path=ppt/slides/slide9.xml><?xml version="1.0" encoding="utf-8"?>
+<p:sld xmlns:a="http://schemas.openxmlformats.org/drawingml/2006/main" xmlns:r="http://schemas.openxmlformats.org/officeDocument/2006/relationships" xmlns:p="http://schemas.openxmlformats.org/presentationml/2006/main">
+  <p:cSld>
+    <p:spTree>
+      <p:nvGrpSpPr>
+        <p:cNvPr id="1" name=""/>
+        <p:cNvGrpSpPr/>
+        <p:nvPr/>
+      </p:nvGrpSpPr>
+      <p:grpSpPr>
+        <a:xfrm>
+          <a:off x="0" y="0"/>
+          <a:ext cx="0" cy="0"/>
+          <a:chOff x="0" y="0"/>
+          <a:chExt cx="0" cy="0"/>
+        </a:xfrm>
+      </p:grpSpPr>
+      <p:sp>
+        <p:nvSpPr>
+          <p:cNvPr id="27" name="Rounded Rectangle 26"/>
+          <p:cNvSpPr/>
+          <p:nvPr/>
+        </p:nvSpPr>
+        <p:spPr>
+          <a:xfrm>
+            <a:off x="853570" y="853671"/>
+            <a:ext cx="7234527" cy="4851352"/>
+          </a:xfrm>
+          <a:prstGeom prst="roundRect">
+            <a:avLst>
+              <a:gd name="adj" fmla="val 4437"/>
+            </a:avLst>
+          </a:prstGeom>
+          <a:solidFill>
+            <a:srgbClr val="EDEDED"/>
+          </a:solidFill>
+          <a:ln>
+            <a:solidFill>
+              <a:srgbClr val="000000"/>
+            </a:solidFill>
+          </a:ln>
+          <a:effectLst/>
+        </p:spPr>
+        <p:style>
+          <a:lnRef idx="1">
+            <a:schemeClr val="accent1"/>
+          </a:lnRef>
+          <a:fillRef idx="3">
+            <a:schemeClr val="accent1"/>
+          </a:fillRef>
+          <a:effectRef idx="2">
+            <a:schemeClr val="accent1"/>
+          </a:effectRef>
+          <a:fontRef idx="minor">
+            <a:schemeClr val="lt1"/>
+          </a:fontRef>
+        </p:style>
+        <p:txBody>
+          <a:bodyPr rtlCol="0" anchor="ctr"/>
+          <a:lstStyle/>
+          <a:p>
+            <a:pPr algn="ctr"/>
+            <a:endParaRPr lang="en-US"/>
+          </a:p>
+        </p:txBody>
+      </p:sp>
+      <p:sp>
+        <p:nvSpPr>
+          <p:cNvPr id="26" name="Rectangle 25"/>
+          <p:cNvSpPr/>
+          <p:nvPr/>
+        </p:nvSpPr>
+        <p:spPr>
+          <a:xfrm>
+            <a:off x="863980" y="855015"/>
+            <a:ext cx="7213708" cy="923330"/>
+          </a:xfrm>
+          <a:prstGeom prst="rect">
+            <a:avLst/>
+          </a:prstGeom>
+        </p:spPr>
+        <p:txBody>
+          <a:bodyPr wrap="square">
+            <a:spAutoFit/>
+          </a:bodyPr>
+          <a:lstStyle/>
+          <a:p>
+            <a:pPr algn="ctr"/>
+            <a:r>
+              <a:rPr lang="en-US" sz="5400" b="1" dirty="0" smtClean="0">
+                <a:solidFill>
+                  <a:srgbClr val="052B48"/>
+                </a:solidFill>
+                <a:latin typeface="Calibri"/>
+                <a:cs typeface="Calibri"/>
+              </a:rPr>
+              <a:t>Parallel I/O using MPI</a:t>
+            </a:r>
+            <a:endParaRPr lang="en-US" sz="5400" b="1" dirty="0">
+              <a:solidFill>
+                <a:srgbClr val="052B48"/>
+              </a:solidFill>
+              <a:latin typeface="Calibri"/>
+              <a:cs typeface="Calibri"/>
+            </a:endParaRPr>
+          </a:p>
+        </p:txBody>
+      </p:sp>
+      <p:sp>
+        <p:nvSpPr>
+          <p:cNvPr id="8" name="Folded Corner 7"/>
+          <p:cNvSpPr/>
+          <p:nvPr/>
+        </p:nvSpPr>
+        <p:spPr>
+          <a:xfrm rot="10800000" flipH="1">
+            <a:off x="3767562" y="2807415"/>
+            <a:ext cx="1419941" cy="1900138"/>
+          </a:xfrm>
+          <a:prstGeom prst="foldedCorner">
+            <a:avLst>
+              <a:gd name="adj" fmla="val 26556"/>
+            </a:avLst>
+          </a:prstGeom>
+          <a:solidFill>
+            <a:srgbClr val="052A48"/>
+          </a:solidFill>
+          <a:ln w="28575" cmpd="sng">
+            <a:solidFill>
+              <a:schemeClr val="bg1"/>
+            </a:solidFill>
+          </a:ln>
+          <a:effectLst/>
+        </p:spPr>
+        <p:style>
+          <a:lnRef idx="1">
+            <a:schemeClr val="accent1"/>
+          </a:lnRef>
+          <a:fillRef idx="3">
+            <a:schemeClr val="accent1"/>
+          </a:fillRef>
+          <a:effectRef idx="2">
+            <a:schemeClr val="accent1"/>
+          </a:effectRef>
+          <a:fontRef idx="minor">
+            <a:schemeClr val="lt1"/>
+          </a:fontRef>
+        </p:style>
+        <p:txBody>
+          <a:bodyPr rtlCol="0" anchor="ctr"/>
+          <a:lstStyle/>
+          <a:p>
+            <a:pPr algn="ctr"/>
+            <a:r>
+              <a:rPr lang="en-US" u="sng" dirty="0" smtClean="0"/>
+              <a:t>																			   </a:t>
+            </a:r>
+            <a:endParaRPr lang="en-US" u="sng" dirty="0"/>
+          </a:p>
+        </p:txBody>
+      </p:sp>
+      <p:grpSp>
+        <p:nvGrpSpPr>
+          <p:cNvPr id="11" name="Group 10"/>
+          <p:cNvGrpSpPr>
+            <a:grpSpLocks noChangeAspect="1"/>
+          </p:cNvGrpSpPr>
+          <p:nvPr/>
+        </p:nvGrpSpPr>
+        <p:grpSpPr>
+          <a:xfrm>
+            <a:off x="3474304" y="2736471"/>
+            <a:ext cx="947929" cy="947929"/>
+            <a:chOff x="2259923" y="2660201"/>
+            <a:chExt cx="1959561" cy="1962561"/>
+          </a:xfrm>
+        </p:grpSpPr>
+        <p:sp>
+          <p:nvSpPr>
+            <p:cNvPr id="18" name="Oval 17"/>
+            <p:cNvSpPr/>
+            <p:nvPr/>
+          </p:nvSpPr>
+          <p:spPr>
+            <a:xfrm>
+              <a:off x="2259923" y="2660201"/>
+              <a:ext cx="1959561" cy="1962561"/>
+            </a:xfrm>
+            <a:prstGeom prst="ellipse">
+              <a:avLst/>
+            </a:prstGeom>
+            <a:solidFill>
+              <a:schemeClr val="bg1"/>
+            </a:solidFill>
+            <a:ln w="76200" cmpd="sng">
+              <a:solidFill>
+                <a:srgbClr val="052A48"/>
+              </a:solidFill>
+            </a:ln>
+            <a:effectLst/>
+          </p:spPr>
+          <p:style>
+            <a:lnRef idx="1">
+              <a:schemeClr val="accent1"/>
+            </a:lnRef>
+            <a:fillRef idx="3">
+              <a:schemeClr val="accent1"/>
+            </a:fillRef>
+            <a:effectRef idx="2">
+              <a:schemeClr val="accent1"/>
+            </a:effectRef>
+            <a:fontRef idx="minor">
+              <a:schemeClr val="lt1"/>
+            </a:fontRef>
+          </p:style>
+          <p:txBody>
+            <a:bodyPr rtlCol="0" anchor="ctr"/>
+            <a:lstStyle/>
+            <a:p>
+              <a:endParaRPr lang="en-US" sz="4400" dirty="0"/>
+            </a:p>
+          </p:txBody>
+        </p:sp>
+        <p:pic>
+          <p:nvPicPr>
+            <p:cNvPr id="19" name="Picture 18" descr="logo_brain_transp_512x512.png"/>
+            <p:cNvPicPr>
+              <a:picLocks noChangeAspect="1"/>
+            </p:cNvPicPr>
+            <p:nvPr/>
+          </p:nvPicPr>
+          <p:blipFill>
+            <a:blip r:embed="rId3">
+              <a:extLst>
+                <a:ext uri="{28A0092B-C50C-407E-A947-70E740481C1C}">
+                  <a14:useLocalDpi xmlns:a14="http://schemas.microsoft.com/office/drawing/2010/main" val="0"/>
+                </a:ext>
+              </a:extLst>
+            </a:blip>
+            <a:stretch>
+              <a:fillRect/>
+            </a:stretch>
+          </p:blipFill>
+          <p:spPr>
+            <a:xfrm>
+              <a:off x="2393887" y="2838486"/>
+              <a:ext cx="1703898" cy="1703898"/>
+            </a:xfrm>
+            <a:prstGeom prst="rect">
+              <a:avLst/>
+            </a:prstGeom>
+          </p:spPr>
+        </p:pic>
+      </p:grpSp>
+      <p:sp>
+        <p:nvSpPr>
+          <p:cNvPr id="21" name="Cube 20"/>
+          <p:cNvSpPr/>
+          <p:nvPr/>
+        </p:nvSpPr>
+        <p:spPr>
+          <a:xfrm>
+            <a:off x="3814099" y="5133421"/>
+            <a:ext cx="1305723" cy="417754"/>
+          </a:xfrm>
+          <a:prstGeom prst="cube">
+            <a:avLst>
+              <a:gd name="adj" fmla="val 11969"/>
+            </a:avLst>
+          </a:prstGeom>
+          <a:solidFill>
+            <a:srgbClr val="052A48"/>
+          </a:solidFill>
+          <a:ln w="9525" cap="flat" cmpd="sng" algn="ctr">
+            <a:solidFill>
+              <a:srgbClr val="FFFFFF"/>
+            </a:solidFill>
+            <a:prstDash val="solid"/>
+          </a:ln>
+          <a:effectLst/>
+        </p:spPr>
+        <p:txBody>
+          <a:bodyPr tIns="0" bIns="45720" rtlCol="0" anchor="ctr" anchorCtr="0"/>
+          <a:lstStyle/>
+          <a:p>
+            <a:pPr marL="0" marR="0" lvl="0" indent="0" algn="ctr" defTabSz="914400" eaLnBrk="1" fontAlgn="auto" latinLnBrk="0" hangingPunct="1">
+              <a:lnSpc>
+                <a:spcPct val="100000"/>
+              </a:lnSpc>
+              <a:spcBef>
+                <a:spcPts val="0"/>
+              </a:spcBef>
+              <a:spcAft>
+                <a:spcPts val="0"/>
+              </a:spcAft>
+              <a:buClrTx/>
+              <a:buSzTx/>
+              <a:buFontTx/>
+              <a:buNone/>
+              <a:tabLst/>
+              <a:defRPr/>
+            </a:pPr>
+            <a:r>
+              <a:rPr kumimoji="0" lang="en-US" sz="1800" i="0" u="none" strike="noStrike" kern="0" cap="none" spc="0" normalizeH="0" baseline="0" noProof="0" dirty="0" err="1" smtClean="0">
+                <a:ln>
+                  <a:noFill/>
+                </a:ln>
+                <a:solidFill>
+                  <a:schemeClr val="bg1">
+                    <a:lumMod val="85000"/>
+                  </a:schemeClr>
+                </a:solidFill>
+                <a:effectLst/>
+                <a:uLnTx/>
+                <a:uFillTx/>
+                <a:latin typeface="Calibri"/>
+                <a:ea typeface="+mn-ea"/>
+                <a:cs typeface="+mn-cs"/>
+              </a:rPr>
+              <a:t>PyNWB</a:t>
+            </a:r>
+            <a:endParaRPr kumimoji="0" lang="en-US" sz="1800" i="0" u="none" strike="noStrike" kern="0" cap="none" spc="0" normalizeH="0" baseline="0" noProof="0" dirty="0">
+              <a:ln>
+                <a:noFill/>
+              </a:ln>
+              <a:solidFill>
+                <a:schemeClr val="bg1">
+                  <a:lumMod val="85000"/>
+                </a:schemeClr>
+              </a:solidFill>
+              <a:effectLst/>
+              <a:uLnTx/>
+              <a:uFillTx/>
+              <a:latin typeface="Calibri"/>
+              <a:ea typeface="+mn-ea"/>
+              <a:cs typeface="+mn-cs"/>
+            </a:endParaRPr>
+          </a:p>
+        </p:txBody>
+      </p:sp>
+      <p:sp>
+        <p:nvSpPr>
+          <p:cNvPr id="25" name="Cube 24"/>
+          <p:cNvSpPr/>
+          <p:nvPr/>
+        </p:nvSpPr>
+        <p:spPr>
+          <a:xfrm>
+            <a:off x="3820720" y="1947059"/>
+            <a:ext cx="1305723" cy="417754"/>
+          </a:xfrm>
+          <a:prstGeom prst="cube">
+            <a:avLst>
+              <a:gd name="adj" fmla="val 11969"/>
+            </a:avLst>
+          </a:prstGeom>
+          <a:solidFill>
+            <a:srgbClr val="052A48"/>
+          </a:solidFill>
+          <a:ln w="9525" cap="flat" cmpd="sng" algn="ctr">
+            <a:solidFill>
+              <a:srgbClr val="FFFFFF"/>
+            </a:solidFill>
+            <a:prstDash val="solid"/>
+          </a:ln>
+          <a:effectLst/>
+        </p:spPr>
+        <p:txBody>
+          <a:bodyPr tIns="0" bIns="45720" rtlCol="0" anchor="ctr" anchorCtr="0"/>
+          <a:lstStyle/>
+          <a:p>
+            <a:pPr marL="0" marR="0" lvl="0" indent="0" algn="ctr" defTabSz="914400" eaLnBrk="1" fontAlgn="auto" latinLnBrk="0" hangingPunct="1">
+              <a:lnSpc>
+                <a:spcPct val="100000"/>
+              </a:lnSpc>
+              <a:spcBef>
+                <a:spcPts val="0"/>
+              </a:spcBef>
+              <a:spcAft>
+                <a:spcPts val="0"/>
+              </a:spcAft>
+              <a:buClrTx/>
+              <a:buSzTx/>
+              <a:buFontTx/>
+              <a:buNone/>
+              <a:tabLst/>
+              <a:defRPr/>
+            </a:pPr>
+            <a:r>
+              <a:rPr kumimoji="0" lang="en-US" sz="1800" i="0" u="none" strike="noStrike" kern="0" cap="none" spc="0" normalizeH="0" baseline="0" noProof="0" dirty="0" err="1" smtClean="0">
+                <a:ln>
+                  <a:noFill/>
+                </a:ln>
+                <a:solidFill>
+                  <a:schemeClr val="bg1">
+                    <a:lumMod val="85000"/>
+                  </a:schemeClr>
+                </a:solidFill>
+                <a:effectLst/>
+                <a:uLnTx/>
+                <a:uFillTx/>
+                <a:latin typeface="Calibri"/>
+                <a:ea typeface="+mn-ea"/>
+                <a:cs typeface="+mn-cs"/>
+              </a:rPr>
+              <a:t>PyNWB</a:t>
+            </a:r>
+            <a:endParaRPr kumimoji="0" lang="en-US" sz="1800" i="0" u="none" strike="noStrike" kern="0" cap="none" spc="0" normalizeH="0" baseline="0" noProof="0" dirty="0">
+              <a:ln>
+                <a:noFill/>
+              </a:ln>
+              <a:solidFill>
+                <a:schemeClr val="bg1">
+                  <a:lumMod val="85000"/>
+                </a:schemeClr>
+              </a:solidFill>
+              <a:effectLst/>
+              <a:uLnTx/>
+              <a:uFillTx/>
+              <a:latin typeface="Calibri"/>
+              <a:ea typeface="+mn-ea"/>
+              <a:cs typeface="+mn-cs"/>
+            </a:endParaRPr>
+          </a:p>
+        </p:txBody>
+      </p:sp>
+      <p:sp>
+        <p:nvSpPr>
+          <p:cNvPr id="28" name="Cube 27"/>
+          <p:cNvSpPr/>
+          <p:nvPr/>
+        </p:nvSpPr>
+        <p:spPr>
+          <a:xfrm>
+            <a:off x="1161722" y="3519384"/>
+            <a:ext cx="1305723" cy="417754"/>
+          </a:xfrm>
+          <a:prstGeom prst="cube">
+            <a:avLst>
+              <a:gd name="adj" fmla="val 11969"/>
+            </a:avLst>
+          </a:prstGeom>
+          <a:solidFill>
+            <a:srgbClr val="052A48"/>
+          </a:solidFill>
+          <a:ln w="9525" cap="flat" cmpd="sng" algn="ctr">
+            <a:solidFill>
+              <a:srgbClr val="FFFFFF"/>
+            </a:solidFill>
+            <a:prstDash val="solid"/>
+          </a:ln>
+          <a:effectLst/>
+        </p:spPr>
+        <p:txBody>
+          <a:bodyPr tIns="0" bIns="45720" rtlCol="0" anchor="ctr" anchorCtr="0"/>
+          <a:lstStyle/>
+          <a:p>
+            <a:pPr marL="0" marR="0" lvl="0" indent="0" algn="ctr" defTabSz="914400" eaLnBrk="1" fontAlgn="auto" latinLnBrk="0" hangingPunct="1">
+              <a:lnSpc>
+                <a:spcPct val="100000"/>
+              </a:lnSpc>
+              <a:spcBef>
+                <a:spcPts val="0"/>
+              </a:spcBef>
+              <a:spcAft>
+                <a:spcPts val="0"/>
+              </a:spcAft>
+              <a:buClrTx/>
+              <a:buSzTx/>
+              <a:buFontTx/>
+              <a:buNone/>
+              <a:tabLst/>
+              <a:defRPr/>
+            </a:pPr>
+            <a:r>
+              <a:rPr kumimoji="0" lang="en-US" sz="1800" i="0" u="none" strike="noStrike" kern="0" cap="none" spc="0" normalizeH="0" baseline="0" noProof="0" dirty="0" err="1" smtClean="0">
+                <a:ln>
+                  <a:noFill/>
+                </a:ln>
+                <a:solidFill>
+                  <a:schemeClr val="bg1">
+                    <a:lumMod val="85000"/>
+                  </a:schemeClr>
+                </a:solidFill>
+                <a:effectLst/>
+                <a:uLnTx/>
+                <a:uFillTx/>
+                <a:latin typeface="Calibri"/>
+                <a:ea typeface="+mn-ea"/>
+                <a:cs typeface="+mn-cs"/>
+              </a:rPr>
+              <a:t>PyNWB</a:t>
+            </a:r>
+            <a:endParaRPr kumimoji="0" lang="en-US" sz="1800" i="0" u="none" strike="noStrike" kern="0" cap="none" spc="0" normalizeH="0" baseline="0" noProof="0" dirty="0">
+              <a:ln>
+                <a:noFill/>
+              </a:ln>
+              <a:solidFill>
+                <a:schemeClr val="bg1">
+                  <a:lumMod val="85000"/>
+                </a:schemeClr>
+              </a:solidFill>
+              <a:effectLst/>
+              <a:uLnTx/>
+              <a:uFillTx/>
+              <a:latin typeface="Calibri"/>
+              <a:ea typeface="+mn-ea"/>
+              <a:cs typeface="+mn-cs"/>
+            </a:endParaRPr>
+          </a:p>
+        </p:txBody>
+      </p:sp>
+      <p:sp>
+        <p:nvSpPr>
+          <p:cNvPr id="30" name="Cube 29"/>
+          <p:cNvSpPr/>
+          <p:nvPr/>
+        </p:nvSpPr>
+        <p:spPr>
+          <a:xfrm>
+            <a:off x="6559614" y="3519900"/>
+            <a:ext cx="1305723" cy="417754"/>
+          </a:xfrm>
+          <a:prstGeom prst="cube">
+            <a:avLst>
+              <a:gd name="adj" fmla="val 11969"/>
+            </a:avLst>
+          </a:prstGeom>
+          <a:solidFill>
+            <a:srgbClr val="052A48"/>
+          </a:solidFill>
+          <a:ln w="9525" cap="flat" cmpd="sng" algn="ctr">
+            <a:solidFill>
+              <a:srgbClr val="FFFFFF"/>
+            </a:solidFill>
+            <a:prstDash val="solid"/>
+          </a:ln>
+          <a:effectLst/>
+        </p:spPr>
+        <p:txBody>
+          <a:bodyPr tIns="0" bIns="45720" rtlCol="0" anchor="ctr" anchorCtr="0"/>
+          <a:lstStyle/>
+          <a:p>
+            <a:pPr marL="0" marR="0" lvl="0" indent="0" algn="ctr" defTabSz="914400" eaLnBrk="1" fontAlgn="auto" latinLnBrk="0" hangingPunct="1">
+              <a:lnSpc>
+                <a:spcPct val="100000"/>
+              </a:lnSpc>
+              <a:spcBef>
+                <a:spcPts val="0"/>
+              </a:spcBef>
+              <a:spcAft>
+                <a:spcPts val="0"/>
+              </a:spcAft>
+              <a:buClrTx/>
+              <a:buSzTx/>
+              <a:buFontTx/>
+              <a:buNone/>
+              <a:tabLst/>
+              <a:defRPr/>
+            </a:pPr>
+            <a:r>
+              <a:rPr kumimoji="0" lang="en-US" sz="1800" i="0" u="none" strike="noStrike" kern="0" cap="none" spc="0" normalizeH="0" baseline="0" noProof="0" dirty="0" err="1" smtClean="0">
+                <a:ln>
+                  <a:noFill/>
+                </a:ln>
+                <a:solidFill>
+                  <a:schemeClr val="bg1">
+                    <a:lumMod val="85000"/>
+                  </a:schemeClr>
+                </a:solidFill>
+                <a:effectLst/>
+                <a:uLnTx/>
+                <a:uFillTx/>
+                <a:latin typeface="Calibri"/>
+                <a:ea typeface="+mn-ea"/>
+                <a:cs typeface="+mn-cs"/>
+              </a:rPr>
+              <a:t>PyNWB</a:t>
+            </a:r>
+            <a:endParaRPr kumimoji="0" lang="en-US" sz="1800" i="0" u="none" strike="noStrike" kern="0" cap="none" spc="0" normalizeH="0" baseline="0" noProof="0" dirty="0">
+              <a:ln>
+                <a:noFill/>
+              </a:ln>
+              <a:solidFill>
+                <a:schemeClr val="bg1">
+                  <a:lumMod val="85000"/>
+                </a:schemeClr>
+              </a:solidFill>
+              <a:effectLst/>
+              <a:uLnTx/>
+              <a:uFillTx/>
+              <a:latin typeface="Calibri"/>
+              <a:ea typeface="+mn-ea"/>
+              <a:cs typeface="+mn-cs"/>
+            </a:endParaRPr>
+          </a:p>
+        </p:txBody>
+      </p:sp>
+      <p:sp>
+        <p:nvSpPr>
+          <p:cNvPr id="34" name="Left Arrow 33"/>
+          <p:cNvSpPr/>
+          <p:nvPr/>
+        </p:nvSpPr>
+        <p:spPr>
+          <a:xfrm rot="5400000" flipV="1">
+            <a:off x="4269649" y="4783832"/>
+            <a:ext cx="416341" cy="268194"/>
+          </a:xfrm>
+          <a:prstGeom prst="leftArrow">
+            <a:avLst>
+              <a:gd name="adj1" fmla="val 46274"/>
+              <a:gd name="adj2" fmla="val 50000"/>
+            </a:avLst>
+          </a:prstGeom>
+          <a:solidFill>
+            <a:srgbClr val="052A48"/>
+          </a:solidFill>
+          <a:ln w="9525" cmpd="sng">
+            <a:solidFill>
+              <a:srgbClr val="FFFFFF"/>
+            </a:solidFill>
+          </a:ln>
+        </p:spPr>
+        <p:style>
+          <a:lnRef idx="0">
+            <a:schemeClr val="accent1">
+              <a:tint val="60000"/>
+              <a:hueOff val="0"/>
+              <a:satOff val="0"/>
+              <a:lumOff val="0"/>
+              <a:alphaOff val="0"/>
+            </a:schemeClr>
+          </a:lnRef>
+          <a:fillRef idx="1">
+            <a:schemeClr val="accent1">
+              <a:tint val="60000"/>
+              <a:hueOff val="0"/>
+              <a:satOff val="0"/>
+              <a:lumOff val="0"/>
+              <a:alphaOff val="0"/>
+            </a:schemeClr>
+          </a:fillRef>
+          <a:effectRef idx="0">
+            <a:schemeClr val="accent1">
+              <a:tint val="60000"/>
+              <a:hueOff val="0"/>
+              <a:satOff val="0"/>
+              <a:lumOff val="0"/>
+              <a:alphaOff val="0"/>
+            </a:schemeClr>
+          </a:effectRef>
+          <a:fontRef idx="minor">
+            <a:schemeClr val="lt1"/>
+          </a:fontRef>
+        </p:style>
+      </p:sp>
+      <p:sp>
+        <p:nvSpPr>
+          <p:cNvPr id="35" name="Left Arrow 34"/>
+          <p:cNvSpPr/>
+          <p:nvPr/>
+        </p:nvSpPr>
+        <p:spPr>
+          <a:xfrm rot="16200000" flipV="1">
+            <a:off x="4270167" y="2451408"/>
+            <a:ext cx="416341" cy="268194"/>
+          </a:xfrm>
+          <a:prstGeom prst="leftArrow">
+            <a:avLst>
+              <a:gd name="adj1" fmla="val 46274"/>
+              <a:gd name="adj2" fmla="val 50000"/>
+            </a:avLst>
+          </a:prstGeom>
+          <a:solidFill>
+            <a:srgbClr val="052A48"/>
+          </a:solidFill>
+          <a:ln w="9525" cmpd="sng">
+            <a:solidFill>
+              <a:srgbClr val="FFFFFF"/>
+            </a:solidFill>
+          </a:ln>
+        </p:spPr>
+        <p:style>
+          <a:lnRef idx="0">
+            <a:schemeClr val="accent1">
+              <a:tint val="60000"/>
+              <a:hueOff val="0"/>
+              <a:satOff val="0"/>
+              <a:lumOff val="0"/>
+              <a:alphaOff val="0"/>
+            </a:schemeClr>
+          </a:lnRef>
+          <a:fillRef idx="1">
+            <a:schemeClr val="accent1">
+              <a:tint val="60000"/>
+              <a:hueOff val="0"/>
+              <a:satOff val="0"/>
+              <a:lumOff val="0"/>
+              <a:alphaOff val="0"/>
+            </a:schemeClr>
+          </a:fillRef>
+          <a:effectRef idx="0">
+            <a:schemeClr val="accent1">
+              <a:tint val="60000"/>
+              <a:hueOff val="0"/>
+              <a:satOff val="0"/>
+              <a:lumOff val="0"/>
+              <a:alphaOff val="0"/>
+            </a:schemeClr>
+          </a:effectRef>
+          <a:fontRef idx="minor">
+            <a:schemeClr val="lt1"/>
+          </a:fontRef>
+        </p:style>
+      </p:sp>
+      <p:sp>
+        <p:nvSpPr>
+          <p:cNvPr id="36" name="Left Arrow 35"/>
+          <p:cNvSpPr/>
+          <p:nvPr/>
+        </p:nvSpPr>
+        <p:spPr>
+          <a:xfrm rot="10800000" flipV="1">
+            <a:off x="2466969" y="3606941"/>
+            <a:ext cx="1186546" cy="268194"/>
+          </a:xfrm>
+          <a:prstGeom prst="leftArrow">
+            <a:avLst>
+              <a:gd name="adj1" fmla="val 46274"/>
+              <a:gd name="adj2" fmla="val 50000"/>
+            </a:avLst>
+          </a:prstGeom>
+          <a:solidFill>
+            <a:srgbClr val="052A48"/>
+          </a:solidFill>
+          <a:ln w="9525" cmpd="sng">
+            <a:solidFill>
+              <a:srgbClr val="FFFFFF"/>
+            </a:solidFill>
+          </a:ln>
+        </p:spPr>
+        <p:style>
+          <a:lnRef idx="0">
+            <a:schemeClr val="accent1">
+              <a:tint val="60000"/>
+              <a:hueOff val="0"/>
+              <a:satOff val="0"/>
+              <a:lumOff val="0"/>
+              <a:alphaOff val="0"/>
+            </a:schemeClr>
+          </a:lnRef>
+          <a:fillRef idx="1">
+            <a:schemeClr val="accent1">
+              <a:tint val="60000"/>
+              <a:hueOff val="0"/>
+              <a:satOff val="0"/>
+              <a:lumOff val="0"/>
+              <a:alphaOff val="0"/>
+            </a:schemeClr>
+          </a:fillRef>
+          <a:effectRef idx="0">
+            <a:schemeClr val="accent1">
+              <a:tint val="60000"/>
+              <a:hueOff val="0"/>
+              <a:satOff val="0"/>
+              <a:lumOff val="0"/>
+              <a:alphaOff val="0"/>
+            </a:schemeClr>
+          </a:effectRef>
+          <a:fontRef idx="minor">
+            <a:schemeClr val="lt1"/>
+          </a:fontRef>
+        </p:style>
+      </p:sp>
+      <p:sp>
+        <p:nvSpPr>
+          <p:cNvPr id="37" name="Left Arrow 36"/>
+          <p:cNvSpPr/>
+          <p:nvPr/>
+        </p:nvSpPr>
+        <p:spPr>
+          <a:xfrm rot="10800000" flipH="1" flipV="1">
+            <a:off x="5259407" y="3607490"/>
+            <a:ext cx="1288946" cy="268194"/>
+          </a:xfrm>
+          <a:prstGeom prst="leftArrow">
+            <a:avLst>
+              <a:gd name="adj1" fmla="val 46274"/>
+              <a:gd name="adj2" fmla="val 50000"/>
+            </a:avLst>
+          </a:prstGeom>
+          <a:solidFill>
+            <a:srgbClr val="052A48"/>
+          </a:solidFill>
+          <a:ln w="9525" cmpd="sng">
+            <a:solidFill>
+              <a:srgbClr val="FFFFFF"/>
+            </a:solidFill>
+          </a:ln>
+        </p:spPr>
+        <p:style>
+          <a:lnRef idx="0">
+            <a:schemeClr val="accent1">
+              <a:tint val="60000"/>
+              <a:hueOff val="0"/>
+              <a:satOff val="0"/>
+              <a:lumOff val="0"/>
+              <a:alphaOff val="0"/>
+            </a:schemeClr>
+          </a:lnRef>
+          <a:fillRef idx="1">
+            <a:schemeClr val="accent1">
+              <a:tint val="60000"/>
+              <a:hueOff val="0"/>
+              <a:satOff val="0"/>
+              <a:lumOff val="0"/>
+              <a:alphaOff val="0"/>
+            </a:schemeClr>
+          </a:fillRef>
+          <a:effectRef idx="0">
+            <a:schemeClr val="accent1">
+              <a:tint val="60000"/>
+              <a:hueOff val="0"/>
+              <a:satOff val="0"/>
+              <a:lumOff val="0"/>
+              <a:alphaOff val="0"/>
+            </a:schemeClr>
+          </a:effectRef>
+          <a:fontRef idx="minor">
+            <a:schemeClr val="lt1"/>
+          </a:fontRef>
+        </p:style>
+      </p:sp>
+      <p:sp>
+        <p:nvSpPr>
+          <p:cNvPr id="38" name="Left Arrow 37"/>
+          <p:cNvSpPr/>
+          <p:nvPr/>
+        </p:nvSpPr>
+        <p:spPr>
+          <a:xfrm rot="8743586" flipV="1">
+            <a:off x="2696659" y="4338309"/>
+            <a:ext cx="1101907" cy="268194"/>
+          </a:xfrm>
+          <a:prstGeom prst="leftArrow">
+            <a:avLst>
+              <a:gd name="adj1" fmla="val 46274"/>
+              <a:gd name="adj2" fmla="val 50000"/>
+            </a:avLst>
+          </a:prstGeom>
+          <a:solidFill>
+            <a:srgbClr val="052A48"/>
+          </a:solidFill>
+          <a:ln w="9525" cmpd="sng">
+            <a:solidFill>
+              <a:srgbClr val="FFFFFF"/>
+            </a:solidFill>
+          </a:ln>
+        </p:spPr>
+        <p:style>
+          <a:lnRef idx="0">
+            <a:schemeClr val="accent1">
+              <a:tint val="60000"/>
+              <a:hueOff val="0"/>
+              <a:satOff val="0"/>
+              <a:lumOff val="0"/>
+              <a:alphaOff val="0"/>
+            </a:schemeClr>
+          </a:lnRef>
+          <a:fillRef idx="1">
+            <a:schemeClr val="accent1">
+              <a:tint val="60000"/>
+              <a:hueOff val="0"/>
+              <a:satOff val="0"/>
+              <a:lumOff val="0"/>
+              <a:alphaOff val="0"/>
+            </a:schemeClr>
+          </a:fillRef>
+          <a:effectRef idx="0">
+            <a:schemeClr val="accent1">
+              <a:tint val="60000"/>
+              <a:hueOff val="0"/>
+              <a:satOff val="0"/>
+              <a:lumOff val="0"/>
+              <a:alphaOff val="0"/>
+            </a:schemeClr>
+          </a:effectRef>
+          <a:fontRef idx="minor">
+            <a:schemeClr val="lt1"/>
+          </a:fontRef>
+        </p:style>
+      </p:sp>
+      <p:sp>
+        <p:nvSpPr>
+          <p:cNvPr id="17" name="Cube 16"/>
+          <p:cNvSpPr/>
+          <p:nvPr/>
+        </p:nvSpPr>
+        <p:spPr>
+          <a:xfrm>
+            <a:off x="1928718" y="4729655"/>
+            <a:ext cx="1305723" cy="417754"/>
+          </a:xfrm>
+          <a:prstGeom prst="cube">
+            <a:avLst>
+              <a:gd name="adj" fmla="val 11969"/>
+            </a:avLst>
+          </a:prstGeom>
+          <a:solidFill>
+            <a:srgbClr val="052A48"/>
+          </a:solidFill>
+          <a:ln w="9525" cap="flat" cmpd="sng" algn="ctr">
+            <a:solidFill>
+              <a:srgbClr val="FFFFFF"/>
+            </a:solidFill>
+            <a:prstDash val="solid"/>
+          </a:ln>
+          <a:effectLst/>
+        </p:spPr>
+        <p:txBody>
+          <a:bodyPr tIns="0" bIns="45720" rtlCol="0" anchor="ctr" anchorCtr="0"/>
+          <a:lstStyle/>
+          <a:p>
+            <a:pPr marL="0" marR="0" lvl="0" indent="0" algn="ctr" defTabSz="914400" eaLnBrk="1" fontAlgn="auto" latinLnBrk="0" hangingPunct="1">
+              <a:lnSpc>
+                <a:spcPct val="100000"/>
+              </a:lnSpc>
+              <a:spcBef>
+                <a:spcPts val="0"/>
+              </a:spcBef>
+              <a:spcAft>
+                <a:spcPts val="0"/>
+              </a:spcAft>
+              <a:buClrTx/>
+              <a:buSzTx/>
+              <a:buFontTx/>
+              <a:buNone/>
+              <a:tabLst/>
+              <a:defRPr/>
+            </a:pPr>
+            <a:r>
+              <a:rPr kumimoji="0" lang="en-US" sz="1800" i="0" u="none" strike="noStrike" kern="0" cap="none" spc="0" normalizeH="0" baseline="0" noProof="0" dirty="0" err="1" smtClean="0">
+                <a:ln>
+                  <a:noFill/>
+                </a:ln>
+                <a:solidFill>
+                  <a:schemeClr val="bg1">
+                    <a:lumMod val="85000"/>
+                  </a:schemeClr>
+                </a:solidFill>
+                <a:effectLst/>
+                <a:uLnTx/>
+                <a:uFillTx/>
+                <a:latin typeface="Calibri"/>
+                <a:ea typeface="+mn-ea"/>
+                <a:cs typeface="+mn-cs"/>
+              </a:rPr>
+              <a:t>PyNWB</a:t>
+            </a:r>
+            <a:endParaRPr kumimoji="0" lang="en-US" sz="1800" i="0" u="none" strike="noStrike" kern="0" cap="none" spc="0" normalizeH="0" baseline="0" noProof="0" dirty="0">
+              <a:ln>
+                <a:noFill/>
+              </a:ln>
+              <a:solidFill>
+                <a:schemeClr val="bg1">
+                  <a:lumMod val="85000"/>
+                </a:schemeClr>
+              </a:solidFill>
+              <a:effectLst/>
+              <a:uLnTx/>
+              <a:uFillTx/>
+              <a:latin typeface="Calibri"/>
+              <a:ea typeface="+mn-ea"/>
+              <a:cs typeface="+mn-cs"/>
+            </a:endParaRPr>
+          </a:p>
+        </p:txBody>
+      </p:sp>
+      <p:sp>
+        <p:nvSpPr>
+          <p:cNvPr id="39" name="Left Arrow 38"/>
+          <p:cNvSpPr/>
+          <p:nvPr/>
+        </p:nvSpPr>
+        <p:spPr>
+          <a:xfrm rot="12856414" flipH="1" flipV="1">
+            <a:off x="5163566" y="4334257"/>
+            <a:ext cx="1101907" cy="268194"/>
+          </a:xfrm>
+          <a:prstGeom prst="leftArrow">
+            <a:avLst>
+              <a:gd name="adj1" fmla="val 46274"/>
+              <a:gd name="adj2" fmla="val 50000"/>
+            </a:avLst>
+          </a:prstGeom>
+          <a:solidFill>
+            <a:srgbClr val="052A48"/>
+          </a:solidFill>
+          <a:ln w="9525" cmpd="sng">
+            <a:solidFill>
+              <a:srgbClr val="FFFFFF"/>
+            </a:solidFill>
+          </a:ln>
+        </p:spPr>
+        <p:style>
+          <a:lnRef idx="0">
+            <a:schemeClr val="accent1">
+              <a:tint val="60000"/>
+              <a:hueOff val="0"/>
+              <a:satOff val="0"/>
+              <a:lumOff val="0"/>
+              <a:alphaOff val="0"/>
+            </a:schemeClr>
+          </a:lnRef>
+          <a:fillRef idx="1">
+            <a:schemeClr val="accent1">
+              <a:tint val="60000"/>
+              <a:hueOff val="0"/>
+              <a:satOff val="0"/>
+              <a:lumOff val="0"/>
+              <a:alphaOff val="0"/>
+            </a:schemeClr>
+          </a:fillRef>
+          <a:effectRef idx="0">
+            <a:schemeClr val="accent1">
+              <a:tint val="60000"/>
+              <a:hueOff val="0"/>
+              <a:satOff val="0"/>
+              <a:lumOff val="0"/>
+              <a:alphaOff val="0"/>
+            </a:schemeClr>
+          </a:effectRef>
+          <a:fontRef idx="minor">
+            <a:schemeClr val="lt1"/>
+          </a:fontRef>
+        </p:style>
+      </p:sp>
+      <p:sp>
+        <p:nvSpPr>
+          <p:cNvPr id="31" name="Cube 30"/>
+          <p:cNvSpPr/>
+          <p:nvPr/>
+        </p:nvSpPr>
+        <p:spPr>
+          <a:xfrm>
+            <a:off x="5666114" y="4729913"/>
+            <a:ext cx="1305723" cy="417754"/>
+          </a:xfrm>
+          <a:prstGeom prst="cube">
+            <a:avLst>
+              <a:gd name="adj" fmla="val 11969"/>
+            </a:avLst>
+          </a:prstGeom>
+          <a:solidFill>
+            <a:srgbClr val="052A48"/>
+          </a:solidFill>
+          <a:ln w="9525" cap="flat" cmpd="sng" algn="ctr">
+            <a:solidFill>
+              <a:srgbClr val="FFFFFF"/>
+            </a:solidFill>
+            <a:prstDash val="solid"/>
+          </a:ln>
+          <a:effectLst/>
+        </p:spPr>
+        <p:txBody>
+          <a:bodyPr tIns="0" bIns="45720" rtlCol="0" anchor="ctr" anchorCtr="0"/>
+          <a:lstStyle/>
+          <a:p>
+            <a:pPr marL="0" marR="0" lvl="0" indent="0" algn="ctr" defTabSz="914400" eaLnBrk="1" fontAlgn="auto" latinLnBrk="0" hangingPunct="1">
+              <a:lnSpc>
+                <a:spcPct val="100000"/>
+              </a:lnSpc>
+              <a:spcBef>
+                <a:spcPts val="0"/>
+              </a:spcBef>
+              <a:spcAft>
+                <a:spcPts val="0"/>
+              </a:spcAft>
+              <a:buClrTx/>
+              <a:buSzTx/>
+              <a:buFontTx/>
+              <a:buNone/>
+              <a:tabLst/>
+              <a:defRPr/>
+            </a:pPr>
+            <a:r>
+              <a:rPr kumimoji="0" lang="en-US" sz="1800" i="0" u="none" strike="noStrike" kern="0" cap="none" spc="0" normalizeH="0" baseline="0" noProof="0" dirty="0" err="1" smtClean="0">
+                <a:ln>
+                  <a:noFill/>
+                </a:ln>
+                <a:solidFill>
+                  <a:schemeClr val="bg1">
+                    <a:lumMod val="85000"/>
+                  </a:schemeClr>
+                </a:solidFill>
+                <a:effectLst/>
+                <a:uLnTx/>
+                <a:uFillTx/>
+                <a:latin typeface="Calibri"/>
+                <a:ea typeface="+mn-ea"/>
+                <a:cs typeface="+mn-cs"/>
+              </a:rPr>
+              <a:t>PyNWB</a:t>
+            </a:r>
+            <a:endParaRPr kumimoji="0" lang="en-US" sz="1800" i="0" u="none" strike="noStrike" kern="0" cap="none" spc="0" normalizeH="0" baseline="0" noProof="0" dirty="0">
+              <a:ln>
+                <a:noFill/>
+              </a:ln>
+              <a:solidFill>
+                <a:schemeClr val="bg1">
+                  <a:lumMod val="85000"/>
+                </a:schemeClr>
+              </a:solidFill>
+              <a:effectLst/>
+              <a:uLnTx/>
+              <a:uFillTx/>
+              <a:latin typeface="Calibri"/>
+              <a:ea typeface="+mn-ea"/>
+              <a:cs typeface="+mn-cs"/>
+            </a:endParaRPr>
+          </a:p>
+        </p:txBody>
+      </p:sp>
+      <p:sp>
+        <p:nvSpPr>
+          <p:cNvPr id="40" name="Left Arrow 39"/>
+          <p:cNvSpPr/>
+          <p:nvPr/>
+        </p:nvSpPr>
+        <p:spPr>
+          <a:xfrm rot="8743586" flipH="1">
+            <a:off x="5164119" y="2908337"/>
+            <a:ext cx="1101907" cy="268194"/>
+          </a:xfrm>
+          <a:prstGeom prst="leftArrow">
+            <a:avLst>
+              <a:gd name="adj1" fmla="val 46274"/>
+              <a:gd name="adj2" fmla="val 50000"/>
+            </a:avLst>
+          </a:prstGeom>
+          <a:solidFill>
+            <a:srgbClr val="052A48"/>
+          </a:solidFill>
+          <a:ln w="9525" cmpd="sng">
+            <a:solidFill>
+              <a:srgbClr val="FFFFFF"/>
+            </a:solidFill>
+          </a:ln>
+        </p:spPr>
+        <p:style>
+          <a:lnRef idx="0">
+            <a:schemeClr val="accent1">
+              <a:tint val="60000"/>
+              <a:hueOff val="0"/>
+              <a:satOff val="0"/>
+              <a:lumOff val="0"/>
+              <a:alphaOff val="0"/>
+            </a:schemeClr>
+          </a:lnRef>
+          <a:fillRef idx="1">
+            <a:schemeClr val="accent1">
+              <a:tint val="60000"/>
+              <a:hueOff val="0"/>
+              <a:satOff val="0"/>
+              <a:lumOff val="0"/>
+              <a:alphaOff val="0"/>
+            </a:schemeClr>
+          </a:fillRef>
+          <a:effectRef idx="0">
+            <a:schemeClr val="accent1">
+              <a:tint val="60000"/>
+              <a:hueOff val="0"/>
+              <a:satOff val="0"/>
+              <a:lumOff val="0"/>
+              <a:alphaOff val="0"/>
+            </a:schemeClr>
+          </a:effectRef>
+          <a:fontRef idx="minor">
+            <a:schemeClr val="lt1"/>
+          </a:fontRef>
+        </p:style>
+      </p:sp>
+      <p:sp>
+        <p:nvSpPr>
+          <p:cNvPr id="32" name="Cube 31"/>
+          <p:cNvSpPr/>
+          <p:nvPr/>
+        </p:nvSpPr>
+        <p:spPr>
+          <a:xfrm>
+            <a:off x="5666652" y="2395368"/>
+            <a:ext cx="1305723" cy="417754"/>
+          </a:xfrm>
+          <a:prstGeom prst="cube">
+            <a:avLst>
+              <a:gd name="adj" fmla="val 11969"/>
+            </a:avLst>
+          </a:prstGeom>
+          <a:solidFill>
+            <a:srgbClr val="052A48"/>
+          </a:solidFill>
+          <a:ln w="9525" cap="flat" cmpd="sng" algn="ctr">
+            <a:solidFill>
+              <a:srgbClr val="FFFFFF"/>
+            </a:solidFill>
+            <a:prstDash val="solid"/>
+          </a:ln>
+          <a:effectLst/>
+        </p:spPr>
+        <p:txBody>
+          <a:bodyPr tIns="0" bIns="45720" rtlCol="0" anchor="ctr" anchorCtr="0"/>
+          <a:lstStyle/>
+          <a:p>
+            <a:pPr marL="0" marR="0" lvl="0" indent="0" algn="ctr" defTabSz="914400" eaLnBrk="1" fontAlgn="auto" latinLnBrk="0" hangingPunct="1">
+              <a:lnSpc>
+                <a:spcPct val="100000"/>
+              </a:lnSpc>
+              <a:spcBef>
+                <a:spcPts val="0"/>
+              </a:spcBef>
+              <a:spcAft>
+                <a:spcPts val="0"/>
+              </a:spcAft>
+              <a:buClrTx/>
+              <a:buSzTx/>
+              <a:buFontTx/>
+              <a:buNone/>
+              <a:tabLst/>
+              <a:defRPr/>
+            </a:pPr>
+            <a:r>
+              <a:rPr kumimoji="0" lang="en-US" sz="1800" i="0" u="none" strike="noStrike" kern="0" cap="none" spc="0" normalizeH="0" baseline="0" noProof="0" dirty="0" err="1" smtClean="0">
+                <a:ln>
+                  <a:noFill/>
+                </a:ln>
+                <a:solidFill>
+                  <a:schemeClr val="bg1">
+                    <a:lumMod val="85000"/>
+                  </a:schemeClr>
+                </a:solidFill>
+                <a:effectLst/>
+                <a:uLnTx/>
+                <a:uFillTx/>
+                <a:latin typeface="Calibri"/>
+                <a:ea typeface="+mn-ea"/>
+                <a:cs typeface="+mn-cs"/>
+              </a:rPr>
+              <a:t>PyNWB</a:t>
+            </a:r>
+            <a:endParaRPr kumimoji="0" lang="en-US" sz="1800" i="0" u="none" strike="noStrike" kern="0" cap="none" spc="0" normalizeH="0" baseline="0" noProof="0" dirty="0">
+              <a:ln>
+                <a:noFill/>
+              </a:ln>
+              <a:solidFill>
+                <a:schemeClr val="bg1">
+                  <a:lumMod val="85000"/>
+                </a:schemeClr>
+              </a:solidFill>
+              <a:effectLst/>
+              <a:uLnTx/>
+              <a:uFillTx/>
+              <a:latin typeface="Calibri"/>
+              <a:ea typeface="+mn-ea"/>
+              <a:cs typeface="+mn-cs"/>
+            </a:endParaRPr>
+          </a:p>
+        </p:txBody>
+      </p:sp>
+      <p:sp>
+        <p:nvSpPr>
+          <p:cNvPr id="41" name="Left Arrow 40"/>
+          <p:cNvSpPr/>
+          <p:nvPr/>
+        </p:nvSpPr>
+        <p:spPr>
+          <a:xfrm rot="12856414">
+            <a:off x="2527004" y="2826537"/>
+            <a:ext cx="936787" cy="268194"/>
+          </a:xfrm>
+          <a:prstGeom prst="leftArrow">
+            <a:avLst>
+              <a:gd name="adj1" fmla="val 46274"/>
+              <a:gd name="adj2" fmla="val 50000"/>
+            </a:avLst>
+          </a:prstGeom>
+          <a:solidFill>
+            <a:srgbClr val="052A48"/>
+          </a:solidFill>
+          <a:ln w="9525" cmpd="sng">
+            <a:solidFill>
+              <a:srgbClr val="FFFFFF"/>
+            </a:solidFill>
+          </a:ln>
+        </p:spPr>
+        <p:style>
+          <a:lnRef idx="0">
+            <a:schemeClr val="accent1">
+              <a:tint val="60000"/>
+              <a:hueOff val="0"/>
+              <a:satOff val="0"/>
+              <a:lumOff val="0"/>
+              <a:alphaOff val="0"/>
+            </a:schemeClr>
+          </a:lnRef>
+          <a:fillRef idx="1">
+            <a:schemeClr val="accent1">
+              <a:tint val="60000"/>
+              <a:hueOff val="0"/>
+              <a:satOff val="0"/>
+              <a:lumOff val="0"/>
+              <a:alphaOff val="0"/>
+            </a:schemeClr>
+          </a:fillRef>
+          <a:effectRef idx="0">
+            <a:schemeClr val="accent1">
+              <a:tint val="60000"/>
+              <a:hueOff val="0"/>
+              <a:satOff val="0"/>
+              <a:lumOff val="0"/>
+              <a:alphaOff val="0"/>
+            </a:schemeClr>
+          </a:effectRef>
+          <a:fontRef idx="minor">
+            <a:schemeClr val="lt1"/>
+          </a:fontRef>
+        </p:style>
+      </p:sp>
+      <p:sp>
+        <p:nvSpPr>
+          <p:cNvPr id="29" name="Cube 28"/>
+          <p:cNvSpPr/>
+          <p:nvPr/>
+        </p:nvSpPr>
+        <p:spPr>
+          <a:xfrm>
+            <a:off x="1943060" y="2395110"/>
+            <a:ext cx="1305723" cy="417754"/>
+          </a:xfrm>
+          <a:prstGeom prst="cube">
+            <a:avLst>
+              <a:gd name="adj" fmla="val 11969"/>
+            </a:avLst>
+          </a:prstGeom>
+          <a:solidFill>
+            <a:srgbClr val="052A48"/>
+          </a:solidFill>
+          <a:ln w="9525" cap="flat" cmpd="sng" algn="ctr">
+            <a:solidFill>
+              <a:srgbClr val="FFFFFF"/>
+            </a:solidFill>
+            <a:prstDash val="solid"/>
+          </a:ln>
+          <a:effectLst/>
+        </p:spPr>
+        <p:txBody>
+          <a:bodyPr tIns="0" bIns="45720" rtlCol="0" anchor="ctr" anchorCtr="0"/>
+          <a:lstStyle/>
+          <a:p>
+            <a:pPr marL="0" marR="0" lvl="0" indent="0" algn="ctr" defTabSz="914400" eaLnBrk="1" fontAlgn="auto" latinLnBrk="0" hangingPunct="1">
+              <a:lnSpc>
+                <a:spcPct val="100000"/>
+              </a:lnSpc>
+              <a:spcBef>
+                <a:spcPts val="0"/>
+              </a:spcBef>
+              <a:spcAft>
+                <a:spcPts val="0"/>
+              </a:spcAft>
+              <a:buClrTx/>
+              <a:buSzTx/>
+              <a:buFontTx/>
+              <a:buNone/>
+              <a:tabLst/>
+              <a:defRPr/>
+            </a:pPr>
+            <a:r>
+              <a:rPr kumimoji="0" lang="en-US" sz="1800" i="0" u="none" strike="noStrike" kern="0" cap="none" spc="0" normalizeH="0" baseline="0" noProof="0" dirty="0" err="1" smtClean="0">
+                <a:ln>
+                  <a:noFill/>
+                </a:ln>
+                <a:solidFill>
+                  <a:schemeClr val="bg1">
+                    <a:lumMod val="85000"/>
+                  </a:schemeClr>
+                </a:solidFill>
+                <a:effectLst/>
+                <a:uLnTx/>
+                <a:uFillTx/>
+                <a:latin typeface="Calibri"/>
+                <a:ea typeface="+mn-ea"/>
+                <a:cs typeface="+mn-cs"/>
+              </a:rPr>
+              <a:t>PyNWB</a:t>
+            </a:r>
+            <a:endParaRPr kumimoji="0" lang="en-US" sz="1800" i="0" u="none" strike="noStrike" kern="0" cap="none" spc="0" normalizeH="0" baseline="0" noProof="0" dirty="0">
+              <a:ln>
+                <a:noFill/>
+              </a:ln>
+              <a:solidFill>
+                <a:schemeClr val="bg1">
+                  <a:lumMod val="85000"/>
+                </a:schemeClr>
+              </a:solidFill>
+              <a:effectLst/>
+              <a:uLnTx/>
+              <a:uFillTx/>
+              <a:latin typeface="Calibri"/>
+              <a:ea typeface="+mn-ea"/>
+              <a:cs typeface="+mn-cs"/>
+            </a:endParaRPr>
+          </a:p>
+        </p:txBody>
+      </p:sp>
+    </p:spTree>
+    <p:extLst>
+      <p:ext uri="{BB962C8B-B14F-4D97-AF65-F5344CB8AC3E}">
+        <p14:creationId xmlns:p14="http://schemas.microsoft.com/office/powerpoint/2010/main" val="2963881109"/>
       </p:ext>
     </p:extLst>
   </p:cSld>
@@ -8216,7 +9175,7 @@
   <a:extraClrSchemeLst/>
   <a:extLst>
     <a:ext uri="{05A4C25C-085E-4340-85A3-A5531E510DB2}">
-      <thm15:themeFamily xmlns:thm15="http://schemas.microsoft.com/office/thememl/2012/main" xmlns="" name="Office Theme" id="{62F939B6-93AF-4DB8-9C6B-D6C7DFDC589F}" vid="{4A3C46E8-61CC-4603-A589-7422A47A8E4A}"/>
+      <thm15:themeFamily xmlns="" xmlns:thm15="http://schemas.microsoft.com/office/thememl/2012/main" name="Office Theme" id="{62F939B6-93AF-4DB8-9C6B-D6C7DFDC589F}" vid="{4A3C46E8-61CC-4603-A589-7422A47A8E4A}"/>
     </a:ext>
   </a:extLst>
 </a:theme>

</xml_diff>

<commit_message>
Updated tutorial to convert icephys tabels to pandas
</commit_message>
<xml_diff>
--- a/docs/source/figures/gallery_thumbnails.pptx
+++ b/docs/source/figures/gallery_thumbnails.pptx
@@ -5,23 +5,24 @@
     <p:sldMasterId id="2147483660" r:id="rId1"/>
   </p:sldMasterIdLst>
   <p:notesMasterIdLst>
-    <p:notesMasterId r:id="rId16"/>
+    <p:notesMasterId r:id="rId17"/>
   </p:notesMasterIdLst>
   <p:sldIdLst>
     <p:sldId id="342" r:id="rId2"/>
-    <p:sldId id="347" r:id="rId3"/>
-    <p:sldId id="346" r:id="rId4"/>
-    <p:sldId id="348" r:id="rId5"/>
-    <p:sldId id="349" r:id="rId6"/>
-    <p:sldId id="350" r:id="rId7"/>
-    <p:sldId id="357" r:id="rId8"/>
-    <p:sldId id="352" r:id="rId9"/>
-    <p:sldId id="361" r:id="rId10"/>
-    <p:sldId id="353" r:id="rId11"/>
-    <p:sldId id="354" r:id="rId12"/>
-    <p:sldId id="355" r:id="rId13"/>
-    <p:sldId id="358" r:id="rId14"/>
-    <p:sldId id="359" r:id="rId15"/>
+    <p:sldId id="362" r:id="rId3"/>
+    <p:sldId id="347" r:id="rId4"/>
+    <p:sldId id="346" r:id="rId5"/>
+    <p:sldId id="348" r:id="rId6"/>
+    <p:sldId id="349" r:id="rId7"/>
+    <p:sldId id="350" r:id="rId8"/>
+    <p:sldId id="357" r:id="rId9"/>
+    <p:sldId id="352" r:id="rId10"/>
+    <p:sldId id="361" r:id="rId11"/>
+    <p:sldId id="353" r:id="rId12"/>
+    <p:sldId id="354" r:id="rId13"/>
+    <p:sldId id="355" r:id="rId14"/>
+    <p:sldId id="358" r:id="rId15"/>
+    <p:sldId id="359" r:id="rId16"/>
   </p:sldIdLst>
   <p:sldSz cx="12192000" cy="6858000"/>
   <p:notesSz cx="6858000" cy="9144000"/>
@@ -122,7 +123,7 @@
   </p:defaultTextStyle>
   <p:extLst>
     <p:ext uri="{EFAFB233-063F-42B5-8137-9DF3F51BA10A}">
-      <p15:sldGuideLst xmlns="" xmlns:p15="http://schemas.microsoft.com/office/powerpoint/2012/main"/>
+      <p15:sldGuideLst xmlns:p15="http://schemas.microsoft.com/office/powerpoint/2012/main" xmlns=""/>
     </p:ext>
   </p:extLst>
 </p:presentation>
@@ -210,7 +211,7 @@
           <a:p>
             <a:fld id="{4D6A40B9-902A-4E0E-AF39-1C357549AEE0}" type="datetimeFigureOut">
               <a:rPr lang="en-US" smtClean="0"/>
-              <a:t>7/7/21</a:t>
+              <a:t>7/16/21</a:t>
             </a:fld>
             <a:endParaRPr lang="en-US"/>
           </a:p>
@@ -542,7 +543,7 @@
           <a:p>
             <a:fld id="{88156F16-9966-4EDC-933D-6170A05B6017}" type="slidenum">
               <a:rPr lang="en-US" smtClean="0"/>
-              <a:t>9</a:t>
+              <a:t>10</a:t>
             </a:fld>
             <a:endParaRPr lang="en-US"/>
           </a:p>
@@ -626,7 +627,7 @@
           <a:p>
             <a:fld id="{88156F16-9966-4EDC-933D-6170A05B6017}" type="slidenum">
               <a:rPr lang="en-US" smtClean="0"/>
-              <a:t>14</a:t>
+              <a:t>15</a:t>
             </a:fld>
             <a:endParaRPr lang="en-US"/>
           </a:p>
@@ -1458,7 +1459,7 @@
           <p:cNvPr id="4" name="Text Placeholder 3">
             <a:extLst>
               <a:ext uri="{FF2B5EF4-FFF2-40B4-BE49-F238E27FC236}">
-                <a16:creationId xmlns="" xmlns:a16="http://schemas.microsoft.com/office/drawing/2014/main" id="{8850B379-F419-41FB-9123-96081B074583}"/>
+                <a16:creationId xmlns:a16="http://schemas.microsoft.com/office/drawing/2014/main" xmlns="" id="{8850B379-F419-41FB-9123-96081B074583}"/>
               </a:ext>
             </a:extLst>
           </p:cNvPr>
@@ -1749,7 +1750,7 @@
           <p:cNvPr id="5" name="Picture 4">
             <a:extLst>
               <a:ext uri="{FF2B5EF4-FFF2-40B4-BE49-F238E27FC236}">
-                <a16:creationId xmlns="" xmlns:a16="http://schemas.microsoft.com/office/drawing/2014/main" id="{A5059957-9534-4FB9-8820-2343C3BF0E8F}"/>
+                <a16:creationId xmlns:a16="http://schemas.microsoft.com/office/drawing/2014/main" xmlns="" id="{A5059957-9534-4FB9-8820-2343C3BF0E8F}"/>
               </a:ext>
             </a:extLst>
           </p:cNvPr>
@@ -1779,7 +1780,7 @@
           <p:cNvPr id="4" name="Text Placeholder 3">
             <a:extLst>
               <a:ext uri="{FF2B5EF4-FFF2-40B4-BE49-F238E27FC236}">
-                <a16:creationId xmlns="" xmlns:a16="http://schemas.microsoft.com/office/drawing/2014/main" id="{8850B379-F419-41FB-9123-96081B074583}"/>
+                <a16:creationId xmlns:a16="http://schemas.microsoft.com/office/drawing/2014/main" xmlns="" id="{8850B379-F419-41FB-9123-96081B074583}"/>
               </a:ext>
             </a:extLst>
           </p:cNvPr>
@@ -2136,7 +2137,7 @@
           <p:cNvPr id="7" name="Google Shape;20;p4">
             <a:extLst>
               <a:ext uri="{FF2B5EF4-FFF2-40B4-BE49-F238E27FC236}">
-                <a16:creationId xmlns="" xmlns:a16="http://schemas.microsoft.com/office/drawing/2014/main" id="{537643E4-B983-42CC-9421-9C4C107A5DA4}"/>
+                <a16:creationId xmlns:a16="http://schemas.microsoft.com/office/drawing/2014/main" xmlns="" id="{537643E4-B983-42CC-9421-9C4C107A5DA4}"/>
               </a:ext>
             </a:extLst>
           </p:cNvPr>
@@ -3565,7 +3566,7 @@
           <p:cNvPr id="5" name="Picture 4" descr="A screenshot of a cell phone&#10;&#10;Description automatically generated">
             <a:extLst>
               <a:ext uri="{FF2B5EF4-FFF2-40B4-BE49-F238E27FC236}">
-                <a16:creationId xmlns:a16="http://schemas.microsoft.com/office/drawing/2014/main" xmlns="" id="{8C303482-C4AE-E049-A13A-50CE832D1F2A}"/>
+                <a16:creationId xmlns="" xmlns:a16="http://schemas.microsoft.com/office/drawing/2014/main" id="{8C303482-C4AE-E049-A13A-50CE832D1F2A}"/>
               </a:ext>
             </a:extLst>
           </p:cNvPr>
@@ -3662,6 +3663,1433 @@
 </file>
 
 <file path=ppt/slides/slide10.xml><?xml version="1.0" encoding="utf-8"?>
+<p:sld xmlns:a="http://schemas.openxmlformats.org/drawingml/2006/main" xmlns:r="http://schemas.openxmlformats.org/officeDocument/2006/relationships" xmlns:p="http://schemas.openxmlformats.org/presentationml/2006/main">
+  <p:cSld>
+    <p:spTree>
+      <p:nvGrpSpPr>
+        <p:cNvPr id="1" name=""/>
+        <p:cNvGrpSpPr/>
+        <p:nvPr/>
+      </p:nvGrpSpPr>
+      <p:grpSpPr>
+        <a:xfrm>
+          <a:off x="0" y="0"/>
+          <a:ext cx="0" cy="0"/>
+          <a:chOff x="0" y="0"/>
+          <a:chExt cx="0" cy="0"/>
+        </a:xfrm>
+      </p:grpSpPr>
+      <p:sp>
+        <p:nvSpPr>
+          <p:cNvPr id="27" name="Rounded Rectangle 26"/>
+          <p:cNvSpPr/>
+          <p:nvPr/>
+        </p:nvSpPr>
+        <p:spPr>
+          <a:xfrm>
+            <a:off x="853570" y="853671"/>
+            <a:ext cx="7234527" cy="4851352"/>
+          </a:xfrm>
+          <a:prstGeom prst="roundRect">
+            <a:avLst>
+              <a:gd name="adj" fmla="val 4437"/>
+            </a:avLst>
+          </a:prstGeom>
+          <a:solidFill>
+            <a:srgbClr val="EDEDED"/>
+          </a:solidFill>
+          <a:ln>
+            <a:solidFill>
+              <a:srgbClr val="000000"/>
+            </a:solidFill>
+          </a:ln>
+          <a:effectLst/>
+        </p:spPr>
+        <p:style>
+          <a:lnRef idx="1">
+            <a:schemeClr val="accent1"/>
+          </a:lnRef>
+          <a:fillRef idx="3">
+            <a:schemeClr val="accent1"/>
+          </a:fillRef>
+          <a:effectRef idx="2">
+            <a:schemeClr val="accent1"/>
+          </a:effectRef>
+          <a:fontRef idx="minor">
+            <a:schemeClr val="lt1"/>
+          </a:fontRef>
+        </p:style>
+        <p:txBody>
+          <a:bodyPr rtlCol="0" anchor="ctr"/>
+          <a:lstStyle/>
+          <a:p>
+            <a:pPr algn="ctr"/>
+            <a:endParaRPr lang="en-US"/>
+          </a:p>
+        </p:txBody>
+      </p:sp>
+      <p:sp>
+        <p:nvSpPr>
+          <p:cNvPr id="26" name="Rectangle 25"/>
+          <p:cNvSpPr/>
+          <p:nvPr/>
+        </p:nvSpPr>
+        <p:spPr>
+          <a:xfrm>
+            <a:off x="863980" y="855015"/>
+            <a:ext cx="7213708" cy="923330"/>
+          </a:xfrm>
+          <a:prstGeom prst="rect">
+            <a:avLst/>
+          </a:prstGeom>
+        </p:spPr>
+        <p:txBody>
+          <a:bodyPr wrap="square">
+            <a:spAutoFit/>
+          </a:bodyPr>
+          <a:lstStyle/>
+          <a:p>
+            <a:pPr algn="ctr"/>
+            <a:r>
+              <a:rPr lang="en-US" sz="5400" b="1" dirty="0" smtClean="0">
+                <a:solidFill>
+                  <a:srgbClr val="052B48"/>
+                </a:solidFill>
+                <a:latin typeface="Calibri"/>
+                <a:cs typeface="Calibri"/>
+              </a:rPr>
+              <a:t>Parallel I/O using MPI</a:t>
+            </a:r>
+            <a:endParaRPr lang="en-US" sz="5400" b="1" dirty="0">
+              <a:solidFill>
+                <a:srgbClr val="052B48"/>
+              </a:solidFill>
+              <a:latin typeface="Calibri"/>
+              <a:cs typeface="Calibri"/>
+            </a:endParaRPr>
+          </a:p>
+        </p:txBody>
+      </p:sp>
+      <p:sp>
+        <p:nvSpPr>
+          <p:cNvPr id="8" name="Folded Corner 7"/>
+          <p:cNvSpPr/>
+          <p:nvPr/>
+        </p:nvSpPr>
+        <p:spPr>
+          <a:xfrm rot="10800000" flipH="1">
+            <a:off x="3767562" y="2807415"/>
+            <a:ext cx="1419941" cy="1900138"/>
+          </a:xfrm>
+          <a:prstGeom prst="foldedCorner">
+            <a:avLst>
+              <a:gd name="adj" fmla="val 26556"/>
+            </a:avLst>
+          </a:prstGeom>
+          <a:solidFill>
+            <a:srgbClr val="052A48"/>
+          </a:solidFill>
+          <a:ln w="28575" cmpd="sng">
+            <a:solidFill>
+              <a:schemeClr val="bg1"/>
+            </a:solidFill>
+          </a:ln>
+          <a:effectLst/>
+        </p:spPr>
+        <p:style>
+          <a:lnRef idx="1">
+            <a:schemeClr val="accent1"/>
+          </a:lnRef>
+          <a:fillRef idx="3">
+            <a:schemeClr val="accent1"/>
+          </a:fillRef>
+          <a:effectRef idx="2">
+            <a:schemeClr val="accent1"/>
+          </a:effectRef>
+          <a:fontRef idx="minor">
+            <a:schemeClr val="lt1"/>
+          </a:fontRef>
+        </p:style>
+        <p:txBody>
+          <a:bodyPr rtlCol="0" anchor="ctr"/>
+          <a:lstStyle/>
+          <a:p>
+            <a:pPr algn="ctr"/>
+            <a:r>
+              <a:rPr lang="en-US" u="sng" dirty="0" smtClean="0"/>
+              <a:t>																			   </a:t>
+            </a:r>
+            <a:endParaRPr lang="en-US" u="sng" dirty="0"/>
+          </a:p>
+        </p:txBody>
+      </p:sp>
+      <p:grpSp>
+        <p:nvGrpSpPr>
+          <p:cNvPr id="11" name="Group 10"/>
+          <p:cNvGrpSpPr>
+            <a:grpSpLocks noChangeAspect="1"/>
+          </p:cNvGrpSpPr>
+          <p:nvPr/>
+        </p:nvGrpSpPr>
+        <p:grpSpPr>
+          <a:xfrm>
+            <a:off x="3474304" y="2736471"/>
+            <a:ext cx="947929" cy="947929"/>
+            <a:chOff x="2259923" y="2660201"/>
+            <a:chExt cx="1959561" cy="1962561"/>
+          </a:xfrm>
+        </p:grpSpPr>
+        <p:sp>
+          <p:nvSpPr>
+            <p:cNvPr id="18" name="Oval 17"/>
+            <p:cNvSpPr/>
+            <p:nvPr/>
+          </p:nvSpPr>
+          <p:spPr>
+            <a:xfrm>
+              <a:off x="2259923" y="2660201"/>
+              <a:ext cx="1959561" cy="1962561"/>
+            </a:xfrm>
+            <a:prstGeom prst="ellipse">
+              <a:avLst/>
+            </a:prstGeom>
+            <a:solidFill>
+              <a:schemeClr val="bg1"/>
+            </a:solidFill>
+            <a:ln w="76200" cmpd="sng">
+              <a:solidFill>
+                <a:srgbClr val="052A48"/>
+              </a:solidFill>
+            </a:ln>
+            <a:effectLst/>
+          </p:spPr>
+          <p:style>
+            <a:lnRef idx="1">
+              <a:schemeClr val="accent1"/>
+            </a:lnRef>
+            <a:fillRef idx="3">
+              <a:schemeClr val="accent1"/>
+            </a:fillRef>
+            <a:effectRef idx="2">
+              <a:schemeClr val="accent1"/>
+            </a:effectRef>
+            <a:fontRef idx="minor">
+              <a:schemeClr val="lt1"/>
+            </a:fontRef>
+          </p:style>
+          <p:txBody>
+            <a:bodyPr rtlCol="0" anchor="ctr"/>
+            <a:lstStyle/>
+            <a:p>
+              <a:endParaRPr lang="en-US" sz="4400" dirty="0"/>
+            </a:p>
+          </p:txBody>
+        </p:sp>
+        <p:pic>
+          <p:nvPicPr>
+            <p:cNvPr id="19" name="Picture 18" descr="logo_brain_transp_512x512.png"/>
+            <p:cNvPicPr>
+              <a:picLocks noChangeAspect="1"/>
+            </p:cNvPicPr>
+            <p:nvPr/>
+          </p:nvPicPr>
+          <p:blipFill>
+            <a:blip r:embed="rId3">
+              <a:extLst>
+                <a:ext uri="{28A0092B-C50C-407E-A947-70E740481C1C}">
+                  <a14:useLocalDpi xmlns:a14="http://schemas.microsoft.com/office/drawing/2010/main" val="0"/>
+                </a:ext>
+              </a:extLst>
+            </a:blip>
+            <a:stretch>
+              <a:fillRect/>
+            </a:stretch>
+          </p:blipFill>
+          <p:spPr>
+            <a:xfrm>
+              <a:off x="2393887" y="2838486"/>
+              <a:ext cx="1703898" cy="1703898"/>
+            </a:xfrm>
+            <a:prstGeom prst="rect">
+              <a:avLst/>
+            </a:prstGeom>
+          </p:spPr>
+        </p:pic>
+      </p:grpSp>
+      <p:sp>
+        <p:nvSpPr>
+          <p:cNvPr id="21" name="Cube 20"/>
+          <p:cNvSpPr/>
+          <p:nvPr/>
+        </p:nvSpPr>
+        <p:spPr>
+          <a:xfrm>
+            <a:off x="3814099" y="5133421"/>
+            <a:ext cx="1305723" cy="417754"/>
+          </a:xfrm>
+          <a:prstGeom prst="cube">
+            <a:avLst>
+              <a:gd name="adj" fmla="val 11969"/>
+            </a:avLst>
+          </a:prstGeom>
+          <a:solidFill>
+            <a:srgbClr val="052A48"/>
+          </a:solidFill>
+          <a:ln w="9525" cap="flat" cmpd="sng" algn="ctr">
+            <a:solidFill>
+              <a:srgbClr val="FFFFFF"/>
+            </a:solidFill>
+            <a:prstDash val="solid"/>
+          </a:ln>
+          <a:effectLst/>
+        </p:spPr>
+        <p:txBody>
+          <a:bodyPr tIns="0" bIns="45720" rtlCol="0" anchor="ctr" anchorCtr="0"/>
+          <a:lstStyle/>
+          <a:p>
+            <a:pPr marL="0" marR="0" lvl="0" indent="0" algn="ctr" defTabSz="914400" eaLnBrk="1" fontAlgn="auto" latinLnBrk="0" hangingPunct="1">
+              <a:lnSpc>
+                <a:spcPct val="100000"/>
+              </a:lnSpc>
+              <a:spcBef>
+                <a:spcPts val="0"/>
+              </a:spcBef>
+              <a:spcAft>
+                <a:spcPts val="0"/>
+              </a:spcAft>
+              <a:buClrTx/>
+              <a:buSzTx/>
+              <a:buFontTx/>
+              <a:buNone/>
+              <a:tabLst/>
+              <a:defRPr/>
+            </a:pPr>
+            <a:r>
+              <a:rPr kumimoji="0" lang="en-US" sz="1800" i="0" u="none" strike="noStrike" kern="0" cap="none" spc="0" normalizeH="0" baseline="0" noProof="0" dirty="0" err="1" smtClean="0">
+                <a:ln>
+                  <a:noFill/>
+                </a:ln>
+                <a:solidFill>
+                  <a:schemeClr val="bg1">
+                    <a:lumMod val="85000"/>
+                  </a:schemeClr>
+                </a:solidFill>
+                <a:effectLst/>
+                <a:uLnTx/>
+                <a:uFillTx/>
+                <a:latin typeface="Calibri"/>
+                <a:ea typeface="+mn-ea"/>
+                <a:cs typeface="+mn-cs"/>
+              </a:rPr>
+              <a:t>PyNWB</a:t>
+            </a:r>
+            <a:endParaRPr kumimoji="0" lang="en-US" sz="1800" i="0" u="none" strike="noStrike" kern="0" cap="none" spc="0" normalizeH="0" baseline="0" noProof="0" dirty="0">
+              <a:ln>
+                <a:noFill/>
+              </a:ln>
+              <a:solidFill>
+                <a:schemeClr val="bg1">
+                  <a:lumMod val="85000"/>
+                </a:schemeClr>
+              </a:solidFill>
+              <a:effectLst/>
+              <a:uLnTx/>
+              <a:uFillTx/>
+              <a:latin typeface="Calibri"/>
+              <a:ea typeface="+mn-ea"/>
+              <a:cs typeface="+mn-cs"/>
+            </a:endParaRPr>
+          </a:p>
+        </p:txBody>
+      </p:sp>
+      <p:sp>
+        <p:nvSpPr>
+          <p:cNvPr id="25" name="Cube 24"/>
+          <p:cNvSpPr/>
+          <p:nvPr/>
+        </p:nvSpPr>
+        <p:spPr>
+          <a:xfrm>
+            <a:off x="3820720" y="1947059"/>
+            <a:ext cx="1305723" cy="417754"/>
+          </a:xfrm>
+          <a:prstGeom prst="cube">
+            <a:avLst>
+              <a:gd name="adj" fmla="val 11969"/>
+            </a:avLst>
+          </a:prstGeom>
+          <a:solidFill>
+            <a:srgbClr val="052A48"/>
+          </a:solidFill>
+          <a:ln w="9525" cap="flat" cmpd="sng" algn="ctr">
+            <a:solidFill>
+              <a:srgbClr val="FFFFFF"/>
+            </a:solidFill>
+            <a:prstDash val="solid"/>
+          </a:ln>
+          <a:effectLst/>
+        </p:spPr>
+        <p:txBody>
+          <a:bodyPr tIns="0" bIns="45720" rtlCol="0" anchor="ctr" anchorCtr="0"/>
+          <a:lstStyle/>
+          <a:p>
+            <a:pPr marL="0" marR="0" lvl="0" indent="0" algn="ctr" defTabSz="914400" eaLnBrk="1" fontAlgn="auto" latinLnBrk="0" hangingPunct="1">
+              <a:lnSpc>
+                <a:spcPct val="100000"/>
+              </a:lnSpc>
+              <a:spcBef>
+                <a:spcPts val="0"/>
+              </a:spcBef>
+              <a:spcAft>
+                <a:spcPts val="0"/>
+              </a:spcAft>
+              <a:buClrTx/>
+              <a:buSzTx/>
+              <a:buFontTx/>
+              <a:buNone/>
+              <a:tabLst/>
+              <a:defRPr/>
+            </a:pPr>
+            <a:r>
+              <a:rPr kumimoji="0" lang="en-US" sz="1800" i="0" u="none" strike="noStrike" kern="0" cap="none" spc="0" normalizeH="0" baseline="0" noProof="0" dirty="0" err="1" smtClean="0">
+                <a:ln>
+                  <a:noFill/>
+                </a:ln>
+                <a:solidFill>
+                  <a:schemeClr val="bg1">
+                    <a:lumMod val="85000"/>
+                  </a:schemeClr>
+                </a:solidFill>
+                <a:effectLst/>
+                <a:uLnTx/>
+                <a:uFillTx/>
+                <a:latin typeface="Calibri"/>
+                <a:ea typeface="+mn-ea"/>
+                <a:cs typeface="+mn-cs"/>
+              </a:rPr>
+              <a:t>PyNWB</a:t>
+            </a:r>
+            <a:endParaRPr kumimoji="0" lang="en-US" sz="1800" i="0" u="none" strike="noStrike" kern="0" cap="none" spc="0" normalizeH="0" baseline="0" noProof="0" dirty="0">
+              <a:ln>
+                <a:noFill/>
+              </a:ln>
+              <a:solidFill>
+                <a:schemeClr val="bg1">
+                  <a:lumMod val="85000"/>
+                </a:schemeClr>
+              </a:solidFill>
+              <a:effectLst/>
+              <a:uLnTx/>
+              <a:uFillTx/>
+              <a:latin typeface="Calibri"/>
+              <a:ea typeface="+mn-ea"/>
+              <a:cs typeface="+mn-cs"/>
+            </a:endParaRPr>
+          </a:p>
+        </p:txBody>
+      </p:sp>
+      <p:sp>
+        <p:nvSpPr>
+          <p:cNvPr id="28" name="Cube 27"/>
+          <p:cNvSpPr/>
+          <p:nvPr/>
+        </p:nvSpPr>
+        <p:spPr>
+          <a:xfrm>
+            <a:off x="1161722" y="3519384"/>
+            <a:ext cx="1305723" cy="417754"/>
+          </a:xfrm>
+          <a:prstGeom prst="cube">
+            <a:avLst>
+              <a:gd name="adj" fmla="val 11969"/>
+            </a:avLst>
+          </a:prstGeom>
+          <a:solidFill>
+            <a:srgbClr val="052A48"/>
+          </a:solidFill>
+          <a:ln w="9525" cap="flat" cmpd="sng" algn="ctr">
+            <a:solidFill>
+              <a:srgbClr val="FFFFFF"/>
+            </a:solidFill>
+            <a:prstDash val="solid"/>
+          </a:ln>
+          <a:effectLst/>
+        </p:spPr>
+        <p:txBody>
+          <a:bodyPr tIns="0" bIns="45720" rtlCol="0" anchor="ctr" anchorCtr="0"/>
+          <a:lstStyle/>
+          <a:p>
+            <a:pPr marL="0" marR="0" lvl="0" indent="0" algn="ctr" defTabSz="914400" eaLnBrk="1" fontAlgn="auto" latinLnBrk="0" hangingPunct="1">
+              <a:lnSpc>
+                <a:spcPct val="100000"/>
+              </a:lnSpc>
+              <a:spcBef>
+                <a:spcPts val="0"/>
+              </a:spcBef>
+              <a:spcAft>
+                <a:spcPts val="0"/>
+              </a:spcAft>
+              <a:buClrTx/>
+              <a:buSzTx/>
+              <a:buFontTx/>
+              <a:buNone/>
+              <a:tabLst/>
+              <a:defRPr/>
+            </a:pPr>
+            <a:r>
+              <a:rPr kumimoji="0" lang="en-US" sz="1800" i="0" u="none" strike="noStrike" kern="0" cap="none" spc="0" normalizeH="0" baseline="0" noProof="0" dirty="0" err="1" smtClean="0">
+                <a:ln>
+                  <a:noFill/>
+                </a:ln>
+                <a:solidFill>
+                  <a:schemeClr val="bg1">
+                    <a:lumMod val="85000"/>
+                  </a:schemeClr>
+                </a:solidFill>
+                <a:effectLst/>
+                <a:uLnTx/>
+                <a:uFillTx/>
+                <a:latin typeface="Calibri"/>
+                <a:ea typeface="+mn-ea"/>
+                <a:cs typeface="+mn-cs"/>
+              </a:rPr>
+              <a:t>PyNWB</a:t>
+            </a:r>
+            <a:endParaRPr kumimoji="0" lang="en-US" sz="1800" i="0" u="none" strike="noStrike" kern="0" cap="none" spc="0" normalizeH="0" baseline="0" noProof="0" dirty="0">
+              <a:ln>
+                <a:noFill/>
+              </a:ln>
+              <a:solidFill>
+                <a:schemeClr val="bg1">
+                  <a:lumMod val="85000"/>
+                </a:schemeClr>
+              </a:solidFill>
+              <a:effectLst/>
+              <a:uLnTx/>
+              <a:uFillTx/>
+              <a:latin typeface="Calibri"/>
+              <a:ea typeface="+mn-ea"/>
+              <a:cs typeface="+mn-cs"/>
+            </a:endParaRPr>
+          </a:p>
+        </p:txBody>
+      </p:sp>
+      <p:sp>
+        <p:nvSpPr>
+          <p:cNvPr id="30" name="Cube 29"/>
+          <p:cNvSpPr/>
+          <p:nvPr/>
+        </p:nvSpPr>
+        <p:spPr>
+          <a:xfrm>
+            <a:off x="6559614" y="3519900"/>
+            <a:ext cx="1305723" cy="417754"/>
+          </a:xfrm>
+          <a:prstGeom prst="cube">
+            <a:avLst>
+              <a:gd name="adj" fmla="val 11969"/>
+            </a:avLst>
+          </a:prstGeom>
+          <a:solidFill>
+            <a:srgbClr val="052A48"/>
+          </a:solidFill>
+          <a:ln w="9525" cap="flat" cmpd="sng" algn="ctr">
+            <a:solidFill>
+              <a:srgbClr val="FFFFFF"/>
+            </a:solidFill>
+            <a:prstDash val="solid"/>
+          </a:ln>
+          <a:effectLst/>
+        </p:spPr>
+        <p:txBody>
+          <a:bodyPr tIns="0" bIns="45720" rtlCol="0" anchor="ctr" anchorCtr="0"/>
+          <a:lstStyle/>
+          <a:p>
+            <a:pPr marL="0" marR="0" lvl="0" indent="0" algn="ctr" defTabSz="914400" eaLnBrk="1" fontAlgn="auto" latinLnBrk="0" hangingPunct="1">
+              <a:lnSpc>
+                <a:spcPct val="100000"/>
+              </a:lnSpc>
+              <a:spcBef>
+                <a:spcPts val="0"/>
+              </a:spcBef>
+              <a:spcAft>
+                <a:spcPts val="0"/>
+              </a:spcAft>
+              <a:buClrTx/>
+              <a:buSzTx/>
+              <a:buFontTx/>
+              <a:buNone/>
+              <a:tabLst/>
+              <a:defRPr/>
+            </a:pPr>
+            <a:r>
+              <a:rPr kumimoji="0" lang="en-US" sz="1800" i="0" u="none" strike="noStrike" kern="0" cap="none" spc="0" normalizeH="0" baseline="0" noProof="0" dirty="0" err="1" smtClean="0">
+                <a:ln>
+                  <a:noFill/>
+                </a:ln>
+                <a:solidFill>
+                  <a:schemeClr val="bg1">
+                    <a:lumMod val="85000"/>
+                  </a:schemeClr>
+                </a:solidFill>
+                <a:effectLst/>
+                <a:uLnTx/>
+                <a:uFillTx/>
+                <a:latin typeface="Calibri"/>
+                <a:ea typeface="+mn-ea"/>
+                <a:cs typeface="+mn-cs"/>
+              </a:rPr>
+              <a:t>PyNWB</a:t>
+            </a:r>
+            <a:endParaRPr kumimoji="0" lang="en-US" sz="1800" i="0" u="none" strike="noStrike" kern="0" cap="none" spc="0" normalizeH="0" baseline="0" noProof="0" dirty="0">
+              <a:ln>
+                <a:noFill/>
+              </a:ln>
+              <a:solidFill>
+                <a:schemeClr val="bg1">
+                  <a:lumMod val="85000"/>
+                </a:schemeClr>
+              </a:solidFill>
+              <a:effectLst/>
+              <a:uLnTx/>
+              <a:uFillTx/>
+              <a:latin typeface="Calibri"/>
+              <a:ea typeface="+mn-ea"/>
+              <a:cs typeface="+mn-cs"/>
+            </a:endParaRPr>
+          </a:p>
+        </p:txBody>
+      </p:sp>
+      <p:sp>
+        <p:nvSpPr>
+          <p:cNvPr id="34" name="Left Arrow 33"/>
+          <p:cNvSpPr/>
+          <p:nvPr/>
+        </p:nvSpPr>
+        <p:spPr>
+          <a:xfrm rot="5400000" flipV="1">
+            <a:off x="4269649" y="4783832"/>
+            <a:ext cx="416341" cy="268194"/>
+          </a:xfrm>
+          <a:prstGeom prst="leftArrow">
+            <a:avLst>
+              <a:gd name="adj1" fmla="val 46274"/>
+              <a:gd name="adj2" fmla="val 50000"/>
+            </a:avLst>
+          </a:prstGeom>
+          <a:solidFill>
+            <a:srgbClr val="052A48"/>
+          </a:solidFill>
+          <a:ln w="9525" cmpd="sng">
+            <a:solidFill>
+              <a:srgbClr val="FFFFFF"/>
+            </a:solidFill>
+          </a:ln>
+        </p:spPr>
+        <p:style>
+          <a:lnRef idx="0">
+            <a:schemeClr val="accent1">
+              <a:tint val="60000"/>
+              <a:hueOff val="0"/>
+              <a:satOff val="0"/>
+              <a:lumOff val="0"/>
+              <a:alphaOff val="0"/>
+            </a:schemeClr>
+          </a:lnRef>
+          <a:fillRef idx="1">
+            <a:schemeClr val="accent1">
+              <a:tint val="60000"/>
+              <a:hueOff val="0"/>
+              <a:satOff val="0"/>
+              <a:lumOff val="0"/>
+              <a:alphaOff val="0"/>
+            </a:schemeClr>
+          </a:fillRef>
+          <a:effectRef idx="0">
+            <a:schemeClr val="accent1">
+              <a:tint val="60000"/>
+              <a:hueOff val="0"/>
+              <a:satOff val="0"/>
+              <a:lumOff val="0"/>
+              <a:alphaOff val="0"/>
+            </a:schemeClr>
+          </a:effectRef>
+          <a:fontRef idx="minor">
+            <a:schemeClr val="lt1"/>
+          </a:fontRef>
+        </p:style>
+      </p:sp>
+      <p:sp>
+        <p:nvSpPr>
+          <p:cNvPr id="35" name="Left Arrow 34"/>
+          <p:cNvSpPr/>
+          <p:nvPr/>
+        </p:nvSpPr>
+        <p:spPr>
+          <a:xfrm rot="16200000" flipV="1">
+            <a:off x="4270167" y="2451408"/>
+            <a:ext cx="416341" cy="268194"/>
+          </a:xfrm>
+          <a:prstGeom prst="leftArrow">
+            <a:avLst>
+              <a:gd name="adj1" fmla="val 46274"/>
+              <a:gd name="adj2" fmla="val 50000"/>
+            </a:avLst>
+          </a:prstGeom>
+          <a:solidFill>
+            <a:srgbClr val="052A48"/>
+          </a:solidFill>
+          <a:ln w="9525" cmpd="sng">
+            <a:solidFill>
+              <a:srgbClr val="FFFFFF"/>
+            </a:solidFill>
+          </a:ln>
+        </p:spPr>
+        <p:style>
+          <a:lnRef idx="0">
+            <a:schemeClr val="accent1">
+              <a:tint val="60000"/>
+              <a:hueOff val="0"/>
+              <a:satOff val="0"/>
+              <a:lumOff val="0"/>
+              <a:alphaOff val="0"/>
+            </a:schemeClr>
+          </a:lnRef>
+          <a:fillRef idx="1">
+            <a:schemeClr val="accent1">
+              <a:tint val="60000"/>
+              <a:hueOff val="0"/>
+              <a:satOff val="0"/>
+              <a:lumOff val="0"/>
+              <a:alphaOff val="0"/>
+            </a:schemeClr>
+          </a:fillRef>
+          <a:effectRef idx="0">
+            <a:schemeClr val="accent1">
+              <a:tint val="60000"/>
+              <a:hueOff val="0"/>
+              <a:satOff val="0"/>
+              <a:lumOff val="0"/>
+              <a:alphaOff val="0"/>
+            </a:schemeClr>
+          </a:effectRef>
+          <a:fontRef idx="minor">
+            <a:schemeClr val="lt1"/>
+          </a:fontRef>
+        </p:style>
+      </p:sp>
+      <p:sp>
+        <p:nvSpPr>
+          <p:cNvPr id="36" name="Left Arrow 35"/>
+          <p:cNvSpPr/>
+          <p:nvPr/>
+        </p:nvSpPr>
+        <p:spPr>
+          <a:xfrm rot="10800000" flipV="1">
+            <a:off x="2466969" y="3606941"/>
+            <a:ext cx="1186546" cy="268194"/>
+          </a:xfrm>
+          <a:prstGeom prst="leftArrow">
+            <a:avLst>
+              <a:gd name="adj1" fmla="val 46274"/>
+              <a:gd name="adj2" fmla="val 50000"/>
+            </a:avLst>
+          </a:prstGeom>
+          <a:solidFill>
+            <a:srgbClr val="052A48"/>
+          </a:solidFill>
+          <a:ln w="9525" cmpd="sng">
+            <a:solidFill>
+              <a:srgbClr val="FFFFFF"/>
+            </a:solidFill>
+          </a:ln>
+        </p:spPr>
+        <p:style>
+          <a:lnRef idx="0">
+            <a:schemeClr val="accent1">
+              <a:tint val="60000"/>
+              <a:hueOff val="0"/>
+              <a:satOff val="0"/>
+              <a:lumOff val="0"/>
+              <a:alphaOff val="0"/>
+            </a:schemeClr>
+          </a:lnRef>
+          <a:fillRef idx="1">
+            <a:schemeClr val="accent1">
+              <a:tint val="60000"/>
+              <a:hueOff val="0"/>
+              <a:satOff val="0"/>
+              <a:lumOff val="0"/>
+              <a:alphaOff val="0"/>
+            </a:schemeClr>
+          </a:fillRef>
+          <a:effectRef idx="0">
+            <a:schemeClr val="accent1">
+              <a:tint val="60000"/>
+              <a:hueOff val="0"/>
+              <a:satOff val="0"/>
+              <a:lumOff val="0"/>
+              <a:alphaOff val="0"/>
+            </a:schemeClr>
+          </a:effectRef>
+          <a:fontRef idx="minor">
+            <a:schemeClr val="lt1"/>
+          </a:fontRef>
+        </p:style>
+      </p:sp>
+      <p:sp>
+        <p:nvSpPr>
+          <p:cNvPr id="37" name="Left Arrow 36"/>
+          <p:cNvSpPr/>
+          <p:nvPr/>
+        </p:nvSpPr>
+        <p:spPr>
+          <a:xfrm rot="10800000" flipH="1" flipV="1">
+            <a:off x="5259407" y="3607490"/>
+            <a:ext cx="1288946" cy="268194"/>
+          </a:xfrm>
+          <a:prstGeom prst="leftArrow">
+            <a:avLst>
+              <a:gd name="adj1" fmla="val 46274"/>
+              <a:gd name="adj2" fmla="val 50000"/>
+            </a:avLst>
+          </a:prstGeom>
+          <a:solidFill>
+            <a:srgbClr val="052A48"/>
+          </a:solidFill>
+          <a:ln w="9525" cmpd="sng">
+            <a:solidFill>
+              <a:srgbClr val="FFFFFF"/>
+            </a:solidFill>
+          </a:ln>
+        </p:spPr>
+        <p:style>
+          <a:lnRef idx="0">
+            <a:schemeClr val="accent1">
+              <a:tint val="60000"/>
+              <a:hueOff val="0"/>
+              <a:satOff val="0"/>
+              <a:lumOff val="0"/>
+              <a:alphaOff val="0"/>
+            </a:schemeClr>
+          </a:lnRef>
+          <a:fillRef idx="1">
+            <a:schemeClr val="accent1">
+              <a:tint val="60000"/>
+              <a:hueOff val="0"/>
+              <a:satOff val="0"/>
+              <a:lumOff val="0"/>
+              <a:alphaOff val="0"/>
+            </a:schemeClr>
+          </a:fillRef>
+          <a:effectRef idx="0">
+            <a:schemeClr val="accent1">
+              <a:tint val="60000"/>
+              <a:hueOff val="0"/>
+              <a:satOff val="0"/>
+              <a:lumOff val="0"/>
+              <a:alphaOff val="0"/>
+            </a:schemeClr>
+          </a:effectRef>
+          <a:fontRef idx="minor">
+            <a:schemeClr val="lt1"/>
+          </a:fontRef>
+        </p:style>
+      </p:sp>
+      <p:sp>
+        <p:nvSpPr>
+          <p:cNvPr id="38" name="Left Arrow 37"/>
+          <p:cNvSpPr/>
+          <p:nvPr/>
+        </p:nvSpPr>
+        <p:spPr>
+          <a:xfrm rot="8743586" flipV="1">
+            <a:off x="2696659" y="4338309"/>
+            <a:ext cx="1101907" cy="268194"/>
+          </a:xfrm>
+          <a:prstGeom prst="leftArrow">
+            <a:avLst>
+              <a:gd name="adj1" fmla="val 46274"/>
+              <a:gd name="adj2" fmla="val 50000"/>
+            </a:avLst>
+          </a:prstGeom>
+          <a:solidFill>
+            <a:srgbClr val="052A48"/>
+          </a:solidFill>
+          <a:ln w="9525" cmpd="sng">
+            <a:solidFill>
+              <a:srgbClr val="FFFFFF"/>
+            </a:solidFill>
+          </a:ln>
+        </p:spPr>
+        <p:style>
+          <a:lnRef idx="0">
+            <a:schemeClr val="accent1">
+              <a:tint val="60000"/>
+              <a:hueOff val="0"/>
+              <a:satOff val="0"/>
+              <a:lumOff val="0"/>
+              <a:alphaOff val="0"/>
+            </a:schemeClr>
+          </a:lnRef>
+          <a:fillRef idx="1">
+            <a:schemeClr val="accent1">
+              <a:tint val="60000"/>
+              <a:hueOff val="0"/>
+              <a:satOff val="0"/>
+              <a:lumOff val="0"/>
+              <a:alphaOff val="0"/>
+            </a:schemeClr>
+          </a:fillRef>
+          <a:effectRef idx="0">
+            <a:schemeClr val="accent1">
+              <a:tint val="60000"/>
+              <a:hueOff val="0"/>
+              <a:satOff val="0"/>
+              <a:lumOff val="0"/>
+              <a:alphaOff val="0"/>
+            </a:schemeClr>
+          </a:effectRef>
+          <a:fontRef idx="minor">
+            <a:schemeClr val="lt1"/>
+          </a:fontRef>
+        </p:style>
+      </p:sp>
+      <p:sp>
+        <p:nvSpPr>
+          <p:cNvPr id="17" name="Cube 16"/>
+          <p:cNvSpPr/>
+          <p:nvPr/>
+        </p:nvSpPr>
+        <p:spPr>
+          <a:xfrm>
+            <a:off x="1928718" y="4729655"/>
+            <a:ext cx="1305723" cy="417754"/>
+          </a:xfrm>
+          <a:prstGeom prst="cube">
+            <a:avLst>
+              <a:gd name="adj" fmla="val 11969"/>
+            </a:avLst>
+          </a:prstGeom>
+          <a:solidFill>
+            <a:srgbClr val="052A48"/>
+          </a:solidFill>
+          <a:ln w="9525" cap="flat" cmpd="sng" algn="ctr">
+            <a:solidFill>
+              <a:srgbClr val="FFFFFF"/>
+            </a:solidFill>
+            <a:prstDash val="solid"/>
+          </a:ln>
+          <a:effectLst/>
+        </p:spPr>
+        <p:txBody>
+          <a:bodyPr tIns="0" bIns="45720" rtlCol="0" anchor="ctr" anchorCtr="0"/>
+          <a:lstStyle/>
+          <a:p>
+            <a:pPr marL="0" marR="0" lvl="0" indent="0" algn="ctr" defTabSz="914400" eaLnBrk="1" fontAlgn="auto" latinLnBrk="0" hangingPunct="1">
+              <a:lnSpc>
+                <a:spcPct val="100000"/>
+              </a:lnSpc>
+              <a:spcBef>
+                <a:spcPts val="0"/>
+              </a:spcBef>
+              <a:spcAft>
+                <a:spcPts val="0"/>
+              </a:spcAft>
+              <a:buClrTx/>
+              <a:buSzTx/>
+              <a:buFontTx/>
+              <a:buNone/>
+              <a:tabLst/>
+              <a:defRPr/>
+            </a:pPr>
+            <a:r>
+              <a:rPr kumimoji="0" lang="en-US" sz="1800" i="0" u="none" strike="noStrike" kern="0" cap="none" spc="0" normalizeH="0" baseline="0" noProof="0" dirty="0" err="1" smtClean="0">
+                <a:ln>
+                  <a:noFill/>
+                </a:ln>
+                <a:solidFill>
+                  <a:schemeClr val="bg1">
+                    <a:lumMod val="85000"/>
+                  </a:schemeClr>
+                </a:solidFill>
+                <a:effectLst/>
+                <a:uLnTx/>
+                <a:uFillTx/>
+                <a:latin typeface="Calibri"/>
+                <a:ea typeface="+mn-ea"/>
+                <a:cs typeface="+mn-cs"/>
+              </a:rPr>
+              <a:t>PyNWB</a:t>
+            </a:r>
+            <a:endParaRPr kumimoji="0" lang="en-US" sz="1800" i="0" u="none" strike="noStrike" kern="0" cap="none" spc="0" normalizeH="0" baseline="0" noProof="0" dirty="0">
+              <a:ln>
+                <a:noFill/>
+              </a:ln>
+              <a:solidFill>
+                <a:schemeClr val="bg1">
+                  <a:lumMod val="85000"/>
+                </a:schemeClr>
+              </a:solidFill>
+              <a:effectLst/>
+              <a:uLnTx/>
+              <a:uFillTx/>
+              <a:latin typeface="Calibri"/>
+              <a:ea typeface="+mn-ea"/>
+              <a:cs typeface="+mn-cs"/>
+            </a:endParaRPr>
+          </a:p>
+        </p:txBody>
+      </p:sp>
+      <p:sp>
+        <p:nvSpPr>
+          <p:cNvPr id="39" name="Left Arrow 38"/>
+          <p:cNvSpPr/>
+          <p:nvPr/>
+        </p:nvSpPr>
+        <p:spPr>
+          <a:xfrm rot="12856414" flipH="1" flipV="1">
+            <a:off x="5163566" y="4334257"/>
+            <a:ext cx="1101907" cy="268194"/>
+          </a:xfrm>
+          <a:prstGeom prst="leftArrow">
+            <a:avLst>
+              <a:gd name="adj1" fmla="val 46274"/>
+              <a:gd name="adj2" fmla="val 50000"/>
+            </a:avLst>
+          </a:prstGeom>
+          <a:solidFill>
+            <a:srgbClr val="052A48"/>
+          </a:solidFill>
+          <a:ln w="9525" cmpd="sng">
+            <a:solidFill>
+              <a:srgbClr val="FFFFFF"/>
+            </a:solidFill>
+          </a:ln>
+        </p:spPr>
+        <p:style>
+          <a:lnRef idx="0">
+            <a:schemeClr val="accent1">
+              <a:tint val="60000"/>
+              <a:hueOff val="0"/>
+              <a:satOff val="0"/>
+              <a:lumOff val="0"/>
+              <a:alphaOff val="0"/>
+            </a:schemeClr>
+          </a:lnRef>
+          <a:fillRef idx="1">
+            <a:schemeClr val="accent1">
+              <a:tint val="60000"/>
+              <a:hueOff val="0"/>
+              <a:satOff val="0"/>
+              <a:lumOff val="0"/>
+              <a:alphaOff val="0"/>
+            </a:schemeClr>
+          </a:fillRef>
+          <a:effectRef idx="0">
+            <a:schemeClr val="accent1">
+              <a:tint val="60000"/>
+              <a:hueOff val="0"/>
+              <a:satOff val="0"/>
+              <a:lumOff val="0"/>
+              <a:alphaOff val="0"/>
+            </a:schemeClr>
+          </a:effectRef>
+          <a:fontRef idx="minor">
+            <a:schemeClr val="lt1"/>
+          </a:fontRef>
+        </p:style>
+      </p:sp>
+      <p:sp>
+        <p:nvSpPr>
+          <p:cNvPr id="31" name="Cube 30"/>
+          <p:cNvSpPr/>
+          <p:nvPr/>
+        </p:nvSpPr>
+        <p:spPr>
+          <a:xfrm>
+            <a:off x="5666114" y="4729913"/>
+            <a:ext cx="1305723" cy="417754"/>
+          </a:xfrm>
+          <a:prstGeom prst="cube">
+            <a:avLst>
+              <a:gd name="adj" fmla="val 11969"/>
+            </a:avLst>
+          </a:prstGeom>
+          <a:solidFill>
+            <a:srgbClr val="052A48"/>
+          </a:solidFill>
+          <a:ln w="9525" cap="flat" cmpd="sng" algn="ctr">
+            <a:solidFill>
+              <a:srgbClr val="FFFFFF"/>
+            </a:solidFill>
+            <a:prstDash val="solid"/>
+          </a:ln>
+          <a:effectLst/>
+        </p:spPr>
+        <p:txBody>
+          <a:bodyPr tIns="0" bIns="45720" rtlCol="0" anchor="ctr" anchorCtr="0"/>
+          <a:lstStyle/>
+          <a:p>
+            <a:pPr marL="0" marR="0" lvl="0" indent="0" algn="ctr" defTabSz="914400" eaLnBrk="1" fontAlgn="auto" latinLnBrk="0" hangingPunct="1">
+              <a:lnSpc>
+                <a:spcPct val="100000"/>
+              </a:lnSpc>
+              <a:spcBef>
+                <a:spcPts val="0"/>
+              </a:spcBef>
+              <a:spcAft>
+                <a:spcPts val="0"/>
+              </a:spcAft>
+              <a:buClrTx/>
+              <a:buSzTx/>
+              <a:buFontTx/>
+              <a:buNone/>
+              <a:tabLst/>
+              <a:defRPr/>
+            </a:pPr>
+            <a:r>
+              <a:rPr kumimoji="0" lang="en-US" sz="1800" i="0" u="none" strike="noStrike" kern="0" cap="none" spc="0" normalizeH="0" baseline="0" noProof="0" dirty="0" err="1" smtClean="0">
+                <a:ln>
+                  <a:noFill/>
+                </a:ln>
+                <a:solidFill>
+                  <a:schemeClr val="bg1">
+                    <a:lumMod val="85000"/>
+                  </a:schemeClr>
+                </a:solidFill>
+                <a:effectLst/>
+                <a:uLnTx/>
+                <a:uFillTx/>
+                <a:latin typeface="Calibri"/>
+                <a:ea typeface="+mn-ea"/>
+                <a:cs typeface="+mn-cs"/>
+              </a:rPr>
+              <a:t>PyNWB</a:t>
+            </a:r>
+            <a:endParaRPr kumimoji="0" lang="en-US" sz="1800" i="0" u="none" strike="noStrike" kern="0" cap="none" spc="0" normalizeH="0" baseline="0" noProof="0" dirty="0">
+              <a:ln>
+                <a:noFill/>
+              </a:ln>
+              <a:solidFill>
+                <a:schemeClr val="bg1">
+                  <a:lumMod val="85000"/>
+                </a:schemeClr>
+              </a:solidFill>
+              <a:effectLst/>
+              <a:uLnTx/>
+              <a:uFillTx/>
+              <a:latin typeface="Calibri"/>
+              <a:ea typeface="+mn-ea"/>
+              <a:cs typeface="+mn-cs"/>
+            </a:endParaRPr>
+          </a:p>
+        </p:txBody>
+      </p:sp>
+      <p:sp>
+        <p:nvSpPr>
+          <p:cNvPr id="40" name="Left Arrow 39"/>
+          <p:cNvSpPr/>
+          <p:nvPr/>
+        </p:nvSpPr>
+        <p:spPr>
+          <a:xfrm rot="8743586" flipH="1">
+            <a:off x="5164119" y="2908337"/>
+            <a:ext cx="1101907" cy="268194"/>
+          </a:xfrm>
+          <a:prstGeom prst="leftArrow">
+            <a:avLst>
+              <a:gd name="adj1" fmla="val 46274"/>
+              <a:gd name="adj2" fmla="val 50000"/>
+            </a:avLst>
+          </a:prstGeom>
+          <a:solidFill>
+            <a:srgbClr val="052A48"/>
+          </a:solidFill>
+          <a:ln w="9525" cmpd="sng">
+            <a:solidFill>
+              <a:srgbClr val="FFFFFF"/>
+            </a:solidFill>
+          </a:ln>
+        </p:spPr>
+        <p:style>
+          <a:lnRef idx="0">
+            <a:schemeClr val="accent1">
+              <a:tint val="60000"/>
+              <a:hueOff val="0"/>
+              <a:satOff val="0"/>
+              <a:lumOff val="0"/>
+              <a:alphaOff val="0"/>
+            </a:schemeClr>
+          </a:lnRef>
+          <a:fillRef idx="1">
+            <a:schemeClr val="accent1">
+              <a:tint val="60000"/>
+              <a:hueOff val="0"/>
+              <a:satOff val="0"/>
+              <a:lumOff val="0"/>
+              <a:alphaOff val="0"/>
+            </a:schemeClr>
+          </a:fillRef>
+          <a:effectRef idx="0">
+            <a:schemeClr val="accent1">
+              <a:tint val="60000"/>
+              <a:hueOff val="0"/>
+              <a:satOff val="0"/>
+              <a:lumOff val="0"/>
+              <a:alphaOff val="0"/>
+            </a:schemeClr>
+          </a:effectRef>
+          <a:fontRef idx="minor">
+            <a:schemeClr val="lt1"/>
+          </a:fontRef>
+        </p:style>
+      </p:sp>
+      <p:sp>
+        <p:nvSpPr>
+          <p:cNvPr id="32" name="Cube 31"/>
+          <p:cNvSpPr/>
+          <p:nvPr/>
+        </p:nvSpPr>
+        <p:spPr>
+          <a:xfrm>
+            <a:off x="5666652" y="2395368"/>
+            <a:ext cx="1305723" cy="417754"/>
+          </a:xfrm>
+          <a:prstGeom prst="cube">
+            <a:avLst>
+              <a:gd name="adj" fmla="val 11969"/>
+            </a:avLst>
+          </a:prstGeom>
+          <a:solidFill>
+            <a:srgbClr val="052A48"/>
+          </a:solidFill>
+          <a:ln w="9525" cap="flat" cmpd="sng" algn="ctr">
+            <a:solidFill>
+              <a:srgbClr val="FFFFFF"/>
+            </a:solidFill>
+            <a:prstDash val="solid"/>
+          </a:ln>
+          <a:effectLst/>
+        </p:spPr>
+        <p:txBody>
+          <a:bodyPr tIns="0" bIns="45720" rtlCol="0" anchor="ctr" anchorCtr="0"/>
+          <a:lstStyle/>
+          <a:p>
+            <a:pPr marL="0" marR="0" lvl="0" indent="0" algn="ctr" defTabSz="914400" eaLnBrk="1" fontAlgn="auto" latinLnBrk="0" hangingPunct="1">
+              <a:lnSpc>
+                <a:spcPct val="100000"/>
+              </a:lnSpc>
+              <a:spcBef>
+                <a:spcPts val="0"/>
+              </a:spcBef>
+              <a:spcAft>
+                <a:spcPts val="0"/>
+              </a:spcAft>
+              <a:buClrTx/>
+              <a:buSzTx/>
+              <a:buFontTx/>
+              <a:buNone/>
+              <a:tabLst/>
+              <a:defRPr/>
+            </a:pPr>
+            <a:r>
+              <a:rPr kumimoji="0" lang="en-US" sz="1800" i="0" u="none" strike="noStrike" kern="0" cap="none" spc="0" normalizeH="0" baseline="0" noProof="0" dirty="0" err="1" smtClean="0">
+                <a:ln>
+                  <a:noFill/>
+                </a:ln>
+                <a:solidFill>
+                  <a:schemeClr val="bg1">
+                    <a:lumMod val="85000"/>
+                  </a:schemeClr>
+                </a:solidFill>
+                <a:effectLst/>
+                <a:uLnTx/>
+                <a:uFillTx/>
+                <a:latin typeface="Calibri"/>
+                <a:ea typeface="+mn-ea"/>
+                <a:cs typeface="+mn-cs"/>
+              </a:rPr>
+              <a:t>PyNWB</a:t>
+            </a:r>
+            <a:endParaRPr kumimoji="0" lang="en-US" sz="1800" i="0" u="none" strike="noStrike" kern="0" cap="none" spc="0" normalizeH="0" baseline="0" noProof="0" dirty="0">
+              <a:ln>
+                <a:noFill/>
+              </a:ln>
+              <a:solidFill>
+                <a:schemeClr val="bg1">
+                  <a:lumMod val="85000"/>
+                </a:schemeClr>
+              </a:solidFill>
+              <a:effectLst/>
+              <a:uLnTx/>
+              <a:uFillTx/>
+              <a:latin typeface="Calibri"/>
+              <a:ea typeface="+mn-ea"/>
+              <a:cs typeface="+mn-cs"/>
+            </a:endParaRPr>
+          </a:p>
+        </p:txBody>
+      </p:sp>
+      <p:sp>
+        <p:nvSpPr>
+          <p:cNvPr id="41" name="Left Arrow 40"/>
+          <p:cNvSpPr/>
+          <p:nvPr/>
+        </p:nvSpPr>
+        <p:spPr>
+          <a:xfrm rot="12856414">
+            <a:off x="2527004" y="2826537"/>
+            <a:ext cx="936787" cy="268194"/>
+          </a:xfrm>
+          <a:prstGeom prst="leftArrow">
+            <a:avLst>
+              <a:gd name="adj1" fmla="val 46274"/>
+              <a:gd name="adj2" fmla="val 50000"/>
+            </a:avLst>
+          </a:prstGeom>
+          <a:solidFill>
+            <a:srgbClr val="052A48"/>
+          </a:solidFill>
+          <a:ln w="9525" cmpd="sng">
+            <a:solidFill>
+              <a:srgbClr val="FFFFFF"/>
+            </a:solidFill>
+          </a:ln>
+        </p:spPr>
+        <p:style>
+          <a:lnRef idx="0">
+            <a:schemeClr val="accent1">
+              <a:tint val="60000"/>
+              <a:hueOff val="0"/>
+              <a:satOff val="0"/>
+              <a:lumOff val="0"/>
+              <a:alphaOff val="0"/>
+            </a:schemeClr>
+          </a:lnRef>
+          <a:fillRef idx="1">
+            <a:schemeClr val="accent1">
+              <a:tint val="60000"/>
+              <a:hueOff val="0"/>
+              <a:satOff val="0"/>
+              <a:lumOff val="0"/>
+              <a:alphaOff val="0"/>
+            </a:schemeClr>
+          </a:fillRef>
+          <a:effectRef idx="0">
+            <a:schemeClr val="accent1">
+              <a:tint val="60000"/>
+              <a:hueOff val="0"/>
+              <a:satOff val="0"/>
+              <a:lumOff val="0"/>
+              <a:alphaOff val="0"/>
+            </a:schemeClr>
+          </a:effectRef>
+          <a:fontRef idx="minor">
+            <a:schemeClr val="lt1"/>
+          </a:fontRef>
+        </p:style>
+      </p:sp>
+      <p:sp>
+        <p:nvSpPr>
+          <p:cNvPr id="29" name="Cube 28"/>
+          <p:cNvSpPr/>
+          <p:nvPr/>
+        </p:nvSpPr>
+        <p:spPr>
+          <a:xfrm>
+            <a:off x="1943060" y="2395110"/>
+            <a:ext cx="1305723" cy="417754"/>
+          </a:xfrm>
+          <a:prstGeom prst="cube">
+            <a:avLst>
+              <a:gd name="adj" fmla="val 11969"/>
+            </a:avLst>
+          </a:prstGeom>
+          <a:solidFill>
+            <a:srgbClr val="052A48"/>
+          </a:solidFill>
+          <a:ln w="9525" cap="flat" cmpd="sng" algn="ctr">
+            <a:solidFill>
+              <a:srgbClr val="FFFFFF"/>
+            </a:solidFill>
+            <a:prstDash val="solid"/>
+          </a:ln>
+          <a:effectLst/>
+        </p:spPr>
+        <p:txBody>
+          <a:bodyPr tIns="0" bIns="45720" rtlCol="0" anchor="ctr" anchorCtr="0"/>
+          <a:lstStyle/>
+          <a:p>
+            <a:pPr marL="0" marR="0" lvl="0" indent="0" algn="ctr" defTabSz="914400" eaLnBrk="1" fontAlgn="auto" latinLnBrk="0" hangingPunct="1">
+              <a:lnSpc>
+                <a:spcPct val="100000"/>
+              </a:lnSpc>
+              <a:spcBef>
+                <a:spcPts val="0"/>
+              </a:spcBef>
+              <a:spcAft>
+                <a:spcPts val="0"/>
+              </a:spcAft>
+              <a:buClrTx/>
+              <a:buSzTx/>
+              <a:buFontTx/>
+              <a:buNone/>
+              <a:tabLst/>
+              <a:defRPr/>
+            </a:pPr>
+            <a:r>
+              <a:rPr kumimoji="0" lang="en-US" sz="1800" i="0" u="none" strike="noStrike" kern="0" cap="none" spc="0" normalizeH="0" baseline="0" noProof="0" dirty="0" err="1" smtClean="0">
+                <a:ln>
+                  <a:noFill/>
+                </a:ln>
+                <a:solidFill>
+                  <a:schemeClr val="bg1">
+                    <a:lumMod val="85000"/>
+                  </a:schemeClr>
+                </a:solidFill>
+                <a:effectLst/>
+                <a:uLnTx/>
+                <a:uFillTx/>
+                <a:latin typeface="Calibri"/>
+                <a:ea typeface="+mn-ea"/>
+                <a:cs typeface="+mn-cs"/>
+              </a:rPr>
+              <a:t>PyNWB</a:t>
+            </a:r>
+            <a:endParaRPr kumimoji="0" lang="en-US" sz="1800" i="0" u="none" strike="noStrike" kern="0" cap="none" spc="0" normalizeH="0" baseline="0" noProof="0" dirty="0">
+              <a:ln>
+                <a:noFill/>
+              </a:ln>
+              <a:solidFill>
+                <a:schemeClr val="bg1">
+                  <a:lumMod val="85000"/>
+                </a:schemeClr>
+              </a:solidFill>
+              <a:effectLst/>
+              <a:uLnTx/>
+              <a:uFillTx/>
+              <a:latin typeface="Calibri"/>
+              <a:ea typeface="+mn-ea"/>
+              <a:cs typeface="+mn-cs"/>
+            </a:endParaRPr>
+          </a:p>
+        </p:txBody>
+      </p:sp>
+    </p:spTree>
+    <p:extLst>
+      <p:ext uri="{BB962C8B-B14F-4D97-AF65-F5344CB8AC3E}">
+        <p14:creationId xmlns:p14="http://schemas.microsoft.com/office/powerpoint/2010/main" val="2963881109"/>
+      </p:ext>
+    </p:extLst>
+  </p:cSld>
+  <p:clrMapOvr>
+    <a:masterClrMapping/>
+  </p:clrMapOvr>
+</p:sld>
+</file>
+
+<file path=ppt/slides/slide11.xml><?xml version="1.0" encoding="utf-8"?>
 <p:sld xmlns:a="http://schemas.openxmlformats.org/drawingml/2006/main" xmlns:r="http://schemas.openxmlformats.org/officeDocument/2006/relationships" xmlns:p="http://schemas.openxmlformats.org/presentationml/2006/main">
   <p:cSld>
     <p:spTree>
@@ -3881,7 +5309,7 @@
 </p:sld>
 </file>
 
-<file path=ppt/slides/slide11.xml><?xml version="1.0" encoding="utf-8"?>
+<file path=ppt/slides/slide12.xml><?xml version="1.0" encoding="utf-8"?>
 <p:sld xmlns:a="http://schemas.openxmlformats.org/drawingml/2006/main" xmlns:r="http://schemas.openxmlformats.org/officeDocument/2006/relationships" xmlns:p="http://schemas.openxmlformats.org/presentationml/2006/main">
   <p:cSld>
     <p:spTree>
@@ -4021,338 +5449,6 @@
     <p:extLst>
       <p:ext uri="{BB962C8B-B14F-4D97-AF65-F5344CB8AC3E}">
         <p14:creationId xmlns:p14="http://schemas.microsoft.com/office/powerpoint/2010/main" val="3305643027"/>
-      </p:ext>
-    </p:extLst>
-  </p:cSld>
-  <p:clrMapOvr>
-    <a:masterClrMapping/>
-  </p:clrMapOvr>
-</p:sld>
-</file>
-
-<file path=ppt/slides/slide12.xml><?xml version="1.0" encoding="utf-8"?>
-<p:sld xmlns:a="http://schemas.openxmlformats.org/drawingml/2006/main" xmlns:r="http://schemas.openxmlformats.org/officeDocument/2006/relationships" xmlns:p="http://schemas.openxmlformats.org/presentationml/2006/main">
-  <p:cSld>
-    <p:spTree>
-      <p:nvGrpSpPr>
-        <p:cNvPr id="1" name=""/>
-        <p:cNvGrpSpPr/>
-        <p:nvPr/>
-      </p:nvGrpSpPr>
-      <p:grpSpPr>
-        <a:xfrm>
-          <a:off x="0" y="0"/>
-          <a:ext cx="0" cy="0"/>
-          <a:chOff x="0" y="0"/>
-          <a:chExt cx="0" cy="0"/>
-        </a:xfrm>
-      </p:grpSpPr>
-      <p:sp>
-        <p:nvSpPr>
-          <p:cNvPr id="27" name="Rounded Rectangle 26"/>
-          <p:cNvSpPr/>
-          <p:nvPr/>
-        </p:nvSpPr>
-        <p:spPr>
-          <a:xfrm>
-            <a:off x="853570" y="853671"/>
-            <a:ext cx="7234527" cy="4851352"/>
-          </a:xfrm>
-          <a:prstGeom prst="roundRect">
-            <a:avLst>
-              <a:gd name="adj" fmla="val 4437"/>
-            </a:avLst>
-          </a:prstGeom>
-          <a:solidFill>
-            <a:srgbClr val="EDEDED"/>
-          </a:solidFill>
-          <a:ln>
-            <a:solidFill>
-              <a:srgbClr val="000000"/>
-            </a:solidFill>
-          </a:ln>
-          <a:effectLst/>
-        </p:spPr>
-        <p:style>
-          <a:lnRef idx="1">
-            <a:schemeClr val="accent1"/>
-          </a:lnRef>
-          <a:fillRef idx="3">
-            <a:schemeClr val="accent1"/>
-          </a:fillRef>
-          <a:effectRef idx="2">
-            <a:schemeClr val="accent1"/>
-          </a:effectRef>
-          <a:fontRef idx="minor">
-            <a:schemeClr val="lt1"/>
-          </a:fontRef>
-        </p:style>
-        <p:txBody>
-          <a:bodyPr rtlCol="0" anchor="ctr"/>
-          <a:lstStyle/>
-          <a:p>
-            <a:pPr algn="ctr"/>
-            <a:endParaRPr lang="en-US"/>
-          </a:p>
-        </p:txBody>
-      </p:sp>
-      <p:sp>
-        <p:nvSpPr>
-          <p:cNvPr id="26" name="Rectangle 25"/>
-          <p:cNvSpPr/>
-          <p:nvPr/>
-        </p:nvSpPr>
-        <p:spPr>
-          <a:xfrm>
-            <a:off x="863980" y="855015"/>
-            <a:ext cx="7213708" cy="2585323"/>
-          </a:xfrm>
-          <a:prstGeom prst="rect">
-            <a:avLst/>
-          </a:prstGeom>
-        </p:spPr>
-        <p:txBody>
-          <a:bodyPr wrap="square">
-            <a:spAutoFit/>
-          </a:bodyPr>
-          <a:lstStyle/>
-          <a:p>
-            <a:pPr algn="ctr"/>
-            <a:r>
-              <a:rPr lang="en-US" sz="5400" b="1" dirty="0" smtClean="0">
-                <a:solidFill>
-                  <a:srgbClr val="052B48"/>
-                </a:solidFill>
-                <a:latin typeface="Calibri"/>
-                <a:cs typeface="Calibri"/>
-              </a:rPr>
-              <a:t>Adding/Removing Containers from an NWB File </a:t>
-            </a:r>
-            <a:endParaRPr lang="en-US" sz="5400" b="1" dirty="0">
-              <a:solidFill>
-                <a:srgbClr val="052B48"/>
-              </a:solidFill>
-              <a:latin typeface="Calibri"/>
-              <a:cs typeface="Calibri"/>
-            </a:endParaRPr>
-          </a:p>
-        </p:txBody>
-      </p:sp>
-      <p:sp>
-        <p:nvSpPr>
-          <p:cNvPr id="3" name="Folded Corner 2"/>
-          <p:cNvSpPr/>
-          <p:nvPr/>
-        </p:nvSpPr>
-        <p:spPr>
-          <a:xfrm rot="10800000" flipH="1">
-            <a:off x="3839842" y="3460251"/>
-            <a:ext cx="1419941" cy="1900138"/>
-          </a:xfrm>
-          <a:prstGeom prst="foldedCorner">
-            <a:avLst>
-              <a:gd name="adj" fmla="val 26556"/>
-            </a:avLst>
-          </a:prstGeom>
-          <a:solidFill>
-            <a:srgbClr val="052A48"/>
-          </a:solidFill>
-          <a:ln w="28575" cmpd="sng">
-            <a:solidFill>
-              <a:schemeClr val="bg1"/>
-            </a:solidFill>
-          </a:ln>
-          <a:effectLst/>
-        </p:spPr>
-        <p:style>
-          <a:lnRef idx="1">
-            <a:schemeClr val="accent1"/>
-          </a:lnRef>
-          <a:fillRef idx="3">
-            <a:schemeClr val="accent1"/>
-          </a:fillRef>
-          <a:effectRef idx="2">
-            <a:schemeClr val="accent1"/>
-          </a:effectRef>
-          <a:fontRef idx="minor">
-            <a:schemeClr val="lt1"/>
-          </a:fontRef>
-        </p:style>
-        <p:txBody>
-          <a:bodyPr rtlCol="0" anchor="ctr"/>
-          <a:lstStyle/>
-          <a:p>
-            <a:pPr algn="ctr"/>
-            <a:r>
-              <a:rPr lang="en-US" u="sng" dirty="0" smtClean="0"/>
-              <a:t>																			   </a:t>
-            </a:r>
-            <a:endParaRPr lang="en-US" u="sng" dirty="0"/>
-          </a:p>
-        </p:txBody>
-      </p:sp>
-      <p:sp>
-        <p:nvSpPr>
-          <p:cNvPr id="4" name="Oval 3"/>
-          <p:cNvSpPr/>
-          <p:nvPr/>
-        </p:nvSpPr>
-        <p:spPr>
-          <a:xfrm>
-            <a:off x="4939826" y="5048168"/>
-            <a:ext cx="579977" cy="601510"/>
-          </a:xfrm>
-          <a:prstGeom prst="ellipse">
-            <a:avLst/>
-          </a:prstGeom>
-          <a:solidFill>
-            <a:srgbClr val="052A48"/>
-          </a:solidFill>
-          <a:ln w="76200" cmpd="sng">
-            <a:solidFill>
-              <a:srgbClr val="FFFFFF"/>
-            </a:solidFill>
-          </a:ln>
-          <a:effectLst/>
-        </p:spPr>
-        <p:style>
-          <a:lnRef idx="1">
-            <a:schemeClr val="accent1"/>
-          </a:lnRef>
-          <a:fillRef idx="3">
-            <a:schemeClr val="accent1"/>
-          </a:fillRef>
-          <a:effectRef idx="2">
-            <a:schemeClr val="accent1"/>
-          </a:effectRef>
-          <a:fontRef idx="minor">
-            <a:schemeClr val="lt1"/>
-          </a:fontRef>
-        </p:style>
-        <p:txBody>
-          <a:bodyPr rtlCol="0" anchor="ctr"/>
-          <a:lstStyle/>
-          <a:p>
-            <a:endParaRPr lang="en-US" sz="4400" dirty="0"/>
-          </a:p>
-        </p:txBody>
-      </p:sp>
-      <p:sp>
-        <p:nvSpPr>
-          <p:cNvPr id="5" name="Rectangle 4"/>
-          <p:cNvSpPr/>
-          <p:nvPr/>
-        </p:nvSpPr>
-        <p:spPr>
-          <a:xfrm>
-            <a:off x="5013201" y="4804441"/>
-            <a:ext cx="415273" cy="923330"/>
-          </a:xfrm>
-          <a:prstGeom prst="rect">
-            <a:avLst/>
-          </a:prstGeom>
-          <a:effectLst/>
-        </p:spPr>
-        <p:txBody>
-          <a:bodyPr wrap="none">
-            <a:spAutoFit/>
-          </a:bodyPr>
-          <a:lstStyle/>
-          <a:p>
-            <a:r>
-              <a:rPr lang="en-US" sz="5400" b="1" dirty="0">
-                <a:solidFill>
-                  <a:schemeClr val="bg1"/>
-                </a:solidFill>
-              </a:rPr>
-              <a:t>-</a:t>
-            </a:r>
-          </a:p>
-        </p:txBody>
-      </p:sp>
-      <p:sp>
-        <p:nvSpPr>
-          <p:cNvPr id="8" name="Oval 7"/>
-          <p:cNvSpPr/>
-          <p:nvPr/>
-        </p:nvSpPr>
-        <p:spPr>
-          <a:xfrm>
-            <a:off x="4942253" y="4360489"/>
-            <a:ext cx="579977" cy="601510"/>
-          </a:xfrm>
-          <a:prstGeom prst="ellipse">
-            <a:avLst/>
-          </a:prstGeom>
-          <a:solidFill>
-            <a:srgbClr val="052A48"/>
-          </a:solidFill>
-          <a:ln w="76200" cmpd="sng">
-            <a:solidFill>
-              <a:srgbClr val="FFFFFF"/>
-            </a:solidFill>
-          </a:ln>
-          <a:effectLst/>
-        </p:spPr>
-        <p:style>
-          <a:lnRef idx="1">
-            <a:schemeClr val="accent1"/>
-          </a:lnRef>
-          <a:fillRef idx="3">
-            <a:schemeClr val="accent1"/>
-          </a:fillRef>
-          <a:effectRef idx="2">
-            <a:schemeClr val="accent1"/>
-          </a:effectRef>
-          <a:fontRef idx="minor">
-            <a:schemeClr val="lt1"/>
-          </a:fontRef>
-        </p:style>
-        <p:txBody>
-          <a:bodyPr rtlCol="0" anchor="ctr"/>
-          <a:lstStyle/>
-          <a:p>
-            <a:endParaRPr lang="en-US" sz="4400" dirty="0"/>
-          </a:p>
-        </p:txBody>
-      </p:sp>
-      <p:sp>
-        <p:nvSpPr>
-          <p:cNvPr id="9" name="Rectangle 8"/>
-          <p:cNvSpPr/>
-          <p:nvPr/>
-        </p:nvSpPr>
-        <p:spPr>
-          <a:xfrm>
-            <a:off x="4975628" y="4256776"/>
-            <a:ext cx="514183" cy="769441"/>
-          </a:xfrm>
-          <a:prstGeom prst="rect">
-            <a:avLst/>
-          </a:prstGeom>
-          <a:effectLst/>
-        </p:spPr>
-        <p:txBody>
-          <a:bodyPr wrap="none">
-            <a:spAutoFit/>
-          </a:bodyPr>
-          <a:lstStyle/>
-          <a:p>
-            <a:r>
-              <a:rPr lang="en-US" sz="4400" b="1" dirty="0">
-                <a:solidFill>
-                  <a:schemeClr val="bg1"/>
-                </a:solidFill>
-              </a:rPr>
-              <a:t>+</a:t>
-            </a:r>
-          </a:p>
-        </p:txBody>
-      </p:sp>
-    </p:spTree>
-    <p:extLst>
-      <p:ext uri="{BB962C8B-B14F-4D97-AF65-F5344CB8AC3E}">
-        <p14:creationId xmlns:p14="http://schemas.microsoft.com/office/powerpoint/2010/main" val="3909940052"/>
       </p:ext>
     </p:extLst>
   </p:cSld>
@@ -4437,6 +5533,338 @@
         <p:spPr>
           <a:xfrm>
             <a:off x="863980" y="855015"/>
+            <a:ext cx="7213708" cy="2585323"/>
+          </a:xfrm>
+          <a:prstGeom prst="rect">
+            <a:avLst/>
+          </a:prstGeom>
+        </p:spPr>
+        <p:txBody>
+          <a:bodyPr wrap="square">
+            <a:spAutoFit/>
+          </a:bodyPr>
+          <a:lstStyle/>
+          <a:p>
+            <a:pPr algn="ctr"/>
+            <a:r>
+              <a:rPr lang="en-US" sz="5400" b="1" dirty="0" smtClean="0">
+                <a:solidFill>
+                  <a:srgbClr val="052B48"/>
+                </a:solidFill>
+                <a:latin typeface="Calibri"/>
+                <a:cs typeface="Calibri"/>
+              </a:rPr>
+              <a:t>Adding/Removing Containers from an NWB File </a:t>
+            </a:r>
+            <a:endParaRPr lang="en-US" sz="5400" b="1" dirty="0">
+              <a:solidFill>
+                <a:srgbClr val="052B48"/>
+              </a:solidFill>
+              <a:latin typeface="Calibri"/>
+              <a:cs typeface="Calibri"/>
+            </a:endParaRPr>
+          </a:p>
+        </p:txBody>
+      </p:sp>
+      <p:sp>
+        <p:nvSpPr>
+          <p:cNvPr id="3" name="Folded Corner 2"/>
+          <p:cNvSpPr/>
+          <p:nvPr/>
+        </p:nvSpPr>
+        <p:spPr>
+          <a:xfrm rot="10800000" flipH="1">
+            <a:off x="3839842" y="3460251"/>
+            <a:ext cx="1419941" cy="1900138"/>
+          </a:xfrm>
+          <a:prstGeom prst="foldedCorner">
+            <a:avLst>
+              <a:gd name="adj" fmla="val 26556"/>
+            </a:avLst>
+          </a:prstGeom>
+          <a:solidFill>
+            <a:srgbClr val="052A48"/>
+          </a:solidFill>
+          <a:ln w="28575" cmpd="sng">
+            <a:solidFill>
+              <a:schemeClr val="bg1"/>
+            </a:solidFill>
+          </a:ln>
+          <a:effectLst/>
+        </p:spPr>
+        <p:style>
+          <a:lnRef idx="1">
+            <a:schemeClr val="accent1"/>
+          </a:lnRef>
+          <a:fillRef idx="3">
+            <a:schemeClr val="accent1"/>
+          </a:fillRef>
+          <a:effectRef idx="2">
+            <a:schemeClr val="accent1"/>
+          </a:effectRef>
+          <a:fontRef idx="minor">
+            <a:schemeClr val="lt1"/>
+          </a:fontRef>
+        </p:style>
+        <p:txBody>
+          <a:bodyPr rtlCol="0" anchor="ctr"/>
+          <a:lstStyle/>
+          <a:p>
+            <a:pPr algn="ctr"/>
+            <a:r>
+              <a:rPr lang="en-US" u="sng" dirty="0" smtClean="0"/>
+              <a:t>																			   </a:t>
+            </a:r>
+            <a:endParaRPr lang="en-US" u="sng" dirty="0"/>
+          </a:p>
+        </p:txBody>
+      </p:sp>
+      <p:sp>
+        <p:nvSpPr>
+          <p:cNvPr id="4" name="Oval 3"/>
+          <p:cNvSpPr/>
+          <p:nvPr/>
+        </p:nvSpPr>
+        <p:spPr>
+          <a:xfrm>
+            <a:off x="4939826" y="5048168"/>
+            <a:ext cx="579977" cy="601510"/>
+          </a:xfrm>
+          <a:prstGeom prst="ellipse">
+            <a:avLst/>
+          </a:prstGeom>
+          <a:solidFill>
+            <a:srgbClr val="052A48"/>
+          </a:solidFill>
+          <a:ln w="76200" cmpd="sng">
+            <a:solidFill>
+              <a:srgbClr val="FFFFFF"/>
+            </a:solidFill>
+          </a:ln>
+          <a:effectLst/>
+        </p:spPr>
+        <p:style>
+          <a:lnRef idx="1">
+            <a:schemeClr val="accent1"/>
+          </a:lnRef>
+          <a:fillRef idx="3">
+            <a:schemeClr val="accent1"/>
+          </a:fillRef>
+          <a:effectRef idx="2">
+            <a:schemeClr val="accent1"/>
+          </a:effectRef>
+          <a:fontRef idx="minor">
+            <a:schemeClr val="lt1"/>
+          </a:fontRef>
+        </p:style>
+        <p:txBody>
+          <a:bodyPr rtlCol="0" anchor="ctr"/>
+          <a:lstStyle/>
+          <a:p>
+            <a:endParaRPr lang="en-US" sz="4400" dirty="0"/>
+          </a:p>
+        </p:txBody>
+      </p:sp>
+      <p:sp>
+        <p:nvSpPr>
+          <p:cNvPr id="5" name="Rectangle 4"/>
+          <p:cNvSpPr/>
+          <p:nvPr/>
+        </p:nvSpPr>
+        <p:spPr>
+          <a:xfrm>
+            <a:off x="5013201" y="4804441"/>
+            <a:ext cx="415273" cy="923330"/>
+          </a:xfrm>
+          <a:prstGeom prst="rect">
+            <a:avLst/>
+          </a:prstGeom>
+          <a:effectLst/>
+        </p:spPr>
+        <p:txBody>
+          <a:bodyPr wrap="none">
+            <a:spAutoFit/>
+          </a:bodyPr>
+          <a:lstStyle/>
+          <a:p>
+            <a:r>
+              <a:rPr lang="en-US" sz="5400" b="1" dirty="0">
+                <a:solidFill>
+                  <a:schemeClr val="bg1"/>
+                </a:solidFill>
+              </a:rPr>
+              <a:t>-</a:t>
+            </a:r>
+          </a:p>
+        </p:txBody>
+      </p:sp>
+      <p:sp>
+        <p:nvSpPr>
+          <p:cNvPr id="8" name="Oval 7"/>
+          <p:cNvSpPr/>
+          <p:nvPr/>
+        </p:nvSpPr>
+        <p:spPr>
+          <a:xfrm>
+            <a:off x="4942253" y="4360489"/>
+            <a:ext cx="579977" cy="601510"/>
+          </a:xfrm>
+          <a:prstGeom prst="ellipse">
+            <a:avLst/>
+          </a:prstGeom>
+          <a:solidFill>
+            <a:srgbClr val="052A48"/>
+          </a:solidFill>
+          <a:ln w="76200" cmpd="sng">
+            <a:solidFill>
+              <a:srgbClr val="FFFFFF"/>
+            </a:solidFill>
+          </a:ln>
+          <a:effectLst/>
+        </p:spPr>
+        <p:style>
+          <a:lnRef idx="1">
+            <a:schemeClr val="accent1"/>
+          </a:lnRef>
+          <a:fillRef idx="3">
+            <a:schemeClr val="accent1"/>
+          </a:fillRef>
+          <a:effectRef idx="2">
+            <a:schemeClr val="accent1"/>
+          </a:effectRef>
+          <a:fontRef idx="minor">
+            <a:schemeClr val="lt1"/>
+          </a:fontRef>
+        </p:style>
+        <p:txBody>
+          <a:bodyPr rtlCol="0" anchor="ctr"/>
+          <a:lstStyle/>
+          <a:p>
+            <a:endParaRPr lang="en-US" sz="4400" dirty="0"/>
+          </a:p>
+        </p:txBody>
+      </p:sp>
+      <p:sp>
+        <p:nvSpPr>
+          <p:cNvPr id="9" name="Rectangle 8"/>
+          <p:cNvSpPr/>
+          <p:nvPr/>
+        </p:nvSpPr>
+        <p:spPr>
+          <a:xfrm>
+            <a:off x="4975628" y="4256776"/>
+            <a:ext cx="514183" cy="769441"/>
+          </a:xfrm>
+          <a:prstGeom prst="rect">
+            <a:avLst/>
+          </a:prstGeom>
+          <a:effectLst/>
+        </p:spPr>
+        <p:txBody>
+          <a:bodyPr wrap="none">
+            <a:spAutoFit/>
+          </a:bodyPr>
+          <a:lstStyle/>
+          <a:p>
+            <a:r>
+              <a:rPr lang="en-US" sz="4400" b="1" dirty="0">
+                <a:solidFill>
+                  <a:schemeClr val="bg1"/>
+                </a:solidFill>
+              </a:rPr>
+              <a:t>+</a:t>
+            </a:r>
+          </a:p>
+        </p:txBody>
+      </p:sp>
+    </p:spTree>
+    <p:extLst>
+      <p:ext uri="{BB962C8B-B14F-4D97-AF65-F5344CB8AC3E}">
+        <p14:creationId xmlns:p14="http://schemas.microsoft.com/office/powerpoint/2010/main" val="3909940052"/>
+      </p:ext>
+    </p:extLst>
+  </p:cSld>
+  <p:clrMapOvr>
+    <a:masterClrMapping/>
+  </p:clrMapOvr>
+</p:sld>
+</file>
+
+<file path=ppt/slides/slide14.xml><?xml version="1.0" encoding="utf-8"?>
+<p:sld xmlns:a="http://schemas.openxmlformats.org/drawingml/2006/main" xmlns:r="http://schemas.openxmlformats.org/officeDocument/2006/relationships" xmlns:p="http://schemas.openxmlformats.org/presentationml/2006/main">
+  <p:cSld>
+    <p:spTree>
+      <p:nvGrpSpPr>
+        <p:cNvPr id="1" name=""/>
+        <p:cNvGrpSpPr/>
+        <p:nvPr/>
+      </p:nvGrpSpPr>
+      <p:grpSpPr>
+        <a:xfrm>
+          <a:off x="0" y="0"/>
+          <a:ext cx="0" cy="0"/>
+          <a:chOff x="0" y="0"/>
+          <a:chExt cx="0" cy="0"/>
+        </a:xfrm>
+      </p:grpSpPr>
+      <p:sp>
+        <p:nvSpPr>
+          <p:cNvPr id="27" name="Rounded Rectangle 26"/>
+          <p:cNvSpPr/>
+          <p:nvPr/>
+        </p:nvSpPr>
+        <p:spPr>
+          <a:xfrm>
+            <a:off x="853570" y="853671"/>
+            <a:ext cx="7234527" cy="4851352"/>
+          </a:xfrm>
+          <a:prstGeom prst="roundRect">
+            <a:avLst>
+              <a:gd name="adj" fmla="val 4437"/>
+            </a:avLst>
+          </a:prstGeom>
+          <a:solidFill>
+            <a:srgbClr val="EDEDED"/>
+          </a:solidFill>
+          <a:ln>
+            <a:solidFill>
+              <a:srgbClr val="000000"/>
+            </a:solidFill>
+          </a:ln>
+          <a:effectLst/>
+        </p:spPr>
+        <p:style>
+          <a:lnRef idx="1">
+            <a:schemeClr val="accent1"/>
+          </a:lnRef>
+          <a:fillRef idx="3">
+            <a:schemeClr val="accent1"/>
+          </a:fillRef>
+          <a:effectRef idx="2">
+            <a:schemeClr val="accent1"/>
+          </a:effectRef>
+          <a:fontRef idx="minor">
+            <a:schemeClr val="lt1"/>
+          </a:fontRef>
+        </p:style>
+        <p:txBody>
+          <a:bodyPr rtlCol="0" anchor="ctr"/>
+          <a:lstStyle/>
+          <a:p>
+            <a:pPr algn="ctr"/>
+            <a:endParaRPr lang="en-US"/>
+          </a:p>
+        </p:txBody>
+      </p:sp>
+      <p:sp>
+        <p:nvSpPr>
+          <p:cNvPr id="26" name="Rectangle 25"/>
+          <p:cNvSpPr/>
+          <p:nvPr/>
+        </p:nvSpPr>
+        <p:spPr>
+          <a:xfrm>
+            <a:off x="863980" y="855015"/>
             <a:ext cx="7213708" cy="923330"/>
           </a:xfrm>
           <a:prstGeom prst="rect">
@@ -4612,7 +6040,7 @@
 </p:sld>
 </file>
 
-<file path=ppt/slides/slide14.xml><?xml version="1.0" encoding="utf-8"?>
+<file path=ppt/slides/slide15.xml><?xml version="1.0" encoding="utf-8"?>
 <p:sld xmlns:a="http://schemas.openxmlformats.org/drawingml/2006/main" xmlns:r="http://schemas.openxmlformats.org/officeDocument/2006/relationships" xmlns:p="http://schemas.openxmlformats.org/presentationml/2006/main">
   <p:cSld>
     <p:spTree>
@@ -5017,6 +6445,157 @@
                 <a:latin typeface="Calibri"/>
                 <a:cs typeface="Calibri"/>
               </a:rPr>
+              <a:t>Query Intracellular Electrophysiology Metadata</a:t>
+            </a:r>
+            <a:endParaRPr lang="en-US" sz="5400" b="1" dirty="0">
+              <a:solidFill>
+                <a:srgbClr val="052B48"/>
+              </a:solidFill>
+              <a:latin typeface="Calibri"/>
+              <a:cs typeface="Calibri"/>
+            </a:endParaRPr>
+          </a:p>
+        </p:txBody>
+      </p:sp>
+      <p:pic>
+        <p:nvPicPr>
+          <p:cNvPr id="9" name="Picture 8" descr="Screen Shot 2021-07-16 at 7.49.02 PM.png"/>
+          <p:cNvPicPr>
+            <a:picLocks noChangeAspect="1"/>
+          </p:cNvPicPr>
+          <p:nvPr/>
+        </p:nvPicPr>
+        <p:blipFill>
+          <a:blip r:embed="rId2">
+            <a:extLst>
+              <a:ext uri="{28A0092B-C50C-407E-A947-70E740481C1C}">
+                <a14:useLocalDpi xmlns:a14="http://schemas.microsoft.com/office/drawing/2010/main" val="0"/>
+              </a:ext>
+            </a:extLst>
+          </a:blip>
+          <a:stretch>
+            <a:fillRect/>
+          </a:stretch>
+        </p:blipFill>
+        <p:spPr>
+          <a:xfrm>
+            <a:off x="1291164" y="3404272"/>
+            <a:ext cx="6360583" cy="2209129"/>
+          </a:xfrm>
+          <a:prstGeom prst="rect">
+            <a:avLst/>
+          </a:prstGeom>
+        </p:spPr>
+      </p:pic>
+    </p:spTree>
+    <p:extLst>
+      <p:ext uri="{BB962C8B-B14F-4D97-AF65-F5344CB8AC3E}">
+        <p14:creationId xmlns:p14="http://schemas.microsoft.com/office/powerpoint/2010/main" val="1093748511"/>
+      </p:ext>
+    </p:extLst>
+  </p:cSld>
+  <p:clrMapOvr>
+    <a:masterClrMapping/>
+  </p:clrMapOvr>
+</p:sld>
+</file>
+
+<file path=ppt/slides/slide3.xml><?xml version="1.0" encoding="utf-8"?>
+<p:sld xmlns:a="http://schemas.openxmlformats.org/drawingml/2006/main" xmlns:r="http://schemas.openxmlformats.org/officeDocument/2006/relationships" xmlns:p="http://schemas.openxmlformats.org/presentationml/2006/main">
+  <p:cSld>
+    <p:spTree>
+      <p:nvGrpSpPr>
+        <p:cNvPr id="1" name=""/>
+        <p:cNvGrpSpPr/>
+        <p:nvPr/>
+      </p:nvGrpSpPr>
+      <p:grpSpPr>
+        <a:xfrm>
+          <a:off x="0" y="0"/>
+          <a:ext cx="0" cy="0"/>
+          <a:chOff x="0" y="0"/>
+          <a:chExt cx="0" cy="0"/>
+        </a:xfrm>
+      </p:grpSpPr>
+      <p:sp>
+        <p:nvSpPr>
+          <p:cNvPr id="27" name="Rounded Rectangle 26"/>
+          <p:cNvSpPr/>
+          <p:nvPr/>
+        </p:nvSpPr>
+        <p:spPr>
+          <a:xfrm>
+            <a:off x="853570" y="853671"/>
+            <a:ext cx="7234527" cy="4851352"/>
+          </a:xfrm>
+          <a:prstGeom prst="roundRect">
+            <a:avLst>
+              <a:gd name="adj" fmla="val 4437"/>
+            </a:avLst>
+          </a:prstGeom>
+          <a:solidFill>
+            <a:srgbClr val="EDEDED"/>
+          </a:solidFill>
+          <a:ln>
+            <a:solidFill>
+              <a:srgbClr val="000000"/>
+            </a:solidFill>
+          </a:ln>
+          <a:effectLst/>
+        </p:spPr>
+        <p:style>
+          <a:lnRef idx="1">
+            <a:schemeClr val="accent1"/>
+          </a:lnRef>
+          <a:fillRef idx="3">
+            <a:schemeClr val="accent1"/>
+          </a:fillRef>
+          <a:effectRef idx="2">
+            <a:schemeClr val="accent1"/>
+          </a:effectRef>
+          <a:fontRef idx="minor">
+            <a:schemeClr val="lt1"/>
+          </a:fontRef>
+        </p:style>
+        <p:txBody>
+          <a:bodyPr rtlCol="0" anchor="ctr"/>
+          <a:lstStyle/>
+          <a:p>
+            <a:pPr algn="ctr"/>
+            <a:endParaRPr lang="en-US"/>
+          </a:p>
+        </p:txBody>
+      </p:sp>
+      <p:sp>
+        <p:nvSpPr>
+          <p:cNvPr id="26" name="Rectangle 25"/>
+          <p:cNvSpPr/>
+          <p:nvPr/>
+        </p:nvSpPr>
+        <p:spPr>
+          <a:xfrm>
+            <a:off x="863980" y="855015"/>
+            <a:ext cx="7213708" cy="2585323"/>
+          </a:xfrm>
+          <a:prstGeom prst="rect">
+            <a:avLst/>
+          </a:prstGeom>
+        </p:spPr>
+        <p:txBody>
+          <a:bodyPr wrap="square">
+            <a:spAutoFit/>
+          </a:bodyPr>
+          <a:lstStyle/>
+          <a:p>
+            <a:pPr algn="ctr"/>
+            <a:r>
+              <a:rPr lang="en-US" sz="5400" b="1" dirty="0" smtClean="0">
+                <a:solidFill>
+                  <a:srgbClr val="052B48"/>
+                </a:solidFill>
+                <a:latin typeface="Calibri"/>
+                <a:cs typeface="Calibri"/>
+              </a:rPr>
               <a:t>Intracellular Electrophysiology Data using </a:t>
             </a:r>
             <a:r>
@@ -5110,7 +6689,7 @@
 </p:sld>
 </file>
 
-<file path=ppt/slides/slide3.xml><?xml version="1.0" encoding="utf-8"?>
+<file path=ppt/slides/slide4.xml><?xml version="1.0" encoding="utf-8"?>
 <p:sld xmlns:a="http://schemas.openxmlformats.org/drawingml/2006/main" xmlns:r="http://schemas.openxmlformats.org/officeDocument/2006/relationships" xmlns:p="http://schemas.openxmlformats.org/presentationml/2006/main">
   <p:cSld>
     <p:spTree>
@@ -5313,7 +6892,7 @@
 </p:sld>
 </file>
 
-<file path=ppt/slides/slide4.xml><?xml version="1.0" encoding="utf-8"?>
+<file path=ppt/slides/slide5.xml><?xml version="1.0" encoding="utf-8"?>
 <p:sld xmlns:a="http://schemas.openxmlformats.org/drawingml/2006/main" xmlns:r="http://schemas.openxmlformats.org/officeDocument/2006/relationships" xmlns:p="http://schemas.openxmlformats.org/presentationml/2006/main">
   <p:cSld>
     <p:spTree>
@@ -5504,7 +7083,7 @@
 </p:sld>
 </file>
 
-<file path=ppt/slides/slide5.xml><?xml version="1.0" encoding="utf-8"?>
+<file path=ppt/slides/slide6.xml><?xml version="1.0" encoding="utf-8"?>
 <p:sld xmlns:a="http://schemas.openxmlformats.org/drawingml/2006/main" xmlns:r="http://schemas.openxmlformats.org/officeDocument/2006/relationships" xmlns:p="http://schemas.openxmlformats.org/presentationml/2006/main">
   <p:cSld>
     <p:spTree>
@@ -5654,7 +7233,7 @@
 </p:sld>
 </file>
 
-<file path=ppt/slides/slide6.xml><?xml version="1.0" encoding="utf-8"?>
+<file path=ppt/slides/slide7.xml><?xml version="1.0" encoding="utf-8"?>
 <p:sld xmlns:a="http://schemas.openxmlformats.org/drawingml/2006/main" xmlns:r="http://schemas.openxmlformats.org/officeDocument/2006/relationships" xmlns:p="http://schemas.openxmlformats.org/presentationml/2006/main">
   <p:cSld>
     <p:spTree>
@@ -5952,7 +7531,7 @@
 </p:sld>
 </file>
 
-<file path=ppt/slides/slide7.xml><?xml version="1.0" encoding="utf-8"?>
+<file path=ppt/slides/slide8.xml><?xml version="1.0" encoding="utf-8"?>
 <p:sld xmlns:a="http://schemas.openxmlformats.org/drawingml/2006/main" xmlns:r="http://schemas.openxmlformats.org/officeDocument/2006/relationships" xmlns:p="http://schemas.openxmlformats.org/presentationml/2006/main">
   <p:cSld>
     <p:spTree>
@@ -6048,17 +7627,7 @@
                 <a:latin typeface="Calibri"/>
                 <a:cs typeface="Calibri"/>
               </a:rPr>
-              <a:t>HDF5 Dataset </a:t>
-            </a:r>
-            <a:r>
-              <a:rPr lang="en-US" sz="5400" b="1" dirty="0" smtClean="0">
-                <a:solidFill>
-                  <a:srgbClr val="052B48"/>
-                </a:solidFill>
-                <a:latin typeface="Calibri"/>
-                <a:cs typeface="Calibri"/>
-              </a:rPr>
-              <a:t>I/O</a:t>
+              <a:t>HDF5 Dataset I/O</a:t>
             </a:r>
             <a:endParaRPr lang="en-US" sz="5400" b="1" dirty="0">
               <a:solidFill>
@@ -6587,7 +8156,7 @@
 </p:sld>
 </file>
 
-<file path=ppt/slides/slide8.xml><?xml version="1.0" encoding="utf-8"?>
+<file path=ppt/slides/slide9.xml><?xml version="1.0" encoding="utf-8"?>
 <p:sld xmlns:a="http://schemas.openxmlformats.org/drawingml/2006/main" xmlns:r="http://schemas.openxmlformats.org/officeDocument/2006/relationships" xmlns:p="http://schemas.openxmlformats.org/presentationml/2006/main">
   <p:cSld>
     <p:spTree>
@@ -7169,1433 +8738,6 @@
     <p:extLst>
       <p:ext uri="{BB962C8B-B14F-4D97-AF65-F5344CB8AC3E}">
         <p14:creationId xmlns:p14="http://schemas.microsoft.com/office/powerpoint/2010/main" val="1333564583"/>
-      </p:ext>
-    </p:extLst>
-  </p:cSld>
-  <p:clrMapOvr>
-    <a:masterClrMapping/>
-  </p:clrMapOvr>
-</p:sld>
-</file>
-
-<file path=ppt/slides/slide9.xml><?xml version="1.0" encoding="utf-8"?>
-<p:sld xmlns:a="http://schemas.openxmlformats.org/drawingml/2006/main" xmlns:r="http://schemas.openxmlformats.org/officeDocument/2006/relationships" xmlns:p="http://schemas.openxmlformats.org/presentationml/2006/main">
-  <p:cSld>
-    <p:spTree>
-      <p:nvGrpSpPr>
-        <p:cNvPr id="1" name=""/>
-        <p:cNvGrpSpPr/>
-        <p:nvPr/>
-      </p:nvGrpSpPr>
-      <p:grpSpPr>
-        <a:xfrm>
-          <a:off x="0" y="0"/>
-          <a:ext cx="0" cy="0"/>
-          <a:chOff x="0" y="0"/>
-          <a:chExt cx="0" cy="0"/>
-        </a:xfrm>
-      </p:grpSpPr>
-      <p:sp>
-        <p:nvSpPr>
-          <p:cNvPr id="27" name="Rounded Rectangle 26"/>
-          <p:cNvSpPr/>
-          <p:nvPr/>
-        </p:nvSpPr>
-        <p:spPr>
-          <a:xfrm>
-            <a:off x="853570" y="853671"/>
-            <a:ext cx="7234527" cy="4851352"/>
-          </a:xfrm>
-          <a:prstGeom prst="roundRect">
-            <a:avLst>
-              <a:gd name="adj" fmla="val 4437"/>
-            </a:avLst>
-          </a:prstGeom>
-          <a:solidFill>
-            <a:srgbClr val="EDEDED"/>
-          </a:solidFill>
-          <a:ln>
-            <a:solidFill>
-              <a:srgbClr val="000000"/>
-            </a:solidFill>
-          </a:ln>
-          <a:effectLst/>
-        </p:spPr>
-        <p:style>
-          <a:lnRef idx="1">
-            <a:schemeClr val="accent1"/>
-          </a:lnRef>
-          <a:fillRef idx="3">
-            <a:schemeClr val="accent1"/>
-          </a:fillRef>
-          <a:effectRef idx="2">
-            <a:schemeClr val="accent1"/>
-          </a:effectRef>
-          <a:fontRef idx="minor">
-            <a:schemeClr val="lt1"/>
-          </a:fontRef>
-        </p:style>
-        <p:txBody>
-          <a:bodyPr rtlCol="0" anchor="ctr"/>
-          <a:lstStyle/>
-          <a:p>
-            <a:pPr algn="ctr"/>
-            <a:endParaRPr lang="en-US"/>
-          </a:p>
-        </p:txBody>
-      </p:sp>
-      <p:sp>
-        <p:nvSpPr>
-          <p:cNvPr id="26" name="Rectangle 25"/>
-          <p:cNvSpPr/>
-          <p:nvPr/>
-        </p:nvSpPr>
-        <p:spPr>
-          <a:xfrm>
-            <a:off x="863980" y="855015"/>
-            <a:ext cx="7213708" cy="923330"/>
-          </a:xfrm>
-          <a:prstGeom prst="rect">
-            <a:avLst/>
-          </a:prstGeom>
-        </p:spPr>
-        <p:txBody>
-          <a:bodyPr wrap="square">
-            <a:spAutoFit/>
-          </a:bodyPr>
-          <a:lstStyle/>
-          <a:p>
-            <a:pPr algn="ctr"/>
-            <a:r>
-              <a:rPr lang="en-US" sz="5400" b="1" dirty="0" smtClean="0">
-                <a:solidFill>
-                  <a:srgbClr val="052B48"/>
-                </a:solidFill>
-                <a:latin typeface="Calibri"/>
-                <a:cs typeface="Calibri"/>
-              </a:rPr>
-              <a:t>Parallel I/O using MPI</a:t>
-            </a:r>
-            <a:endParaRPr lang="en-US" sz="5400" b="1" dirty="0">
-              <a:solidFill>
-                <a:srgbClr val="052B48"/>
-              </a:solidFill>
-              <a:latin typeface="Calibri"/>
-              <a:cs typeface="Calibri"/>
-            </a:endParaRPr>
-          </a:p>
-        </p:txBody>
-      </p:sp>
-      <p:sp>
-        <p:nvSpPr>
-          <p:cNvPr id="8" name="Folded Corner 7"/>
-          <p:cNvSpPr/>
-          <p:nvPr/>
-        </p:nvSpPr>
-        <p:spPr>
-          <a:xfrm rot="10800000" flipH="1">
-            <a:off x="3767562" y="2807415"/>
-            <a:ext cx="1419941" cy="1900138"/>
-          </a:xfrm>
-          <a:prstGeom prst="foldedCorner">
-            <a:avLst>
-              <a:gd name="adj" fmla="val 26556"/>
-            </a:avLst>
-          </a:prstGeom>
-          <a:solidFill>
-            <a:srgbClr val="052A48"/>
-          </a:solidFill>
-          <a:ln w="28575" cmpd="sng">
-            <a:solidFill>
-              <a:schemeClr val="bg1"/>
-            </a:solidFill>
-          </a:ln>
-          <a:effectLst/>
-        </p:spPr>
-        <p:style>
-          <a:lnRef idx="1">
-            <a:schemeClr val="accent1"/>
-          </a:lnRef>
-          <a:fillRef idx="3">
-            <a:schemeClr val="accent1"/>
-          </a:fillRef>
-          <a:effectRef idx="2">
-            <a:schemeClr val="accent1"/>
-          </a:effectRef>
-          <a:fontRef idx="minor">
-            <a:schemeClr val="lt1"/>
-          </a:fontRef>
-        </p:style>
-        <p:txBody>
-          <a:bodyPr rtlCol="0" anchor="ctr"/>
-          <a:lstStyle/>
-          <a:p>
-            <a:pPr algn="ctr"/>
-            <a:r>
-              <a:rPr lang="en-US" u="sng" dirty="0" smtClean="0"/>
-              <a:t>																			   </a:t>
-            </a:r>
-            <a:endParaRPr lang="en-US" u="sng" dirty="0"/>
-          </a:p>
-        </p:txBody>
-      </p:sp>
-      <p:grpSp>
-        <p:nvGrpSpPr>
-          <p:cNvPr id="11" name="Group 10"/>
-          <p:cNvGrpSpPr>
-            <a:grpSpLocks noChangeAspect="1"/>
-          </p:cNvGrpSpPr>
-          <p:nvPr/>
-        </p:nvGrpSpPr>
-        <p:grpSpPr>
-          <a:xfrm>
-            <a:off x="3474304" y="2736471"/>
-            <a:ext cx="947929" cy="947929"/>
-            <a:chOff x="2259923" y="2660201"/>
-            <a:chExt cx="1959561" cy="1962561"/>
-          </a:xfrm>
-        </p:grpSpPr>
-        <p:sp>
-          <p:nvSpPr>
-            <p:cNvPr id="18" name="Oval 17"/>
-            <p:cNvSpPr/>
-            <p:nvPr/>
-          </p:nvSpPr>
-          <p:spPr>
-            <a:xfrm>
-              <a:off x="2259923" y="2660201"/>
-              <a:ext cx="1959561" cy="1962561"/>
-            </a:xfrm>
-            <a:prstGeom prst="ellipse">
-              <a:avLst/>
-            </a:prstGeom>
-            <a:solidFill>
-              <a:schemeClr val="bg1"/>
-            </a:solidFill>
-            <a:ln w="76200" cmpd="sng">
-              <a:solidFill>
-                <a:srgbClr val="052A48"/>
-              </a:solidFill>
-            </a:ln>
-            <a:effectLst/>
-          </p:spPr>
-          <p:style>
-            <a:lnRef idx="1">
-              <a:schemeClr val="accent1"/>
-            </a:lnRef>
-            <a:fillRef idx="3">
-              <a:schemeClr val="accent1"/>
-            </a:fillRef>
-            <a:effectRef idx="2">
-              <a:schemeClr val="accent1"/>
-            </a:effectRef>
-            <a:fontRef idx="minor">
-              <a:schemeClr val="lt1"/>
-            </a:fontRef>
-          </p:style>
-          <p:txBody>
-            <a:bodyPr rtlCol="0" anchor="ctr"/>
-            <a:lstStyle/>
-            <a:p>
-              <a:endParaRPr lang="en-US" sz="4400" dirty="0"/>
-            </a:p>
-          </p:txBody>
-        </p:sp>
-        <p:pic>
-          <p:nvPicPr>
-            <p:cNvPr id="19" name="Picture 18" descr="logo_brain_transp_512x512.png"/>
-            <p:cNvPicPr>
-              <a:picLocks noChangeAspect="1"/>
-            </p:cNvPicPr>
-            <p:nvPr/>
-          </p:nvPicPr>
-          <p:blipFill>
-            <a:blip r:embed="rId3">
-              <a:extLst>
-                <a:ext uri="{28A0092B-C50C-407E-A947-70E740481C1C}">
-                  <a14:useLocalDpi xmlns:a14="http://schemas.microsoft.com/office/drawing/2010/main" val="0"/>
-                </a:ext>
-              </a:extLst>
-            </a:blip>
-            <a:stretch>
-              <a:fillRect/>
-            </a:stretch>
-          </p:blipFill>
-          <p:spPr>
-            <a:xfrm>
-              <a:off x="2393887" y="2838486"/>
-              <a:ext cx="1703898" cy="1703898"/>
-            </a:xfrm>
-            <a:prstGeom prst="rect">
-              <a:avLst/>
-            </a:prstGeom>
-          </p:spPr>
-        </p:pic>
-      </p:grpSp>
-      <p:sp>
-        <p:nvSpPr>
-          <p:cNvPr id="21" name="Cube 20"/>
-          <p:cNvSpPr/>
-          <p:nvPr/>
-        </p:nvSpPr>
-        <p:spPr>
-          <a:xfrm>
-            <a:off x="3814099" y="5133421"/>
-            <a:ext cx="1305723" cy="417754"/>
-          </a:xfrm>
-          <a:prstGeom prst="cube">
-            <a:avLst>
-              <a:gd name="adj" fmla="val 11969"/>
-            </a:avLst>
-          </a:prstGeom>
-          <a:solidFill>
-            <a:srgbClr val="052A48"/>
-          </a:solidFill>
-          <a:ln w="9525" cap="flat" cmpd="sng" algn="ctr">
-            <a:solidFill>
-              <a:srgbClr val="FFFFFF"/>
-            </a:solidFill>
-            <a:prstDash val="solid"/>
-          </a:ln>
-          <a:effectLst/>
-        </p:spPr>
-        <p:txBody>
-          <a:bodyPr tIns="0" bIns="45720" rtlCol="0" anchor="ctr" anchorCtr="0"/>
-          <a:lstStyle/>
-          <a:p>
-            <a:pPr marL="0" marR="0" lvl="0" indent="0" algn="ctr" defTabSz="914400" eaLnBrk="1" fontAlgn="auto" latinLnBrk="0" hangingPunct="1">
-              <a:lnSpc>
-                <a:spcPct val="100000"/>
-              </a:lnSpc>
-              <a:spcBef>
-                <a:spcPts val="0"/>
-              </a:spcBef>
-              <a:spcAft>
-                <a:spcPts val="0"/>
-              </a:spcAft>
-              <a:buClrTx/>
-              <a:buSzTx/>
-              <a:buFontTx/>
-              <a:buNone/>
-              <a:tabLst/>
-              <a:defRPr/>
-            </a:pPr>
-            <a:r>
-              <a:rPr kumimoji="0" lang="en-US" sz="1800" i="0" u="none" strike="noStrike" kern="0" cap="none" spc="0" normalizeH="0" baseline="0" noProof="0" dirty="0" err="1" smtClean="0">
-                <a:ln>
-                  <a:noFill/>
-                </a:ln>
-                <a:solidFill>
-                  <a:schemeClr val="bg1">
-                    <a:lumMod val="85000"/>
-                  </a:schemeClr>
-                </a:solidFill>
-                <a:effectLst/>
-                <a:uLnTx/>
-                <a:uFillTx/>
-                <a:latin typeface="Calibri"/>
-                <a:ea typeface="+mn-ea"/>
-                <a:cs typeface="+mn-cs"/>
-              </a:rPr>
-              <a:t>PyNWB</a:t>
-            </a:r>
-            <a:endParaRPr kumimoji="0" lang="en-US" sz="1800" i="0" u="none" strike="noStrike" kern="0" cap="none" spc="0" normalizeH="0" baseline="0" noProof="0" dirty="0">
-              <a:ln>
-                <a:noFill/>
-              </a:ln>
-              <a:solidFill>
-                <a:schemeClr val="bg1">
-                  <a:lumMod val="85000"/>
-                </a:schemeClr>
-              </a:solidFill>
-              <a:effectLst/>
-              <a:uLnTx/>
-              <a:uFillTx/>
-              <a:latin typeface="Calibri"/>
-              <a:ea typeface="+mn-ea"/>
-              <a:cs typeface="+mn-cs"/>
-            </a:endParaRPr>
-          </a:p>
-        </p:txBody>
-      </p:sp>
-      <p:sp>
-        <p:nvSpPr>
-          <p:cNvPr id="25" name="Cube 24"/>
-          <p:cNvSpPr/>
-          <p:nvPr/>
-        </p:nvSpPr>
-        <p:spPr>
-          <a:xfrm>
-            <a:off x="3820720" y="1947059"/>
-            <a:ext cx="1305723" cy="417754"/>
-          </a:xfrm>
-          <a:prstGeom prst="cube">
-            <a:avLst>
-              <a:gd name="adj" fmla="val 11969"/>
-            </a:avLst>
-          </a:prstGeom>
-          <a:solidFill>
-            <a:srgbClr val="052A48"/>
-          </a:solidFill>
-          <a:ln w="9525" cap="flat" cmpd="sng" algn="ctr">
-            <a:solidFill>
-              <a:srgbClr val="FFFFFF"/>
-            </a:solidFill>
-            <a:prstDash val="solid"/>
-          </a:ln>
-          <a:effectLst/>
-        </p:spPr>
-        <p:txBody>
-          <a:bodyPr tIns="0" bIns="45720" rtlCol="0" anchor="ctr" anchorCtr="0"/>
-          <a:lstStyle/>
-          <a:p>
-            <a:pPr marL="0" marR="0" lvl="0" indent="0" algn="ctr" defTabSz="914400" eaLnBrk="1" fontAlgn="auto" latinLnBrk="0" hangingPunct="1">
-              <a:lnSpc>
-                <a:spcPct val="100000"/>
-              </a:lnSpc>
-              <a:spcBef>
-                <a:spcPts val="0"/>
-              </a:spcBef>
-              <a:spcAft>
-                <a:spcPts val="0"/>
-              </a:spcAft>
-              <a:buClrTx/>
-              <a:buSzTx/>
-              <a:buFontTx/>
-              <a:buNone/>
-              <a:tabLst/>
-              <a:defRPr/>
-            </a:pPr>
-            <a:r>
-              <a:rPr kumimoji="0" lang="en-US" sz="1800" i="0" u="none" strike="noStrike" kern="0" cap="none" spc="0" normalizeH="0" baseline="0" noProof="0" dirty="0" err="1" smtClean="0">
-                <a:ln>
-                  <a:noFill/>
-                </a:ln>
-                <a:solidFill>
-                  <a:schemeClr val="bg1">
-                    <a:lumMod val="85000"/>
-                  </a:schemeClr>
-                </a:solidFill>
-                <a:effectLst/>
-                <a:uLnTx/>
-                <a:uFillTx/>
-                <a:latin typeface="Calibri"/>
-                <a:ea typeface="+mn-ea"/>
-                <a:cs typeface="+mn-cs"/>
-              </a:rPr>
-              <a:t>PyNWB</a:t>
-            </a:r>
-            <a:endParaRPr kumimoji="0" lang="en-US" sz="1800" i="0" u="none" strike="noStrike" kern="0" cap="none" spc="0" normalizeH="0" baseline="0" noProof="0" dirty="0">
-              <a:ln>
-                <a:noFill/>
-              </a:ln>
-              <a:solidFill>
-                <a:schemeClr val="bg1">
-                  <a:lumMod val="85000"/>
-                </a:schemeClr>
-              </a:solidFill>
-              <a:effectLst/>
-              <a:uLnTx/>
-              <a:uFillTx/>
-              <a:latin typeface="Calibri"/>
-              <a:ea typeface="+mn-ea"/>
-              <a:cs typeface="+mn-cs"/>
-            </a:endParaRPr>
-          </a:p>
-        </p:txBody>
-      </p:sp>
-      <p:sp>
-        <p:nvSpPr>
-          <p:cNvPr id="28" name="Cube 27"/>
-          <p:cNvSpPr/>
-          <p:nvPr/>
-        </p:nvSpPr>
-        <p:spPr>
-          <a:xfrm>
-            <a:off x="1161722" y="3519384"/>
-            <a:ext cx="1305723" cy="417754"/>
-          </a:xfrm>
-          <a:prstGeom prst="cube">
-            <a:avLst>
-              <a:gd name="adj" fmla="val 11969"/>
-            </a:avLst>
-          </a:prstGeom>
-          <a:solidFill>
-            <a:srgbClr val="052A48"/>
-          </a:solidFill>
-          <a:ln w="9525" cap="flat" cmpd="sng" algn="ctr">
-            <a:solidFill>
-              <a:srgbClr val="FFFFFF"/>
-            </a:solidFill>
-            <a:prstDash val="solid"/>
-          </a:ln>
-          <a:effectLst/>
-        </p:spPr>
-        <p:txBody>
-          <a:bodyPr tIns="0" bIns="45720" rtlCol="0" anchor="ctr" anchorCtr="0"/>
-          <a:lstStyle/>
-          <a:p>
-            <a:pPr marL="0" marR="0" lvl="0" indent="0" algn="ctr" defTabSz="914400" eaLnBrk="1" fontAlgn="auto" latinLnBrk="0" hangingPunct="1">
-              <a:lnSpc>
-                <a:spcPct val="100000"/>
-              </a:lnSpc>
-              <a:spcBef>
-                <a:spcPts val="0"/>
-              </a:spcBef>
-              <a:spcAft>
-                <a:spcPts val="0"/>
-              </a:spcAft>
-              <a:buClrTx/>
-              <a:buSzTx/>
-              <a:buFontTx/>
-              <a:buNone/>
-              <a:tabLst/>
-              <a:defRPr/>
-            </a:pPr>
-            <a:r>
-              <a:rPr kumimoji="0" lang="en-US" sz="1800" i="0" u="none" strike="noStrike" kern="0" cap="none" spc="0" normalizeH="0" baseline="0" noProof="0" dirty="0" err="1" smtClean="0">
-                <a:ln>
-                  <a:noFill/>
-                </a:ln>
-                <a:solidFill>
-                  <a:schemeClr val="bg1">
-                    <a:lumMod val="85000"/>
-                  </a:schemeClr>
-                </a:solidFill>
-                <a:effectLst/>
-                <a:uLnTx/>
-                <a:uFillTx/>
-                <a:latin typeface="Calibri"/>
-                <a:ea typeface="+mn-ea"/>
-                <a:cs typeface="+mn-cs"/>
-              </a:rPr>
-              <a:t>PyNWB</a:t>
-            </a:r>
-            <a:endParaRPr kumimoji="0" lang="en-US" sz="1800" i="0" u="none" strike="noStrike" kern="0" cap="none" spc="0" normalizeH="0" baseline="0" noProof="0" dirty="0">
-              <a:ln>
-                <a:noFill/>
-              </a:ln>
-              <a:solidFill>
-                <a:schemeClr val="bg1">
-                  <a:lumMod val="85000"/>
-                </a:schemeClr>
-              </a:solidFill>
-              <a:effectLst/>
-              <a:uLnTx/>
-              <a:uFillTx/>
-              <a:latin typeface="Calibri"/>
-              <a:ea typeface="+mn-ea"/>
-              <a:cs typeface="+mn-cs"/>
-            </a:endParaRPr>
-          </a:p>
-        </p:txBody>
-      </p:sp>
-      <p:sp>
-        <p:nvSpPr>
-          <p:cNvPr id="30" name="Cube 29"/>
-          <p:cNvSpPr/>
-          <p:nvPr/>
-        </p:nvSpPr>
-        <p:spPr>
-          <a:xfrm>
-            <a:off x="6559614" y="3519900"/>
-            <a:ext cx="1305723" cy="417754"/>
-          </a:xfrm>
-          <a:prstGeom prst="cube">
-            <a:avLst>
-              <a:gd name="adj" fmla="val 11969"/>
-            </a:avLst>
-          </a:prstGeom>
-          <a:solidFill>
-            <a:srgbClr val="052A48"/>
-          </a:solidFill>
-          <a:ln w="9525" cap="flat" cmpd="sng" algn="ctr">
-            <a:solidFill>
-              <a:srgbClr val="FFFFFF"/>
-            </a:solidFill>
-            <a:prstDash val="solid"/>
-          </a:ln>
-          <a:effectLst/>
-        </p:spPr>
-        <p:txBody>
-          <a:bodyPr tIns="0" bIns="45720" rtlCol="0" anchor="ctr" anchorCtr="0"/>
-          <a:lstStyle/>
-          <a:p>
-            <a:pPr marL="0" marR="0" lvl="0" indent="0" algn="ctr" defTabSz="914400" eaLnBrk="1" fontAlgn="auto" latinLnBrk="0" hangingPunct="1">
-              <a:lnSpc>
-                <a:spcPct val="100000"/>
-              </a:lnSpc>
-              <a:spcBef>
-                <a:spcPts val="0"/>
-              </a:spcBef>
-              <a:spcAft>
-                <a:spcPts val="0"/>
-              </a:spcAft>
-              <a:buClrTx/>
-              <a:buSzTx/>
-              <a:buFontTx/>
-              <a:buNone/>
-              <a:tabLst/>
-              <a:defRPr/>
-            </a:pPr>
-            <a:r>
-              <a:rPr kumimoji="0" lang="en-US" sz="1800" i="0" u="none" strike="noStrike" kern="0" cap="none" spc="0" normalizeH="0" baseline="0" noProof="0" dirty="0" err="1" smtClean="0">
-                <a:ln>
-                  <a:noFill/>
-                </a:ln>
-                <a:solidFill>
-                  <a:schemeClr val="bg1">
-                    <a:lumMod val="85000"/>
-                  </a:schemeClr>
-                </a:solidFill>
-                <a:effectLst/>
-                <a:uLnTx/>
-                <a:uFillTx/>
-                <a:latin typeface="Calibri"/>
-                <a:ea typeface="+mn-ea"/>
-                <a:cs typeface="+mn-cs"/>
-              </a:rPr>
-              <a:t>PyNWB</a:t>
-            </a:r>
-            <a:endParaRPr kumimoji="0" lang="en-US" sz="1800" i="0" u="none" strike="noStrike" kern="0" cap="none" spc="0" normalizeH="0" baseline="0" noProof="0" dirty="0">
-              <a:ln>
-                <a:noFill/>
-              </a:ln>
-              <a:solidFill>
-                <a:schemeClr val="bg1">
-                  <a:lumMod val="85000"/>
-                </a:schemeClr>
-              </a:solidFill>
-              <a:effectLst/>
-              <a:uLnTx/>
-              <a:uFillTx/>
-              <a:latin typeface="Calibri"/>
-              <a:ea typeface="+mn-ea"/>
-              <a:cs typeface="+mn-cs"/>
-            </a:endParaRPr>
-          </a:p>
-        </p:txBody>
-      </p:sp>
-      <p:sp>
-        <p:nvSpPr>
-          <p:cNvPr id="34" name="Left Arrow 33"/>
-          <p:cNvSpPr/>
-          <p:nvPr/>
-        </p:nvSpPr>
-        <p:spPr>
-          <a:xfrm rot="5400000" flipV="1">
-            <a:off x="4269649" y="4783832"/>
-            <a:ext cx="416341" cy="268194"/>
-          </a:xfrm>
-          <a:prstGeom prst="leftArrow">
-            <a:avLst>
-              <a:gd name="adj1" fmla="val 46274"/>
-              <a:gd name="adj2" fmla="val 50000"/>
-            </a:avLst>
-          </a:prstGeom>
-          <a:solidFill>
-            <a:srgbClr val="052A48"/>
-          </a:solidFill>
-          <a:ln w="9525" cmpd="sng">
-            <a:solidFill>
-              <a:srgbClr val="FFFFFF"/>
-            </a:solidFill>
-          </a:ln>
-        </p:spPr>
-        <p:style>
-          <a:lnRef idx="0">
-            <a:schemeClr val="accent1">
-              <a:tint val="60000"/>
-              <a:hueOff val="0"/>
-              <a:satOff val="0"/>
-              <a:lumOff val="0"/>
-              <a:alphaOff val="0"/>
-            </a:schemeClr>
-          </a:lnRef>
-          <a:fillRef idx="1">
-            <a:schemeClr val="accent1">
-              <a:tint val="60000"/>
-              <a:hueOff val="0"/>
-              <a:satOff val="0"/>
-              <a:lumOff val="0"/>
-              <a:alphaOff val="0"/>
-            </a:schemeClr>
-          </a:fillRef>
-          <a:effectRef idx="0">
-            <a:schemeClr val="accent1">
-              <a:tint val="60000"/>
-              <a:hueOff val="0"/>
-              <a:satOff val="0"/>
-              <a:lumOff val="0"/>
-              <a:alphaOff val="0"/>
-            </a:schemeClr>
-          </a:effectRef>
-          <a:fontRef idx="minor">
-            <a:schemeClr val="lt1"/>
-          </a:fontRef>
-        </p:style>
-      </p:sp>
-      <p:sp>
-        <p:nvSpPr>
-          <p:cNvPr id="35" name="Left Arrow 34"/>
-          <p:cNvSpPr/>
-          <p:nvPr/>
-        </p:nvSpPr>
-        <p:spPr>
-          <a:xfrm rot="16200000" flipV="1">
-            <a:off x="4270167" y="2451408"/>
-            <a:ext cx="416341" cy="268194"/>
-          </a:xfrm>
-          <a:prstGeom prst="leftArrow">
-            <a:avLst>
-              <a:gd name="adj1" fmla="val 46274"/>
-              <a:gd name="adj2" fmla="val 50000"/>
-            </a:avLst>
-          </a:prstGeom>
-          <a:solidFill>
-            <a:srgbClr val="052A48"/>
-          </a:solidFill>
-          <a:ln w="9525" cmpd="sng">
-            <a:solidFill>
-              <a:srgbClr val="FFFFFF"/>
-            </a:solidFill>
-          </a:ln>
-        </p:spPr>
-        <p:style>
-          <a:lnRef idx="0">
-            <a:schemeClr val="accent1">
-              <a:tint val="60000"/>
-              <a:hueOff val="0"/>
-              <a:satOff val="0"/>
-              <a:lumOff val="0"/>
-              <a:alphaOff val="0"/>
-            </a:schemeClr>
-          </a:lnRef>
-          <a:fillRef idx="1">
-            <a:schemeClr val="accent1">
-              <a:tint val="60000"/>
-              <a:hueOff val="0"/>
-              <a:satOff val="0"/>
-              <a:lumOff val="0"/>
-              <a:alphaOff val="0"/>
-            </a:schemeClr>
-          </a:fillRef>
-          <a:effectRef idx="0">
-            <a:schemeClr val="accent1">
-              <a:tint val="60000"/>
-              <a:hueOff val="0"/>
-              <a:satOff val="0"/>
-              <a:lumOff val="0"/>
-              <a:alphaOff val="0"/>
-            </a:schemeClr>
-          </a:effectRef>
-          <a:fontRef idx="minor">
-            <a:schemeClr val="lt1"/>
-          </a:fontRef>
-        </p:style>
-      </p:sp>
-      <p:sp>
-        <p:nvSpPr>
-          <p:cNvPr id="36" name="Left Arrow 35"/>
-          <p:cNvSpPr/>
-          <p:nvPr/>
-        </p:nvSpPr>
-        <p:spPr>
-          <a:xfrm rot="10800000" flipV="1">
-            <a:off x="2466969" y="3606941"/>
-            <a:ext cx="1186546" cy="268194"/>
-          </a:xfrm>
-          <a:prstGeom prst="leftArrow">
-            <a:avLst>
-              <a:gd name="adj1" fmla="val 46274"/>
-              <a:gd name="adj2" fmla="val 50000"/>
-            </a:avLst>
-          </a:prstGeom>
-          <a:solidFill>
-            <a:srgbClr val="052A48"/>
-          </a:solidFill>
-          <a:ln w="9525" cmpd="sng">
-            <a:solidFill>
-              <a:srgbClr val="FFFFFF"/>
-            </a:solidFill>
-          </a:ln>
-        </p:spPr>
-        <p:style>
-          <a:lnRef idx="0">
-            <a:schemeClr val="accent1">
-              <a:tint val="60000"/>
-              <a:hueOff val="0"/>
-              <a:satOff val="0"/>
-              <a:lumOff val="0"/>
-              <a:alphaOff val="0"/>
-            </a:schemeClr>
-          </a:lnRef>
-          <a:fillRef idx="1">
-            <a:schemeClr val="accent1">
-              <a:tint val="60000"/>
-              <a:hueOff val="0"/>
-              <a:satOff val="0"/>
-              <a:lumOff val="0"/>
-              <a:alphaOff val="0"/>
-            </a:schemeClr>
-          </a:fillRef>
-          <a:effectRef idx="0">
-            <a:schemeClr val="accent1">
-              <a:tint val="60000"/>
-              <a:hueOff val="0"/>
-              <a:satOff val="0"/>
-              <a:lumOff val="0"/>
-              <a:alphaOff val="0"/>
-            </a:schemeClr>
-          </a:effectRef>
-          <a:fontRef idx="minor">
-            <a:schemeClr val="lt1"/>
-          </a:fontRef>
-        </p:style>
-      </p:sp>
-      <p:sp>
-        <p:nvSpPr>
-          <p:cNvPr id="37" name="Left Arrow 36"/>
-          <p:cNvSpPr/>
-          <p:nvPr/>
-        </p:nvSpPr>
-        <p:spPr>
-          <a:xfrm rot="10800000" flipH="1" flipV="1">
-            <a:off x="5259407" y="3607490"/>
-            <a:ext cx="1288946" cy="268194"/>
-          </a:xfrm>
-          <a:prstGeom prst="leftArrow">
-            <a:avLst>
-              <a:gd name="adj1" fmla="val 46274"/>
-              <a:gd name="adj2" fmla="val 50000"/>
-            </a:avLst>
-          </a:prstGeom>
-          <a:solidFill>
-            <a:srgbClr val="052A48"/>
-          </a:solidFill>
-          <a:ln w="9525" cmpd="sng">
-            <a:solidFill>
-              <a:srgbClr val="FFFFFF"/>
-            </a:solidFill>
-          </a:ln>
-        </p:spPr>
-        <p:style>
-          <a:lnRef idx="0">
-            <a:schemeClr val="accent1">
-              <a:tint val="60000"/>
-              <a:hueOff val="0"/>
-              <a:satOff val="0"/>
-              <a:lumOff val="0"/>
-              <a:alphaOff val="0"/>
-            </a:schemeClr>
-          </a:lnRef>
-          <a:fillRef idx="1">
-            <a:schemeClr val="accent1">
-              <a:tint val="60000"/>
-              <a:hueOff val="0"/>
-              <a:satOff val="0"/>
-              <a:lumOff val="0"/>
-              <a:alphaOff val="0"/>
-            </a:schemeClr>
-          </a:fillRef>
-          <a:effectRef idx="0">
-            <a:schemeClr val="accent1">
-              <a:tint val="60000"/>
-              <a:hueOff val="0"/>
-              <a:satOff val="0"/>
-              <a:lumOff val="0"/>
-              <a:alphaOff val="0"/>
-            </a:schemeClr>
-          </a:effectRef>
-          <a:fontRef idx="minor">
-            <a:schemeClr val="lt1"/>
-          </a:fontRef>
-        </p:style>
-      </p:sp>
-      <p:sp>
-        <p:nvSpPr>
-          <p:cNvPr id="38" name="Left Arrow 37"/>
-          <p:cNvSpPr/>
-          <p:nvPr/>
-        </p:nvSpPr>
-        <p:spPr>
-          <a:xfrm rot="8743586" flipV="1">
-            <a:off x="2696659" y="4338309"/>
-            <a:ext cx="1101907" cy="268194"/>
-          </a:xfrm>
-          <a:prstGeom prst="leftArrow">
-            <a:avLst>
-              <a:gd name="adj1" fmla="val 46274"/>
-              <a:gd name="adj2" fmla="val 50000"/>
-            </a:avLst>
-          </a:prstGeom>
-          <a:solidFill>
-            <a:srgbClr val="052A48"/>
-          </a:solidFill>
-          <a:ln w="9525" cmpd="sng">
-            <a:solidFill>
-              <a:srgbClr val="FFFFFF"/>
-            </a:solidFill>
-          </a:ln>
-        </p:spPr>
-        <p:style>
-          <a:lnRef idx="0">
-            <a:schemeClr val="accent1">
-              <a:tint val="60000"/>
-              <a:hueOff val="0"/>
-              <a:satOff val="0"/>
-              <a:lumOff val="0"/>
-              <a:alphaOff val="0"/>
-            </a:schemeClr>
-          </a:lnRef>
-          <a:fillRef idx="1">
-            <a:schemeClr val="accent1">
-              <a:tint val="60000"/>
-              <a:hueOff val="0"/>
-              <a:satOff val="0"/>
-              <a:lumOff val="0"/>
-              <a:alphaOff val="0"/>
-            </a:schemeClr>
-          </a:fillRef>
-          <a:effectRef idx="0">
-            <a:schemeClr val="accent1">
-              <a:tint val="60000"/>
-              <a:hueOff val="0"/>
-              <a:satOff val="0"/>
-              <a:lumOff val="0"/>
-              <a:alphaOff val="0"/>
-            </a:schemeClr>
-          </a:effectRef>
-          <a:fontRef idx="minor">
-            <a:schemeClr val="lt1"/>
-          </a:fontRef>
-        </p:style>
-      </p:sp>
-      <p:sp>
-        <p:nvSpPr>
-          <p:cNvPr id="17" name="Cube 16"/>
-          <p:cNvSpPr/>
-          <p:nvPr/>
-        </p:nvSpPr>
-        <p:spPr>
-          <a:xfrm>
-            <a:off x="1928718" y="4729655"/>
-            <a:ext cx="1305723" cy="417754"/>
-          </a:xfrm>
-          <a:prstGeom prst="cube">
-            <a:avLst>
-              <a:gd name="adj" fmla="val 11969"/>
-            </a:avLst>
-          </a:prstGeom>
-          <a:solidFill>
-            <a:srgbClr val="052A48"/>
-          </a:solidFill>
-          <a:ln w="9525" cap="flat" cmpd="sng" algn="ctr">
-            <a:solidFill>
-              <a:srgbClr val="FFFFFF"/>
-            </a:solidFill>
-            <a:prstDash val="solid"/>
-          </a:ln>
-          <a:effectLst/>
-        </p:spPr>
-        <p:txBody>
-          <a:bodyPr tIns="0" bIns="45720" rtlCol="0" anchor="ctr" anchorCtr="0"/>
-          <a:lstStyle/>
-          <a:p>
-            <a:pPr marL="0" marR="0" lvl="0" indent="0" algn="ctr" defTabSz="914400" eaLnBrk="1" fontAlgn="auto" latinLnBrk="0" hangingPunct="1">
-              <a:lnSpc>
-                <a:spcPct val="100000"/>
-              </a:lnSpc>
-              <a:spcBef>
-                <a:spcPts val="0"/>
-              </a:spcBef>
-              <a:spcAft>
-                <a:spcPts val="0"/>
-              </a:spcAft>
-              <a:buClrTx/>
-              <a:buSzTx/>
-              <a:buFontTx/>
-              <a:buNone/>
-              <a:tabLst/>
-              <a:defRPr/>
-            </a:pPr>
-            <a:r>
-              <a:rPr kumimoji="0" lang="en-US" sz="1800" i="0" u="none" strike="noStrike" kern="0" cap="none" spc="0" normalizeH="0" baseline="0" noProof="0" dirty="0" err="1" smtClean="0">
-                <a:ln>
-                  <a:noFill/>
-                </a:ln>
-                <a:solidFill>
-                  <a:schemeClr val="bg1">
-                    <a:lumMod val="85000"/>
-                  </a:schemeClr>
-                </a:solidFill>
-                <a:effectLst/>
-                <a:uLnTx/>
-                <a:uFillTx/>
-                <a:latin typeface="Calibri"/>
-                <a:ea typeface="+mn-ea"/>
-                <a:cs typeface="+mn-cs"/>
-              </a:rPr>
-              <a:t>PyNWB</a:t>
-            </a:r>
-            <a:endParaRPr kumimoji="0" lang="en-US" sz="1800" i="0" u="none" strike="noStrike" kern="0" cap="none" spc="0" normalizeH="0" baseline="0" noProof="0" dirty="0">
-              <a:ln>
-                <a:noFill/>
-              </a:ln>
-              <a:solidFill>
-                <a:schemeClr val="bg1">
-                  <a:lumMod val="85000"/>
-                </a:schemeClr>
-              </a:solidFill>
-              <a:effectLst/>
-              <a:uLnTx/>
-              <a:uFillTx/>
-              <a:latin typeface="Calibri"/>
-              <a:ea typeface="+mn-ea"/>
-              <a:cs typeface="+mn-cs"/>
-            </a:endParaRPr>
-          </a:p>
-        </p:txBody>
-      </p:sp>
-      <p:sp>
-        <p:nvSpPr>
-          <p:cNvPr id="39" name="Left Arrow 38"/>
-          <p:cNvSpPr/>
-          <p:nvPr/>
-        </p:nvSpPr>
-        <p:spPr>
-          <a:xfrm rot="12856414" flipH="1" flipV="1">
-            <a:off x="5163566" y="4334257"/>
-            <a:ext cx="1101907" cy="268194"/>
-          </a:xfrm>
-          <a:prstGeom prst="leftArrow">
-            <a:avLst>
-              <a:gd name="adj1" fmla="val 46274"/>
-              <a:gd name="adj2" fmla="val 50000"/>
-            </a:avLst>
-          </a:prstGeom>
-          <a:solidFill>
-            <a:srgbClr val="052A48"/>
-          </a:solidFill>
-          <a:ln w="9525" cmpd="sng">
-            <a:solidFill>
-              <a:srgbClr val="FFFFFF"/>
-            </a:solidFill>
-          </a:ln>
-        </p:spPr>
-        <p:style>
-          <a:lnRef idx="0">
-            <a:schemeClr val="accent1">
-              <a:tint val="60000"/>
-              <a:hueOff val="0"/>
-              <a:satOff val="0"/>
-              <a:lumOff val="0"/>
-              <a:alphaOff val="0"/>
-            </a:schemeClr>
-          </a:lnRef>
-          <a:fillRef idx="1">
-            <a:schemeClr val="accent1">
-              <a:tint val="60000"/>
-              <a:hueOff val="0"/>
-              <a:satOff val="0"/>
-              <a:lumOff val="0"/>
-              <a:alphaOff val="0"/>
-            </a:schemeClr>
-          </a:fillRef>
-          <a:effectRef idx="0">
-            <a:schemeClr val="accent1">
-              <a:tint val="60000"/>
-              <a:hueOff val="0"/>
-              <a:satOff val="0"/>
-              <a:lumOff val="0"/>
-              <a:alphaOff val="0"/>
-            </a:schemeClr>
-          </a:effectRef>
-          <a:fontRef idx="minor">
-            <a:schemeClr val="lt1"/>
-          </a:fontRef>
-        </p:style>
-      </p:sp>
-      <p:sp>
-        <p:nvSpPr>
-          <p:cNvPr id="31" name="Cube 30"/>
-          <p:cNvSpPr/>
-          <p:nvPr/>
-        </p:nvSpPr>
-        <p:spPr>
-          <a:xfrm>
-            <a:off x="5666114" y="4729913"/>
-            <a:ext cx="1305723" cy="417754"/>
-          </a:xfrm>
-          <a:prstGeom prst="cube">
-            <a:avLst>
-              <a:gd name="adj" fmla="val 11969"/>
-            </a:avLst>
-          </a:prstGeom>
-          <a:solidFill>
-            <a:srgbClr val="052A48"/>
-          </a:solidFill>
-          <a:ln w="9525" cap="flat" cmpd="sng" algn="ctr">
-            <a:solidFill>
-              <a:srgbClr val="FFFFFF"/>
-            </a:solidFill>
-            <a:prstDash val="solid"/>
-          </a:ln>
-          <a:effectLst/>
-        </p:spPr>
-        <p:txBody>
-          <a:bodyPr tIns="0" bIns="45720" rtlCol="0" anchor="ctr" anchorCtr="0"/>
-          <a:lstStyle/>
-          <a:p>
-            <a:pPr marL="0" marR="0" lvl="0" indent="0" algn="ctr" defTabSz="914400" eaLnBrk="1" fontAlgn="auto" latinLnBrk="0" hangingPunct="1">
-              <a:lnSpc>
-                <a:spcPct val="100000"/>
-              </a:lnSpc>
-              <a:spcBef>
-                <a:spcPts val="0"/>
-              </a:spcBef>
-              <a:spcAft>
-                <a:spcPts val="0"/>
-              </a:spcAft>
-              <a:buClrTx/>
-              <a:buSzTx/>
-              <a:buFontTx/>
-              <a:buNone/>
-              <a:tabLst/>
-              <a:defRPr/>
-            </a:pPr>
-            <a:r>
-              <a:rPr kumimoji="0" lang="en-US" sz="1800" i="0" u="none" strike="noStrike" kern="0" cap="none" spc="0" normalizeH="0" baseline="0" noProof="0" dirty="0" err="1" smtClean="0">
-                <a:ln>
-                  <a:noFill/>
-                </a:ln>
-                <a:solidFill>
-                  <a:schemeClr val="bg1">
-                    <a:lumMod val="85000"/>
-                  </a:schemeClr>
-                </a:solidFill>
-                <a:effectLst/>
-                <a:uLnTx/>
-                <a:uFillTx/>
-                <a:latin typeface="Calibri"/>
-                <a:ea typeface="+mn-ea"/>
-                <a:cs typeface="+mn-cs"/>
-              </a:rPr>
-              <a:t>PyNWB</a:t>
-            </a:r>
-            <a:endParaRPr kumimoji="0" lang="en-US" sz="1800" i="0" u="none" strike="noStrike" kern="0" cap="none" spc="0" normalizeH="0" baseline="0" noProof="0" dirty="0">
-              <a:ln>
-                <a:noFill/>
-              </a:ln>
-              <a:solidFill>
-                <a:schemeClr val="bg1">
-                  <a:lumMod val="85000"/>
-                </a:schemeClr>
-              </a:solidFill>
-              <a:effectLst/>
-              <a:uLnTx/>
-              <a:uFillTx/>
-              <a:latin typeface="Calibri"/>
-              <a:ea typeface="+mn-ea"/>
-              <a:cs typeface="+mn-cs"/>
-            </a:endParaRPr>
-          </a:p>
-        </p:txBody>
-      </p:sp>
-      <p:sp>
-        <p:nvSpPr>
-          <p:cNvPr id="40" name="Left Arrow 39"/>
-          <p:cNvSpPr/>
-          <p:nvPr/>
-        </p:nvSpPr>
-        <p:spPr>
-          <a:xfrm rot="8743586" flipH="1">
-            <a:off x="5164119" y="2908337"/>
-            <a:ext cx="1101907" cy="268194"/>
-          </a:xfrm>
-          <a:prstGeom prst="leftArrow">
-            <a:avLst>
-              <a:gd name="adj1" fmla="val 46274"/>
-              <a:gd name="adj2" fmla="val 50000"/>
-            </a:avLst>
-          </a:prstGeom>
-          <a:solidFill>
-            <a:srgbClr val="052A48"/>
-          </a:solidFill>
-          <a:ln w="9525" cmpd="sng">
-            <a:solidFill>
-              <a:srgbClr val="FFFFFF"/>
-            </a:solidFill>
-          </a:ln>
-        </p:spPr>
-        <p:style>
-          <a:lnRef idx="0">
-            <a:schemeClr val="accent1">
-              <a:tint val="60000"/>
-              <a:hueOff val="0"/>
-              <a:satOff val="0"/>
-              <a:lumOff val="0"/>
-              <a:alphaOff val="0"/>
-            </a:schemeClr>
-          </a:lnRef>
-          <a:fillRef idx="1">
-            <a:schemeClr val="accent1">
-              <a:tint val="60000"/>
-              <a:hueOff val="0"/>
-              <a:satOff val="0"/>
-              <a:lumOff val="0"/>
-              <a:alphaOff val="0"/>
-            </a:schemeClr>
-          </a:fillRef>
-          <a:effectRef idx="0">
-            <a:schemeClr val="accent1">
-              <a:tint val="60000"/>
-              <a:hueOff val="0"/>
-              <a:satOff val="0"/>
-              <a:lumOff val="0"/>
-              <a:alphaOff val="0"/>
-            </a:schemeClr>
-          </a:effectRef>
-          <a:fontRef idx="minor">
-            <a:schemeClr val="lt1"/>
-          </a:fontRef>
-        </p:style>
-      </p:sp>
-      <p:sp>
-        <p:nvSpPr>
-          <p:cNvPr id="32" name="Cube 31"/>
-          <p:cNvSpPr/>
-          <p:nvPr/>
-        </p:nvSpPr>
-        <p:spPr>
-          <a:xfrm>
-            <a:off x="5666652" y="2395368"/>
-            <a:ext cx="1305723" cy="417754"/>
-          </a:xfrm>
-          <a:prstGeom prst="cube">
-            <a:avLst>
-              <a:gd name="adj" fmla="val 11969"/>
-            </a:avLst>
-          </a:prstGeom>
-          <a:solidFill>
-            <a:srgbClr val="052A48"/>
-          </a:solidFill>
-          <a:ln w="9525" cap="flat" cmpd="sng" algn="ctr">
-            <a:solidFill>
-              <a:srgbClr val="FFFFFF"/>
-            </a:solidFill>
-            <a:prstDash val="solid"/>
-          </a:ln>
-          <a:effectLst/>
-        </p:spPr>
-        <p:txBody>
-          <a:bodyPr tIns="0" bIns="45720" rtlCol="0" anchor="ctr" anchorCtr="0"/>
-          <a:lstStyle/>
-          <a:p>
-            <a:pPr marL="0" marR="0" lvl="0" indent="0" algn="ctr" defTabSz="914400" eaLnBrk="1" fontAlgn="auto" latinLnBrk="0" hangingPunct="1">
-              <a:lnSpc>
-                <a:spcPct val="100000"/>
-              </a:lnSpc>
-              <a:spcBef>
-                <a:spcPts val="0"/>
-              </a:spcBef>
-              <a:spcAft>
-                <a:spcPts val="0"/>
-              </a:spcAft>
-              <a:buClrTx/>
-              <a:buSzTx/>
-              <a:buFontTx/>
-              <a:buNone/>
-              <a:tabLst/>
-              <a:defRPr/>
-            </a:pPr>
-            <a:r>
-              <a:rPr kumimoji="0" lang="en-US" sz="1800" i="0" u="none" strike="noStrike" kern="0" cap="none" spc="0" normalizeH="0" baseline="0" noProof="0" dirty="0" err="1" smtClean="0">
-                <a:ln>
-                  <a:noFill/>
-                </a:ln>
-                <a:solidFill>
-                  <a:schemeClr val="bg1">
-                    <a:lumMod val="85000"/>
-                  </a:schemeClr>
-                </a:solidFill>
-                <a:effectLst/>
-                <a:uLnTx/>
-                <a:uFillTx/>
-                <a:latin typeface="Calibri"/>
-                <a:ea typeface="+mn-ea"/>
-                <a:cs typeface="+mn-cs"/>
-              </a:rPr>
-              <a:t>PyNWB</a:t>
-            </a:r>
-            <a:endParaRPr kumimoji="0" lang="en-US" sz="1800" i="0" u="none" strike="noStrike" kern="0" cap="none" spc="0" normalizeH="0" baseline="0" noProof="0" dirty="0">
-              <a:ln>
-                <a:noFill/>
-              </a:ln>
-              <a:solidFill>
-                <a:schemeClr val="bg1">
-                  <a:lumMod val="85000"/>
-                </a:schemeClr>
-              </a:solidFill>
-              <a:effectLst/>
-              <a:uLnTx/>
-              <a:uFillTx/>
-              <a:latin typeface="Calibri"/>
-              <a:ea typeface="+mn-ea"/>
-              <a:cs typeface="+mn-cs"/>
-            </a:endParaRPr>
-          </a:p>
-        </p:txBody>
-      </p:sp>
-      <p:sp>
-        <p:nvSpPr>
-          <p:cNvPr id="41" name="Left Arrow 40"/>
-          <p:cNvSpPr/>
-          <p:nvPr/>
-        </p:nvSpPr>
-        <p:spPr>
-          <a:xfrm rot="12856414">
-            <a:off x="2527004" y="2826537"/>
-            <a:ext cx="936787" cy="268194"/>
-          </a:xfrm>
-          <a:prstGeom prst="leftArrow">
-            <a:avLst>
-              <a:gd name="adj1" fmla="val 46274"/>
-              <a:gd name="adj2" fmla="val 50000"/>
-            </a:avLst>
-          </a:prstGeom>
-          <a:solidFill>
-            <a:srgbClr val="052A48"/>
-          </a:solidFill>
-          <a:ln w="9525" cmpd="sng">
-            <a:solidFill>
-              <a:srgbClr val="FFFFFF"/>
-            </a:solidFill>
-          </a:ln>
-        </p:spPr>
-        <p:style>
-          <a:lnRef idx="0">
-            <a:schemeClr val="accent1">
-              <a:tint val="60000"/>
-              <a:hueOff val="0"/>
-              <a:satOff val="0"/>
-              <a:lumOff val="0"/>
-              <a:alphaOff val="0"/>
-            </a:schemeClr>
-          </a:lnRef>
-          <a:fillRef idx="1">
-            <a:schemeClr val="accent1">
-              <a:tint val="60000"/>
-              <a:hueOff val="0"/>
-              <a:satOff val="0"/>
-              <a:lumOff val="0"/>
-              <a:alphaOff val="0"/>
-            </a:schemeClr>
-          </a:fillRef>
-          <a:effectRef idx="0">
-            <a:schemeClr val="accent1">
-              <a:tint val="60000"/>
-              <a:hueOff val="0"/>
-              <a:satOff val="0"/>
-              <a:lumOff val="0"/>
-              <a:alphaOff val="0"/>
-            </a:schemeClr>
-          </a:effectRef>
-          <a:fontRef idx="minor">
-            <a:schemeClr val="lt1"/>
-          </a:fontRef>
-        </p:style>
-      </p:sp>
-      <p:sp>
-        <p:nvSpPr>
-          <p:cNvPr id="29" name="Cube 28"/>
-          <p:cNvSpPr/>
-          <p:nvPr/>
-        </p:nvSpPr>
-        <p:spPr>
-          <a:xfrm>
-            <a:off x="1943060" y="2395110"/>
-            <a:ext cx="1305723" cy="417754"/>
-          </a:xfrm>
-          <a:prstGeom prst="cube">
-            <a:avLst>
-              <a:gd name="adj" fmla="val 11969"/>
-            </a:avLst>
-          </a:prstGeom>
-          <a:solidFill>
-            <a:srgbClr val="052A48"/>
-          </a:solidFill>
-          <a:ln w="9525" cap="flat" cmpd="sng" algn="ctr">
-            <a:solidFill>
-              <a:srgbClr val="FFFFFF"/>
-            </a:solidFill>
-            <a:prstDash val="solid"/>
-          </a:ln>
-          <a:effectLst/>
-        </p:spPr>
-        <p:txBody>
-          <a:bodyPr tIns="0" bIns="45720" rtlCol="0" anchor="ctr" anchorCtr="0"/>
-          <a:lstStyle/>
-          <a:p>
-            <a:pPr marL="0" marR="0" lvl="0" indent="0" algn="ctr" defTabSz="914400" eaLnBrk="1" fontAlgn="auto" latinLnBrk="0" hangingPunct="1">
-              <a:lnSpc>
-                <a:spcPct val="100000"/>
-              </a:lnSpc>
-              <a:spcBef>
-                <a:spcPts val="0"/>
-              </a:spcBef>
-              <a:spcAft>
-                <a:spcPts val="0"/>
-              </a:spcAft>
-              <a:buClrTx/>
-              <a:buSzTx/>
-              <a:buFontTx/>
-              <a:buNone/>
-              <a:tabLst/>
-              <a:defRPr/>
-            </a:pPr>
-            <a:r>
-              <a:rPr kumimoji="0" lang="en-US" sz="1800" i="0" u="none" strike="noStrike" kern="0" cap="none" spc="0" normalizeH="0" baseline="0" noProof="0" dirty="0" err="1" smtClean="0">
-                <a:ln>
-                  <a:noFill/>
-                </a:ln>
-                <a:solidFill>
-                  <a:schemeClr val="bg1">
-                    <a:lumMod val="85000"/>
-                  </a:schemeClr>
-                </a:solidFill>
-                <a:effectLst/>
-                <a:uLnTx/>
-                <a:uFillTx/>
-                <a:latin typeface="Calibri"/>
-                <a:ea typeface="+mn-ea"/>
-                <a:cs typeface="+mn-cs"/>
-              </a:rPr>
-              <a:t>PyNWB</a:t>
-            </a:r>
-            <a:endParaRPr kumimoji="0" lang="en-US" sz="1800" i="0" u="none" strike="noStrike" kern="0" cap="none" spc="0" normalizeH="0" baseline="0" noProof="0" dirty="0">
-              <a:ln>
-                <a:noFill/>
-              </a:ln>
-              <a:solidFill>
-                <a:schemeClr val="bg1">
-                  <a:lumMod val="85000"/>
-                </a:schemeClr>
-              </a:solidFill>
-              <a:effectLst/>
-              <a:uLnTx/>
-              <a:uFillTx/>
-              <a:latin typeface="Calibri"/>
-              <a:ea typeface="+mn-ea"/>
-              <a:cs typeface="+mn-cs"/>
-            </a:endParaRPr>
-          </a:p>
-        </p:txBody>
-      </p:sp>
-    </p:spTree>
-    <p:extLst>
-      <p:ext uri="{BB962C8B-B14F-4D97-AF65-F5344CB8AC3E}">
-        <p14:creationId xmlns:p14="http://schemas.microsoft.com/office/powerpoint/2010/main" val="2963881109"/>
       </p:ext>
     </p:extLst>
   </p:cSld>
@@ -9175,7 +9317,7 @@
   <a:extraClrSchemeLst/>
   <a:extLst>
     <a:ext uri="{05A4C25C-085E-4340-85A3-A5531E510DB2}">
-      <thm15:themeFamily xmlns="" xmlns:thm15="http://schemas.microsoft.com/office/thememl/2012/main" name="Office Theme" id="{62F939B6-93AF-4DB8-9C6B-D6C7DFDC589F}" vid="{4A3C46E8-61CC-4603-A589-7422A47A8E4A}"/>
+      <thm15:themeFamily xmlns:thm15="http://schemas.microsoft.com/office/thememl/2012/main" xmlns="" name="Office Theme" id="{62F939B6-93AF-4DB8-9C6B-D6C7DFDC589F}" vid="{4A3C46E8-61CC-4603-A589-7422A47A8E4A}"/>
     </a:ext>
   </a:extLst>
 </a:theme>

</xml_diff>

<commit_message>
add thumbnail for streaming tutorial
</commit_message>
<xml_diff>
--- a/docs/source/figures/gallery_thumbnails.pptx
+++ b/docs/source/figures/gallery_thumbnails.pptx
@@ -5,7 +5,7 @@
     <p:sldMasterId id="2147483660" r:id="rId1"/>
   </p:sldMasterIdLst>
   <p:notesMasterIdLst>
-    <p:notesMasterId r:id="rId17"/>
+    <p:notesMasterId r:id="rId18"/>
   </p:notesMasterIdLst>
   <p:sldIdLst>
     <p:sldId id="342" r:id="rId2"/>
@@ -18,11 +18,12 @@
     <p:sldId id="357" r:id="rId9"/>
     <p:sldId id="352" r:id="rId10"/>
     <p:sldId id="361" r:id="rId11"/>
-    <p:sldId id="353" r:id="rId12"/>
-    <p:sldId id="354" r:id="rId13"/>
-    <p:sldId id="355" r:id="rId14"/>
-    <p:sldId id="358" r:id="rId15"/>
-    <p:sldId id="359" r:id="rId16"/>
+    <p:sldId id="363" r:id="rId12"/>
+    <p:sldId id="353" r:id="rId13"/>
+    <p:sldId id="354" r:id="rId14"/>
+    <p:sldId id="355" r:id="rId15"/>
+    <p:sldId id="358" r:id="rId16"/>
+    <p:sldId id="359" r:id="rId17"/>
   </p:sldIdLst>
   <p:sldSz cx="12192000" cy="6858000"/>
   <p:notesSz cx="6858000" cy="9144000"/>
@@ -123,7 +124,7 @@
   </p:defaultTextStyle>
   <p:extLst>
     <p:ext uri="{EFAFB233-063F-42B5-8137-9DF3F51BA10A}">
-      <p15:sldGuideLst xmlns:p15="http://schemas.microsoft.com/office/powerpoint/2012/main" xmlns=""/>
+      <p15:sldGuideLst xmlns="" xmlns:p15="http://schemas.microsoft.com/office/powerpoint/2012/main"/>
     </p:ext>
   </p:extLst>
 </p:presentation>
@@ -211,7 +212,7 @@
           <a:p>
             <a:fld id="{4D6A40B9-902A-4E0E-AF39-1C357549AEE0}" type="datetimeFigureOut">
               <a:rPr lang="en-US" smtClean="0"/>
-              <a:t>7/16/21</a:t>
+              <a:t>8/11/21</a:t>
             </a:fld>
             <a:endParaRPr lang="en-US"/>
           </a:p>
@@ -627,7 +628,91 @@
           <a:p>
             <a:fld id="{88156F16-9966-4EDC-933D-6170A05B6017}" type="slidenum">
               <a:rPr lang="en-US" smtClean="0"/>
-              <a:t>15</a:t>
+              <a:t>11</a:t>
+            </a:fld>
+            <a:endParaRPr lang="en-US"/>
+          </a:p>
+        </p:txBody>
+      </p:sp>
+    </p:spTree>
+    <p:extLst>
+      <p:ext uri="{BB962C8B-B14F-4D97-AF65-F5344CB8AC3E}">
+        <p14:creationId xmlns:p14="http://schemas.microsoft.com/office/powerpoint/2010/main" val="1267039365"/>
+      </p:ext>
+    </p:extLst>
+  </p:cSld>
+  <p:clrMapOvr>
+    <a:masterClrMapping/>
+  </p:clrMapOvr>
+</p:notes>
+</file>
+
+<file path=ppt/notesSlides/notesSlide3.xml><?xml version="1.0" encoding="utf-8"?>
+<p:notes xmlns:a="http://schemas.openxmlformats.org/drawingml/2006/main" xmlns:r="http://schemas.openxmlformats.org/officeDocument/2006/relationships" xmlns:p="http://schemas.openxmlformats.org/presentationml/2006/main">
+  <p:cSld>
+    <p:spTree>
+      <p:nvGrpSpPr>
+        <p:cNvPr id="1" name=""/>
+        <p:cNvGrpSpPr/>
+        <p:nvPr/>
+      </p:nvGrpSpPr>
+      <p:grpSpPr>
+        <a:xfrm>
+          <a:off x="0" y="0"/>
+          <a:ext cx="0" cy="0"/>
+          <a:chOff x="0" y="0"/>
+          <a:chExt cx="0" cy="0"/>
+        </a:xfrm>
+      </p:grpSpPr>
+      <p:sp>
+        <p:nvSpPr>
+          <p:cNvPr id="2" name="Slide Image Placeholder 1"/>
+          <p:cNvSpPr>
+            <a:spLocks noGrp="1" noRot="1" noChangeAspect="1"/>
+          </p:cNvSpPr>
+          <p:nvPr>
+            <p:ph type="sldImg"/>
+          </p:nvPr>
+        </p:nvSpPr>
+        <p:spPr/>
+      </p:sp>
+      <p:sp>
+        <p:nvSpPr>
+          <p:cNvPr id="3" name="Notes Placeholder 2"/>
+          <p:cNvSpPr>
+            <a:spLocks noGrp="1"/>
+          </p:cNvSpPr>
+          <p:nvPr>
+            <p:ph type="body" idx="1"/>
+          </p:nvPr>
+        </p:nvSpPr>
+        <p:spPr/>
+        <p:txBody>
+          <a:bodyPr/>
+          <a:lstStyle/>
+          <a:p>
+            <a:endParaRPr lang="en-US" dirty="0"/>
+          </a:p>
+        </p:txBody>
+      </p:sp>
+      <p:sp>
+        <p:nvSpPr>
+          <p:cNvPr id="4" name="Slide Number Placeholder 3"/>
+          <p:cNvSpPr>
+            <a:spLocks noGrp="1"/>
+          </p:cNvSpPr>
+          <p:nvPr>
+            <p:ph type="sldNum" sz="quarter" idx="10"/>
+          </p:nvPr>
+        </p:nvSpPr>
+        <p:spPr/>
+        <p:txBody>
+          <a:bodyPr/>
+          <a:lstStyle/>
+          <a:p>
+            <a:fld id="{88156F16-9966-4EDC-933D-6170A05B6017}" type="slidenum">
+              <a:rPr lang="en-US" smtClean="0"/>
+              <a:t>16</a:t>
             </a:fld>
             <a:endParaRPr lang="en-US"/>
           </a:p>
@@ -1459,7 +1544,7 @@
           <p:cNvPr id="4" name="Text Placeholder 3">
             <a:extLst>
               <a:ext uri="{FF2B5EF4-FFF2-40B4-BE49-F238E27FC236}">
-                <a16:creationId xmlns:a16="http://schemas.microsoft.com/office/drawing/2014/main" xmlns="" id="{8850B379-F419-41FB-9123-96081B074583}"/>
+                <a16:creationId xmlns="" xmlns:a16="http://schemas.microsoft.com/office/drawing/2014/main" id="{8850B379-F419-41FB-9123-96081B074583}"/>
               </a:ext>
             </a:extLst>
           </p:cNvPr>
@@ -1750,7 +1835,7 @@
           <p:cNvPr id="5" name="Picture 4">
             <a:extLst>
               <a:ext uri="{FF2B5EF4-FFF2-40B4-BE49-F238E27FC236}">
-                <a16:creationId xmlns:a16="http://schemas.microsoft.com/office/drawing/2014/main" xmlns="" id="{A5059957-9534-4FB9-8820-2343C3BF0E8F}"/>
+                <a16:creationId xmlns="" xmlns:a16="http://schemas.microsoft.com/office/drawing/2014/main" id="{A5059957-9534-4FB9-8820-2343C3BF0E8F}"/>
               </a:ext>
             </a:extLst>
           </p:cNvPr>
@@ -1780,7 +1865,7 @@
           <p:cNvPr id="4" name="Text Placeholder 3">
             <a:extLst>
               <a:ext uri="{FF2B5EF4-FFF2-40B4-BE49-F238E27FC236}">
-                <a16:creationId xmlns:a16="http://schemas.microsoft.com/office/drawing/2014/main" xmlns="" id="{8850B379-F419-41FB-9123-96081B074583}"/>
+                <a16:creationId xmlns="" xmlns:a16="http://schemas.microsoft.com/office/drawing/2014/main" id="{8850B379-F419-41FB-9123-96081B074583}"/>
               </a:ext>
             </a:extLst>
           </p:cNvPr>
@@ -2137,7 +2222,7 @@
           <p:cNvPr id="7" name="Google Shape;20;p4">
             <a:extLst>
               <a:ext uri="{FF2B5EF4-FFF2-40B4-BE49-F238E27FC236}">
-                <a16:creationId xmlns:a16="http://schemas.microsoft.com/office/drawing/2014/main" xmlns="" id="{537643E4-B983-42CC-9421-9C4C107A5DA4}"/>
+                <a16:creationId xmlns="" xmlns:a16="http://schemas.microsoft.com/office/drawing/2014/main" id="{537643E4-B983-42CC-9421-9C4C107A5DA4}"/>
               </a:ext>
             </a:extLst>
           </p:cNvPr>
@@ -3566,7 +3651,7 @@
           <p:cNvPr id="5" name="Picture 4" descr="A screenshot of a cell phone&#10;&#10;Description automatically generated">
             <a:extLst>
               <a:ext uri="{FF2B5EF4-FFF2-40B4-BE49-F238E27FC236}">
-                <a16:creationId xmlns="" xmlns:a16="http://schemas.microsoft.com/office/drawing/2014/main" id="{8C303482-C4AE-E049-A13A-50CE832D1F2A}"/>
+                <a16:creationId xmlns:a16="http://schemas.microsoft.com/office/drawing/2014/main" xmlns="" id="{8C303482-C4AE-E049-A13A-50CE832D1F2A}"/>
               </a:ext>
             </a:extLst>
           </p:cNvPr>
@@ -5108,6 +5193,728 @@
       </p:grpSpPr>
       <p:sp>
         <p:nvSpPr>
+          <p:cNvPr id="5" name="Rounded Rectangle 4"/>
+          <p:cNvSpPr/>
+          <p:nvPr/>
+        </p:nvSpPr>
+        <p:spPr>
+          <a:xfrm>
+            <a:off x="853570" y="853671"/>
+            <a:ext cx="7234527" cy="4851352"/>
+          </a:xfrm>
+          <a:prstGeom prst="roundRect">
+            <a:avLst>
+              <a:gd name="adj" fmla="val 4437"/>
+            </a:avLst>
+          </a:prstGeom>
+          <a:solidFill>
+            <a:srgbClr val="EDEDED"/>
+          </a:solidFill>
+          <a:ln>
+            <a:solidFill>
+              <a:srgbClr val="000000"/>
+            </a:solidFill>
+          </a:ln>
+          <a:effectLst/>
+        </p:spPr>
+        <p:style>
+          <a:lnRef idx="1">
+            <a:schemeClr val="accent1"/>
+          </a:lnRef>
+          <a:fillRef idx="3">
+            <a:schemeClr val="accent1"/>
+          </a:fillRef>
+          <a:effectRef idx="2">
+            <a:schemeClr val="accent1"/>
+          </a:effectRef>
+          <a:fontRef idx="minor">
+            <a:schemeClr val="lt1"/>
+          </a:fontRef>
+        </p:style>
+        <p:txBody>
+          <a:bodyPr rtlCol="0" anchor="ctr"/>
+          <a:lstStyle/>
+          <a:p>
+            <a:pPr algn="ctr"/>
+            <a:endParaRPr lang="en-US"/>
+          </a:p>
+        </p:txBody>
+      </p:sp>
+      <p:sp>
+        <p:nvSpPr>
+          <p:cNvPr id="6" name="Rectangle 5"/>
+          <p:cNvSpPr/>
+          <p:nvPr/>
+        </p:nvSpPr>
+        <p:spPr>
+          <a:xfrm>
+            <a:off x="863980" y="855015"/>
+            <a:ext cx="7213708" cy="1754327"/>
+          </a:xfrm>
+          <a:prstGeom prst="rect">
+            <a:avLst/>
+          </a:prstGeom>
+        </p:spPr>
+        <p:txBody>
+          <a:bodyPr wrap="square">
+            <a:spAutoFit/>
+          </a:bodyPr>
+          <a:lstStyle/>
+          <a:p>
+            <a:pPr algn="ctr"/>
+            <a:r>
+              <a:rPr lang="en-US" sz="5400" b="1" dirty="0" smtClean="0">
+                <a:solidFill>
+                  <a:srgbClr val="052B48"/>
+                </a:solidFill>
+                <a:latin typeface="Calibri"/>
+                <a:cs typeface="Calibri"/>
+              </a:rPr>
+              <a:t>Streaming from an </a:t>
+            </a:r>
+          </a:p>
+          <a:p>
+            <a:pPr algn="ctr"/>
+            <a:r>
+              <a:rPr lang="en-US" sz="5400" b="1" dirty="0" smtClean="0">
+                <a:solidFill>
+                  <a:srgbClr val="052B48"/>
+                </a:solidFill>
+                <a:latin typeface="Calibri"/>
+                <a:cs typeface="Calibri"/>
+              </a:rPr>
+              <a:t>S3 Bucket</a:t>
+            </a:r>
+            <a:endParaRPr lang="en-US" sz="5400" b="1" dirty="0">
+              <a:solidFill>
+                <a:srgbClr val="052B48"/>
+              </a:solidFill>
+              <a:latin typeface="Calibri"/>
+              <a:cs typeface="Calibri"/>
+            </a:endParaRPr>
+          </a:p>
+        </p:txBody>
+      </p:sp>
+      <p:sp>
+        <p:nvSpPr>
+          <p:cNvPr id="17" name="Trapezoid 16"/>
+          <p:cNvSpPr/>
+          <p:nvPr/>
+        </p:nvSpPr>
+        <p:spPr>
+          <a:xfrm flipV="1">
+            <a:off x="1054894" y="3262874"/>
+            <a:ext cx="2498432" cy="2136087"/>
+          </a:xfrm>
+          <a:prstGeom prst="trapezoid">
+            <a:avLst>
+              <a:gd name="adj" fmla="val 17917"/>
+            </a:avLst>
+          </a:prstGeom>
+          <a:solidFill>
+            <a:schemeClr val="accent2"/>
+          </a:solidFill>
+          <a:ln>
+            <a:noFill/>
+          </a:ln>
+          <a:effectLst/>
+        </p:spPr>
+        <p:style>
+          <a:lnRef idx="1">
+            <a:schemeClr val="accent1"/>
+          </a:lnRef>
+          <a:fillRef idx="3">
+            <a:schemeClr val="accent1"/>
+          </a:fillRef>
+          <a:effectRef idx="2">
+            <a:schemeClr val="accent1"/>
+          </a:effectRef>
+          <a:fontRef idx="minor">
+            <a:schemeClr val="lt1"/>
+          </a:fontRef>
+        </p:style>
+        <p:txBody>
+          <a:bodyPr rtlCol="0" anchor="ctr"/>
+          <a:lstStyle/>
+          <a:p>
+            <a:pPr algn="ctr"/>
+            <a:endParaRPr lang="en-US"/>
+          </a:p>
+        </p:txBody>
+      </p:sp>
+      <p:sp>
+        <p:nvSpPr>
+          <p:cNvPr id="18" name="Oval 17"/>
+          <p:cNvSpPr/>
+          <p:nvPr/>
+        </p:nvSpPr>
+        <p:spPr>
+          <a:xfrm>
+            <a:off x="985492" y="2780495"/>
+            <a:ext cx="2630294" cy="652317"/>
+          </a:xfrm>
+          <a:prstGeom prst="ellipse">
+            <a:avLst/>
+          </a:prstGeom>
+          <a:solidFill>
+            <a:srgbClr val="ED7D31"/>
+          </a:solidFill>
+          <a:ln w="76200" cmpd="sng">
+            <a:solidFill>
+              <a:schemeClr val="accent3">
+                <a:lumMod val="20000"/>
+                <a:lumOff val="80000"/>
+              </a:schemeClr>
+            </a:solidFill>
+          </a:ln>
+          <a:effectLst/>
+        </p:spPr>
+        <p:style>
+          <a:lnRef idx="1">
+            <a:schemeClr val="accent1"/>
+          </a:lnRef>
+          <a:fillRef idx="3">
+            <a:schemeClr val="accent1"/>
+          </a:fillRef>
+          <a:effectRef idx="2">
+            <a:schemeClr val="accent1"/>
+          </a:effectRef>
+          <a:fontRef idx="minor">
+            <a:schemeClr val="lt1"/>
+          </a:fontRef>
+        </p:style>
+        <p:txBody>
+          <a:bodyPr rtlCol="0" anchor="ctr"/>
+          <a:lstStyle/>
+          <a:p>
+            <a:pPr algn="ctr"/>
+            <a:endParaRPr lang="en-US"/>
+          </a:p>
+        </p:txBody>
+      </p:sp>
+      <p:grpSp>
+        <p:nvGrpSpPr>
+          <p:cNvPr id="25" name="Group 24"/>
+          <p:cNvGrpSpPr/>
+          <p:nvPr/>
+        </p:nvGrpSpPr>
+        <p:grpSpPr>
+          <a:xfrm>
+            <a:off x="1531496" y="3563238"/>
+            <a:ext cx="1390281" cy="1683064"/>
+            <a:chOff x="3606582" y="3649328"/>
+            <a:chExt cx="1713199" cy="1971082"/>
+          </a:xfrm>
+        </p:grpSpPr>
+        <p:sp>
+          <p:nvSpPr>
+            <p:cNvPr id="20" name="Folded Corner 19"/>
+            <p:cNvSpPr/>
+            <p:nvPr/>
+          </p:nvSpPr>
+          <p:spPr>
+            <a:xfrm rot="10800000" flipH="1">
+              <a:off x="3899840" y="3720272"/>
+              <a:ext cx="1419941" cy="1900138"/>
+            </a:xfrm>
+            <a:prstGeom prst="foldedCorner">
+              <a:avLst>
+                <a:gd name="adj" fmla="val 26556"/>
+              </a:avLst>
+            </a:prstGeom>
+            <a:solidFill>
+              <a:srgbClr val="052A48"/>
+            </a:solidFill>
+            <a:ln w="28575" cmpd="sng">
+              <a:solidFill>
+                <a:schemeClr val="bg1"/>
+              </a:solidFill>
+            </a:ln>
+            <a:effectLst/>
+          </p:spPr>
+          <p:style>
+            <a:lnRef idx="1">
+              <a:schemeClr val="accent1"/>
+            </a:lnRef>
+            <a:fillRef idx="3">
+              <a:schemeClr val="accent1"/>
+            </a:fillRef>
+            <a:effectRef idx="2">
+              <a:schemeClr val="accent1"/>
+            </a:effectRef>
+            <a:fontRef idx="minor">
+              <a:schemeClr val="lt1"/>
+            </a:fontRef>
+          </p:style>
+          <p:txBody>
+            <a:bodyPr rtlCol="0" anchor="ctr"/>
+            <a:lstStyle/>
+            <a:p>
+              <a:pPr algn="ctr"/>
+              <a:r>
+                <a:rPr lang="en-US" u="sng" dirty="0" smtClean="0"/>
+                <a:t>												   </a:t>
+              </a:r>
+              <a:endParaRPr lang="en-US" u="sng" dirty="0"/>
+            </a:p>
+          </p:txBody>
+        </p:sp>
+        <p:grpSp>
+          <p:nvGrpSpPr>
+            <p:cNvPr id="21" name="Group 20"/>
+            <p:cNvGrpSpPr>
+              <a:grpSpLocks noChangeAspect="1"/>
+            </p:cNvGrpSpPr>
+            <p:nvPr/>
+          </p:nvGrpSpPr>
+          <p:grpSpPr>
+            <a:xfrm>
+              <a:off x="3606582" y="3649328"/>
+              <a:ext cx="947929" cy="947929"/>
+              <a:chOff x="2259923" y="2660201"/>
+              <a:chExt cx="1959561" cy="1962561"/>
+            </a:xfrm>
+          </p:grpSpPr>
+          <p:sp>
+            <p:nvSpPr>
+              <p:cNvPr id="22" name="Oval 21"/>
+              <p:cNvSpPr/>
+              <p:nvPr/>
+            </p:nvSpPr>
+            <p:spPr>
+              <a:xfrm>
+                <a:off x="2259923" y="2660201"/>
+                <a:ext cx="1959561" cy="1962561"/>
+              </a:xfrm>
+              <a:prstGeom prst="ellipse">
+                <a:avLst/>
+              </a:prstGeom>
+              <a:solidFill>
+                <a:schemeClr val="bg1"/>
+              </a:solidFill>
+              <a:ln w="76200" cmpd="sng">
+                <a:solidFill>
+                  <a:srgbClr val="052A48"/>
+                </a:solidFill>
+              </a:ln>
+              <a:effectLst/>
+            </p:spPr>
+            <p:style>
+              <a:lnRef idx="1">
+                <a:schemeClr val="accent1"/>
+              </a:lnRef>
+              <a:fillRef idx="3">
+                <a:schemeClr val="accent1"/>
+              </a:fillRef>
+              <a:effectRef idx="2">
+                <a:schemeClr val="accent1"/>
+              </a:effectRef>
+              <a:fontRef idx="minor">
+                <a:schemeClr val="lt1"/>
+              </a:fontRef>
+            </p:style>
+            <p:txBody>
+              <a:bodyPr rtlCol="0" anchor="ctr"/>
+              <a:lstStyle/>
+              <a:p>
+                <a:endParaRPr lang="en-US" sz="4400" dirty="0"/>
+              </a:p>
+            </p:txBody>
+          </p:sp>
+          <p:pic>
+            <p:nvPicPr>
+              <p:cNvPr id="23" name="Picture 22" descr="logo_brain_transp_512x512.png"/>
+              <p:cNvPicPr>
+                <a:picLocks noChangeAspect="1"/>
+              </p:cNvPicPr>
+              <p:nvPr/>
+            </p:nvPicPr>
+            <p:blipFill>
+              <a:blip r:embed="rId3">
+                <a:extLst>
+                  <a:ext uri="{28A0092B-C50C-407E-A947-70E740481C1C}">
+                    <a14:useLocalDpi xmlns:a14="http://schemas.microsoft.com/office/drawing/2010/main" val="0"/>
+                  </a:ext>
+                </a:extLst>
+              </a:blip>
+              <a:stretch>
+                <a:fillRect/>
+              </a:stretch>
+            </p:blipFill>
+            <p:spPr>
+              <a:xfrm>
+                <a:off x="2393887" y="2838486"/>
+                <a:ext cx="1703898" cy="1703898"/>
+              </a:xfrm>
+              <a:prstGeom prst="rect">
+                <a:avLst/>
+              </a:prstGeom>
+            </p:spPr>
+          </p:pic>
+        </p:grpSp>
+      </p:grpSp>
+      <p:grpSp>
+        <p:nvGrpSpPr>
+          <p:cNvPr id="30" name="Group 29"/>
+          <p:cNvGrpSpPr/>
+          <p:nvPr/>
+        </p:nvGrpSpPr>
+        <p:grpSpPr>
+          <a:xfrm>
+            <a:off x="5517371" y="3095041"/>
+            <a:ext cx="2213888" cy="2779488"/>
+            <a:chOff x="5065982" y="2866031"/>
+            <a:chExt cx="2581995" cy="3004819"/>
+          </a:xfrm>
+        </p:grpSpPr>
+        <p:sp>
+          <p:nvSpPr>
+            <p:cNvPr id="26" name="Rounded Rectangle 25"/>
+            <p:cNvSpPr/>
+            <p:nvPr/>
+          </p:nvSpPr>
+          <p:spPr>
+            <a:xfrm>
+              <a:off x="5094024" y="2866031"/>
+              <a:ext cx="2526191" cy="1693248"/>
+            </a:xfrm>
+            <a:prstGeom prst="roundRect">
+              <a:avLst/>
+            </a:prstGeom>
+            <a:solidFill>
+              <a:schemeClr val="bg1"/>
+            </a:solidFill>
+            <a:ln w="57150" cmpd="sng">
+              <a:solidFill>
+                <a:srgbClr val="052A48"/>
+              </a:solidFill>
+            </a:ln>
+            <a:effectLst/>
+            <a:scene3d>
+              <a:camera prst="perspectiveFront"/>
+              <a:lightRig rig="threePt" dir="t"/>
+            </a:scene3d>
+            <a:sp3d>
+              <a:bevelT w="101600" h="88900"/>
+              <a:bevelB w="88900" h="101600"/>
+            </a:sp3d>
+          </p:spPr>
+          <p:style>
+            <a:lnRef idx="1">
+              <a:schemeClr val="accent1"/>
+            </a:lnRef>
+            <a:fillRef idx="3">
+              <a:schemeClr val="accent1"/>
+            </a:fillRef>
+            <a:effectRef idx="2">
+              <a:schemeClr val="accent1"/>
+            </a:effectRef>
+            <a:fontRef idx="minor">
+              <a:schemeClr val="lt1"/>
+            </a:fontRef>
+          </p:style>
+          <p:txBody>
+            <a:bodyPr rtlCol="0" anchor="ctr"/>
+            <a:lstStyle/>
+            <a:p>
+              <a:pPr algn="ctr"/>
+              <a:endParaRPr lang="en-US"/>
+            </a:p>
+          </p:txBody>
+        </p:sp>
+        <p:sp>
+          <p:nvSpPr>
+            <p:cNvPr id="27" name="Rounded Rectangle 26"/>
+            <p:cNvSpPr/>
+            <p:nvPr/>
+          </p:nvSpPr>
+          <p:spPr>
+            <a:xfrm>
+              <a:off x="5065982" y="4171949"/>
+              <a:ext cx="2581995" cy="1698901"/>
+            </a:xfrm>
+            <a:prstGeom prst="roundRect">
+              <a:avLst/>
+            </a:prstGeom>
+            <a:solidFill>
+              <a:srgbClr val="052A48"/>
+            </a:solidFill>
+            <a:ln w="57150" cmpd="sng">
+              <a:solidFill>
+                <a:srgbClr val="052A48"/>
+              </a:solidFill>
+            </a:ln>
+            <a:effectLst/>
+            <a:scene3d>
+              <a:camera prst="perspectiveFront">
+                <a:rot lat="6780000" lon="0" rev="0"/>
+              </a:camera>
+              <a:lightRig rig="threePt" dir="t"/>
+            </a:scene3d>
+            <a:sp3d>
+              <a:bevelT w="95250" h="133350"/>
+            </a:sp3d>
+          </p:spPr>
+          <p:style>
+            <a:lnRef idx="1">
+              <a:schemeClr val="accent1"/>
+            </a:lnRef>
+            <a:fillRef idx="3">
+              <a:schemeClr val="accent1"/>
+            </a:fillRef>
+            <a:effectRef idx="2">
+              <a:schemeClr val="accent1"/>
+            </a:effectRef>
+            <a:fontRef idx="minor">
+              <a:schemeClr val="lt1"/>
+            </a:fontRef>
+          </p:style>
+          <p:txBody>
+            <a:bodyPr rtlCol="0" anchor="ctr"/>
+            <a:lstStyle/>
+            <a:p>
+              <a:pPr algn="ctr"/>
+              <a:endParaRPr lang="en-US"/>
+            </a:p>
+          </p:txBody>
+        </p:sp>
+        <p:sp>
+          <p:nvSpPr>
+            <p:cNvPr id="28" name="Rounded Rectangle 27"/>
+            <p:cNvSpPr/>
+            <p:nvPr/>
+          </p:nvSpPr>
+          <p:spPr>
+            <a:xfrm>
+              <a:off x="5225887" y="4406608"/>
+              <a:ext cx="2276348" cy="811926"/>
+            </a:xfrm>
+            <a:prstGeom prst="roundRect">
+              <a:avLst/>
+            </a:prstGeom>
+            <a:solidFill>
+              <a:schemeClr val="bg1"/>
+            </a:solidFill>
+            <a:ln w="57150" cmpd="sng">
+              <a:noFill/>
+            </a:ln>
+            <a:effectLst/>
+            <a:scene3d>
+              <a:camera prst="perspectiveFront">
+                <a:rot lat="6780000" lon="0" rev="0"/>
+              </a:camera>
+              <a:lightRig rig="brightRoom" dir="t"/>
+            </a:scene3d>
+            <a:sp3d prstMaterial="matte">
+              <a:contourClr>
+                <a:schemeClr val="tx1"/>
+              </a:contourClr>
+            </a:sp3d>
+          </p:spPr>
+          <p:style>
+            <a:lnRef idx="1">
+              <a:schemeClr val="accent1"/>
+            </a:lnRef>
+            <a:fillRef idx="3">
+              <a:schemeClr val="accent1"/>
+            </a:fillRef>
+            <a:effectRef idx="2">
+              <a:schemeClr val="accent1"/>
+            </a:effectRef>
+            <a:fontRef idx="minor">
+              <a:schemeClr val="lt1"/>
+            </a:fontRef>
+          </p:style>
+          <p:txBody>
+            <a:bodyPr rtlCol="0" anchor="ctr"/>
+            <a:lstStyle/>
+            <a:p>
+              <a:pPr algn="ctr"/>
+              <a:endParaRPr lang="en-US"/>
+            </a:p>
+          </p:txBody>
+        </p:sp>
+        <p:sp>
+          <p:nvSpPr>
+            <p:cNvPr id="29" name="Rounded Rectangle 28"/>
+            <p:cNvSpPr/>
+            <p:nvPr/>
+          </p:nvSpPr>
+          <p:spPr>
+            <a:xfrm>
+              <a:off x="5891853" y="4899312"/>
+              <a:ext cx="923313" cy="443862"/>
+            </a:xfrm>
+            <a:prstGeom prst="roundRect">
+              <a:avLst/>
+            </a:prstGeom>
+            <a:solidFill>
+              <a:schemeClr val="bg1"/>
+            </a:solidFill>
+            <a:ln w="57150" cmpd="sng">
+              <a:noFill/>
+            </a:ln>
+            <a:effectLst/>
+            <a:scene3d>
+              <a:camera prst="perspectiveFront">
+                <a:rot lat="6780000" lon="0" rev="0"/>
+              </a:camera>
+              <a:lightRig rig="brightRoom" dir="t"/>
+            </a:scene3d>
+            <a:sp3d prstMaterial="matte">
+              <a:contourClr>
+                <a:schemeClr val="tx1"/>
+              </a:contourClr>
+            </a:sp3d>
+          </p:spPr>
+          <p:style>
+            <a:lnRef idx="1">
+              <a:schemeClr val="accent1"/>
+            </a:lnRef>
+            <a:fillRef idx="3">
+              <a:schemeClr val="accent1"/>
+            </a:fillRef>
+            <a:effectRef idx="2">
+              <a:schemeClr val="accent1"/>
+            </a:effectRef>
+            <a:fontRef idx="minor">
+              <a:schemeClr val="lt1"/>
+            </a:fontRef>
+          </p:style>
+          <p:txBody>
+            <a:bodyPr rtlCol="0" anchor="ctr"/>
+            <a:lstStyle/>
+            <a:p>
+              <a:pPr algn="ctr"/>
+              <a:endParaRPr lang="en-US"/>
+            </a:p>
+          </p:txBody>
+        </p:sp>
+      </p:grpSp>
+      <p:sp>
+        <p:nvSpPr>
+          <p:cNvPr id="32" name="Notched Right Arrow 31"/>
+          <p:cNvSpPr/>
+          <p:nvPr/>
+        </p:nvSpPr>
+        <p:spPr>
+          <a:xfrm>
+            <a:off x="3629667" y="3754291"/>
+            <a:ext cx="1700321" cy="985414"/>
+          </a:xfrm>
+          <a:prstGeom prst="notchedRightArrow">
+            <a:avLst/>
+          </a:prstGeom>
+          <a:solidFill>
+            <a:srgbClr val="052A48"/>
+          </a:solidFill>
+          <a:ln>
+            <a:noFill/>
+          </a:ln>
+          <a:effectLst/>
+        </p:spPr>
+        <p:style>
+          <a:lnRef idx="1">
+            <a:schemeClr val="accent1"/>
+          </a:lnRef>
+          <a:fillRef idx="3">
+            <a:schemeClr val="accent1"/>
+          </a:fillRef>
+          <a:effectRef idx="2">
+            <a:schemeClr val="accent1"/>
+          </a:effectRef>
+          <a:fontRef idx="minor">
+            <a:schemeClr val="lt1"/>
+          </a:fontRef>
+        </p:style>
+        <p:txBody>
+          <a:bodyPr rtlCol="0" anchor="ctr"/>
+          <a:lstStyle/>
+          <a:p>
+            <a:pPr algn="ctr"/>
+            <a:r>
+              <a:rPr lang="en-US" sz="1200" dirty="0" smtClean="0">
+                <a:latin typeface="Courier"/>
+                <a:cs typeface="Courier"/>
+              </a:rPr>
+              <a:t>010011101000101011101</a:t>
+            </a:r>
+            <a:r>
+              <a:rPr lang="mr-IN" sz="1200" dirty="0" smtClean="0">
+                <a:latin typeface="Courier"/>
+                <a:cs typeface="Courier"/>
+              </a:rPr>
+              <a:t>…</a:t>
+            </a:r>
+            <a:endParaRPr lang="en-US" sz="1200" dirty="0">
+              <a:latin typeface="Courier"/>
+              <a:cs typeface="Courier"/>
+            </a:endParaRPr>
+          </a:p>
+        </p:txBody>
+      </p:sp>
+      <p:pic>
+        <p:nvPicPr>
+          <p:cNvPr id="43" name="Picture 42" descr="logo_brain_transp_512x512.png"/>
+          <p:cNvPicPr>
+            <a:picLocks noChangeAspect="1"/>
+          </p:cNvPicPr>
+          <p:nvPr/>
+        </p:nvPicPr>
+        <p:blipFill>
+          <a:blip r:embed="rId3">
+            <a:extLst>
+              <a:ext uri="{28A0092B-C50C-407E-A947-70E740481C1C}">
+                <a14:useLocalDpi xmlns:a14="http://schemas.microsoft.com/office/drawing/2010/main" val="0"/>
+              </a:ext>
+            </a:extLst>
+          </a:blip>
+          <a:stretch>
+            <a:fillRect/>
+          </a:stretch>
+        </p:blipFill>
+        <p:spPr>
+          <a:xfrm>
+            <a:off x="5692336" y="3164609"/>
+            <a:ext cx="521649" cy="548044"/>
+          </a:xfrm>
+          <a:prstGeom prst="rect">
+            <a:avLst/>
+          </a:prstGeom>
+        </p:spPr>
+      </p:pic>
+    </p:spTree>
+    <p:extLst>
+      <p:ext uri="{BB962C8B-B14F-4D97-AF65-F5344CB8AC3E}">
+        <p14:creationId xmlns:p14="http://schemas.microsoft.com/office/powerpoint/2010/main" val="2812368335"/>
+      </p:ext>
+    </p:extLst>
+  </p:cSld>
+  <p:clrMapOvr>
+    <a:masterClrMapping/>
+  </p:clrMapOvr>
+</p:sld>
+</file>
+
+<file path=ppt/slides/slide12.xml><?xml version="1.0" encoding="utf-8"?>
+<p:sld xmlns:a="http://schemas.openxmlformats.org/drawingml/2006/main" xmlns:r="http://schemas.openxmlformats.org/officeDocument/2006/relationships" xmlns:p="http://schemas.openxmlformats.org/presentationml/2006/main">
+  <p:cSld>
+    <p:spTree>
+      <p:nvGrpSpPr>
+        <p:cNvPr id="1" name=""/>
+        <p:cNvGrpSpPr/>
+        <p:nvPr/>
+      </p:nvGrpSpPr>
+      <p:grpSpPr>
+        <a:xfrm>
+          <a:off x="0" y="0"/>
+          <a:ext cx="0" cy="0"/>
+          <a:chOff x="0" y="0"/>
+          <a:chExt cx="0" cy="0"/>
+        </a:xfrm>
+      </p:grpSpPr>
+      <p:sp>
+        <p:nvSpPr>
           <p:cNvPr id="27" name="Rounded Rectangle 26"/>
           <p:cNvSpPr/>
           <p:nvPr/>
@@ -5309,7 +6116,7 @@
 </p:sld>
 </file>
 
-<file path=ppt/slides/slide12.xml><?xml version="1.0" encoding="utf-8"?>
+<file path=ppt/slides/slide13.xml><?xml version="1.0" encoding="utf-8"?>
 <p:sld xmlns:a="http://schemas.openxmlformats.org/drawingml/2006/main" xmlns:r="http://schemas.openxmlformats.org/officeDocument/2006/relationships" xmlns:p="http://schemas.openxmlformats.org/presentationml/2006/main">
   <p:cSld>
     <p:spTree>
@@ -5449,338 +6256,6 @@
     <p:extLst>
       <p:ext uri="{BB962C8B-B14F-4D97-AF65-F5344CB8AC3E}">
         <p14:creationId xmlns:p14="http://schemas.microsoft.com/office/powerpoint/2010/main" val="3305643027"/>
-      </p:ext>
-    </p:extLst>
-  </p:cSld>
-  <p:clrMapOvr>
-    <a:masterClrMapping/>
-  </p:clrMapOvr>
-</p:sld>
-</file>
-
-<file path=ppt/slides/slide13.xml><?xml version="1.0" encoding="utf-8"?>
-<p:sld xmlns:a="http://schemas.openxmlformats.org/drawingml/2006/main" xmlns:r="http://schemas.openxmlformats.org/officeDocument/2006/relationships" xmlns:p="http://schemas.openxmlformats.org/presentationml/2006/main">
-  <p:cSld>
-    <p:spTree>
-      <p:nvGrpSpPr>
-        <p:cNvPr id="1" name=""/>
-        <p:cNvGrpSpPr/>
-        <p:nvPr/>
-      </p:nvGrpSpPr>
-      <p:grpSpPr>
-        <a:xfrm>
-          <a:off x="0" y="0"/>
-          <a:ext cx="0" cy="0"/>
-          <a:chOff x="0" y="0"/>
-          <a:chExt cx="0" cy="0"/>
-        </a:xfrm>
-      </p:grpSpPr>
-      <p:sp>
-        <p:nvSpPr>
-          <p:cNvPr id="27" name="Rounded Rectangle 26"/>
-          <p:cNvSpPr/>
-          <p:nvPr/>
-        </p:nvSpPr>
-        <p:spPr>
-          <a:xfrm>
-            <a:off x="853570" y="853671"/>
-            <a:ext cx="7234527" cy="4851352"/>
-          </a:xfrm>
-          <a:prstGeom prst="roundRect">
-            <a:avLst>
-              <a:gd name="adj" fmla="val 4437"/>
-            </a:avLst>
-          </a:prstGeom>
-          <a:solidFill>
-            <a:srgbClr val="EDEDED"/>
-          </a:solidFill>
-          <a:ln>
-            <a:solidFill>
-              <a:srgbClr val="000000"/>
-            </a:solidFill>
-          </a:ln>
-          <a:effectLst/>
-        </p:spPr>
-        <p:style>
-          <a:lnRef idx="1">
-            <a:schemeClr val="accent1"/>
-          </a:lnRef>
-          <a:fillRef idx="3">
-            <a:schemeClr val="accent1"/>
-          </a:fillRef>
-          <a:effectRef idx="2">
-            <a:schemeClr val="accent1"/>
-          </a:effectRef>
-          <a:fontRef idx="minor">
-            <a:schemeClr val="lt1"/>
-          </a:fontRef>
-        </p:style>
-        <p:txBody>
-          <a:bodyPr rtlCol="0" anchor="ctr"/>
-          <a:lstStyle/>
-          <a:p>
-            <a:pPr algn="ctr"/>
-            <a:endParaRPr lang="en-US"/>
-          </a:p>
-        </p:txBody>
-      </p:sp>
-      <p:sp>
-        <p:nvSpPr>
-          <p:cNvPr id="26" name="Rectangle 25"/>
-          <p:cNvSpPr/>
-          <p:nvPr/>
-        </p:nvSpPr>
-        <p:spPr>
-          <a:xfrm>
-            <a:off x="863980" y="855015"/>
-            <a:ext cx="7213708" cy="2585323"/>
-          </a:xfrm>
-          <a:prstGeom prst="rect">
-            <a:avLst/>
-          </a:prstGeom>
-        </p:spPr>
-        <p:txBody>
-          <a:bodyPr wrap="square">
-            <a:spAutoFit/>
-          </a:bodyPr>
-          <a:lstStyle/>
-          <a:p>
-            <a:pPr algn="ctr"/>
-            <a:r>
-              <a:rPr lang="en-US" sz="5400" b="1" dirty="0" smtClean="0">
-                <a:solidFill>
-                  <a:srgbClr val="052B48"/>
-                </a:solidFill>
-                <a:latin typeface="Calibri"/>
-                <a:cs typeface="Calibri"/>
-              </a:rPr>
-              <a:t>Adding/Removing Containers from an NWB File </a:t>
-            </a:r>
-            <a:endParaRPr lang="en-US" sz="5400" b="1" dirty="0">
-              <a:solidFill>
-                <a:srgbClr val="052B48"/>
-              </a:solidFill>
-              <a:latin typeface="Calibri"/>
-              <a:cs typeface="Calibri"/>
-            </a:endParaRPr>
-          </a:p>
-        </p:txBody>
-      </p:sp>
-      <p:sp>
-        <p:nvSpPr>
-          <p:cNvPr id="3" name="Folded Corner 2"/>
-          <p:cNvSpPr/>
-          <p:nvPr/>
-        </p:nvSpPr>
-        <p:spPr>
-          <a:xfrm rot="10800000" flipH="1">
-            <a:off x="3839842" y="3460251"/>
-            <a:ext cx="1419941" cy="1900138"/>
-          </a:xfrm>
-          <a:prstGeom prst="foldedCorner">
-            <a:avLst>
-              <a:gd name="adj" fmla="val 26556"/>
-            </a:avLst>
-          </a:prstGeom>
-          <a:solidFill>
-            <a:srgbClr val="052A48"/>
-          </a:solidFill>
-          <a:ln w="28575" cmpd="sng">
-            <a:solidFill>
-              <a:schemeClr val="bg1"/>
-            </a:solidFill>
-          </a:ln>
-          <a:effectLst/>
-        </p:spPr>
-        <p:style>
-          <a:lnRef idx="1">
-            <a:schemeClr val="accent1"/>
-          </a:lnRef>
-          <a:fillRef idx="3">
-            <a:schemeClr val="accent1"/>
-          </a:fillRef>
-          <a:effectRef idx="2">
-            <a:schemeClr val="accent1"/>
-          </a:effectRef>
-          <a:fontRef idx="minor">
-            <a:schemeClr val="lt1"/>
-          </a:fontRef>
-        </p:style>
-        <p:txBody>
-          <a:bodyPr rtlCol="0" anchor="ctr"/>
-          <a:lstStyle/>
-          <a:p>
-            <a:pPr algn="ctr"/>
-            <a:r>
-              <a:rPr lang="en-US" u="sng" dirty="0" smtClean="0"/>
-              <a:t>																			   </a:t>
-            </a:r>
-            <a:endParaRPr lang="en-US" u="sng" dirty="0"/>
-          </a:p>
-        </p:txBody>
-      </p:sp>
-      <p:sp>
-        <p:nvSpPr>
-          <p:cNvPr id="4" name="Oval 3"/>
-          <p:cNvSpPr/>
-          <p:nvPr/>
-        </p:nvSpPr>
-        <p:spPr>
-          <a:xfrm>
-            <a:off x="4939826" y="5048168"/>
-            <a:ext cx="579977" cy="601510"/>
-          </a:xfrm>
-          <a:prstGeom prst="ellipse">
-            <a:avLst/>
-          </a:prstGeom>
-          <a:solidFill>
-            <a:srgbClr val="052A48"/>
-          </a:solidFill>
-          <a:ln w="76200" cmpd="sng">
-            <a:solidFill>
-              <a:srgbClr val="FFFFFF"/>
-            </a:solidFill>
-          </a:ln>
-          <a:effectLst/>
-        </p:spPr>
-        <p:style>
-          <a:lnRef idx="1">
-            <a:schemeClr val="accent1"/>
-          </a:lnRef>
-          <a:fillRef idx="3">
-            <a:schemeClr val="accent1"/>
-          </a:fillRef>
-          <a:effectRef idx="2">
-            <a:schemeClr val="accent1"/>
-          </a:effectRef>
-          <a:fontRef idx="minor">
-            <a:schemeClr val="lt1"/>
-          </a:fontRef>
-        </p:style>
-        <p:txBody>
-          <a:bodyPr rtlCol="0" anchor="ctr"/>
-          <a:lstStyle/>
-          <a:p>
-            <a:endParaRPr lang="en-US" sz="4400" dirty="0"/>
-          </a:p>
-        </p:txBody>
-      </p:sp>
-      <p:sp>
-        <p:nvSpPr>
-          <p:cNvPr id="5" name="Rectangle 4"/>
-          <p:cNvSpPr/>
-          <p:nvPr/>
-        </p:nvSpPr>
-        <p:spPr>
-          <a:xfrm>
-            <a:off x="5013201" y="4804441"/>
-            <a:ext cx="415273" cy="923330"/>
-          </a:xfrm>
-          <a:prstGeom prst="rect">
-            <a:avLst/>
-          </a:prstGeom>
-          <a:effectLst/>
-        </p:spPr>
-        <p:txBody>
-          <a:bodyPr wrap="none">
-            <a:spAutoFit/>
-          </a:bodyPr>
-          <a:lstStyle/>
-          <a:p>
-            <a:r>
-              <a:rPr lang="en-US" sz="5400" b="1" dirty="0">
-                <a:solidFill>
-                  <a:schemeClr val="bg1"/>
-                </a:solidFill>
-              </a:rPr>
-              <a:t>-</a:t>
-            </a:r>
-          </a:p>
-        </p:txBody>
-      </p:sp>
-      <p:sp>
-        <p:nvSpPr>
-          <p:cNvPr id="8" name="Oval 7"/>
-          <p:cNvSpPr/>
-          <p:nvPr/>
-        </p:nvSpPr>
-        <p:spPr>
-          <a:xfrm>
-            <a:off x="4942253" y="4360489"/>
-            <a:ext cx="579977" cy="601510"/>
-          </a:xfrm>
-          <a:prstGeom prst="ellipse">
-            <a:avLst/>
-          </a:prstGeom>
-          <a:solidFill>
-            <a:srgbClr val="052A48"/>
-          </a:solidFill>
-          <a:ln w="76200" cmpd="sng">
-            <a:solidFill>
-              <a:srgbClr val="FFFFFF"/>
-            </a:solidFill>
-          </a:ln>
-          <a:effectLst/>
-        </p:spPr>
-        <p:style>
-          <a:lnRef idx="1">
-            <a:schemeClr val="accent1"/>
-          </a:lnRef>
-          <a:fillRef idx="3">
-            <a:schemeClr val="accent1"/>
-          </a:fillRef>
-          <a:effectRef idx="2">
-            <a:schemeClr val="accent1"/>
-          </a:effectRef>
-          <a:fontRef idx="minor">
-            <a:schemeClr val="lt1"/>
-          </a:fontRef>
-        </p:style>
-        <p:txBody>
-          <a:bodyPr rtlCol="0" anchor="ctr"/>
-          <a:lstStyle/>
-          <a:p>
-            <a:endParaRPr lang="en-US" sz="4400" dirty="0"/>
-          </a:p>
-        </p:txBody>
-      </p:sp>
-      <p:sp>
-        <p:nvSpPr>
-          <p:cNvPr id="9" name="Rectangle 8"/>
-          <p:cNvSpPr/>
-          <p:nvPr/>
-        </p:nvSpPr>
-        <p:spPr>
-          <a:xfrm>
-            <a:off x="4975628" y="4256776"/>
-            <a:ext cx="514183" cy="769441"/>
-          </a:xfrm>
-          <a:prstGeom prst="rect">
-            <a:avLst/>
-          </a:prstGeom>
-          <a:effectLst/>
-        </p:spPr>
-        <p:txBody>
-          <a:bodyPr wrap="none">
-            <a:spAutoFit/>
-          </a:bodyPr>
-          <a:lstStyle/>
-          <a:p>
-            <a:r>
-              <a:rPr lang="en-US" sz="4400" b="1" dirty="0">
-                <a:solidFill>
-                  <a:schemeClr val="bg1"/>
-                </a:solidFill>
-              </a:rPr>
-              <a:t>+</a:t>
-            </a:r>
-          </a:p>
-        </p:txBody>
-      </p:sp>
-    </p:spTree>
-    <p:extLst>
-      <p:ext uri="{BB962C8B-B14F-4D97-AF65-F5344CB8AC3E}">
-        <p14:creationId xmlns:p14="http://schemas.microsoft.com/office/powerpoint/2010/main" val="3909940052"/>
       </p:ext>
     </p:extLst>
   </p:cSld>
@@ -5865,6 +6340,338 @@
         <p:spPr>
           <a:xfrm>
             <a:off x="863980" y="855015"/>
+            <a:ext cx="7213708" cy="2585323"/>
+          </a:xfrm>
+          <a:prstGeom prst="rect">
+            <a:avLst/>
+          </a:prstGeom>
+        </p:spPr>
+        <p:txBody>
+          <a:bodyPr wrap="square">
+            <a:spAutoFit/>
+          </a:bodyPr>
+          <a:lstStyle/>
+          <a:p>
+            <a:pPr algn="ctr"/>
+            <a:r>
+              <a:rPr lang="en-US" sz="5400" b="1" dirty="0" smtClean="0">
+                <a:solidFill>
+                  <a:srgbClr val="052B48"/>
+                </a:solidFill>
+                <a:latin typeface="Calibri"/>
+                <a:cs typeface="Calibri"/>
+              </a:rPr>
+              <a:t>Adding/Removing Containers from an NWB File </a:t>
+            </a:r>
+            <a:endParaRPr lang="en-US" sz="5400" b="1" dirty="0">
+              <a:solidFill>
+                <a:srgbClr val="052B48"/>
+              </a:solidFill>
+              <a:latin typeface="Calibri"/>
+              <a:cs typeface="Calibri"/>
+            </a:endParaRPr>
+          </a:p>
+        </p:txBody>
+      </p:sp>
+      <p:sp>
+        <p:nvSpPr>
+          <p:cNvPr id="3" name="Folded Corner 2"/>
+          <p:cNvSpPr/>
+          <p:nvPr/>
+        </p:nvSpPr>
+        <p:spPr>
+          <a:xfrm rot="10800000" flipH="1">
+            <a:off x="3839842" y="3460251"/>
+            <a:ext cx="1419941" cy="1900138"/>
+          </a:xfrm>
+          <a:prstGeom prst="foldedCorner">
+            <a:avLst>
+              <a:gd name="adj" fmla="val 26556"/>
+            </a:avLst>
+          </a:prstGeom>
+          <a:solidFill>
+            <a:srgbClr val="052A48"/>
+          </a:solidFill>
+          <a:ln w="28575" cmpd="sng">
+            <a:solidFill>
+              <a:schemeClr val="bg1"/>
+            </a:solidFill>
+          </a:ln>
+          <a:effectLst/>
+        </p:spPr>
+        <p:style>
+          <a:lnRef idx="1">
+            <a:schemeClr val="accent1"/>
+          </a:lnRef>
+          <a:fillRef idx="3">
+            <a:schemeClr val="accent1"/>
+          </a:fillRef>
+          <a:effectRef idx="2">
+            <a:schemeClr val="accent1"/>
+          </a:effectRef>
+          <a:fontRef idx="minor">
+            <a:schemeClr val="lt1"/>
+          </a:fontRef>
+        </p:style>
+        <p:txBody>
+          <a:bodyPr rtlCol="0" anchor="ctr"/>
+          <a:lstStyle/>
+          <a:p>
+            <a:pPr algn="ctr"/>
+            <a:r>
+              <a:rPr lang="en-US" u="sng" dirty="0" smtClean="0"/>
+              <a:t>																			   </a:t>
+            </a:r>
+            <a:endParaRPr lang="en-US" u="sng" dirty="0"/>
+          </a:p>
+        </p:txBody>
+      </p:sp>
+      <p:sp>
+        <p:nvSpPr>
+          <p:cNvPr id="4" name="Oval 3"/>
+          <p:cNvSpPr/>
+          <p:nvPr/>
+        </p:nvSpPr>
+        <p:spPr>
+          <a:xfrm>
+            <a:off x="4939826" y="5048168"/>
+            <a:ext cx="579977" cy="601510"/>
+          </a:xfrm>
+          <a:prstGeom prst="ellipse">
+            <a:avLst/>
+          </a:prstGeom>
+          <a:solidFill>
+            <a:srgbClr val="052A48"/>
+          </a:solidFill>
+          <a:ln w="76200" cmpd="sng">
+            <a:solidFill>
+              <a:srgbClr val="FFFFFF"/>
+            </a:solidFill>
+          </a:ln>
+          <a:effectLst/>
+        </p:spPr>
+        <p:style>
+          <a:lnRef idx="1">
+            <a:schemeClr val="accent1"/>
+          </a:lnRef>
+          <a:fillRef idx="3">
+            <a:schemeClr val="accent1"/>
+          </a:fillRef>
+          <a:effectRef idx="2">
+            <a:schemeClr val="accent1"/>
+          </a:effectRef>
+          <a:fontRef idx="minor">
+            <a:schemeClr val="lt1"/>
+          </a:fontRef>
+        </p:style>
+        <p:txBody>
+          <a:bodyPr rtlCol="0" anchor="ctr"/>
+          <a:lstStyle/>
+          <a:p>
+            <a:endParaRPr lang="en-US" sz="4400" dirty="0"/>
+          </a:p>
+        </p:txBody>
+      </p:sp>
+      <p:sp>
+        <p:nvSpPr>
+          <p:cNvPr id="5" name="Rectangle 4"/>
+          <p:cNvSpPr/>
+          <p:nvPr/>
+        </p:nvSpPr>
+        <p:spPr>
+          <a:xfrm>
+            <a:off x="5013201" y="4804441"/>
+            <a:ext cx="415273" cy="923330"/>
+          </a:xfrm>
+          <a:prstGeom prst="rect">
+            <a:avLst/>
+          </a:prstGeom>
+          <a:effectLst/>
+        </p:spPr>
+        <p:txBody>
+          <a:bodyPr wrap="none">
+            <a:spAutoFit/>
+          </a:bodyPr>
+          <a:lstStyle/>
+          <a:p>
+            <a:r>
+              <a:rPr lang="en-US" sz="5400" b="1" dirty="0">
+                <a:solidFill>
+                  <a:schemeClr val="bg1"/>
+                </a:solidFill>
+              </a:rPr>
+              <a:t>-</a:t>
+            </a:r>
+          </a:p>
+        </p:txBody>
+      </p:sp>
+      <p:sp>
+        <p:nvSpPr>
+          <p:cNvPr id="8" name="Oval 7"/>
+          <p:cNvSpPr/>
+          <p:nvPr/>
+        </p:nvSpPr>
+        <p:spPr>
+          <a:xfrm>
+            <a:off x="4942253" y="4360489"/>
+            <a:ext cx="579977" cy="601510"/>
+          </a:xfrm>
+          <a:prstGeom prst="ellipse">
+            <a:avLst/>
+          </a:prstGeom>
+          <a:solidFill>
+            <a:srgbClr val="052A48"/>
+          </a:solidFill>
+          <a:ln w="76200" cmpd="sng">
+            <a:solidFill>
+              <a:srgbClr val="FFFFFF"/>
+            </a:solidFill>
+          </a:ln>
+          <a:effectLst/>
+        </p:spPr>
+        <p:style>
+          <a:lnRef idx="1">
+            <a:schemeClr val="accent1"/>
+          </a:lnRef>
+          <a:fillRef idx="3">
+            <a:schemeClr val="accent1"/>
+          </a:fillRef>
+          <a:effectRef idx="2">
+            <a:schemeClr val="accent1"/>
+          </a:effectRef>
+          <a:fontRef idx="minor">
+            <a:schemeClr val="lt1"/>
+          </a:fontRef>
+        </p:style>
+        <p:txBody>
+          <a:bodyPr rtlCol="0" anchor="ctr"/>
+          <a:lstStyle/>
+          <a:p>
+            <a:endParaRPr lang="en-US" sz="4400" dirty="0"/>
+          </a:p>
+        </p:txBody>
+      </p:sp>
+      <p:sp>
+        <p:nvSpPr>
+          <p:cNvPr id="9" name="Rectangle 8"/>
+          <p:cNvSpPr/>
+          <p:nvPr/>
+        </p:nvSpPr>
+        <p:spPr>
+          <a:xfrm>
+            <a:off x="4975628" y="4256776"/>
+            <a:ext cx="514183" cy="769441"/>
+          </a:xfrm>
+          <a:prstGeom prst="rect">
+            <a:avLst/>
+          </a:prstGeom>
+          <a:effectLst/>
+        </p:spPr>
+        <p:txBody>
+          <a:bodyPr wrap="none">
+            <a:spAutoFit/>
+          </a:bodyPr>
+          <a:lstStyle/>
+          <a:p>
+            <a:r>
+              <a:rPr lang="en-US" sz="4400" b="1" dirty="0">
+                <a:solidFill>
+                  <a:schemeClr val="bg1"/>
+                </a:solidFill>
+              </a:rPr>
+              <a:t>+</a:t>
+            </a:r>
+          </a:p>
+        </p:txBody>
+      </p:sp>
+    </p:spTree>
+    <p:extLst>
+      <p:ext uri="{BB962C8B-B14F-4D97-AF65-F5344CB8AC3E}">
+        <p14:creationId xmlns:p14="http://schemas.microsoft.com/office/powerpoint/2010/main" val="3909940052"/>
+      </p:ext>
+    </p:extLst>
+  </p:cSld>
+  <p:clrMapOvr>
+    <a:masterClrMapping/>
+  </p:clrMapOvr>
+</p:sld>
+</file>
+
+<file path=ppt/slides/slide15.xml><?xml version="1.0" encoding="utf-8"?>
+<p:sld xmlns:a="http://schemas.openxmlformats.org/drawingml/2006/main" xmlns:r="http://schemas.openxmlformats.org/officeDocument/2006/relationships" xmlns:p="http://schemas.openxmlformats.org/presentationml/2006/main">
+  <p:cSld>
+    <p:spTree>
+      <p:nvGrpSpPr>
+        <p:cNvPr id="1" name=""/>
+        <p:cNvGrpSpPr/>
+        <p:nvPr/>
+      </p:nvGrpSpPr>
+      <p:grpSpPr>
+        <a:xfrm>
+          <a:off x="0" y="0"/>
+          <a:ext cx="0" cy="0"/>
+          <a:chOff x="0" y="0"/>
+          <a:chExt cx="0" cy="0"/>
+        </a:xfrm>
+      </p:grpSpPr>
+      <p:sp>
+        <p:nvSpPr>
+          <p:cNvPr id="27" name="Rounded Rectangle 26"/>
+          <p:cNvSpPr/>
+          <p:nvPr/>
+        </p:nvSpPr>
+        <p:spPr>
+          <a:xfrm>
+            <a:off x="853570" y="853671"/>
+            <a:ext cx="7234527" cy="4851352"/>
+          </a:xfrm>
+          <a:prstGeom prst="roundRect">
+            <a:avLst>
+              <a:gd name="adj" fmla="val 4437"/>
+            </a:avLst>
+          </a:prstGeom>
+          <a:solidFill>
+            <a:srgbClr val="EDEDED"/>
+          </a:solidFill>
+          <a:ln>
+            <a:solidFill>
+              <a:srgbClr val="000000"/>
+            </a:solidFill>
+          </a:ln>
+          <a:effectLst/>
+        </p:spPr>
+        <p:style>
+          <a:lnRef idx="1">
+            <a:schemeClr val="accent1"/>
+          </a:lnRef>
+          <a:fillRef idx="3">
+            <a:schemeClr val="accent1"/>
+          </a:fillRef>
+          <a:effectRef idx="2">
+            <a:schemeClr val="accent1"/>
+          </a:effectRef>
+          <a:fontRef idx="minor">
+            <a:schemeClr val="lt1"/>
+          </a:fontRef>
+        </p:style>
+        <p:txBody>
+          <a:bodyPr rtlCol="0" anchor="ctr"/>
+          <a:lstStyle/>
+          <a:p>
+            <a:pPr algn="ctr"/>
+            <a:endParaRPr lang="en-US"/>
+          </a:p>
+        </p:txBody>
+      </p:sp>
+      <p:sp>
+        <p:nvSpPr>
+          <p:cNvPr id="26" name="Rectangle 25"/>
+          <p:cNvSpPr/>
+          <p:nvPr/>
+        </p:nvSpPr>
+        <p:spPr>
+          <a:xfrm>
+            <a:off x="863980" y="855015"/>
             <a:ext cx="7213708" cy="923330"/>
           </a:xfrm>
           <a:prstGeom prst="rect">
@@ -6040,7 +6847,7 @@
 </p:sld>
 </file>
 
-<file path=ppt/slides/slide15.xml><?xml version="1.0" encoding="utf-8"?>
+<file path=ppt/slides/slide16.xml><?xml version="1.0" encoding="utf-8"?>
 <p:sld xmlns:a="http://schemas.openxmlformats.org/drawingml/2006/main" xmlns:r="http://schemas.openxmlformats.org/officeDocument/2006/relationships" xmlns:p="http://schemas.openxmlformats.org/presentationml/2006/main">
   <p:cSld>
     <p:spTree>
@@ -9317,7 +10124,7 @@
   <a:extraClrSchemeLst/>
   <a:extLst>
     <a:ext uri="{05A4C25C-085E-4340-85A3-A5531E510DB2}">
-      <thm15:themeFamily xmlns:thm15="http://schemas.microsoft.com/office/thememl/2012/main" xmlns="" name="Office Theme" id="{62F939B6-93AF-4DB8-9C6B-D6C7DFDC589F}" vid="{4A3C46E8-61CC-4603-A589-7422A47A8E4A}"/>
+      <thm15:themeFamily xmlns="" xmlns:thm15="http://schemas.microsoft.com/office/thememl/2012/main" name="Office Theme" id="{62F939B6-93AF-4DB8-9C6B-D6C7DFDC589F}" vid="{4A3C46E8-61CC-4603-A589-7422A47A8E4A}"/>
     </a:ext>
   </a:extLst>
 </a:theme>

</xml_diff>

<commit_message>
Test ROS3 streaming in CI and add ROS3 tutorial (#1393)
Co-authored-by: Oliver Ruebel <oruebel@lbl.gov>
Co-authored-by: !git for-each-ref --format='%(refname:short)' `git symbolic-ref HEAD` <ben.dichter@gmail.com>
</commit_message>
<xml_diff>
--- a/docs/source/figures/gallery_thumbnails.pptx
+++ b/docs/source/figures/gallery_thumbnails.pptx
@@ -5,7 +5,7 @@
     <p:sldMasterId id="2147483660" r:id="rId1"/>
   </p:sldMasterIdLst>
   <p:notesMasterIdLst>
-    <p:notesMasterId r:id="rId17"/>
+    <p:notesMasterId r:id="rId18"/>
   </p:notesMasterIdLst>
   <p:sldIdLst>
     <p:sldId id="342" r:id="rId2"/>
@@ -18,11 +18,12 @@
     <p:sldId id="357" r:id="rId9"/>
     <p:sldId id="352" r:id="rId10"/>
     <p:sldId id="361" r:id="rId11"/>
-    <p:sldId id="353" r:id="rId12"/>
-    <p:sldId id="354" r:id="rId13"/>
-    <p:sldId id="355" r:id="rId14"/>
-    <p:sldId id="358" r:id="rId15"/>
-    <p:sldId id="359" r:id="rId16"/>
+    <p:sldId id="363" r:id="rId12"/>
+    <p:sldId id="353" r:id="rId13"/>
+    <p:sldId id="354" r:id="rId14"/>
+    <p:sldId id="355" r:id="rId15"/>
+    <p:sldId id="358" r:id="rId16"/>
+    <p:sldId id="359" r:id="rId17"/>
   </p:sldIdLst>
   <p:sldSz cx="12192000" cy="6858000"/>
   <p:notesSz cx="6858000" cy="9144000"/>
@@ -123,7 +124,7 @@
   </p:defaultTextStyle>
   <p:extLst>
     <p:ext uri="{EFAFB233-063F-42B5-8137-9DF3F51BA10A}">
-      <p15:sldGuideLst xmlns:p15="http://schemas.microsoft.com/office/powerpoint/2012/main" xmlns=""/>
+      <p15:sldGuideLst xmlns="" xmlns:p15="http://schemas.microsoft.com/office/powerpoint/2012/main"/>
     </p:ext>
   </p:extLst>
 </p:presentation>
@@ -211,7 +212,7 @@
           <a:p>
             <a:fld id="{4D6A40B9-902A-4E0E-AF39-1C357549AEE0}" type="datetimeFigureOut">
               <a:rPr lang="en-US" smtClean="0"/>
-              <a:t>7/16/21</a:t>
+              <a:t>8/11/21</a:t>
             </a:fld>
             <a:endParaRPr lang="en-US"/>
           </a:p>
@@ -627,7 +628,91 @@
           <a:p>
             <a:fld id="{88156F16-9966-4EDC-933D-6170A05B6017}" type="slidenum">
               <a:rPr lang="en-US" smtClean="0"/>
-              <a:t>15</a:t>
+              <a:t>11</a:t>
+            </a:fld>
+            <a:endParaRPr lang="en-US"/>
+          </a:p>
+        </p:txBody>
+      </p:sp>
+    </p:spTree>
+    <p:extLst>
+      <p:ext uri="{BB962C8B-B14F-4D97-AF65-F5344CB8AC3E}">
+        <p14:creationId xmlns:p14="http://schemas.microsoft.com/office/powerpoint/2010/main" val="1267039365"/>
+      </p:ext>
+    </p:extLst>
+  </p:cSld>
+  <p:clrMapOvr>
+    <a:masterClrMapping/>
+  </p:clrMapOvr>
+</p:notes>
+</file>
+
+<file path=ppt/notesSlides/notesSlide3.xml><?xml version="1.0" encoding="utf-8"?>
+<p:notes xmlns:a="http://schemas.openxmlformats.org/drawingml/2006/main" xmlns:r="http://schemas.openxmlformats.org/officeDocument/2006/relationships" xmlns:p="http://schemas.openxmlformats.org/presentationml/2006/main">
+  <p:cSld>
+    <p:spTree>
+      <p:nvGrpSpPr>
+        <p:cNvPr id="1" name=""/>
+        <p:cNvGrpSpPr/>
+        <p:nvPr/>
+      </p:nvGrpSpPr>
+      <p:grpSpPr>
+        <a:xfrm>
+          <a:off x="0" y="0"/>
+          <a:ext cx="0" cy="0"/>
+          <a:chOff x="0" y="0"/>
+          <a:chExt cx="0" cy="0"/>
+        </a:xfrm>
+      </p:grpSpPr>
+      <p:sp>
+        <p:nvSpPr>
+          <p:cNvPr id="2" name="Slide Image Placeholder 1"/>
+          <p:cNvSpPr>
+            <a:spLocks noGrp="1" noRot="1" noChangeAspect="1"/>
+          </p:cNvSpPr>
+          <p:nvPr>
+            <p:ph type="sldImg"/>
+          </p:nvPr>
+        </p:nvSpPr>
+        <p:spPr/>
+      </p:sp>
+      <p:sp>
+        <p:nvSpPr>
+          <p:cNvPr id="3" name="Notes Placeholder 2"/>
+          <p:cNvSpPr>
+            <a:spLocks noGrp="1"/>
+          </p:cNvSpPr>
+          <p:nvPr>
+            <p:ph type="body" idx="1"/>
+          </p:nvPr>
+        </p:nvSpPr>
+        <p:spPr/>
+        <p:txBody>
+          <a:bodyPr/>
+          <a:lstStyle/>
+          <a:p>
+            <a:endParaRPr lang="en-US" dirty="0"/>
+          </a:p>
+        </p:txBody>
+      </p:sp>
+      <p:sp>
+        <p:nvSpPr>
+          <p:cNvPr id="4" name="Slide Number Placeholder 3"/>
+          <p:cNvSpPr>
+            <a:spLocks noGrp="1"/>
+          </p:cNvSpPr>
+          <p:nvPr>
+            <p:ph type="sldNum" sz="quarter" idx="10"/>
+          </p:nvPr>
+        </p:nvSpPr>
+        <p:spPr/>
+        <p:txBody>
+          <a:bodyPr/>
+          <a:lstStyle/>
+          <a:p>
+            <a:fld id="{88156F16-9966-4EDC-933D-6170A05B6017}" type="slidenum">
+              <a:rPr lang="en-US" smtClean="0"/>
+              <a:t>16</a:t>
             </a:fld>
             <a:endParaRPr lang="en-US"/>
           </a:p>
@@ -1459,7 +1544,7 @@
           <p:cNvPr id="4" name="Text Placeholder 3">
             <a:extLst>
               <a:ext uri="{FF2B5EF4-FFF2-40B4-BE49-F238E27FC236}">
-                <a16:creationId xmlns:a16="http://schemas.microsoft.com/office/drawing/2014/main" xmlns="" id="{8850B379-F419-41FB-9123-96081B074583}"/>
+                <a16:creationId xmlns="" xmlns:a16="http://schemas.microsoft.com/office/drawing/2014/main" id="{8850B379-F419-41FB-9123-96081B074583}"/>
               </a:ext>
             </a:extLst>
           </p:cNvPr>
@@ -1750,7 +1835,7 @@
           <p:cNvPr id="5" name="Picture 4">
             <a:extLst>
               <a:ext uri="{FF2B5EF4-FFF2-40B4-BE49-F238E27FC236}">
-                <a16:creationId xmlns:a16="http://schemas.microsoft.com/office/drawing/2014/main" xmlns="" id="{A5059957-9534-4FB9-8820-2343C3BF0E8F}"/>
+                <a16:creationId xmlns="" xmlns:a16="http://schemas.microsoft.com/office/drawing/2014/main" id="{A5059957-9534-4FB9-8820-2343C3BF0E8F}"/>
               </a:ext>
             </a:extLst>
           </p:cNvPr>
@@ -1780,7 +1865,7 @@
           <p:cNvPr id="4" name="Text Placeholder 3">
             <a:extLst>
               <a:ext uri="{FF2B5EF4-FFF2-40B4-BE49-F238E27FC236}">
-                <a16:creationId xmlns:a16="http://schemas.microsoft.com/office/drawing/2014/main" xmlns="" id="{8850B379-F419-41FB-9123-96081B074583}"/>
+                <a16:creationId xmlns="" xmlns:a16="http://schemas.microsoft.com/office/drawing/2014/main" id="{8850B379-F419-41FB-9123-96081B074583}"/>
               </a:ext>
             </a:extLst>
           </p:cNvPr>
@@ -2137,7 +2222,7 @@
           <p:cNvPr id="7" name="Google Shape;20;p4">
             <a:extLst>
               <a:ext uri="{FF2B5EF4-FFF2-40B4-BE49-F238E27FC236}">
-                <a16:creationId xmlns:a16="http://schemas.microsoft.com/office/drawing/2014/main" xmlns="" id="{537643E4-B983-42CC-9421-9C4C107A5DA4}"/>
+                <a16:creationId xmlns="" xmlns:a16="http://schemas.microsoft.com/office/drawing/2014/main" id="{537643E4-B983-42CC-9421-9C4C107A5DA4}"/>
               </a:ext>
             </a:extLst>
           </p:cNvPr>
@@ -3566,7 +3651,7 @@
           <p:cNvPr id="5" name="Picture 4" descr="A screenshot of a cell phone&#10;&#10;Description automatically generated">
             <a:extLst>
               <a:ext uri="{FF2B5EF4-FFF2-40B4-BE49-F238E27FC236}">
-                <a16:creationId xmlns="" xmlns:a16="http://schemas.microsoft.com/office/drawing/2014/main" id="{8C303482-C4AE-E049-A13A-50CE832D1F2A}"/>
+                <a16:creationId xmlns:a16="http://schemas.microsoft.com/office/drawing/2014/main" xmlns="" id="{8C303482-C4AE-E049-A13A-50CE832D1F2A}"/>
               </a:ext>
             </a:extLst>
           </p:cNvPr>
@@ -5108,6 +5193,728 @@
       </p:grpSpPr>
       <p:sp>
         <p:nvSpPr>
+          <p:cNvPr id="5" name="Rounded Rectangle 4"/>
+          <p:cNvSpPr/>
+          <p:nvPr/>
+        </p:nvSpPr>
+        <p:spPr>
+          <a:xfrm>
+            <a:off x="853570" y="853671"/>
+            <a:ext cx="7234527" cy="4851352"/>
+          </a:xfrm>
+          <a:prstGeom prst="roundRect">
+            <a:avLst>
+              <a:gd name="adj" fmla="val 4437"/>
+            </a:avLst>
+          </a:prstGeom>
+          <a:solidFill>
+            <a:srgbClr val="EDEDED"/>
+          </a:solidFill>
+          <a:ln>
+            <a:solidFill>
+              <a:srgbClr val="000000"/>
+            </a:solidFill>
+          </a:ln>
+          <a:effectLst/>
+        </p:spPr>
+        <p:style>
+          <a:lnRef idx="1">
+            <a:schemeClr val="accent1"/>
+          </a:lnRef>
+          <a:fillRef idx="3">
+            <a:schemeClr val="accent1"/>
+          </a:fillRef>
+          <a:effectRef idx="2">
+            <a:schemeClr val="accent1"/>
+          </a:effectRef>
+          <a:fontRef idx="minor">
+            <a:schemeClr val="lt1"/>
+          </a:fontRef>
+        </p:style>
+        <p:txBody>
+          <a:bodyPr rtlCol="0" anchor="ctr"/>
+          <a:lstStyle/>
+          <a:p>
+            <a:pPr algn="ctr"/>
+            <a:endParaRPr lang="en-US"/>
+          </a:p>
+        </p:txBody>
+      </p:sp>
+      <p:sp>
+        <p:nvSpPr>
+          <p:cNvPr id="6" name="Rectangle 5"/>
+          <p:cNvSpPr/>
+          <p:nvPr/>
+        </p:nvSpPr>
+        <p:spPr>
+          <a:xfrm>
+            <a:off x="863980" y="855015"/>
+            <a:ext cx="7213708" cy="1754327"/>
+          </a:xfrm>
+          <a:prstGeom prst="rect">
+            <a:avLst/>
+          </a:prstGeom>
+        </p:spPr>
+        <p:txBody>
+          <a:bodyPr wrap="square">
+            <a:spAutoFit/>
+          </a:bodyPr>
+          <a:lstStyle/>
+          <a:p>
+            <a:pPr algn="ctr"/>
+            <a:r>
+              <a:rPr lang="en-US" sz="5400" b="1" dirty="0" smtClean="0">
+                <a:solidFill>
+                  <a:srgbClr val="052B48"/>
+                </a:solidFill>
+                <a:latin typeface="Calibri"/>
+                <a:cs typeface="Calibri"/>
+              </a:rPr>
+              <a:t>Streaming from an </a:t>
+            </a:r>
+          </a:p>
+          <a:p>
+            <a:pPr algn="ctr"/>
+            <a:r>
+              <a:rPr lang="en-US" sz="5400" b="1" dirty="0" smtClean="0">
+                <a:solidFill>
+                  <a:srgbClr val="052B48"/>
+                </a:solidFill>
+                <a:latin typeface="Calibri"/>
+                <a:cs typeface="Calibri"/>
+              </a:rPr>
+              <a:t>S3 Bucket</a:t>
+            </a:r>
+            <a:endParaRPr lang="en-US" sz="5400" b="1" dirty="0">
+              <a:solidFill>
+                <a:srgbClr val="052B48"/>
+              </a:solidFill>
+              <a:latin typeface="Calibri"/>
+              <a:cs typeface="Calibri"/>
+            </a:endParaRPr>
+          </a:p>
+        </p:txBody>
+      </p:sp>
+      <p:sp>
+        <p:nvSpPr>
+          <p:cNvPr id="17" name="Trapezoid 16"/>
+          <p:cNvSpPr/>
+          <p:nvPr/>
+        </p:nvSpPr>
+        <p:spPr>
+          <a:xfrm flipV="1">
+            <a:off x="1054894" y="3262874"/>
+            <a:ext cx="2498432" cy="2136087"/>
+          </a:xfrm>
+          <a:prstGeom prst="trapezoid">
+            <a:avLst>
+              <a:gd name="adj" fmla="val 17917"/>
+            </a:avLst>
+          </a:prstGeom>
+          <a:solidFill>
+            <a:schemeClr val="accent2"/>
+          </a:solidFill>
+          <a:ln>
+            <a:noFill/>
+          </a:ln>
+          <a:effectLst/>
+        </p:spPr>
+        <p:style>
+          <a:lnRef idx="1">
+            <a:schemeClr val="accent1"/>
+          </a:lnRef>
+          <a:fillRef idx="3">
+            <a:schemeClr val="accent1"/>
+          </a:fillRef>
+          <a:effectRef idx="2">
+            <a:schemeClr val="accent1"/>
+          </a:effectRef>
+          <a:fontRef idx="minor">
+            <a:schemeClr val="lt1"/>
+          </a:fontRef>
+        </p:style>
+        <p:txBody>
+          <a:bodyPr rtlCol="0" anchor="ctr"/>
+          <a:lstStyle/>
+          <a:p>
+            <a:pPr algn="ctr"/>
+            <a:endParaRPr lang="en-US"/>
+          </a:p>
+        </p:txBody>
+      </p:sp>
+      <p:sp>
+        <p:nvSpPr>
+          <p:cNvPr id="18" name="Oval 17"/>
+          <p:cNvSpPr/>
+          <p:nvPr/>
+        </p:nvSpPr>
+        <p:spPr>
+          <a:xfrm>
+            <a:off x="985492" y="2780495"/>
+            <a:ext cx="2630294" cy="652317"/>
+          </a:xfrm>
+          <a:prstGeom prst="ellipse">
+            <a:avLst/>
+          </a:prstGeom>
+          <a:solidFill>
+            <a:srgbClr val="ED7D31"/>
+          </a:solidFill>
+          <a:ln w="76200" cmpd="sng">
+            <a:solidFill>
+              <a:schemeClr val="accent3">
+                <a:lumMod val="20000"/>
+                <a:lumOff val="80000"/>
+              </a:schemeClr>
+            </a:solidFill>
+          </a:ln>
+          <a:effectLst/>
+        </p:spPr>
+        <p:style>
+          <a:lnRef idx="1">
+            <a:schemeClr val="accent1"/>
+          </a:lnRef>
+          <a:fillRef idx="3">
+            <a:schemeClr val="accent1"/>
+          </a:fillRef>
+          <a:effectRef idx="2">
+            <a:schemeClr val="accent1"/>
+          </a:effectRef>
+          <a:fontRef idx="minor">
+            <a:schemeClr val="lt1"/>
+          </a:fontRef>
+        </p:style>
+        <p:txBody>
+          <a:bodyPr rtlCol="0" anchor="ctr"/>
+          <a:lstStyle/>
+          <a:p>
+            <a:pPr algn="ctr"/>
+            <a:endParaRPr lang="en-US"/>
+          </a:p>
+        </p:txBody>
+      </p:sp>
+      <p:grpSp>
+        <p:nvGrpSpPr>
+          <p:cNvPr id="25" name="Group 24"/>
+          <p:cNvGrpSpPr/>
+          <p:nvPr/>
+        </p:nvGrpSpPr>
+        <p:grpSpPr>
+          <a:xfrm>
+            <a:off x="1531496" y="3563238"/>
+            <a:ext cx="1390281" cy="1683064"/>
+            <a:chOff x="3606582" y="3649328"/>
+            <a:chExt cx="1713199" cy="1971082"/>
+          </a:xfrm>
+        </p:grpSpPr>
+        <p:sp>
+          <p:nvSpPr>
+            <p:cNvPr id="20" name="Folded Corner 19"/>
+            <p:cNvSpPr/>
+            <p:nvPr/>
+          </p:nvSpPr>
+          <p:spPr>
+            <a:xfrm rot="10800000" flipH="1">
+              <a:off x="3899840" y="3720272"/>
+              <a:ext cx="1419941" cy="1900138"/>
+            </a:xfrm>
+            <a:prstGeom prst="foldedCorner">
+              <a:avLst>
+                <a:gd name="adj" fmla="val 26556"/>
+              </a:avLst>
+            </a:prstGeom>
+            <a:solidFill>
+              <a:srgbClr val="052A48"/>
+            </a:solidFill>
+            <a:ln w="28575" cmpd="sng">
+              <a:solidFill>
+                <a:schemeClr val="bg1"/>
+              </a:solidFill>
+            </a:ln>
+            <a:effectLst/>
+          </p:spPr>
+          <p:style>
+            <a:lnRef idx="1">
+              <a:schemeClr val="accent1"/>
+            </a:lnRef>
+            <a:fillRef idx="3">
+              <a:schemeClr val="accent1"/>
+            </a:fillRef>
+            <a:effectRef idx="2">
+              <a:schemeClr val="accent1"/>
+            </a:effectRef>
+            <a:fontRef idx="minor">
+              <a:schemeClr val="lt1"/>
+            </a:fontRef>
+          </p:style>
+          <p:txBody>
+            <a:bodyPr rtlCol="0" anchor="ctr"/>
+            <a:lstStyle/>
+            <a:p>
+              <a:pPr algn="ctr"/>
+              <a:r>
+                <a:rPr lang="en-US" u="sng" dirty="0" smtClean="0"/>
+                <a:t>												   </a:t>
+              </a:r>
+              <a:endParaRPr lang="en-US" u="sng" dirty="0"/>
+            </a:p>
+          </p:txBody>
+        </p:sp>
+        <p:grpSp>
+          <p:nvGrpSpPr>
+            <p:cNvPr id="21" name="Group 20"/>
+            <p:cNvGrpSpPr>
+              <a:grpSpLocks noChangeAspect="1"/>
+            </p:cNvGrpSpPr>
+            <p:nvPr/>
+          </p:nvGrpSpPr>
+          <p:grpSpPr>
+            <a:xfrm>
+              <a:off x="3606582" y="3649328"/>
+              <a:ext cx="947929" cy="947929"/>
+              <a:chOff x="2259923" y="2660201"/>
+              <a:chExt cx="1959561" cy="1962561"/>
+            </a:xfrm>
+          </p:grpSpPr>
+          <p:sp>
+            <p:nvSpPr>
+              <p:cNvPr id="22" name="Oval 21"/>
+              <p:cNvSpPr/>
+              <p:nvPr/>
+            </p:nvSpPr>
+            <p:spPr>
+              <a:xfrm>
+                <a:off x="2259923" y="2660201"/>
+                <a:ext cx="1959561" cy="1962561"/>
+              </a:xfrm>
+              <a:prstGeom prst="ellipse">
+                <a:avLst/>
+              </a:prstGeom>
+              <a:solidFill>
+                <a:schemeClr val="bg1"/>
+              </a:solidFill>
+              <a:ln w="76200" cmpd="sng">
+                <a:solidFill>
+                  <a:srgbClr val="052A48"/>
+                </a:solidFill>
+              </a:ln>
+              <a:effectLst/>
+            </p:spPr>
+            <p:style>
+              <a:lnRef idx="1">
+                <a:schemeClr val="accent1"/>
+              </a:lnRef>
+              <a:fillRef idx="3">
+                <a:schemeClr val="accent1"/>
+              </a:fillRef>
+              <a:effectRef idx="2">
+                <a:schemeClr val="accent1"/>
+              </a:effectRef>
+              <a:fontRef idx="minor">
+                <a:schemeClr val="lt1"/>
+              </a:fontRef>
+            </p:style>
+            <p:txBody>
+              <a:bodyPr rtlCol="0" anchor="ctr"/>
+              <a:lstStyle/>
+              <a:p>
+                <a:endParaRPr lang="en-US" sz="4400" dirty="0"/>
+              </a:p>
+            </p:txBody>
+          </p:sp>
+          <p:pic>
+            <p:nvPicPr>
+              <p:cNvPr id="23" name="Picture 22" descr="logo_brain_transp_512x512.png"/>
+              <p:cNvPicPr>
+                <a:picLocks noChangeAspect="1"/>
+              </p:cNvPicPr>
+              <p:nvPr/>
+            </p:nvPicPr>
+            <p:blipFill>
+              <a:blip r:embed="rId3">
+                <a:extLst>
+                  <a:ext uri="{28A0092B-C50C-407E-A947-70E740481C1C}">
+                    <a14:useLocalDpi xmlns:a14="http://schemas.microsoft.com/office/drawing/2010/main" val="0"/>
+                  </a:ext>
+                </a:extLst>
+              </a:blip>
+              <a:stretch>
+                <a:fillRect/>
+              </a:stretch>
+            </p:blipFill>
+            <p:spPr>
+              <a:xfrm>
+                <a:off x="2393887" y="2838486"/>
+                <a:ext cx="1703898" cy="1703898"/>
+              </a:xfrm>
+              <a:prstGeom prst="rect">
+                <a:avLst/>
+              </a:prstGeom>
+            </p:spPr>
+          </p:pic>
+        </p:grpSp>
+      </p:grpSp>
+      <p:grpSp>
+        <p:nvGrpSpPr>
+          <p:cNvPr id="30" name="Group 29"/>
+          <p:cNvGrpSpPr/>
+          <p:nvPr/>
+        </p:nvGrpSpPr>
+        <p:grpSpPr>
+          <a:xfrm>
+            <a:off x="5517371" y="3095041"/>
+            <a:ext cx="2213888" cy="2779488"/>
+            <a:chOff x="5065982" y="2866031"/>
+            <a:chExt cx="2581995" cy="3004819"/>
+          </a:xfrm>
+        </p:grpSpPr>
+        <p:sp>
+          <p:nvSpPr>
+            <p:cNvPr id="26" name="Rounded Rectangle 25"/>
+            <p:cNvSpPr/>
+            <p:nvPr/>
+          </p:nvSpPr>
+          <p:spPr>
+            <a:xfrm>
+              <a:off x="5094024" y="2866031"/>
+              <a:ext cx="2526191" cy="1693248"/>
+            </a:xfrm>
+            <a:prstGeom prst="roundRect">
+              <a:avLst/>
+            </a:prstGeom>
+            <a:solidFill>
+              <a:schemeClr val="bg1"/>
+            </a:solidFill>
+            <a:ln w="57150" cmpd="sng">
+              <a:solidFill>
+                <a:srgbClr val="052A48"/>
+              </a:solidFill>
+            </a:ln>
+            <a:effectLst/>
+            <a:scene3d>
+              <a:camera prst="perspectiveFront"/>
+              <a:lightRig rig="threePt" dir="t"/>
+            </a:scene3d>
+            <a:sp3d>
+              <a:bevelT w="101600" h="88900"/>
+              <a:bevelB w="88900" h="101600"/>
+            </a:sp3d>
+          </p:spPr>
+          <p:style>
+            <a:lnRef idx="1">
+              <a:schemeClr val="accent1"/>
+            </a:lnRef>
+            <a:fillRef idx="3">
+              <a:schemeClr val="accent1"/>
+            </a:fillRef>
+            <a:effectRef idx="2">
+              <a:schemeClr val="accent1"/>
+            </a:effectRef>
+            <a:fontRef idx="minor">
+              <a:schemeClr val="lt1"/>
+            </a:fontRef>
+          </p:style>
+          <p:txBody>
+            <a:bodyPr rtlCol="0" anchor="ctr"/>
+            <a:lstStyle/>
+            <a:p>
+              <a:pPr algn="ctr"/>
+              <a:endParaRPr lang="en-US"/>
+            </a:p>
+          </p:txBody>
+        </p:sp>
+        <p:sp>
+          <p:nvSpPr>
+            <p:cNvPr id="27" name="Rounded Rectangle 26"/>
+            <p:cNvSpPr/>
+            <p:nvPr/>
+          </p:nvSpPr>
+          <p:spPr>
+            <a:xfrm>
+              <a:off x="5065982" y="4171949"/>
+              <a:ext cx="2581995" cy="1698901"/>
+            </a:xfrm>
+            <a:prstGeom prst="roundRect">
+              <a:avLst/>
+            </a:prstGeom>
+            <a:solidFill>
+              <a:srgbClr val="052A48"/>
+            </a:solidFill>
+            <a:ln w="57150" cmpd="sng">
+              <a:solidFill>
+                <a:srgbClr val="052A48"/>
+              </a:solidFill>
+            </a:ln>
+            <a:effectLst/>
+            <a:scene3d>
+              <a:camera prst="perspectiveFront">
+                <a:rot lat="6780000" lon="0" rev="0"/>
+              </a:camera>
+              <a:lightRig rig="threePt" dir="t"/>
+            </a:scene3d>
+            <a:sp3d>
+              <a:bevelT w="95250" h="133350"/>
+            </a:sp3d>
+          </p:spPr>
+          <p:style>
+            <a:lnRef idx="1">
+              <a:schemeClr val="accent1"/>
+            </a:lnRef>
+            <a:fillRef idx="3">
+              <a:schemeClr val="accent1"/>
+            </a:fillRef>
+            <a:effectRef idx="2">
+              <a:schemeClr val="accent1"/>
+            </a:effectRef>
+            <a:fontRef idx="minor">
+              <a:schemeClr val="lt1"/>
+            </a:fontRef>
+          </p:style>
+          <p:txBody>
+            <a:bodyPr rtlCol="0" anchor="ctr"/>
+            <a:lstStyle/>
+            <a:p>
+              <a:pPr algn="ctr"/>
+              <a:endParaRPr lang="en-US"/>
+            </a:p>
+          </p:txBody>
+        </p:sp>
+        <p:sp>
+          <p:nvSpPr>
+            <p:cNvPr id="28" name="Rounded Rectangle 27"/>
+            <p:cNvSpPr/>
+            <p:nvPr/>
+          </p:nvSpPr>
+          <p:spPr>
+            <a:xfrm>
+              <a:off x="5225887" y="4406608"/>
+              <a:ext cx="2276348" cy="811926"/>
+            </a:xfrm>
+            <a:prstGeom prst="roundRect">
+              <a:avLst/>
+            </a:prstGeom>
+            <a:solidFill>
+              <a:schemeClr val="bg1"/>
+            </a:solidFill>
+            <a:ln w="57150" cmpd="sng">
+              <a:noFill/>
+            </a:ln>
+            <a:effectLst/>
+            <a:scene3d>
+              <a:camera prst="perspectiveFront">
+                <a:rot lat="6780000" lon="0" rev="0"/>
+              </a:camera>
+              <a:lightRig rig="brightRoom" dir="t"/>
+            </a:scene3d>
+            <a:sp3d prstMaterial="matte">
+              <a:contourClr>
+                <a:schemeClr val="tx1"/>
+              </a:contourClr>
+            </a:sp3d>
+          </p:spPr>
+          <p:style>
+            <a:lnRef idx="1">
+              <a:schemeClr val="accent1"/>
+            </a:lnRef>
+            <a:fillRef idx="3">
+              <a:schemeClr val="accent1"/>
+            </a:fillRef>
+            <a:effectRef idx="2">
+              <a:schemeClr val="accent1"/>
+            </a:effectRef>
+            <a:fontRef idx="minor">
+              <a:schemeClr val="lt1"/>
+            </a:fontRef>
+          </p:style>
+          <p:txBody>
+            <a:bodyPr rtlCol="0" anchor="ctr"/>
+            <a:lstStyle/>
+            <a:p>
+              <a:pPr algn="ctr"/>
+              <a:endParaRPr lang="en-US"/>
+            </a:p>
+          </p:txBody>
+        </p:sp>
+        <p:sp>
+          <p:nvSpPr>
+            <p:cNvPr id="29" name="Rounded Rectangle 28"/>
+            <p:cNvSpPr/>
+            <p:nvPr/>
+          </p:nvSpPr>
+          <p:spPr>
+            <a:xfrm>
+              <a:off x="5891853" y="4899312"/>
+              <a:ext cx="923313" cy="443862"/>
+            </a:xfrm>
+            <a:prstGeom prst="roundRect">
+              <a:avLst/>
+            </a:prstGeom>
+            <a:solidFill>
+              <a:schemeClr val="bg1"/>
+            </a:solidFill>
+            <a:ln w="57150" cmpd="sng">
+              <a:noFill/>
+            </a:ln>
+            <a:effectLst/>
+            <a:scene3d>
+              <a:camera prst="perspectiveFront">
+                <a:rot lat="6780000" lon="0" rev="0"/>
+              </a:camera>
+              <a:lightRig rig="brightRoom" dir="t"/>
+            </a:scene3d>
+            <a:sp3d prstMaterial="matte">
+              <a:contourClr>
+                <a:schemeClr val="tx1"/>
+              </a:contourClr>
+            </a:sp3d>
+          </p:spPr>
+          <p:style>
+            <a:lnRef idx="1">
+              <a:schemeClr val="accent1"/>
+            </a:lnRef>
+            <a:fillRef idx="3">
+              <a:schemeClr val="accent1"/>
+            </a:fillRef>
+            <a:effectRef idx="2">
+              <a:schemeClr val="accent1"/>
+            </a:effectRef>
+            <a:fontRef idx="minor">
+              <a:schemeClr val="lt1"/>
+            </a:fontRef>
+          </p:style>
+          <p:txBody>
+            <a:bodyPr rtlCol="0" anchor="ctr"/>
+            <a:lstStyle/>
+            <a:p>
+              <a:pPr algn="ctr"/>
+              <a:endParaRPr lang="en-US"/>
+            </a:p>
+          </p:txBody>
+        </p:sp>
+      </p:grpSp>
+      <p:sp>
+        <p:nvSpPr>
+          <p:cNvPr id="32" name="Notched Right Arrow 31"/>
+          <p:cNvSpPr/>
+          <p:nvPr/>
+        </p:nvSpPr>
+        <p:spPr>
+          <a:xfrm>
+            <a:off x="3629667" y="3754291"/>
+            <a:ext cx="1700321" cy="985414"/>
+          </a:xfrm>
+          <a:prstGeom prst="notchedRightArrow">
+            <a:avLst/>
+          </a:prstGeom>
+          <a:solidFill>
+            <a:srgbClr val="052A48"/>
+          </a:solidFill>
+          <a:ln>
+            <a:noFill/>
+          </a:ln>
+          <a:effectLst/>
+        </p:spPr>
+        <p:style>
+          <a:lnRef idx="1">
+            <a:schemeClr val="accent1"/>
+          </a:lnRef>
+          <a:fillRef idx="3">
+            <a:schemeClr val="accent1"/>
+          </a:fillRef>
+          <a:effectRef idx="2">
+            <a:schemeClr val="accent1"/>
+          </a:effectRef>
+          <a:fontRef idx="minor">
+            <a:schemeClr val="lt1"/>
+          </a:fontRef>
+        </p:style>
+        <p:txBody>
+          <a:bodyPr rtlCol="0" anchor="ctr"/>
+          <a:lstStyle/>
+          <a:p>
+            <a:pPr algn="ctr"/>
+            <a:r>
+              <a:rPr lang="en-US" sz="1200" dirty="0" smtClean="0">
+                <a:latin typeface="Courier"/>
+                <a:cs typeface="Courier"/>
+              </a:rPr>
+              <a:t>010011101000101011101</a:t>
+            </a:r>
+            <a:r>
+              <a:rPr lang="mr-IN" sz="1200" dirty="0" smtClean="0">
+                <a:latin typeface="Courier"/>
+                <a:cs typeface="Courier"/>
+              </a:rPr>
+              <a:t>…</a:t>
+            </a:r>
+            <a:endParaRPr lang="en-US" sz="1200" dirty="0">
+              <a:latin typeface="Courier"/>
+              <a:cs typeface="Courier"/>
+            </a:endParaRPr>
+          </a:p>
+        </p:txBody>
+      </p:sp>
+      <p:pic>
+        <p:nvPicPr>
+          <p:cNvPr id="43" name="Picture 42" descr="logo_brain_transp_512x512.png"/>
+          <p:cNvPicPr>
+            <a:picLocks noChangeAspect="1"/>
+          </p:cNvPicPr>
+          <p:nvPr/>
+        </p:nvPicPr>
+        <p:blipFill>
+          <a:blip r:embed="rId3">
+            <a:extLst>
+              <a:ext uri="{28A0092B-C50C-407E-A947-70E740481C1C}">
+                <a14:useLocalDpi xmlns:a14="http://schemas.microsoft.com/office/drawing/2010/main" val="0"/>
+              </a:ext>
+            </a:extLst>
+          </a:blip>
+          <a:stretch>
+            <a:fillRect/>
+          </a:stretch>
+        </p:blipFill>
+        <p:spPr>
+          <a:xfrm>
+            <a:off x="5692336" y="3164609"/>
+            <a:ext cx="521649" cy="548044"/>
+          </a:xfrm>
+          <a:prstGeom prst="rect">
+            <a:avLst/>
+          </a:prstGeom>
+        </p:spPr>
+      </p:pic>
+    </p:spTree>
+    <p:extLst>
+      <p:ext uri="{BB962C8B-B14F-4D97-AF65-F5344CB8AC3E}">
+        <p14:creationId xmlns:p14="http://schemas.microsoft.com/office/powerpoint/2010/main" val="2812368335"/>
+      </p:ext>
+    </p:extLst>
+  </p:cSld>
+  <p:clrMapOvr>
+    <a:masterClrMapping/>
+  </p:clrMapOvr>
+</p:sld>
+</file>
+
+<file path=ppt/slides/slide12.xml><?xml version="1.0" encoding="utf-8"?>
+<p:sld xmlns:a="http://schemas.openxmlformats.org/drawingml/2006/main" xmlns:r="http://schemas.openxmlformats.org/officeDocument/2006/relationships" xmlns:p="http://schemas.openxmlformats.org/presentationml/2006/main">
+  <p:cSld>
+    <p:spTree>
+      <p:nvGrpSpPr>
+        <p:cNvPr id="1" name=""/>
+        <p:cNvGrpSpPr/>
+        <p:nvPr/>
+      </p:nvGrpSpPr>
+      <p:grpSpPr>
+        <a:xfrm>
+          <a:off x="0" y="0"/>
+          <a:ext cx="0" cy="0"/>
+          <a:chOff x="0" y="0"/>
+          <a:chExt cx="0" cy="0"/>
+        </a:xfrm>
+      </p:grpSpPr>
+      <p:sp>
+        <p:nvSpPr>
           <p:cNvPr id="27" name="Rounded Rectangle 26"/>
           <p:cNvSpPr/>
           <p:nvPr/>
@@ -5309,7 +6116,7 @@
 </p:sld>
 </file>
 
-<file path=ppt/slides/slide12.xml><?xml version="1.0" encoding="utf-8"?>
+<file path=ppt/slides/slide13.xml><?xml version="1.0" encoding="utf-8"?>
 <p:sld xmlns:a="http://schemas.openxmlformats.org/drawingml/2006/main" xmlns:r="http://schemas.openxmlformats.org/officeDocument/2006/relationships" xmlns:p="http://schemas.openxmlformats.org/presentationml/2006/main">
   <p:cSld>
     <p:spTree>
@@ -5449,338 +6256,6 @@
     <p:extLst>
       <p:ext uri="{BB962C8B-B14F-4D97-AF65-F5344CB8AC3E}">
         <p14:creationId xmlns:p14="http://schemas.microsoft.com/office/powerpoint/2010/main" val="3305643027"/>
-      </p:ext>
-    </p:extLst>
-  </p:cSld>
-  <p:clrMapOvr>
-    <a:masterClrMapping/>
-  </p:clrMapOvr>
-</p:sld>
-</file>
-
-<file path=ppt/slides/slide13.xml><?xml version="1.0" encoding="utf-8"?>
-<p:sld xmlns:a="http://schemas.openxmlformats.org/drawingml/2006/main" xmlns:r="http://schemas.openxmlformats.org/officeDocument/2006/relationships" xmlns:p="http://schemas.openxmlformats.org/presentationml/2006/main">
-  <p:cSld>
-    <p:spTree>
-      <p:nvGrpSpPr>
-        <p:cNvPr id="1" name=""/>
-        <p:cNvGrpSpPr/>
-        <p:nvPr/>
-      </p:nvGrpSpPr>
-      <p:grpSpPr>
-        <a:xfrm>
-          <a:off x="0" y="0"/>
-          <a:ext cx="0" cy="0"/>
-          <a:chOff x="0" y="0"/>
-          <a:chExt cx="0" cy="0"/>
-        </a:xfrm>
-      </p:grpSpPr>
-      <p:sp>
-        <p:nvSpPr>
-          <p:cNvPr id="27" name="Rounded Rectangle 26"/>
-          <p:cNvSpPr/>
-          <p:nvPr/>
-        </p:nvSpPr>
-        <p:spPr>
-          <a:xfrm>
-            <a:off x="853570" y="853671"/>
-            <a:ext cx="7234527" cy="4851352"/>
-          </a:xfrm>
-          <a:prstGeom prst="roundRect">
-            <a:avLst>
-              <a:gd name="adj" fmla="val 4437"/>
-            </a:avLst>
-          </a:prstGeom>
-          <a:solidFill>
-            <a:srgbClr val="EDEDED"/>
-          </a:solidFill>
-          <a:ln>
-            <a:solidFill>
-              <a:srgbClr val="000000"/>
-            </a:solidFill>
-          </a:ln>
-          <a:effectLst/>
-        </p:spPr>
-        <p:style>
-          <a:lnRef idx="1">
-            <a:schemeClr val="accent1"/>
-          </a:lnRef>
-          <a:fillRef idx="3">
-            <a:schemeClr val="accent1"/>
-          </a:fillRef>
-          <a:effectRef idx="2">
-            <a:schemeClr val="accent1"/>
-          </a:effectRef>
-          <a:fontRef idx="minor">
-            <a:schemeClr val="lt1"/>
-          </a:fontRef>
-        </p:style>
-        <p:txBody>
-          <a:bodyPr rtlCol="0" anchor="ctr"/>
-          <a:lstStyle/>
-          <a:p>
-            <a:pPr algn="ctr"/>
-            <a:endParaRPr lang="en-US"/>
-          </a:p>
-        </p:txBody>
-      </p:sp>
-      <p:sp>
-        <p:nvSpPr>
-          <p:cNvPr id="26" name="Rectangle 25"/>
-          <p:cNvSpPr/>
-          <p:nvPr/>
-        </p:nvSpPr>
-        <p:spPr>
-          <a:xfrm>
-            <a:off x="863980" y="855015"/>
-            <a:ext cx="7213708" cy="2585323"/>
-          </a:xfrm>
-          <a:prstGeom prst="rect">
-            <a:avLst/>
-          </a:prstGeom>
-        </p:spPr>
-        <p:txBody>
-          <a:bodyPr wrap="square">
-            <a:spAutoFit/>
-          </a:bodyPr>
-          <a:lstStyle/>
-          <a:p>
-            <a:pPr algn="ctr"/>
-            <a:r>
-              <a:rPr lang="en-US" sz="5400" b="1" dirty="0" smtClean="0">
-                <a:solidFill>
-                  <a:srgbClr val="052B48"/>
-                </a:solidFill>
-                <a:latin typeface="Calibri"/>
-                <a:cs typeface="Calibri"/>
-              </a:rPr>
-              <a:t>Adding/Removing Containers from an NWB File </a:t>
-            </a:r>
-            <a:endParaRPr lang="en-US" sz="5400" b="1" dirty="0">
-              <a:solidFill>
-                <a:srgbClr val="052B48"/>
-              </a:solidFill>
-              <a:latin typeface="Calibri"/>
-              <a:cs typeface="Calibri"/>
-            </a:endParaRPr>
-          </a:p>
-        </p:txBody>
-      </p:sp>
-      <p:sp>
-        <p:nvSpPr>
-          <p:cNvPr id="3" name="Folded Corner 2"/>
-          <p:cNvSpPr/>
-          <p:nvPr/>
-        </p:nvSpPr>
-        <p:spPr>
-          <a:xfrm rot="10800000" flipH="1">
-            <a:off x="3839842" y="3460251"/>
-            <a:ext cx="1419941" cy="1900138"/>
-          </a:xfrm>
-          <a:prstGeom prst="foldedCorner">
-            <a:avLst>
-              <a:gd name="adj" fmla="val 26556"/>
-            </a:avLst>
-          </a:prstGeom>
-          <a:solidFill>
-            <a:srgbClr val="052A48"/>
-          </a:solidFill>
-          <a:ln w="28575" cmpd="sng">
-            <a:solidFill>
-              <a:schemeClr val="bg1"/>
-            </a:solidFill>
-          </a:ln>
-          <a:effectLst/>
-        </p:spPr>
-        <p:style>
-          <a:lnRef idx="1">
-            <a:schemeClr val="accent1"/>
-          </a:lnRef>
-          <a:fillRef idx="3">
-            <a:schemeClr val="accent1"/>
-          </a:fillRef>
-          <a:effectRef idx="2">
-            <a:schemeClr val="accent1"/>
-          </a:effectRef>
-          <a:fontRef idx="minor">
-            <a:schemeClr val="lt1"/>
-          </a:fontRef>
-        </p:style>
-        <p:txBody>
-          <a:bodyPr rtlCol="0" anchor="ctr"/>
-          <a:lstStyle/>
-          <a:p>
-            <a:pPr algn="ctr"/>
-            <a:r>
-              <a:rPr lang="en-US" u="sng" dirty="0" smtClean="0"/>
-              <a:t>																			   </a:t>
-            </a:r>
-            <a:endParaRPr lang="en-US" u="sng" dirty="0"/>
-          </a:p>
-        </p:txBody>
-      </p:sp>
-      <p:sp>
-        <p:nvSpPr>
-          <p:cNvPr id="4" name="Oval 3"/>
-          <p:cNvSpPr/>
-          <p:nvPr/>
-        </p:nvSpPr>
-        <p:spPr>
-          <a:xfrm>
-            <a:off x="4939826" y="5048168"/>
-            <a:ext cx="579977" cy="601510"/>
-          </a:xfrm>
-          <a:prstGeom prst="ellipse">
-            <a:avLst/>
-          </a:prstGeom>
-          <a:solidFill>
-            <a:srgbClr val="052A48"/>
-          </a:solidFill>
-          <a:ln w="76200" cmpd="sng">
-            <a:solidFill>
-              <a:srgbClr val="FFFFFF"/>
-            </a:solidFill>
-          </a:ln>
-          <a:effectLst/>
-        </p:spPr>
-        <p:style>
-          <a:lnRef idx="1">
-            <a:schemeClr val="accent1"/>
-          </a:lnRef>
-          <a:fillRef idx="3">
-            <a:schemeClr val="accent1"/>
-          </a:fillRef>
-          <a:effectRef idx="2">
-            <a:schemeClr val="accent1"/>
-          </a:effectRef>
-          <a:fontRef idx="minor">
-            <a:schemeClr val="lt1"/>
-          </a:fontRef>
-        </p:style>
-        <p:txBody>
-          <a:bodyPr rtlCol="0" anchor="ctr"/>
-          <a:lstStyle/>
-          <a:p>
-            <a:endParaRPr lang="en-US" sz="4400" dirty="0"/>
-          </a:p>
-        </p:txBody>
-      </p:sp>
-      <p:sp>
-        <p:nvSpPr>
-          <p:cNvPr id="5" name="Rectangle 4"/>
-          <p:cNvSpPr/>
-          <p:nvPr/>
-        </p:nvSpPr>
-        <p:spPr>
-          <a:xfrm>
-            <a:off x="5013201" y="4804441"/>
-            <a:ext cx="415273" cy="923330"/>
-          </a:xfrm>
-          <a:prstGeom prst="rect">
-            <a:avLst/>
-          </a:prstGeom>
-          <a:effectLst/>
-        </p:spPr>
-        <p:txBody>
-          <a:bodyPr wrap="none">
-            <a:spAutoFit/>
-          </a:bodyPr>
-          <a:lstStyle/>
-          <a:p>
-            <a:r>
-              <a:rPr lang="en-US" sz="5400" b="1" dirty="0">
-                <a:solidFill>
-                  <a:schemeClr val="bg1"/>
-                </a:solidFill>
-              </a:rPr>
-              <a:t>-</a:t>
-            </a:r>
-          </a:p>
-        </p:txBody>
-      </p:sp>
-      <p:sp>
-        <p:nvSpPr>
-          <p:cNvPr id="8" name="Oval 7"/>
-          <p:cNvSpPr/>
-          <p:nvPr/>
-        </p:nvSpPr>
-        <p:spPr>
-          <a:xfrm>
-            <a:off x="4942253" y="4360489"/>
-            <a:ext cx="579977" cy="601510"/>
-          </a:xfrm>
-          <a:prstGeom prst="ellipse">
-            <a:avLst/>
-          </a:prstGeom>
-          <a:solidFill>
-            <a:srgbClr val="052A48"/>
-          </a:solidFill>
-          <a:ln w="76200" cmpd="sng">
-            <a:solidFill>
-              <a:srgbClr val="FFFFFF"/>
-            </a:solidFill>
-          </a:ln>
-          <a:effectLst/>
-        </p:spPr>
-        <p:style>
-          <a:lnRef idx="1">
-            <a:schemeClr val="accent1"/>
-          </a:lnRef>
-          <a:fillRef idx="3">
-            <a:schemeClr val="accent1"/>
-          </a:fillRef>
-          <a:effectRef idx="2">
-            <a:schemeClr val="accent1"/>
-          </a:effectRef>
-          <a:fontRef idx="minor">
-            <a:schemeClr val="lt1"/>
-          </a:fontRef>
-        </p:style>
-        <p:txBody>
-          <a:bodyPr rtlCol="0" anchor="ctr"/>
-          <a:lstStyle/>
-          <a:p>
-            <a:endParaRPr lang="en-US" sz="4400" dirty="0"/>
-          </a:p>
-        </p:txBody>
-      </p:sp>
-      <p:sp>
-        <p:nvSpPr>
-          <p:cNvPr id="9" name="Rectangle 8"/>
-          <p:cNvSpPr/>
-          <p:nvPr/>
-        </p:nvSpPr>
-        <p:spPr>
-          <a:xfrm>
-            <a:off x="4975628" y="4256776"/>
-            <a:ext cx="514183" cy="769441"/>
-          </a:xfrm>
-          <a:prstGeom prst="rect">
-            <a:avLst/>
-          </a:prstGeom>
-          <a:effectLst/>
-        </p:spPr>
-        <p:txBody>
-          <a:bodyPr wrap="none">
-            <a:spAutoFit/>
-          </a:bodyPr>
-          <a:lstStyle/>
-          <a:p>
-            <a:r>
-              <a:rPr lang="en-US" sz="4400" b="1" dirty="0">
-                <a:solidFill>
-                  <a:schemeClr val="bg1"/>
-                </a:solidFill>
-              </a:rPr>
-              <a:t>+</a:t>
-            </a:r>
-          </a:p>
-        </p:txBody>
-      </p:sp>
-    </p:spTree>
-    <p:extLst>
-      <p:ext uri="{BB962C8B-B14F-4D97-AF65-F5344CB8AC3E}">
-        <p14:creationId xmlns:p14="http://schemas.microsoft.com/office/powerpoint/2010/main" val="3909940052"/>
       </p:ext>
     </p:extLst>
   </p:cSld>
@@ -5865,6 +6340,338 @@
         <p:spPr>
           <a:xfrm>
             <a:off x="863980" y="855015"/>
+            <a:ext cx="7213708" cy="2585323"/>
+          </a:xfrm>
+          <a:prstGeom prst="rect">
+            <a:avLst/>
+          </a:prstGeom>
+        </p:spPr>
+        <p:txBody>
+          <a:bodyPr wrap="square">
+            <a:spAutoFit/>
+          </a:bodyPr>
+          <a:lstStyle/>
+          <a:p>
+            <a:pPr algn="ctr"/>
+            <a:r>
+              <a:rPr lang="en-US" sz="5400" b="1" dirty="0" smtClean="0">
+                <a:solidFill>
+                  <a:srgbClr val="052B48"/>
+                </a:solidFill>
+                <a:latin typeface="Calibri"/>
+                <a:cs typeface="Calibri"/>
+              </a:rPr>
+              <a:t>Adding/Removing Containers from an NWB File </a:t>
+            </a:r>
+            <a:endParaRPr lang="en-US" sz="5400" b="1" dirty="0">
+              <a:solidFill>
+                <a:srgbClr val="052B48"/>
+              </a:solidFill>
+              <a:latin typeface="Calibri"/>
+              <a:cs typeface="Calibri"/>
+            </a:endParaRPr>
+          </a:p>
+        </p:txBody>
+      </p:sp>
+      <p:sp>
+        <p:nvSpPr>
+          <p:cNvPr id="3" name="Folded Corner 2"/>
+          <p:cNvSpPr/>
+          <p:nvPr/>
+        </p:nvSpPr>
+        <p:spPr>
+          <a:xfrm rot="10800000" flipH="1">
+            <a:off x="3839842" y="3460251"/>
+            <a:ext cx="1419941" cy="1900138"/>
+          </a:xfrm>
+          <a:prstGeom prst="foldedCorner">
+            <a:avLst>
+              <a:gd name="adj" fmla="val 26556"/>
+            </a:avLst>
+          </a:prstGeom>
+          <a:solidFill>
+            <a:srgbClr val="052A48"/>
+          </a:solidFill>
+          <a:ln w="28575" cmpd="sng">
+            <a:solidFill>
+              <a:schemeClr val="bg1"/>
+            </a:solidFill>
+          </a:ln>
+          <a:effectLst/>
+        </p:spPr>
+        <p:style>
+          <a:lnRef idx="1">
+            <a:schemeClr val="accent1"/>
+          </a:lnRef>
+          <a:fillRef idx="3">
+            <a:schemeClr val="accent1"/>
+          </a:fillRef>
+          <a:effectRef idx="2">
+            <a:schemeClr val="accent1"/>
+          </a:effectRef>
+          <a:fontRef idx="minor">
+            <a:schemeClr val="lt1"/>
+          </a:fontRef>
+        </p:style>
+        <p:txBody>
+          <a:bodyPr rtlCol="0" anchor="ctr"/>
+          <a:lstStyle/>
+          <a:p>
+            <a:pPr algn="ctr"/>
+            <a:r>
+              <a:rPr lang="en-US" u="sng" dirty="0" smtClean="0"/>
+              <a:t>																			   </a:t>
+            </a:r>
+            <a:endParaRPr lang="en-US" u="sng" dirty="0"/>
+          </a:p>
+        </p:txBody>
+      </p:sp>
+      <p:sp>
+        <p:nvSpPr>
+          <p:cNvPr id="4" name="Oval 3"/>
+          <p:cNvSpPr/>
+          <p:nvPr/>
+        </p:nvSpPr>
+        <p:spPr>
+          <a:xfrm>
+            <a:off x="4939826" y="5048168"/>
+            <a:ext cx="579977" cy="601510"/>
+          </a:xfrm>
+          <a:prstGeom prst="ellipse">
+            <a:avLst/>
+          </a:prstGeom>
+          <a:solidFill>
+            <a:srgbClr val="052A48"/>
+          </a:solidFill>
+          <a:ln w="76200" cmpd="sng">
+            <a:solidFill>
+              <a:srgbClr val="FFFFFF"/>
+            </a:solidFill>
+          </a:ln>
+          <a:effectLst/>
+        </p:spPr>
+        <p:style>
+          <a:lnRef idx="1">
+            <a:schemeClr val="accent1"/>
+          </a:lnRef>
+          <a:fillRef idx="3">
+            <a:schemeClr val="accent1"/>
+          </a:fillRef>
+          <a:effectRef idx="2">
+            <a:schemeClr val="accent1"/>
+          </a:effectRef>
+          <a:fontRef idx="minor">
+            <a:schemeClr val="lt1"/>
+          </a:fontRef>
+        </p:style>
+        <p:txBody>
+          <a:bodyPr rtlCol="0" anchor="ctr"/>
+          <a:lstStyle/>
+          <a:p>
+            <a:endParaRPr lang="en-US" sz="4400" dirty="0"/>
+          </a:p>
+        </p:txBody>
+      </p:sp>
+      <p:sp>
+        <p:nvSpPr>
+          <p:cNvPr id="5" name="Rectangle 4"/>
+          <p:cNvSpPr/>
+          <p:nvPr/>
+        </p:nvSpPr>
+        <p:spPr>
+          <a:xfrm>
+            <a:off x="5013201" y="4804441"/>
+            <a:ext cx="415273" cy="923330"/>
+          </a:xfrm>
+          <a:prstGeom prst="rect">
+            <a:avLst/>
+          </a:prstGeom>
+          <a:effectLst/>
+        </p:spPr>
+        <p:txBody>
+          <a:bodyPr wrap="none">
+            <a:spAutoFit/>
+          </a:bodyPr>
+          <a:lstStyle/>
+          <a:p>
+            <a:r>
+              <a:rPr lang="en-US" sz="5400" b="1" dirty="0">
+                <a:solidFill>
+                  <a:schemeClr val="bg1"/>
+                </a:solidFill>
+              </a:rPr>
+              <a:t>-</a:t>
+            </a:r>
+          </a:p>
+        </p:txBody>
+      </p:sp>
+      <p:sp>
+        <p:nvSpPr>
+          <p:cNvPr id="8" name="Oval 7"/>
+          <p:cNvSpPr/>
+          <p:nvPr/>
+        </p:nvSpPr>
+        <p:spPr>
+          <a:xfrm>
+            <a:off x="4942253" y="4360489"/>
+            <a:ext cx="579977" cy="601510"/>
+          </a:xfrm>
+          <a:prstGeom prst="ellipse">
+            <a:avLst/>
+          </a:prstGeom>
+          <a:solidFill>
+            <a:srgbClr val="052A48"/>
+          </a:solidFill>
+          <a:ln w="76200" cmpd="sng">
+            <a:solidFill>
+              <a:srgbClr val="FFFFFF"/>
+            </a:solidFill>
+          </a:ln>
+          <a:effectLst/>
+        </p:spPr>
+        <p:style>
+          <a:lnRef idx="1">
+            <a:schemeClr val="accent1"/>
+          </a:lnRef>
+          <a:fillRef idx="3">
+            <a:schemeClr val="accent1"/>
+          </a:fillRef>
+          <a:effectRef idx="2">
+            <a:schemeClr val="accent1"/>
+          </a:effectRef>
+          <a:fontRef idx="minor">
+            <a:schemeClr val="lt1"/>
+          </a:fontRef>
+        </p:style>
+        <p:txBody>
+          <a:bodyPr rtlCol="0" anchor="ctr"/>
+          <a:lstStyle/>
+          <a:p>
+            <a:endParaRPr lang="en-US" sz="4400" dirty="0"/>
+          </a:p>
+        </p:txBody>
+      </p:sp>
+      <p:sp>
+        <p:nvSpPr>
+          <p:cNvPr id="9" name="Rectangle 8"/>
+          <p:cNvSpPr/>
+          <p:nvPr/>
+        </p:nvSpPr>
+        <p:spPr>
+          <a:xfrm>
+            <a:off x="4975628" y="4256776"/>
+            <a:ext cx="514183" cy="769441"/>
+          </a:xfrm>
+          <a:prstGeom prst="rect">
+            <a:avLst/>
+          </a:prstGeom>
+          <a:effectLst/>
+        </p:spPr>
+        <p:txBody>
+          <a:bodyPr wrap="none">
+            <a:spAutoFit/>
+          </a:bodyPr>
+          <a:lstStyle/>
+          <a:p>
+            <a:r>
+              <a:rPr lang="en-US" sz="4400" b="1" dirty="0">
+                <a:solidFill>
+                  <a:schemeClr val="bg1"/>
+                </a:solidFill>
+              </a:rPr>
+              <a:t>+</a:t>
+            </a:r>
+          </a:p>
+        </p:txBody>
+      </p:sp>
+    </p:spTree>
+    <p:extLst>
+      <p:ext uri="{BB962C8B-B14F-4D97-AF65-F5344CB8AC3E}">
+        <p14:creationId xmlns:p14="http://schemas.microsoft.com/office/powerpoint/2010/main" val="3909940052"/>
+      </p:ext>
+    </p:extLst>
+  </p:cSld>
+  <p:clrMapOvr>
+    <a:masterClrMapping/>
+  </p:clrMapOvr>
+</p:sld>
+</file>
+
+<file path=ppt/slides/slide15.xml><?xml version="1.0" encoding="utf-8"?>
+<p:sld xmlns:a="http://schemas.openxmlformats.org/drawingml/2006/main" xmlns:r="http://schemas.openxmlformats.org/officeDocument/2006/relationships" xmlns:p="http://schemas.openxmlformats.org/presentationml/2006/main">
+  <p:cSld>
+    <p:spTree>
+      <p:nvGrpSpPr>
+        <p:cNvPr id="1" name=""/>
+        <p:cNvGrpSpPr/>
+        <p:nvPr/>
+      </p:nvGrpSpPr>
+      <p:grpSpPr>
+        <a:xfrm>
+          <a:off x="0" y="0"/>
+          <a:ext cx="0" cy="0"/>
+          <a:chOff x="0" y="0"/>
+          <a:chExt cx="0" cy="0"/>
+        </a:xfrm>
+      </p:grpSpPr>
+      <p:sp>
+        <p:nvSpPr>
+          <p:cNvPr id="27" name="Rounded Rectangle 26"/>
+          <p:cNvSpPr/>
+          <p:nvPr/>
+        </p:nvSpPr>
+        <p:spPr>
+          <a:xfrm>
+            <a:off x="853570" y="853671"/>
+            <a:ext cx="7234527" cy="4851352"/>
+          </a:xfrm>
+          <a:prstGeom prst="roundRect">
+            <a:avLst>
+              <a:gd name="adj" fmla="val 4437"/>
+            </a:avLst>
+          </a:prstGeom>
+          <a:solidFill>
+            <a:srgbClr val="EDEDED"/>
+          </a:solidFill>
+          <a:ln>
+            <a:solidFill>
+              <a:srgbClr val="000000"/>
+            </a:solidFill>
+          </a:ln>
+          <a:effectLst/>
+        </p:spPr>
+        <p:style>
+          <a:lnRef idx="1">
+            <a:schemeClr val="accent1"/>
+          </a:lnRef>
+          <a:fillRef idx="3">
+            <a:schemeClr val="accent1"/>
+          </a:fillRef>
+          <a:effectRef idx="2">
+            <a:schemeClr val="accent1"/>
+          </a:effectRef>
+          <a:fontRef idx="minor">
+            <a:schemeClr val="lt1"/>
+          </a:fontRef>
+        </p:style>
+        <p:txBody>
+          <a:bodyPr rtlCol="0" anchor="ctr"/>
+          <a:lstStyle/>
+          <a:p>
+            <a:pPr algn="ctr"/>
+            <a:endParaRPr lang="en-US"/>
+          </a:p>
+        </p:txBody>
+      </p:sp>
+      <p:sp>
+        <p:nvSpPr>
+          <p:cNvPr id="26" name="Rectangle 25"/>
+          <p:cNvSpPr/>
+          <p:nvPr/>
+        </p:nvSpPr>
+        <p:spPr>
+          <a:xfrm>
+            <a:off x="863980" y="855015"/>
             <a:ext cx="7213708" cy="923330"/>
           </a:xfrm>
           <a:prstGeom prst="rect">
@@ -6040,7 +6847,7 @@
 </p:sld>
 </file>
 
-<file path=ppt/slides/slide15.xml><?xml version="1.0" encoding="utf-8"?>
+<file path=ppt/slides/slide16.xml><?xml version="1.0" encoding="utf-8"?>
 <p:sld xmlns:a="http://schemas.openxmlformats.org/drawingml/2006/main" xmlns:r="http://schemas.openxmlformats.org/officeDocument/2006/relationships" xmlns:p="http://schemas.openxmlformats.org/presentationml/2006/main">
   <p:cSld>
     <p:spTree>
@@ -9317,7 +10124,7 @@
   <a:extraClrSchemeLst/>
   <a:extLst>
     <a:ext uri="{05A4C25C-085E-4340-85A3-A5531E510DB2}">
-      <thm15:themeFamily xmlns:thm15="http://schemas.microsoft.com/office/thememl/2012/main" xmlns="" name="Office Theme" id="{62F939B6-93AF-4DB8-9C6B-D6C7DFDC589F}" vid="{4A3C46E8-61CC-4603-A589-7422A47A8E4A}"/>
+      <thm15:themeFamily xmlns="" xmlns:thm15="http://schemas.microsoft.com/office/thememl/2012/main" name="Office Theme" id="{62F939B6-93AF-4DB8-9C6B-D6C7DFDC589F}" vid="{4A3C46E8-61CC-4603-A589-7422A47A8E4A}"/>
     </a:ext>
   </a:extLst>
 </a:theme>

</xml_diff>

<commit_message>
Add gallery tutorial for annotating time intervals
</commit_message>
<xml_diff>
--- a/docs/source/figures/gallery_thumbnails.pptx
+++ b/docs/source/figures/gallery_thumbnails.pptx
@@ -5,7 +5,7 @@
     <p:sldMasterId id="2147483660" r:id="rId1"/>
   </p:sldMasterIdLst>
   <p:notesMasterIdLst>
-    <p:notesMasterId r:id="rId17"/>
+    <p:notesMasterId r:id="rId18"/>
   </p:notesMasterIdLst>
   <p:sldIdLst>
     <p:sldId id="342" r:id="rId2"/>
@@ -19,10 +19,11 @@
     <p:sldId id="352" r:id="rId10"/>
     <p:sldId id="361" r:id="rId11"/>
     <p:sldId id="353" r:id="rId12"/>
-    <p:sldId id="354" r:id="rId13"/>
-    <p:sldId id="355" r:id="rId14"/>
-    <p:sldId id="358" r:id="rId15"/>
-    <p:sldId id="359" r:id="rId16"/>
+    <p:sldId id="363" r:id="rId13"/>
+    <p:sldId id="354" r:id="rId14"/>
+    <p:sldId id="355" r:id="rId15"/>
+    <p:sldId id="358" r:id="rId16"/>
+    <p:sldId id="359" r:id="rId17"/>
   </p:sldIdLst>
   <p:sldSz cx="12192000" cy="6858000"/>
   <p:notesSz cx="6858000" cy="9144000"/>
@@ -123,7 +124,7 @@
   </p:defaultTextStyle>
   <p:extLst>
     <p:ext uri="{EFAFB233-063F-42B5-8137-9DF3F51BA10A}">
-      <p15:sldGuideLst xmlns:p15="http://schemas.microsoft.com/office/powerpoint/2012/main" xmlns=""/>
+      <p15:sldGuideLst xmlns="" xmlns:p15="http://schemas.microsoft.com/office/powerpoint/2012/main"/>
     </p:ext>
   </p:extLst>
 </p:presentation>
@@ -211,7 +212,7 @@
           <a:p>
             <a:fld id="{4D6A40B9-902A-4E0E-AF39-1C357549AEE0}" type="datetimeFigureOut">
               <a:rPr lang="en-US" smtClean="0"/>
-              <a:t>7/16/21</a:t>
+              <a:t>8/12/21</a:t>
             </a:fld>
             <a:endParaRPr lang="en-US"/>
           </a:p>
@@ -627,7 +628,91 @@
           <a:p>
             <a:fld id="{88156F16-9966-4EDC-933D-6170A05B6017}" type="slidenum">
               <a:rPr lang="en-US" smtClean="0"/>
-              <a:t>15</a:t>
+              <a:t>12</a:t>
+            </a:fld>
+            <a:endParaRPr lang="en-US"/>
+          </a:p>
+        </p:txBody>
+      </p:sp>
+    </p:spTree>
+    <p:extLst>
+      <p:ext uri="{BB962C8B-B14F-4D97-AF65-F5344CB8AC3E}">
+        <p14:creationId xmlns:p14="http://schemas.microsoft.com/office/powerpoint/2010/main" val="1993993187"/>
+      </p:ext>
+    </p:extLst>
+  </p:cSld>
+  <p:clrMapOvr>
+    <a:masterClrMapping/>
+  </p:clrMapOvr>
+</p:notes>
+</file>
+
+<file path=ppt/notesSlides/notesSlide3.xml><?xml version="1.0" encoding="utf-8"?>
+<p:notes xmlns:a="http://schemas.openxmlformats.org/drawingml/2006/main" xmlns:r="http://schemas.openxmlformats.org/officeDocument/2006/relationships" xmlns:p="http://schemas.openxmlformats.org/presentationml/2006/main">
+  <p:cSld>
+    <p:spTree>
+      <p:nvGrpSpPr>
+        <p:cNvPr id="1" name=""/>
+        <p:cNvGrpSpPr/>
+        <p:nvPr/>
+      </p:nvGrpSpPr>
+      <p:grpSpPr>
+        <a:xfrm>
+          <a:off x="0" y="0"/>
+          <a:ext cx="0" cy="0"/>
+          <a:chOff x="0" y="0"/>
+          <a:chExt cx="0" cy="0"/>
+        </a:xfrm>
+      </p:grpSpPr>
+      <p:sp>
+        <p:nvSpPr>
+          <p:cNvPr id="2" name="Slide Image Placeholder 1"/>
+          <p:cNvSpPr>
+            <a:spLocks noGrp="1" noRot="1" noChangeAspect="1"/>
+          </p:cNvSpPr>
+          <p:nvPr>
+            <p:ph type="sldImg"/>
+          </p:nvPr>
+        </p:nvSpPr>
+        <p:spPr/>
+      </p:sp>
+      <p:sp>
+        <p:nvSpPr>
+          <p:cNvPr id="3" name="Notes Placeholder 2"/>
+          <p:cNvSpPr>
+            <a:spLocks noGrp="1"/>
+          </p:cNvSpPr>
+          <p:nvPr>
+            <p:ph type="body" idx="1"/>
+          </p:nvPr>
+        </p:nvSpPr>
+        <p:spPr/>
+        <p:txBody>
+          <a:bodyPr/>
+          <a:lstStyle/>
+          <a:p>
+            <a:endParaRPr lang="en-US" dirty="0"/>
+          </a:p>
+        </p:txBody>
+      </p:sp>
+      <p:sp>
+        <p:nvSpPr>
+          <p:cNvPr id="4" name="Slide Number Placeholder 3"/>
+          <p:cNvSpPr>
+            <a:spLocks noGrp="1"/>
+          </p:cNvSpPr>
+          <p:nvPr>
+            <p:ph type="sldNum" sz="quarter" idx="10"/>
+          </p:nvPr>
+        </p:nvSpPr>
+        <p:spPr/>
+        <p:txBody>
+          <a:bodyPr/>
+          <a:lstStyle/>
+          <a:p>
+            <a:fld id="{88156F16-9966-4EDC-933D-6170A05B6017}" type="slidenum">
+              <a:rPr lang="en-US" smtClean="0"/>
+              <a:t>16</a:t>
             </a:fld>
             <a:endParaRPr lang="en-US"/>
           </a:p>
@@ -1459,7 +1544,7 @@
           <p:cNvPr id="4" name="Text Placeholder 3">
             <a:extLst>
               <a:ext uri="{FF2B5EF4-FFF2-40B4-BE49-F238E27FC236}">
-                <a16:creationId xmlns:a16="http://schemas.microsoft.com/office/drawing/2014/main" xmlns="" id="{8850B379-F419-41FB-9123-96081B074583}"/>
+                <a16:creationId xmlns="" xmlns:a16="http://schemas.microsoft.com/office/drawing/2014/main" id="{8850B379-F419-41FB-9123-96081B074583}"/>
               </a:ext>
             </a:extLst>
           </p:cNvPr>
@@ -1750,7 +1835,7 @@
           <p:cNvPr id="5" name="Picture 4">
             <a:extLst>
               <a:ext uri="{FF2B5EF4-FFF2-40B4-BE49-F238E27FC236}">
-                <a16:creationId xmlns:a16="http://schemas.microsoft.com/office/drawing/2014/main" xmlns="" id="{A5059957-9534-4FB9-8820-2343C3BF0E8F}"/>
+                <a16:creationId xmlns="" xmlns:a16="http://schemas.microsoft.com/office/drawing/2014/main" id="{A5059957-9534-4FB9-8820-2343C3BF0E8F}"/>
               </a:ext>
             </a:extLst>
           </p:cNvPr>
@@ -1780,7 +1865,7 @@
           <p:cNvPr id="4" name="Text Placeholder 3">
             <a:extLst>
               <a:ext uri="{FF2B5EF4-FFF2-40B4-BE49-F238E27FC236}">
-                <a16:creationId xmlns:a16="http://schemas.microsoft.com/office/drawing/2014/main" xmlns="" id="{8850B379-F419-41FB-9123-96081B074583}"/>
+                <a16:creationId xmlns="" xmlns:a16="http://schemas.microsoft.com/office/drawing/2014/main" id="{8850B379-F419-41FB-9123-96081B074583}"/>
               </a:ext>
             </a:extLst>
           </p:cNvPr>
@@ -2137,7 +2222,7 @@
           <p:cNvPr id="7" name="Google Shape;20;p4">
             <a:extLst>
               <a:ext uri="{FF2B5EF4-FFF2-40B4-BE49-F238E27FC236}">
-                <a16:creationId xmlns:a16="http://schemas.microsoft.com/office/drawing/2014/main" xmlns="" id="{537643E4-B983-42CC-9421-9C4C107A5DA4}"/>
+                <a16:creationId xmlns="" xmlns:a16="http://schemas.microsoft.com/office/drawing/2014/main" id="{537643E4-B983-42CC-9421-9C4C107A5DA4}"/>
               </a:ext>
             </a:extLst>
           </p:cNvPr>
@@ -3566,7 +3651,7 @@
           <p:cNvPr id="5" name="Picture 4" descr="A screenshot of a cell phone&#10;&#10;Description automatically generated">
             <a:extLst>
               <a:ext uri="{FF2B5EF4-FFF2-40B4-BE49-F238E27FC236}">
-                <a16:creationId xmlns="" xmlns:a16="http://schemas.microsoft.com/office/drawing/2014/main" id="{8C303482-C4AE-E049-A13A-50CE832D1F2A}"/>
+                <a16:creationId xmlns:a16="http://schemas.microsoft.com/office/drawing/2014/main" xmlns="" id="{8C303482-C4AE-E049-A13A-50CE832D1F2A}"/>
               </a:ext>
             </a:extLst>
           </p:cNvPr>
@@ -5334,7 +5419,7 @@
         </p:nvSpPr>
         <p:spPr>
           <a:xfrm>
-            <a:off x="853570" y="853671"/>
+            <a:off x="853570" y="860481"/>
             <a:ext cx="7234527" cy="4851352"/>
           </a:xfrm>
           <a:prstGeom prst="roundRect">
@@ -5345,9 +5430,9 @@
           <a:solidFill>
             <a:srgbClr val="EDEDED"/>
           </a:solidFill>
-          <a:ln>
+          <a:ln w="3175" cmpd="sng">
             <a:solidFill>
-              <a:srgbClr val="000000"/>
+              <a:srgbClr val="052A48"/>
             </a:solidFill>
           </a:ln>
           <a:effectLst/>
@@ -5384,7 +5469,7 @@
         <p:spPr>
           <a:xfrm>
             <a:off x="863980" y="855015"/>
-            <a:ext cx="7213708" cy="923330"/>
+            <a:ext cx="7213708" cy="1754327"/>
           </a:xfrm>
           <a:prstGeom prst="rect">
             <a:avLst/>
@@ -5405,7 +5490,7 @@
                 <a:latin typeface="Calibri"/>
                 <a:cs typeface="Calibri"/>
               </a:rPr>
-              <a:t>Extending NWB</a:t>
+              <a:t>Annotating Time Intervals</a:t>
             </a:r>
             <a:endParaRPr lang="en-US" sz="5400" b="1" dirty="0">
               <a:solidFill>
@@ -5417,38 +5502,786 @@
           </a:p>
         </p:txBody>
       </p:sp>
-      <p:pic>
-        <p:nvPicPr>
-          <p:cNvPr id="2" name="Picture 1"/>
-          <p:cNvPicPr>
-            <a:picLocks noChangeAspect="1"/>
-          </p:cNvPicPr>
-          <p:nvPr/>
-        </p:nvPicPr>
-        <p:blipFill rotWithShape="1">
-          <a:blip r:embed="rId2"/>
-          <a:srcRect r="61780" b="9233"/>
-          <a:stretch/>
-        </p:blipFill>
+      <p:sp>
+        <p:nvSpPr>
+          <p:cNvPr id="6" name="Left Arrow 5"/>
+          <p:cNvSpPr/>
+          <p:nvPr/>
+        </p:nvSpPr>
+        <p:spPr>
+          <a:xfrm rot="16200000" flipV="1">
+            <a:off x="984462" y="4868639"/>
+            <a:ext cx="846712" cy="62572"/>
+          </a:xfrm>
+          <a:prstGeom prst="leftArrow">
+            <a:avLst>
+              <a:gd name="adj1" fmla="val 100000"/>
+              <a:gd name="adj2" fmla="val 0"/>
+            </a:avLst>
+          </a:prstGeom>
+          <a:solidFill>
+            <a:schemeClr val="accent1"/>
+          </a:solidFill>
+          <a:ln w="9525" cmpd="sng">
+            <a:solidFill>
+              <a:schemeClr val="accent1"/>
+            </a:solidFill>
+          </a:ln>
+        </p:spPr>
+        <p:style>
+          <a:lnRef idx="0">
+            <a:schemeClr val="accent1">
+              <a:tint val="60000"/>
+              <a:hueOff val="0"/>
+              <a:satOff val="0"/>
+              <a:lumOff val="0"/>
+              <a:alphaOff val="0"/>
+            </a:schemeClr>
+          </a:lnRef>
+          <a:fillRef idx="1">
+            <a:schemeClr val="accent1">
+              <a:tint val="60000"/>
+              <a:hueOff val="0"/>
+              <a:satOff val="0"/>
+              <a:lumOff val="0"/>
+              <a:alphaOff val="0"/>
+            </a:schemeClr>
+          </a:fillRef>
+          <a:effectRef idx="0">
+            <a:schemeClr val="accent1">
+              <a:tint val="60000"/>
+              <a:hueOff val="0"/>
+              <a:satOff val="0"/>
+              <a:lumOff val="0"/>
+              <a:alphaOff val="0"/>
+            </a:schemeClr>
+          </a:effectRef>
+          <a:fontRef idx="minor">
+            <a:schemeClr val="lt1"/>
+          </a:fontRef>
+        </p:style>
+      </p:sp>
+      <p:sp>
+        <p:nvSpPr>
+          <p:cNvPr id="7" name="Left Arrow 6"/>
+          <p:cNvSpPr/>
+          <p:nvPr/>
+        </p:nvSpPr>
+        <p:spPr>
+          <a:xfrm rot="16200000" flipV="1">
+            <a:off x="2673658" y="4864879"/>
+            <a:ext cx="846712" cy="62572"/>
+          </a:xfrm>
+          <a:prstGeom prst="leftArrow">
+            <a:avLst>
+              <a:gd name="adj1" fmla="val 100000"/>
+              <a:gd name="adj2" fmla="val 0"/>
+            </a:avLst>
+          </a:prstGeom>
+          <a:solidFill>
+            <a:schemeClr val="accent1"/>
+          </a:solidFill>
+          <a:ln w="9525" cmpd="sng">
+            <a:solidFill>
+              <a:schemeClr val="accent1"/>
+            </a:solidFill>
+          </a:ln>
+        </p:spPr>
+        <p:style>
+          <a:lnRef idx="0">
+            <a:schemeClr val="accent1">
+              <a:tint val="60000"/>
+              <a:hueOff val="0"/>
+              <a:satOff val="0"/>
+              <a:lumOff val="0"/>
+              <a:alphaOff val="0"/>
+            </a:schemeClr>
+          </a:lnRef>
+          <a:fillRef idx="1">
+            <a:schemeClr val="accent1">
+              <a:tint val="60000"/>
+              <a:hueOff val="0"/>
+              <a:satOff val="0"/>
+              <a:lumOff val="0"/>
+              <a:alphaOff val="0"/>
+            </a:schemeClr>
+          </a:fillRef>
+          <a:effectRef idx="0">
+            <a:schemeClr val="accent1">
+              <a:tint val="60000"/>
+              <a:hueOff val="0"/>
+              <a:satOff val="0"/>
+              <a:lumOff val="0"/>
+              <a:alphaOff val="0"/>
+            </a:schemeClr>
+          </a:effectRef>
+          <a:fontRef idx="minor">
+            <a:schemeClr val="lt1"/>
+          </a:fontRef>
+        </p:style>
+      </p:sp>
+      <p:sp>
+        <p:nvSpPr>
+          <p:cNvPr id="9" name="Left Arrow 8"/>
+          <p:cNvSpPr/>
+          <p:nvPr/>
+        </p:nvSpPr>
+        <p:spPr>
+          <a:xfrm rot="16200000" flipV="1">
+            <a:off x="4610193" y="4875290"/>
+            <a:ext cx="846712" cy="62572"/>
+          </a:xfrm>
+          <a:prstGeom prst="leftArrow">
+            <a:avLst>
+              <a:gd name="adj1" fmla="val 100000"/>
+              <a:gd name="adj2" fmla="val 0"/>
+            </a:avLst>
+          </a:prstGeom>
+          <a:solidFill>
+            <a:schemeClr val="accent6"/>
+          </a:solidFill>
+          <a:ln w="9525" cmpd="sng">
+            <a:solidFill>
+              <a:schemeClr val="accent6"/>
+            </a:solidFill>
+          </a:ln>
+        </p:spPr>
+        <p:style>
+          <a:lnRef idx="0">
+            <a:schemeClr val="accent1">
+              <a:tint val="60000"/>
+              <a:hueOff val="0"/>
+              <a:satOff val="0"/>
+              <a:lumOff val="0"/>
+              <a:alphaOff val="0"/>
+            </a:schemeClr>
+          </a:lnRef>
+          <a:fillRef idx="1">
+            <a:schemeClr val="accent1">
+              <a:tint val="60000"/>
+              <a:hueOff val="0"/>
+              <a:satOff val="0"/>
+              <a:lumOff val="0"/>
+              <a:alphaOff val="0"/>
+            </a:schemeClr>
+          </a:fillRef>
+          <a:effectRef idx="0">
+            <a:schemeClr val="accent1">
+              <a:tint val="60000"/>
+              <a:hueOff val="0"/>
+              <a:satOff val="0"/>
+              <a:lumOff val="0"/>
+              <a:alphaOff val="0"/>
+            </a:schemeClr>
+          </a:effectRef>
+          <a:fontRef idx="minor">
+            <a:schemeClr val="lt1"/>
+          </a:fontRef>
+        </p:style>
+      </p:sp>
+      <p:sp>
+        <p:nvSpPr>
+          <p:cNvPr id="10" name="Left Arrow 9"/>
+          <p:cNvSpPr/>
+          <p:nvPr/>
+        </p:nvSpPr>
+        <p:spPr>
+          <a:xfrm rot="16200000" flipV="1">
+            <a:off x="6049573" y="4871530"/>
+            <a:ext cx="846712" cy="62572"/>
+          </a:xfrm>
+          <a:prstGeom prst="leftArrow">
+            <a:avLst>
+              <a:gd name="adj1" fmla="val 100000"/>
+              <a:gd name="adj2" fmla="val 0"/>
+            </a:avLst>
+          </a:prstGeom>
+          <a:solidFill>
+            <a:schemeClr val="accent6"/>
+          </a:solidFill>
+          <a:ln w="9525" cmpd="sng">
+            <a:solidFill>
+              <a:schemeClr val="accent6"/>
+            </a:solidFill>
+          </a:ln>
+        </p:spPr>
+        <p:style>
+          <a:lnRef idx="0">
+            <a:schemeClr val="accent1">
+              <a:tint val="60000"/>
+              <a:hueOff val="0"/>
+              <a:satOff val="0"/>
+              <a:lumOff val="0"/>
+              <a:alphaOff val="0"/>
+            </a:schemeClr>
+          </a:lnRef>
+          <a:fillRef idx="1">
+            <a:schemeClr val="accent1">
+              <a:tint val="60000"/>
+              <a:hueOff val="0"/>
+              <a:satOff val="0"/>
+              <a:lumOff val="0"/>
+              <a:alphaOff val="0"/>
+            </a:schemeClr>
+          </a:fillRef>
+          <a:effectRef idx="0">
+            <a:schemeClr val="accent1">
+              <a:tint val="60000"/>
+              <a:hueOff val="0"/>
+              <a:satOff val="0"/>
+              <a:lumOff val="0"/>
+              <a:alphaOff val="0"/>
+            </a:schemeClr>
+          </a:effectRef>
+          <a:fontRef idx="minor">
+            <a:schemeClr val="lt1"/>
+          </a:fontRef>
+        </p:style>
+      </p:sp>
+      <p:sp>
+        <p:nvSpPr>
+          <p:cNvPr id="5" name="Left Arrow 4"/>
+          <p:cNvSpPr/>
+          <p:nvPr/>
+        </p:nvSpPr>
+        <p:spPr>
+          <a:xfrm rot="10800000" flipV="1">
+            <a:off x="1116104" y="4689645"/>
+            <a:ext cx="6724467" cy="421971"/>
+          </a:xfrm>
+          <a:prstGeom prst="leftArrow">
+            <a:avLst>
+              <a:gd name="adj1" fmla="val 46274"/>
+              <a:gd name="adj2" fmla="val 162557"/>
+            </a:avLst>
+          </a:prstGeom>
+          <a:solidFill>
+            <a:srgbClr val="052A48"/>
+          </a:solidFill>
+          <a:ln w="9525" cmpd="sng">
+            <a:noFill/>
+          </a:ln>
+        </p:spPr>
+        <p:style>
+          <a:lnRef idx="0">
+            <a:schemeClr val="accent1">
+              <a:tint val="60000"/>
+              <a:hueOff val="0"/>
+              <a:satOff val="0"/>
+              <a:lumOff val="0"/>
+              <a:alphaOff val="0"/>
+            </a:schemeClr>
+          </a:lnRef>
+          <a:fillRef idx="1">
+            <a:schemeClr val="accent1">
+              <a:tint val="60000"/>
+              <a:hueOff val="0"/>
+              <a:satOff val="0"/>
+              <a:lumOff val="0"/>
+              <a:alphaOff val="0"/>
+            </a:schemeClr>
+          </a:fillRef>
+          <a:effectRef idx="0">
+            <a:schemeClr val="accent1">
+              <a:tint val="60000"/>
+              <a:hueOff val="0"/>
+              <a:satOff val="0"/>
+              <a:lumOff val="0"/>
+              <a:alphaOff val="0"/>
+            </a:schemeClr>
+          </a:effectRef>
+          <a:fontRef idx="minor">
+            <a:schemeClr val="lt1"/>
+          </a:fontRef>
+        </p:style>
+      </p:sp>
+      <p:sp>
+        <p:nvSpPr>
+          <p:cNvPr id="3" name="Left Brace 2"/>
+          <p:cNvSpPr/>
+          <p:nvPr/>
+        </p:nvSpPr>
+        <p:spPr>
+          <a:xfrm rot="5400000">
+            <a:off x="3957460" y="3312341"/>
+            <a:ext cx="395573" cy="766897"/>
+          </a:xfrm>
+          <a:prstGeom prst="leftBrace">
+            <a:avLst/>
+          </a:prstGeom>
+          <a:noFill/>
+          <a:ln w="38100" cmpd="sng">
+            <a:solidFill>
+              <a:srgbClr val="FF0000"/>
+            </a:solidFill>
+          </a:ln>
+          <a:effectLst/>
+        </p:spPr>
+        <p:style>
+          <a:lnRef idx="2">
+            <a:schemeClr val="accent1"/>
+          </a:lnRef>
+          <a:fillRef idx="0">
+            <a:schemeClr val="accent1"/>
+          </a:fillRef>
+          <a:effectRef idx="1">
+            <a:schemeClr val="accent1"/>
+          </a:effectRef>
+          <a:fontRef idx="minor">
+            <a:schemeClr val="tx1"/>
+          </a:fontRef>
+        </p:style>
+        <p:txBody>
+          <a:bodyPr rtlCol="0" anchor="ctr"/>
+          <a:lstStyle/>
+          <a:p>
+            <a:pPr algn="ctr"/>
+            <a:endParaRPr lang="en-US"/>
+          </a:p>
+        </p:txBody>
+      </p:sp>
+      <p:sp>
+        <p:nvSpPr>
+          <p:cNvPr id="12" name="Left Brace 11"/>
+          <p:cNvSpPr/>
+          <p:nvPr/>
+        </p:nvSpPr>
+        <p:spPr>
+          <a:xfrm rot="5400000">
+            <a:off x="5564238" y="3433942"/>
+            <a:ext cx="385170" cy="1474392"/>
+          </a:xfrm>
+          <a:prstGeom prst="leftBrace">
+            <a:avLst/>
+          </a:prstGeom>
+          <a:ln w="38100" cmpd="sng">
+            <a:solidFill>
+              <a:srgbClr val="70AD47"/>
+            </a:solidFill>
+          </a:ln>
+          <a:effectLst/>
+        </p:spPr>
+        <p:style>
+          <a:lnRef idx="2">
+            <a:schemeClr val="accent1"/>
+          </a:lnRef>
+          <a:fillRef idx="0">
+            <a:schemeClr val="accent1"/>
+          </a:fillRef>
+          <a:effectRef idx="1">
+            <a:schemeClr val="accent1"/>
+          </a:effectRef>
+          <a:fontRef idx="minor">
+            <a:schemeClr val="tx1"/>
+          </a:fontRef>
+        </p:style>
+        <p:txBody>
+          <a:bodyPr rtlCol="0" anchor="ctr"/>
+          <a:lstStyle/>
+          <a:p>
+            <a:pPr algn="ctr"/>
+            <a:endParaRPr lang="en-US"/>
+          </a:p>
+        </p:txBody>
+      </p:sp>
+      <p:sp>
+        <p:nvSpPr>
+          <p:cNvPr id="4" name="Rectangle 3"/>
+          <p:cNvSpPr/>
+          <p:nvPr/>
+        </p:nvSpPr>
         <p:spPr>
           <a:xfrm>
-            <a:off x="2339904" y="1940847"/>
-            <a:ext cx="4329453" cy="3539553"/>
+            <a:off x="3281370" y="4951677"/>
+            <a:ext cx="1679103" cy="369332"/>
           </a:xfrm>
           <a:prstGeom prst="rect">
             <a:avLst/>
           </a:prstGeom>
-          <a:effectLst>
-            <a:glow rad="50800">
-              <a:srgbClr val="052A48"/>
-            </a:glow>
-          </a:effectLst>
-        </p:spPr>
-      </p:pic>
+        </p:spPr>
+        <p:txBody>
+          <a:bodyPr wrap="none">
+            <a:spAutoFit/>
+          </a:bodyPr>
+          <a:lstStyle/>
+          <a:p>
+            <a:r>
+              <a:rPr lang="en-US" b="1" dirty="0" smtClean="0">
+                <a:solidFill>
+                  <a:srgbClr val="052B48"/>
+                </a:solidFill>
+                <a:latin typeface="Calibri"/>
+                <a:cs typeface="Calibri"/>
+              </a:rPr>
+              <a:t>time in seconds</a:t>
+            </a:r>
+            <a:endParaRPr lang="en-US" dirty="0"/>
+          </a:p>
+        </p:txBody>
+      </p:sp>
+      <p:sp>
+        <p:nvSpPr>
+          <p:cNvPr id="14" name="Rectangle 13"/>
+          <p:cNvSpPr/>
+          <p:nvPr/>
+        </p:nvSpPr>
+        <p:spPr>
+          <a:xfrm>
+            <a:off x="1591313" y="3355100"/>
+            <a:ext cx="1357263" cy="523220"/>
+          </a:xfrm>
+          <a:prstGeom prst="rect">
+            <a:avLst/>
+          </a:prstGeom>
+        </p:spPr>
+        <p:txBody>
+          <a:bodyPr wrap="none">
+            <a:spAutoFit/>
+          </a:bodyPr>
+          <a:lstStyle/>
+          <a:p>
+            <a:r>
+              <a:rPr lang="en-US" sz="2800" b="1" dirty="0">
+                <a:solidFill>
+                  <a:schemeClr val="accent5">
+                    <a:lumMod val="75000"/>
+                  </a:schemeClr>
+                </a:solidFill>
+                <a:latin typeface="Calibri"/>
+                <a:cs typeface="Calibri"/>
+              </a:rPr>
+              <a:t>e</a:t>
+            </a:r>
+            <a:r>
+              <a:rPr lang="en-US" sz="2800" b="1" dirty="0" smtClean="0">
+                <a:solidFill>
+                  <a:schemeClr val="accent5">
+                    <a:lumMod val="75000"/>
+                  </a:schemeClr>
+                </a:solidFill>
+                <a:latin typeface="Calibri"/>
+                <a:cs typeface="Calibri"/>
+              </a:rPr>
+              <a:t>poch 1</a:t>
+            </a:r>
+            <a:endParaRPr lang="en-US" sz="2800" dirty="0">
+              <a:solidFill>
+                <a:schemeClr val="accent5">
+                  <a:lumMod val="75000"/>
+                </a:schemeClr>
+              </a:solidFill>
+            </a:endParaRPr>
+          </a:p>
+        </p:txBody>
+      </p:sp>
+      <p:sp>
+        <p:nvSpPr>
+          <p:cNvPr id="15" name="Rectangle 14"/>
+          <p:cNvSpPr/>
+          <p:nvPr/>
+        </p:nvSpPr>
+        <p:spPr>
+          <a:xfrm>
+            <a:off x="5080061" y="3351340"/>
+            <a:ext cx="1367958" cy="523220"/>
+          </a:xfrm>
+          <a:prstGeom prst="rect">
+            <a:avLst/>
+          </a:prstGeom>
+        </p:spPr>
+        <p:txBody>
+          <a:bodyPr wrap="none">
+            <a:spAutoFit/>
+          </a:bodyPr>
+          <a:lstStyle/>
+          <a:p>
+            <a:r>
+              <a:rPr lang="en-US" sz="2800" b="1" dirty="0">
+                <a:solidFill>
+                  <a:schemeClr val="accent6"/>
+                </a:solidFill>
+                <a:latin typeface="Calibri"/>
+                <a:cs typeface="Calibri"/>
+              </a:rPr>
+              <a:t>e</a:t>
+            </a:r>
+            <a:r>
+              <a:rPr lang="en-US" sz="2800" b="1" dirty="0" smtClean="0">
+                <a:solidFill>
+                  <a:schemeClr val="accent6"/>
+                </a:solidFill>
+                <a:latin typeface="Calibri"/>
+                <a:cs typeface="Calibri"/>
+              </a:rPr>
+              <a:t>poch n</a:t>
+            </a:r>
+            <a:endParaRPr lang="en-US" sz="2800" dirty="0">
+              <a:solidFill>
+                <a:schemeClr val="accent6"/>
+              </a:solidFill>
+            </a:endParaRPr>
+          </a:p>
+        </p:txBody>
+      </p:sp>
+      <p:sp>
+        <p:nvSpPr>
+          <p:cNvPr id="16" name="Left Arrow 15"/>
+          <p:cNvSpPr/>
+          <p:nvPr/>
+        </p:nvSpPr>
+        <p:spPr>
+          <a:xfrm rot="16200000" flipV="1">
+            <a:off x="3344328" y="4363801"/>
+            <a:ext cx="846712" cy="36576"/>
+          </a:xfrm>
+          <a:prstGeom prst="leftArrow">
+            <a:avLst>
+              <a:gd name="adj1" fmla="val 100000"/>
+              <a:gd name="adj2" fmla="val 0"/>
+            </a:avLst>
+          </a:prstGeom>
+          <a:solidFill>
+            <a:srgbClr val="FF0000"/>
+          </a:solidFill>
+          <a:ln w="3175" cmpd="sng">
+            <a:noFill/>
+          </a:ln>
+        </p:spPr>
+        <p:style>
+          <a:lnRef idx="0">
+            <a:schemeClr val="accent1">
+              <a:tint val="60000"/>
+              <a:hueOff val="0"/>
+              <a:satOff val="0"/>
+              <a:lumOff val="0"/>
+              <a:alphaOff val="0"/>
+            </a:schemeClr>
+          </a:lnRef>
+          <a:fillRef idx="1">
+            <a:schemeClr val="accent1">
+              <a:tint val="60000"/>
+              <a:hueOff val="0"/>
+              <a:satOff val="0"/>
+              <a:lumOff val="0"/>
+              <a:alphaOff val="0"/>
+            </a:schemeClr>
+          </a:fillRef>
+          <a:effectRef idx="0">
+            <a:schemeClr val="accent1">
+              <a:tint val="60000"/>
+              <a:hueOff val="0"/>
+              <a:satOff val="0"/>
+              <a:lumOff val="0"/>
+              <a:alphaOff val="0"/>
+            </a:schemeClr>
+          </a:effectRef>
+          <a:fontRef idx="minor">
+            <a:schemeClr val="lt1"/>
+          </a:fontRef>
+        </p:style>
+      </p:sp>
+      <p:sp>
+        <p:nvSpPr>
+          <p:cNvPr id="17" name="Left Arrow 16"/>
+          <p:cNvSpPr/>
+          <p:nvPr/>
+        </p:nvSpPr>
+        <p:spPr>
+          <a:xfrm rot="16200000" flipV="1">
+            <a:off x="4114906" y="4360042"/>
+            <a:ext cx="846712" cy="36576"/>
+          </a:xfrm>
+          <a:prstGeom prst="leftArrow">
+            <a:avLst>
+              <a:gd name="adj1" fmla="val 100000"/>
+              <a:gd name="adj2" fmla="val 0"/>
+            </a:avLst>
+          </a:prstGeom>
+          <a:solidFill>
+            <a:srgbClr val="FF0000"/>
+          </a:solidFill>
+          <a:ln w="3175" cmpd="sng">
+            <a:noFill/>
+          </a:ln>
+        </p:spPr>
+        <p:style>
+          <a:lnRef idx="0">
+            <a:schemeClr val="accent1">
+              <a:tint val="60000"/>
+              <a:hueOff val="0"/>
+              <a:satOff val="0"/>
+              <a:lumOff val="0"/>
+              <a:alphaOff val="0"/>
+            </a:schemeClr>
+          </a:lnRef>
+          <a:fillRef idx="1">
+            <a:schemeClr val="accent1">
+              <a:tint val="60000"/>
+              <a:hueOff val="0"/>
+              <a:satOff val="0"/>
+              <a:lumOff val="0"/>
+              <a:alphaOff val="0"/>
+            </a:schemeClr>
+          </a:fillRef>
+          <a:effectRef idx="0">
+            <a:schemeClr val="accent1">
+              <a:tint val="60000"/>
+              <a:hueOff val="0"/>
+              <a:satOff val="0"/>
+              <a:lumOff val="0"/>
+              <a:alphaOff val="0"/>
+            </a:schemeClr>
+          </a:effectRef>
+          <a:fontRef idx="minor">
+            <a:schemeClr val="lt1"/>
+          </a:fontRef>
+        </p:style>
+      </p:sp>
+      <p:sp>
+        <p:nvSpPr>
+          <p:cNvPr id="18" name="Left Brace 17"/>
+          <p:cNvSpPr/>
+          <p:nvPr/>
+        </p:nvSpPr>
+        <p:spPr>
+          <a:xfrm rot="5400000">
+            <a:off x="2059612" y="3306941"/>
+            <a:ext cx="385170" cy="1717550"/>
+          </a:xfrm>
+          <a:prstGeom prst="leftBrace">
+            <a:avLst/>
+          </a:prstGeom>
+          <a:noFill/>
+          <a:ln w="38100" cmpd="sng">
+            <a:solidFill>
+              <a:schemeClr val="accent1"/>
+            </a:solidFill>
+          </a:ln>
+          <a:effectLst/>
+        </p:spPr>
+        <p:style>
+          <a:lnRef idx="2">
+            <a:schemeClr val="accent1"/>
+          </a:lnRef>
+          <a:fillRef idx="0">
+            <a:schemeClr val="accent1"/>
+          </a:fillRef>
+          <a:effectRef idx="1">
+            <a:schemeClr val="accent1"/>
+          </a:effectRef>
+          <a:fontRef idx="minor">
+            <a:schemeClr val="tx1"/>
+          </a:fontRef>
+        </p:style>
+        <p:txBody>
+          <a:bodyPr rtlCol="0" anchor="ctr"/>
+          <a:lstStyle/>
+          <a:p>
+            <a:pPr algn="ctr"/>
+            <a:endParaRPr lang="en-US"/>
+          </a:p>
+        </p:txBody>
+      </p:sp>
+      <p:sp>
+        <p:nvSpPr>
+          <p:cNvPr id="19" name="Rectangle 18"/>
+          <p:cNvSpPr/>
+          <p:nvPr/>
+        </p:nvSpPr>
+        <p:spPr>
+          <a:xfrm>
+            <a:off x="3575766" y="2893274"/>
+            <a:ext cx="1181759" cy="523220"/>
+          </a:xfrm>
+          <a:prstGeom prst="rect">
+            <a:avLst/>
+          </a:prstGeom>
+        </p:spPr>
+        <p:txBody>
+          <a:bodyPr wrap="none">
+            <a:spAutoFit/>
+          </a:bodyPr>
+          <a:lstStyle/>
+          <a:p>
+            <a:r>
+              <a:rPr lang="en-US" sz="2800" b="1" dirty="0" smtClean="0">
+                <a:solidFill>
+                  <a:srgbClr val="FF0000"/>
+                </a:solidFill>
+                <a:latin typeface="Calibri"/>
+                <a:cs typeface="Calibri"/>
+              </a:rPr>
+              <a:t>invalid</a:t>
+            </a:r>
+            <a:endParaRPr lang="en-US" sz="2800" dirty="0">
+              <a:solidFill>
+                <a:srgbClr val="FF0000"/>
+              </a:solidFill>
+            </a:endParaRPr>
+          </a:p>
+        </p:txBody>
+      </p:sp>
+      <p:sp>
+        <p:nvSpPr>
+          <p:cNvPr id="20" name="Left Arrow 19"/>
+          <p:cNvSpPr/>
+          <p:nvPr/>
+        </p:nvSpPr>
+        <p:spPr>
+          <a:xfrm rot="16200000">
+            <a:off x="4102096" y="4449785"/>
+            <a:ext cx="104107" cy="810335"/>
+          </a:xfrm>
+          <a:prstGeom prst="leftArrow">
+            <a:avLst>
+              <a:gd name="adj1" fmla="val 100000"/>
+              <a:gd name="adj2" fmla="val 0"/>
+            </a:avLst>
+          </a:prstGeom>
+          <a:solidFill>
+            <a:srgbClr val="FF0000"/>
+          </a:solidFill>
+          <a:ln w="9525" cmpd="sng">
+            <a:noFill/>
+          </a:ln>
+        </p:spPr>
+        <p:style>
+          <a:lnRef idx="0">
+            <a:schemeClr val="accent1">
+              <a:tint val="60000"/>
+              <a:hueOff val="0"/>
+              <a:satOff val="0"/>
+              <a:lumOff val="0"/>
+              <a:alphaOff val="0"/>
+            </a:schemeClr>
+          </a:lnRef>
+          <a:fillRef idx="1">
+            <a:schemeClr val="accent1">
+              <a:tint val="60000"/>
+              <a:hueOff val="0"/>
+              <a:satOff val="0"/>
+              <a:lumOff val="0"/>
+              <a:alphaOff val="0"/>
+            </a:schemeClr>
+          </a:fillRef>
+          <a:effectRef idx="0">
+            <a:schemeClr val="accent1">
+              <a:tint val="60000"/>
+              <a:hueOff val="0"/>
+              <a:satOff val="0"/>
+              <a:lumOff val="0"/>
+              <a:alphaOff val="0"/>
+            </a:schemeClr>
+          </a:effectRef>
+          <a:fontRef idx="minor">
+            <a:schemeClr val="lt1"/>
+          </a:fontRef>
+        </p:style>
+      </p:sp>
     </p:spTree>
     <p:extLst>
       <p:ext uri="{BB962C8B-B14F-4D97-AF65-F5344CB8AC3E}">
-        <p14:creationId xmlns:p14="http://schemas.microsoft.com/office/powerpoint/2010/main" val="3305643027"/>
+        <p14:creationId xmlns:p14="http://schemas.microsoft.com/office/powerpoint/2010/main" val="739067636"/>
       </p:ext>
     </p:extLst>
   </p:cSld>
@@ -5533,7 +6366,7 @@
         <p:spPr>
           <a:xfrm>
             <a:off x="863980" y="855015"/>
-            <a:ext cx="7213708" cy="2585323"/>
+            <a:ext cx="7213708" cy="923330"/>
           </a:xfrm>
           <a:prstGeom prst="rect">
             <a:avLst/>
@@ -5554,7 +6387,7 @@
                 <a:latin typeface="Calibri"/>
                 <a:cs typeface="Calibri"/>
               </a:rPr>
-              <a:t>Adding/Removing Containers from an NWB File </a:t>
+              <a:t>Extending NWB</a:t>
             </a:r>
             <a:endParaRPr lang="en-US" sz="5400" b="1" dirty="0">
               <a:solidFill>
@@ -5566,221 +6399,38 @@
           </a:p>
         </p:txBody>
       </p:sp>
-      <p:sp>
-        <p:nvSpPr>
-          <p:cNvPr id="3" name="Folded Corner 2"/>
-          <p:cNvSpPr/>
-          <p:nvPr/>
-        </p:nvSpPr>
-        <p:spPr>
-          <a:xfrm rot="10800000" flipH="1">
-            <a:off x="3839842" y="3460251"/>
-            <a:ext cx="1419941" cy="1900138"/>
-          </a:xfrm>
-          <a:prstGeom prst="foldedCorner">
-            <a:avLst>
-              <a:gd name="adj" fmla="val 26556"/>
-            </a:avLst>
-          </a:prstGeom>
-          <a:solidFill>
-            <a:srgbClr val="052A48"/>
-          </a:solidFill>
-          <a:ln w="28575" cmpd="sng">
-            <a:solidFill>
-              <a:schemeClr val="bg1"/>
-            </a:solidFill>
-          </a:ln>
-          <a:effectLst/>
-        </p:spPr>
-        <p:style>
-          <a:lnRef idx="1">
-            <a:schemeClr val="accent1"/>
-          </a:lnRef>
-          <a:fillRef idx="3">
-            <a:schemeClr val="accent1"/>
-          </a:fillRef>
-          <a:effectRef idx="2">
-            <a:schemeClr val="accent1"/>
-          </a:effectRef>
-          <a:fontRef idx="minor">
-            <a:schemeClr val="lt1"/>
-          </a:fontRef>
-        </p:style>
-        <p:txBody>
-          <a:bodyPr rtlCol="0" anchor="ctr"/>
-          <a:lstStyle/>
-          <a:p>
-            <a:pPr algn="ctr"/>
-            <a:r>
-              <a:rPr lang="en-US" u="sng" dirty="0" smtClean="0"/>
-              <a:t>																			   </a:t>
-            </a:r>
-            <a:endParaRPr lang="en-US" u="sng" dirty="0"/>
-          </a:p>
-        </p:txBody>
-      </p:sp>
-      <p:sp>
-        <p:nvSpPr>
-          <p:cNvPr id="4" name="Oval 3"/>
-          <p:cNvSpPr/>
-          <p:nvPr/>
-        </p:nvSpPr>
+      <p:pic>
+        <p:nvPicPr>
+          <p:cNvPr id="2" name="Picture 1"/>
+          <p:cNvPicPr>
+            <a:picLocks noChangeAspect="1"/>
+          </p:cNvPicPr>
+          <p:nvPr/>
+        </p:nvPicPr>
+        <p:blipFill rotWithShape="1">
+          <a:blip r:embed="rId2"/>
+          <a:srcRect r="61780" b="9233"/>
+          <a:stretch/>
+        </p:blipFill>
         <p:spPr>
           <a:xfrm>
-            <a:off x="4939826" y="5048168"/>
-            <a:ext cx="579977" cy="601510"/>
-          </a:xfrm>
-          <a:prstGeom prst="ellipse">
-            <a:avLst/>
-          </a:prstGeom>
-          <a:solidFill>
-            <a:srgbClr val="052A48"/>
-          </a:solidFill>
-          <a:ln w="76200" cmpd="sng">
-            <a:solidFill>
-              <a:srgbClr val="FFFFFF"/>
-            </a:solidFill>
-          </a:ln>
-          <a:effectLst/>
-        </p:spPr>
-        <p:style>
-          <a:lnRef idx="1">
-            <a:schemeClr val="accent1"/>
-          </a:lnRef>
-          <a:fillRef idx="3">
-            <a:schemeClr val="accent1"/>
-          </a:fillRef>
-          <a:effectRef idx="2">
-            <a:schemeClr val="accent1"/>
-          </a:effectRef>
-          <a:fontRef idx="minor">
-            <a:schemeClr val="lt1"/>
-          </a:fontRef>
-        </p:style>
-        <p:txBody>
-          <a:bodyPr rtlCol="0" anchor="ctr"/>
-          <a:lstStyle/>
-          <a:p>
-            <a:endParaRPr lang="en-US" sz="4400" dirty="0"/>
-          </a:p>
-        </p:txBody>
-      </p:sp>
-      <p:sp>
-        <p:nvSpPr>
-          <p:cNvPr id="5" name="Rectangle 4"/>
-          <p:cNvSpPr/>
-          <p:nvPr/>
-        </p:nvSpPr>
-        <p:spPr>
-          <a:xfrm>
-            <a:off x="5013201" y="4804441"/>
-            <a:ext cx="415273" cy="923330"/>
+            <a:off x="2339904" y="1940847"/>
+            <a:ext cx="4329453" cy="3539553"/>
           </a:xfrm>
           <a:prstGeom prst="rect">
             <a:avLst/>
           </a:prstGeom>
-          <a:effectLst/>
-        </p:spPr>
-        <p:txBody>
-          <a:bodyPr wrap="none">
-            <a:spAutoFit/>
-          </a:bodyPr>
-          <a:lstStyle/>
-          <a:p>
-            <a:r>
-              <a:rPr lang="en-US" sz="5400" b="1" dirty="0">
-                <a:solidFill>
-                  <a:schemeClr val="bg1"/>
-                </a:solidFill>
-              </a:rPr>
-              <a:t>-</a:t>
-            </a:r>
-          </a:p>
-        </p:txBody>
-      </p:sp>
-      <p:sp>
-        <p:nvSpPr>
-          <p:cNvPr id="8" name="Oval 7"/>
-          <p:cNvSpPr/>
-          <p:nvPr/>
-        </p:nvSpPr>
-        <p:spPr>
-          <a:xfrm>
-            <a:off x="4942253" y="4360489"/>
-            <a:ext cx="579977" cy="601510"/>
-          </a:xfrm>
-          <a:prstGeom prst="ellipse">
-            <a:avLst/>
-          </a:prstGeom>
-          <a:solidFill>
-            <a:srgbClr val="052A48"/>
-          </a:solidFill>
-          <a:ln w="76200" cmpd="sng">
-            <a:solidFill>
-              <a:srgbClr val="FFFFFF"/>
-            </a:solidFill>
-          </a:ln>
-          <a:effectLst/>
-        </p:spPr>
-        <p:style>
-          <a:lnRef idx="1">
-            <a:schemeClr val="accent1"/>
-          </a:lnRef>
-          <a:fillRef idx="3">
-            <a:schemeClr val="accent1"/>
-          </a:fillRef>
-          <a:effectRef idx="2">
-            <a:schemeClr val="accent1"/>
-          </a:effectRef>
-          <a:fontRef idx="minor">
-            <a:schemeClr val="lt1"/>
-          </a:fontRef>
-        </p:style>
-        <p:txBody>
-          <a:bodyPr rtlCol="0" anchor="ctr"/>
-          <a:lstStyle/>
-          <a:p>
-            <a:endParaRPr lang="en-US" sz="4400" dirty="0"/>
-          </a:p>
-        </p:txBody>
-      </p:sp>
-      <p:sp>
-        <p:nvSpPr>
-          <p:cNvPr id="9" name="Rectangle 8"/>
-          <p:cNvSpPr/>
-          <p:nvPr/>
-        </p:nvSpPr>
-        <p:spPr>
-          <a:xfrm>
-            <a:off x="4975628" y="4256776"/>
-            <a:ext cx="514183" cy="769441"/>
-          </a:xfrm>
-          <a:prstGeom prst="rect">
-            <a:avLst/>
-          </a:prstGeom>
-          <a:effectLst/>
-        </p:spPr>
-        <p:txBody>
-          <a:bodyPr wrap="none">
-            <a:spAutoFit/>
-          </a:bodyPr>
-          <a:lstStyle/>
-          <a:p>
-            <a:r>
-              <a:rPr lang="en-US" sz="4400" b="1" dirty="0">
-                <a:solidFill>
-                  <a:schemeClr val="bg1"/>
-                </a:solidFill>
-              </a:rPr>
-              <a:t>+</a:t>
-            </a:r>
-          </a:p>
-        </p:txBody>
-      </p:sp>
+          <a:effectLst>
+            <a:glow rad="50800">
+              <a:srgbClr val="052A48"/>
+            </a:glow>
+          </a:effectLst>
+        </p:spPr>
+      </p:pic>
     </p:spTree>
     <p:extLst>
       <p:ext uri="{BB962C8B-B14F-4D97-AF65-F5344CB8AC3E}">
-        <p14:creationId xmlns:p14="http://schemas.microsoft.com/office/powerpoint/2010/main" val="3909940052"/>
+        <p14:creationId xmlns:p14="http://schemas.microsoft.com/office/powerpoint/2010/main" val="3305643027"/>
       </p:ext>
     </p:extLst>
   </p:cSld>
@@ -5865,6 +6515,338 @@
         <p:spPr>
           <a:xfrm>
             <a:off x="863980" y="855015"/>
+            <a:ext cx="7213708" cy="2585323"/>
+          </a:xfrm>
+          <a:prstGeom prst="rect">
+            <a:avLst/>
+          </a:prstGeom>
+        </p:spPr>
+        <p:txBody>
+          <a:bodyPr wrap="square">
+            <a:spAutoFit/>
+          </a:bodyPr>
+          <a:lstStyle/>
+          <a:p>
+            <a:pPr algn="ctr"/>
+            <a:r>
+              <a:rPr lang="en-US" sz="5400" b="1" dirty="0" smtClean="0">
+                <a:solidFill>
+                  <a:srgbClr val="052B48"/>
+                </a:solidFill>
+                <a:latin typeface="Calibri"/>
+                <a:cs typeface="Calibri"/>
+              </a:rPr>
+              <a:t>Adding/Removing Containers from an NWB File </a:t>
+            </a:r>
+            <a:endParaRPr lang="en-US" sz="5400" b="1" dirty="0">
+              <a:solidFill>
+                <a:srgbClr val="052B48"/>
+              </a:solidFill>
+              <a:latin typeface="Calibri"/>
+              <a:cs typeface="Calibri"/>
+            </a:endParaRPr>
+          </a:p>
+        </p:txBody>
+      </p:sp>
+      <p:sp>
+        <p:nvSpPr>
+          <p:cNvPr id="3" name="Folded Corner 2"/>
+          <p:cNvSpPr/>
+          <p:nvPr/>
+        </p:nvSpPr>
+        <p:spPr>
+          <a:xfrm rot="10800000" flipH="1">
+            <a:off x="3839842" y="3460251"/>
+            <a:ext cx="1419941" cy="1900138"/>
+          </a:xfrm>
+          <a:prstGeom prst="foldedCorner">
+            <a:avLst>
+              <a:gd name="adj" fmla="val 26556"/>
+            </a:avLst>
+          </a:prstGeom>
+          <a:solidFill>
+            <a:srgbClr val="052A48"/>
+          </a:solidFill>
+          <a:ln w="28575" cmpd="sng">
+            <a:solidFill>
+              <a:schemeClr val="bg1"/>
+            </a:solidFill>
+          </a:ln>
+          <a:effectLst/>
+        </p:spPr>
+        <p:style>
+          <a:lnRef idx="1">
+            <a:schemeClr val="accent1"/>
+          </a:lnRef>
+          <a:fillRef idx="3">
+            <a:schemeClr val="accent1"/>
+          </a:fillRef>
+          <a:effectRef idx="2">
+            <a:schemeClr val="accent1"/>
+          </a:effectRef>
+          <a:fontRef idx="minor">
+            <a:schemeClr val="lt1"/>
+          </a:fontRef>
+        </p:style>
+        <p:txBody>
+          <a:bodyPr rtlCol="0" anchor="ctr"/>
+          <a:lstStyle/>
+          <a:p>
+            <a:pPr algn="ctr"/>
+            <a:r>
+              <a:rPr lang="en-US" u="sng" dirty="0" smtClean="0"/>
+              <a:t>																			   </a:t>
+            </a:r>
+            <a:endParaRPr lang="en-US" u="sng" dirty="0"/>
+          </a:p>
+        </p:txBody>
+      </p:sp>
+      <p:sp>
+        <p:nvSpPr>
+          <p:cNvPr id="4" name="Oval 3"/>
+          <p:cNvSpPr/>
+          <p:nvPr/>
+        </p:nvSpPr>
+        <p:spPr>
+          <a:xfrm>
+            <a:off x="4939826" y="5048168"/>
+            <a:ext cx="579977" cy="601510"/>
+          </a:xfrm>
+          <a:prstGeom prst="ellipse">
+            <a:avLst/>
+          </a:prstGeom>
+          <a:solidFill>
+            <a:srgbClr val="052A48"/>
+          </a:solidFill>
+          <a:ln w="76200" cmpd="sng">
+            <a:solidFill>
+              <a:srgbClr val="FFFFFF"/>
+            </a:solidFill>
+          </a:ln>
+          <a:effectLst/>
+        </p:spPr>
+        <p:style>
+          <a:lnRef idx="1">
+            <a:schemeClr val="accent1"/>
+          </a:lnRef>
+          <a:fillRef idx="3">
+            <a:schemeClr val="accent1"/>
+          </a:fillRef>
+          <a:effectRef idx="2">
+            <a:schemeClr val="accent1"/>
+          </a:effectRef>
+          <a:fontRef idx="minor">
+            <a:schemeClr val="lt1"/>
+          </a:fontRef>
+        </p:style>
+        <p:txBody>
+          <a:bodyPr rtlCol="0" anchor="ctr"/>
+          <a:lstStyle/>
+          <a:p>
+            <a:endParaRPr lang="en-US" sz="4400" dirty="0"/>
+          </a:p>
+        </p:txBody>
+      </p:sp>
+      <p:sp>
+        <p:nvSpPr>
+          <p:cNvPr id="5" name="Rectangle 4"/>
+          <p:cNvSpPr/>
+          <p:nvPr/>
+        </p:nvSpPr>
+        <p:spPr>
+          <a:xfrm>
+            <a:off x="5013201" y="4804441"/>
+            <a:ext cx="415273" cy="923330"/>
+          </a:xfrm>
+          <a:prstGeom prst="rect">
+            <a:avLst/>
+          </a:prstGeom>
+          <a:effectLst/>
+        </p:spPr>
+        <p:txBody>
+          <a:bodyPr wrap="none">
+            <a:spAutoFit/>
+          </a:bodyPr>
+          <a:lstStyle/>
+          <a:p>
+            <a:r>
+              <a:rPr lang="en-US" sz="5400" b="1" dirty="0">
+                <a:solidFill>
+                  <a:schemeClr val="bg1"/>
+                </a:solidFill>
+              </a:rPr>
+              <a:t>-</a:t>
+            </a:r>
+          </a:p>
+        </p:txBody>
+      </p:sp>
+      <p:sp>
+        <p:nvSpPr>
+          <p:cNvPr id="8" name="Oval 7"/>
+          <p:cNvSpPr/>
+          <p:nvPr/>
+        </p:nvSpPr>
+        <p:spPr>
+          <a:xfrm>
+            <a:off x="4942253" y="4360489"/>
+            <a:ext cx="579977" cy="601510"/>
+          </a:xfrm>
+          <a:prstGeom prst="ellipse">
+            <a:avLst/>
+          </a:prstGeom>
+          <a:solidFill>
+            <a:srgbClr val="052A48"/>
+          </a:solidFill>
+          <a:ln w="76200" cmpd="sng">
+            <a:solidFill>
+              <a:srgbClr val="FFFFFF"/>
+            </a:solidFill>
+          </a:ln>
+          <a:effectLst/>
+        </p:spPr>
+        <p:style>
+          <a:lnRef idx="1">
+            <a:schemeClr val="accent1"/>
+          </a:lnRef>
+          <a:fillRef idx="3">
+            <a:schemeClr val="accent1"/>
+          </a:fillRef>
+          <a:effectRef idx="2">
+            <a:schemeClr val="accent1"/>
+          </a:effectRef>
+          <a:fontRef idx="minor">
+            <a:schemeClr val="lt1"/>
+          </a:fontRef>
+        </p:style>
+        <p:txBody>
+          <a:bodyPr rtlCol="0" anchor="ctr"/>
+          <a:lstStyle/>
+          <a:p>
+            <a:endParaRPr lang="en-US" sz="4400" dirty="0"/>
+          </a:p>
+        </p:txBody>
+      </p:sp>
+      <p:sp>
+        <p:nvSpPr>
+          <p:cNvPr id="9" name="Rectangle 8"/>
+          <p:cNvSpPr/>
+          <p:nvPr/>
+        </p:nvSpPr>
+        <p:spPr>
+          <a:xfrm>
+            <a:off x="4975628" y="4256776"/>
+            <a:ext cx="514183" cy="769441"/>
+          </a:xfrm>
+          <a:prstGeom prst="rect">
+            <a:avLst/>
+          </a:prstGeom>
+          <a:effectLst/>
+        </p:spPr>
+        <p:txBody>
+          <a:bodyPr wrap="none">
+            <a:spAutoFit/>
+          </a:bodyPr>
+          <a:lstStyle/>
+          <a:p>
+            <a:r>
+              <a:rPr lang="en-US" sz="4400" b="1" dirty="0">
+                <a:solidFill>
+                  <a:schemeClr val="bg1"/>
+                </a:solidFill>
+              </a:rPr>
+              <a:t>+</a:t>
+            </a:r>
+          </a:p>
+        </p:txBody>
+      </p:sp>
+    </p:spTree>
+    <p:extLst>
+      <p:ext uri="{BB962C8B-B14F-4D97-AF65-F5344CB8AC3E}">
+        <p14:creationId xmlns:p14="http://schemas.microsoft.com/office/powerpoint/2010/main" val="3909940052"/>
+      </p:ext>
+    </p:extLst>
+  </p:cSld>
+  <p:clrMapOvr>
+    <a:masterClrMapping/>
+  </p:clrMapOvr>
+</p:sld>
+</file>
+
+<file path=ppt/slides/slide15.xml><?xml version="1.0" encoding="utf-8"?>
+<p:sld xmlns:a="http://schemas.openxmlformats.org/drawingml/2006/main" xmlns:r="http://schemas.openxmlformats.org/officeDocument/2006/relationships" xmlns:p="http://schemas.openxmlformats.org/presentationml/2006/main">
+  <p:cSld>
+    <p:spTree>
+      <p:nvGrpSpPr>
+        <p:cNvPr id="1" name=""/>
+        <p:cNvGrpSpPr/>
+        <p:nvPr/>
+      </p:nvGrpSpPr>
+      <p:grpSpPr>
+        <a:xfrm>
+          <a:off x="0" y="0"/>
+          <a:ext cx="0" cy="0"/>
+          <a:chOff x="0" y="0"/>
+          <a:chExt cx="0" cy="0"/>
+        </a:xfrm>
+      </p:grpSpPr>
+      <p:sp>
+        <p:nvSpPr>
+          <p:cNvPr id="27" name="Rounded Rectangle 26"/>
+          <p:cNvSpPr/>
+          <p:nvPr/>
+        </p:nvSpPr>
+        <p:spPr>
+          <a:xfrm>
+            <a:off x="853570" y="853671"/>
+            <a:ext cx="7234527" cy="4851352"/>
+          </a:xfrm>
+          <a:prstGeom prst="roundRect">
+            <a:avLst>
+              <a:gd name="adj" fmla="val 4437"/>
+            </a:avLst>
+          </a:prstGeom>
+          <a:solidFill>
+            <a:srgbClr val="EDEDED"/>
+          </a:solidFill>
+          <a:ln>
+            <a:solidFill>
+              <a:srgbClr val="000000"/>
+            </a:solidFill>
+          </a:ln>
+          <a:effectLst/>
+        </p:spPr>
+        <p:style>
+          <a:lnRef idx="1">
+            <a:schemeClr val="accent1"/>
+          </a:lnRef>
+          <a:fillRef idx="3">
+            <a:schemeClr val="accent1"/>
+          </a:fillRef>
+          <a:effectRef idx="2">
+            <a:schemeClr val="accent1"/>
+          </a:effectRef>
+          <a:fontRef idx="minor">
+            <a:schemeClr val="lt1"/>
+          </a:fontRef>
+        </p:style>
+        <p:txBody>
+          <a:bodyPr rtlCol="0" anchor="ctr"/>
+          <a:lstStyle/>
+          <a:p>
+            <a:pPr algn="ctr"/>
+            <a:endParaRPr lang="en-US"/>
+          </a:p>
+        </p:txBody>
+      </p:sp>
+      <p:sp>
+        <p:nvSpPr>
+          <p:cNvPr id="26" name="Rectangle 25"/>
+          <p:cNvSpPr/>
+          <p:nvPr/>
+        </p:nvSpPr>
+        <p:spPr>
+          <a:xfrm>
+            <a:off x="863980" y="855015"/>
             <a:ext cx="7213708" cy="923330"/>
           </a:xfrm>
           <a:prstGeom prst="rect">
@@ -6040,7 +7022,7 @@
 </p:sld>
 </file>
 
-<file path=ppt/slides/slide15.xml><?xml version="1.0" encoding="utf-8"?>
+<file path=ppt/slides/slide16.xml><?xml version="1.0" encoding="utf-8"?>
 <p:sld xmlns:a="http://schemas.openxmlformats.org/drawingml/2006/main" xmlns:r="http://schemas.openxmlformats.org/officeDocument/2006/relationships" xmlns:p="http://schemas.openxmlformats.org/presentationml/2006/main">
   <p:cSld>
     <p:spTree>
@@ -9317,7 +10299,7 @@
   <a:extraClrSchemeLst/>
   <a:extLst>
     <a:ext uri="{05A4C25C-085E-4340-85A3-A5531E510DB2}">
-      <thm15:themeFamily xmlns:thm15="http://schemas.microsoft.com/office/thememl/2012/main" xmlns="" name="Office Theme" id="{62F939B6-93AF-4DB8-9C6B-D6C7DFDC589F}" vid="{4A3C46E8-61CC-4603-A589-7422A47A8E4A}"/>
+      <thm15:themeFamily xmlns="" xmlns:thm15="http://schemas.microsoft.com/office/thememl/2012/main" name="Office Theme" id="{62F939B6-93AF-4DB8-9C6B-D6C7DFDC589F}" vid="{4A3C46E8-61CC-4603-A589-7422A47A8E4A}"/>
     </a:ext>
   </a:extLst>
 </a:theme>

</xml_diff>

<commit_message>
Add thumbnail for behavior data tutorial
</commit_message>
<xml_diff>
--- a/docs/source/figures/gallery_thumbnails.pptx
+++ b/docs/source/figures/gallery_thumbnails.pptx
@@ -5,7 +5,7 @@
     <p:sldMasterId id="2147483660" r:id="rId1"/>
   </p:sldMasterIdLst>
   <p:notesMasterIdLst>
-    <p:notesMasterId r:id="rId18"/>
+    <p:notesMasterId r:id="rId19"/>
   </p:notesMasterIdLst>
   <p:sldIdLst>
     <p:sldId id="342" r:id="rId2"/>
@@ -24,6 +24,7 @@
     <p:sldId id="355" r:id="rId15"/>
     <p:sldId id="358" r:id="rId16"/>
     <p:sldId id="359" r:id="rId17"/>
+    <p:sldId id="364" r:id="rId18"/>
   </p:sldIdLst>
   <p:sldSz cx="12192000" cy="6858000"/>
   <p:notesSz cx="6858000" cy="9144000"/>
@@ -124,7 +125,18 @@
   </p:defaultTextStyle>
   <p:extLst>
     <p:ext uri="{EFAFB233-063F-42B5-8137-9DF3F51BA10A}">
-      <p15:sldGuideLst xmlns="" xmlns:p15="http://schemas.microsoft.com/office/powerpoint/2012/main"/>
+      <p15:sldGuideLst xmlns:p15="http://schemas.microsoft.com/office/powerpoint/2012/main">
+        <p15:guide id="1" orient="horz" pos="3405">
+          <p15:clr>
+            <a:srgbClr val="A4A3A4"/>
+          </p15:clr>
+        </p15:guide>
+        <p15:guide id="2" pos="4184">
+          <p15:clr>
+            <a:srgbClr val="A4A3A4"/>
+          </p15:clr>
+        </p15:guide>
+      </p15:sldGuideLst>
     </p:ext>
   </p:extLst>
 </p:presentation>
@@ -212,7 +224,7 @@
           <a:p>
             <a:fld id="{4D6A40B9-902A-4E0E-AF39-1C357549AEE0}" type="datetimeFigureOut">
               <a:rPr lang="en-US" smtClean="0"/>
-              <a:t>8/11/21</a:t>
+              <a:t>5/5/22</a:t>
             </a:fld>
             <a:endParaRPr lang="en-US"/>
           </a:p>
@@ -1544,7 +1556,7 @@
           <p:cNvPr id="4" name="Text Placeholder 3">
             <a:extLst>
               <a:ext uri="{FF2B5EF4-FFF2-40B4-BE49-F238E27FC236}">
-                <a16:creationId xmlns="" xmlns:a16="http://schemas.microsoft.com/office/drawing/2014/main" id="{8850B379-F419-41FB-9123-96081B074583}"/>
+                <a16:creationId xmlns:a16="http://schemas.microsoft.com/office/drawing/2014/main" id="{8850B379-F419-41FB-9123-96081B074583}"/>
               </a:ext>
             </a:extLst>
           </p:cNvPr>
@@ -1835,7 +1847,7 @@
           <p:cNvPr id="5" name="Picture 4">
             <a:extLst>
               <a:ext uri="{FF2B5EF4-FFF2-40B4-BE49-F238E27FC236}">
-                <a16:creationId xmlns="" xmlns:a16="http://schemas.microsoft.com/office/drawing/2014/main" id="{A5059957-9534-4FB9-8820-2343C3BF0E8F}"/>
+                <a16:creationId xmlns:a16="http://schemas.microsoft.com/office/drawing/2014/main" id="{A5059957-9534-4FB9-8820-2343C3BF0E8F}"/>
               </a:ext>
             </a:extLst>
           </p:cNvPr>
@@ -1865,7 +1877,7 @@
           <p:cNvPr id="4" name="Text Placeholder 3">
             <a:extLst>
               <a:ext uri="{FF2B5EF4-FFF2-40B4-BE49-F238E27FC236}">
-                <a16:creationId xmlns="" xmlns:a16="http://schemas.microsoft.com/office/drawing/2014/main" id="{8850B379-F419-41FB-9123-96081B074583}"/>
+                <a16:creationId xmlns:a16="http://schemas.microsoft.com/office/drawing/2014/main" id="{8850B379-F419-41FB-9123-96081B074583}"/>
               </a:ext>
             </a:extLst>
           </p:cNvPr>
@@ -2222,7 +2234,7 @@
           <p:cNvPr id="7" name="Google Shape;20;p4">
             <a:extLst>
               <a:ext uri="{FF2B5EF4-FFF2-40B4-BE49-F238E27FC236}">
-                <a16:creationId xmlns="" xmlns:a16="http://schemas.microsoft.com/office/drawing/2014/main" id="{537643E4-B983-42CC-9421-9C4C107A5DA4}"/>
+                <a16:creationId xmlns:a16="http://schemas.microsoft.com/office/drawing/2014/main" id="{537643E4-B983-42CC-9421-9C4C107A5DA4}"/>
               </a:ext>
             </a:extLst>
           </p:cNvPr>
@@ -3627,7 +3639,7 @@
           <a:p>
             <a:pPr algn="ctr"/>
             <a:r>
-              <a:rPr lang="en-US" sz="5400" b="1" dirty="0" smtClean="0">
+              <a:rPr lang="en-US" sz="5400" b="1" dirty="0">
                 <a:solidFill>
                   <a:srgbClr val="052B48"/>
                 </a:solidFill>
@@ -3636,13 +3648,6 @@
               </a:rPr>
               <a:t>Intracellular Electrophysiology</a:t>
             </a:r>
-            <a:endParaRPr lang="en-US" sz="5400" b="1" dirty="0">
-              <a:solidFill>
-                <a:srgbClr val="052B48"/>
-              </a:solidFill>
-              <a:latin typeface="Calibri"/>
-              <a:cs typeface="Calibri"/>
-            </a:endParaRPr>
           </a:p>
         </p:txBody>
       </p:sp>
@@ -3651,7 +3656,7 @@
           <p:cNvPr id="5" name="Picture 4" descr="A screenshot of a cell phone&#10;&#10;Description automatically generated">
             <a:extLst>
               <a:ext uri="{FF2B5EF4-FFF2-40B4-BE49-F238E27FC236}">
-                <a16:creationId xmlns:a16="http://schemas.microsoft.com/office/drawing/2014/main" xmlns="" id="{8C303482-C4AE-E049-A13A-50CE832D1F2A}"/>
+                <a16:creationId xmlns:a16="http://schemas.microsoft.com/office/drawing/2014/main" id="{8C303482-C4AE-E049-A13A-50CE832D1F2A}"/>
               </a:ext>
             </a:extLst>
           </p:cNvPr>
@@ -3704,33 +3709,18 @@
           <a:p>
             <a:r>
               <a:rPr lang="en-US" sz="1400" dirty="0"/>
-              <a:t> </a:t>
-            </a:r>
-            <a:r>
-              <a:rPr lang="en-US" sz="1400" dirty="0" smtClean="0"/>
-              <a:t>(figure source</a:t>
-            </a:r>
-            <a:r>
-              <a:rPr lang="en-US" sz="1400" dirty="0"/>
-              <a:t>: </a:t>
+              <a:t> (figure source: </a:t>
             </a:r>
             <a:r>
               <a:rPr lang="en-US" sz="1400" dirty="0">
                 <a:hlinkClick r:id="rId3"/>
               </a:rPr>
-              <a:t>celltypes.brain-</a:t>
+              <a:t>celltypes.brain-map.org</a:t>
             </a:r>
             <a:r>
-              <a:rPr lang="en-US" sz="1400" dirty="0" smtClean="0">
-                <a:hlinkClick r:id="rId3"/>
-              </a:rPr>
-              <a:t>map.org</a:t>
-            </a:r>
-            <a:r>
-              <a:rPr lang="en-US" sz="1400" dirty="0" smtClean="0"/>
+              <a:rPr lang="en-US" sz="1400" dirty="0"/>
               <a:t>)</a:t>
             </a:r>
-            <a:endParaRPr lang="en-US" sz="1400" dirty="0"/>
           </a:p>
         </p:txBody>
       </p:sp>
@@ -3836,7 +3826,7 @@
           <a:p>
             <a:pPr algn="ctr"/>
             <a:r>
-              <a:rPr lang="en-US" sz="5400" b="1" dirty="0" smtClean="0">
+              <a:rPr lang="en-US" sz="5400" b="1" dirty="0">
                 <a:solidFill>
                   <a:srgbClr val="052B48"/>
                 </a:solidFill>
@@ -3845,13 +3835,6 @@
               </a:rPr>
               <a:t>Parallel I/O using MPI</a:t>
             </a:r>
-            <a:endParaRPr lang="en-US" sz="5400" b="1" dirty="0">
-              <a:solidFill>
-                <a:srgbClr val="052B48"/>
-              </a:solidFill>
-              <a:latin typeface="Calibri"/>
-              <a:cs typeface="Calibri"/>
-            </a:endParaRPr>
           </a:p>
         </p:txBody>
       </p:sp>
@@ -3901,10 +3884,9 @@
           <a:p>
             <a:pPr algn="ctr"/>
             <a:r>
-              <a:rPr lang="en-US" u="sng" dirty="0" smtClean="0"/>
+              <a:rPr lang="en-US" u="sng" dirty="0"/>
               <a:t>																			   </a:t>
             </a:r>
-            <a:endParaRPr lang="en-US" u="sng" dirty="0"/>
           </a:p>
         </p:txBody>
       </p:sp>
@@ -4050,7 +4032,7 @@
               <a:defRPr/>
             </a:pPr>
             <a:r>
-              <a:rPr kumimoji="0" lang="en-US" sz="1800" i="0" u="none" strike="noStrike" kern="0" cap="none" spc="0" normalizeH="0" baseline="0" noProof="0" dirty="0" err="1" smtClean="0">
+              <a:rPr kumimoji="0" lang="en-US" sz="1800" i="0" u="none" strike="noStrike" kern="0" cap="none" spc="0" normalizeH="0" baseline="0" noProof="0" dirty="0" err="1">
                 <a:ln>
                   <a:noFill/>
                 </a:ln>
@@ -4136,7 +4118,7 @@
               <a:defRPr/>
             </a:pPr>
             <a:r>
-              <a:rPr kumimoji="0" lang="en-US" sz="1800" i="0" u="none" strike="noStrike" kern="0" cap="none" spc="0" normalizeH="0" baseline="0" noProof="0" dirty="0" err="1" smtClean="0">
+              <a:rPr kumimoji="0" lang="en-US" sz="1800" i="0" u="none" strike="noStrike" kern="0" cap="none" spc="0" normalizeH="0" baseline="0" noProof="0" dirty="0" err="1">
                 <a:ln>
                   <a:noFill/>
                 </a:ln>
@@ -4222,7 +4204,7 @@
               <a:defRPr/>
             </a:pPr>
             <a:r>
-              <a:rPr kumimoji="0" lang="en-US" sz="1800" i="0" u="none" strike="noStrike" kern="0" cap="none" spc="0" normalizeH="0" baseline="0" noProof="0" dirty="0" err="1" smtClean="0">
+              <a:rPr kumimoji="0" lang="en-US" sz="1800" i="0" u="none" strike="noStrike" kern="0" cap="none" spc="0" normalizeH="0" baseline="0" noProof="0" dirty="0" err="1">
                 <a:ln>
                   <a:noFill/>
                 </a:ln>
@@ -4308,7 +4290,7 @@
               <a:defRPr/>
             </a:pPr>
             <a:r>
-              <a:rPr kumimoji="0" lang="en-US" sz="1800" i="0" u="none" strike="noStrike" kern="0" cap="none" spc="0" normalizeH="0" baseline="0" noProof="0" dirty="0" err="1" smtClean="0">
+              <a:rPr kumimoji="0" lang="en-US" sz="1800" i="0" u="none" strike="noStrike" kern="0" cap="none" spc="0" normalizeH="0" baseline="0" noProof="0" dirty="0" err="1">
                 <a:ln>
                   <a:noFill/>
                 </a:ln>
@@ -4689,7 +4671,7 @@
               <a:defRPr/>
             </a:pPr>
             <a:r>
-              <a:rPr kumimoji="0" lang="en-US" sz="1800" i="0" u="none" strike="noStrike" kern="0" cap="none" spc="0" normalizeH="0" baseline="0" noProof="0" dirty="0" err="1" smtClean="0">
+              <a:rPr kumimoji="0" lang="en-US" sz="1800" i="0" u="none" strike="noStrike" kern="0" cap="none" spc="0" normalizeH="0" baseline="0" noProof="0" dirty="0" err="1">
                 <a:ln>
                   <a:noFill/>
                 </a:ln>
@@ -4834,7 +4816,7 @@
               <a:defRPr/>
             </a:pPr>
             <a:r>
-              <a:rPr kumimoji="0" lang="en-US" sz="1800" i="0" u="none" strike="noStrike" kern="0" cap="none" spc="0" normalizeH="0" baseline="0" noProof="0" dirty="0" err="1" smtClean="0">
+              <a:rPr kumimoji="0" lang="en-US" sz="1800" i="0" u="none" strike="noStrike" kern="0" cap="none" spc="0" normalizeH="0" baseline="0" noProof="0" dirty="0" err="1">
                 <a:ln>
                   <a:noFill/>
                 </a:ln>
@@ -4979,7 +4961,7 @@
               <a:defRPr/>
             </a:pPr>
             <a:r>
-              <a:rPr kumimoji="0" lang="en-US" sz="1800" i="0" u="none" strike="noStrike" kern="0" cap="none" spc="0" normalizeH="0" baseline="0" noProof="0" dirty="0" err="1" smtClean="0">
+              <a:rPr kumimoji="0" lang="en-US" sz="1800" i="0" u="none" strike="noStrike" kern="0" cap="none" spc="0" normalizeH="0" baseline="0" noProof="0" dirty="0" err="1">
                 <a:ln>
                   <a:noFill/>
                 </a:ln>
@@ -5124,7 +5106,7 @@
               <a:defRPr/>
             </a:pPr>
             <a:r>
-              <a:rPr kumimoji="0" lang="en-US" sz="1800" i="0" u="none" strike="noStrike" kern="0" cap="none" spc="0" normalizeH="0" baseline="0" noProof="0" dirty="0" err="1" smtClean="0">
+              <a:rPr kumimoji="0" lang="en-US" sz="1800" i="0" u="none" strike="noStrike" kern="0" cap="none" spc="0" normalizeH="0" baseline="0" noProof="0" dirty="0" err="1">
                 <a:ln>
                   <a:noFill/>
                 </a:ln>
@@ -5263,7 +5245,7 @@
           <a:p>
             <a:pPr algn="ctr"/>
             <a:r>
-              <a:rPr lang="en-US" sz="5400" b="1" dirty="0" smtClean="0">
+              <a:rPr lang="en-US" sz="5400" b="1" dirty="0">
                 <a:solidFill>
                   <a:srgbClr val="052B48"/>
                 </a:solidFill>
@@ -5276,7 +5258,7 @@
           <a:p>
             <a:pPr algn="ctr"/>
             <a:r>
-              <a:rPr lang="en-US" sz="5400" b="1" dirty="0" smtClean="0">
+              <a:rPr lang="en-US" sz="5400" b="1" dirty="0">
                 <a:solidFill>
                   <a:srgbClr val="052B48"/>
                 </a:solidFill>
@@ -5285,13 +5267,6 @@
               </a:rPr>
               <a:t>S3 Bucket</a:t>
             </a:r>
-            <a:endParaRPr lang="en-US" sz="5400" b="1" dirty="0">
-              <a:solidFill>
-                <a:srgbClr val="052B48"/>
-              </a:solidFill>
-              <a:latin typeface="Calibri"/>
-              <a:cs typeface="Calibri"/>
-            </a:endParaRPr>
           </a:p>
         </p:txBody>
       </p:sp>
@@ -5452,10 +5427,9 @@
             <a:p>
               <a:pPr algn="ctr"/>
               <a:r>
-                <a:rPr lang="en-US" u="sng" dirty="0" smtClean="0"/>
+                <a:rPr lang="en-US" u="sng" dirty="0"/>
                 <a:t>												   </a:t>
               </a:r>
-              <a:endParaRPr lang="en-US" u="sng" dirty="0"/>
             </a:p>
           </p:txBody>
         </p:sp>
@@ -5833,14 +5807,14 @@
           <a:p>
             <a:pPr algn="ctr"/>
             <a:r>
-              <a:rPr lang="en-US" sz="1200" dirty="0" smtClean="0">
+              <a:rPr lang="en-US" sz="1200" dirty="0">
                 <a:latin typeface="Courier"/>
                 <a:cs typeface="Courier"/>
               </a:rPr>
               <a:t>010011101000101011101</a:t>
             </a:r>
             <a:r>
-              <a:rPr lang="mr-IN" sz="1200" dirty="0" smtClean="0">
+              <a:rPr lang="mr-IN" sz="1200" dirty="0">
                 <a:latin typeface="Courier"/>
                 <a:cs typeface="Courier"/>
               </a:rPr>
@@ -5985,7 +5959,7 @@
           <a:p>
             <a:pPr algn="ctr"/>
             <a:r>
-              <a:rPr lang="en-US" sz="5400" b="1" dirty="0" smtClean="0">
+              <a:rPr lang="en-US" sz="5400" b="1" dirty="0">
                 <a:solidFill>
                   <a:srgbClr val="052B48"/>
                 </a:solidFill>
@@ -5994,13 +5968,6 @@
               </a:rPr>
               <a:t>Object IDs in NWB</a:t>
             </a:r>
-            <a:endParaRPr lang="en-US" sz="5400" b="1" dirty="0">
-              <a:solidFill>
-                <a:srgbClr val="052B48"/>
-              </a:solidFill>
-              <a:latin typeface="Calibri"/>
-              <a:cs typeface="Calibri"/>
-            </a:endParaRPr>
           </a:p>
         </p:txBody>
       </p:sp>
@@ -6205,7 +6172,7 @@
           <a:p>
             <a:pPr algn="ctr"/>
             <a:r>
-              <a:rPr lang="en-US" sz="5400" b="1" dirty="0" smtClean="0">
+              <a:rPr lang="en-US" sz="5400" b="1" dirty="0">
                 <a:solidFill>
                   <a:srgbClr val="052B48"/>
                 </a:solidFill>
@@ -6214,13 +6181,6 @@
               </a:rPr>
               <a:t>Extending NWB</a:t>
             </a:r>
-            <a:endParaRPr lang="en-US" sz="5400" b="1" dirty="0">
-              <a:solidFill>
-                <a:srgbClr val="052B48"/>
-              </a:solidFill>
-              <a:latin typeface="Calibri"/>
-              <a:cs typeface="Calibri"/>
-            </a:endParaRPr>
           </a:p>
         </p:txBody>
       </p:sp>
@@ -6354,7 +6314,7 @@
           <a:p>
             <a:pPr algn="ctr"/>
             <a:r>
-              <a:rPr lang="en-US" sz="5400" b="1" dirty="0" smtClean="0">
+              <a:rPr lang="en-US" sz="5400" b="1" dirty="0">
                 <a:solidFill>
                   <a:srgbClr val="052B48"/>
                 </a:solidFill>
@@ -6363,13 +6323,6 @@
               </a:rPr>
               <a:t>Adding/Removing Containers from an NWB File </a:t>
             </a:r>
-            <a:endParaRPr lang="en-US" sz="5400" b="1" dirty="0">
-              <a:solidFill>
-                <a:srgbClr val="052B48"/>
-              </a:solidFill>
-              <a:latin typeface="Calibri"/>
-              <a:cs typeface="Calibri"/>
-            </a:endParaRPr>
           </a:p>
         </p:txBody>
       </p:sp>
@@ -6419,10 +6372,9 @@
           <a:p>
             <a:pPr algn="ctr"/>
             <a:r>
-              <a:rPr lang="en-US" u="sng" dirty="0" smtClean="0"/>
+              <a:rPr lang="en-US" u="sng" dirty="0"/>
               <a:t>																			   </a:t>
             </a:r>
-            <a:endParaRPr lang="en-US" u="sng" dirty="0"/>
           </a:p>
         </p:txBody>
       </p:sp>
@@ -6686,7 +6638,7 @@
           <a:p>
             <a:pPr algn="ctr"/>
             <a:r>
-              <a:rPr lang="en-US" sz="5400" b="1" dirty="0" smtClean="0">
+              <a:rPr lang="en-US" sz="5400" b="1" dirty="0">
                 <a:solidFill>
                   <a:srgbClr val="052B48"/>
                 </a:solidFill>
@@ -6695,13 +6647,6 @@
               </a:rPr>
               <a:t>NWB File Basics</a:t>
             </a:r>
-            <a:endParaRPr lang="en-US" sz="5400" b="1" dirty="0">
-              <a:solidFill>
-                <a:srgbClr val="052B48"/>
-              </a:solidFill>
-              <a:latin typeface="Calibri"/>
-              <a:cs typeface="Calibri"/>
-            </a:endParaRPr>
           </a:p>
         </p:txBody>
       </p:sp>
@@ -6751,10 +6696,9 @@
           <a:p>
             <a:pPr algn="ctr"/>
             <a:r>
-              <a:rPr lang="en-US" sz="2400" u="sng" dirty="0" smtClean="0"/>
+              <a:rPr lang="en-US" sz="2400" u="sng" dirty="0"/>
               <a:t>																														   </a:t>
             </a:r>
-            <a:endParaRPr lang="en-US" sz="2400" u="sng" dirty="0"/>
           </a:p>
         </p:txBody>
       </p:sp>
@@ -6936,7 +6880,7 @@
           <a:p>
             <a:pPr algn="ctr"/>
             <a:r>
-              <a:rPr lang="en-US" sz="5400" b="1" dirty="0" smtClean="0">
+              <a:rPr lang="en-US" sz="5400" b="1" dirty="0">
                 <a:solidFill>
                   <a:srgbClr val="052B48"/>
                 </a:solidFill>
@@ -6945,13 +6889,6 @@
               </a:rPr>
               <a:t>Exploratory Data Analysis with NWB</a:t>
             </a:r>
-            <a:endParaRPr lang="en-US" sz="5400" b="1" dirty="0">
-              <a:solidFill>
-                <a:srgbClr val="052B48"/>
-              </a:solidFill>
-              <a:latin typeface="Calibri"/>
-              <a:cs typeface="Calibri"/>
-            </a:endParaRPr>
           </a:p>
         </p:txBody>
       </p:sp>
@@ -7001,10 +6938,9 @@
           <a:p>
             <a:pPr algn="ctr"/>
             <a:r>
-              <a:rPr lang="en-US" u="sng" dirty="0" smtClean="0"/>
+              <a:rPr lang="en-US" u="sng" dirty="0"/>
               <a:t>																					   </a:t>
             </a:r>
-            <a:endParaRPr lang="en-US" u="sng" dirty="0"/>
           </a:p>
         </p:txBody>
       </p:sp>
@@ -7124,7 +7060,7 @@
           <a:lstStyle/>
           <a:p>
             <a:r>
-              <a:rPr lang="en-US" sz="3800" b="1" dirty="0" smtClean="0">
+              <a:rPr lang="en-US" sz="3800" b="1" dirty="0">
                 <a:solidFill>
                   <a:schemeClr val="bg1"/>
                 </a:solidFill>
@@ -7133,13 +7069,6 @@
               </a:rPr>
               <a:t>/scratch</a:t>
             </a:r>
-            <a:endParaRPr lang="en-US" sz="3800" b="1" dirty="0">
-              <a:solidFill>
-                <a:schemeClr val="bg1"/>
-              </a:solidFill>
-              <a:latin typeface="Courier"/>
-              <a:cs typeface="Courier"/>
-            </a:endParaRPr>
           </a:p>
         </p:txBody>
       </p:sp>
@@ -7147,6 +7076,512 @@
     <p:extLst>
       <p:ext uri="{BB962C8B-B14F-4D97-AF65-F5344CB8AC3E}">
         <p14:creationId xmlns:p14="http://schemas.microsoft.com/office/powerpoint/2010/main" val="122021392"/>
+      </p:ext>
+    </p:extLst>
+  </p:cSld>
+  <p:clrMapOvr>
+    <a:masterClrMapping/>
+  </p:clrMapOvr>
+</p:sld>
+</file>
+
+<file path=ppt/slides/slide17.xml><?xml version="1.0" encoding="utf-8"?>
+<p:sld xmlns:a="http://schemas.openxmlformats.org/drawingml/2006/main" xmlns:r="http://schemas.openxmlformats.org/officeDocument/2006/relationships" xmlns:p="http://schemas.openxmlformats.org/presentationml/2006/main">
+  <p:cSld>
+    <p:spTree>
+      <p:nvGrpSpPr>
+        <p:cNvPr id="1" name=""/>
+        <p:cNvGrpSpPr/>
+        <p:nvPr/>
+      </p:nvGrpSpPr>
+      <p:grpSpPr>
+        <a:xfrm>
+          <a:off x="0" y="0"/>
+          <a:ext cx="0" cy="0"/>
+          <a:chOff x="0" y="0"/>
+          <a:chExt cx="0" cy="0"/>
+        </a:xfrm>
+      </p:grpSpPr>
+      <p:sp>
+        <p:nvSpPr>
+          <p:cNvPr id="27" name="Rounded Rectangle 26"/>
+          <p:cNvSpPr/>
+          <p:nvPr/>
+        </p:nvSpPr>
+        <p:spPr>
+          <a:xfrm>
+            <a:off x="853570" y="853671"/>
+            <a:ext cx="7234527" cy="4851352"/>
+          </a:xfrm>
+          <a:prstGeom prst="roundRect">
+            <a:avLst>
+              <a:gd name="adj" fmla="val 4437"/>
+            </a:avLst>
+          </a:prstGeom>
+          <a:solidFill>
+            <a:srgbClr val="EDEDED"/>
+          </a:solidFill>
+          <a:ln>
+            <a:solidFill>
+              <a:srgbClr val="000000"/>
+            </a:solidFill>
+          </a:ln>
+          <a:effectLst/>
+        </p:spPr>
+        <p:style>
+          <a:lnRef idx="1">
+            <a:schemeClr val="accent1"/>
+          </a:lnRef>
+          <a:fillRef idx="3">
+            <a:schemeClr val="accent1"/>
+          </a:fillRef>
+          <a:effectRef idx="2">
+            <a:schemeClr val="accent1"/>
+          </a:effectRef>
+          <a:fontRef idx="minor">
+            <a:schemeClr val="lt1"/>
+          </a:fontRef>
+        </p:style>
+        <p:txBody>
+          <a:bodyPr rtlCol="0" anchor="ctr"/>
+          <a:lstStyle/>
+          <a:p>
+            <a:pPr algn="ctr"/>
+            <a:endParaRPr lang="en-US"/>
+          </a:p>
+        </p:txBody>
+      </p:sp>
+      <p:sp>
+        <p:nvSpPr>
+          <p:cNvPr id="26" name="Rectangle 25"/>
+          <p:cNvSpPr/>
+          <p:nvPr/>
+        </p:nvSpPr>
+        <p:spPr>
+          <a:xfrm>
+            <a:off x="863980" y="855015"/>
+            <a:ext cx="7213708" cy="923330"/>
+          </a:xfrm>
+          <a:prstGeom prst="rect">
+            <a:avLst/>
+          </a:prstGeom>
+        </p:spPr>
+        <p:txBody>
+          <a:bodyPr wrap="square">
+            <a:spAutoFit/>
+          </a:bodyPr>
+          <a:lstStyle/>
+          <a:p>
+            <a:pPr algn="ctr"/>
+            <a:r>
+              <a:rPr lang="en-US" sz="5400" b="1" dirty="0">
+                <a:solidFill>
+                  <a:srgbClr val="052B48"/>
+                </a:solidFill>
+                <a:latin typeface="Calibri"/>
+                <a:cs typeface="Calibri"/>
+              </a:rPr>
+              <a:t>Behavior Data</a:t>
+            </a:r>
+          </a:p>
+        </p:txBody>
+      </p:sp>
+      <p:pic>
+        <p:nvPicPr>
+          <p:cNvPr id="7" name="Graphic 6" descr="Rat with solid fill">
+            <a:extLst>
+              <a:ext uri="{FF2B5EF4-FFF2-40B4-BE49-F238E27FC236}">
+                <a16:creationId xmlns:a16="http://schemas.microsoft.com/office/drawing/2014/main" id="{89ADF108-F3A3-A64C-A232-F1CEDB204E81}"/>
+              </a:ext>
+            </a:extLst>
+          </p:cNvPr>
+          <p:cNvPicPr>
+            <a:picLocks noChangeAspect="1"/>
+          </p:cNvPicPr>
+          <p:nvPr/>
+        </p:nvPicPr>
+        <p:blipFill rotWithShape="1">
+          <a:blip r:embed="rId2">
+            <a:extLst>
+              <a:ext uri="{28A0092B-C50C-407E-A947-70E740481C1C}">
+                <a14:useLocalDpi xmlns:a14="http://schemas.microsoft.com/office/drawing/2010/main" val="0"/>
+              </a:ext>
+              <a:ext uri="{96DAC541-7B7A-43D3-8B79-37D633B846F1}">
+                <asvg:svgBlip xmlns:asvg="http://schemas.microsoft.com/office/drawing/2016/SVG/main" r:embed="rId3"/>
+              </a:ext>
+            </a:extLst>
+          </a:blip>
+          <a:srcRect b="23361"/>
+          <a:stretch/>
+        </p:blipFill>
+        <p:spPr>
+          <a:xfrm>
+            <a:off x="2129958" y="3054626"/>
+            <a:ext cx="3200800" cy="2453047"/>
+          </a:xfrm>
+          <a:prstGeom prst="rect">
+            <a:avLst/>
+          </a:prstGeom>
+        </p:spPr>
+      </p:pic>
+      <p:pic>
+        <p:nvPicPr>
+          <p:cNvPr id="15" name="Graphic 14" descr="Rat with solid fill">
+            <a:extLst>
+              <a:ext uri="{FF2B5EF4-FFF2-40B4-BE49-F238E27FC236}">
+                <a16:creationId xmlns:a16="http://schemas.microsoft.com/office/drawing/2014/main" id="{C8A3EC6B-7CFD-3A41-A99F-A004CFA9D4DE}"/>
+              </a:ext>
+            </a:extLst>
+          </p:cNvPr>
+          <p:cNvPicPr>
+            <a:picLocks noChangeAspect="1"/>
+          </p:cNvPicPr>
+          <p:nvPr/>
+        </p:nvPicPr>
+        <p:blipFill>
+          <a:blip r:embed="rId2">
+            <a:extLst>
+              <a:ext uri="{28A0092B-C50C-407E-A947-70E740481C1C}">
+                <a14:useLocalDpi xmlns:a14="http://schemas.microsoft.com/office/drawing/2010/main" val="0"/>
+              </a:ext>
+              <a:ext uri="{96DAC541-7B7A-43D3-8B79-37D633B846F1}">
+                <asvg:svgBlip xmlns:asvg="http://schemas.microsoft.com/office/drawing/2016/SVG/main" r:embed="rId3"/>
+              </a:ext>
+            </a:extLst>
+          </a:blip>
+          <a:stretch>
+            <a:fillRect/>
+          </a:stretch>
+        </p:blipFill>
+        <p:spPr>
+          <a:xfrm>
+            <a:off x="5809721" y="1721797"/>
+            <a:ext cx="2191030" cy="2191030"/>
+          </a:xfrm>
+          <a:prstGeom prst="rect">
+            <a:avLst/>
+          </a:prstGeom>
+        </p:spPr>
+      </p:pic>
+      <p:pic>
+        <p:nvPicPr>
+          <p:cNvPr id="16" name="Graphic 15" descr="Rat with solid fill">
+            <a:extLst>
+              <a:ext uri="{FF2B5EF4-FFF2-40B4-BE49-F238E27FC236}">
+                <a16:creationId xmlns:a16="http://schemas.microsoft.com/office/drawing/2014/main" id="{A3CDCCE2-0ED0-FB42-B520-1BD237ED81F7}"/>
+              </a:ext>
+            </a:extLst>
+          </p:cNvPr>
+          <p:cNvPicPr>
+            <a:picLocks noChangeAspect="1"/>
+          </p:cNvPicPr>
+          <p:nvPr/>
+        </p:nvPicPr>
+        <p:blipFill>
+          <a:blip r:embed="rId2">
+            <a:extLst>
+              <a:ext uri="{28A0092B-C50C-407E-A947-70E740481C1C}">
+                <a14:useLocalDpi xmlns:a14="http://schemas.microsoft.com/office/drawing/2010/main" val="0"/>
+              </a:ext>
+              <a:ext uri="{96DAC541-7B7A-43D3-8B79-37D633B846F1}">
+                <asvg:svgBlip xmlns:asvg="http://schemas.microsoft.com/office/drawing/2016/SVG/main" r:embed="rId3"/>
+              </a:ext>
+            </a:extLst>
+          </a:blip>
+          <a:stretch>
+            <a:fillRect/>
+          </a:stretch>
+        </p:blipFill>
+        <p:spPr>
+          <a:xfrm>
+            <a:off x="1038201" y="1434875"/>
+            <a:ext cx="1912903" cy="1912903"/>
+          </a:xfrm>
+          <a:prstGeom prst="rect">
+            <a:avLst/>
+          </a:prstGeom>
+        </p:spPr>
+      </p:pic>
+      <p:sp>
+        <p:nvSpPr>
+          <p:cNvPr id="13" name="Freeform 12">
+            <a:extLst>
+              <a:ext uri="{FF2B5EF4-FFF2-40B4-BE49-F238E27FC236}">
+                <a16:creationId xmlns:a16="http://schemas.microsoft.com/office/drawing/2014/main" id="{19130C81-02F2-4542-B1DF-0E7BC45F4E03}"/>
+              </a:ext>
+            </a:extLst>
+          </p:cNvPr>
+          <p:cNvSpPr/>
+          <p:nvPr/>
+        </p:nvSpPr>
+        <p:spPr>
+          <a:xfrm>
+            <a:off x="1612083" y="2490281"/>
+            <a:ext cx="1842180" cy="2305456"/>
+          </a:xfrm>
+          <a:custGeom>
+            <a:avLst/>
+            <a:gdLst>
+              <a:gd name="connsiteX0" fmla="*/ 1206606 w 1842180"/>
+              <a:gd name="connsiteY0" fmla="*/ 0 h 2305456"/>
+              <a:gd name="connsiteX1" fmla="*/ 1789881 w 1842180"/>
+              <a:gd name="connsiteY1" fmla="*/ 403720 h 2305456"/>
+              <a:gd name="connsiteX2" fmla="*/ 31480 w 1842180"/>
+              <a:gd name="connsiteY2" fmla="*/ 1614881 h 2305456"/>
+              <a:gd name="connsiteX3" fmla="*/ 829193 w 1842180"/>
+              <a:gd name="connsiteY3" fmla="*/ 2305456 h 2305456"/>
+            </a:gdLst>
+            <a:ahLst/>
+            <a:cxnLst>
+              <a:cxn ang="0">
+                <a:pos x="connsiteX0" y="connsiteY0"/>
+              </a:cxn>
+              <a:cxn ang="0">
+                <a:pos x="connsiteX1" y="connsiteY1"/>
+              </a:cxn>
+              <a:cxn ang="0">
+                <a:pos x="connsiteX2" y="connsiteY2"/>
+              </a:cxn>
+              <a:cxn ang="0">
+                <a:pos x="connsiteX3" y="connsiteY3"/>
+              </a:cxn>
+            </a:cxnLst>
+            <a:rect l="l" t="t" r="r" b="b"/>
+            <a:pathLst>
+              <a:path w="1842180" h="2305456" extrusionOk="0">
+                <a:moveTo>
+                  <a:pt x="1206606" y="0"/>
+                </a:moveTo>
+                <a:cubicBezTo>
+                  <a:pt x="1542487" y="34173"/>
+                  <a:pt x="1974980" y="138610"/>
+                  <a:pt x="1789881" y="403720"/>
+                </a:cubicBezTo>
+                <a:cubicBezTo>
+                  <a:pt x="1692452" y="693588"/>
+                  <a:pt x="110981" y="1300489"/>
+                  <a:pt x="31480" y="1614881"/>
+                </a:cubicBezTo>
+                <a:cubicBezTo>
+                  <a:pt x="-233304" y="2034052"/>
+                  <a:pt x="324939" y="2258709"/>
+                  <a:pt x="829193" y="2305456"/>
+                </a:cubicBezTo>
+              </a:path>
+            </a:pathLst>
+          </a:custGeom>
+          <a:noFill/>
+          <a:ln w="57150">
+            <a:solidFill>
+              <a:schemeClr val="accent2">
+                <a:lumMod val="75000"/>
+              </a:schemeClr>
+            </a:solidFill>
+            <a:prstDash val="dash"/>
+            <a:extLst>
+              <a:ext uri="{C807C97D-BFC1-408E-A445-0C87EB9F89A2}">
+                <ask:lineSketchStyleProps xmlns:ask="http://schemas.microsoft.com/office/drawing/2018/sketchyshapes" sd="1219033472">
+                  <a:custGeom>
+                    <a:avLst/>
+                    <a:gdLst>
+                      <a:gd name="connsiteX0" fmla="*/ 1368390 w 2089182"/>
+                      <a:gd name="connsiteY0" fmla="*/ 0 h 2110902"/>
+                      <a:gd name="connsiteX1" fmla="*/ 2029871 w 2089182"/>
+                      <a:gd name="connsiteY1" fmla="*/ 369651 h 2110902"/>
+                      <a:gd name="connsiteX2" fmla="*/ 35701 w 2089182"/>
+                      <a:gd name="connsiteY2" fmla="*/ 1478604 h 2110902"/>
+                      <a:gd name="connsiteX3" fmla="*/ 940373 w 2089182"/>
+                      <a:gd name="connsiteY3" fmla="*/ 2110902 h 2110902"/>
+                    </a:gdLst>
+                    <a:ahLst/>
+                    <a:cxnLst>
+                      <a:cxn ang="0">
+                        <a:pos x="connsiteX0" y="connsiteY0"/>
+                      </a:cxn>
+                      <a:cxn ang="0">
+                        <a:pos x="connsiteX1" y="connsiteY1"/>
+                      </a:cxn>
+                      <a:cxn ang="0">
+                        <a:pos x="connsiteX2" y="connsiteY2"/>
+                      </a:cxn>
+                      <a:cxn ang="0">
+                        <a:pos x="connsiteX3" y="connsiteY3"/>
+                      </a:cxn>
+                    </a:cxnLst>
+                    <a:rect l="l" t="t" r="r" b="b"/>
+                    <a:pathLst>
+                      <a:path w="2089182" h="2110902">
+                        <a:moveTo>
+                          <a:pt x="1368390" y="0"/>
+                        </a:moveTo>
+                        <a:cubicBezTo>
+                          <a:pt x="1810188" y="61608"/>
+                          <a:pt x="2251986" y="123217"/>
+                          <a:pt x="2029871" y="369651"/>
+                        </a:cubicBezTo>
+                        <a:cubicBezTo>
+                          <a:pt x="1807756" y="616085"/>
+                          <a:pt x="217284" y="1188396"/>
+                          <a:pt x="35701" y="1478604"/>
+                        </a:cubicBezTo>
+                        <a:cubicBezTo>
+                          <a:pt x="-145882" y="1768813"/>
+                          <a:pt x="397245" y="1939857"/>
+                          <a:pt x="940373" y="2110902"/>
+                        </a:cubicBezTo>
+                      </a:path>
+                    </a:pathLst>
+                  </a:custGeom>
+                  <ask:type>
+                    <ask:lineSketchScribble/>
+                  </ask:type>
+                </ask:lineSketchStyleProps>
+              </a:ext>
+            </a:extLst>
+          </a:ln>
+        </p:spPr>
+        <p:style>
+          <a:lnRef idx="2">
+            <a:schemeClr val="accent1">
+              <a:shade val="50000"/>
+            </a:schemeClr>
+          </a:lnRef>
+          <a:fillRef idx="1">
+            <a:schemeClr val="accent1"/>
+          </a:fillRef>
+          <a:effectRef idx="0">
+            <a:schemeClr val="accent1"/>
+          </a:effectRef>
+          <a:fontRef idx="minor">
+            <a:schemeClr val="lt1"/>
+          </a:fontRef>
+        </p:style>
+        <p:txBody>
+          <a:bodyPr rtlCol="0" anchor="ctr"/>
+          <a:lstStyle/>
+          <a:p>
+            <a:pPr algn="ctr"/>
+            <a:endParaRPr lang="en-US"/>
+          </a:p>
+        </p:txBody>
+      </p:sp>
+      <p:sp>
+        <p:nvSpPr>
+          <p:cNvPr id="14" name="Freeform 13">
+            <a:extLst>
+              <a:ext uri="{FF2B5EF4-FFF2-40B4-BE49-F238E27FC236}">
+                <a16:creationId xmlns:a16="http://schemas.microsoft.com/office/drawing/2014/main" id="{F120426E-49A9-CC4A-BF42-6C4093DE209A}"/>
+              </a:ext>
+            </a:extLst>
+          </p:cNvPr>
+          <p:cNvSpPr/>
+          <p:nvPr/>
+        </p:nvSpPr>
+        <p:spPr>
+          <a:xfrm>
+            <a:off x="5097294" y="3064214"/>
+            <a:ext cx="894945" cy="1702340"/>
+          </a:xfrm>
+          <a:custGeom>
+            <a:avLst/>
+            <a:gdLst>
+              <a:gd name="connsiteX0" fmla="*/ 0 w 894945"/>
+              <a:gd name="connsiteY0" fmla="*/ 1702340 h 1702340"/>
+              <a:gd name="connsiteX1" fmla="*/ 885217 w 894945"/>
+              <a:gd name="connsiteY1" fmla="*/ 1478604 h 1702340"/>
+              <a:gd name="connsiteX2" fmla="*/ 126460 w 894945"/>
+              <a:gd name="connsiteY2" fmla="*/ 554476 h 1702340"/>
+              <a:gd name="connsiteX3" fmla="*/ 894945 w 894945"/>
+              <a:gd name="connsiteY3" fmla="*/ 0 h 1702340"/>
+              <a:gd name="connsiteX4" fmla="*/ 894945 w 894945"/>
+              <a:gd name="connsiteY4" fmla="*/ 0 h 1702340"/>
+            </a:gdLst>
+            <a:ahLst/>
+            <a:cxnLst>
+              <a:cxn ang="0">
+                <a:pos x="connsiteX0" y="connsiteY0"/>
+              </a:cxn>
+              <a:cxn ang="0">
+                <a:pos x="connsiteX1" y="connsiteY1"/>
+              </a:cxn>
+              <a:cxn ang="0">
+                <a:pos x="connsiteX2" y="connsiteY2"/>
+              </a:cxn>
+              <a:cxn ang="0">
+                <a:pos x="connsiteX3" y="connsiteY3"/>
+              </a:cxn>
+              <a:cxn ang="0">
+                <a:pos x="connsiteX4" y="connsiteY4"/>
+              </a:cxn>
+            </a:cxnLst>
+            <a:rect l="l" t="t" r="r" b="b"/>
+            <a:pathLst>
+              <a:path w="894945" h="1702340">
+                <a:moveTo>
+                  <a:pt x="0" y="1702340"/>
+                </a:moveTo>
+                <a:cubicBezTo>
+                  <a:pt x="432070" y="1686127"/>
+                  <a:pt x="864140" y="1669915"/>
+                  <a:pt x="885217" y="1478604"/>
+                </a:cubicBezTo>
+                <a:cubicBezTo>
+                  <a:pt x="906294" y="1287293"/>
+                  <a:pt x="124839" y="800910"/>
+                  <a:pt x="126460" y="554476"/>
+                </a:cubicBezTo>
+                <a:cubicBezTo>
+                  <a:pt x="128081" y="308042"/>
+                  <a:pt x="894945" y="0"/>
+                  <a:pt x="894945" y="0"/>
+                </a:cubicBezTo>
+                <a:lnTo>
+                  <a:pt x="894945" y="0"/>
+                </a:lnTo>
+              </a:path>
+            </a:pathLst>
+          </a:custGeom>
+          <a:noFill/>
+          <a:ln w="57150">
+            <a:solidFill>
+              <a:schemeClr val="accent2">
+                <a:lumMod val="75000"/>
+              </a:schemeClr>
+            </a:solidFill>
+            <a:prstDash val="dash"/>
+            <a:headEnd type="none" w="med" len="med"/>
+            <a:tailEnd type="triangle" w="lg" len="lg"/>
+          </a:ln>
+        </p:spPr>
+        <p:style>
+          <a:lnRef idx="2">
+            <a:schemeClr val="accent1">
+              <a:shade val="50000"/>
+            </a:schemeClr>
+          </a:lnRef>
+          <a:fillRef idx="1">
+            <a:schemeClr val="accent1"/>
+          </a:fillRef>
+          <a:effectRef idx="0">
+            <a:schemeClr val="accent1"/>
+          </a:effectRef>
+          <a:fontRef idx="minor">
+            <a:schemeClr val="lt1"/>
+          </a:fontRef>
+        </p:style>
+        <p:txBody>
+          <a:bodyPr rtlCol="0" anchor="ctr"/>
+          <a:lstStyle/>
+          <a:p>
+            <a:pPr algn="ctr"/>
+            <a:endParaRPr lang="en-US"/>
+          </a:p>
+        </p:txBody>
+      </p:sp>
+    </p:spTree>
+    <p:extLst>
+      <p:ext uri="{BB962C8B-B14F-4D97-AF65-F5344CB8AC3E}">
+        <p14:creationId xmlns:p14="http://schemas.microsoft.com/office/powerpoint/2010/main" val="1104418864"/>
       </p:ext>
     </p:extLst>
   </p:cSld>
@@ -7245,7 +7680,7 @@
           <a:p>
             <a:pPr algn="ctr"/>
             <a:r>
-              <a:rPr lang="en-US" sz="5400" b="1" dirty="0" smtClean="0">
+              <a:rPr lang="en-US" sz="5400" b="1" dirty="0">
                 <a:solidFill>
                   <a:srgbClr val="052B48"/>
                 </a:solidFill>
@@ -7254,13 +7689,6 @@
               </a:rPr>
               <a:t>Query Intracellular Electrophysiology Metadata</a:t>
             </a:r>
-            <a:endParaRPr lang="en-US" sz="5400" b="1" dirty="0">
-              <a:solidFill>
-                <a:srgbClr val="052B48"/>
-              </a:solidFill>
-              <a:latin typeface="Calibri"/>
-              <a:cs typeface="Calibri"/>
-            </a:endParaRPr>
           </a:p>
         </p:txBody>
       </p:sp>
@@ -7396,7 +7824,7 @@
           <a:p>
             <a:pPr algn="ctr"/>
             <a:r>
-              <a:rPr lang="en-US" sz="5400" b="1" dirty="0" smtClean="0">
+              <a:rPr lang="en-US" sz="5400" b="1" dirty="0">
                 <a:solidFill>
                   <a:srgbClr val="052B48"/>
                 </a:solidFill>
@@ -7406,7 +7834,7 @@
               <a:t>Intracellular Electrophysiology Data using </a:t>
             </a:r>
             <a:r>
-              <a:rPr lang="en-US" sz="5400" b="1" dirty="0" err="1" smtClean="0">
+              <a:rPr lang="en-US" sz="5400" b="1" dirty="0" err="1">
                 <a:solidFill>
                   <a:srgbClr val="052B48"/>
                 </a:solidFill>
@@ -7468,18 +7896,13 @@
           <a:p>
             <a:pPr algn="ctr"/>
             <a:r>
-              <a:rPr lang="en-US" sz="5400" b="1" dirty="0" smtClean="0">
+              <a:rPr lang="en-US" sz="5400" b="1" dirty="0">
                 <a:solidFill>
                   <a:srgbClr val="FF0000"/>
                 </a:solidFill>
               </a:rPr>
               <a:t>DEPRECATED</a:t>
             </a:r>
-            <a:endParaRPr lang="en-US" sz="5400" b="1" dirty="0">
-              <a:solidFill>
-                <a:srgbClr val="FF0000"/>
-              </a:solidFill>
-            </a:endParaRPr>
           </a:p>
         </p:txBody>
       </p:sp>
@@ -7585,7 +8008,7 @@
           <a:p>
             <a:pPr algn="ctr"/>
             <a:r>
-              <a:rPr lang="en-US" sz="5400" b="1" dirty="0" smtClean="0">
+              <a:rPr lang="en-US" sz="5400" b="1" dirty="0">
                 <a:solidFill>
                   <a:srgbClr val="052B48"/>
                 </a:solidFill>
@@ -7594,13 +8017,6 @@
               </a:rPr>
               <a:t>Allen Brain Observatory</a:t>
             </a:r>
-            <a:endParaRPr lang="en-US" sz="5400" b="1" dirty="0">
-              <a:solidFill>
-                <a:srgbClr val="052B48"/>
-              </a:solidFill>
-              <a:latin typeface="Calibri"/>
-              <a:cs typeface="Calibri"/>
-            </a:endParaRPr>
           </a:p>
         </p:txBody>
       </p:sp>
@@ -7627,33 +8043,18 @@
           <a:p>
             <a:r>
               <a:rPr lang="en-US" sz="1400" dirty="0"/>
-              <a:t> </a:t>
-            </a:r>
-            <a:r>
-              <a:rPr lang="en-US" sz="1400" dirty="0" smtClean="0"/>
-              <a:t>(figure source</a:t>
-            </a:r>
-            <a:r>
-              <a:rPr lang="en-US" sz="1400" dirty="0"/>
-              <a:t>: </a:t>
+              <a:t> (figure source: </a:t>
             </a:r>
             <a:r>
               <a:rPr lang="en-US" sz="1400" dirty="0">
                 <a:hlinkClick r:id="rId2"/>
               </a:rPr>
-              <a:t>https://observatory.brain-</a:t>
+              <a:t>https://observatory.brain-map.org</a:t>
             </a:r>
             <a:r>
-              <a:rPr lang="en-US" sz="1400" dirty="0" smtClean="0">
-                <a:hlinkClick r:id="rId2"/>
-              </a:rPr>
-              <a:t>map.org</a:t>
-            </a:r>
-            <a:r>
-              <a:rPr lang="en-US" sz="1400" dirty="0" smtClean="0"/>
+              <a:rPr lang="en-US" sz="1400" dirty="0"/>
               <a:t>)</a:t>
             </a:r>
-            <a:endParaRPr lang="en-US" sz="1400" dirty="0"/>
           </a:p>
         </p:txBody>
       </p:sp>
@@ -7788,7 +8189,7 @@
           <a:p>
             <a:pPr algn="ctr"/>
             <a:r>
-              <a:rPr lang="en-US" sz="5400" b="1" dirty="0" smtClean="0">
+              <a:rPr lang="en-US" sz="5400" b="1" dirty="0">
                 <a:solidFill>
                   <a:srgbClr val="052B48"/>
                 </a:solidFill>
@@ -7797,13 +8198,6 @@
               </a:rPr>
               <a:t>Extracellular Electrophysiology</a:t>
             </a:r>
-            <a:endParaRPr lang="en-US" sz="5400" b="1" dirty="0">
-              <a:solidFill>
-                <a:srgbClr val="052B48"/>
-              </a:solidFill>
-              <a:latin typeface="Calibri"/>
-              <a:cs typeface="Calibri"/>
-            </a:endParaRPr>
           </a:p>
         </p:txBody>
       </p:sp>
@@ -7979,7 +8373,7 @@
           <a:p>
             <a:pPr algn="ctr"/>
             <a:r>
-              <a:rPr lang="en-US" sz="5400" b="1" dirty="0" smtClean="0">
+              <a:rPr lang="en-US" sz="5400" b="1" dirty="0">
                 <a:solidFill>
                   <a:srgbClr val="052B48"/>
                 </a:solidFill>
@@ -7988,13 +8382,6 @@
               </a:rPr>
               <a:t>Calcium Imaging Data</a:t>
             </a:r>
-            <a:endParaRPr lang="en-US" sz="5400" b="1" dirty="0">
-              <a:solidFill>
-                <a:srgbClr val="052B48"/>
-              </a:solidFill>
-              <a:latin typeface="Calibri"/>
-              <a:cs typeface="Calibri"/>
-            </a:endParaRPr>
           </a:p>
         </p:txBody>
       </p:sp>
@@ -8129,7 +8516,7 @@
           <a:p>
             <a:pPr algn="ctr"/>
             <a:r>
-              <a:rPr lang="en-US" sz="5400" b="1" dirty="0" smtClean="0">
+              <a:rPr lang="en-US" sz="5400" b="1" dirty="0">
                 <a:solidFill>
                   <a:srgbClr val="052B48"/>
                 </a:solidFill>
@@ -8138,13 +8525,6 @@
               </a:rPr>
               <a:t>Iterative Data Write</a:t>
             </a:r>
-            <a:endParaRPr lang="en-US" sz="5400" b="1" dirty="0">
-              <a:solidFill>
-                <a:srgbClr val="052B48"/>
-              </a:solidFill>
-              <a:latin typeface="Calibri"/>
-              <a:cs typeface="Calibri"/>
-            </a:endParaRPr>
           </a:p>
         </p:txBody>
       </p:sp>
@@ -8427,7 +8807,7 @@
           <a:p>
             <a:pPr algn="ctr"/>
             <a:r>
-              <a:rPr lang="en-US" sz="5400" b="1" dirty="0" smtClean="0">
+              <a:rPr lang="en-US" sz="5400" b="1" dirty="0">
                 <a:solidFill>
                   <a:srgbClr val="052B48"/>
                 </a:solidFill>
@@ -8436,13 +8816,6 @@
               </a:rPr>
               <a:t>HDF5 Dataset I/O</a:t>
             </a:r>
-            <a:endParaRPr lang="en-US" sz="5400" b="1" dirty="0">
-              <a:solidFill>
-                <a:srgbClr val="052B48"/>
-              </a:solidFill>
-              <a:latin typeface="Calibri"/>
-              <a:cs typeface="Calibri"/>
-            </a:endParaRPr>
           </a:p>
         </p:txBody>
       </p:sp>
@@ -9052,7 +9425,7 @@
           <a:p>
             <a:pPr algn="ctr"/>
             <a:r>
-              <a:rPr lang="en-US" sz="5400" b="1" dirty="0" smtClean="0">
+              <a:rPr lang="en-US" sz="5400" b="1" dirty="0">
                 <a:solidFill>
                   <a:srgbClr val="052B48"/>
                 </a:solidFill>
@@ -9061,13 +9434,6 @@
               </a:rPr>
               <a:t>Modular Data Storage using External Files</a:t>
             </a:r>
-            <a:endParaRPr lang="en-US" sz="5400" b="1" dirty="0">
-              <a:solidFill>
-                <a:srgbClr val="052B48"/>
-              </a:solidFill>
-              <a:latin typeface="Calibri"/>
-              <a:cs typeface="Calibri"/>
-            </a:endParaRPr>
           </a:p>
         </p:txBody>
       </p:sp>
@@ -9392,10 +9758,9 @@
           <a:p>
             <a:pPr algn="ctr"/>
             <a:r>
-              <a:rPr lang="en-US" u="sng" dirty="0" smtClean="0"/>
+              <a:rPr lang="en-US" u="sng" dirty="0"/>
               <a:t>																			   </a:t>
             </a:r>
-            <a:endParaRPr lang="en-US" u="sng" dirty="0"/>
           </a:p>
         </p:txBody>
       </p:sp>
@@ -10124,7 +10489,7 @@
   <a:extraClrSchemeLst/>
   <a:extLst>
     <a:ext uri="{05A4C25C-085E-4340-85A3-A5531E510DB2}">
-      <thm15:themeFamily xmlns="" xmlns:thm15="http://schemas.microsoft.com/office/thememl/2012/main" name="Office Theme" id="{62F939B6-93AF-4DB8-9C6B-D6C7DFDC589F}" vid="{4A3C46E8-61CC-4603-A589-7422A47A8E4A}"/>
+      <thm15:themeFamily xmlns:thm15="http://schemas.microsoft.com/office/thememl/2012/main" name="Office Theme" id="{62F939B6-93AF-4DB8-9C6B-D6C7DFDC589F}" vid="{4A3C46E8-61CC-4603-A589-7422A47A8E4A}"/>
     </a:ext>
   </a:extLst>
 </a:theme>

</xml_diff>

<commit_message>
Add thumbnail for behavior data tutorial (#1473)
* Add thumbnail for behavior data tutorial

* Remove whitespace around thumbnail
</commit_message>
<xml_diff>
--- a/docs/source/figures/gallery_thumbnails.pptx
+++ b/docs/source/figures/gallery_thumbnails.pptx
@@ -5,7 +5,7 @@
     <p:sldMasterId id="2147483660" r:id="rId1"/>
   </p:sldMasterIdLst>
   <p:notesMasterIdLst>
-    <p:notesMasterId r:id="rId18"/>
+    <p:notesMasterId r:id="rId19"/>
   </p:notesMasterIdLst>
   <p:sldIdLst>
     <p:sldId id="342" r:id="rId2"/>
@@ -24,6 +24,7 @@
     <p:sldId id="355" r:id="rId15"/>
     <p:sldId id="358" r:id="rId16"/>
     <p:sldId id="359" r:id="rId17"/>
+    <p:sldId id="364" r:id="rId18"/>
   </p:sldIdLst>
   <p:sldSz cx="12192000" cy="6858000"/>
   <p:notesSz cx="6858000" cy="9144000"/>
@@ -124,7 +125,18 @@
   </p:defaultTextStyle>
   <p:extLst>
     <p:ext uri="{EFAFB233-063F-42B5-8137-9DF3F51BA10A}">
-      <p15:sldGuideLst xmlns="" xmlns:p15="http://schemas.microsoft.com/office/powerpoint/2012/main"/>
+      <p15:sldGuideLst xmlns:p15="http://schemas.microsoft.com/office/powerpoint/2012/main">
+        <p15:guide id="1" orient="horz" pos="3405">
+          <p15:clr>
+            <a:srgbClr val="A4A3A4"/>
+          </p15:clr>
+        </p15:guide>
+        <p15:guide id="2" pos="4184">
+          <p15:clr>
+            <a:srgbClr val="A4A3A4"/>
+          </p15:clr>
+        </p15:guide>
+      </p15:sldGuideLst>
     </p:ext>
   </p:extLst>
 </p:presentation>
@@ -212,7 +224,7 @@
           <a:p>
             <a:fld id="{4D6A40B9-902A-4E0E-AF39-1C357549AEE0}" type="datetimeFigureOut">
               <a:rPr lang="en-US" smtClean="0"/>
-              <a:t>8/11/21</a:t>
+              <a:t>5/5/22</a:t>
             </a:fld>
             <a:endParaRPr lang="en-US"/>
           </a:p>
@@ -1544,7 +1556,7 @@
           <p:cNvPr id="4" name="Text Placeholder 3">
             <a:extLst>
               <a:ext uri="{FF2B5EF4-FFF2-40B4-BE49-F238E27FC236}">
-                <a16:creationId xmlns="" xmlns:a16="http://schemas.microsoft.com/office/drawing/2014/main" id="{8850B379-F419-41FB-9123-96081B074583}"/>
+                <a16:creationId xmlns:a16="http://schemas.microsoft.com/office/drawing/2014/main" id="{8850B379-F419-41FB-9123-96081B074583}"/>
               </a:ext>
             </a:extLst>
           </p:cNvPr>
@@ -1835,7 +1847,7 @@
           <p:cNvPr id="5" name="Picture 4">
             <a:extLst>
               <a:ext uri="{FF2B5EF4-FFF2-40B4-BE49-F238E27FC236}">
-                <a16:creationId xmlns="" xmlns:a16="http://schemas.microsoft.com/office/drawing/2014/main" id="{A5059957-9534-4FB9-8820-2343C3BF0E8F}"/>
+                <a16:creationId xmlns:a16="http://schemas.microsoft.com/office/drawing/2014/main" id="{A5059957-9534-4FB9-8820-2343C3BF0E8F}"/>
               </a:ext>
             </a:extLst>
           </p:cNvPr>
@@ -1865,7 +1877,7 @@
           <p:cNvPr id="4" name="Text Placeholder 3">
             <a:extLst>
               <a:ext uri="{FF2B5EF4-FFF2-40B4-BE49-F238E27FC236}">
-                <a16:creationId xmlns="" xmlns:a16="http://schemas.microsoft.com/office/drawing/2014/main" id="{8850B379-F419-41FB-9123-96081B074583}"/>
+                <a16:creationId xmlns:a16="http://schemas.microsoft.com/office/drawing/2014/main" id="{8850B379-F419-41FB-9123-96081B074583}"/>
               </a:ext>
             </a:extLst>
           </p:cNvPr>
@@ -2222,7 +2234,7 @@
           <p:cNvPr id="7" name="Google Shape;20;p4">
             <a:extLst>
               <a:ext uri="{FF2B5EF4-FFF2-40B4-BE49-F238E27FC236}">
-                <a16:creationId xmlns="" xmlns:a16="http://schemas.microsoft.com/office/drawing/2014/main" id="{537643E4-B983-42CC-9421-9C4C107A5DA4}"/>
+                <a16:creationId xmlns:a16="http://schemas.microsoft.com/office/drawing/2014/main" id="{537643E4-B983-42CC-9421-9C4C107A5DA4}"/>
               </a:ext>
             </a:extLst>
           </p:cNvPr>
@@ -3627,7 +3639,7 @@
           <a:p>
             <a:pPr algn="ctr"/>
             <a:r>
-              <a:rPr lang="en-US" sz="5400" b="1" dirty="0" smtClean="0">
+              <a:rPr lang="en-US" sz="5400" b="1" dirty="0">
                 <a:solidFill>
                   <a:srgbClr val="052B48"/>
                 </a:solidFill>
@@ -3636,13 +3648,6 @@
               </a:rPr>
               <a:t>Intracellular Electrophysiology</a:t>
             </a:r>
-            <a:endParaRPr lang="en-US" sz="5400" b="1" dirty="0">
-              <a:solidFill>
-                <a:srgbClr val="052B48"/>
-              </a:solidFill>
-              <a:latin typeface="Calibri"/>
-              <a:cs typeface="Calibri"/>
-            </a:endParaRPr>
           </a:p>
         </p:txBody>
       </p:sp>
@@ -3651,7 +3656,7 @@
           <p:cNvPr id="5" name="Picture 4" descr="A screenshot of a cell phone&#10;&#10;Description automatically generated">
             <a:extLst>
               <a:ext uri="{FF2B5EF4-FFF2-40B4-BE49-F238E27FC236}">
-                <a16:creationId xmlns:a16="http://schemas.microsoft.com/office/drawing/2014/main" xmlns="" id="{8C303482-C4AE-E049-A13A-50CE832D1F2A}"/>
+                <a16:creationId xmlns:a16="http://schemas.microsoft.com/office/drawing/2014/main" id="{8C303482-C4AE-E049-A13A-50CE832D1F2A}"/>
               </a:ext>
             </a:extLst>
           </p:cNvPr>
@@ -3704,33 +3709,18 @@
           <a:p>
             <a:r>
               <a:rPr lang="en-US" sz="1400" dirty="0"/>
-              <a:t> </a:t>
-            </a:r>
-            <a:r>
-              <a:rPr lang="en-US" sz="1400" dirty="0" smtClean="0"/>
-              <a:t>(figure source</a:t>
-            </a:r>
-            <a:r>
-              <a:rPr lang="en-US" sz="1400" dirty="0"/>
-              <a:t>: </a:t>
+              <a:t> (figure source: </a:t>
             </a:r>
             <a:r>
               <a:rPr lang="en-US" sz="1400" dirty="0">
                 <a:hlinkClick r:id="rId3"/>
               </a:rPr>
-              <a:t>celltypes.brain-</a:t>
+              <a:t>celltypes.brain-map.org</a:t>
             </a:r>
             <a:r>
-              <a:rPr lang="en-US" sz="1400" dirty="0" smtClean="0">
-                <a:hlinkClick r:id="rId3"/>
-              </a:rPr>
-              <a:t>map.org</a:t>
-            </a:r>
-            <a:r>
-              <a:rPr lang="en-US" sz="1400" dirty="0" smtClean="0"/>
+              <a:rPr lang="en-US" sz="1400" dirty="0"/>
               <a:t>)</a:t>
             </a:r>
-            <a:endParaRPr lang="en-US" sz="1400" dirty="0"/>
           </a:p>
         </p:txBody>
       </p:sp>
@@ -3836,7 +3826,7 @@
           <a:p>
             <a:pPr algn="ctr"/>
             <a:r>
-              <a:rPr lang="en-US" sz="5400" b="1" dirty="0" smtClean="0">
+              <a:rPr lang="en-US" sz="5400" b="1" dirty="0">
                 <a:solidFill>
                   <a:srgbClr val="052B48"/>
                 </a:solidFill>
@@ -3845,13 +3835,6 @@
               </a:rPr>
               <a:t>Parallel I/O using MPI</a:t>
             </a:r>
-            <a:endParaRPr lang="en-US" sz="5400" b="1" dirty="0">
-              <a:solidFill>
-                <a:srgbClr val="052B48"/>
-              </a:solidFill>
-              <a:latin typeface="Calibri"/>
-              <a:cs typeface="Calibri"/>
-            </a:endParaRPr>
           </a:p>
         </p:txBody>
       </p:sp>
@@ -3901,10 +3884,9 @@
           <a:p>
             <a:pPr algn="ctr"/>
             <a:r>
-              <a:rPr lang="en-US" u="sng" dirty="0" smtClean="0"/>
+              <a:rPr lang="en-US" u="sng" dirty="0"/>
               <a:t>																			   </a:t>
             </a:r>
-            <a:endParaRPr lang="en-US" u="sng" dirty="0"/>
           </a:p>
         </p:txBody>
       </p:sp>
@@ -4050,7 +4032,7 @@
               <a:defRPr/>
             </a:pPr>
             <a:r>
-              <a:rPr kumimoji="0" lang="en-US" sz="1800" i="0" u="none" strike="noStrike" kern="0" cap="none" spc="0" normalizeH="0" baseline="0" noProof="0" dirty="0" err="1" smtClean="0">
+              <a:rPr kumimoji="0" lang="en-US" sz="1800" i="0" u="none" strike="noStrike" kern="0" cap="none" spc="0" normalizeH="0" baseline="0" noProof="0" dirty="0" err="1">
                 <a:ln>
                   <a:noFill/>
                 </a:ln>
@@ -4136,7 +4118,7 @@
               <a:defRPr/>
             </a:pPr>
             <a:r>
-              <a:rPr kumimoji="0" lang="en-US" sz="1800" i="0" u="none" strike="noStrike" kern="0" cap="none" spc="0" normalizeH="0" baseline="0" noProof="0" dirty="0" err="1" smtClean="0">
+              <a:rPr kumimoji="0" lang="en-US" sz="1800" i="0" u="none" strike="noStrike" kern="0" cap="none" spc="0" normalizeH="0" baseline="0" noProof="0" dirty="0" err="1">
                 <a:ln>
                   <a:noFill/>
                 </a:ln>
@@ -4222,7 +4204,7 @@
               <a:defRPr/>
             </a:pPr>
             <a:r>
-              <a:rPr kumimoji="0" lang="en-US" sz="1800" i="0" u="none" strike="noStrike" kern="0" cap="none" spc="0" normalizeH="0" baseline="0" noProof="0" dirty="0" err="1" smtClean="0">
+              <a:rPr kumimoji="0" lang="en-US" sz="1800" i="0" u="none" strike="noStrike" kern="0" cap="none" spc="0" normalizeH="0" baseline="0" noProof="0" dirty="0" err="1">
                 <a:ln>
                   <a:noFill/>
                 </a:ln>
@@ -4308,7 +4290,7 @@
               <a:defRPr/>
             </a:pPr>
             <a:r>
-              <a:rPr kumimoji="0" lang="en-US" sz="1800" i="0" u="none" strike="noStrike" kern="0" cap="none" spc="0" normalizeH="0" baseline="0" noProof="0" dirty="0" err="1" smtClean="0">
+              <a:rPr kumimoji="0" lang="en-US" sz="1800" i="0" u="none" strike="noStrike" kern="0" cap="none" spc="0" normalizeH="0" baseline="0" noProof="0" dirty="0" err="1">
                 <a:ln>
                   <a:noFill/>
                 </a:ln>
@@ -4689,7 +4671,7 @@
               <a:defRPr/>
             </a:pPr>
             <a:r>
-              <a:rPr kumimoji="0" lang="en-US" sz="1800" i="0" u="none" strike="noStrike" kern="0" cap="none" spc="0" normalizeH="0" baseline="0" noProof="0" dirty="0" err="1" smtClean="0">
+              <a:rPr kumimoji="0" lang="en-US" sz="1800" i="0" u="none" strike="noStrike" kern="0" cap="none" spc="0" normalizeH="0" baseline="0" noProof="0" dirty="0" err="1">
                 <a:ln>
                   <a:noFill/>
                 </a:ln>
@@ -4834,7 +4816,7 @@
               <a:defRPr/>
             </a:pPr>
             <a:r>
-              <a:rPr kumimoji="0" lang="en-US" sz="1800" i="0" u="none" strike="noStrike" kern="0" cap="none" spc="0" normalizeH="0" baseline="0" noProof="0" dirty="0" err="1" smtClean="0">
+              <a:rPr kumimoji="0" lang="en-US" sz="1800" i="0" u="none" strike="noStrike" kern="0" cap="none" spc="0" normalizeH="0" baseline="0" noProof="0" dirty="0" err="1">
                 <a:ln>
                   <a:noFill/>
                 </a:ln>
@@ -4979,7 +4961,7 @@
               <a:defRPr/>
             </a:pPr>
             <a:r>
-              <a:rPr kumimoji="0" lang="en-US" sz="1800" i="0" u="none" strike="noStrike" kern="0" cap="none" spc="0" normalizeH="0" baseline="0" noProof="0" dirty="0" err="1" smtClean="0">
+              <a:rPr kumimoji="0" lang="en-US" sz="1800" i="0" u="none" strike="noStrike" kern="0" cap="none" spc="0" normalizeH="0" baseline="0" noProof="0" dirty="0" err="1">
                 <a:ln>
                   <a:noFill/>
                 </a:ln>
@@ -5124,7 +5106,7 @@
               <a:defRPr/>
             </a:pPr>
             <a:r>
-              <a:rPr kumimoji="0" lang="en-US" sz="1800" i="0" u="none" strike="noStrike" kern="0" cap="none" spc="0" normalizeH="0" baseline="0" noProof="0" dirty="0" err="1" smtClean="0">
+              <a:rPr kumimoji="0" lang="en-US" sz="1800" i="0" u="none" strike="noStrike" kern="0" cap="none" spc="0" normalizeH="0" baseline="0" noProof="0" dirty="0" err="1">
                 <a:ln>
                   <a:noFill/>
                 </a:ln>
@@ -5263,7 +5245,7 @@
           <a:p>
             <a:pPr algn="ctr"/>
             <a:r>
-              <a:rPr lang="en-US" sz="5400" b="1" dirty="0" smtClean="0">
+              <a:rPr lang="en-US" sz="5400" b="1" dirty="0">
                 <a:solidFill>
                   <a:srgbClr val="052B48"/>
                 </a:solidFill>
@@ -5276,7 +5258,7 @@
           <a:p>
             <a:pPr algn="ctr"/>
             <a:r>
-              <a:rPr lang="en-US" sz="5400" b="1" dirty="0" smtClean="0">
+              <a:rPr lang="en-US" sz="5400" b="1" dirty="0">
                 <a:solidFill>
                   <a:srgbClr val="052B48"/>
                 </a:solidFill>
@@ -5285,13 +5267,6 @@
               </a:rPr>
               <a:t>S3 Bucket</a:t>
             </a:r>
-            <a:endParaRPr lang="en-US" sz="5400" b="1" dirty="0">
-              <a:solidFill>
-                <a:srgbClr val="052B48"/>
-              </a:solidFill>
-              <a:latin typeface="Calibri"/>
-              <a:cs typeface="Calibri"/>
-            </a:endParaRPr>
           </a:p>
         </p:txBody>
       </p:sp>
@@ -5452,10 +5427,9 @@
             <a:p>
               <a:pPr algn="ctr"/>
               <a:r>
-                <a:rPr lang="en-US" u="sng" dirty="0" smtClean="0"/>
+                <a:rPr lang="en-US" u="sng" dirty="0"/>
                 <a:t>												   </a:t>
               </a:r>
-              <a:endParaRPr lang="en-US" u="sng" dirty="0"/>
             </a:p>
           </p:txBody>
         </p:sp>
@@ -5833,14 +5807,14 @@
           <a:p>
             <a:pPr algn="ctr"/>
             <a:r>
-              <a:rPr lang="en-US" sz="1200" dirty="0" smtClean="0">
+              <a:rPr lang="en-US" sz="1200" dirty="0">
                 <a:latin typeface="Courier"/>
                 <a:cs typeface="Courier"/>
               </a:rPr>
               <a:t>010011101000101011101</a:t>
             </a:r>
             <a:r>
-              <a:rPr lang="mr-IN" sz="1200" dirty="0" smtClean="0">
+              <a:rPr lang="mr-IN" sz="1200" dirty="0">
                 <a:latin typeface="Courier"/>
                 <a:cs typeface="Courier"/>
               </a:rPr>
@@ -5985,7 +5959,7 @@
           <a:p>
             <a:pPr algn="ctr"/>
             <a:r>
-              <a:rPr lang="en-US" sz="5400" b="1" dirty="0" smtClean="0">
+              <a:rPr lang="en-US" sz="5400" b="1" dirty="0">
                 <a:solidFill>
                   <a:srgbClr val="052B48"/>
                 </a:solidFill>
@@ -5994,13 +5968,6 @@
               </a:rPr>
               <a:t>Object IDs in NWB</a:t>
             </a:r>
-            <a:endParaRPr lang="en-US" sz="5400" b="1" dirty="0">
-              <a:solidFill>
-                <a:srgbClr val="052B48"/>
-              </a:solidFill>
-              <a:latin typeface="Calibri"/>
-              <a:cs typeface="Calibri"/>
-            </a:endParaRPr>
           </a:p>
         </p:txBody>
       </p:sp>
@@ -6205,7 +6172,7 @@
           <a:p>
             <a:pPr algn="ctr"/>
             <a:r>
-              <a:rPr lang="en-US" sz="5400" b="1" dirty="0" smtClean="0">
+              <a:rPr lang="en-US" sz="5400" b="1" dirty="0">
                 <a:solidFill>
                   <a:srgbClr val="052B48"/>
                 </a:solidFill>
@@ -6214,13 +6181,6 @@
               </a:rPr>
               <a:t>Extending NWB</a:t>
             </a:r>
-            <a:endParaRPr lang="en-US" sz="5400" b="1" dirty="0">
-              <a:solidFill>
-                <a:srgbClr val="052B48"/>
-              </a:solidFill>
-              <a:latin typeface="Calibri"/>
-              <a:cs typeface="Calibri"/>
-            </a:endParaRPr>
           </a:p>
         </p:txBody>
       </p:sp>
@@ -6354,7 +6314,7 @@
           <a:p>
             <a:pPr algn="ctr"/>
             <a:r>
-              <a:rPr lang="en-US" sz="5400" b="1" dirty="0" smtClean="0">
+              <a:rPr lang="en-US" sz="5400" b="1" dirty="0">
                 <a:solidFill>
                   <a:srgbClr val="052B48"/>
                 </a:solidFill>
@@ -6363,13 +6323,6 @@
               </a:rPr>
               <a:t>Adding/Removing Containers from an NWB File </a:t>
             </a:r>
-            <a:endParaRPr lang="en-US" sz="5400" b="1" dirty="0">
-              <a:solidFill>
-                <a:srgbClr val="052B48"/>
-              </a:solidFill>
-              <a:latin typeface="Calibri"/>
-              <a:cs typeface="Calibri"/>
-            </a:endParaRPr>
           </a:p>
         </p:txBody>
       </p:sp>
@@ -6419,10 +6372,9 @@
           <a:p>
             <a:pPr algn="ctr"/>
             <a:r>
-              <a:rPr lang="en-US" u="sng" dirty="0" smtClean="0"/>
+              <a:rPr lang="en-US" u="sng" dirty="0"/>
               <a:t>																			   </a:t>
             </a:r>
-            <a:endParaRPr lang="en-US" u="sng" dirty="0"/>
           </a:p>
         </p:txBody>
       </p:sp>
@@ -6686,7 +6638,7 @@
           <a:p>
             <a:pPr algn="ctr"/>
             <a:r>
-              <a:rPr lang="en-US" sz="5400" b="1" dirty="0" smtClean="0">
+              <a:rPr lang="en-US" sz="5400" b="1" dirty="0">
                 <a:solidFill>
                   <a:srgbClr val="052B48"/>
                 </a:solidFill>
@@ -6695,13 +6647,6 @@
               </a:rPr>
               <a:t>NWB File Basics</a:t>
             </a:r>
-            <a:endParaRPr lang="en-US" sz="5400" b="1" dirty="0">
-              <a:solidFill>
-                <a:srgbClr val="052B48"/>
-              </a:solidFill>
-              <a:latin typeface="Calibri"/>
-              <a:cs typeface="Calibri"/>
-            </a:endParaRPr>
           </a:p>
         </p:txBody>
       </p:sp>
@@ -6751,10 +6696,9 @@
           <a:p>
             <a:pPr algn="ctr"/>
             <a:r>
-              <a:rPr lang="en-US" sz="2400" u="sng" dirty="0" smtClean="0"/>
+              <a:rPr lang="en-US" sz="2400" u="sng" dirty="0"/>
               <a:t>																														   </a:t>
             </a:r>
-            <a:endParaRPr lang="en-US" sz="2400" u="sng" dirty="0"/>
           </a:p>
         </p:txBody>
       </p:sp>
@@ -6936,7 +6880,7 @@
           <a:p>
             <a:pPr algn="ctr"/>
             <a:r>
-              <a:rPr lang="en-US" sz="5400" b="1" dirty="0" smtClean="0">
+              <a:rPr lang="en-US" sz="5400" b="1" dirty="0">
                 <a:solidFill>
                   <a:srgbClr val="052B48"/>
                 </a:solidFill>
@@ -6945,13 +6889,6 @@
               </a:rPr>
               <a:t>Exploratory Data Analysis with NWB</a:t>
             </a:r>
-            <a:endParaRPr lang="en-US" sz="5400" b="1" dirty="0">
-              <a:solidFill>
-                <a:srgbClr val="052B48"/>
-              </a:solidFill>
-              <a:latin typeface="Calibri"/>
-              <a:cs typeface="Calibri"/>
-            </a:endParaRPr>
           </a:p>
         </p:txBody>
       </p:sp>
@@ -7001,10 +6938,9 @@
           <a:p>
             <a:pPr algn="ctr"/>
             <a:r>
-              <a:rPr lang="en-US" u="sng" dirty="0" smtClean="0"/>
+              <a:rPr lang="en-US" u="sng" dirty="0"/>
               <a:t>																					   </a:t>
             </a:r>
-            <a:endParaRPr lang="en-US" u="sng" dirty="0"/>
           </a:p>
         </p:txBody>
       </p:sp>
@@ -7124,7 +7060,7 @@
           <a:lstStyle/>
           <a:p>
             <a:r>
-              <a:rPr lang="en-US" sz="3800" b="1" dirty="0" smtClean="0">
+              <a:rPr lang="en-US" sz="3800" b="1" dirty="0">
                 <a:solidFill>
                   <a:schemeClr val="bg1"/>
                 </a:solidFill>
@@ -7133,13 +7069,6 @@
               </a:rPr>
               <a:t>/scratch</a:t>
             </a:r>
-            <a:endParaRPr lang="en-US" sz="3800" b="1" dirty="0">
-              <a:solidFill>
-                <a:schemeClr val="bg1"/>
-              </a:solidFill>
-              <a:latin typeface="Courier"/>
-              <a:cs typeface="Courier"/>
-            </a:endParaRPr>
           </a:p>
         </p:txBody>
       </p:sp>
@@ -7147,6 +7076,512 @@
     <p:extLst>
       <p:ext uri="{BB962C8B-B14F-4D97-AF65-F5344CB8AC3E}">
         <p14:creationId xmlns:p14="http://schemas.microsoft.com/office/powerpoint/2010/main" val="122021392"/>
+      </p:ext>
+    </p:extLst>
+  </p:cSld>
+  <p:clrMapOvr>
+    <a:masterClrMapping/>
+  </p:clrMapOvr>
+</p:sld>
+</file>
+
+<file path=ppt/slides/slide17.xml><?xml version="1.0" encoding="utf-8"?>
+<p:sld xmlns:a="http://schemas.openxmlformats.org/drawingml/2006/main" xmlns:r="http://schemas.openxmlformats.org/officeDocument/2006/relationships" xmlns:p="http://schemas.openxmlformats.org/presentationml/2006/main">
+  <p:cSld>
+    <p:spTree>
+      <p:nvGrpSpPr>
+        <p:cNvPr id="1" name=""/>
+        <p:cNvGrpSpPr/>
+        <p:nvPr/>
+      </p:nvGrpSpPr>
+      <p:grpSpPr>
+        <a:xfrm>
+          <a:off x="0" y="0"/>
+          <a:ext cx="0" cy="0"/>
+          <a:chOff x="0" y="0"/>
+          <a:chExt cx="0" cy="0"/>
+        </a:xfrm>
+      </p:grpSpPr>
+      <p:sp>
+        <p:nvSpPr>
+          <p:cNvPr id="27" name="Rounded Rectangle 26"/>
+          <p:cNvSpPr/>
+          <p:nvPr/>
+        </p:nvSpPr>
+        <p:spPr>
+          <a:xfrm>
+            <a:off x="853570" y="853671"/>
+            <a:ext cx="7234527" cy="4851352"/>
+          </a:xfrm>
+          <a:prstGeom prst="roundRect">
+            <a:avLst>
+              <a:gd name="adj" fmla="val 4437"/>
+            </a:avLst>
+          </a:prstGeom>
+          <a:solidFill>
+            <a:srgbClr val="EDEDED"/>
+          </a:solidFill>
+          <a:ln>
+            <a:solidFill>
+              <a:srgbClr val="000000"/>
+            </a:solidFill>
+          </a:ln>
+          <a:effectLst/>
+        </p:spPr>
+        <p:style>
+          <a:lnRef idx="1">
+            <a:schemeClr val="accent1"/>
+          </a:lnRef>
+          <a:fillRef idx="3">
+            <a:schemeClr val="accent1"/>
+          </a:fillRef>
+          <a:effectRef idx="2">
+            <a:schemeClr val="accent1"/>
+          </a:effectRef>
+          <a:fontRef idx="minor">
+            <a:schemeClr val="lt1"/>
+          </a:fontRef>
+        </p:style>
+        <p:txBody>
+          <a:bodyPr rtlCol="0" anchor="ctr"/>
+          <a:lstStyle/>
+          <a:p>
+            <a:pPr algn="ctr"/>
+            <a:endParaRPr lang="en-US"/>
+          </a:p>
+        </p:txBody>
+      </p:sp>
+      <p:sp>
+        <p:nvSpPr>
+          <p:cNvPr id="26" name="Rectangle 25"/>
+          <p:cNvSpPr/>
+          <p:nvPr/>
+        </p:nvSpPr>
+        <p:spPr>
+          <a:xfrm>
+            <a:off x="863980" y="855015"/>
+            <a:ext cx="7213708" cy="923330"/>
+          </a:xfrm>
+          <a:prstGeom prst="rect">
+            <a:avLst/>
+          </a:prstGeom>
+        </p:spPr>
+        <p:txBody>
+          <a:bodyPr wrap="square">
+            <a:spAutoFit/>
+          </a:bodyPr>
+          <a:lstStyle/>
+          <a:p>
+            <a:pPr algn="ctr"/>
+            <a:r>
+              <a:rPr lang="en-US" sz="5400" b="1" dirty="0">
+                <a:solidFill>
+                  <a:srgbClr val="052B48"/>
+                </a:solidFill>
+                <a:latin typeface="Calibri"/>
+                <a:cs typeface="Calibri"/>
+              </a:rPr>
+              <a:t>Behavior Data</a:t>
+            </a:r>
+          </a:p>
+        </p:txBody>
+      </p:sp>
+      <p:pic>
+        <p:nvPicPr>
+          <p:cNvPr id="7" name="Graphic 6" descr="Rat with solid fill">
+            <a:extLst>
+              <a:ext uri="{FF2B5EF4-FFF2-40B4-BE49-F238E27FC236}">
+                <a16:creationId xmlns:a16="http://schemas.microsoft.com/office/drawing/2014/main" id="{89ADF108-F3A3-A64C-A232-F1CEDB204E81}"/>
+              </a:ext>
+            </a:extLst>
+          </p:cNvPr>
+          <p:cNvPicPr>
+            <a:picLocks noChangeAspect="1"/>
+          </p:cNvPicPr>
+          <p:nvPr/>
+        </p:nvPicPr>
+        <p:blipFill rotWithShape="1">
+          <a:blip r:embed="rId2">
+            <a:extLst>
+              <a:ext uri="{28A0092B-C50C-407E-A947-70E740481C1C}">
+                <a14:useLocalDpi xmlns:a14="http://schemas.microsoft.com/office/drawing/2010/main" val="0"/>
+              </a:ext>
+              <a:ext uri="{96DAC541-7B7A-43D3-8B79-37D633B846F1}">
+                <asvg:svgBlip xmlns:asvg="http://schemas.microsoft.com/office/drawing/2016/SVG/main" r:embed="rId3"/>
+              </a:ext>
+            </a:extLst>
+          </a:blip>
+          <a:srcRect b="23361"/>
+          <a:stretch/>
+        </p:blipFill>
+        <p:spPr>
+          <a:xfrm>
+            <a:off x="2129958" y="3054626"/>
+            <a:ext cx="3200800" cy="2453047"/>
+          </a:xfrm>
+          <a:prstGeom prst="rect">
+            <a:avLst/>
+          </a:prstGeom>
+        </p:spPr>
+      </p:pic>
+      <p:pic>
+        <p:nvPicPr>
+          <p:cNvPr id="15" name="Graphic 14" descr="Rat with solid fill">
+            <a:extLst>
+              <a:ext uri="{FF2B5EF4-FFF2-40B4-BE49-F238E27FC236}">
+                <a16:creationId xmlns:a16="http://schemas.microsoft.com/office/drawing/2014/main" id="{C8A3EC6B-7CFD-3A41-A99F-A004CFA9D4DE}"/>
+              </a:ext>
+            </a:extLst>
+          </p:cNvPr>
+          <p:cNvPicPr>
+            <a:picLocks noChangeAspect="1"/>
+          </p:cNvPicPr>
+          <p:nvPr/>
+        </p:nvPicPr>
+        <p:blipFill>
+          <a:blip r:embed="rId2">
+            <a:extLst>
+              <a:ext uri="{28A0092B-C50C-407E-A947-70E740481C1C}">
+                <a14:useLocalDpi xmlns:a14="http://schemas.microsoft.com/office/drawing/2010/main" val="0"/>
+              </a:ext>
+              <a:ext uri="{96DAC541-7B7A-43D3-8B79-37D633B846F1}">
+                <asvg:svgBlip xmlns:asvg="http://schemas.microsoft.com/office/drawing/2016/SVG/main" r:embed="rId3"/>
+              </a:ext>
+            </a:extLst>
+          </a:blip>
+          <a:stretch>
+            <a:fillRect/>
+          </a:stretch>
+        </p:blipFill>
+        <p:spPr>
+          <a:xfrm>
+            <a:off x="5809721" y="1721797"/>
+            <a:ext cx="2191030" cy="2191030"/>
+          </a:xfrm>
+          <a:prstGeom prst="rect">
+            <a:avLst/>
+          </a:prstGeom>
+        </p:spPr>
+      </p:pic>
+      <p:pic>
+        <p:nvPicPr>
+          <p:cNvPr id="16" name="Graphic 15" descr="Rat with solid fill">
+            <a:extLst>
+              <a:ext uri="{FF2B5EF4-FFF2-40B4-BE49-F238E27FC236}">
+                <a16:creationId xmlns:a16="http://schemas.microsoft.com/office/drawing/2014/main" id="{A3CDCCE2-0ED0-FB42-B520-1BD237ED81F7}"/>
+              </a:ext>
+            </a:extLst>
+          </p:cNvPr>
+          <p:cNvPicPr>
+            <a:picLocks noChangeAspect="1"/>
+          </p:cNvPicPr>
+          <p:nvPr/>
+        </p:nvPicPr>
+        <p:blipFill>
+          <a:blip r:embed="rId2">
+            <a:extLst>
+              <a:ext uri="{28A0092B-C50C-407E-A947-70E740481C1C}">
+                <a14:useLocalDpi xmlns:a14="http://schemas.microsoft.com/office/drawing/2010/main" val="0"/>
+              </a:ext>
+              <a:ext uri="{96DAC541-7B7A-43D3-8B79-37D633B846F1}">
+                <asvg:svgBlip xmlns:asvg="http://schemas.microsoft.com/office/drawing/2016/SVG/main" r:embed="rId3"/>
+              </a:ext>
+            </a:extLst>
+          </a:blip>
+          <a:stretch>
+            <a:fillRect/>
+          </a:stretch>
+        </p:blipFill>
+        <p:spPr>
+          <a:xfrm>
+            <a:off x="1038201" y="1434875"/>
+            <a:ext cx="1912903" cy="1912903"/>
+          </a:xfrm>
+          <a:prstGeom prst="rect">
+            <a:avLst/>
+          </a:prstGeom>
+        </p:spPr>
+      </p:pic>
+      <p:sp>
+        <p:nvSpPr>
+          <p:cNvPr id="13" name="Freeform 12">
+            <a:extLst>
+              <a:ext uri="{FF2B5EF4-FFF2-40B4-BE49-F238E27FC236}">
+                <a16:creationId xmlns:a16="http://schemas.microsoft.com/office/drawing/2014/main" id="{19130C81-02F2-4542-B1DF-0E7BC45F4E03}"/>
+              </a:ext>
+            </a:extLst>
+          </p:cNvPr>
+          <p:cNvSpPr/>
+          <p:nvPr/>
+        </p:nvSpPr>
+        <p:spPr>
+          <a:xfrm>
+            <a:off x="1612083" y="2490281"/>
+            <a:ext cx="1842180" cy="2305456"/>
+          </a:xfrm>
+          <a:custGeom>
+            <a:avLst/>
+            <a:gdLst>
+              <a:gd name="connsiteX0" fmla="*/ 1206606 w 1842180"/>
+              <a:gd name="connsiteY0" fmla="*/ 0 h 2305456"/>
+              <a:gd name="connsiteX1" fmla="*/ 1789881 w 1842180"/>
+              <a:gd name="connsiteY1" fmla="*/ 403720 h 2305456"/>
+              <a:gd name="connsiteX2" fmla="*/ 31480 w 1842180"/>
+              <a:gd name="connsiteY2" fmla="*/ 1614881 h 2305456"/>
+              <a:gd name="connsiteX3" fmla="*/ 829193 w 1842180"/>
+              <a:gd name="connsiteY3" fmla="*/ 2305456 h 2305456"/>
+            </a:gdLst>
+            <a:ahLst/>
+            <a:cxnLst>
+              <a:cxn ang="0">
+                <a:pos x="connsiteX0" y="connsiteY0"/>
+              </a:cxn>
+              <a:cxn ang="0">
+                <a:pos x="connsiteX1" y="connsiteY1"/>
+              </a:cxn>
+              <a:cxn ang="0">
+                <a:pos x="connsiteX2" y="connsiteY2"/>
+              </a:cxn>
+              <a:cxn ang="0">
+                <a:pos x="connsiteX3" y="connsiteY3"/>
+              </a:cxn>
+            </a:cxnLst>
+            <a:rect l="l" t="t" r="r" b="b"/>
+            <a:pathLst>
+              <a:path w="1842180" h="2305456" extrusionOk="0">
+                <a:moveTo>
+                  <a:pt x="1206606" y="0"/>
+                </a:moveTo>
+                <a:cubicBezTo>
+                  <a:pt x="1542487" y="34173"/>
+                  <a:pt x="1974980" y="138610"/>
+                  <a:pt x="1789881" y="403720"/>
+                </a:cubicBezTo>
+                <a:cubicBezTo>
+                  <a:pt x="1692452" y="693588"/>
+                  <a:pt x="110981" y="1300489"/>
+                  <a:pt x="31480" y="1614881"/>
+                </a:cubicBezTo>
+                <a:cubicBezTo>
+                  <a:pt x="-233304" y="2034052"/>
+                  <a:pt x="324939" y="2258709"/>
+                  <a:pt x="829193" y="2305456"/>
+                </a:cubicBezTo>
+              </a:path>
+            </a:pathLst>
+          </a:custGeom>
+          <a:noFill/>
+          <a:ln w="57150">
+            <a:solidFill>
+              <a:schemeClr val="accent2">
+                <a:lumMod val="75000"/>
+              </a:schemeClr>
+            </a:solidFill>
+            <a:prstDash val="dash"/>
+            <a:extLst>
+              <a:ext uri="{C807C97D-BFC1-408E-A445-0C87EB9F89A2}">
+                <ask:lineSketchStyleProps xmlns:ask="http://schemas.microsoft.com/office/drawing/2018/sketchyshapes" sd="1219033472">
+                  <a:custGeom>
+                    <a:avLst/>
+                    <a:gdLst>
+                      <a:gd name="connsiteX0" fmla="*/ 1368390 w 2089182"/>
+                      <a:gd name="connsiteY0" fmla="*/ 0 h 2110902"/>
+                      <a:gd name="connsiteX1" fmla="*/ 2029871 w 2089182"/>
+                      <a:gd name="connsiteY1" fmla="*/ 369651 h 2110902"/>
+                      <a:gd name="connsiteX2" fmla="*/ 35701 w 2089182"/>
+                      <a:gd name="connsiteY2" fmla="*/ 1478604 h 2110902"/>
+                      <a:gd name="connsiteX3" fmla="*/ 940373 w 2089182"/>
+                      <a:gd name="connsiteY3" fmla="*/ 2110902 h 2110902"/>
+                    </a:gdLst>
+                    <a:ahLst/>
+                    <a:cxnLst>
+                      <a:cxn ang="0">
+                        <a:pos x="connsiteX0" y="connsiteY0"/>
+                      </a:cxn>
+                      <a:cxn ang="0">
+                        <a:pos x="connsiteX1" y="connsiteY1"/>
+                      </a:cxn>
+                      <a:cxn ang="0">
+                        <a:pos x="connsiteX2" y="connsiteY2"/>
+                      </a:cxn>
+                      <a:cxn ang="0">
+                        <a:pos x="connsiteX3" y="connsiteY3"/>
+                      </a:cxn>
+                    </a:cxnLst>
+                    <a:rect l="l" t="t" r="r" b="b"/>
+                    <a:pathLst>
+                      <a:path w="2089182" h="2110902">
+                        <a:moveTo>
+                          <a:pt x="1368390" y="0"/>
+                        </a:moveTo>
+                        <a:cubicBezTo>
+                          <a:pt x="1810188" y="61608"/>
+                          <a:pt x="2251986" y="123217"/>
+                          <a:pt x="2029871" y="369651"/>
+                        </a:cubicBezTo>
+                        <a:cubicBezTo>
+                          <a:pt x="1807756" y="616085"/>
+                          <a:pt x="217284" y="1188396"/>
+                          <a:pt x="35701" y="1478604"/>
+                        </a:cubicBezTo>
+                        <a:cubicBezTo>
+                          <a:pt x="-145882" y="1768813"/>
+                          <a:pt x="397245" y="1939857"/>
+                          <a:pt x="940373" y="2110902"/>
+                        </a:cubicBezTo>
+                      </a:path>
+                    </a:pathLst>
+                  </a:custGeom>
+                  <ask:type>
+                    <ask:lineSketchScribble/>
+                  </ask:type>
+                </ask:lineSketchStyleProps>
+              </a:ext>
+            </a:extLst>
+          </a:ln>
+        </p:spPr>
+        <p:style>
+          <a:lnRef idx="2">
+            <a:schemeClr val="accent1">
+              <a:shade val="50000"/>
+            </a:schemeClr>
+          </a:lnRef>
+          <a:fillRef idx="1">
+            <a:schemeClr val="accent1"/>
+          </a:fillRef>
+          <a:effectRef idx="0">
+            <a:schemeClr val="accent1"/>
+          </a:effectRef>
+          <a:fontRef idx="minor">
+            <a:schemeClr val="lt1"/>
+          </a:fontRef>
+        </p:style>
+        <p:txBody>
+          <a:bodyPr rtlCol="0" anchor="ctr"/>
+          <a:lstStyle/>
+          <a:p>
+            <a:pPr algn="ctr"/>
+            <a:endParaRPr lang="en-US"/>
+          </a:p>
+        </p:txBody>
+      </p:sp>
+      <p:sp>
+        <p:nvSpPr>
+          <p:cNvPr id="14" name="Freeform 13">
+            <a:extLst>
+              <a:ext uri="{FF2B5EF4-FFF2-40B4-BE49-F238E27FC236}">
+                <a16:creationId xmlns:a16="http://schemas.microsoft.com/office/drawing/2014/main" id="{F120426E-49A9-CC4A-BF42-6C4093DE209A}"/>
+              </a:ext>
+            </a:extLst>
+          </p:cNvPr>
+          <p:cNvSpPr/>
+          <p:nvPr/>
+        </p:nvSpPr>
+        <p:spPr>
+          <a:xfrm>
+            <a:off x="5097294" y="3064214"/>
+            <a:ext cx="894945" cy="1702340"/>
+          </a:xfrm>
+          <a:custGeom>
+            <a:avLst/>
+            <a:gdLst>
+              <a:gd name="connsiteX0" fmla="*/ 0 w 894945"/>
+              <a:gd name="connsiteY0" fmla="*/ 1702340 h 1702340"/>
+              <a:gd name="connsiteX1" fmla="*/ 885217 w 894945"/>
+              <a:gd name="connsiteY1" fmla="*/ 1478604 h 1702340"/>
+              <a:gd name="connsiteX2" fmla="*/ 126460 w 894945"/>
+              <a:gd name="connsiteY2" fmla="*/ 554476 h 1702340"/>
+              <a:gd name="connsiteX3" fmla="*/ 894945 w 894945"/>
+              <a:gd name="connsiteY3" fmla="*/ 0 h 1702340"/>
+              <a:gd name="connsiteX4" fmla="*/ 894945 w 894945"/>
+              <a:gd name="connsiteY4" fmla="*/ 0 h 1702340"/>
+            </a:gdLst>
+            <a:ahLst/>
+            <a:cxnLst>
+              <a:cxn ang="0">
+                <a:pos x="connsiteX0" y="connsiteY0"/>
+              </a:cxn>
+              <a:cxn ang="0">
+                <a:pos x="connsiteX1" y="connsiteY1"/>
+              </a:cxn>
+              <a:cxn ang="0">
+                <a:pos x="connsiteX2" y="connsiteY2"/>
+              </a:cxn>
+              <a:cxn ang="0">
+                <a:pos x="connsiteX3" y="connsiteY3"/>
+              </a:cxn>
+              <a:cxn ang="0">
+                <a:pos x="connsiteX4" y="connsiteY4"/>
+              </a:cxn>
+            </a:cxnLst>
+            <a:rect l="l" t="t" r="r" b="b"/>
+            <a:pathLst>
+              <a:path w="894945" h="1702340">
+                <a:moveTo>
+                  <a:pt x="0" y="1702340"/>
+                </a:moveTo>
+                <a:cubicBezTo>
+                  <a:pt x="432070" y="1686127"/>
+                  <a:pt x="864140" y="1669915"/>
+                  <a:pt x="885217" y="1478604"/>
+                </a:cubicBezTo>
+                <a:cubicBezTo>
+                  <a:pt x="906294" y="1287293"/>
+                  <a:pt x="124839" y="800910"/>
+                  <a:pt x="126460" y="554476"/>
+                </a:cubicBezTo>
+                <a:cubicBezTo>
+                  <a:pt x="128081" y="308042"/>
+                  <a:pt x="894945" y="0"/>
+                  <a:pt x="894945" y="0"/>
+                </a:cubicBezTo>
+                <a:lnTo>
+                  <a:pt x="894945" y="0"/>
+                </a:lnTo>
+              </a:path>
+            </a:pathLst>
+          </a:custGeom>
+          <a:noFill/>
+          <a:ln w="57150">
+            <a:solidFill>
+              <a:schemeClr val="accent2">
+                <a:lumMod val="75000"/>
+              </a:schemeClr>
+            </a:solidFill>
+            <a:prstDash val="dash"/>
+            <a:headEnd type="none" w="med" len="med"/>
+            <a:tailEnd type="triangle" w="lg" len="lg"/>
+          </a:ln>
+        </p:spPr>
+        <p:style>
+          <a:lnRef idx="2">
+            <a:schemeClr val="accent1">
+              <a:shade val="50000"/>
+            </a:schemeClr>
+          </a:lnRef>
+          <a:fillRef idx="1">
+            <a:schemeClr val="accent1"/>
+          </a:fillRef>
+          <a:effectRef idx="0">
+            <a:schemeClr val="accent1"/>
+          </a:effectRef>
+          <a:fontRef idx="minor">
+            <a:schemeClr val="lt1"/>
+          </a:fontRef>
+        </p:style>
+        <p:txBody>
+          <a:bodyPr rtlCol="0" anchor="ctr"/>
+          <a:lstStyle/>
+          <a:p>
+            <a:pPr algn="ctr"/>
+            <a:endParaRPr lang="en-US"/>
+          </a:p>
+        </p:txBody>
+      </p:sp>
+    </p:spTree>
+    <p:extLst>
+      <p:ext uri="{BB962C8B-B14F-4D97-AF65-F5344CB8AC3E}">
+        <p14:creationId xmlns:p14="http://schemas.microsoft.com/office/powerpoint/2010/main" val="1104418864"/>
       </p:ext>
     </p:extLst>
   </p:cSld>
@@ -7245,7 +7680,7 @@
           <a:p>
             <a:pPr algn="ctr"/>
             <a:r>
-              <a:rPr lang="en-US" sz="5400" b="1" dirty="0" smtClean="0">
+              <a:rPr lang="en-US" sz="5400" b="1" dirty="0">
                 <a:solidFill>
                   <a:srgbClr val="052B48"/>
                 </a:solidFill>
@@ -7254,13 +7689,6 @@
               </a:rPr>
               <a:t>Query Intracellular Electrophysiology Metadata</a:t>
             </a:r>
-            <a:endParaRPr lang="en-US" sz="5400" b="1" dirty="0">
-              <a:solidFill>
-                <a:srgbClr val="052B48"/>
-              </a:solidFill>
-              <a:latin typeface="Calibri"/>
-              <a:cs typeface="Calibri"/>
-            </a:endParaRPr>
           </a:p>
         </p:txBody>
       </p:sp>
@@ -7396,7 +7824,7 @@
           <a:p>
             <a:pPr algn="ctr"/>
             <a:r>
-              <a:rPr lang="en-US" sz="5400" b="1" dirty="0" smtClean="0">
+              <a:rPr lang="en-US" sz="5400" b="1" dirty="0">
                 <a:solidFill>
                   <a:srgbClr val="052B48"/>
                 </a:solidFill>
@@ -7406,7 +7834,7 @@
               <a:t>Intracellular Electrophysiology Data using </a:t>
             </a:r>
             <a:r>
-              <a:rPr lang="en-US" sz="5400" b="1" dirty="0" err="1" smtClean="0">
+              <a:rPr lang="en-US" sz="5400" b="1" dirty="0" err="1">
                 <a:solidFill>
                   <a:srgbClr val="052B48"/>
                 </a:solidFill>
@@ -7468,18 +7896,13 @@
           <a:p>
             <a:pPr algn="ctr"/>
             <a:r>
-              <a:rPr lang="en-US" sz="5400" b="1" dirty="0" smtClean="0">
+              <a:rPr lang="en-US" sz="5400" b="1" dirty="0">
                 <a:solidFill>
                   <a:srgbClr val="FF0000"/>
                 </a:solidFill>
               </a:rPr>
               <a:t>DEPRECATED</a:t>
             </a:r>
-            <a:endParaRPr lang="en-US" sz="5400" b="1" dirty="0">
-              <a:solidFill>
-                <a:srgbClr val="FF0000"/>
-              </a:solidFill>
-            </a:endParaRPr>
           </a:p>
         </p:txBody>
       </p:sp>
@@ -7585,7 +8008,7 @@
           <a:p>
             <a:pPr algn="ctr"/>
             <a:r>
-              <a:rPr lang="en-US" sz="5400" b="1" dirty="0" smtClean="0">
+              <a:rPr lang="en-US" sz="5400" b="1" dirty="0">
                 <a:solidFill>
                   <a:srgbClr val="052B48"/>
                 </a:solidFill>
@@ -7594,13 +8017,6 @@
               </a:rPr>
               <a:t>Allen Brain Observatory</a:t>
             </a:r>
-            <a:endParaRPr lang="en-US" sz="5400" b="1" dirty="0">
-              <a:solidFill>
-                <a:srgbClr val="052B48"/>
-              </a:solidFill>
-              <a:latin typeface="Calibri"/>
-              <a:cs typeface="Calibri"/>
-            </a:endParaRPr>
           </a:p>
         </p:txBody>
       </p:sp>
@@ -7627,33 +8043,18 @@
           <a:p>
             <a:r>
               <a:rPr lang="en-US" sz="1400" dirty="0"/>
-              <a:t> </a:t>
-            </a:r>
-            <a:r>
-              <a:rPr lang="en-US" sz="1400" dirty="0" smtClean="0"/>
-              <a:t>(figure source</a:t>
-            </a:r>
-            <a:r>
-              <a:rPr lang="en-US" sz="1400" dirty="0"/>
-              <a:t>: </a:t>
+              <a:t> (figure source: </a:t>
             </a:r>
             <a:r>
               <a:rPr lang="en-US" sz="1400" dirty="0">
                 <a:hlinkClick r:id="rId2"/>
               </a:rPr>
-              <a:t>https://observatory.brain-</a:t>
+              <a:t>https://observatory.brain-map.org</a:t>
             </a:r>
             <a:r>
-              <a:rPr lang="en-US" sz="1400" dirty="0" smtClean="0">
-                <a:hlinkClick r:id="rId2"/>
-              </a:rPr>
-              <a:t>map.org</a:t>
-            </a:r>
-            <a:r>
-              <a:rPr lang="en-US" sz="1400" dirty="0" smtClean="0"/>
+              <a:rPr lang="en-US" sz="1400" dirty="0"/>
               <a:t>)</a:t>
             </a:r>
-            <a:endParaRPr lang="en-US" sz="1400" dirty="0"/>
           </a:p>
         </p:txBody>
       </p:sp>
@@ -7788,7 +8189,7 @@
           <a:p>
             <a:pPr algn="ctr"/>
             <a:r>
-              <a:rPr lang="en-US" sz="5400" b="1" dirty="0" smtClean="0">
+              <a:rPr lang="en-US" sz="5400" b="1" dirty="0">
                 <a:solidFill>
                   <a:srgbClr val="052B48"/>
                 </a:solidFill>
@@ -7797,13 +8198,6 @@
               </a:rPr>
               <a:t>Extracellular Electrophysiology</a:t>
             </a:r>
-            <a:endParaRPr lang="en-US" sz="5400" b="1" dirty="0">
-              <a:solidFill>
-                <a:srgbClr val="052B48"/>
-              </a:solidFill>
-              <a:latin typeface="Calibri"/>
-              <a:cs typeface="Calibri"/>
-            </a:endParaRPr>
           </a:p>
         </p:txBody>
       </p:sp>
@@ -7979,7 +8373,7 @@
           <a:p>
             <a:pPr algn="ctr"/>
             <a:r>
-              <a:rPr lang="en-US" sz="5400" b="1" dirty="0" smtClean="0">
+              <a:rPr lang="en-US" sz="5400" b="1" dirty="0">
                 <a:solidFill>
                   <a:srgbClr val="052B48"/>
                 </a:solidFill>
@@ -7988,13 +8382,6 @@
               </a:rPr>
               <a:t>Calcium Imaging Data</a:t>
             </a:r>
-            <a:endParaRPr lang="en-US" sz="5400" b="1" dirty="0">
-              <a:solidFill>
-                <a:srgbClr val="052B48"/>
-              </a:solidFill>
-              <a:latin typeface="Calibri"/>
-              <a:cs typeface="Calibri"/>
-            </a:endParaRPr>
           </a:p>
         </p:txBody>
       </p:sp>
@@ -8129,7 +8516,7 @@
           <a:p>
             <a:pPr algn="ctr"/>
             <a:r>
-              <a:rPr lang="en-US" sz="5400" b="1" dirty="0" smtClean="0">
+              <a:rPr lang="en-US" sz="5400" b="1" dirty="0">
                 <a:solidFill>
                   <a:srgbClr val="052B48"/>
                 </a:solidFill>
@@ -8138,13 +8525,6 @@
               </a:rPr>
               <a:t>Iterative Data Write</a:t>
             </a:r>
-            <a:endParaRPr lang="en-US" sz="5400" b="1" dirty="0">
-              <a:solidFill>
-                <a:srgbClr val="052B48"/>
-              </a:solidFill>
-              <a:latin typeface="Calibri"/>
-              <a:cs typeface="Calibri"/>
-            </a:endParaRPr>
           </a:p>
         </p:txBody>
       </p:sp>
@@ -8427,7 +8807,7 @@
           <a:p>
             <a:pPr algn="ctr"/>
             <a:r>
-              <a:rPr lang="en-US" sz="5400" b="1" dirty="0" smtClean="0">
+              <a:rPr lang="en-US" sz="5400" b="1" dirty="0">
                 <a:solidFill>
                   <a:srgbClr val="052B48"/>
                 </a:solidFill>
@@ -8436,13 +8816,6 @@
               </a:rPr>
               <a:t>HDF5 Dataset I/O</a:t>
             </a:r>
-            <a:endParaRPr lang="en-US" sz="5400" b="1" dirty="0">
-              <a:solidFill>
-                <a:srgbClr val="052B48"/>
-              </a:solidFill>
-              <a:latin typeface="Calibri"/>
-              <a:cs typeface="Calibri"/>
-            </a:endParaRPr>
           </a:p>
         </p:txBody>
       </p:sp>
@@ -9052,7 +9425,7 @@
           <a:p>
             <a:pPr algn="ctr"/>
             <a:r>
-              <a:rPr lang="en-US" sz="5400" b="1" dirty="0" smtClean="0">
+              <a:rPr lang="en-US" sz="5400" b="1" dirty="0">
                 <a:solidFill>
                   <a:srgbClr val="052B48"/>
                 </a:solidFill>
@@ -9061,13 +9434,6 @@
               </a:rPr>
               <a:t>Modular Data Storage using External Files</a:t>
             </a:r>
-            <a:endParaRPr lang="en-US" sz="5400" b="1" dirty="0">
-              <a:solidFill>
-                <a:srgbClr val="052B48"/>
-              </a:solidFill>
-              <a:latin typeface="Calibri"/>
-              <a:cs typeface="Calibri"/>
-            </a:endParaRPr>
           </a:p>
         </p:txBody>
       </p:sp>
@@ -9392,10 +9758,9 @@
           <a:p>
             <a:pPr algn="ctr"/>
             <a:r>
-              <a:rPr lang="en-US" u="sng" dirty="0" smtClean="0"/>
+              <a:rPr lang="en-US" u="sng" dirty="0"/>
               <a:t>																			   </a:t>
             </a:r>
-            <a:endParaRPr lang="en-US" u="sng" dirty="0"/>
           </a:p>
         </p:txBody>
       </p:sp>
@@ -10124,7 +10489,7 @@
   <a:extraClrSchemeLst/>
   <a:extLst>
     <a:ext uri="{05A4C25C-085E-4340-85A3-A5531E510DB2}">
-      <thm15:themeFamily xmlns="" xmlns:thm15="http://schemas.microsoft.com/office/thememl/2012/main" name="Office Theme" id="{62F939B6-93AF-4DB8-9C6B-D6C7DFDC589F}" vid="{4A3C46E8-61CC-4603-A589-7422A47A8E4A}"/>
+      <thm15:themeFamily xmlns:thm15="http://schemas.microsoft.com/office/thememl/2012/main" name="Office Theme" id="{62F939B6-93AF-4DB8-9C6B-D6C7DFDC589F}" vid="{4A3C46E8-61CC-4603-A589-7422A47A8E4A}"/>
     </a:ext>
   </a:extLst>
 </a:theme>

</xml_diff>

<commit_message>
create thumbnail for read basics tutorial
</commit_message>
<xml_diff>
--- a/docs/source/figures/gallery_thumbnails.pptx
+++ b/docs/source/figures/gallery_thumbnails.pptx
@@ -5,7 +5,7 @@
     <p:sldMasterId id="2147483660" r:id="rId1"/>
   </p:sldMasterIdLst>
   <p:notesMasterIdLst>
-    <p:notesMasterId r:id="rId19"/>
+    <p:notesMasterId r:id="rId21"/>
   </p:notesMasterIdLst>
   <p:sldIdLst>
     <p:sldId id="342" r:id="rId2"/>
@@ -25,6 +25,8 @@
     <p:sldId id="358" r:id="rId16"/>
     <p:sldId id="359" r:id="rId17"/>
     <p:sldId id="364" r:id="rId18"/>
+    <p:sldId id="365" r:id="rId19"/>
+    <p:sldId id="366" r:id="rId20"/>
   </p:sldIdLst>
   <p:sldSz cx="12192000" cy="6858000"/>
   <p:notesSz cx="6858000" cy="9144000"/>
@@ -7591,6 +7593,410 @@
 </p:sld>
 </file>
 
+<file path=ppt/slides/slide18.xml><?xml version="1.0" encoding="utf-8"?>
+<p:sld xmlns:a="http://schemas.openxmlformats.org/drawingml/2006/main" xmlns:r="http://schemas.openxmlformats.org/officeDocument/2006/relationships" xmlns:p="http://schemas.openxmlformats.org/presentationml/2006/main">
+  <p:cSld>
+    <p:spTree>
+      <p:nvGrpSpPr>
+        <p:cNvPr id="1" name=""/>
+        <p:cNvGrpSpPr/>
+        <p:nvPr/>
+      </p:nvGrpSpPr>
+      <p:grpSpPr>
+        <a:xfrm>
+          <a:off x="0" y="0"/>
+          <a:ext cx="0" cy="0"/>
+          <a:chOff x="0" y="0"/>
+          <a:chExt cx="0" cy="0"/>
+        </a:xfrm>
+      </p:grpSpPr>
+      <p:sp>
+        <p:nvSpPr>
+          <p:cNvPr id="27" name="Rounded Rectangle 26"/>
+          <p:cNvSpPr/>
+          <p:nvPr/>
+        </p:nvSpPr>
+        <p:spPr>
+          <a:xfrm>
+            <a:off x="853570" y="853671"/>
+            <a:ext cx="7234527" cy="4851352"/>
+          </a:xfrm>
+          <a:prstGeom prst="roundRect">
+            <a:avLst>
+              <a:gd name="adj" fmla="val 4437"/>
+            </a:avLst>
+          </a:prstGeom>
+          <a:solidFill>
+            <a:srgbClr val="EDEDED"/>
+          </a:solidFill>
+          <a:ln>
+            <a:solidFill>
+              <a:srgbClr val="000000"/>
+            </a:solidFill>
+          </a:ln>
+          <a:effectLst/>
+        </p:spPr>
+        <p:style>
+          <a:lnRef idx="1">
+            <a:schemeClr val="accent1"/>
+          </a:lnRef>
+          <a:fillRef idx="3">
+            <a:schemeClr val="accent1"/>
+          </a:fillRef>
+          <a:effectRef idx="2">
+            <a:schemeClr val="accent1"/>
+          </a:effectRef>
+          <a:fontRef idx="minor">
+            <a:schemeClr val="lt1"/>
+          </a:fontRef>
+        </p:style>
+        <p:txBody>
+          <a:bodyPr rtlCol="0" anchor="ctr"/>
+          <a:lstStyle/>
+          <a:p>
+            <a:pPr algn="ctr"/>
+            <a:endParaRPr lang="en-US"/>
+          </a:p>
+        </p:txBody>
+      </p:sp>
+      <p:sp>
+        <p:nvSpPr>
+          <p:cNvPr id="26" name="Rectangle 25"/>
+          <p:cNvSpPr/>
+          <p:nvPr/>
+        </p:nvSpPr>
+        <p:spPr>
+          <a:xfrm>
+            <a:off x="863980" y="855015"/>
+            <a:ext cx="7213708" cy="1754326"/>
+          </a:xfrm>
+          <a:prstGeom prst="rect">
+            <a:avLst/>
+          </a:prstGeom>
+        </p:spPr>
+        <p:txBody>
+          <a:bodyPr wrap="square">
+            <a:spAutoFit/>
+          </a:bodyPr>
+          <a:lstStyle/>
+          <a:p>
+            <a:pPr algn="ctr"/>
+            <a:r>
+              <a:rPr lang="en-US" sz="5400" b="1" dirty="0">
+                <a:solidFill>
+                  <a:srgbClr val="052B48"/>
+                </a:solidFill>
+                <a:latin typeface="Calibri"/>
+                <a:cs typeface="Calibri"/>
+              </a:rPr>
+              <a:t>Reading and Exploring an NWB File</a:t>
+            </a:r>
+          </a:p>
+        </p:txBody>
+      </p:sp>
+      <p:pic>
+        <p:nvPicPr>
+          <p:cNvPr id="5" name="Graphic 4" descr="Folder Search with solid fill">
+            <a:extLst>
+              <a:ext uri="{FF2B5EF4-FFF2-40B4-BE49-F238E27FC236}">
+                <a16:creationId xmlns:a16="http://schemas.microsoft.com/office/drawing/2014/main" id="{D17D48AB-8DB4-F277-6F50-27AF4160E87D}"/>
+              </a:ext>
+            </a:extLst>
+          </p:cNvPr>
+          <p:cNvPicPr>
+            <a:picLocks noChangeAspect="1"/>
+          </p:cNvPicPr>
+          <p:nvPr/>
+        </p:nvPicPr>
+        <p:blipFill>
+          <a:blip r:embed="rId2">
+            <a:extLst>
+              <a:ext uri="{28A0092B-C50C-407E-A947-70E740481C1C}">
+                <a14:useLocalDpi xmlns:a14="http://schemas.microsoft.com/office/drawing/2010/main" val="0"/>
+              </a:ext>
+              <a:ext uri="{96DAC541-7B7A-43D3-8B79-37D633B846F1}">
+                <asvg:svgBlip xmlns:asvg="http://schemas.microsoft.com/office/drawing/2016/SVG/main" r:embed="rId3"/>
+              </a:ext>
+            </a:extLst>
+          </a:blip>
+          <a:stretch>
+            <a:fillRect/>
+          </a:stretch>
+        </p:blipFill>
+        <p:spPr>
+          <a:xfrm>
+            <a:off x="4022724" y="3403096"/>
+            <a:ext cx="2476550" cy="2476550"/>
+          </a:xfrm>
+          <a:prstGeom prst="rect">
+            <a:avLst/>
+          </a:prstGeom>
+        </p:spPr>
+      </p:pic>
+      <p:grpSp>
+        <p:nvGrpSpPr>
+          <p:cNvPr id="20" name="Group 19">
+            <a:extLst>
+              <a:ext uri="{FF2B5EF4-FFF2-40B4-BE49-F238E27FC236}">
+                <a16:creationId xmlns:a16="http://schemas.microsoft.com/office/drawing/2014/main" id="{68DE8607-11B2-09AE-004F-C3F75DFB510A}"/>
+              </a:ext>
+            </a:extLst>
+          </p:cNvPr>
+          <p:cNvGrpSpPr>
+            <a:grpSpLocks noChangeAspect="1"/>
+          </p:cNvGrpSpPr>
+          <p:nvPr/>
+        </p:nvGrpSpPr>
+        <p:grpSpPr>
+          <a:xfrm>
+            <a:off x="3313878" y="2510865"/>
+            <a:ext cx="1669317" cy="1656000"/>
+            <a:chOff x="2769912" y="2630196"/>
+            <a:chExt cx="2721715" cy="2699999"/>
+          </a:xfrm>
+        </p:grpSpPr>
+        <p:sp>
+          <p:nvSpPr>
+            <p:cNvPr id="23" name="Folded Corner 22">
+              <a:extLst>
+                <a:ext uri="{FF2B5EF4-FFF2-40B4-BE49-F238E27FC236}">
+                  <a16:creationId xmlns:a16="http://schemas.microsoft.com/office/drawing/2014/main" id="{0978C650-A31F-3E85-DFD4-C4FCDCA8457B}"/>
+                </a:ext>
+              </a:extLst>
+            </p:cNvPr>
+            <p:cNvSpPr/>
+            <p:nvPr/>
+          </p:nvSpPr>
+          <p:spPr>
+            <a:xfrm rot="10800000" flipH="1">
+              <a:off x="3184160" y="2684996"/>
+              <a:ext cx="2307467" cy="2645199"/>
+            </a:xfrm>
+            <a:prstGeom prst="foldedCorner">
+              <a:avLst>
+                <a:gd name="adj" fmla="val 26556"/>
+              </a:avLst>
+            </a:prstGeom>
+            <a:solidFill>
+              <a:srgbClr val="052A48"/>
+            </a:solidFill>
+            <a:ln w="38100" cmpd="sng">
+              <a:solidFill>
+                <a:schemeClr val="bg1"/>
+              </a:solidFill>
+            </a:ln>
+            <a:effectLst/>
+          </p:spPr>
+          <p:style>
+            <a:lnRef idx="1">
+              <a:schemeClr val="accent1"/>
+            </a:lnRef>
+            <a:fillRef idx="3">
+              <a:schemeClr val="accent1"/>
+            </a:fillRef>
+            <a:effectRef idx="2">
+              <a:schemeClr val="accent1"/>
+            </a:effectRef>
+            <a:fontRef idx="minor">
+              <a:schemeClr val="lt1"/>
+            </a:fontRef>
+          </p:style>
+          <p:txBody>
+            <a:bodyPr rtlCol="0" anchor="ctr"/>
+            <a:lstStyle/>
+            <a:p>
+              <a:pPr algn="ctr"/>
+              <a:r>
+                <a:rPr lang="en-US" sz="1050" u="sng" dirty="0"/>
+                <a:t>								</a:t>
+              </a:r>
+              <a:r>
+                <a:rPr lang="en-US" sz="900" u="sng" dirty="0"/>
+                <a:t>   </a:t>
+              </a:r>
+            </a:p>
+          </p:txBody>
+        </p:sp>
+        <p:grpSp>
+          <p:nvGrpSpPr>
+            <p:cNvPr id="24" name="Group 23">
+              <a:extLst>
+                <a:ext uri="{FF2B5EF4-FFF2-40B4-BE49-F238E27FC236}">
+                  <a16:creationId xmlns:a16="http://schemas.microsoft.com/office/drawing/2014/main" id="{E83F4AC5-DE61-4FAA-C351-95AF8FCEF9C8}"/>
+                </a:ext>
+              </a:extLst>
+            </p:cNvPr>
+            <p:cNvGrpSpPr>
+              <a:grpSpLocks noChangeAspect="1"/>
+            </p:cNvGrpSpPr>
+            <p:nvPr/>
+          </p:nvGrpSpPr>
+          <p:grpSpPr>
+            <a:xfrm>
+              <a:off x="2769912" y="2630196"/>
+              <a:ext cx="1503336" cy="1503337"/>
+              <a:chOff x="2259923" y="2660201"/>
+              <a:chExt cx="1959561" cy="1962561"/>
+            </a:xfrm>
+          </p:grpSpPr>
+          <p:sp>
+            <p:nvSpPr>
+              <p:cNvPr id="25" name="Oval 24">
+                <a:extLst>
+                  <a:ext uri="{FF2B5EF4-FFF2-40B4-BE49-F238E27FC236}">
+                    <a16:creationId xmlns:a16="http://schemas.microsoft.com/office/drawing/2014/main" id="{9C4806BF-EDED-96FF-2B39-CAEFB6463948}"/>
+                  </a:ext>
+                </a:extLst>
+              </p:cNvPr>
+              <p:cNvSpPr/>
+              <p:nvPr/>
+            </p:nvSpPr>
+            <p:spPr>
+              <a:xfrm>
+                <a:off x="2259923" y="2660201"/>
+                <a:ext cx="1959561" cy="1962561"/>
+              </a:xfrm>
+              <a:prstGeom prst="ellipse">
+                <a:avLst/>
+              </a:prstGeom>
+              <a:solidFill>
+                <a:schemeClr val="bg1"/>
+              </a:solidFill>
+              <a:ln w="76200" cmpd="sng">
+                <a:solidFill>
+                  <a:srgbClr val="052A48"/>
+                </a:solidFill>
+              </a:ln>
+              <a:effectLst/>
+            </p:spPr>
+            <p:style>
+              <a:lnRef idx="1">
+                <a:schemeClr val="accent1"/>
+              </a:lnRef>
+              <a:fillRef idx="3">
+                <a:schemeClr val="accent1"/>
+              </a:fillRef>
+              <a:effectRef idx="2">
+                <a:schemeClr val="accent1"/>
+              </a:effectRef>
+              <a:fontRef idx="minor">
+                <a:schemeClr val="lt1"/>
+              </a:fontRef>
+            </p:style>
+            <p:txBody>
+              <a:bodyPr rtlCol="0" anchor="ctr"/>
+              <a:lstStyle/>
+              <a:p>
+                <a:endParaRPr lang="en-US" sz="4400" dirty="0"/>
+              </a:p>
+            </p:txBody>
+          </p:sp>
+          <p:pic>
+            <p:nvPicPr>
+              <p:cNvPr id="28" name="Picture 27" descr="logo_brain_transp_512x512.png">
+                <a:extLst>
+                  <a:ext uri="{FF2B5EF4-FFF2-40B4-BE49-F238E27FC236}">
+                    <a16:creationId xmlns:a16="http://schemas.microsoft.com/office/drawing/2014/main" id="{0737FE45-E46A-D45E-B8BD-4EEDDF3B6B2B}"/>
+                  </a:ext>
+                </a:extLst>
+              </p:cNvPr>
+              <p:cNvPicPr>
+                <a:picLocks noChangeAspect="1"/>
+              </p:cNvPicPr>
+              <p:nvPr/>
+            </p:nvPicPr>
+            <p:blipFill>
+              <a:blip r:embed="rId4">
+                <a:extLst>
+                  <a:ext uri="{28A0092B-C50C-407E-A947-70E740481C1C}">
+                    <a14:useLocalDpi xmlns:a14="http://schemas.microsoft.com/office/drawing/2010/main" val="0"/>
+                  </a:ext>
+                </a:extLst>
+              </a:blip>
+              <a:stretch>
+                <a:fillRect/>
+              </a:stretch>
+            </p:blipFill>
+            <p:spPr>
+              <a:xfrm>
+                <a:off x="2393887" y="2838486"/>
+                <a:ext cx="1703898" cy="1703898"/>
+              </a:xfrm>
+              <a:prstGeom prst="rect">
+                <a:avLst/>
+              </a:prstGeom>
+            </p:spPr>
+          </p:pic>
+        </p:grpSp>
+      </p:grpSp>
+    </p:spTree>
+    <p:extLst>
+      <p:ext uri="{BB962C8B-B14F-4D97-AF65-F5344CB8AC3E}">
+        <p14:creationId xmlns:p14="http://schemas.microsoft.com/office/powerpoint/2010/main" val="3534876857"/>
+      </p:ext>
+    </p:extLst>
+  </p:cSld>
+  <p:clrMapOvr>
+    <a:masterClrMapping/>
+  </p:clrMapOvr>
+</p:sld>
+</file>
+
+<file path=ppt/slides/slide19.xml><?xml version="1.0" encoding="utf-8"?>
+<p:sld xmlns:a="http://schemas.openxmlformats.org/drawingml/2006/main" xmlns:r="http://schemas.openxmlformats.org/officeDocument/2006/relationships" xmlns:p="http://schemas.openxmlformats.org/presentationml/2006/main">
+  <p:cSld>
+    <p:spTree>
+      <p:nvGrpSpPr>
+        <p:cNvPr id="1" name=""/>
+        <p:cNvGrpSpPr/>
+        <p:nvPr/>
+      </p:nvGrpSpPr>
+      <p:grpSpPr>
+        <a:xfrm>
+          <a:off x="0" y="0"/>
+          <a:ext cx="0" cy="0"/>
+          <a:chOff x="0" y="0"/>
+          <a:chExt cx="0" cy="0"/>
+        </a:xfrm>
+      </p:grpSpPr>
+      <p:sp>
+        <p:nvSpPr>
+          <p:cNvPr id="3" name="Title 2">
+            <a:extLst>
+              <a:ext uri="{FF2B5EF4-FFF2-40B4-BE49-F238E27FC236}">
+                <a16:creationId xmlns:a16="http://schemas.microsoft.com/office/drawing/2014/main" id="{B02E6584-2580-7522-0149-AB80033C1825}"/>
+              </a:ext>
+            </a:extLst>
+          </p:cNvPr>
+          <p:cNvSpPr>
+            <a:spLocks noGrp="1"/>
+          </p:cNvSpPr>
+          <p:nvPr>
+            <p:ph type="title"/>
+          </p:nvPr>
+        </p:nvSpPr>
+        <p:spPr/>
+        <p:txBody>
+          <a:bodyPr/>
+          <a:lstStyle/>
+          <a:p>
+            <a:endParaRPr lang="en-HU"/>
+          </a:p>
+        </p:txBody>
+      </p:sp>
+    </p:spTree>
+    <p:extLst>
+      <p:ext uri="{BB962C8B-B14F-4D97-AF65-F5344CB8AC3E}">
+        <p14:creationId xmlns:p14="http://schemas.microsoft.com/office/powerpoint/2010/main" val="2691372971"/>
+      </p:ext>
+    </p:extLst>
+  </p:cSld>
+  <p:clrMapOvr>
+    <a:masterClrMapping/>
+  </p:clrMapOvr>
+</p:sld>
+</file>
+
 <file path=ppt/slides/slide2.xml><?xml version="1.0" encoding="utf-8"?>
 <p:sld xmlns:a="http://schemas.openxmlformats.org/drawingml/2006/main" xmlns:r="http://schemas.openxmlformats.org/officeDocument/2006/relationships" xmlns:p="http://schemas.openxmlformats.org/presentationml/2006/main">
   <p:cSld>

</xml_diff>

<commit_message>
Automatically migrate TimeIntervals.timeseries to use TimeSeriesReferenceVectorData (#1390)
Co-authored-by: Ryan Ly <rly@lbl.gov>
</commit_message>
<xml_diff>
--- a/docs/source/figures/gallery_thumbnails.pptx
+++ b/docs/source/figures/gallery_thumbnails.pptx
@@ -5,7 +5,7 @@
     <p:sldMasterId id="2147483660" r:id="rId1"/>
   </p:sldMasterIdLst>
   <p:notesMasterIdLst>
-    <p:notesMasterId r:id="rId21"/>
+    <p:notesMasterId r:id="rId19"/>
   </p:notesMasterIdLst>
   <p:sldIdLst>
     <p:sldId id="342" r:id="rId2"/>
@@ -20,13 +20,11 @@
     <p:sldId id="361" r:id="rId11"/>
     <p:sldId id="363" r:id="rId12"/>
     <p:sldId id="353" r:id="rId13"/>
-    <p:sldId id="354" r:id="rId14"/>
-    <p:sldId id="355" r:id="rId15"/>
-    <p:sldId id="358" r:id="rId16"/>
-    <p:sldId id="359" r:id="rId17"/>
-    <p:sldId id="364" r:id="rId18"/>
-    <p:sldId id="365" r:id="rId19"/>
-    <p:sldId id="366" r:id="rId20"/>
+    <p:sldId id="364" r:id="rId14"/>
+    <p:sldId id="354" r:id="rId15"/>
+    <p:sldId id="355" r:id="rId16"/>
+    <p:sldId id="358" r:id="rId17"/>
+    <p:sldId id="359" r:id="rId18"/>
   </p:sldIdLst>
   <p:sldSz cx="12192000" cy="6858000"/>
   <p:notesSz cx="6858000" cy="9144000"/>
@@ -127,18 +125,7 @@
   </p:defaultTextStyle>
   <p:extLst>
     <p:ext uri="{EFAFB233-063F-42B5-8137-9DF3F51BA10A}">
-      <p15:sldGuideLst xmlns:p15="http://schemas.microsoft.com/office/powerpoint/2012/main">
-        <p15:guide id="1" orient="horz" pos="3405">
-          <p15:clr>
-            <a:srgbClr val="A4A3A4"/>
-          </p15:clr>
-        </p15:guide>
-        <p15:guide id="2" pos="4184">
-          <p15:clr>
-            <a:srgbClr val="A4A3A4"/>
-          </p15:clr>
-        </p15:guide>
-      </p15:sldGuideLst>
+      <p15:sldGuideLst xmlns:p15="http://schemas.microsoft.com/office/powerpoint/2012/main" xmlns=""/>
     </p:ext>
   </p:extLst>
 </p:presentation>
@@ -226,7 +213,7 @@
           <a:p>
             <a:fld id="{4D6A40B9-902A-4E0E-AF39-1C357549AEE0}" type="datetimeFigureOut">
               <a:rPr lang="en-US" smtClean="0"/>
-              <a:t>5/5/22</a:t>
+              <a:t>8/12/21</a:t>
             </a:fld>
             <a:endParaRPr lang="en-US"/>
           </a:p>
@@ -726,7 +713,91 @@
           <a:p>
             <a:fld id="{88156F16-9966-4EDC-933D-6170A05B6017}" type="slidenum">
               <a:rPr lang="en-US" smtClean="0"/>
-              <a:t>16</a:t>
+              <a:t>13</a:t>
+            </a:fld>
+            <a:endParaRPr lang="en-US"/>
+          </a:p>
+        </p:txBody>
+      </p:sp>
+    </p:spTree>
+    <p:extLst>
+      <p:ext uri="{BB962C8B-B14F-4D97-AF65-F5344CB8AC3E}">
+        <p14:creationId xmlns:p14="http://schemas.microsoft.com/office/powerpoint/2010/main" val="1993993187"/>
+      </p:ext>
+    </p:extLst>
+  </p:cSld>
+  <p:clrMapOvr>
+    <a:masterClrMapping/>
+  </p:clrMapOvr>
+</p:notes>
+</file>
+
+<file path=ppt/notesSlides/notesSlide4.xml><?xml version="1.0" encoding="utf-8"?>
+<p:notes xmlns:a="http://schemas.openxmlformats.org/drawingml/2006/main" xmlns:r="http://schemas.openxmlformats.org/officeDocument/2006/relationships" xmlns:p="http://schemas.openxmlformats.org/presentationml/2006/main">
+  <p:cSld>
+    <p:spTree>
+      <p:nvGrpSpPr>
+        <p:cNvPr id="1" name=""/>
+        <p:cNvGrpSpPr/>
+        <p:nvPr/>
+      </p:nvGrpSpPr>
+      <p:grpSpPr>
+        <a:xfrm>
+          <a:off x="0" y="0"/>
+          <a:ext cx="0" cy="0"/>
+          <a:chOff x="0" y="0"/>
+          <a:chExt cx="0" cy="0"/>
+        </a:xfrm>
+      </p:grpSpPr>
+      <p:sp>
+        <p:nvSpPr>
+          <p:cNvPr id="2" name="Slide Image Placeholder 1"/>
+          <p:cNvSpPr>
+            <a:spLocks noGrp="1" noRot="1" noChangeAspect="1"/>
+          </p:cNvSpPr>
+          <p:nvPr>
+            <p:ph type="sldImg"/>
+          </p:nvPr>
+        </p:nvSpPr>
+        <p:spPr/>
+      </p:sp>
+      <p:sp>
+        <p:nvSpPr>
+          <p:cNvPr id="3" name="Notes Placeholder 2"/>
+          <p:cNvSpPr>
+            <a:spLocks noGrp="1"/>
+          </p:cNvSpPr>
+          <p:nvPr>
+            <p:ph type="body" idx="1"/>
+          </p:nvPr>
+        </p:nvSpPr>
+        <p:spPr/>
+        <p:txBody>
+          <a:bodyPr/>
+          <a:lstStyle/>
+          <a:p>
+            <a:endParaRPr lang="en-US" dirty="0"/>
+          </a:p>
+        </p:txBody>
+      </p:sp>
+      <p:sp>
+        <p:nvSpPr>
+          <p:cNvPr id="4" name="Slide Number Placeholder 3"/>
+          <p:cNvSpPr>
+            <a:spLocks noGrp="1"/>
+          </p:cNvSpPr>
+          <p:nvPr>
+            <p:ph type="sldNum" sz="quarter" idx="10"/>
+          </p:nvPr>
+        </p:nvSpPr>
+        <p:spPr/>
+        <p:txBody>
+          <a:bodyPr/>
+          <a:lstStyle/>
+          <a:p>
+            <a:fld id="{88156F16-9966-4EDC-933D-6170A05B6017}" type="slidenum">
+              <a:rPr lang="en-US" smtClean="0"/>
+              <a:t>17</a:t>
             </a:fld>
             <a:endParaRPr lang="en-US"/>
           </a:p>
@@ -1558,7 +1629,7 @@
           <p:cNvPr id="4" name="Text Placeholder 3">
             <a:extLst>
               <a:ext uri="{FF2B5EF4-FFF2-40B4-BE49-F238E27FC236}">
-                <a16:creationId xmlns:a16="http://schemas.microsoft.com/office/drawing/2014/main" id="{8850B379-F419-41FB-9123-96081B074583}"/>
+                <a16:creationId xmlns:a16="http://schemas.microsoft.com/office/drawing/2014/main" xmlns="" id="{8850B379-F419-41FB-9123-96081B074583}"/>
               </a:ext>
             </a:extLst>
           </p:cNvPr>
@@ -1849,7 +1920,7 @@
           <p:cNvPr id="5" name="Picture 4">
             <a:extLst>
               <a:ext uri="{FF2B5EF4-FFF2-40B4-BE49-F238E27FC236}">
-                <a16:creationId xmlns:a16="http://schemas.microsoft.com/office/drawing/2014/main" id="{A5059957-9534-4FB9-8820-2343C3BF0E8F}"/>
+                <a16:creationId xmlns:a16="http://schemas.microsoft.com/office/drawing/2014/main" xmlns="" id="{A5059957-9534-4FB9-8820-2343C3BF0E8F}"/>
               </a:ext>
             </a:extLst>
           </p:cNvPr>
@@ -1879,7 +1950,7 @@
           <p:cNvPr id="4" name="Text Placeholder 3">
             <a:extLst>
               <a:ext uri="{FF2B5EF4-FFF2-40B4-BE49-F238E27FC236}">
-                <a16:creationId xmlns:a16="http://schemas.microsoft.com/office/drawing/2014/main" id="{8850B379-F419-41FB-9123-96081B074583}"/>
+                <a16:creationId xmlns:a16="http://schemas.microsoft.com/office/drawing/2014/main" xmlns="" id="{8850B379-F419-41FB-9123-96081B074583}"/>
               </a:ext>
             </a:extLst>
           </p:cNvPr>
@@ -2236,7 +2307,7 @@
           <p:cNvPr id="7" name="Google Shape;20;p4">
             <a:extLst>
               <a:ext uri="{FF2B5EF4-FFF2-40B4-BE49-F238E27FC236}">
-                <a16:creationId xmlns:a16="http://schemas.microsoft.com/office/drawing/2014/main" id="{537643E4-B983-42CC-9421-9C4C107A5DA4}"/>
+                <a16:creationId xmlns:a16="http://schemas.microsoft.com/office/drawing/2014/main" xmlns="" id="{537643E4-B983-42CC-9421-9C4C107A5DA4}"/>
               </a:ext>
             </a:extLst>
           </p:cNvPr>
@@ -3641,7 +3712,7 @@
           <a:p>
             <a:pPr algn="ctr"/>
             <a:r>
-              <a:rPr lang="en-US" sz="5400" b="1" dirty="0">
+              <a:rPr lang="en-US" sz="5400" b="1" dirty="0" smtClean="0">
                 <a:solidFill>
                   <a:srgbClr val="052B48"/>
                 </a:solidFill>
@@ -3650,6 +3721,13 @@
               </a:rPr>
               <a:t>Intracellular Electrophysiology</a:t>
             </a:r>
+            <a:endParaRPr lang="en-US" sz="5400" b="1" dirty="0">
+              <a:solidFill>
+                <a:srgbClr val="052B48"/>
+              </a:solidFill>
+              <a:latin typeface="Calibri"/>
+              <a:cs typeface="Calibri"/>
+            </a:endParaRPr>
           </a:p>
         </p:txBody>
       </p:sp>
@@ -3658,7 +3736,7 @@
           <p:cNvPr id="5" name="Picture 4" descr="A screenshot of a cell phone&#10;&#10;Description automatically generated">
             <a:extLst>
               <a:ext uri="{FF2B5EF4-FFF2-40B4-BE49-F238E27FC236}">
-                <a16:creationId xmlns:a16="http://schemas.microsoft.com/office/drawing/2014/main" id="{8C303482-C4AE-E049-A13A-50CE832D1F2A}"/>
+                <a16:creationId xmlns="" xmlns:a16="http://schemas.microsoft.com/office/drawing/2014/main" id="{8C303482-C4AE-E049-A13A-50CE832D1F2A}"/>
               </a:ext>
             </a:extLst>
           </p:cNvPr>
@@ -3711,18 +3789,33 @@
           <a:p>
             <a:r>
               <a:rPr lang="en-US" sz="1400" dirty="0"/>
-              <a:t> (figure source: </a:t>
+              <a:t> </a:t>
+            </a:r>
+            <a:r>
+              <a:rPr lang="en-US" sz="1400" dirty="0" smtClean="0"/>
+              <a:t>(figure source</a:t>
+            </a:r>
+            <a:r>
+              <a:rPr lang="en-US" sz="1400" dirty="0"/>
+              <a:t>: </a:t>
             </a:r>
             <a:r>
               <a:rPr lang="en-US" sz="1400" dirty="0">
                 <a:hlinkClick r:id="rId3"/>
               </a:rPr>
-              <a:t>celltypes.brain-map.org</a:t>
+              <a:t>celltypes.brain-</a:t>
             </a:r>
             <a:r>
-              <a:rPr lang="en-US" sz="1400" dirty="0"/>
+              <a:rPr lang="en-US" sz="1400" dirty="0" smtClean="0">
+                <a:hlinkClick r:id="rId3"/>
+              </a:rPr>
+              <a:t>map.org</a:t>
+            </a:r>
+            <a:r>
+              <a:rPr lang="en-US" sz="1400" dirty="0" smtClean="0"/>
               <a:t>)</a:t>
             </a:r>
+            <a:endParaRPr lang="en-US" sz="1400" dirty="0"/>
           </a:p>
         </p:txBody>
       </p:sp>
@@ -3828,7 +3921,7 @@
           <a:p>
             <a:pPr algn="ctr"/>
             <a:r>
-              <a:rPr lang="en-US" sz="5400" b="1" dirty="0">
+              <a:rPr lang="en-US" sz="5400" b="1" dirty="0" smtClean="0">
                 <a:solidFill>
                   <a:srgbClr val="052B48"/>
                 </a:solidFill>
@@ -3837,6 +3930,13 @@
               </a:rPr>
               <a:t>Parallel I/O using MPI</a:t>
             </a:r>
+            <a:endParaRPr lang="en-US" sz="5400" b="1" dirty="0">
+              <a:solidFill>
+                <a:srgbClr val="052B48"/>
+              </a:solidFill>
+              <a:latin typeface="Calibri"/>
+              <a:cs typeface="Calibri"/>
+            </a:endParaRPr>
           </a:p>
         </p:txBody>
       </p:sp>
@@ -3886,9 +3986,10 @@
           <a:p>
             <a:pPr algn="ctr"/>
             <a:r>
-              <a:rPr lang="en-US" u="sng" dirty="0"/>
+              <a:rPr lang="en-US" u="sng" dirty="0" smtClean="0"/>
               <a:t>																			   </a:t>
             </a:r>
+            <a:endParaRPr lang="en-US" u="sng" dirty="0"/>
           </a:p>
         </p:txBody>
       </p:sp>
@@ -4034,7 +4135,7 @@
               <a:defRPr/>
             </a:pPr>
             <a:r>
-              <a:rPr kumimoji="0" lang="en-US" sz="1800" i="0" u="none" strike="noStrike" kern="0" cap="none" spc="0" normalizeH="0" baseline="0" noProof="0" dirty="0" err="1">
+              <a:rPr kumimoji="0" lang="en-US" sz="1800" i="0" u="none" strike="noStrike" kern="0" cap="none" spc="0" normalizeH="0" baseline="0" noProof="0" dirty="0" err="1" smtClean="0">
                 <a:ln>
                   <a:noFill/>
                 </a:ln>
@@ -4120,7 +4221,7 @@
               <a:defRPr/>
             </a:pPr>
             <a:r>
-              <a:rPr kumimoji="0" lang="en-US" sz="1800" i="0" u="none" strike="noStrike" kern="0" cap="none" spc="0" normalizeH="0" baseline="0" noProof="0" dirty="0" err="1">
+              <a:rPr kumimoji="0" lang="en-US" sz="1800" i="0" u="none" strike="noStrike" kern="0" cap="none" spc="0" normalizeH="0" baseline="0" noProof="0" dirty="0" err="1" smtClean="0">
                 <a:ln>
                   <a:noFill/>
                 </a:ln>
@@ -4206,7 +4307,7 @@
               <a:defRPr/>
             </a:pPr>
             <a:r>
-              <a:rPr kumimoji="0" lang="en-US" sz="1800" i="0" u="none" strike="noStrike" kern="0" cap="none" spc="0" normalizeH="0" baseline="0" noProof="0" dirty="0" err="1">
+              <a:rPr kumimoji="0" lang="en-US" sz="1800" i="0" u="none" strike="noStrike" kern="0" cap="none" spc="0" normalizeH="0" baseline="0" noProof="0" dirty="0" err="1" smtClean="0">
                 <a:ln>
                   <a:noFill/>
                 </a:ln>
@@ -4292,7 +4393,7 @@
               <a:defRPr/>
             </a:pPr>
             <a:r>
-              <a:rPr kumimoji="0" lang="en-US" sz="1800" i="0" u="none" strike="noStrike" kern="0" cap="none" spc="0" normalizeH="0" baseline="0" noProof="0" dirty="0" err="1">
+              <a:rPr kumimoji="0" lang="en-US" sz="1800" i="0" u="none" strike="noStrike" kern="0" cap="none" spc="0" normalizeH="0" baseline="0" noProof="0" dirty="0" err="1" smtClean="0">
                 <a:ln>
                   <a:noFill/>
                 </a:ln>
@@ -4673,7 +4774,7 @@
               <a:defRPr/>
             </a:pPr>
             <a:r>
-              <a:rPr kumimoji="0" lang="en-US" sz="1800" i="0" u="none" strike="noStrike" kern="0" cap="none" spc="0" normalizeH="0" baseline="0" noProof="0" dirty="0" err="1">
+              <a:rPr kumimoji="0" lang="en-US" sz="1800" i="0" u="none" strike="noStrike" kern="0" cap="none" spc="0" normalizeH="0" baseline="0" noProof="0" dirty="0" err="1" smtClean="0">
                 <a:ln>
                   <a:noFill/>
                 </a:ln>
@@ -4818,7 +4919,7 @@
               <a:defRPr/>
             </a:pPr>
             <a:r>
-              <a:rPr kumimoji="0" lang="en-US" sz="1800" i="0" u="none" strike="noStrike" kern="0" cap="none" spc="0" normalizeH="0" baseline="0" noProof="0" dirty="0" err="1">
+              <a:rPr kumimoji="0" lang="en-US" sz="1800" i="0" u="none" strike="noStrike" kern="0" cap="none" spc="0" normalizeH="0" baseline="0" noProof="0" dirty="0" err="1" smtClean="0">
                 <a:ln>
                   <a:noFill/>
                 </a:ln>
@@ -4963,7 +5064,7 @@
               <a:defRPr/>
             </a:pPr>
             <a:r>
-              <a:rPr kumimoji="0" lang="en-US" sz="1800" i="0" u="none" strike="noStrike" kern="0" cap="none" spc="0" normalizeH="0" baseline="0" noProof="0" dirty="0" err="1">
+              <a:rPr kumimoji="0" lang="en-US" sz="1800" i="0" u="none" strike="noStrike" kern="0" cap="none" spc="0" normalizeH="0" baseline="0" noProof="0" dirty="0" err="1" smtClean="0">
                 <a:ln>
                   <a:noFill/>
                 </a:ln>
@@ -5108,7 +5209,7 @@
               <a:defRPr/>
             </a:pPr>
             <a:r>
-              <a:rPr kumimoji="0" lang="en-US" sz="1800" i="0" u="none" strike="noStrike" kern="0" cap="none" spc="0" normalizeH="0" baseline="0" noProof="0" dirty="0" err="1">
+              <a:rPr kumimoji="0" lang="en-US" sz="1800" i="0" u="none" strike="noStrike" kern="0" cap="none" spc="0" normalizeH="0" baseline="0" noProof="0" dirty="0" err="1" smtClean="0">
                 <a:ln>
                   <a:noFill/>
                 </a:ln>
@@ -5247,7 +5348,7 @@
           <a:p>
             <a:pPr algn="ctr"/>
             <a:r>
-              <a:rPr lang="en-US" sz="5400" b="1" dirty="0">
+              <a:rPr lang="en-US" sz="5400" b="1" dirty="0" smtClean="0">
                 <a:solidFill>
                   <a:srgbClr val="052B48"/>
                 </a:solidFill>
@@ -5260,7 +5361,7 @@
           <a:p>
             <a:pPr algn="ctr"/>
             <a:r>
-              <a:rPr lang="en-US" sz="5400" b="1" dirty="0">
+              <a:rPr lang="en-US" sz="5400" b="1" dirty="0" smtClean="0">
                 <a:solidFill>
                   <a:srgbClr val="052B48"/>
                 </a:solidFill>
@@ -5269,6 +5370,13 @@
               </a:rPr>
               <a:t>S3 Bucket</a:t>
             </a:r>
+            <a:endParaRPr lang="en-US" sz="5400" b="1" dirty="0">
+              <a:solidFill>
+                <a:srgbClr val="052B48"/>
+              </a:solidFill>
+              <a:latin typeface="Calibri"/>
+              <a:cs typeface="Calibri"/>
+            </a:endParaRPr>
           </a:p>
         </p:txBody>
       </p:sp>
@@ -5429,9 +5537,10 @@
             <a:p>
               <a:pPr algn="ctr"/>
               <a:r>
-                <a:rPr lang="en-US" u="sng" dirty="0"/>
+                <a:rPr lang="en-US" u="sng" dirty="0" smtClean="0"/>
                 <a:t>												   </a:t>
               </a:r>
+              <a:endParaRPr lang="en-US" u="sng" dirty="0"/>
             </a:p>
           </p:txBody>
         </p:sp>
@@ -5809,14 +5918,14 @@
           <a:p>
             <a:pPr algn="ctr"/>
             <a:r>
-              <a:rPr lang="en-US" sz="1200" dirty="0">
+              <a:rPr lang="en-US" sz="1200" dirty="0" smtClean="0">
                 <a:latin typeface="Courier"/>
                 <a:cs typeface="Courier"/>
               </a:rPr>
               <a:t>010011101000101011101</a:t>
             </a:r>
             <a:r>
-              <a:rPr lang="mr-IN" sz="1200" dirty="0">
+              <a:rPr lang="mr-IN" sz="1200" dirty="0" smtClean="0">
                 <a:latin typeface="Courier"/>
                 <a:cs typeface="Courier"/>
               </a:rPr>
@@ -5961,7 +6070,7 @@
           <a:p>
             <a:pPr algn="ctr"/>
             <a:r>
-              <a:rPr lang="en-US" sz="5400" b="1" dirty="0">
+              <a:rPr lang="en-US" sz="5400" b="1" dirty="0" smtClean="0">
                 <a:solidFill>
                   <a:srgbClr val="052B48"/>
                 </a:solidFill>
@@ -5970,6 +6079,13 @@
               </a:rPr>
               <a:t>Object IDs in NWB</a:t>
             </a:r>
+            <a:endParaRPr lang="en-US" sz="5400" b="1" dirty="0">
+              <a:solidFill>
+                <a:srgbClr val="052B48"/>
+              </a:solidFill>
+              <a:latin typeface="Calibri"/>
+              <a:cs typeface="Calibri"/>
+            </a:endParaRPr>
           </a:p>
         </p:txBody>
       </p:sp>
@@ -6110,7 +6226,7 @@
         </p:nvSpPr>
         <p:spPr>
           <a:xfrm>
-            <a:off x="853570" y="853671"/>
+            <a:off x="853570" y="860481"/>
             <a:ext cx="7234527" cy="4851352"/>
           </a:xfrm>
           <a:prstGeom prst="roundRect">
@@ -6121,9 +6237,9 @@
           <a:solidFill>
             <a:srgbClr val="EDEDED"/>
           </a:solidFill>
-          <a:ln>
+          <a:ln w="3175" cmpd="sng">
             <a:solidFill>
-              <a:srgbClr val="000000"/>
+              <a:srgbClr val="052A48"/>
             </a:solidFill>
           </a:ln>
           <a:effectLst/>
@@ -6160,7 +6276,7 @@
         <p:spPr>
           <a:xfrm>
             <a:off x="863980" y="855015"/>
-            <a:ext cx="7213708" cy="923330"/>
+            <a:ext cx="7213708" cy="1754327"/>
           </a:xfrm>
           <a:prstGeom prst="rect">
             <a:avLst/>
@@ -6174,50 +6290,805 @@
           <a:p>
             <a:pPr algn="ctr"/>
             <a:r>
-              <a:rPr lang="en-US" sz="5400" b="1" dirty="0">
+              <a:rPr lang="en-US" sz="5400" b="1" dirty="0" smtClean="0">
                 <a:solidFill>
                   <a:srgbClr val="052B48"/>
                 </a:solidFill>
                 <a:latin typeface="Calibri"/>
                 <a:cs typeface="Calibri"/>
               </a:rPr>
-              <a:t>Extending NWB</a:t>
+              <a:t>Annotating Time Intervals</a:t>
             </a:r>
+            <a:endParaRPr lang="en-US" sz="5400" b="1" dirty="0">
+              <a:solidFill>
+                <a:srgbClr val="052B48"/>
+              </a:solidFill>
+              <a:latin typeface="Calibri"/>
+              <a:cs typeface="Calibri"/>
+            </a:endParaRPr>
           </a:p>
         </p:txBody>
       </p:sp>
-      <p:pic>
-        <p:nvPicPr>
-          <p:cNvPr id="2" name="Picture 1"/>
-          <p:cNvPicPr>
-            <a:picLocks noChangeAspect="1"/>
-          </p:cNvPicPr>
-          <p:nvPr/>
-        </p:nvPicPr>
-        <p:blipFill rotWithShape="1">
-          <a:blip r:embed="rId2"/>
-          <a:srcRect r="61780" b="9233"/>
-          <a:stretch/>
-        </p:blipFill>
+      <p:sp>
+        <p:nvSpPr>
+          <p:cNvPr id="6" name="Left Arrow 5"/>
+          <p:cNvSpPr/>
+          <p:nvPr/>
+        </p:nvSpPr>
+        <p:spPr>
+          <a:xfrm rot="16200000" flipV="1">
+            <a:off x="984462" y="4868639"/>
+            <a:ext cx="846712" cy="62572"/>
+          </a:xfrm>
+          <a:prstGeom prst="leftArrow">
+            <a:avLst>
+              <a:gd name="adj1" fmla="val 100000"/>
+              <a:gd name="adj2" fmla="val 0"/>
+            </a:avLst>
+          </a:prstGeom>
+          <a:solidFill>
+            <a:schemeClr val="accent1"/>
+          </a:solidFill>
+          <a:ln w="9525" cmpd="sng">
+            <a:solidFill>
+              <a:schemeClr val="accent1"/>
+            </a:solidFill>
+          </a:ln>
+        </p:spPr>
+        <p:style>
+          <a:lnRef idx="0">
+            <a:schemeClr val="accent1">
+              <a:tint val="60000"/>
+              <a:hueOff val="0"/>
+              <a:satOff val="0"/>
+              <a:lumOff val="0"/>
+              <a:alphaOff val="0"/>
+            </a:schemeClr>
+          </a:lnRef>
+          <a:fillRef idx="1">
+            <a:schemeClr val="accent1">
+              <a:tint val="60000"/>
+              <a:hueOff val="0"/>
+              <a:satOff val="0"/>
+              <a:lumOff val="0"/>
+              <a:alphaOff val="0"/>
+            </a:schemeClr>
+          </a:fillRef>
+          <a:effectRef idx="0">
+            <a:schemeClr val="accent1">
+              <a:tint val="60000"/>
+              <a:hueOff val="0"/>
+              <a:satOff val="0"/>
+              <a:lumOff val="0"/>
+              <a:alphaOff val="0"/>
+            </a:schemeClr>
+          </a:effectRef>
+          <a:fontRef idx="minor">
+            <a:schemeClr val="lt1"/>
+          </a:fontRef>
+        </p:style>
+      </p:sp>
+      <p:sp>
+        <p:nvSpPr>
+          <p:cNvPr id="7" name="Left Arrow 6"/>
+          <p:cNvSpPr/>
+          <p:nvPr/>
+        </p:nvSpPr>
+        <p:spPr>
+          <a:xfrm rot="16200000" flipV="1">
+            <a:off x="2673658" y="4864879"/>
+            <a:ext cx="846712" cy="62572"/>
+          </a:xfrm>
+          <a:prstGeom prst="leftArrow">
+            <a:avLst>
+              <a:gd name="adj1" fmla="val 100000"/>
+              <a:gd name="adj2" fmla="val 0"/>
+            </a:avLst>
+          </a:prstGeom>
+          <a:solidFill>
+            <a:schemeClr val="accent1"/>
+          </a:solidFill>
+          <a:ln w="9525" cmpd="sng">
+            <a:solidFill>
+              <a:schemeClr val="accent1"/>
+            </a:solidFill>
+          </a:ln>
+        </p:spPr>
+        <p:style>
+          <a:lnRef idx="0">
+            <a:schemeClr val="accent1">
+              <a:tint val="60000"/>
+              <a:hueOff val="0"/>
+              <a:satOff val="0"/>
+              <a:lumOff val="0"/>
+              <a:alphaOff val="0"/>
+            </a:schemeClr>
+          </a:lnRef>
+          <a:fillRef idx="1">
+            <a:schemeClr val="accent1">
+              <a:tint val="60000"/>
+              <a:hueOff val="0"/>
+              <a:satOff val="0"/>
+              <a:lumOff val="0"/>
+              <a:alphaOff val="0"/>
+            </a:schemeClr>
+          </a:fillRef>
+          <a:effectRef idx="0">
+            <a:schemeClr val="accent1">
+              <a:tint val="60000"/>
+              <a:hueOff val="0"/>
+              <a:satOff val="0"/>
+              <a:lumOff val="0"/>
+              <a:alphaOff val="0"/>
+            </a:schemeClr>
+          </a:effectRef>
+          <a:fontRef idx="minor">
+            <a:schemeClr val="lt1"/>
+          </a:fontRef>
+        </p:style>
+      </p:sp>
+      <p:sp>
+        <p:nvSpPr>
+          <p:cNvPr id="9" name="Left Arrow 8"/>
+          <p:cNvSpPr/>
+          <p:nvPr/>
+        </p:nvSpPr>
+        <p:spPr>
+          <a:xfrm rot="16200000" flipV="1">
+            <a:off x="4610193" y="4875290"/>
+            <a:ext cx="846712" cy="62572"/>
+          </a:xfrm>
+          <a:prstGeom prst="leftArrow">
+            <a:avLst>
+              <a:gd name="adj1" fmla="val 100000"/>
+              <a:gd name="adj2" fmla="val 0"/>
+            </a:avLst>
+          </a:prstGeom>
+          <a:solidFill>
+            <a:schemeClr val="accent6"/>
+          </a:solidFill>
+          <a:ln w="9525" cmpd="sng">
+            <a:solidFill>
+              <a:schemeClr val="accent6"/>
+            </a:solidFill>
+          </a:ln>
+        </p:spPr>
+        <p:style>
+          <a:lnRef idx="0">
+            <a:schemeClr val="accent1">
+              <a:tint val="60000"/>
+              <a:hueOff val="0"/>
+              <a:satOff val="0"/>
+              <a:lumOff val="0"/>
+              <a:alphaOff val="0"/>
+            </a:schemeClr>
+          </a:lnRef>
+          <a:fillRef idx="1">
+            <a:schemeClr val="accent1">
+              <a:tint val="60000"/>
+              <a:hueOff val="0"/>
+              <a:satOff val="0"/>
+              <a:lumOff val="0"/>
+              <a:alphaOff val="0"/>
+            </a:schemeClr>
+          </a:fillRef>
+          <a:effectRef idx="0">
+            <a:schemeClr val="accent1">
+              <a:tint val="60000"/>
+              <a:hueOff val="0"/>
+              <a:satOff val="0"/>
+              <a:lumOff val="0"/>
+              <a:alphaOff val="0"/>
+            </a:schemeClr>
+          </a:effectRef>
+          <a:fontRef idx="minor">
+            <a:schemeClr val="lt1"/>
+          </a:fontRef>
+        </p:style>
+      </p:sp>
+      <p:sp>
+        <p:nvSpPr>
+          <p:cNvPr id="10" name="Left Arrow 9"/>
+          <p:cNvSpPr/>
+          <p:nvPr/>
+        </p:nvSpPr>
+        <p:spPr>
+          <a:xfrm rot="16200000" flipV="1">
+            <a:off x="6049573" y="4871530"/>
+            <a:ext cx="846712" cy="62572"/>
+          </a:xfrm>
+          <a:prstGeom prst="leftArrow">
+            <a:avLst>
+              <a:gd name="adj1" fmla="val 100000"/>
+              <a:gd name="adj2" fmla="val 0"/>
+            </a:avLst>
+          </a:prstGeom>
+          <a:solidFill>
+            <a:schemeClr val="accent6"/>
+          </a:solidFill>
+          <a:ln w="9525" cmpd="sng">
+            <a:solidFill>
+              <a:schemeClr val="accent6"/>
+            </a:solidFill>
+          </a:ln>
+        </p:spPr>
+        <p:style>
+          <a:lnRef idx="0">
+            <a:schemeClr val="accent1">
+              <a:tint val="60000"/>
+              <a:hueOff val="0"/>
+              <a:satOff val="0"/>
+              <a:lumOff val="0"/>
+              <a:alphaOff val="0"/>
+            </a:schemeClr>
+          </a:lnRef>
+          <a:fillRef idx="1">
+            <a:schemeClr val="accent1">
+              <a:tint val="60000"/>
+              <a:hueOff val="0"/>
+              <a:satOff val="0"/>
+              <a:lumOff val="0"/>
+              <a:alphaOff val="0"/>
+            </a:schemeClr>
+          </a:fillRef>
+          <a:effectRef idx="0">
+            <a:schemeClr val="accent1">
+              <a:tint val="60000"/>
+              <a:hueOff val="0"/>
+              <a:satOff val="0"/>
+              <a:lumOff val="0"/>
+              <a:alphaOff val="0"/>
+            </a:schemeClr>
+          </a:effectRef>
+          <a:fontRef idx="minor">
+            <a:schemeClr val="lt1"/>
+          </a:fontRef>
+        </p:style>
+      </p:sp>
+      <p:sp>
+        <p:nvSpPr>
+          <p:cNvPr id="5" name="Left Arrow 4"/>
+          <p:cNvSpPr/>
+          <p:nvPr/>
+        </p:nvSpPr>
+        <p:spPr>
+          <a:xfrm rot="10800000" flipV="1">
+            <a:off x="1116104" y="4689645"/>
+            <a:ext cx="6724467" cy="421971"/>
+          </a:xfrm>
+          <a:prstGeom prst="leftArrow">
+            <a:avLst>
+              <a:gd name="adj1" fmla="val 46274"/>
+              <a:gd name="adj2" fmla="val 162557"/>
+            </a:avLst>
+          </a:prstGeom>
+          <a:solidFill>
+            <a:srgbClr val="052A48"/>
+          </a:solidFill>
+          <a:ln w="9525" cmpd="sng">
+            <a:noFill/>
+          </a:ln>
+        </p:spPr>
+        <p:style>
+          <a:lnRef idx="0">
+            <a:schemeClr val="accent1">
+              <a:tint val="60000"/>
+              <a:hueOff val="0"/>
+              <a:satOff val="0"/>
+              <a:lumOff val="0"/>
+              <a:alphaOff val="0"/>
+            </a:schemeClr>
+          </a:lnRef>
+          <a:fillRef idx="1">
+            <a:schemeClr val="accent1">
+              <a:tint val="60000"/>
+              <a:hueOff val="0"/>
+              <a:satOff val="0"/>
+              <a:lumOff val="0"/>
+              <a:alphaOff val="0"/>
+            </a:schemeClr>
+          </a:fillRef>
+          <a:effectRef idx="0">
+            <a:schemeClr val="accent1">
+              <a:tint val="60000"/>
+              <a:hueOff val="0"/>
+              <a:satOff val="0"/>
+              <a:lumOff val="0"/>
+              <a:alphaOff val="0"/>
+            </a:schemeClr>
+          </a:effectRef>
+          <a:fontRef idx="minor">
+            <a:schemeClr val="lt1"/>
+          </a:fontRef>
+        </p:style>
+      </p:sp>
+      <p:sp>
+        <p:nvSpPr>
+          <p:cNvPr id="3" name="Left Brace 2"/>
+          <p:cNvSpPr/>
+          <p:nvPr/>
+        </p:nvSpPr>
+        <p:spPr>
+          <a:xfrm rot="5400000">
+            <a:off x="3957460" y="3312341"/>
+            <a:ext cx="395573" cy="766897"/>
+          </a:xfrm>
+          <a:prstGeom prst="leftBrace">
+            <a:avLst/>
+          </a:prstGeom>
+          <a:noFill/>
+          <a:ln w="38100" cmpd="sng">
+            <a:solidFill>
+              <a:srgbClr val="FF0000"/>
+            </a:solidFill>
+          </a:ln>
+          <a:effectLst/>
+        </p:spPr>
+        <p:style>
+          <a:lnRef idx="2">
+            <a:schemeClr val="accent1"/>
+          </a:lnRef>
+          <a:fillRef idx="0">
+            <a:schemeClr val="accent1"/>
+          </a:fillRef>
+          <a:effectRef idx="1">
+            <a:schemeClr val="accent1"/>
+          </a:effectRef>
+          <a:fontRef idx="minor">
+            <a:schemeClr val="tx1"/>
+          </a:fontRef>
+        </p:style>
+        <p:txBody>
+          <a:bodyPr rtlCol="0" anchor="ctr"/>
+          <a:lstStyle/>
+          <a:p>
+            <a:pPr algn="ctr"/>
+            <a:endParaRPr lang="en-US"/>
+          </a:p>
+        </p:txBody>
+      </p:sp>
+      <p:sp>
+        <p:nvSpPr>
+          <p:cNvPr id="12" name="Left Brace 11"/>
+          <p:cNvSpPr/>
+          <p:nvPr/>
+        </p:nvSpPr>
+        <p:spPr>
+          <a:xfrm rot="5400000">
+            <a:off x="5564238" y="3433942"/>
+            <a:ext cx="385170" cy="1474392"/>
+          </a:xfrm>
+          <a:prstGeom prst="leftBrace">
+            <a:avLst/>
+          </a:prstGeom>
+          <a:ln w="38100" cmpd="sng">
+            <a:solidFill>
+              <a:srgbClr val="70AD47"/>
+            </a:solidFill>
+          </a:ln>
+          <a:effectLst/>
+        </p:spPr>
+        <p:style>
+          <a:lnRef idx="2">
+            <a:schemeClr val="accent1"/>
+          </a:lnRef>
+          <a:fillRef idx="0">
+            <a:schemeClr val="accent1"/>
+          </a:fillRef>
+          <a:effectRef idx="1">
+            <a:schemeClr val="accent1"/>
+          </a:effectRef>
+          <a:fontRef idx="minor">
+            <a:schemeClr val="tx1"/>
+          </a:fontRef>
+        </p:style>
+        <p:txBody>
+          <a:bodyPr rtlCol="0" anchor="ctr"/>
+          <a:lstStyle/>
+          <a:p>
+            <a:pPr algn="ctr"/>
+            <a:endParaRPr lang="en-US"/>
+          </a:p>
+        </p:txBody>
+      </p:sp>
+      <p:sp>
+        <p:nvSpPr>
+          <p:cNvPr id="4" name="Rectangle 3"/>
+          <p:cNvSpPr/>
+          <p:nvPr/>
+        </p:nvSpPr>
         <p:spPr>
           <a:xfrm>
-            <a:off x="2339904" y="1940847"/>
-            <a:ext cx="4329453" cy="3539553"/>
+            <a:off x="3281370" y="4951677"/>
+            <a:ext cx="1679103" cy="369332"/>
           </a:xfrm>
           <a:prstGeom prst="rect">
             <a:avLst/>
           </a:prstGeom>
-          <a:effectLst>
-            <a:glow rad="50800">
-              <a:srgbClr val="052A48"/>
-            </a:glow>
-          </a:effectLst>
-        </p:spPr>
-      </p:pic>
+        </p:spPr>
+        <p:txBody>
+          <a:bodyPr wrap="none">
+            <a:spAutoFit/>
+          </a:bodyPr>
+          <a:lstStyle/>
+          <a:p>
+            <a:r>
+              <a:rPr lang="en-US" b="1" dirty="0" smtClean="0">
+                <a:solidFill>
+                  <a:srgbClr val="052B48"/>
+                </a:solidFill>
+                <a:latin typeface="Calibri"/>
+                <a:cs typeface="Calibri"/>
+              </a:rPr>
+              <a:t>time in seconds</a:t>
+            </a:r>
+            <a:endParaRPr lang="en-US" dirty="0"/>
+          </a:p>
+        </p:txBody>
+      </p:sp>
+      <p:sp>
+        <p:nvSpPr>
+          <p:cNvPr id="14" name="Rectangle 13"/>
+          <p:cNvSpPr/>
+          <p:nvPr/>
+        </p:nvSpPr>
+        <p:spPr>
+          <a:xfrm>
+            <a:off x="1591313" y="3355100"/>
+            <a:ext cx="1357263" cy="523220"/>
+          </a:xfrm>
+          <a:prstGeom prst="rect">
+            <a:avLst/>
+          </a:prstGeom>
+        </p:spPr>
+        <p:txBody>
+          <a:bodyPr wrap="none">
+            <a:spAutoFit/>
+          </a:bodyPr>
+          <a:lstStyle/>
+          <a:p>
+            <a:r>
+              <a:rPr lang="en-US" sz="2800" b="1" dirty="0">
+                <a:solidFill>
+                  <a:schemeClr val="accent5">
+                    <a:lumMod val="75000"/>
+                  </a:schemeClr>
+                </a:solidFill>
+                <a:latin typeface="Calibri"/>
+                <a:cs typeface="Calibri"/>
+              </a:rPr>
+              <a:t>e</a:t>
+            </a:r>
+            <a:r>
+              <a:rPr lang="en-US" sz="2800" b="1" dirty="0" smtClean="0">
+                <a:solidFill>
+                  <a:schemeClr val="accent5">
+                    <a:lumMod val="75000"/>
+                  </a:schemeClr>
+                </a:solidFill>
+                <a:latin typeface="Calibri"/>
+                <a:cs typeface="Calibri"/>
+              </a:rPr>
+              <a:t>poch 1</a:t>
+            </a:r>
+            <a:endParaRPr lang="en-US" sz="2800" dirty="0">
+              <a:solidFill>
+                <a:schemeClr val="accent5">
+                  <a:lumMod val="75000"/>
+                </a:schemeClr>
+              </a:solidFill>
+            </a:endParaRPr>
+          </a:p>
+        </p:txBody>
+      </p:sp>
+      <p:sp>
+        <p:nvSpPr>
+          <p:cNvPr id="15" name="Rectangle 14"/>
+          <p:cNvSpPr/>
+          <p:nvPr/>
+        </p:nvSpPr>
+        <p:spPr>
+          <a:xfrm>
+            <a:off x="5080061" y="3351340"/>
+            <a:ext cx="1367958" cy="523220"/>
+          </a:xfrm>
+          <a:prstGeom prst="rect">
+            <a:avLst/>
+          </a:prstGeom>
+        </p:spPr>
+        <p:txBody>
+          <a:bodyPr wrap="none">
+            <a:spAutoFit/>
+          </a:bodyPr>
+          <a:lstStyle/>
+          <a:p>
+            <a:r>
+              <a:rPr lang="en-US" sz="2800" b="1" dirty="0">
+                <a:solidFill>
+                  <a:schemeClr val="accent6"/>
+                </a:solidFill>
+                <a:latin typeface="Calibri"/>
+                <a:cs typeface="Calibri"/>
+              </a:rPr>
+              <a:t>e</a:t>
+            </a:r>
+            <a:r>
+              <a:rPr lang="en-US" sz="2800" b="1" dirty="0" smtClean="0">
+                <a:solidFill>
+                  <a:schemeClr val="accent6"/>
+                </a:solidFill>
+                <a:latin typeface="Calibri"/>
+                <a:cs typeface="Calibri"/>
+              </a:rPr>
+              <a:t>poch n</a:t>
+            </a:r>
+            <a:endParaRPr lang="en-US" sz="2800" dirty="0">
+              <a:solidFill>
+                <a:schemeClr val="accent6"/>
+              </a:solidFill>
+            </a:endParaRPr>
+          </a:p>
+        </p:txBody>
+      </p:sp>
+      <p:sp>
+        <p:nvSpPr>
+          <p:cNvPr id="16" name="Left Arrow 15"/>
+          <p:cNvSpPr/>
+          <p:nvPr/>
+        </p:nvSpPr>
+        <p:spPr>
+          <a:xfrm rot="16200000" flipV="1">
+            <a:off x="3344328" y="4363801"/>
+            <a:ext cx="846712" cy="36576"/>
+          </a:xfrm>
+          <a:prstGeom prst="leftArrow">
+            <a:avLst>
+              <a:gd name="adj1" fmla="val 100000"/>
+              <a:gd name="adj2" fmla="val 0"/>
+            </a:avLst>
+          </a:prstGeom>
+          <a:solidFill>
+            <a:srgbClr val="FF0000"/>
+          </a:solidFill>
+          <a:ln w="3175" cmpd="sng">
+            <a:noFill/>
+          </a:ln>
+        </p:spPr>
+        <p:style>
+          <a:lnRef idx="0">
+            <a:schemeClr val="accent1">
+              <a:tint val="60000"/>
+              <a:hueOff val="0"/>
+              <a:satOff val="0"/>
+              <a:lumOff val="0"/>
+              <a:alphaOff val="0"/>
+            </a:schemeClr>
+          </a:lnRef>
+          <a:fillRef idx="1">
+            <a:schemeClr val="accent1">
+              <a:tint val="60000"/>
+              <a:hueOff val="0"/>
+              <a:satOff val="0"/>
+              <a:lumOff val="0"/>
+              <a:alphaOff val="0"/>
+            </a:schemeClr>
+          </a:fillRef>
+          <a:effectRef idx="0">
+            <a:schemeClr val="accent1">
+              <a:tint val="60000"/>
+              <a:hueOff val="0"/>
+              <a:satOff val="0"/>
+              <a:lumOff val="0"/>
+              <a:alphaOff val="0"/>
+            </a:schemeClr>
+          </a:effectRef>
+          <a:fontRef idx="minor">
+            <a:schemeClr val="lt1"/>
+          </a:fontRef>
+        </p:style>
+      </p:sp>
+      <p:sp>
+        <p:nvSpPr>
+          <p:cNvPr id="17" name="Left Arrow 16"/>
+          <p:cNvSpPr/>
+          <p:nvPr/>
+        </p:nvSpPr>
+        <p:spPr>
+          <a:xfrm rot="16200000" flipV="1">
+            <a:off x="4114906" y="4360042"/>
+            <a:ext cx="846712" cy="36576"/>
+          </a:xfrm>
+          <a:prstGeom prst="leftArrow">
+            <a:avLst>
+              <a:gd name="adj1" fmla="val 100000"/>
+              <a:gd name="adj2" fmla="val 0"/>
+            </a:avLst>
+          </a:prstGeom>
+          <a:solidFill>
+            <a:srgbClr val="FF0000"/>
+          </a:solidFill>
+          <a:ln w="3175" cmpd="sng">
+            <a:noFill/>
+          </a:ln>
+        </p:spPr>
+        <p:style>
+          <a:lnRef idx="0">
+            <a:schemeClr val="accent1">
+              <a:tint val="60000"/>
+              <a:hueOff val="0"/>
+              <a:satOff val="0"/>
+              <a:lumOff val="0"/>
+              <a:alphaOff val="0"/>
+            </a:schemeClr>
+          </a:lnRef>
+          <a:fillRef idx="1">
+            <a:schemeClr val="accent1">
+              <a:tint val="60000"/>
+              <a:hueOff val="0"/>
+              <a:satOff val="0"/>
+              <a:lumOff val="0"/>
+              <a:alphaOff val="0"/>
+            </a:schemeClr>
+          </a:fillRef>
+          <a:effectRef idx="0">
+            <a:schemeClr val="accent1">
+              <a:tint val="60000"/>
+              <a:hueOff val="0"/>
+              <a:satOff val="0"/>
+              <a:lumOff val="0"/>
+              <a:alphaOff val="0"/>
+            </a:schemeClr>
+          </a:effectRef>
+          <a:fontRef idx="minor">
+            <a:schemeClr val="lt1"/>
+          </a:fontRef>
+        </p:style>
+      </p:sp>
+      <p:sp>
+        <p:nvSpPr>
+          <p:cNvPr id="18" name="Left Brace 17"/>
+          <p:cNvSpPr/>
+          <p:nvPr/>
+        </p:nvSpPr>
+        <p:spPr>
+          <a:xfrm rot="5400000">
+            <a:off x="2059612" y="3306941"/>
+            <a:ext cx="385170" cy="1717550"/>
+          </a:xfrm>
+          <a:prstGeom prst="leftBrace">
+            <a:avLst/>
+          </a:prstGeom>
+          <a:noFill/>
+          <a:ln w="38100" cmpd="sng">
+            <a:solidFill>
+              <a:schemeClr val="accent1"/>
+            </a:solidFill>
+          </a:ln>
+          <a:effectLst/>
+        </p:spPr>
+        <p:style>
+          <a:lnRef idx="2">
+            <a:schemeClr val="accent1"/>
+          </a:lnRef>
+          <a:fillRef idx="0">
+            <a:schemeClr val="accent1"/>
+          </a:fillRef>
+          <a:effectRef idx="1">
+            <a:schemeClr val="accent1"/>
+          </a:effectRef>
+          <a:fontRef idx="minor">
+            <a:schemeClr val="tx1"/>
+          </a:fontRef>
+        </p:style>
+        <p:txBody>
+          <a:bodyPr rtlCol="0" anchor="ctr"/>
+          <a:lstStyle/>
+          <a:p>
+            <a:pPr algn="ctr"/>
+            <a:endParaRPr lang="en-US"/>
+          </a:p>
+        </p:txBody>
+      </p:sp>
+      <p:sp>
+        <p:nvSpPr>
+          <p:cNvPr id="19" name="Rectangle 18"/>
+          <p:cNvSpPr/>
+          <p:nvPr/>
+        </p:nvSpPr>
+        <p:spPr>
+          <a:xfrm>
+            <a:off x="3575766" y="2893274"/>
+            <a:ext cx="1181759" cy="523220"/>
+          </a:xfrm>
+          <a:prstGeom prst="rect">
+            <a:avLst/>
+          </a:prstGeom>
+        </p:spPr>
+        <p:txBody>
+          <a:bodyPr wrap="none">
+            <a:spAutoFit/>
+          </a:bodyPr>
+          <a:lstStyle/>
+          <a:p>
+            <a:r>
+              <a:rPr lang="en-US" sz="2800" b="1" dirty="0" smtClean="0">
+                <a:solidFill>
+                  <a:srgbClr val="FF0000"/>
+                </a:solidFill>
+                <a:latin typeface="Calibri"/>
+                <a:cs typeface="Calibri"/>
+              </a:rPr>
+              <a:t>invalid</a:t>
+            </a:r>
+            <a:endParaRPr lang="en-US" sz="2800" dirty="0">
+              <a:solidFill>
+                <a:srgbClr val="FF0000"/>
+              </a:solidFill>
+            </a:endParaRPr>
+          </a:p>
+        </p:txBody>
+      </p:sp>
+      <p:sp>
+        <p:nvSpPr>
+          <p:cNvPr id="20" name="Left Arrow 19"/>
+          <p:cNvSpPr/>
+          <p:nvPr/>
+        </p:nvSpPr>
+        <p:spPr>
+          <a:xfrm rot="16200000">
+            <a:off x="4102096" y="4449785"/>
+            <a:ext cx="104107" cy="810335"/>
+          </a:xfrm>
+          <a:prstGeom prst="leftArrow">
+            <a:avLst>
+              <a:gd name="adj1" fmla="val 100000"/>
+              <a:gd name="adj2" fmla="val 0"/>
+            </a:avLst>
+          </a:prstGeom>
+          <a:solidFill>
+            <a:srgbClr val="FF0000"/>
+          </a:solidFill>
+          <a:ln w="9525" cmpd="sng">
+            <a:noFill/>
+          </a:ln>
+        </p:spPr>
+        <p:style>
+          <a:lnRef idx="0">
+            <a:schemeClr val="accent1">
+              <a:tint val="60000"/>
+              <a:hueOff val="0"/>
+              <a:satOff val="0"/>
+              <a:lumOff val="0"/>
+              <a:alphaOff val="0"/>
+            </a:schemeClr>
+          </a:lnRef>
+          <a:fillRef idx="1">
+            <a:schemeClr val="accent1">
+              <a:tint val="60000"/>
+              <a:hueOff val="0"/>
+              <a:satOff val="0"/>
+              <a:lumOff val="0"/>
+              <a:alphaOff val="0"/>
+            </a:schemeClr>
+          </a:fillRef>
+          <a:effectRef idx="0">
+            <a:schemeClr val="accent1">
+              <a:tint val="60000"/>
+              <a:hueOff val="0"/>
+              <a:satOff val="0"/>
+              <a:lumOff val="0"/>
+              <a:alphaOff val="0"/>
+            </a:schemeClr>
+          </a:effectRef>
+          <a:fontRef idx="minor">
+            <a:schemeClr val="lt1"/>
+          </a:fontRef>
+        </p:style>
+      </p:sp>
     </p:spTree>
     <p:extLst>
       <p:ext uri="{BB962C8B-B14F-4D97-AF65-F5344CB8AC3E}">
-        <p14:creationId xmlns:p14="http://schemas.microsoft.com/office/powerpoint/2010/main" val="3305643027"/>
+        <p14:creationId xmlns:p14="http://schemas.microsoft.com/office/powerpoint/2010/main" val="640723453"/>
       </p:ext>
     </p:extLst>
   </p:cSld>
@@ -6302,7 +7173,7 @@
         <p:spPr>
           <a:xfrm>
             <a:off x="863980" y="855015"/>
-            <a:ext cx="7213708" cy="2585323"/>
+            <a:ext cx="7213708" cy="923330"/>
           </a:xfrm>
           <a:prstGeom prst="rect">
             <a:avLst/>
@@ -6316,232 +7187,57 @@
           <a:p>
             <a:pPr algn="ctr"/>
             <a:r>
-              <a:rPr lang="en-US" sz="5400" b="1" dirty="0">
+              <a:rPr lang="en-US" sz="5400" b="1" dirty="0" smtClean="0">
                 <a:solidFill>
                   <a:srgbClr val="052B48"/>
                 </a:solidFill>
                 <a:latin typeface="Calibri"/>
                 <a:cs typeface="Calibri"/>
               </a:rPr>
-              <a:t>Adding/Removing Containers from an NWB File </a:t>
+              <a:t>Extending NWB</a:t>
             </a:r>
+            <a:endParaRPr lang="en-US" sz="5400" b="1" dirty="0">
+              <a:solidFill>
+                <a:srgbClr val="052B48"/>
+              </a:solidFill>
+              <a:latin typeface="Calibri"/>
+              <a:cs typeface="Calibri"/>
+            </a:endParaRPr>
           </a:p>
         </p:txBody>
       </p:sp>
-      <p:sp>
-        <p:nvSpPr>
-          <p:cNvPr id="3" name="Folded Corner 2"/>
-          <p:cNvSpPr/>
-          <p:nvPr/>
-        </p:nvSpPr>
-        <p:spPr>
-          <a:xfrm rot="10800000" flipH="1">
-            <a:off x="3839842" y="3460251"/>
-            <a:ext cx="1419941" cy="1900138"/>
-          </a:xfrm>
-          <a:prstGeom prst="foldedCorner">
-            <a:avLst>
-              <a:gd name="adj" fmla="val 26556"/>
-            </a:avLst>
-          </a:prstGeom>
-          <a:solidFill>
-            <a:srgbClr val="052A48"/>
-          </a:solidFill>
-          <a:ln w="28575" cmpd="sng">
-            <a:solidFill>
-              <a:schemeClr val="bg1"/>
-            </a:solidFill>
-          </a:ln>
-          <a:effectLst/>
-        </p:spPr>
-        <p:style>
-          <a:lnRef idx="1">
-            <a:schemeClr val="accent1"/>
-          </a:lnRef>
-          <a:fillRef idx="3">
-            <a:schemeClr val="accent1"/>
-          </a:fillRef>
-          <a:effectRef idx="2">
-            <a:schemeClr val="accent1"/>
-          </a:effectRef>
-          <a:fontRef idx="minor">
-            <a:schemeClr val="lt1"/>
-          </a:fontRef>
-        </p:style>
-        <p:txBody>
-          <a:bodyPr rtlCol="0" anchor="ctr"/>
-          <a:lstStyle/>
-          <a:p>
-            <a:pPr algn="ctr"/>
-            <a:r>
-              <a:rPr lang="en-US" u="sng" dirty="0"/>
-              <a:t>																			   </a:t>
-            </a:r>
-          </a:p>
-        </p:txBody>
-      </p:sp>
-      <p:sp>
-        <p:nvSpPr>
-          <p:cNvPr id="4" name="Oval 3"/>
-          <p:cNvSpPr/>
-          <p:nvPr/>
-        </p:nvSpPr>
+      <p:pic>
+        <p:nvPicPr>
+          <p:cNvPr id="2" name="Picture 1"/>
+          <p:cNvPicPr>
+            <a:picLocks noChangeAspect="1"/>
+          </p:cNvPicPr>
+          <p:nvPr/>
+        </p:nvPicPr>
+        <p:blipFill rotWithShape="1">
+          <a:blip r:embed="rId2"/>
+          <a:srcRect r="61780" b="9233"/>
+          <a:stretch/>
+        </p:blipFill>
         <p:spPr>
           <a:xfrm>
-            <a:off x="4939826" y="5048168"/>
-            <a:ext cx="579977" cy="601510"/>
-          </a:xfrm>
-          <a:prstGeom prst="ellipse">
-            <a:avLst/>
-          </a:prstGeom>
-          <a:solidFill>
-            <a:srgbClr val="052A48"/>
-          </a:solidFill>
-          <a:ln w="76200" cmpd="sng">
-            <a:solidFill>
-              <a:srgbClr val="FFFFFF"/>
-            </a:solidFill>
-          </a:ln>
-          <a:effectLst/>
-        </p:spPr>
-        <p:style>
-          <a:lnRef idx="1">
-            <a:schemeClr val="accent1"/>
-          </a:lnRef>
-          <a:fillRef idx="3">
-            <a:schemeClr val="accent1"/>
-          </a:fillRef>
-          <a:effectRef idx="2">
-            <a:schemeClr val="accent1"/>
-          </a:effectRef>
-          <a:fontRef idx="minor">
-            <a:schemeClr val="lt1"/>
-          </a:fontRef>
-        </p:style>
-        <p:txBody>
-          <a:bodyPr rtlCol="0" anchor="ctr"/>
-          <a:lstStyle/>
-          <a:p>
-            <a:endParaRPr lang="en-US" sz="4400" dirty="0"/>
-          </a:p>
-        </p:txBody>
-      </p:sp>
-      <p:sp>
-        <p:nvSpPr>
-          <p:cNvPr id="5" name="Rectangle 4"/>
-          <p:cNvSpPr/>
-          <p:nvPr/>
-        </p:nvSpPr>
-        <p:spPr>
-          <a:xfrm>
-            <a:off x="5013201" y="4804441"/>
-            <a:ext cx="415273" cy="923330"/>
+            <a:off x="2339904" y="1940847"/>
+            <a:ext cx="4329453" cy="3539553"/>
           </a:xfrm>
           <a:prstGeom prst="rect">
             <a:avLst/>
           </a:prstGeom>
-          <a:effectLst/>
-        </p:spPr>
-        <p:txBody>
-          <a:bodyPr wrap="none">
-            <a:spAutoFit/>
-          </a:bodyPr>
-          <a:lstStyle/>
-          <a:p>
-            <a:r>
-              <a:rPr lang="en-US" sz="5400" b="1" dirty="0">
-                <a:solidFill>
-                  <a:schemeClr val="bg1"/>
-                </a:solidFill>
-              </a:rPr>
-              <a:t>-</a:t>
-            </a:r>
-          </a:p>
-        </p:txBody>
-      </p:sp>
-      <p:sp>
-        <p:nvSpPr>
-          <p:cNvPr id="8" name="Oval 7"/>
-          <p:cNvSpPr/>
-          <p:nvPr/>
-        </p:nvSpPr>
-        <p:spPr>
-          <a:xfrm>
-            <a:off x="4942253" y="4360489"/>
-            <a:ext cx="579977" cy="601510"/>
-          </a:xfrm>
-          <a:prstGeom prst="ellipse">
-            <a:avLst/>
-          </a:prstGeom>
-          <a:solidFill>
-            <a:srgbClr val="052A48"/>
-          </a:solidFill>
-          <a:ln w="76200" cmpd="sng">
-            <a:solidFill>
-              <a:srgbClr val="FFFFFF"/>
-            </a:solidFill>
-          </a:ln>
-          <a:effectLst/>
-        </p:spPr>
-        <p:style>
-          <a:lnRef idx="1">
-            <a:schemeClr val="accent1"/>
-          </a:lnRef>
-          <a:fillRef idx="3">
-            <a:schemeClr val="accent1"/>
-          </a:fillRef>
-          <a:effectRef idx="2">
-            <a:schemeClr val="accent1"/>
-          </a:effectRef>
-          <a:fontRef idx="minor">
-            <a:schemeClr val="lt1"/>
-          </a:fontRef>
-        </p:style>
-        <p:txBody>
-          <a:bodyPr rtlCol="0" anchor="ctr"/>
-          <a:lstStyle/>
-          <a:p>
-            <a:endParaRPr lang="en-US" sz="4400" dirty="0"/>
-          </a:p>
-        </p:txBody>
-      </p:sp>
-      <p:sp>
-        <p:nvSpPr>
-          <p:cNvPr id="9" name="Rectangle 8"/>
-          <p:cNvSpPr/>
-          <p:nvPr/>
-        </p:nvSpPr>
-        <p:spPr>
-          <a:xfrm>
-            <a:off x="4975628" y="4256776"/>
-            <a:ext cx="514183" cy="769441"/>
-          </a:xfrm>
-          <a:prstGeom prst="rect">
-            <a:avLst/>
-          </a:prstGeom>
-          <a:effectLst/>
-        </p:spPr>
-        <p:txBody>
-          <a:bodyPr wrap="none">
-            <a:spAutoFit/>
-          </a:bodyPr>
-          <a:lstStyle/>
-          <a:p>
-            <a:r>
-              <a:rPr lang="en-US" sz="4400" b="1" dirty="0">
-                <a:solidFill>
-                  <a:schemeClr val="bg1"/>
-                </a:solidFill>
-              </a:rPr>
-              <a:t>+</a:t>
-            </a:r>
-          </a:p>
-        </p:txBody>
-      </p:sp>
+          <a:effectLst>
+            <a:glow rad="50800">
+              <a:srgbClr val="052A48"/>
+            </a:glow>
+          </a:effectLst>
+        </p:spPr>
+      </p:pic>
     </p:spTree>
     <p:extLst>
       <p:ext uri="{BB962C8B-B14F-4D97-AF65-F5344CB8AC3E}">
-        <p14:creationId xmlns:p14="http://schemas.microsoft.com/office/powerpoint/2010/main" val="3909940052"/>
+        <p14:creationId xmlns:p14="http://schemas.microsoft.com/office/powerpoint/2010/main" val="3305643027"/>
       </p:ext>
     </p:extLst>
   </p:cSld>
@@ -6626,7 +7322,7 @@
         <p:spPr>
           <a:xfrm>
             <a:off x="863980" y="855015"/>
-            <a:ext cx="7213708" cy="923330"/>
+            <a:ext cx="7213708" cy="2585323"/>
           </a:xfrm>
           <a:prstGeom prst="rect">
             <a:avLst/>
@@ -6640,28 +7336,35 @@
           <a:p>
             <a:pPr algn="ctr"/>
             <a:r>
-              <a:rPr lang="en-US" sz="5400" b="1" dirty="0">
+              <a:rPr lang="en-US" sz="5400" b="1" dirty="0" smtClean="0">
                 <a:solidFill>
                   <a:srgbClr val="052B48"/>
                 </a:solidFill>
                 <a:latin typeface="Calibri"/>
                 <a:cs typeface="Calibri"/>
               </a:rPr>
-              <a:t>NWB File Basics</a:t>
+              <a:t>Adding/Removing Containers from an NWB File </a:t>
             </a:r>
+            <a:endParaRPr lang="en-US" sz="5400" b="1" dirty="0">
+              <a:solidFill>
+                <a:srgbClr val="052B48"/>
+              </a:solidFill>
+              <a:latin typeface="Calibri"/>
+              <a:cs typeface="Calibri"/>
+            </a:endParaRPr>
           </a:p>
         </p:txBody>
       </p:sp>
       <p:sp>
         <p:nvSpPr>
-          <p:cNvPr id="13" name="Folded Corner 12"/>
+          <p:cNvPr id="3" name="Folded Corner 2"/>
           <p:cNvSpPr/>
           <p:nvPr/>
         </p:nvSpPr>
         <p:spPr>
           <a:xfrm rot="10800000" flipH="1">
-            <a:off x="3539854" y="2150156"/>
-            <a:ext cx="2489899" cy="3390248"/>
+            <a:off x="3839842" y="3460251"/>
+            <a:ext cx="1419941" cy="1900138"/>
           </a:xfrm>
           <a:prstGeom prst="foldedCorner">
             <a:avLst>
@@ -6671,7 +7374,7 @@
           <a:solidFill>
             <a:srgbClr val="052A48"/>
           </a:solidFill>
-          <a:ln w="38100" cmpd="sng">
+          <a:ln w="28575" cmpd="sng">
             <a:solidFill>
               <a:schemeClr val="bg1"/>
             </a:solidFill>
@@ -6698,32 +7401,33 @@
           <a:p>
             <a:pPr algn="ctr"/>
             <a:r>
-              <a:rPr lang="en-US" sz="2400" u="sng" dirty="0"/>
-              <a:t>																														   </a:t>
+              <a:rPr lang="en-US" u="sng" dirty="0" smtClean="0"/>
+              <a:t>																			   </a:t>
             </a:r>
+            <a:endParaRPr lang="en-US" u="sng" dirty="0"/>
           </a:p>
         </p:txBody>
       </p:sp>
       <p:sp>
         <p:nvSpPr>
-          <p:cNvPr id="15" name="Oval 14"/>
+          <p:cNvPr id="4" name="Oval 3"/>
           <p:cNvSpPr/>
           <p:nvPr/>
         </p:nvSpPr>
         <p:spPr>
           <a:xfrm>
-            <a:off x="2409917" y="1840138"/>
-            <a:ext cx="2478024" cy="2481818"/>
+            <a:off x="4939826" y="5048168"/>
+            <a:ext cx="579977" cy="601510"/>
           </a:xfrm>
           <a:prstGeom prst="ellipse">
             <a:avLst/>
           </a:prstGeom>
           <a:solidFill>
-            <a:schemeClr val="bg1"/>
+            <a:srgbClr val="052A48"/>
           </a:solidFill>
           <a:ln w="76200" cmpd="sng">
             <a:solidFill>
-              <a:srgbClr val="052A48"/>
+              <a:srgbClr val="FFFFFF"/>
             </a:solidFill>
           </a:ln>
           <a:effectLst/>
@@ -6750,40 +7454,122 @@
           </a:p>
         </p:txBody>
       </p:sp>
-      <p:pic>
-        <p:nvPicPr>
-          <p:cNvPr id="3" name="Picture 2" descr="logo_brain_transp_512x512.png"/>
-          <p:cNvPicPr>
-            <a:picLocks noChangeAspect="1"/>
-          </p:cNvPicPr>
-          <p:nvPr/>
-        </p:nvPicPr>
-        <p:blipFill>
-          <a:blip r:embed="rId2">
-            <a:extLst>
-              <a:ext uri="{28A0092B-C50C-407E-A947-70E740481C1C}">
-                <a14:useLocalDpi xmlns:a14="http://schemas.microsoft.com/office/drawing/2010/main" val="0"/>
-              </a:ext>
-            </a:extLst>
-          </a:blip>
-          <a:stretch>
-            <a:fillRect/>
-          </a:stretch>
-        </p:blipFill>
+      <p:sp>
+        <p:nvSpPr>
+          <p:cNvPr id="5" name="Rectangle 4"/>
+          <p:cNvSpPr/>
+          <p:nvPr/>
+        </p:nvSpPr>
         <p:spPr>
           <a:xfrm>
-            <a:off x="2642554" y="2065594"/>
-            <a:ext cx="2154717" cy="2154717"/>
+            <a:off x="5013201" y="4804441"/>
+            <a:ext cx="415273" cy="923330"/>
           </a:xfrm>
           <a:prstGeom prst="rect">
             <a:avLst/>
           </a:prstGeom>
-        </p:spPr>
-      </p:pic>
+          <a:effectLst/>
+        </p:spPr>
+        <p:txBody>
+          <a:bodyPr wrap="none">
+            <a:spAutoFit/>
+          </a:bodyPr>
+          <a:lstStyle/>
+          <a:p>
+            <a:r>
+              <a:rPr lang="en-US" sz="5400" b="1" dirty="0">
+                <a:solidFill>
+                  <a:schemeClr val="bg1"/>
+                </a:solidFill>
+              </a:rPr>
+              <a:t>-</a:t>
+            </a:r>
+          </a:p>
+        </p:txBody>
+      </p:sp>
+      <p:sp>
+        <p:nvSpPr>
+          <p:cNvPr id="8" name="Oval 7"/>
+          <p:cNvSpPr/>
+          <p:nvPr/>
+        </p:nvSpPr>
+        <p:spPr>
+          <a:xfrm>
+            <a:off x="4942253" y="4360489"/>
+            <a:ext cx="579977" cy="601510"/>
+          </a:xfrm>
+          <a:prstGeom prst="ellipse">
+            <a:avLst/>
+          </a:prstGeom>
+          <a:solidFill>
+            <a:srgbClr val="052A48"/>
+          </a:solidFill>
+          <a:ln w="76200" cmpd="sng">
+            <a:solidFill>
+              <a:srgbClr val="FFFFFF"/>
+            </a:solidFill>
+          </a:ln>
+          <a:effectLst/>
+        </p:spPr>
+        <p:style>
+          <a:lnRef idx="1">
+            <a:schemeClr val="accent1"/>
+          </a:lnRef>
+          <a:fillRef idx="3">
+            <a:schemeClr val="accent1"/>
+          </a:fillRef>
+          <a:effectRef idx="2">
+            <a:schemeClr val="accent1"/>
+          </a:effectRef>
+          <a:fontRef idx="minor">
+            <a:schemeClr val="lt1"/>
+          </a:fontRef>
+        </p:style>
+        <p:txBody>
+          <a:bodyPr rtlCol="0" anchor="ctr"/>
+          <a:lstStyle/>
+          <a:p>
+            <a:endParaRPr lang="en-US" sz="4400" dirty="0"/>
+          </a:p>
+        </p:txBody>
+      </p:sp>
+      <p:sp>
+        <p:nvSpPr>
+          <p:cNvPr id="9" name="Rectangle 8"/>
+          <p:cNvSpPr/>
+          <p:nvPr/>
+        </p:nvSpPr>
+        <p:spPr>
+          <a:xfrm>
+            <a:off x="4975628" y="4256776"/>
+            <a:ext cx="514183" cy="769441"/>
+          </a:xfrm>
+          <a:prstGeom prst="rect">
+            <a:avLst/>
+          </a:prstGeom>
+          <a:effectLst/>
+        </p:spPr>
+        <p:txBody>
+          <a:bodyPr wrap="none">
+            <a:spAutoFit/>
+          </a:bodyPr>
+          <a:lstStyle/>
+          <a:p>
+            <a:r>
+              <a:rPr lang="en-US" sz="4400" b="1" dirty="0">
+                <a:solidFill>
+                  <a:schemeClr val="bg1"/>
+                </a:solidFill>
+              </a:rPr>
+              <a:t>+</a:t>
+            </a:r>
+          </a:p>
+        </p:txBody>
+      </p:sp>
     </p:spTree>
     <p:extLst>
       <p:ext uri="{BB962C8B-B14F-4D97-AF65-F5344CB8AC3E}">
-        <p14:creationId xmlns:p14="http://schemas.microsoft.com/office/powerpoint/2010/main" val="1847033829"/>
+        <p14:creationId xmlns:p14="http://schemas.microsoft.com/office/powerpoint/2010/main" val="3909940052"/>
       </p:ext>
     </p:extLst>
   </p:cSld>
@@ -6868,7 +7654,7 @@
         <p:spPr>
           <a:xfrm>
             <a:off x="863980" y="855015"/>
-            <a:ext cx="7213708" cy="1754327"/>
+            <a:ext cx="7213708" cy="923330"/>
           </a:xfrm>
           <a:prstGeom prst="rect">
             <a:avLst/>
@@ -6882,15 +7668,22 @@
           <a:p>
             <a:pPr algn="ctr"/>
             <a:r>
-              <a:rPr lang="en-US" sz="5400" b="1" dirty="0">
+              <a:rPr lang="en-US" sz="5400" b="1" dirty="0" smtClean="0">
                 <a:solidFill>
                   <a:srgbClr val="052B48"/>
                 </a:solidFill>
                 <a:latin typeface="Calibri"/>
                 <a:cs typeface="Calibri"/>
               </a:rPr>
-              <a:t>Exploratory Data Analysis with NWB</a:t>
+              <a:t>NWB File Basics</a:t>
             </a:r>
+            <a:endParaRPr lang="en-US" sz="5400" b="1" dirty="0">
+              <a:solidFill>
+                <a:srgbClr val="052B48"/>
+              </a:solidFill>
+              <a:latin typeface="Calibri"/>
+              <a:cs typeface="Calibri"/>
+            </a:endParaRPr>
           </a:p>
         </p:txBody>
       </p:sp>
@@ -6902,8 +7695,8 @@
         </p:nvSpPr>
         <p:spPr>
           <a:xfrm rot="10800000" flipH="1">
-            <a:off x="3223450" y="2690195"/>
-            <a:ext cx="2526317" cy="2896081"/>
+            <a:off x="3539854" y="2150156"/>
+            <a:ext cx="2489899" cy="3390248"/>
           </a:xfrm>
           <a:prstGeom prst="foldedCorner">
             <a:avLst>
@@ -6940,9 +7733,260 @@
           <a:p>
             <a:pPr algn="ctr"/>
             <a:r>
-              <a:rPr lang="en-US" u="sng" dirty="0"/>
+              <a:rPr lang="en-US" sz="2400" u="sng" dirty="0" smtClean="0"/>
+              <a:t>																														   </a:t>
+            </a:r>
+            <a:endParaRPr lang="en-US" sz="2400" u="sng" dirty="0"/>
+          </a:p>
+        </p:txBody>
+      </p:sp>
+      <p:sp>
+        <p:nvSpPr>
+          <p:cNvPr id="15" name="Oval 14"/>
+          <p:cNvSpPr/>
+          <p:nvPr/>
+        </p:nvSpPr>
+        <p:spPr>
+          <a:xfrm>
+            <a:off x="2409917" y="1840138"/>
+            <a:ext cx="2478024" cy="2481818"/>
+          </a:xfrm>
+          <a:prstGeom prst="ellipse">
+            <a:avLst/>
+          </a:prstGeom>
+          <a:solidFill>
+            <a:schemeClr val="bg1"/>
+          </a:solidFill>
+          <a:ln w="76200" cmpd="sng">
+            <a:solidFill>
+              <a:srgbClr val="052A48"/>
+            </a:solidFill>
+          </a:ln>
+          <a:effectLst/>
+        </p:spPr>
+        <p:style>
+          <a:lnRef idx="1">
+            <a:schemeClr val="accent1"/>
+          </a:lnRef>
+          <a:fillRef idx="3">
+            <a:schemeClr val="accent1"/>
+          </a:fillRef>
+          <a:effectRef idx="2">
+            <a:schemeClr val="accent1"/>
+          </a:effectRef>
+          <a:fontRef idx="minor">
+            <a:schemeClr val="lt1"/>
+          </a:fontRef>
+        </p:style>
+        <p:txBody>
+          <a:bodyPr rtlCol="0" anchor="ctr"/>
+          <a:lstStyle/>
+          <a:p>
+            <a:endParaRPr lang="en-US" sz="4400" dirty="0"/>
+          </a:p>
+        </p:txBody>
+      </p:sp>
+      <p:pic>
+        <p:nvPicPr>
+          <p:cNvPr id="3" name="Picture 2" descr="logo_brain_transp_512x512.png"/>
+          <p:cNvPicPr>
+            <a:picLocks noChangeAspect="1"/>
+          </p:cNvPicPr>
+          <p:nvPr/>
+        </p:nvPicPr>
+        <p:blipFill>
+          <a:blip r:embed="rId2">
+            <a:extLst>
+              <a:ext uri="{28A0092B-C50C-407E-A947-70E740481C1C}">
+                <a14:useLocalDpi xmlns:a14="http://schemas.microsoft.com/office/drawing/2010/main" val="0"/>
+              </a:ext>
+            </a:extLst>
+          </a:blip>
+          <a:stretch>
+            <a:fillRect/>
+          </a:stretch>
+        </p:blipFill>
+        <p:spPr>
+          <a:xfrm>
+            <a:off x="2642554" y="2065594"/>
+            <a:ext cx="2154717" cy="2154717"/>
+          </a:xfrm>
+          <a:prstGeom prst="rect">
+            <a:avLst/>
+          </a:prstGeom>
+        </p:spPr>
+      </p:pic>
+    </p:spTree>
+    <p:extLst>
+      <p:ext uri="{BB962C8B-B14F-4D97-AF65-F5344CB8AC3E}">
+        <p14:creationId xmlns:p14="http://schemas.microsoft.com/office/powerpoint/2010/main" val="1847033829"/>
+      </p:ext>
+    </p:extLst>
+  </p:cSld>
+  <p:clrMapOvr>
+    <a:masterClrMapping/>
+  </p:clrMapOvr>
+</p:sld>
+</file>
+
+<file path=ppt/slides/slide17.xml><?xml version="1.0" encoding="utf-8"?>
+<p:sld xmlns:a="http://schemas.openxmlformats.org/drawingml/2006/main" xmlns:r="http://schemas.openxmlformats.org/officeDocument/2006/relationships" xmlns:p="http://schemas.openxmlformats.org/presentationml/2006/main">
+  <p:cSld>
+    <p:spTree>
+      <p:nvGrpSpPr>
+        <p:cNvPr id="1" name=""/>
+        <p:cNvGrpSpPr/>
+        <p:nvPr/>
+      </p:nvGrpSpPr>
+      <p:grpSpPr>
+        <a:xfrm>
+          <a:off x="0" y="0"/>
+          <a:ext cx="0" cy="0"/>
+          <a:chOff x="0" y="0"/>
+          <a:chExt cx="0" cy="0"/>
+        </a:xfrm>
+      </p:grpSpPr>
+      <p:sp>
+        <p:nvSpPr>
+          <p:cNvPr id="27" name="Rounded Rectangle 26"/>
+          <p:cNvSpPr/>
+          <p:nvPr/>
+        </p:nvSpPr>
+        <p:spPr>
+          <a:xfrm>
+            <a:off x="853570" y="853671"/>
+            <a:ext cx="7234527" cy="4851352"/>
+          </a:xfrm>
+          <a:prstGeom prst="roundRect">
+            <a:avLst>
+              <a:gd name="adj" fmla="val 4437"/>
+            </a:avLst>
+          </a:prstGeom>
+          <a:solidFill>
+            <a:srgbClr val="EDEDED"/>
+          </a:solidFill>
+          <a:ln>
+            <a:solidFill>
+              <a:srgbClr val="000000"/>
+            </a:solidFill>
+          </a:ln>
+          <a:effectLst/>
+        </p:spPr>
+        <p:style>
+          <a:lnRef idx="1">
+            <a:schemeClr val="accent1"/>
+          </a:lnRef>
+          <a:fillRef idx="3">
+            <a:schemeClr val="accent1"/>
+          </a:fillRef>
+          <a:effectRef idx="2">
+            <a:schemeClr val="accent1"/>
+          </a:effectRef>
+          <a:fontRef idx="minor">
+            <a:schemeClr val="lt1"/>
+          </a:fontRef>
+        </p:style>
+        <p:txBody>
+          <a:bodyPr rtlCol="0" anchor="ctr"/>
+          <a:lstStyle/>
+          <a:p>
+            <a:pPr algn="ctr"/>
+            <a:endParaRPr lang="en-US"/>
+          </a:p>
+        </p:txBody>
+      </p:sp>
+      <p:sp>
+        <p:nvSpPr>
+          <p:cNvPr id="26" name="Rectangle 25"/>
+          <p:cNvSpPr/>
+          <p:nvPr/>
+        </p:nvSpPr>
+        <p:spPr>
+          <a:xfrm>
+            <a:off x="863980" y="855015"/>
+            <a:ext cx="7213708" cy="1754327"/>
+          </a:xfrm>
+          <a:prstGeom prst="rect">
+            <a:avLst/>
+          </a:prstGeom>
+        </p:spPr>
+        <p:txBody>
+          <a:bodyPr wrap="square">
+            <a:spAutoFit/>
+          </a:bodyPr>
+          <a:lstStyle/>
+          <a:p>
+            <a:pPr algn="ctr"/>
+            <a:r>
+              <a:rPr lang="en-US" sz="5400" b="1" dirty="0" smtClean="0">
+                <a:solidFill>
+                  <a:srgbClr val="052B48"/>
+                </a:solidFill>
+                <a:latin typeface="Calibri"/>
+                <a:cs typeface="Calibri"/>
+              </a:rPr>
+              <a:t>Exploratory Data Analysis with NWB</a:t>
+            </a:r>
+            <a:endParaRPr lang="en-US" sz="5400" b="1" dirty="0">
+              <a:solidFill>
+                <a:srgbClr val="052B48"/>
+              </a:solidFill>
+              <a:latin typeface="Calibri"/>
+              <a:cs typeface="Calibri"/>
+            </a:endParaRPr>
+          </a:p>
+        </p:txBody>
+      </p:sp>
+      <p:sp>
+        <p:nvSpPr>
+          <p:cNvPr id="13" name="Folded Corner 12"/>
+          <p:cNvSpPr/>
+          <p:nvPr/>
+        </p:nvSpPr>
+        <p:spPr>
+          <a:xfrm rot="10800000" flipH="1">
+            <a:off x="3223450" y="2690195"/>
+            <a:ext cx="2526317" cy="2896081"/>
+          </a:xfrm>
+          <a:prstGeom prst="foldedCorner">
+            <a:avLst>
+              <a:gd name="adj" fmla="val 26556"/>
+            </a:avLst>
+          </a:prstGeom>
+          <a:solidFill>
+            <a:srgbClr val="052A48"/>
+          </a:solidFill>
+          <a:ln w="38100" cmpd="sng">
+            <a:solidFill>
+              <a:schemeClr val="bg1"/>
+            </a:solidFill>
+          </a:ln>
+          <a:effectLst/>
+        </p:spPr>
+        <p:style>
+          <a:lnRef idx="1">
+            <a:schemeClr val="accent1"/>
+          </a:lnRef>
+          <a:fillRef idx="3">
+            <a:schemeClr val="accent1"/>
+          </a:fillRef>
+          <a:effectRef idx="2">
+            <a:schemeClr val="accent1"/>
+          </a:effectRef>
+          <a:fontRef idx="minor">
+            <a:schemeClr val="lt1"/>
+          </a:fontRef>
+        </p:style>
+        <p:txBody>
+          <a:bodyPr rtlCol="0" anchor="ctr"/>
+          <a:lstStyle/>
+          <a:p>
+            <a:pPr algn="ctr"/>
+            <a:r>
+              <a:rPr lang="en-US" u="sng" dirty="0" smtClean="0"/>
               <a:t>																					   </a:t>
             </a:r>
+            <a:endParaRPr lang="en-US" u="sng" dirty="0"/>
           </a:p>
         </p:txBody>
       </p:sp>
@@ -7062,7 +8106,7 @@
           <a:lstStyle/>
           <a:p>
             <a:r>
-              <a:rPr lang="en-US" sz="3800" b="1" dirty="0">
+              <a:rPr lang="en-US" sz="3800" b="1" dirty="0" smtClean="0">
                 <a:solidFill>
                   <a:schemeClr val="bg1"/>
                 </a:solidFill>
@@ -7071,6 +8115,13 @@
               </a:rPr>
               <a:t>/scratch</a:t>
             </a:r>
+            <a:endParaRPr lang="en-US" sz="3800" b="1" dirty="0">
+              <a:solidFill>
+                <a:schemeClr val="bg1"/>
+              </a:solidFill>
+              <a:latin typeface="Courier"/>
+              <a:cs typeface="Courier"/>
+            </a:endParaRPr>
           </a:p>
         </p:txBody>
       </p:sp>
@@ -7078,916 +8129,6 @@
     <p:extLst>
       <p:ext uri="{BB962C8B-B14F-4D97-AF65-F5344CB8AC3E}">
         <p14:creationId xmlns:p14="http://schemas.microsoft.com/office/powerpoint/2010/main" val="122021392"/>
-      </p:ext>
-    </p:extLst>
-  </p:cSld>
-  <p:clrMapOvr>
-    <a:masterClrMapping/>
-  </p:clrMapOvr>
-</p:sld>
-</file>
-
-<file path=ppt/slides/slide17.xml><?xml version="1.0" encoding="utf-8"?>
-<p:sld xmlns:a="http://schemas.openxmlformats.org/drawingml/2006/main" xmlns:r="http://schemas.openxmlformats.org/officeDocument/2006/relationships" xmlns:p="http://schemas.openxmlformats.org/presentationml/2006/main">
-  <p:cSld>
-    <p:spTree>
-      <p:nvGrpSpPr>
-        <p:cNvPr id="1" name=""/>
-        <p:cNvGrpSpPr/>
-        <p:nvPr/>
-      </p:nvGrpSpPr>
-      <p:grpSpPr>
-        <a:xfrm>
-          <a:off x="0" y="0"/>
-          <a:ext cx="0" cy="0"/>
-          <a:chOff x="0" y="0"/>
-          <a:chExt cx="0" cy="0"/>
-        </a:xfrm>
-      </p:grpSpPr>
-      <p:sp>
-        <p:nvSpPr>
-          <p:cNvPr id="27" name="Rounded Rectangle 26"/>
-          <p:cNvSpPr/>
-          <p:nvPr/>
-        </p:nvSpPr>
-        <p:spPr>
-          <a:xfrm>
-            <a:off x="853570" y="853671"/>
-            <a:ext cx="7234527" cy="4851352"/>
-          </a:xfrm>
-          <a:prstGeom prst="roundRect">
-            <a:avLst>
-              <a:gd name="adj" fmla="val 4437"/>
-            </a:avLst>
-          </a:prstGeom>
-          <a:solidFill>
-            <a:srgbClr val="EDEDED"/>
-          </a:solidFill>
-          <a:ln>
-            <a:solidFill>
-              <a:srgbClr val="000000"/>
-            </a:solidFill>
-          </a:ln>
-          <a:effectLst/>
-        </p:spPr>
-        <p:style>
-          <a:lnRef idx="1">
-            <a:schemeClr val="accent1"/>
-          </a:lnRef>
-          <a:fillRef idx="3">
-            <a:schemeClr val="accent1"/>
-          </a:fillRef>
-          <a:effectRef idx="2">
-            <a:schemeClr val="accent1"/>
-          </a:effectRef>
-          <a:fontRef idx="minor">
-            <a:schemeClr val="lt1"/>
-          </a:fontRef>
-        </p:style>
-        <p:txBody>
-          <a:bodyPr rtlCol="0" anchor="ctr"/>
-          <a:lstStyle/>
-          <a:p>
-            <a:pPr algn="ctr"/>
-            <a:endParaRPr lang="en-US"/>
-          </a:p>
-        </p:txBody>
-      </p:sp>
-      <p:sp>
-        <p:nvSpPr>
-          <p:cNvPr id="26" name="Rectangle 25"/>
-          <p:cNvSpPr/>
-          <p:nvPr/>
-        </p:nvSpPr>
-        <p:spPr>
-          <a:xfrm>
-            <a:off x="863980" y="855015"/>
-            <a:ext cx="7213708" cy="923330"/>
-          </a:xfrm>
-          <a:prstGeom prst="rect">
-            <a:avLst/>
-          </a:prstGeom>
-        </p:spPr>
-        <p:txBody>
-          <a:bodyPr wrap="square">
-            <a:spAutoFit/>
-          </a:bodyPr>
-          <a:lstStyle/>
-          <a:p>
-            <a:pPr algn="ctr"/>
-            <a:r>
-              <a:rPr lang="en-US" sz="5400" b="1" dirty="0">
-                <a:solidFill>
-                  <a:srgbClr val="052B48"/>
-                </a:solidFill>
-                <a:latin typeface="Calibri"/>
-                <a:cs typeface="Calibri"/>
-              </a:rPr>
-              <a:t>Behavior Data</a:t>
-            </a:r>
-          </a:p>
-        </p:txBody>
-      </p:sp>
-      <p:pic>
-        <p:nvPicPr>
-          <p:cNvPr id="7" name="Graphic 6" descr="Rat with solid fill">
-            <a:extLst>
-              <a:ext uri="{FF2B5EF4-FFF2-40B4-BE49-F238E27FC236}">
-                <a16:creationId xmlns:a16="http://schemas.microsoft.com/office/drawing/2014/main" id="{89ADF108-F3A3-A64C-A232-F1CEDB204E81}"/>
-              </a:ext>
-            </a:extLst>
-          </p:cNvPr>
-          <p:cNvPicPr>
-            <a:picLocks noChangeAspect="1"/>
-          </p:cNvPicPr>
-          <p:nvPr/>
-        </p:nvPicPr>
-        <p:blipFill rotWithShape="1">
-          <a:blip r:embed="rId2">
-            <a:extLst>
-              <a:ext uri="{28A0092B-C50C-407E-A947-70E740481C1C}">
-                <a14:useLocalDpi xmlns:a14="http://schemas.microsoft.com/office/drawing/2010/main" val="0"/>
-              </a:ext>
-              <a:ext uri="{96DAC541-7B7A-43D3-8B79-37D633B846F1}">
-                <asvg:svgBlip xmlns:asvg="http://schemas.microsoft.com/office/drawing/2016/SVG/main" r:embed="rId3"/>
-              </a:ext>
-            </a:extLst>
-          </a:blip>
-          <a:srcRect b="23361"/>
-          <a:stretch/>
-        </p:blipFill>
-        <p:spPr>
-          <a:xfrm>
-            <a:off x="2129958" y="3054626"/>
-            <a:ext cx="3200800" cy="2453047"/>
-          </a:xfrm>
-          <a:prstGeom prst="rect">
-            <a:avLst/>
-          </a:prstGeom>
-        </p:spPr>
-      </p:pic>
-      <p:pic>
-        <p:nvPicPr>
-          <p:cNvPr id="15" name="Graphic 14" descr="Rat with solid fill">
-            <a:extLst>
-              <a:ext uri="{FF2B5EF4-FFF2-40B4-BE49-F238E27FC236}">
-                <a16:creationId xmlns:a16="http://schemas.microsoft.com/office/drawing/2014/main" id="{C8A3EC6B-7CFD-3A41-A99F-A004CFA9D4DE}"/>
-              </a:ext>
-            </a:extLst>
-          </p:cNvPr>
-          <p:cNvPicPr>
-            <a:picLocks noChangeAspect="1"/>
-          </p:cNvPicPr>
-          <p:nvPr/>
-        </p:nvPicPr>
-        <p:blipFill>
-          <a:blip r:embed="rId2">
-            <a:extLst>
-              <a:ext uri="{28A0092B-C50C-407E-A947-70E740481C1C}">
-                <a14:useLocalDpi xmlns:a14="http://schemas.microsoft.com/office/drawing/2010/main" val="0"/>
-              </a:ext>
-              <a:ext uri="{96DAC541-7B7A-43D3-8B79-37D633B846F1}">
-                <asvg:svgBlip xmlns:asvg="http://schemas.microsoft.com/office/drawing/2016/SVG/main" r:embed="rId3"/>
-              </a:ext>
-            </a:extLst>
-          </a:blip>
-          <a:stretch>
-            <a:fillRect/>
-          </a:stretch>
-        </p:blipFill>
-        <p:spPr>
-          <a:xfrm>
-            <a:off x="5809721" y="1721797"/>
-            <a:ext cx="2191030" cy="2191030"/>
-          </a:xfrm>
-          <a:prstGeom prst="rect">
-            <a:avLst/>
-          </a:prstGeom>
-        </p:spPr>
-      </p:pic>
-      <p:pic>
-        <p:nvPicPr>
-          <p:cNvPr id="16" name="Graphic 15" descr="Rat with solid fill">
-            <a:extLst>
-              <a:ext uri="{FF2B5EF4-FFF2-40B4-BE49-F238E27FC236}">
-                <a16:creationId xmlns:a16="http://schemas.microsoft.com/office/drawing/2014/main" id="{A3CDCCE2-0ED0-FB42-B520-1BD237ED81F7}"/>
-              </a:ext>
-            </a:extLst>
-          </p:cNvPr>
-          <p:cNvPicPr>
-            <a:picLocks noChangeAspect="1"/>
-          </p:cNvPicPr>
-          <p:nvPr/>
-        </p:nvPicPr>
-        <p:blipFill>
-          <a:blip r:embed="rId2">
-            <a:extLst>
-              <a:ext uri="{28A0092B-C50C-407E-A947-70E740481C1C}">
-                <a14:useLocalDpi xmlns:a14="http://schemas.microsoft.com/office/drawing/2010/main" val="0"/>
-              </a:ext>
-              <a:ext uri="{96DAC541-7B7A-43D3-8B79-37D633B846F1}">
-                <asvg:svgBlip xmlns:asvg="http://schemas.microsoft.com/office/drawing/2016/SVG/main" r:embed="rId3"/>
-              </a:ext>
-            </a:extLst>
-          </a:blip>
-          <a:stretch>
-            <a:fillRect/>
-          </a:stretch>
-        </p:blipFill>
-        <p:spPr>
-          <a:xfrm>
-            <a:off x="1038201" y="1434875"/>
-            <a:ext cx="1912903" cy="1912903"/>
-          </a:xfrm>
-          <a:prstGeom prst="rect">
-            <a:avLst/>
-          </a:prstGeom>
-        </p:spPr>
-      </p:pic>
-      <p:sp>
-        <p:nvSpPr>
-          <p:cNvPr id="13" name="Freeform 12">
-            <a:extLst>
-              <a:ext uri="{FF2B5EF4-FFF2-40B4-BE49-F238E27FC236}">
-                <a16:creationId xmlns:a16="http://schemas.microsoft.com/office/drawing/2014/main" id="{19130C81-02F2-4542-B1DF-0E7BC45F4E03}"/>
-              </a:ext>
-            </a:extLst>
-          </p:cNvPr>
-          <p:cNvSpPr/>
-          <p:nvPr/>
-        </p:nvSpPr>
-        <p:spPr>
-          <a:xfrm>
-            <a:off x="1612083" y="2490281"/>
-            <a:ext cx="1842180" cy="2305456"/>
-          </a:xfrm>
-          <a:custGeom>
-            <a:avLst/>
-            <a:gdLst>
-              <a:gd name="connsiteX0" fmla="*/ 1206606 w 1842180"/>
-              <a:gd name="connsiteY0" fmla="*/ 0 h 2305456"/>
-              <a:gd name="connsiteX1" fmla="*/ 1789881 w 1842180"/>
-              <a:gd name="connsiteY1" fmla="*/ 403720 h 2305456"/>
-              <a:gd name="connsiteX2" fmla="*/ 31480 w 1842180"/>
-              <a:gd name="connsiteY2" fmla="*/ 1614881 h 2305456"/>
-              <a:gd name="connsiteX3" fmla="*/ 829193 w 1842180"/>
-              <a:gd name="connsiteY3" fmla="*/ 2305456 h 2305456"/>
-            </a:gdLst>
-            <a:ahLst/>
-            <a:cxnLst>
-              <a:cxn ang="0">
-                <a:pos x="connsiteX0" y="connsiteY0"/>
-              </a:cxn>
-              <a:cxn ang="0">
-                <a:pos x="connsiteX1" y="connsiteY1"/>
-              </a:cxn>
-              <a:cxn ang="0">
-                <a:pos x="connsiteX2" y="connsiteY2"/>
-              </a:cxn>
-              <a:cxn ang="0">
-                <a:pos x="connsiteX3" y="connsiteY3"/>
-              </a:cxn>
-            </a:cxnLst>
-            <a:rect l="l" t="t" r="r" b="b"/>
-            <a:pathLst>
-              <a:path w="1842180" h="2305456" extrusionOk="0">
-                <a:moveTo>
-                  <a:pt x="1206606" y="0"/>
-                </a:moveTo>
-                <a:cubicBezTo>
-                  <a:pt x="1542487" y="34173"/>
-                  <a:pt x="1974980" y="138610"/>
-                  <a:pt x="1789881" y="403720"/>
-                </a:cubicBezTo>
-                <a:cubicBezTo>
-                  <a:pt x="1692452" y="693588"/>
-                  <a:pt x="110981" y="1300489"/>
-                  <a:pt x="31480" y="1614881"/>
-                </a:cubicBezTo>
-                <a:cubicBezTo>
-                  <a:pt x="-233304" y="2034052"/>
-                  <a:pt x="324939" y="2258709"/>
-                  <a:pt x="829193" y="2305456"/>
-                </a:cubicBezTo>
-              </a:path>
-            </a:pathLst>
-          </a:custGeom>
-          <a:noFill/>
-          <a:ln w="57150">
-            <a:solidFill>
-              <a:schemeClr val="accent2">
-                <a:lumMod val="75000"/>
-              </a:schemeClr>
-            </a:solidFill>
-            <a:prstDash val="dash"/>
-            <a:extLst>
-              <a:ext uri="{C807C97D-BFC1-408E-A445-0C87EB9F89A2}">
-                <ask:lineSketchStyleProps xmlns:ask="http://schemas.microsoft.com/office/drawing/2018/sketchyshapes" sd="1219033472">
-                  <a:custGeom>
-                    <a:avLst/>
-                    <a:gdLst>
-                      <a:gd name="connsiteX0" fmla="*/ 1368390 w 2089182"/>
-                      <a:gd name="connsiteY0" fmla="*/ 0 h 2110902"/>
-                      <a:gd name="connsiteX1" fmla="*/ 2029871 w 2089182"/>
-                      <a:gd name="connsiteY1" fmla="*/ 369651 h 2110902"/>
-                      <a:gd name="connsiteX2" fmla="*/ 35701 w 2089182"/>
-                      <a:gd name="connsiteY2" fmla="*/ 1478604 h 2110902"/>
-                      <a:gd name="connsiteX3" fmla="*/ 940373 w 2089182"/>
-                      <a:gd name="connsiteY3" fmla="*/ 2110902 h 2110902"/>
-                    </a:gdLst>
-                    <a:ahLst/>
-                    <a:cxnLst>
-                      <a:cxn ang="0">
-                        <a:pos x="connsiteX0" y="connsiteY0"/>
-                      </a:cxn>
-                      <a:cxn ang="0">
-                        <a:pos x="connsiteX1" y="connsiteY1"/>
-                      </a:cxn>
-                      <a:cxn ang="0">
-                        <a:pos x="connsiteX2" y="connsiteY2"/>
-                      </a:cxn>
-                      <a:cxn ang="0">
-                        <a:pos x="connsiteX3" y="connsiteY3"/>
-                      </a:cxn>
-                    </a:cxnLst>
-                    <a:rect l="l" t="t" r="r" b="b"/>
-                    <a:pathLst>
-                      <a:path w="2089182" h="2110902">
-                        <a:moveTo>
-                          <a:pt x="1368390" y="0"/>
-                        </a:moveTo>
-                        <a:cubicBezTo>
-                          <a:pt x="1810188" y="61608"/>
-                          <a:pt x="2251986" y="123217"/>
-                          <a:pt x="2029871" y="369651"/>
-                        </a:cubicBezTo>
-                        <a:cubicBezTo>
-                          <a:pt x="1807756" y="616085"/>
-                          <a:pt x="217284" y="1188396"/>
-                          <a:pt x="35701" y="1478604"/>
-                        </a:cubicBezTo>
-                        <a:cubicBezTo>
-                          <a:pt x="-145882" y="1768813"/>
-                          <a:pt x="397245" y="1939857"/>
-                          <a:pt x="940373" y="2110902"/>
-                        </a:cubicBezTo>
-                      </a:path>
-                    </a:pathLst>
-                  </a:custGeom>
-                  <ask:type>
-                    <ask:lineSketchScribble/>
-                  </ask:type>
-                </ask:lineSketchStyleProps>
-              </a:ext>
-            </a:extLst>
-          </a:ln>
-        </p:spPr>
-        <p:style>
-          <a:lnRef idx="2">
-            <a:schemeClr val="accent1">
-              <a:shade val="50000"/>
-            </a:schemeClr>
-          </a:lnRef>
-          <a:fillRef idx="1">
-            <a:schemeClr val="accent1"/>
-          </a:fillRef>
-          <a:effectRef idx="0">
-            <a:schemeClr val="accent1"/>
-          </a:effectRef>
-          <a:fontRef idx="minor">
-            <a:schemeClr val="lt1"/>
-          </a:fontRef>
-        </p:style>
-        <p:txBody>
-          <a:bodyPr rtlCol="0" anchor="ctr"/>
-          <a:lstStyle/>
-          <a:p>
-            <a:pPr algn="ctr"/>
-            <a:endParaRPr lang="en-US"/>
-          </a:p>
-        </p:txBody>
-      </p:sp>
-      <p:sp>
-        <p:nvSpPr>
-          <p:cNvPr id="14" name="Freeform 13">
-            <a:extLst>
-              <a:ext uri="{FF2B5EF4-FFF2-40B4-BE49-F238E27FC236}">
-                <a16:creationId xmlns:a16="http://schemas.microsoft.com/office/drawing/2014/main" id="{F120426E-49A9-CC4A-BF42-6C4093DE209A}"/>
-              </a:ext>
-            </a:extLst>
-          </p:cNvPr>
-          <p:cNvSpPr/>
-          <p:nvPr/>
-        </p:nvSpPr>
-        <p:spPr>
-          <a:xfrm>
-            <a:off x="5097294" y="3064214"/>
-            <a:ext cx="894945" cy="1702340"/>
-          </a:xfrm>
-          <a:custGeom>
-            <a:avLst/>
-            <a:gdLst>
-              <a:gd name="connsiteX0" fmla="*/ 0 w 894945"/>
-              <a:gd name="connsiteY0" fmla="*/ 1702340 h 1702340"/>
-              <a:gd name="connsiteX1" fmla="*/ 885217 w 894945"/>
-              <a:gd name="connsiteY1" fmla="*/ 1478604 h 1702340"/>
-              <a:gd name="connsiteX2" fmla="*/ 126460 w 894945"/>
-              <a:gd name="connsiteY2" fmla="*/ 554476 h 1702340"/>
-              <a:gd name="connsiteX3" fmla="*/ 894945 w 894945"/>
-              <a:gd name="connsiteY3" fmla="*/ 0 h 1702340"/>
-              <a:gd name="connsiteX4" fmla="*/ 894945 w 894945"/>
-              <a:gd name="connsiteY4" fmla="*/ 0 h 1702340"/>
-            </a:gdLst>
-            <a:ahLst/>
-            <a:cxnLst>
-              <a:cxn ang="0">
-                <a:pos x="connsiteX0" y="connsiteY0"/>
-              </a:cxn>
-              <a:cxn ang="0">
-                <a:pos x="connsiteX1" y="connsiteY1"/>
-              </a:cxn>
-              <a:cxn ang="0">
-                <a:pos x="connsiteX2" y="connsiteY2"/>
-              </a:cxn>
-              <a:cxn ang="0">
-                <a:pos x="connsiteX3" y="connsiteY3"/>
-              </a:cxn>
-              <a:cxn ang="0">
-                <a:pos x="connsiteX4" y="connsiteY4"/>
-              </a:cxn>
-            </a:cxnLst>
-            <a:rect l="l" t="t" r="r" b="b"/>
-            <a:pathLst>
-              <a:path w="894945" h="1702340">
-                <a:moveTo>
-                  <a:pt x="0" y="1702340"/>
-                </a:moveTo>
-                <a:cubicBezTo>
-                  <a:pt x="432070" y="1686127"/>
-                  <a:pt x="864140" y="1669915"/>
-                  <a:pt x="885217" y="1478604"/>
-                </a:cubicBezTo>
-                <a:cubicBezTo>
-                  <a:pt x="906294" y="1287293"/>
-                  <a:pt x="124839" y="800910"/>
-                  <a:pt x="126460" y="554476"/>
-                </a:cubicBezTo>
-                <a:cubicBezTo>
-                  <a:pt x="128081" y="308042"/>
-                  <a:pt x="894945" y="0"/>
-                  <a:pt x="894945" y="0"/>
-                </a:cubicBezTo>
-                <a:lnTo>
-                  <a:pt x="894945" y="0"/>
-                </a:lnTo>
-              </a:path>
-            </a:pathLst>
-          </a:custGeom>
-          <a:noFill/>
-          <a:ln w="57150">
-            <a:solidFill>
-              <a:schemeClr val="accent2">
-                <a:lumMod val="75000"/>
-              </a:schemeClr>
-            </a:solidFill>
-            <a:prstDash val="dash"/>
-            <a:headEnd type="none" w="med" len="med"/>
-            <a:tailEnd type="triangle" w="lg" len="lg"/>
-          </a:ln>
-        </p:spPr>
-        <p:style>
-          <a:lnRef idx="2">
-            <a:schemeClr val="accent1">
-              <a:shade val="50000"/>
-            </a:schemeClr>
-          </a:lnRef>
-          <a:fillRef idx="1">
-            <a:schemeClr val="accent1"/>
-          </a:fillRef>
-          <a:effectRef idx="0">
-            <a:schemeClr val="accent1"/>
-          </a:effectRef>
-          <a:fontRef idx="minor">
-            <a:schemeClr val="lt1"/>
-          </a:fontRef>
-        </p:style>
-        <p:txBody>
-          <a:bodyPr rtlCol="0" anchor="ctr"/>
-          <a:lstStyle/>
-          <a:p>
-            <a:pPr algn="ctr"/>
-            <a:endParaRPr lang="en-US"/>
-          </a:p>
-        </p:txBody>
-      </p:sp>
-    </p:spTree>
-    <p:extLst>
-      <p:ext uri="{BB962C8B-B14F-4D97-AF65-F5344CB8AC3E}">
-        <p14:creationId xmlns:p14="http://schemas.microsoft.com/office/powerpoint/2010/main" val="1104418864"/>
-      </p:ext>
-    </p:extLst>
-  </p:cSld>
-  <p:clrMapOvr>
-    <a:masterClrMapping/>
-  </p:clrMapOvr>
-</p:sld>
-</file>
-
-<file path=ppt/slides/slide18.xml><?xml version="1.0" encoding="utf-8"?>
-<p:sld xmlns:a="http://schemas.openxmlformats.org/drawingml/2006/main" xmlns:r="http://schemas.openxmlformats.org/officeDocument/2006/relationships" xmlns:p="http://schemas.openxmlformats.org/presentationml/2006/main">
-  <p:cSld>
-    <p:spTree>
-      <p:nvGrpSpPr>
-        <p:cNvPr id="1" name=""/>
-        <p:cNvGrpSpPr/>
-        <p:nvPr/>
-      </p:nvGrpSpPr>
-      <p:grpSpPr>
-        <a:xfrm>
-          <a:off x="0" y="0"/>
-          <a:ext cx="0" cy="0"/>
-          <a:chOff x="0" y="0"/>
-          <a:chExt cx="0" cy="0"/>
-        </a:xfrm>
-      </p:grpSpPr>
-      <p:sp>
-        <p:nvSpPr>
-          <p:cNvPr id="27" name="Rounded Rectangle 26"/>
-          <p:cNvSpPr/>
-          <p:nvPr/>
-        </p:nvSpPr>
-        <p:spPr>
-          <a:xfrm>
-            <a:off x="853570" y="853671"/>
-            <a:ext cx="7234527" cy="4851352"/>
-          </a:xfrm>
-          <a:prstGeom prst="roundRect">
-            <a:avLst>
-              <a:gd name="adj" fmla="val 4437"/>
-            </a:avLst>
-          </a:prstGeom>
-          <a:solidFill>
-            <a:srgbClr val="EDEDED"/>
-          </a:solidFill>
-          <a:ln>
-            <a:solidFill>
-              <a:srgbClr val="000000"/>
-            </a:solidFill>
-          </a:ln>
-          <a:effectLst/>
-        </p:spPr>
-        <p:style>
-          <a:lnRef idx="1">
-            <a:schemeClr val="accent1"/>
-          </a:lnRef>
-          <a:fillRef idx="3">
-            <a:schemeClr val="accent1"/>
-          </a:fillRef>
-          <a:effectRef idx="2">
-            <a:schemeClr val="accent1"/>
-          </a:effectRef>
-          <a:fontRef idx="minor">
-            <a:schemeClr val="lt1"/>
-          </a:fontRef>
-        </p:style>
-        <p:txBody>
-          <a:bodyPr rtlCol="0" anchor="ctr"/>
-          <a:lstStyle/>
-          <a:p>
-            <a:pPr algn="ctr"/>
-            <a:endParaRPr lang="en-US"/>
-          </a:p>
-        </p:txBody>
-      </p:sp>
-      <p:sp>
-        <p:nvSpPr>
-          <p:cNvPr id="26" name="Rectangle 25"/>
-          <p:cNvSpPr/>
-          <p:nvPr/>
-        </p:nvSpPr>
-        <p:spPr>
-          <a:xfrm>
-            <a:off x="863980" y="855015"/>
-            <a:ext cx="7213708" cy="1754326"/>
-          </a:xfrm>
-          <a:prstGeom prst="rect">
-            <a:avLst/>
-          </a:prstGeom>
-        </p:spPr>
-        <p:txBody>
-          <a:bodyPr wrap="square">
-            <a:spAutoFit/>
-          </a:bodyPr>
-          <a:lstStyle/>
-          <a:p>
-            <a:pPr algn="ctr"/>
-            <a:r>
-              <a:rPr lang="en-US" sz="5400" b="1" dirty="0">
-                <a:solidFill>
-                  <a:srgbClr val="052B48"/>
-                </a:solidFill>
-                <a:latin typeface="Calibri"/>
-                <a:cs typeface="Calibri"/>
-              </a:rPr>
-              <a:t>Reading and Exploring an NWB File</a:t>
-            </a:r>
-          </a:p>
-        </p:txBody>
-      </p:sp>
-      <p:pic>
-        <p:nvPicPr>
-          <p:cNvPr id="5" name="Graphic 4" descr="Folder Search with solid fill">
-            <a:extLst>
-              <a:ext uri="{FF2B5EF4-FFF2-40B4-BE49-F238E27FC236}">
-                <a16:creationId xmlns:a16="http://schemas.microsoft.com/office/drawing/2014/main" id="{D17D48AB-8DB4-F277-6F50-27AF4160E87D}"/>
-              </a:ext>
-            </a:extLst>
-          </p:cNvPr>
-          <p:cNvPicPr>
-            <a:picLocks noChangeAspect="1"/>
-          </p:cNvPicPr>
-          <p:nvPr/>
-        </p:nvPicPr>
-        <p:blipFill>
-          <a:blip r:embed="rId2">
-            <a:extLst>
-              <a:ext uri="{28A0092B-C50C-407E-A947-70E740481C1C}">
-                <a14:useLocalDpi xmlns:a14="http://schemas.microsoft.com/office/drawing/2010/main" val="0"/>
-              </a:ext>
-              <a:ext uri="{96DAC541-7B7A-43D3-8B79-37D633B846F1}">
-                <asvg:svgBlip xmlns:asvg="http://schemas.microsoft.com/office/drawing/2016/SVG/main" r:embed="rId3"/>
-              </a:ext>
-            </a:extLst>
-          </a:blip>
-          <a:stretch>
-            <a:fillRect/>
-          </a:stretch>
-        </p:blipFill>
-        <p:spPr>
-          <a:xfrm>
-            <a:off x="4022724" y="3403096"/>
-            <a:ext cx="2476550" cy="2476550"/>
-          </a:xfrm>
-          <a:prstGeom prst="rect">
-            <a:avLst/>
-          </a:prstGeom>
-        </p:spPr>
-      </p:pic>
-      <p:grpSp>
-        <p:nvGrpSpPr>
-          <p:cNvPr id="20" name="Group 19">
-            <a:extLst>
-              <a:ext uri="{FF2B5EF4-FFF2-40B4-BE49-F238E27FC236}">
-                <a16:creationId xmlns:a16="http://schemas.microsoft.com/office/drawing/2014/main" id="{68DE8607-11B2-09AE-004F-C3F75DFB510A}"/>
-              </a:ext>
-            </a:extLst>
-          </p:cNvPr>
-          <p:cNvGrpSpPr>
-            <a:grpSpLocks noChangeAspect="1"/>
-          </p:cNvGrpSpPr>
-          <p:nvPr/>
-        </p:nvGrpSpPr>
-        <p:grpSpPr>
-          <a:xfrm>
-            <a:off x="3313878" y="2510865"/>
-            <a:ext cx="1669317" cy="1656000"/>
-            <a:chOff x="2769912" y="2630196"/>
-            <a:chExt cx="2721715" cy="2699999"/>
-          </a:xfrm>
-        </p:grpSpPr>
-        <p:sp>
-          <p:nvSpPr>
-            <p:cNvPr id="23" name="Folded Corner 22">
-              <a:extLst>
-                <a:ext uri="{FF2B5EF4-FFF2-40B4-BE49-F238E27FC236}">
-                  <a16:creationId xmlns:a16="http://schemas.microsoft.com/office/drawing/2014/main" id="{0978C650-A31F-3E85-DFD4-C4FCDCA8457B}"/>
-                </a:ext>
-              </a:extLst>
-            </p:cNvPr>
-            <p:cNvSpPr/>
-            <p:nvPr/>
-          </p:nvSpPr>
-          <p:spPr>
-            <a:xfrm rot="10800000" flipH="1">
-              <a:off x="3184160" y="2684996"/>
-              <a:ext cx="2307467" cy="2645199"/>
-            </a:xfrm>
-            <a:prstGeom prst="foldedCorner">
-              <a:avLst>
-                <a:gd name="adj" fmla="val 26556"/>
-              </a:avLst>
-            </a:prstGeom>
-            <a:solidFill>
-              <a:srgbClr val="052A48"/>
-            </a:solidFill>
-            <a:ln w="38100" cmpd="sng">
-              <a:solidFill>
-                <a:schemeClr val="bg1"/>
-              </a:solidFill>
-            </a:ln>
-            <a:effectLst/>
-          </p:spPr>
-          <p:style>
-            <a:lnRef idx="1">
-              <a:schemeClr val="accent1"/>
-            </a:lnRef>
-            <a:fillRef idx="3">
-              <a:schemeClr val="accent1"/>
-            </a:fillRef>
-            <a:effectRef idx="2">
-              <a:schemeClr val="accent1"/>
-            </a:effectRef>
-            <a:fontRef idx="minor">
-              <a:schemeClr val="lt1"/>
-            </a:fontRef>
-          </p:style>
-          <p:txBody>
-            <a:bodyPr rtlCol="0" anchor="ctr"/>
-            <a:lstStyle/>
-            <a:p>
-              <a:pPr algn="ctr"/>
-              <a:r>
-                <a:rPr lang="en-US" sz="1050" u="sng" dirty="0"/>
-                <a:t>								</a:t>
-              </a:r>
-              <a:r>
-                <a:rPr lang="en-US" sz="900" u="sng" dirty="0"/>
-                <a:t>   </a:t>
-              </a:r>
-            </a:p>
-          </p:txBody>
-        </p:sp>
-        <p:grpSp>
-          <p:nvGrpSpPr>
-            <p:cNvPr id="24" name="Group 23">
-              <a:extLst>
-                <a:ext uri="{FF2B5EF4-FFF2-40B4-BE49-F238E27FC236}">
-                  <a16:creationId xmlns:a16="http://schemas.microsoft.com/office/drawing/2014/main" id="{E83F4AC5-DE61-4FAA-C351-95AF8FCEF9C8}"/>
-                </a:ext>
-              </a:extLst>
-            </p:cNvPr>
-            <p:cNvGrpSpPr>
-              <a:grpSpLocks noChangeAspect="1"/>
-            </p:cNvGrpSpPr>
-            <p:nvPr/>
-          </p:nvGrpSpPr>
-          <p:grpSpPr>
-            <a:xfrm>
-              <a:off x="2769912" y="2630196"/>
-              <a:ext cx="1503336" cy="1503337"/>
-              <a:chOff x="2259923" y="2660201"/>
-              <a:chExt cx="1959561" cy="1962561"/>
-            </a:xfrm>
-          </p:grpSpPr>
-          <p:sp>
-            <p:nvSpPr>
-              <p:cNvPr id="25" name="Oval 24">
-                <a:extLst>
-                  <a:ext uri="{FF2B5EF4-FFF2-40B4-BE49-F238E27FC236}">
-                    <a16:creationId xmlns:a16="http://schemas.microsoft.com/office/drawing/2014/main" id="{9C4806BF-EDED-96FF-2B39-CAEFB6463948}"/>
-                  </a:ext>
-                </a:extLst>
-              </p:cNvPr>
-              <p:cNvSpPr/>
-              <p:nvPr/>
-            </p:nvSpPr>
-            <p:spPr>
-              <a:xfrm>
-                <a:off x="2259923" y="2660201"/>
-                <a:ext cx="1959561" cy="1962561"/>
-              </a:xfrm>
-              <a:prstGeom prst="ellipse">
-                <a:avLst/>
-              </a:prstGeom>
-              <a:solidFill>
-                <a:schemeClr val="bg1"/>
-              </a:solidFill>
-              <a:ln w="76200" cmpd="sng">
-                <a:solidFill>
-                  <a:srgbClr val="052A48"/>
-                </a:solidFill>
-              </a:ln>
-              <a:effectLst/>
-            </p:spPr>
-            <p:style>
-              <a:lnRef idx="1">
-                <a:schemeClr val="accent1"/>
-              </a:lnRef>
-              <a:fillRef idx="3">
-                <a:schemeClr val="accent1"/>
-              </a:fillRef>
-              <a:effectRef idx="2">
-                <a:schemeClr val="accent1"/>
-              </a:effectRef>
-              <a:fontRef idx="minor">
-                <a:schemeClr val="lt1"/>
-              </a:fontRef>
-            </p:style>
-            <p:txBody>
-              <a:bodyPr rtlCol="0" anchor="ctr"/>
-              <a:lstStyle/>
-              <a:p>
-                <a:endParaRPr lang="en-US" sz="4400" dirty="0"/>
-              </a:p>
-            </p:txBody>
-          </p:sp>
-          <p:pic>
-            <p:nvPicPr>
-              <p:cNvPr id="28" name="Picture 27" descr="logo_brain_transp_512x512.png">
-                <a:extLst>
-                  <a:ext uri="{FF2B5EF4-FFF2-40B4-BE49-F238E27FC236}">
-                    <a16:creationId xmlns:a16="http://schemas.microsoft.com/office/drawing/2014/main" id="{0737FE45-E46A-D45E-B8BD-4EEDDF3B6B2B}"/>
-                  </a:ext>
-                </a:extLst>
-              </p:cNvPr>
-              <p:cNvPicPr>
-                <a:picLocks noChangeAspect="1"/>
-              </p:cNvPicPr>
-              <p:nvPr/>
-            </p:nvPicPr>
-            <p:blipFill>
-              <a:blip r:embed="rId4">
-                <a:extLst>
-                  <a:ext uri="{28A0092B-C50C-407E-A947-70E740481C1C}">
-                    <a14:useLocalDpi xmlns:a14="http://schemas.microsoft.com/office/drawing/2010/main" val="0"/>
-                  </a:ext>
-                </a:extLst>
-              </a:blip>
-              <a:stretch>
-                <a:fillRect/>
-              </a:stretch>
-            </p:blipFill>
-            <p:spPr>
-              <a:xfrm>
-                <a:off x="2393887" y="2838486"/>
-                <a:ext cx="1703898" cy="1703898"/>
-              </a:xfrm>
-              <a:prstGeom prst="rect">
-                <a:avLst/>
-              </a:prstGeom>
-            </p:spPr>
-          </p:pic>
-        </p:grpSp>
-      </p:grpSp>
-    </p:spTree>
-    <p:extLst>
-      <p:ext uri="{BB962C8B-B14F-4D97-AF65-F5344CB8AC3E}">
-        <p14:creationId xmlns:p14="http://schemas.microsoft.com/office/powerpoint/2010/main" val="3534876857"/>
-      </p:ext>
-    </p:extLst>
-  </p:cSld>
-  <p:clrMapOvr>
-    <a:masterClrMapping/>
-  </p:clrMapOvr>
-</p:sld>
-</file>
-
-<file path=ppt/slides/slide19.xml><?xml version="1.0" encoding="utf-8"?>
-<p:sld xmlns:a="http://schemas.openxmlformats.org/drawingml/2006/main" xmlns:r="http://schemas.openxmlformats.org/officeDocument/2006/relationships" xmlns:p="http://schemas.openxmlformats.org/presentationml/2006/main">
-  <p:cSld>
-    <p:spTree>
-      <p:nvGrpSpPr>
-        <p:cNvPr id="1" name=""/>
-        <p:cNvGrpSpPr/>
-        <p:nvPr/>
-      </p:nvGrpSpPr>
-      <p:grpSpPr>
-        <a:xfrm>
-          <a:off x="0" y="0"/>
-          <a:ext cx="0" cy="0"/>
-          <a:chOff x="0" y="0"/>
-          <a:chExt cx="0" cy="0"/>
-        </a:xfrm>
-      </p:grpSpPr>
-      <p:sp>
-        <p:nvSpPr>
-          <p:cNvPr id="3" name="Title 2">
-            <a:extLst>
-              <a:ext uri="{FF2B5EF4-FFF2-40B4-BE49-F238E27FC236}">
-                <a16:creationId xmlns:a16="http://schemas.microsoft.com/office/drawing/2014/main" id="{B02E6584-2580-7522-0149-AB80033C1825}"/>
-              </a:ext>
-            </a:extLst>
-          </p:cNvPr>
-          <p:cNvSpPr>
-            <a:spLocks noGrp="1"/>
-          </p:cNvSpPr>
-          <p:nvPr>
-            <p:ph type="title"/>
-          </p:nvPr>
-        </p:nvSpPr>
-        <p:spPr/>
-        <p:txBody>
-          <a:bodyPr/>
-          <a:lstStyle/>
-          <a:p>
-            <a:endParaRPr lang="en-HU"/>
-          </a:p>
-        </p:txBody>
-      </p:sp>
-    </p:spTree>
-    <p:extLst>
-      <p:ext uri="{BB962C8B-B14F-4D97-AF65-F5344CB8AC3E}">
-        <p14:creationId xmlns:p14="http://schemas.microsoft.com/office/powerpoint/2010/main" val="2691372971"/>
       </p:ext>
     </p:extLst>
   </p:cSld>
@@ -8086,7 +8227,7 @@
           <a:p>
             <a:pPr algn="ctr"/>
             <a:r>
-              <a:rPr lang="en-US" sz="5400" b="1" dirty="0">
+              <a:rPr lang="en-US" sz="5400" b="1" dirty="0" smtClean="0">
                 <a:solidFill>
                   <a:srgbClr val="052B48"/>
                 </a:solidFill>
@@ -8095,6 +8236,13 @@
               </a:rPr>
               <a:t>Query Intracellular Electrophysiology Metadata</a:t>
             </a:r>
+            <a:endParaRPr lang="en-US" sz="5400" b="1" dirty="0">
+              <a:solidFill>
+                <a:srgbClr val="052B48"/>
+              </a:solidFill>
+              <a:latin typeface="Calibri"/>
+              <a:cs typeface="Calibri"/>
+            </a:endParaRPr>
           </a:p>
         </p:txBody>
       </p:sp>
@@ -8230,7 +8378,7 @@
           <a:p>
             <a:pPr algn="ctr"/>
             <a:r>
-              <a:rPr lang="en-US" sz="5400" b="1" dirty="0">
+              <a:rPr lang="en-US" sz="5400" b="1" dirty="0" smtClean="0">
                 <a:solidFill>
                   <a:srgbClr val="052B48"/>
                 </a:solidFill>
@@ -8240,7 +8388,7 @@
               <a:t>Intracellular Electrophysiology Data using </a:t>
             </a:r>
             <a:r>
-              <a:rPr lang="en-US" sz="5400" b="1" dirty="0" err="1">
+              <a:rPr lang="en-US" sz="5400" b="1" dirty="0" err="1" smtClean="0">
                 <a:solidFill>
                   <a:srgbClr val="052B48"/>
                 </a:solidFill>
@@ -8302,13 +8450,18 @@
           <a:p>
             <a:pPr algn="ctr"/>
             <a:r>
-              <a:rPr lang="en-US" sz="5400" b="1" dirty="0">
+              <a:rPr lang="en-US" sz="5400" b="1" dirty="0" smtClean="0">
                 <a:solidFill>
                   <a:srgbClr val="FF0000"/>
                 </a:solidFill>
               </a:rPr>
               <a:t>DEPRECATED</a:t>
             </a:r>
+            <a:endParaRPr lang="en-US" sz="5400" b="1" dirty="0">
+              <a:solidFill>
+                <a:srgbClr val="FF0000"/>
+              </a:solidFill>
+            </a:endParaRPr>
           </a:p>
         </p:txBody>
       </p:sp>
@@ -8414,7 +8567,7 @@
           <a:p>
             <a:pPr algn="ctr"/>
             <a:r>
-              <a:rPr lang="en-US" sz="5400" b="1" dirty="0">
+              <a:rPr lang="en-US" sz="5400" b="1" dirty="0" smtClean="0">
                 <a:solidFill>
                   <a:srgbClr val="052B48"/>
                 </a:solidFill>
@@ -8423,6 +8576,13 @@
               </a:rPr>
               <a:t>Allen Brain Observatory</a:t>
             </a:r>
+            <a:endParaRPr lang="en-US" sz="5400" b="1" dirty="0">
+              <a:solidFill>
+                <a:srgbClr val="052B48"/>
+              </a:solidFill>
+              <a:latin typeface="Calibri"/>
+              <a:cs typeface="Calibri"/>
+            </a:endParaRPr>
           </a:p>
         </p:txBody>
       </p:sp>
@@ -8449,18 +8609,33 @@
           <a:p>
             <a:r>
               <a:rPr lang="en-US" sz="1400" dirty="0"/>
-              <a:t> (figure source: </a:t>
+              <a:t> </a:t>
+            </a:r>
+            <a:r>
+              <a:rPr lang="en-US" sz="1400" dirty="0" smtClean="0"/>
+              <a:t>(figure source</a:t>
+            </a:r>
+            <a:r>
+              <a:rPr lang="en-US" sz="1400" dirty="0"/>
+              <a:t>: </a:t>
             </a:r>
             <a:r>
               <a:rPr lang="en-US" sz="1400" dirty="0">
                 <a:hlinkClick r:id="rId2"/>
               </a:rPr>
-              <a:t>https://observatory.brain-map.org</a:t>
+              <a:t>https://observatory.brain-</a:t>
             </a:r>
             <a:r>
-              <a:rPr lang="en-US" sz="1400" dirty="0"/>
+              <a:rPr lang="en-US" sz="1400" dirty="0" smtClean="0">
+                <a:hlinkClick r:id="rId2"/>
+              </a:rPr>
+              <a:t>map.org</a:t>
+            </a:r>
+            <a:r>
+              <a:rPr lang="en-US" sz="1400" dirty="0" smtClean="0"/>
               <a:t>)</a:t>
             </a:r>
+            <a:endParaRPr lang="en-US" sz="1400" dirty="0"/>
           </a:p>
         </p:txBody>
       </p:sp>
@@ -8595,7 +8770,7 @@
           <a:p>
             <a:pPr algn="ctr"/>
             <a:r>
-              <a:rPr lang="en-US" sz="5400" b="1" dirty="0">
+              <a:rPr lang="en-US" sz="5400" b="1" dirty="0" smtClean="0">
                 <a:solidFill>
                   <a:srgbClr val="052B48"/>
                 </a:solidFill>
@@ -8604,6 +8779,13 @@
               </a:rPr>
               <a:t>Extracellular Electrophysiology</a:t>
             </a:r>
+            <a:endParaRPr lang="en-US" sz="5400" b="1" dirty="0">
+              <a:solidFill>
+                <a:srgbClr val="052B48"/>
+              </a:solidFill>
+              <a:latin typeface="Calibri"/>
+              <a:cs typeface="Calibri"/>
+            </a:endParaRPr>
           </a:p>
         </p:txBody>
       </p:sp>
@@ -8779,7 +8961,7 @@
           <a:p>
             <a:pPr algn="ctr"/>
             <a:r>
-              <a:rPr lang="en-US" sz="5400" b="1" dirty="0">
+              <a:rPr lang="en-US" sz="5400" b="1" dirty="0" smtClean="0">
                 <a:solidFill>
                   <a:srgbClr val="052B48"/>
                 </a:solidFill>
@@ -8788,6 +8970,13 @@
               </a:rPr>
               <a:t>Calcium Imaging Data</a:t>
             </a:r>
+            <a:endParaRPr lang="en-US" sz="5400" b="1" dirty="0">
+              <a:solidFill>
+                <a:srgbClr val="052B48"/>
+              </a:solidFill>
+              <a:latin typeface="Calibri"/>
+              <a:cs typeface="Calibri"/>
+            </a:endParaRPr>
           </a:p>
         </p:txBody>
       </p:sp>
@@ -8922,7 +9111,7 @@
           <a:p>
             <a:pPr algn="ctr"/>
             <a:r>
-              <a:rPr lang="en-US" sz="5400" b="1" dirty="0">
+              <a:rPr lang="en-US" sz="5400" b="1" dirty="0" smtClean="0">
                 <a:solidFill>
                   <a:srgbClr val="052B48"/>
                 </a:solidFill>
@@ -8931,6 +9120,13 @@
               </a:rPr>
               <a:t>Iterative Data Write</a:t>
             </a:r>
+            <a:endParaRPr lang="en-US" sz="5400" b="1" dirty="0">
+              <a:solidFill>
+                <a:srgbClr val="052B48"/>
+              </a:solidFill>
+              <a:latin typeface="Calibri"/>
+              <a:cs typeface="Calibri"/>
+            </a:endParaRPr>
           </a:p>
         </p:txBody>
       </p:sp>
@@ -9213,7 +9409,7 @@
           <a:p>
             <a:pPr algn="ctr"/>
             <a:r>
-              <a:rPr lang="en-US" sz="5400" b="1" dirty="0">
+              <a:rPr lang="en-US" sz="5400" b="1" dirty="0" smtClean="0">
                 <a:solidFill>
                   <a:srgbClr val="052B48"/>
                 </a:solidFill>
@@ -9222,6 +9418,13 @@
               </a:rPr>
               <a:t>HDF5 Dataset I/O</a:t>
             </a:r>
+            <a:endParaRPr lang="en-US" sz="5400" b="1" dirty="0">
+              <a:solidFill>
+                <a:srgbClr val="052B48"/>
+              </a:solidFill>
+              <a:latin typeface="Calibri"/>
+              <a:cs typeface="Calibri"/>
+            </a:endParaRPr>
           </a:p>
         </p:txBody>
       </p:sp>
@@ -9831,7 +10034,7 @@
           <a:p>
             <a:pPr algn="ctr"/>
             <a:r>
-              <a:rPr lang="en-US" sz="5400" b="1" dirty="0">
+              <a:rPr lang="en-US" sz="5400" b="1" dirty="0" smtClean="0">
                 <a:solidFill>
                   <a:srgbClr val="052B48"/>
                 </a:solidFill>
@@ -9840,6 +10043,13 @@
               </a:rPr>
               <a:t>Modular Data Storage using External Files</a:t>
             </a:r>
+            <a:endParaRPr lang="en-US" sz="5400" b="1" dirty="0">
+              <a:solidFill>
+                <a:srgbClr val="052B48"/>
+              </a:solidFill>
+              <a:latin typeface="Calibri"/>
+              <a:cs typeface="Calibri"/>
+            </a:endParaRPr>
           </a:p>
         </p:txBody>
       </p:sp>
@@ -10164,9 +10374,10 @@
           <a:p>
             <a:pPr algn="ctr"/>
             <a:r>
-              <a:rPr lang="en-US" u="sng" dirty="0"/>
+              <a:rPr lang="en-US" u="sng" dirty="0" smtClean="0"/>
               <a:t>																			   </a:t>
             </a:r>
+            <a:endParaRPr lang="en-US" u="sng" dirty="0"/>
           </a:p>
         </p:txBody>
       </p:sp>
@@ -10895,7 +11106,7 @@
   <a:extraClrSchemeLst/>
   <a:extLst>
     <a:ext uri="{05A4C25C-085E-4340-85A3-A5531E510DB2}">
-      <thm15:themeFamily xmlns:thm15="http://schemas.microsoft.com/office/thememl/2012/main" name="Office Theme" id="{62F939B6-93AF-4DB8-9C6B-D6C7DFDC589F}" vid="{4A3C46E8-61CC-4603-A589-7422A47A8E4A}"/>
+      <thm15:themeFamily xmlns:thm15="http://schemas.microsoft.com/office/thememl/2012/main" xmlns="" name="Office Theme" id="{62F939B6-93AF-4DB8-9C6B-D6C7DFDC589F}" vid="{4A3C46E8-61CC-4603-A589-7422A47A8E4A}"/>
     </a:ext>
   </a:extLst>
 </a:theme>

</xml_diff>

<commit_message>
Add a thumbnail for the Optogenitcs gallery tutorial
</commit_message>
<xml_diff>
--- a/docs/source/figures/gallery_thumbnails.pptx
+++ b/docs/source/figures/gallery_thumbnails.pptx
@@ -5,7 +5,7 @@
     <p:sldMasterId id="2147483660" r:id="rId1"/>
   </p:sldMasterIdLst>
   <p:notesMasterIdLst>
-    <p:notesMasterId r:id="rId19"/>
+    <p:notesMasterId r:id="rId20"/>
   </p:notesMasterIdLst>
   <p:sldIdLst>
     <p:sldId id="342" r:id="rId2"/>
@@ -14,17 +14,18 @@
     <p:sldId id="346" r:id="rId5"/>
     <p:sldId id="348" r:id="rId6"/>
     <p:sldId id="349" r:id="rId7"/>
-    <p:sldId id="350" r:id="rId8"/>
-    <p:sldId id="357" r:id="rId9"/>
-    <p:sldId id="352" r:id="rId10"/>
-    <p:sldId id="361" r:id="rId11"/>
-    <p:sldId id="363" r:id="rId12"/>
-    <p:sldId id="353" r:id="rId13"/>
-    <p:sldId id="364" r:id="rId14"/>
-    <p:sldId id="354" r:id="rId15"/>
-    <p:sldId id="355" r:id="rId16"/>
-    <p:sldId id="358" r:id="rId17"/>
-    <p:sldId id="359" r:id="rId18"/>
+    <p:sldId id="365" r:id="rId8"/>
+    <p:sldId id="350" r:id="rId9"/>
+    <p:sldId id="357" r:id="rId10"/>
+    <p:sldId id="352" r:id="rId11"/>
+    <p:sldId id="361" r:id="rId12"/>
+    <p:sldId id="363" r:id="rId13"/>
+    <p:sldId id="353" r:id="rId14"/>
+    <p:sldId id="364" r:id="rId15"/>
+    <p:sldId id="354" r:id="rId16"/>
+    <p:sldId id="355" r:id="rId17"/>
+    <p:sldId id="358" r:id="rId18"/>
+    <p:sldId id="359" r:id="rId19"/>
   </p:sldIdLst>
   <p:sldSz cx="12192000" cy="6858000"/>
   <p:notesSz cx="6858000" cy="9144000"/>
@@ -125,7 +126,18 @@
   </p:defaultTextStyle>
   <p:extLst>
     <p:ext uri="{EFAFB233-063F-42B5-8137-9DF3F51BA10A}">
-      <p15:sldGuideLst xmlns:p15="http://schemas.microsoft.com/office/powerpoint/2012/main" xmlns=""/>
+      <p15:sldGuideLst xmlns:p15="http://schemas.microsoft.com/office/powerpoint/2012/main">
+        <p15:guide id="1" orient="horz" pos="3405">
+          <p15:clr>
+            <a:srgbClr val="A4A3A4"/>
+          </p15:clr>
+        </p15:guide>
+        <p15:guide id="2" pos="4184">
+          <p15:clr>
+            <a:srgbClr val="A4A3A4"/>
+          </p15:clr>
+        </p15:guide>
+      </p15:sldGuideLst>
     </p:ext>
   </p:extLst>
 </p:presentation>
@@ -213,7 +225,7 @@
           <a:p>
             <a:fld id="{4D6A40B9-902A-4E0E-AF39-1C357549AEE0}" type="datetimeFigureOut">
               <a:rPr lang="en-US" smtClean="0"/>
-              <a:t>8/12/21</a:t>
+              <a:t>7/19/23</a:t>
             </a:fld>
             <a:endParaRPr lang="en-US"/>
           </a:p>
@@ -545,7 +557,7 @@
           <a:p>
             <a:fld id="{88156F16-9966-4EDC-933D-6170A05B6017}" type="slidenum">
               <a:rPr lang="en-US" smtClean="0"/>
-              <a:t>10</a:t>
+              <a:t>11</a:t>
             </a:fld>
             <a:endParaRPr lang="en-US"/>
           </a:p>
@@ -629,7 +641,7 @@
           <a:p>
             <a:fld id="{88156F16-9966-4EDC-933D-6170A05B6017}" type="slidenum">
               <a:rPr lang="en-US" smtClean="0"/>
-              <a:t>11</a:t>
+              <a:t>12</a:t>
             </a:fld>
             <a:endParaRPr lang="en-US"/>
           </a:p>
@@ -713,7 +725,7 @@
           <a:p>
             <a:fld id="{88156F16-9966-4EDC-933D-6170A05B6017}" type="slidenum">
               <a:rPr lang="en-US" smtClean="0"/>
-              <a:t>13</a:t>
+              <a:t>14</a:t>
             </a:fld>
             <a:endParaRPr lang="en-US"/>
           </a:p>
@@ -797,7 +809,7 @@
           <a:p>
             <a:fld id="{88156F16-9966-4EDC-933D-6170A05B6017}" type="slidenum">
               <a:rPr lang="en-US" smtClean="0"/>
-              <a:t>17</a:t>
+              <a:t>18</a:t>
             </a:fld>
             <a:endParaRPr lang="en-US"/>
           </a:p>
@@ -1629,7 +1641,7 @@
           <p:cNvPr id="4" name="Text Placeholder 3">
             <a:extLst>
               <a:ext uri="{FF2B5EF4-FFF2-40B4-BE49-F238E27FC236}">
-                <a16:creationId xmlns:a16="http://schemas.microsoft.com/office/drawing/2014/main" xmlns="" id="{8850B379-F419-41FB-9123-96081B074583}"/>
+                <a16:creationId xmlns:a16="http://schemas.microsoft.com/office/drawing/2014/main" id="{8850B379-F419-41FB-9123-96081B074583}"/>
               </a:ext>
             </a:extLst>
           </p:cNvPr>
@@ -1920,7 +1932,7 @@
           <p:cNvPr id="5" name="Picture 4">
             <a:extLst>
               <a:ext uri="{FF2B5EF4-FFF2-40B4-BE49-F238E27FC236}">
-                <a16:creationId xmlns:a16="http://schemas.microsoft.com/office/drawing/2014/main" xmlns="" id="{A5059957-9534-4FB9-8820-2343C3BF0E8F}"/>
+                <a16:creationId xmlns:a16="http://schemas.microsoft.com/office/drawing/2014/main" id="{A5059957-9534-4FB9-8820-2343C3BF0E8F}"/>
               </a:ext>
             </a:extLst>
           </p:cNvPr>
@@ -1950,7 +1962,7 @@
           <p:cNvPr id="4" name="Text Placeholder 3">
             <a:extLst>
               <a:ext uri="{FF2B5EF4-FFF2-40B4-BE49-F238E27FC236}">
-                <a16:creationId xmlns:a16="http://schemas.microsoft.com/office/drawing/2014/main" xmlns="" id="{8850B379-F419-41FB-9123-96081B074583}"/>
+                <a16:creationId xmlns:a16="http://schemas.microsoft.com/office/drawing/2014/main" id="{8850B379-F419-41FB-9123-96081B074583}"/>
               </a:ext>
             </a:extLst>
           </p:cNvPr>
@@ -2307,7 +2319,7 @@
           <p:cNvPr id="7" name="Google Shape;20;p4">
             <a:extLst>
               <a:ext uri="{FF2B5EF4-FFF2-40B4-BE49-F238E27FC236}">
-                <a16:creationId xmlns:a16="http://schemas.microsoft.com/office/drawing/2014/main" xmlns="" id="{537643E4-B983-42CC-9421-9C4C107A5DA4}"/>
+                <a16:creationId xmlns:a16="http://schemas.microsoft.com/office/drawing/2014/main" id="{537643E4-B983-42CC-9421-9C4C107A5DA4}"/>
               </a:ext>
             </a:extLst>
           </p:cNvPr>
@@ -3712,7 +3724,7 @@
           <a:p>
             <a:pPr algn="ctr"/>
             <a:r>
-              <a:rPr lang="en-US" sz="5400" b="1" dirty="0" smtClean="0">
+              <a:rPr lang="en-US" sz="5400" b="1" dirty="0">
                 <a:solidFill>
                   <a:srgbClr val="052B48"/>
                 </a:solidFill>
@@ -3721,13 +3733,6 @@
               </a:rPr>
               <a:t>Intracellular Electrophysiology</a:t>
             </a:r>
-            <a:endParaRPr lang="en-US" sz="5400" b="1" dirty="0">
-              <a:solidFill>
-                <a:srgbClr val="052B48"/>
-              </a:solidFill>
-              <a:latin typeface="Calibri"/>
-              <a:cs typeface="Calibri"/>
-            </a:endParaRPr>
           </a:p>
         </p:txBody>
       </p:sp>
@@ -3736,7 +3741,7 @@
           <p:cNvPr id="5" name="Picture 4" descr="A screenshot of a cell phone&#10;&#10;Description automatically generated">
             <a:extLst>
               <a:ext uri="{FF2B5EF4-FFF2-40B4-BE49-F238E27FC236}">
-                <a16:creationId xmlns="" xmlns:a16="http://schemas.microsoft.com/office/drawing/2014/main" id="{8C303482-C4AE-E049-A13A-50CE832D1F2A}"/>
+                <a16:creationId xmlns:a16="http://schemas.microsoft.com/office/drawing/2014/main" id="{8C303482-C4AE-E049-A13A-50CE832D1F2A}"/>
               </a:ext>
             </a:extLst>
           </p:cNvPr>
@@ -3789,33 +3794,18 @@
           <a:p>
             <a:r>
               <a:rPr lang="en-US" sz="1400" dirty="0"/>
-              <a:t> </a:t>
-            </a:r>
-            <a:r>
-              <a:rPr lang="en-US" sz="1400" dirty="0" smtClean="0"/>
-              <a:t>(figure source</a:t>
-            </a:r>
-            <a:r>
-              <a:rPr lang="en-US" sz="1400" dirty="0"/>
-              <a:t>: </a:t>
+              <a:t> (figure source: </a:t>
             </a:r>
             <a:r>
               <a:rPr lang="en-US" sz="1400" dirty="0">
                 <a:hlinkClick r:id="rId3"/>
               </a:rPr>
-              <a:t>celltypes.brain-</a:t>
+              <a:t>celltypes.brain-map.org</a:t>
             </a:r>
             <a:r>
-              <a:rPr lang="en-US" sz="1400" dirty="0" smtClean="0">
-                <a:hlinkClick r:id="rId3"/>
-              </a:rPr>
-              <a:t>map.org</a:t>
-            </a:r>
-            <a:r>
-              <a:rPr lang="en-US" sz="1400" dirty="0" smtClean="0"/>
+              <a:rPr lang="en-US" sz="1400" dirty="0"/>
               <a:t>)</a:t>
             </a:r>
-            <a:endParaRPr lang="en-US" sz="1400" dirty="0"/>
           </a:p>
         </p:txBody>
       </p:sp>
@@ -3907,7 +3897,7 @@
         <p:spPr>
           <a:xfrm>
             <a:off x="863980" y="855015"/>
-            <a:ext cx="7213708" cy="923330"/>
+            <a:ext cx="7213708" cy="1754327"/>
           </a:xfrm>
           <a:prstGeom prst="rect">
             <a:avLst/>
@@ -3921,35 +3911,146 @@
           <a:p>
             <a:pPr algn="ctr"/>
             <a:r>
-              <a:rPr lang="en-US" sz="5400" b="1" dirty="0" smtClean="0">
+              <a:rPr lang="en-US" sz="5400" b="1" dirty="0">
                 <a:solidFill>
                   <a:srgbClr val="052B48"/>
                 </a:solidFill>
                 <a:latin typeface="Calibri"/>
                 <a:cs typeface="Calibri"/>
               </a:rPr>
-              <a:t>Parallel I/O using MPI</a:t>
+              <a:t>Modular Data Storage using External Files</a:t>
             </a:r>
-            <a:endParaRPr lang="en-US" sz="5400" b="1" dirty="0">
-              <a:solidFill>
-                <a:srgbClr val="052B48"/>
-              </a:solidFill>
-              <a:latin typeface="Calibri"/>
-              <a:cs typeface="Calibri"/>
-            </a:endParaRPr>
           </a:p>
         </p:txBody>
       </p:sp>
       <p:sp>
         <p:nvSpPr>
-          <p:cNvPr id="8" name="Folded Corner 7"/>
+          <p:cNvPr id="15" name="Left Arrow 14"/>
           <p:cNvSpPr/>
           <p:nvPr/>
         </p:nvSpPr>
         <p:spPr>
+          <a:xfrm rot="5400000" flipV="1">
+            <a:off x="4274700" y="3528909"/>
+            <a:ext cx="550232" cy="279992"/>
+          </a:xfrm>
+          <a:prstGeom prst="leftArrow">
+            <a:avLst>
+              <a:gd name="adj1" fmla="val 60000"/>
+              <a:gd name="adj2" fmla="val 50000"/>
+            </a:avLst>
+          </a:prstGeom>
+          <a:solidFill>
+            <a:srgbClr val="052A48"/>
+          </a:solidFill>
+          <a:ln w="38100" cmpd="sng">
+            <a:solidFill>
+              <a:srgbClr val="FFFFFF"/>
+            </a:solidFill>
+          </a:ln>
+        </p:spPr>
+        <p:style>
+          <a:lnRef idx="0">
+            <a:schemeClr val="accent1">
+              <a:tint val="60000"/>
+              <a:hueOff val="0"/>
+              <a:satOff val="0"/>
+              <a:lumOff val="0"/>
+              <a:alphaOff val="0"/>
+            </a:schemeClr>
+          </a:lnRef>
+          <a:fillRef idx="1">
+            <a:schemeClr val="accent1">
+              <a:tint val="60000"/>
+              <a:hueOff val="0"/>
+              <a:satOff val="0"/>
+              <a:lumOff val="0"/>
+              <a:alphaOff val="0"/>
+            </a:schemeClr>
+          </a:fillRef>
+          <a:effectRef idx="0">
+            <a:schemeClr val="accent1">
+              <a:tint val="60000"/>
+              <a:hueOff val="0"/>
+              <a:satOff val="0"/>
+              <a:lumOff val="0"/>
+              <a:alphaOff val="0"/>
+            </a:schemeClr>
+          </a:effectRef>
+          <a:fontRef idx="minor">
+            <a:schemeClr val="lt1"/>
+          </a:fontRef>
+        </p:style>
+      </p:sp>
+      <p:sp>
+        <p:nvSpPr>
+          <p:cNvPr id="16" name="Left Arrow 15"/>
+          <p:cNvSpPr/>
+          <p:nvPr/>
+        </p:nvSpPr>
+        <p:spPr>
+          <a:xfrm rot="2734356">
+            <a:off x="3061789" y="4549986"/>
+            <a:ext cx="1096849" cy="425306"/>
+          </a:xfrm>
+          <a:prstGeom prst="leftArrow">
+            <a:avLst>
+              <a:gd name="adj1" fmla="val 60000"/>
+              <a:gd name="adj2" fmla="val 50000"/>
+            </a:avLst>
+          </a:prstGeom>
+          <a:solidFill>
+            <a:srgbClr val="052A48"/>
+          </a:solidFill>
+          <a:ln w="38100" cmpd="sng">
+            <a:solidFill>
+              <a:srgbClr val="FFFFFF"/>
+            </a:solidFill>
+          </a:ln>
+        </p:spPr>
+        <p:style>
+          <a:lnRef idx="0">
+            <a:schemeClr val="accent1">
+              <a:tint val="60000"/>
+              <a:hueOff val="0"/>
+              <a:satOff val="0"/>
+              <a:lumOff val="0"/>
+              <a:alphaOff val="0"/>
+            </a:schemeClr>
+          </a:lnRef>
+          <a:fillRef idx="1">
+            <a:schemeClr val="accent1">
+              <a:tint val="60000"/>
+              <a:hueOff val="0"/>
+              <a:satOff val="0"/>
+              <a:lumOff val="0"/>
+              <a:alphaOff val="0"/>
+            </a:schemeClr>
+          </a:fillRef>
+          <a:effectRef idx="0">
+            <a:schemeClr val="accent1">
+              <a:tint val="60000"/>
+              <a:hueOff val="0"/>
+              <a:satOff val="0"/>
+              <a:lumOff val="0"/>
+              <a:alphaOff val="0"/>
+            </a:schemeClr>
+          </a:effectRef>
+          <a:fontRef idx="minor">
+            <a:schemeClr val="lt1"/>
+          </a:fontRef>
+        </p:style>
+      </p:sp>
+      <p:sp>
+        <p:nvSpPr>
+          <p:cNvPr id="12" name="Folded Corner 11"/>
+          <p:cNvSpPr/>
+          <p:nvPr/>
+        </p:nvSpPr>
+        <p:spPr>
           <a:xfrm rot="10800000" flipH="1">
-            <a:off x="3767562" y="2807415"/>
-            <a:ext cx="1419941" cy="1900138"/>
+            <a:off x="2182317" y="3072614"/>
+            <a:ext cx="1037552" cy="1327710"/>
           </a:xfrm>
           <a:prstGeom prst="foldedCorner">
             <a:avLst>
@@ -3985,11 +4086,475 @@
           <a:lstStyle/>
           <a:p>
             <a:pPr algn="ctr"/>
+            <a:endParaRPr lang="en-US" sz="1000" u="sng" dirty="0"/>
+          </a:p>
+        </p:txBody>
+      </p:sp>
+      <p:sp>
+        <p:nvSpPr>
+          <p:cNvPr id="14" name="Folded Corner 13"/>
+          <p:cNvSpPr/>
+          <p:nvPr/>
+        </p:nvSpPr>
+        <p:spPr>
+          <a:xfrm rot="10800000" flipH="1">
+            <a:off x="4267044" y="2617358"/>
+            <a:ext cx="572757" cy="762891"/>
+          </a:xfrm>
+          <a:prstGeom prst="foldedCorner">
+            <a:avLst>
+              <a:gd name="adj" fmla="val 26556"/>
+            </a:avLst>
+          </a:prstGeom>
+          <a:solidFill>
+            <a:srgbClr val="052A48"/>
+          </a:solidFill>
+          <a:ln w="28575" cmpd="sng">
+            <a:solidFill>
+              <a:schemeClr val="bg1"/>
+            </a:solidFill>
+          </a:ln>
+          <a:effectLst/>
+        </p:spPr>
+        <p:style>
+          <a:lnRef idx="1">
+            <a:schemeClr val="accent1"/>
+          </a:lnRef>
+          <a:fillRef idx="3">
+            <a:schemeClr val="accent1"/>
+          </a:fillRef>
+          <a:effectRef idx="2">
+            <a:schemeClr val="accent1"/>
+          </a:effectRef>
+          <a:fontRef idx="minor">
+            <a:schemeClr val="lt1"/>
+          </a:fontRef>
+        </p:style>
+        <p:txBody>
+          <a:bodyPr rtlCol="0" anchor="ctr"/>
+          <a:lstStyle/>
+          <a:p>
+            <a:pPr algn="ctr"/>
+            <a:endParaRPr lang="en-US" sz="1000" u="sng" dirty="0"/>
+          </a:p>
+        </p:txBody>
+      </p:sp>
+      <p:sp>
+        <p:nvSpPr>
+          <p:cNvPr id="20" name="Left Arrow 19"/>
+          <p:cNvSpPr/>
+          <p:nvPr/>
+        </p:nvSpPr>
+        <p:spPr>
+          <a:xfrm rot="18865644" flipH="1">
+            <a:off x="5072927" y="4550292"/>
+            <a:ext cx="1096849" cy="425306"/>
+          </a:xfrm>
+          <a:prstGeom prst="leftArrow">
+            <a:avLst>
+              <a:gd name="adj1" fmla="val 60000"/>
+              <a:gd name="adj2" fmla="val 50000"/>
+            </a:avLst>
+          </a:prstGeom>
+          <a:solidFill>
+            <a:srgbClr val="052A48"/>
+          </a:solidFill>
+          <a:ln w="38100" cmpd="sng">
+            <a:solidFill>
+              <a:srgbClr val="FFFFFF"/>
+            </a:solidFill>
+          </a:ln>
+        </p:spPr>
+        <p:style>
+          <a:lnRef idx="0">
+            <a:schemeClr val="accent1">
+              <a:tint val="60000"/>
+              <a:hueOff val="0"/>
+              <a:satOff val="0"/>
+              <a:lumOff val="0"/>
+              <a:alphaOff val="0"/>
+            </a:schemeClr>
+          </a:lnRef>
+          <a:fillRef idx="1">
+            <a:schemeClr val="accent1">
+              <a:tint val="60000"/>
+              <a:hueOff val="0"/>
+              <a:satOff val="0"/>
+              <a:lumOff val="0"/>
+              <a:alphaOff val="0"/>
+            </a:schemeClr>
+          </a:fillRef>
+          <a:effectRef idx="0">
+            <a:schemeClr val="accent1">
+              <a:tint val="60000"/>
+              <a:hueOff val="0"/>
+              <a:satOff val="0"/>
+              <a:lumOff val="0"/>
+              <a:alphaOff val="0"/>
+            </a:schemeClr>
+          </a:effectRef>
+          <a:fontRef idx="minor">
+            <a:schemeClr val="lt1"/>
+          </a:fontRef>
+        </p:style>
+      </p:sp>
+      <p:sp>
+        <p:nvSpPr>
+          <p:cNvPr id="8" name="Folded Corner 7"/>
+          <p:cNvSpPr/>
+          <p:nvPr/>
+        </p:nvSpPr>
+        <p:spPr>
+          <a:xfrm rot="10800000" flipH="1">
+            <a:off x="3899840" y="3720272"/>
+            <a:ext cx="1419941" cy="1900138"/>
+          </a:xfrm>
+          <a:prstGeom prst="foldedCorner">
+            <a:avLst>
+              <a:gd name="adj" fmla="val 26556"/>
+            </a:avLst>
+          </a:prstGeom>
+          <a:solidFill>
+            <a:srgbClr val="052A48"/>
+          </a:solidFill>
+          <a:ln w="28575" cmpd="sng">
+            <a:solidFill>
+              <a:schemeClr val="bg1"/>
+            </a:solidFill>
+          </a:ln>
+          <a:effectLst/>
+        </p:spPr>
+        <p:style>
+          <a:lnRef idx="1">
+            <a:schemeClr val="accent1"/>
+          </a:lnRef>
+          <a:fillRef idx="3">
+            <a:schemeClr val="accent1"/>
+          </a:fillRef>
+          <a:effectRef idx="2">
+            <a:schemeClr val="accent1"/>
+          </a:effectRef>
+          <a:fontRef idx="minor">
+            <a:schemeClr val="lt1"/>
+          </a:fontRef>
+        </p:style>
+        <p:txBody>
+          <a:bodyPr rtlCol="0" anchor="ctr"/>
+          <a:lstStyle/>
+          <a:p>
+            <a:pPr algn="ctr"/>
             <a:r>
-              <a:rPr lang="en-US" u="sng" dirty="0" smtClean="0"/>
+              <a:rPr lang="en-US" u="sng" dirty="0"/>
               <a:t>																			   </a:t>
             </a:r>
-            <a:endParaRPr lang="en-US" u="sng" dirty="0"/>
+          </a:p>
+        </p:txBody>
+      </p:sp>
+      <p:grpSp>
+        <p:nvGrpSpPr>
+          <p:cNvPr id="11" name="Group 10"/>
+          <p:cNvGrpSpPr>
+            <a:grpSpLocks noChangeAspect="1"/>
+          </p:cNvGrpSpPr>
+          <p:nvPr/>
+        </p:nvGrpSpPr>
+        <p:grpSpPr>
+          <a:xfrm>
+            <a:off x="3606582" y="3649328"/>
+            <a:ext cx="947929" cy="947929"/>
+            <a:chOff x="2259923" y="2660201"/>
+            <a:chExt cx="1959561" cy="1962561"/>
+          </a:xfrm>
+        </p:grpSpPr>
+        <p:sp>
+          <p:nvSpPr>
+            <p:cNvPr id="18" name="Oval 17"/>
+            <p:cNvSpPr/>
+            <p:nvPr/>
+          </p:nvSpPr>
+          <p:spPr>
+            <a:xfrm>
+              <a:off x="2259923" y="2660201"/>
+              <a:ext cx="1959561" cy="1962561"/>
+            </a:xfrm>
+            <a:prstGeom prst="ellipse">
+              <a:avLst/>
+            </a:prstGeom>
+            <a:solidFill>
+              <a:schemeClr val="bg1"/>
+            </a:solidFill>
+            <a:ln w="76200" cmpd="sng">
+              <a:solidFill>
+                <a:srgbClr val="052A48"/>
+              </a:solidFill>
+            </a:ln>
+            <a:effectLst/>
+          </p:spPr>
+          <p:style>
+            <a:lnRef idx="1">
+              <a:schemeClr val="accent1"/>
+            </a:lnRef>
+            <a:fillRef idx="3">
+              <a:schemeClr val="accent1"/>
+            </a:fillRef>
+            <a:effectRef idx="2">
+              <a:schemeClr val="accent1"/>
+            </a:effectRef>
+            <a:fontRef idx="minor">
+              <a:schemeClr val="lt1"/>
+            </a:fontRef>
+          </p:style>
+          <p:txBody>
+            <a:bodyPr rtlCol="0" anchor="ctr"/>
+            <a:lstStyle/>
+            <a:p>
+              <a:endParaRPr lang="en-US" sz="4400" dirty="0"/>
+            </a:p>
+          </p:txBody>
+        </p:sp>
+        <p:pic>
+          <p:nvPicPr>
+            <p:cNvPr id="19" name="Picture 18" descr="logo_brain_transp_512x512.png"/>
+            <p:cNvPicPr>
+              <a:picLocks noChangeAspect="1"/>
+            </p:cNvPicPr>
+            <p:nvPr/>
+          </p:nvPicPr>
+          <p:blipFill>
+            <a:blip r:embed="rId2">
+              <a:extLst>
+                <a:ext uri="{28A0092B-C50C-407E-A947-70E740481C1C}">
+                  <a14:useLocalDpi xmlns:a14="http://schemas.microsoft.com/office/drawing/2010/main" val="0"/>
+                </a:ext>
+              </a:extLst>
+            </a:blip>
+            <a:stretch>
+              <a:fillRect/>
+            </a:stretch>
+          </p:blipFill>
+          <p:spPr>
+            <a:xfrm>
+              <a:off x="2393887" y="2838486"/>
+              <a:ext cx="1703898" cy="1703898"/>
+            </a:xfrm>
+            <a:prstGeom prst="rect">
+              <a:avLst/>
+            </a:prstGeom>
+          </p:spPr>
+        </p:pic>
+      </p:grpSp>
+      <p:sp>
+        <p:nvSpPr>
+          <p:cNvPr id="13" name="Folded Corner 12"/>
+          <p:cNvSpPr/>
+          <p:nvPr/>
+        </p:nvSpPr>
+        <p:spPr>
+          <a:xfrm rot="10800000" flipH="1">
+            <a:off x="6002435" y="3075348"/>
+            <a:ext cx="1037552" cy="1327710"/>
+          </a:xfrm>
+          <a:prstGeom prst="foldedCorner">
+            <a:avLst>
+              <a:gd name="adj" fmla="val 26556"/>
+            </a:avLst>
+          </a:prstGeom>
+          <a:solidFill>
+            <a:srgbClr val="052A48"/>
+          </a:solidFill>
+          <a:ln w="28575" cmpd="sng">
+            <a:solidFill>
+              <a:schemeClr val="bg1"/>
+            </a:solidFill>
+          </a:ln>
+          <a:effectLst/>
+        </p:spPr>
+        <p:style>
+          <a:lnRef idx="1">
+            <a:schemeClr val="accent1"/>
+          </a:lnRef>
+          <a:fillRef idx="3">
+            <a:schemeClr val="accent1"/>
+          </a:fillRef>
+          <a:effectRef idx="2">
+            <a:schemeClr val="accent1"/>
+          </a:effectRef>
+          <a:fontRef idx="minor">
+            <a:schemeClr val="lt1"/>
+          </a:fontRef>
+        </p:style>
+        <p:txBody>
+          <a:bodyPr rtlCol="0" anchor="ctr"/>
+          <a:lstStyle/>
+          <a:p>
+            <a:pPr algn="ctr"/>
+            <a:endParaRPr lang="en-US" sz="1000" u="sng" dirty="0"/>
+          </a:p>
+        </p:txBody>
+      </p:sp>
+    </p:spTree>
+    <p:extLst>
+      <p:ext uri="{BB962C8B-B14F-4D97-AF65-F5344CB8AC3E}">
+        <p14:creationId xmlns:p14="http://schemas.microsoft.com/office/powerpoint/2010/main" val="1333564583"/>
+      </p:ext>
+    </p:extLst>
+  </p:cSld>
+  <p:clrMapOvr>
+    <a:masterClrMapping/>
+  </p:clrMapOvr>
+</p:sld>
+</file>
+
+<file path=ppt/slides/slide11.xml><?xml version="1.0" encoding="utf-8"?>
+<p:sld xmlns:a="http://schemas.openxmlformats.org/drawingml/2006/main" xmlns:r="http://schemas.openxmlformats.org/officeDocument/2006/relationships" xmlns:p="http://schemas.openxmlformats.org/presentationml/2006/main">
+  <p:cSld>
+    <p:spTree>
+      <p:nvGrpSpPr>
+        <p:cNvPr id="1" name=""/>
+        <p:cNvGrpSpPr/>
+        <p:nvPr/>
+      </p:nvGrpSpPr>
+      <p:grpSpPr>
+        <a:xfrm>
+          <a:off x="0" y="0"/>
+          <a:ext cx="0" cy="0"/>
+          <a:chOff x="0" y="0"/>
+          <a:chExt cx="0" cy="0"/>
+        </a:xfrm>
+      </p:grpSpPr>
+      <p:sp>
+        <p:nvSpPr>
+          <p:cNvPr id="27" name="Rounded Rectangle 26"/>
+          <p:cNvSpPr/>
+          <p:nvPr/>
+        </p:nvSpPr>
+        <p:spPr>
+          <a:xfrm>
+            <a:off x="853570" y="853671"/>
+            <a:ext cx="7234527" cy="4851352"/>
+          </a:xfrm>
+          <a:prstGeom prst="roundRect">
+            <a:avLst>
+              <a:gd name="adj" fmla="val 4437"/>
+            </a:avLst>
+          </a:prstGeom>
+          <a:solidFill>
+            <a:srgbClr val="EDEDED"/>
+          </a:solidFill>
+          <a:ln>
+            <a:solidFill>
+              <a:srgbClr val="000000"/>
+            </a:solidFill>
+          </a:ln>
+          <a:effectLst/>
+        </p:spPr>
+        <p:style>
+          <a:lnRef idx="1">
+            <a:schemeClr val="accent1"/>
+          </a:lnRef>
+          <a:fillRef idx="3">
+            <a:schemeClr val="accent1"/>
+          </a:fillRef>
+          <a:effectRef idx="2">
+            <a:schemeClr val="accent1"/>
+          </a:effectRef>
+          <a:fontRef idx="minor">
+            <a:schemeClr val="lt1"/>
+          </a:fontRef>
+        </p:style>
+        <p:txBody>
+          <a:bodyPr rtlCol="0" anchor="ctr"/>
+          <a:lstStyle/>
+          <a:p>
+            <a:pPr algn="ctr"/>
+            <a:endParaRPr lang="en-US"/>
+          </a:p>
+        </p:txBody>
+      </p:sp>
+      <p:sp>
+        <p:nvSpPr>
+          <p:cNvPr id="26" name="Rectangle 25"/>
+          <p:cNvSpPr/>
+          <p:nvPr/>
+        </p:nvSpPr>
+        <p:spPr>
+          <a:xfrm>
+            <a:off x="863980" y="855015"/>
+            <a:ext cx="7213708" cy="923330"/>
+          </a:xfrm>
+          <a:prstGeom prst="rect">
+            <a:avLst/>
+          </a:prstGeom>
+        </p:spPr>
+        <p:txBody>
+          <a:bodyPr wrap="square">
+            <a:spAutoFit/>
+          </a:bodyPr>
+          <a:lstStyle/>
+          <a:p>
+            <a:pPr algn="ctr"/>
+            <a:r>
+              <a:rPr lang="en-US" sz="5400" b="1" dirty="0">
+                <a:solidFill>
+                  <a:srgbClr val="052B48"/>
+                </a:solidFill>
+                <a:latin typeface="Calibri"/>
+                <a:cs typeface="Calibri"/>
+              </a:rPr>
+              <a:t>Parallel I/O using MPI</a:t>
+            </a:r>
+          </a:p>
+        </p:txBody>
+      </p:sp>
+      <p:sp>
+        <p:nvSpPr>
+          <p:cNvPr id="8" name="Folded Corner 7"/>
+          <p:cNvSpPr/>
+          <p:nvPr/>
+        </p:nvSpPr>
+        <p:spPr>
+          <a:xfrm rot="10800000" flipH="1">
+            <a:off x="3767562" y="2807415"/>
+            <a:ext cx="1419941" cy="1900138"/>
+          </a:xfrm>
+          <a:prstGeom prst="foldedCorner">
+            <a:avLst>
+              <a:gd name="adj" fmla="val 26556"/>
+            </a:avLst>
+          </a:prstGeom>
+          <a:solidFill>
+            <a:srgbClr val="052A48"/>
+          </a:solidFill>
+          <a:ln w="28575" cmpd="sng">
+            <a:solidFill>
+              <a:schemeClr val="bg1"/>
+            </a:solidFill>
+          </a:ln>
+          <a:effectLst/>
+        </p:spPr>
+        <p:style>
+          <a:lnRef idx="1">
+            <a:schemeClr val="accent1"/>
+          </a:lnRef>
+          <a:fillRef idx="3">
+            <a:schemeClr val="accent1"/>
+          </a:fillRef>
+          <a:effectRef idx="2">
+            <a:schemeClr val="accent1"/>
+          </a:effectRef>
+          <a:fontRef idx="minor">
+            <a:schemeClr val="lt1"/>
+          </a:fontRef>
+        </p:style>
+        <p:txBody>
+          <a:bodyPr rtlCol="0" anchor="ctr"/>
+          <a:lstStyle/>
+          <a:p>
+            <a:pPr algn="ctr"/>
+            <a:r>
+              <a:rPr lang="en-US" u="sng" dirty="0"/>
+              <a:t>																			   </a:t>
+            </a:r>
           </a:p>
         </p:txBody>
       </p:sp>
@@ -4135,7 +4700,7 @@
               <a:defRPr/>
             </a:pPr>
             <a:r>
-              <a:rPr kumimoji="0" lang="en-US" sz="1800" i="0" u="none" strike="noStrike" kern="0" cap="none" spc="0" normalizeH="0" baseline="0" noProof="0" dirty="0" err="1" smtClean="0">
+              <a:rPr kumimoji="0" lang="en-US" sz="1800" i="0" u="none" strike="noStrike" kern="0" cap="none" spc="0" normalizeH="0" baseline="0" noProof="0" dirty="0" err="1">
                 <a:ln>
                   <a:noFill/>
                 </a:ln>
@@ -4221,7 +4786,7 @@
               <a:defRPr/>
             </a:pPr>
             <a:r>
-              <a:rPr kumimoji="0" lang="en-US" sz="1800" i="0" u="none" strike="noStrike" kern="0" cap="none" spc="0" normalizeH="0" baseline="0" noProof="0" dirty="0" err="1" smtClean="0">
+              <a:rPr kumimoji="0" lang="en-US" sz="1800" i="0" u="none" strike="noStrike" kern="0" cap="none" spc="0" normalizeH="0" baseline="0" noProof="0" dirty="0" err="1">
                 <a:ln>
                   <a:noFill/>
                 </a:ln>
@@ -4307,7 +4872,7 @@
               <a:defRPr/>
             </a:pPr>
             <a:r>
-              <a:rPr kumimoji="0" lang="en-US" sz="1800" i="0" u="none" strike="noStrike" kern="0" cap="none" spc="0" normalizeH="0" baseline="0" noProof="0" dirty="0" err="1" smtClean="0">
+              <a:rPr kumimoji="0" lang="en-US" sz="1800" i="0" u="none" strike="noStrike" kern="0" cap="none" spc="0" normalizeH="0" baseline="0" noProof="0" dirty="0" err="1">
                 <a:ln>
                   <a:noFill/>
                 </a:ln>
@@ -4393,7 +4958,7 @@
               <a:defRPr/>
             </a:pPr>
             <a:r>
-              <a:rPr kumimoji="0" lang="en-US" sz="1800" i="0" u="none" strike="noStrike" kern="0" cap="none" spc="0" normalizeH="0" baseline="0" noProof="0" dirty="0" err="1" smtClean="0">
+              <a:rPr kumimoji="0" lang="en-US" sz="1800" i="0" u="none" strike="noStrike" kern="0" cap="none" spc="0" normalizeH="0" baseline="0" noProof="0" dirty="0" err="1">
                 <a:ln>
                   <a:noFill/>
                 </a:ln>
@@ -4774,7 +5339,7 @@
               <a:defRPr/>
             </a:pPr>
             <a:r>
-              <a:rPr kumimoji="0" lang="en-US" sz="1800" i="0" u="none" strike="noStrike" kern="0" cap="none" spc="0" normalizeH="0" baseline="0" noProof="0" dirty="0" err="1" smtClean="0">
+              <a:rPr kumimoji="0" lang="en-US" sz="1800" i="0" u="none" strike="noStrike" kern="0" cap="none" spc="0" normalizeH="0" baseline="0" noProof="0" dirty="0" err="1">
                 <a:ln>
                   <a:noFill/>
                 </a:ln>
@@ -4919,7 +5484,7 @@
               <a:defRPr/>
             </a:pPr>
             <a:r>
-              <a:rPr kumimoji="0" lang="en-US" sz="1800" i="0" u="none" strike="noStrike" kern="0" cap="none" spc="0" normalizeH="0" baseline="0" noProof="0" dirty="0" err="1" smtClean="0">
+              <a:rPr kumimoji="0" lang="en-US" sz="1800" i="0" u="none" strike="noStrike" kern="0" cap="none" spc="0" normalizeH="0" baseline="0" noProof="0" dirty="0" err="1">
                 <a:ln>
                   <a:noFill/>
                 </a:ln>
@@ -5064,7 +5629,7 @@
               <a:defRPr/>
             </a:pPr>
             <a:r>
-              <a:rPr kumimoji="0" lang="en-US" sz="1800" i="0" u="none" strike="noStrike" kern="0" cap="none" spc="0" normalizeH="0" baseline="0" noProof="0" dirty="0" err="1" smtClean="0">
+              <a:rPr kumimoji="0" lang="en-US" sz="1800" i="0" u="none" strike="noStrike" kern="0" cap="none" spc="0" normalizeH="0" baseline="0" noProof="0" dirty="0" err="1">
                 <a:ln>
                   <a:noFill/>
                 </a:ln>
@@ -5209,7 +5774,7 @@
               <a:defRPr/>
             </a:pPr>
             <a:r>
-              <a:rPr kumimoji="0" lang="en-US" sz="1800" i="0" u="none" strike="noStrike" kern="0" cap="none" spc="0" normalizeH="0" baseline="0" noProof="0" dirty="0" err="1" smtClean="0">
+              <a:rPr kumimoji="0" lang="en-US" sz="1800" i="0" u="none" strike="noStrike" kern="0" cap="none" spc="0" normalizeH="0" baseline="0" noProof="0" dirty="0" err="1">
                 <a:ln>
                   <a:noFill/>
                 </a:ln>
@@ -5259,7 +5824,7 @@
 </p:sld>
 </file>
 
-<file path=ppt/slides/slide11.xml><?xml version="1.0" encoding="utf-8"?>
+<file path=ppt/slides/slide12.xml><?xml version="1.0" encoding="utf-8"?>
 <p:sld xmlns:a="http://schemas.openxmlformats.org/drawingml/2006/main" xmlns:r="http://schemas.openxmlformats.org/officeDocument/2006/relationships" xmlns:p="http://schemas.openxmlformats.org/presentationml/2006/main">
   <p:cSld>
     <p:spTree>
@@ -5348,7 +5913,7 @@
           <a:p>
             <a:pPr algn="ctr"/>
             <a:r>
-              <a:rPr lang="en-US" sz="5400" b="1" dirty="0" smtClean="0">
+              <a:rPr lang="en-US" sz="5400" b="1" dirty="0">
                 <a:solidFill>
                   <a:srgbClr val="052B48"/>
                 </a:solidFill>
@@ -5361,7 +5926,7 @@
           <a:p>
             <a:pPr algn="ctr"/>
             <a:r>
-              <a:rPr lang="en-US" sz="5400" b="1" dirty="0" smtClean="0">
+              <a:rPr lang="en-US" sz="5400" b="1" dirty="0">
                 <a:solidFill>
                   <a:srgbClr val="052B48"/>
                 </a:solidFill>
@@ -5370,13 +5935,6 @@
               </a:rPr>
               <a:t>S3 Bucket</a:t>
             </a:r>
-            <a:endParaRPr lang="en-US" sz="5400" b="1" dirty="0">
-              <a:solidFill>
-                <a:srgbClr val="052B48"/>
-              </a:solidFill>
-              <a:latin typeface="Calibri"/>
-              <a:cs typeface="Calibri"/>
-            </a:endParaRPr>
           </a:p>
         </p:txBody>
       </p:sp>
@@ -5537,10 +6095,9 @@
             <a:p>
               <a:pPr algn="ctr"/>
               <a:r>
-                <a:rPr lang="en-US" u="sng" dirty="0" smtClean="0"/>
+                <a:rPr lang="en-US" u="sng" dirty="0"/>
                 <a:t>												   </a:t>
               </a:r>
-              <a:endParaRPr lang="en-US" u="sng" dirty="0"/>
             </a:p>
           </p:txBody>
         </p:sp>
@@ -5918,14 +6475,14 @@
           <a:p>
             <a:pPr algn="ctr"/>
             <a:r>
-              <a:rPr lang="en-US" sz="1200" dirty="0" smtClean="0">
+              <a:rPr lang="en-US" sz="1200" dirty="0">
                 <a:latin typeface="Courier"/>
                 <a:cs typeface="Courier"/>
               </a:rPr>
               <a:t>010011101000101011101</a:t>
             </a:r>
             <a:r>
-              <a:rPr lang="mr-IN" sz="1200" dirty="0" smtClean="0">
+              <a:rPr lang="mr-IN" sz="1200" dirty="0">
                 <a:latin typeface="Courier"/>
                 <a:cs typeface="Courier"/>
               </a:rPr>
@@ -5981,7 +6538,7 @@
 </p:sld>
 </file>
 
-<file path=ppt/slides/slide12.xml><?xml version="1.0" encoding="utf-8"?>
+<file path=ppt/slides/slide13.xml><?xml version="1.0" encoding="utf-8"?>
 <p:sld xmlns:a="http://schemas.openxmlformats.org/drawingml/2006/main" xmlns:r="http://schemas.openxmlformats.org/officeDocument/2006/relationships" xmlns:p="http://schemas.openxmlformats.org/presentationml/2006/main">
   <p:cSld>
     <p:spTree>
@@ -6070,7 +6627,7 @@
           <a:p>
             <a:pPr algn="ctr"/>
             <a:r>
-              <a:rPr lang="en-US" sz="5400" b="1" dirty="0" smtClean="0">
+              <a:rPr lang="en-US" sz="5400" b="1" dirty="0">
                 <a:solidFill>
                   <a:srgbClr val="052B48"/>
                 </a:solidFill>
@@ -6079,13 +6636,6 @@
               </a:rPr>
               <a:t>Object IDs in NWB</a:t>
             </a:r>
-            <a:endParaRPr lang="en-US" sz="5400" b="1" dirty="0">
-              <a:solidFill>
-                <a:srgbClr val="052B48"/>
-              </a:solidFill>
-              <a:latin typeface="Calibri"/>
-              <a:cs typeface="Calibri"/>
-            </a:endParaRPr>
           </a:p>
         </p:txBody>
       </p:sp>
@@ -6201,7 +6751,7 @@
 </p:sld>
 </file>
 
-<file path=ppt/slides/slide13.xml><?xml version="1.0" encoding="utf-8"?>
+<file path=ppt/slides/slide14.xml><?xml version="1.0" encoding="utf-8"?>
 <p:sld xmlns:a="http://schemas.openxmlformats.org/drawingml/2006/main" xmlns:r="http://schemas.openxmlformats.org/officeDocument/2006/relationships" xmlns:p="http://schemas.openxmlformats.org/presentationml/2006/main">
   <p:cSld>
     <p:spTree>
@@ -6290,7 +6840,7 @@
           <a:p>
             <a:pPr algn="ctr"/>
             <a:r>
-              <a:rPr lang="en-US" sz="5400" b="1" dirty="0" smtClean="0">
+              <a:rPr lang="en-US" sz="5400" b="1" dirty="0">
                 <a:solidFill>
                   <a:srgbClr val="052B48"/>
                 </a:solidFill>
@@ -6299,13 +6849,6 @@
               </a:rPr>
               <a:t>Annotating Time Intervals</a:t>
             </a:r>
-            <a:endParaRPr lang="en-US" sz="5400" b="1" dirty="0">
-              <a:solidFill>
-                <a:srgbClr val="052B48"/>
-              </a:solidFill>
-              <a:latin typeface="Calibri"/>
-              <a:cs typeface="Calibri"/>
-            </a:endParaRPr>
           </a:p>
         </p:txBody>
       </p:sp>
@@ -6713,7 +7256,7 @@
           <a:lstStyle/>
           <a:p>
             <a:r>
-              <a:rPr lang="en-US" b="1" dirty="0" smtClean="0">
+              <a:rPr lang="en-US" b="1" dirty="0">
                 <a:solidFill>
                   <a:srgbClr val="052B48"/>
                 </a:solidFill>
@@ -6757,19 +7300,7 @@
                 <a:latin typeface="Calibri"/>
                 <a:cs typeface="Calibri"/>
               </a:rPr>
-              <a:t>e</a:t>
-            </a:r>
-            <a:r>
-              <a:rPr lang="en-US" sz="2800" b="1" dirty="0" smtClean="0">
-                <a:solidFill>
-                  <a:schemeClr val="accent5">
-                    <a:lumMod val="75000"/>
-                  </a:schemeClr>
-                </a:solidFill>
-                <a:latin typeface="Calibri"/>
-                <a:cs typeface="Calibri"/>
-              </a:rPr>
-              <a:t>poch 1</a:t>
+              <a:t>epoch 1</a:t>
             </a:r>
             <a:endParaRPr lang="en-US" sz="2800" dirty="0">
               <a:solidFill>
@@ -6810,17 +7341,7 @@
                 <a:latin typeface="Calibri"/>
                 <a:cs typeface="Calibri"/>
               </a:rPr>
-              <a:t>e</a:t>
-            </a:r>
-            <a:r>
-              <a:rPr lang="en-US" sz="2800" b="1" dirty="0" smtClean="0">
-                <a:solidFill>
-                  <a:schemeClr val="accent6"/>
-                </a:solidFill>
-                <a:latin typeface="Calibri"/>
-                <a:cs typeface="Calibri"/>
-              </a:rPr>
-              <a:t>poch n</a:t>
+              <a:t>epoch n</a:t>
             </a:r>
             <a:endParaRPr lang="en-US" sz="2800" dirty="0">
               <a:solidFill>
@@ -7011,7 +7532,7 @@
           <a:lstStyle/>
           <a:p>
             <a:r>
-              <a:rPr lang="en-US" sz="2800" b="1" dirty="0" smtClean="0">
+              <a:rPr lang="en-US" sz="2800" b="1" dirty="0">
                 <a:solidFill>
                   <a:srgbClr val="FF0000"/>
                 </a:solidFill>
@@ -7098,7 +7619,7 @@
 </p:sld>
 </file>
 
-<file path=ppt/slides/slide14.xml><?xml version="1.0" encoding="utf-8"?>
+<file path=ppt/slides/slide15.xml><?xml version="1.0" encoding="utf-8"?>
 <p:sld xmlns:a="http://schemas.openxmlformats.org/drawingml/2006/main" xmlns:r="http://schemas.openxmlformats.org/officeDocument/2006/relationships" xmlns:p="http://schemas.openxmlformats.org/presentationml/2006/main">
   <p:cSld>
     <p:spTree>
@@ -7187,7 +7708,7 @@
           <a:p>
             <a:pPr algn="ctr"/>
             <a:r>
-              <a:rPr lang="en-US" sz="5400" b="1" dirty="0" smtClean="0">
+              <a:rPr lang="en-US" sz="5400" b="1" dirty="0">
                 <a:solidFill>
                   <a:srgbClr val="052B48"/>
                 </a:solidFill>
@@ -7196,13 +7717,6 @@
               </a:rPr>
               <a:t>Extending NWB</a:t>
             </a:r>
-            <a:endParaRPr lang="en-US" sz="5400" b="1" dirty="0">
-              <a:solidFill>
-                <a:srgbClr val="052B48"/>
-              </a:solidFill>
-              <a:latin typeface="Calibri"/>
-              <a:cs typeface="Calibri"/>
-            </a:endParaRPr>
           </a:p>
         </p:txBody>
       </p:sp>
@@ -7238,338 +7752,6 @@
     <p:extLst>
       <p:ext uri="{BB962C8B-B14F-4D97-AF65-F5344CB8AC3E}">
         <p14:creationId xmlns:p14="http://schemas.microsoft.com/office/powerpoint/2010/main" val="3305643027"/>
-      </p:ext>
-    </p:extLst>
-  </p:cSld>
-  <p:clrMapOvr>
-    <a:masterClrMapping/>
-  </p:clrMapOvr>
-</p:sld>
-</file>
-
-<file path=ppt/slides/slide15.xml><?xml version="1.0" encoding="utf-8"?>
-<p:sld xmlns:a="http://schemas.openxmlformats.org/drawingml/2006/main" xmlns:r="http://schemas.openxmlformats.org/officeDocument/2006/relationships" xmlns:p="http://schemas.openxmlformats.org/presentationml/2006/main">
-  <p:cSld>
-    <p:spTree>
-      <p:nvGrpSpPr>
-        <p:cNvPr id="1" name=""/>
-        <p:cNvGrpSpPr/>
-        <p:nvPr/>
-      </p:nvGrpSpPr>
-      <p:grpSpPr>
-        <a:xfrm>
-          <a:off x="0" y="0"/>
-          <a:ext cx="0" cy="0"/>
-          <a:chOff x="0" y="0"/>
-          <a:chExt cx="0" cy="0"/>
-        </a:xfrm>
-      </p:grpSpPr>
-      <p:sp>
-        <p:nvSpPr>
-          <p:cNvPr id="27" name="Rounded Rectangle 26"/>
-          <p:cNvSpPr/>
-          <p:nvPr/>
-        </p:nvSpPr>
-        <p:spPr>
-          <a:xfrm>
-            <a:off x="853570" y="853671"/>
-            <a:ext cx="7234527" cy="4851352"/>
-          </a:xfrm>
-          <a:prstGeom prst="roundRect">
-            <a:avLst>
-              <a:gd name="adj" fmla="val 4437"/>
-            </a:avLst>
-          </a:prstGeom>
-          <a:solidFill>
-            <a:srgbClr val="EDEDED"/>
-          </a:solidFill>
-          <a:ln>
-            <a:solidFill>
-              <a:srgbClr val="000000"/>
-            </a:solidFill>
-          </a:ln>
-          <a:effectLst/>
-        </p:spPr>
-        <p:style>
-          <a:lnRef idx="1">
-            <a:schemeClr val="accent1"/>
-          </a:lnRef>
-          <a:fillRef idx="3">
-            <a:schemeClr val="accent1"/>
-          </a:fillRef>
-          <a:effectRef idx="2">
-            <a:schemeClr val="accent1"/>
-          </a:effectRef>
-          <a:fontRef idx="minor">
-            <a:schemeClr val="lt1"/>
-          </a:fontRef>
-        </p:style>
-        <p:txBody>
-          <a:bodyPr rtlCol="0" anchor="ctr"/>
-          <a:lstStyle/>
-          <a:p>
-            <a:pPr algn="ctr"/>
-            <a:endParaRPr lang="en-US"/>
-          </a:p>
-        </p:txBody>
-      </p:sp>
-      <p:sp>
-        <p:nvSpPr>
-          <p:cNvPr id="26" name="Rectangle 25"/>
-          <p:cNvSpPr/>
-          <p:nvPr/>
-        </p:nvSpPr>
-        <p:spPr>
-          <a:xfrm>
-            <a:off x="863980" y="855015"/>
-            <a:ext cx="7213708" cy="2585323"/>
-          </a:xfrm>
-          <a:prstGeom prst="rect">
-            <a:avLst/>
-          </a:prstGeom>
-        </p:spPr>
-        <p:txBody>
-          <a:bodyPr wrap="square">
-            <a:spAutoFit/>
-          </a:bodyPr>
-          <a:lstStyle/>
-          <a:p>
-            <a:pPr algn="ctr"/>
-            <a:r>
-              <a:rPr lang="en-US" sz="5400" b="1" dirty="0" smtClean="0">
-                <a:solidFill>
-                  <a:srgbClr val="052B48"/>
-                </a:solidFill>
-                <a:latin typeface="Calibri"/>
-                <a:cs typeface="Calibri"/>
-              </a:rPr>
-              <a:t>Adding/Removing Containers from an NWB File </a:t>
-            </a:r>
-            <a:endParaRPr lang="en-US" sz="5400" b="1" dirty="0">
-              <a:solidFill>
-                <a:srgbClr val="052B48"/>
-              </a:solidFill>
-              <a:latin typeface="Calibri"/>
-              <a:cs typeface="Calibri"/>
-            </a:endParaRPr>
-          </a:p>
-        </p:txBody>
-      </p:sp>
-      <p:sp>
-        <p:nvSpPr>
-          <p:cNvPr id="3" name="Folded Corner 2"/>
-          <p:cNvSpPr/>
-          <p:nvPr/>
-        </p:nvSpPr>
-        <p:spPr>
-          <a:xfrm rot="10800000" flipH="1">
-            <a:off x="3839842" y="3460251"/>
-            <a:ext cx="1419941" cy="1900138"/>
-          </a:xfrm>
-          <a:prstGeom prst="foldedCorner">
-            <a:avLst>
-              <a:gd name="adj" fmla="val 26556"/>
-            </a:avLst>
-          </a:prstGeom>
-          <a:solidFill>
-            <a:srgbClr val="052A48"/>
-          </a:solidFill>
-          <a:ln w="28575" cmpd="sng">
-            <a:solidFill>
-              <a:schemeClr val="bg1"/>
-            </a:solidFill>
-          </a:ln>
-          <a:effectLst/>
-        </p:spPr>
-        <p:style>
-          <a:lnRef idx="1">
-            <a:schemeClr val="accent1"/>
-          </a:lnRef>
-          <a:fillRef idx="3">
-            <a:schemeClr val="accent1"/>
-          </a:fillRef>
-          <a:effectRef idx="2">
-            <a:schemeClr val="accent1"/>
-          </a:effectRef>
-          <a:fontRef idx="minor">
-            <a:schemeClr val="lt1"/>
-          </a:fontRef>
-        </p:style>
-        <p:txBody>
-          <a:bodyPr rtlCol="0" anchor="ctr"/>
-          <a:lstStyle/>
-          <a:p>
-            <a:pPr algn="ctr"/>
-            <a:r>
-              <a:rPr lang="en-US" u="sng" dirty="0" smtClean="0"/>
-              <a:t>																			   </a:t>
-            </a:r>
-            <a:endParaRPr lang="en-US" u="sng" dirty="0"/>
-          </a:p>
-        </p:txBody>
-      </p:sp>
-      <p:sp>
-        <p:nvSpPr>
-          <p:cNvPr id="4" name="Oval 3"/>
-          <p:cNvSpPr/>
-          <p:nvPr/>
-        </p:nvSpPr>
-        <p:spPr>
-          <a:xfrm>
-            <a:off x="4939826" y="5048168"/>
-            <a:ext cx="579977" cy="601510"/>
-          </a:xfrm>
-          <a:prstGeom prst="ellipse">
-            <a:avLst/>
-          </a:prstGeom>
-          <a:solidFill>
-            <a:srgbClr val="052A48"/>
-          </a:solidFill>
-          <a:ln w="76200" cmpd="sng">
-            <a:solidFill>
-              <a:srgbClr val="FFFFFF"/>
-            </a:solidFill>
-          </a:ln>
-          <a:effectLst/>
-        </p:spPr>
-        <p:style>
-          <a:lnRef idx="1">
-            <a:schemeClr val="accent1"/>
-          </a:lnRef>
-          <a:fillRef idx="3">
-            <a:schemeClr val="accent1"/>
-          </a:fillRef>
-          <a:effectRef idx="2">
-            <a:schemeClr val="accent1"/>
-          </a:effectRef>
-          <a:fontRef idx="minor">
-            <a:schemeClr val="lt1"/>
-          </a:fontRef>
-        </p:style>
-        <p:txBody>
-          <a:bodyPr rtlCol="0" anchor="ctr"/>
-          <a:lstStyle/>
-          <a:p>
-            <a:endParaRPr lang="en-US" sz="4400" dirty="0"/>
-          </a:p>
-        </p:txBody>
-      </p:sp>
-      <p:sp>
-        <p:nvSpPr>
-          <p:cNvPr id="5" name="Rectangle 4"/>
-          <p:cNvSpPr/>
-          <p:nvPr/>
-        </p:nvSpPr>
-        <p:spPr>
-          <a:xfrm>
-            <a:off x="5013201" y="4804441"/>
-            <a:ext cx="415273" cy="923330"/>
-          </a:xfrm>
-          <a:prstGeom prst="rect">
-            <a:avLst/>
-          </a:prstGeom>
-          <a:effectLst/>
-        </p:spPr>
-        <p:txBody>
-          <a:bodyPr wrap="none">
-            <a:spAutoFit/>
-          </a:bodyPr>
-          <a:lstStyle/>
-          <a:p>
-            <a:r>
-              <a:rPr lang="en-US" sz="5400" b="1" dirty="0">
-                <a:solidFill>
-                  <a:schemeClr val="bg1"/>
-                </a:solidFill>
-              </a:rPr>
-              <a:t>-</a:t>
-            </a:r>
-          </a:p>
-        </p:txBody>
-      </p:sp>
-      <p:sp>
-        <p:nvSpPr>
-          <p:cNvPr id="8" name="Oval 7"/>
-          <p:cNvSpPr/>
-          <p:nvPr/>
-        </p:nvSpPr>
-        <p:spPr>
-          <a:xfrm>
-            <a:off x="4942253" y="4360489"/>
-            <a:ext cx="579977" cy="601510"/>
-          </a:xfrm>
-          <a:prstGeom prst="ellipse">
-            <a:avLst/>
-          </a:prstGeom>
-          <a:solidFill>
-            <a:srgbClr val="052A48"/>
-          </a:solidFill>
-          <a:ln w="76200" cmpd="sng">
-            <a:solidFill>
-              <a:srgbClr val="FFFFFF"/>
-            </a:solidFill>
-          </a:ln>
-          <a:effectLst/>
-        </p:spPr>
-        <p:style>
-          <a:lnRef idx="1">
-            <a:schemeClr val="accent1"/>
-          </a:lnRef>
-          <a:fillRef idx="3">
-            <a:schemeClr val="accent1"/>
-          </a:fillRef>
-          <a:effectRef idx="2">
-            <a:schemeClr val="accent1"/>
-          </a:effectRef>
-          <a:fontRef idx="minor">
-            <a:schemeClr val="lt1"/>
-          </a:fontRef>
-        </p:style>
-        <p:txBody>
-          <a:bodyPr rtlCol="0" anchor="ctr"/>
-          <a:lstStyle/>
-          <a:p>
-            <a:endParaRPr lang="en-US" sz="4400" dirty="0"/>
-          </a:p>
-        </p:txBody>
-      </p:sp>
-      <p:sp>
-        <p:nvSpPr>
-          <p:cNvPr id="9" name="Rectangle 8"/>
-          <p:cNvSpPr/>
-          <p:nvPr/>
-        </p:nvSpPr>
-        <p:spPr>
-          <a:xfrm>
-            <a:off x="4975628" y="4256776"/>
-            <a:ext cx="514183" cy="769441"/>
-          </a:xfrm>
-          <a:prstGeom prst="rect">
-            <a:avLst/>
-          </a:prstGeom>
-          <a:effectLst/>
-        </p:spPr>
-        <p:txBody>
-          <a:bodyPr wrap="none">
-            <a:spAutoFit/>
-          </a:bodyPr>
-          <a:lstStyle/>
-          <a:p>
-            <a:r>
-              <a:rPr lang="en-US" sz="4400" b="1" dirty="0">
-                <a:solidFill>
-                  <a:schemeClr val="bg1"/>
-                </a:solidFill>
-              </a:rPr>
-              <a:t>+</a:t>
-            </a:r>
-          </a:p>
-        </p:txBody>
-      </p:sp>
-    </p:spTree>
-    <p:extLst>
-      <p:ext uri="{BB962C8B-B14F-4D97-AF65-F5344CB8AC3E}">
-        <p14:creationId xmlns:p14="http://schemas.microsoft.com/office/powerpoint/2010/main" val="3909940052"/>
       </p:ext>
     </p:extLst>
   </p:cSld>
@@ -7654,7 +7836,7 @@
         <p:spPr>
           <a:xfrm>
             <a:off x="863980" y="855015"/>
-            <a:ext cx="7213708" cy="923330"/>
+            <a:ext cx="7213708" cy="2585323"/>
           </a:xfrm>
           <a:prstGeom prst="rect">
             <a:avLst/>
@@ -7668,35 +7850,28 @@
           <a:p>
             <a:pPr algn="ctr"/>
             <a:r>
-              <a:rPr lang="en-US" sz="5400" b="1" dirty="0" smtClean="0">
+              <a:rPr lang="en-US" sz="5400" b="1" dirty="0">
                 <a:solidFill>
                   <a:srgbClr val="052B48"/>
                 </a:solidFill>
                 <a:latin typeface="Calibri"/>
                 <a:cs typeface="Calibri"/>
               </a:rPr>
-              <a:t>NWB File Basics</a:t>
+              <a:t>Adding/Removing Containers from an NWB File </a:t>
             </a:r>
-            <a:endParaRPr lang="en-US" sz="5400" b="1" dirty="0">
-              <a:solidFill>
-                <a:srgbClr val="052B48"/>
-              </a:solidFill>
-              <a:latin typeface="Calibri"/>
-              <a:cs typeface="Calibri"/>
-            </a:endParaRPr>
           </a:p>
         </p:txBody>
       </p:sp>
       <p:sp>
         <p:nvSpPr>
-          <p:cNvPr id="13" name="Folded Corner 12"/>
+          <p:cNvPr id="3" name="Folded Corner 2"/>
           <p:cNvSpPr/>
           <p:nvPr/>
         </p:nvSpPr>
         <p:spPr>
           <a:xfrm rot="10800000" flipH="1">
-            <a:off x="3539854" y="2150156"/>
-            <a:ext cx="2489899" cy="3390248"/>
+            <a:off x="3839842" y="3460251"/>
+            <a:ext cx="1419941" cy="1900138"/>
           </a:xfrm>
           <a:prstGeom prst="foldedCorner">
             <a:avLst>
@@ -7706,7 +7881,7 @@
           <a:solidFill>
             <a:srgbClr val="052A48"/>
           </a:solidFill>
-          <a:ln w="38100" cmpd="sng">
+          <a:ln w="28575" cmpd="sng">
             <a:solidFill>
               <a:schemeClr val="bg1"/>
             </a:solidFill>
@@ -7733,33 +7908,32 @@
           <a:p>
             <a:pPr algn="ctr"/>
             <a:r>
-              <a:rPr lang="en-US" sz="2400" u="sng" dirty="0" smtClean="0"/>
-              <a:t>																														   </a:t>
+              <a:rPr lang="en-US" u="sng" dirty="0"/>
+              <a:t>																			   </a:t>
             </a:r>
-            <a:endParaRPr lang="en-US" sz="2400" u="sng" dirty="0"/>
           </a:p>
         </p:txBody>
       </p:sp>
       <p:sp>
         <p:nvSpPr>
-          <p:cNvPr id="15" name="Oval 14"/>
+          <p:cNvPr id="4" name="Oval 3"/>
           <p:cNvSpPr/>
           <p:nvPr/>
         </p:nvSpPr>
         <p:spPr>
           <a:xfrm>
-            <a:off x="2409917" y="1840138"/>
-            <a:ext cx="2478024" cy="2481818"/>
+            <a:off x="4939826" y="5048168"/>
+            <a:ext cx="579977" cy="601510"/>
           </a:xfrm>
           <a:prstGeom prst="ellipse">
             <a:avLst/>
           </a:prstGeom>
           <a:solidFill>
-            <a:schemeClr val="bg1"/>
+            <a:srgbClr val="052A48"/>
           </a:solidFill>
           <a:ln w="76200" cmpd="sng">
             <a:solidFill>
-              <a:srgbClr val="052A48"/>
+              <a:srgbClr val="FFFFFF"/>
             </a:solidFill>
           </a:ln>
           <a:effectLst/>
@@ -7786,40 +7960,122 @@
           </a:p>
         </p:txBody>
       </p:sp>
-      <p:pic>
-        <p:nvPicPr>
-          <p:cNvPr id="3" name="Picture 2" descr="logo_brain_transp_512x512.png"/>
-          <p:cNvPicPr>
-            <a:picLocks noChangeAspect="1"/>
-          </p:cNvPicPr>
-          <p:nvPr/>
-        </p:nvPicPr>
-        <p:blipFill>
-          <a:blip r:embed="rId2">
-            <a:extLst>
-              <a:ext uri="{28A0092B-C50C-407E-A947-70E740481C1C}">
-                <a14:useLocalDpi xmlns:a14="http://schemas.microsoft.com/office/drawing/2010/main" val="0"/>
-              </a:ext>
-            </a:extLst>
-          </a:blip>
-          <a:stretch>
-            <a:fillRect/>
-          </a:stretch>
-        </p:blipFill>
+      <p:sp>
+        <p:nvSpPr>
+          <p:cNvPr id="5" name="Rectangle 4"/>
+          <p:cNvSpPr/>
+          <p:nvPr/>
+        </p:nvSpPr>
         <p:spPr>
           <a:xfrm>
-            <a:off x="2642554" y="2065594"/>
-            <a:ext cx="2154717" cy="2154717"/>
+            <a:off x="5013201" y="4804441"/>
+            <a:ext cx="415273" cy="923330"/>
           </a:xfrm>
           <a:prstGeom prst="rect">
             <a:avLst/>
           </a:prstGeom>
-        </p:spPr>
-      </p:pic>
+          <a:effectLst/>
+        </p:spPr>
+        <p:txBody>
+          <a:bodyPr wrap="none">
+            <a:spAutoFit/>
+          </a:bodyPr>
+          <a:lstStyle/>
+          <a:p>
+            <a:r>
+              <a:rPr lang="en-US" sz="5400" b="1" dirty="0">
+                <a:solidFill>
+                  <a:schemeClr val="bg1"/>
+                </a:solidFill>
+              </a:rPr>
+              <a:t>-</a:t>
+            </a:r>
+          </a:p>
+        </p:txBody>
+      </p:sp>
+      <p:sp>
+        <p:nvSpPr>
+          <p:cNvPr id="8" name="Oval 7"/>
+          <p:cNvSpPr/>
+          <p:nvPr/>
+        </p:nvSpPr>
+        <p:spPr>
+          <a:xfrm>
+            <a:off x="4942253" y="4360489"/>
+            <a:ext cx="579977" cy="601510"/>
+          </a:xfrm>
+          <a:prstGeom prst="ellipse">
+            <a:avLst/>
+          </a:prstGeom>
+          <a:solidFill>
+            <a:srgbClr val="052A48"/>
+          </a:solidFill>
+          <a:ln w="76200" cmpd="sng">
+            <a:solidFill>
+              <a:srgbClr val="FFFFFF"/>
+            </a:solidFill>
+          </a:ln>
+          <a:effectLst/>
+        </p:spPr>
+        <p:style>
+          <a:lnRef idx="1">
+            <a:schemeClr val="accent1"/>
+          </a:lnRef>
+          <a:fillRef idx="3">
+            <a:schemeClr val="accent1"/>
+          </a:fillRef>
+          <a:effectRef idx="2">
+            <a:schemeClr val="accent1"/>
+          </a:effectRef>
+          <a:fontRef idx="minor">
+            <a:schemeClr val="lt1"/>
+          </a:fontRef>
+        </p:style>
+        <p:txBody>
+          <a:bodyPr rtlCol="0" anchor="ctr"/>
+          <a:lstStyle/>
+          <a:p>
+            <a:endParaRPr lang="en-US" sz="4400" dirty="0"/>
+          </a:p>
+        </p:txBody>
+      </p:sp>
+      <p:sp>
+        <p:nvSpPr>
+          <p:cNvPr id="9" name="Rectangle 8"/>
+          <p:cNvSpPr/>
+          <p:nvPr/>
+        </p:nvSpPr>
+        <p:spPr>
+          <a:xfrm>
+            <a:off x="4975628" y="4256776"/>
+            <a:ext cx="514183" cy="769441"/>
+          </a:xfrm>
+          <a:prstGeom prst="rect">
+            <a:avLst/>
+          </a:prstGeom>
+          <a:effectLst/>
+        </p:spPr>
+        <p:txBody>
+          <a:bodyPr wrap="none">
+            <a:spAutoFit/>
+          </a:bodyPr>
+          <a:lstStyle/>
+          <a:p>
+            <a:r>
+              <a:rPr lang="en-US" sz="4400" b="1" dirty="0">
+                <a:solidFill>
+                  <a:schemeClr val="bg1"/>
+                </a:solidFill>
+              </a:rPr>
+              <a:t>+</a:t>
+            </a:r>
+          </a:p>
+        </p:txBody>
+      </p:sp>
     </p:spTree>
     <p:extLst>
       <p:ext uri="{BB962C8B-B14F-4D97-AF65-F5344CB8AC3E}">
-        <p14:creationId xmlns:p14="http://schemas.microsoft.com/office/powerpoint/2010/main" val="1847033829"/>
+        <p14:creationId xmlns:p14="http://schemas.microsoft.com/office/powerpoint/2010/main" val="3909940052"/>
       </p:ext>
     </p:extLst>
   </p:cSld>
@@ -7904,7 +8160,7 @@
         <p:spPr>
           <a:xfrm>
             <a:off x="863980" y="855015"/>
-            <a:ext cx="7213708" cy="1754327"/>
+            <a:ext cx="7213708" cy="923330"/>
           </a:xfrm>
           <a:prstGeom prst="rect">
             <a:avLst/>
@@ -7918,22 +8174,15 @@
           <a:p>
             <a:pPr algn="ctr"/>
             <a:r>
-              <a:rPr lang="en-US" sz="5400" b="1" dirty="0" smtClean="0">
+              <a:rPr lang="en-US" sz="5400" b="1" dirty="0">
                 <a:solidFill>
                   <a:srgbClr val="052B48"/>
                 </a:solidFill>
                 <a:latin typeface="Calibri"/>
                 <a:cs typeface="Calibri"/>
               </a:rPr>
-              <a:t>Exploratory Data Analysis with NWB</a:t>
+              <a:t>NWB File Basics</a:t>
             </a:r>
-            <a:endParaRPr lang="en-US" sz="5400" b="1" dirty="0">
-              <a:solidFill>
-                <a:srgbClr val="052B48"/>
-              </a:solidFill>
-              <a:latin typeface="Calibri"/>
-              <a:cs typeface="Calibri"/>
-            </a:endParaRPr>
           </a:p>
         </p:txBody>
       </p:sp>
@@ -7945,8 +8194,8 @@
         </p:nvSpPr>
         <p:spPr>
           <a:xfrm rot="10800000" flipH="1">
-            <a:off x="3223450" y="2690195"/>
-            <a:ext cx="2526317" cy="2896081"/>
+            <a:off x="3539854" y="2150156"/>
+            <a:ext cx="2489899" cy="3390248"/>
           </a:xfrm>
           <a:prstGeom prst="foldedCorner">
             <a:avLst>
@@ -7983,10 +8232,251 @@
           <a:p>
             <a:pPr algn="ctr"/>
             <a:r>
-              <a:rPr lang="en-US" u="sng" dirty="0" smtClean="0"/>
+              <a:rPr lang="en-US" sz="2400" u="sng" dirty="0"/>
+              <a:t>																														   </a:t>
+            </a:r>
+          </a:p>
+        </p:txBody>
+      </p:sp>
+      <p:sp>
+        <p:nvSpPr>
+          <p:cNvPr id="15" name="Oval 14"/>
+          <p:cNvSpPr/>
+          <p:nvPr/>
+        </p:nvSpPr>
+        <p:spPr>
+          <a:xfrm>
+            <a:off x="2409917" y="1840138"/>
+            <a:ext cx="2478024" cy="2481818"/>
+          </a:xfrm>
+          <a:prstGeom prst="ellipse">
+            <a:avLst/>
+          </a:prstGeom>
+          <a:solidFill>
+            <a:schemeClr val="bg1"/>
+          </a:solidFill>
+          <a:ln w="76200" cmpd="sng">
+            <a:solidFill>
+              <a:srgbClr val="052A48"/>
+            </a:solidFill>
+          </a:ln>
+          <a:effectLst/>
+        </p:spPr>
+        <p:style>
+          <a:lnRef idx="1">
+            <a:schemeClr val="accent1"/>
+          </a:lnRef>
+          <a:fillRef idx="3">
+            <a:schemeClr val="accent1"/>
+          </a:fillRef>
+          <a:effectRef idx="2">
+            <a:schemeClr val="accent1"/>
+          </a:effectRef>
+          <a:fontRef idx="minor">
+            <a:schemeClr val="lt1"/>
+          </a:fontRef>
+        </p:style>
+        <p:txBody>
+          <a:bodyPr rtlCol="0" anchor="ctr"/>
+          <a:lstStyle/>
+          <a:p>
+            <a:endParaRPr lang="en-US" sz="4400" dirty="0"/>
+          </a:p>
+        </p:txBody>
+      </p:sp>
+      <p:pic>
+        <p:nvPicPr>
+          <p:cNvPr id="3" name="Picture 2" descr="logo_brain_transp_512x512.png"/>
+          <p:cNvPicPr>
+            <a:picLocks noChangeAspect="1"/>
+          </p:cNvPicPr>
+          <p:nvPr/>
+        </p:nvPicPr>
+        <p:blipFill>
+          <a:blip r:embed="rId2">
+            <a:extLst>
+              <a:ext uri="{28A0092B-C50C-407E-A947-70E740481C1C}">
+                <a14:useLocalDpi xmlns:a14="http://schemas.microsoft.com/office/drawing/2010/main" val="0"/>
+              </a:ext>
+            </a:extLst>
+          </a:blip>
+          <a:stretch>
+            <a:fillRect/>
+          </a:stretch>
+        </p:blipFill>
+        <p:spPr>
+          <a:xfrm>
+            <a:off x="2642554" y="2065594"/>
+            <a:ext cx="2154717" cy="2154717"/>
+          </a:xfrm>
+          <a:prstGeom prst="rect">
+            <a:avLst/>
+          </a:prstGeom>
+        </p:spPr>
+      </p:pic>
+    </p:spTree>
+    <p:extLst>
+      <p:ext uri="{BB962C8B-B14F-4D97-AF65-F5344CB8AC3E}">
+        <p14:creationId xmlns:p14="http://schemas.microsoft.com/office/powerpoint/2010/main" val="1847033829"/>
+      </p:ext>
+    </p:extLst>
+  </p:cSld>
+  <p:clrMapOvr>
+    <a:masterClrMapping/>
+  </p:clrMapOvr>
+</p:sld>
+</file>
+
+<file path=ppt/slides/slide18.xml><?xml version="1.0" encoding="utf-8"?>
+<p:sld xmlns:a="http://schemas.openxmlformats.org/drawingml/2006/main" xmlns:r="http://schemas.openxmlformats.org/officeDocument/2006/relationships" xmlns:p="http://schemas.openxmlformats.org/presentationml/2006/main">
+  <p:cSld>
+    <p:spTree>
+      <p:nvGrpSpPr>
+        <p:cNvPr id="1" name=""/>
+        <p:cNvGrpSpPr/>
+        <p:nvPr/>
+      </p:nvGrpSpPr>
+      <p:grpSpPr>
+        <a:xfrm>
+          <a:off x="0" y="0"/>
+          <a:ext cx="0" cy="0"/>
+          <a:chOff x="0" y="0"/>
+          <a:chExt cx="0" cy="0"/>
+        </a:xfrm>
+      </p:grpSpPr>
+      <p:sp>
+        <p:nvSpPr>
+          <p:cNvPr id="27" name="Rounded Rectangle 26"/>
+          <p:cNvSpPr/>
+          <p:nvPr/>
+        </p:nvSpPr>
+        <p:spPr>
+          <a:xfrm>
+            <a:off x="853570" y="853671"/>
+            <a:ext cx="7234527" cy="4851352"/>
+          </a:xfrm>
+          <a:prstGeom prst="roundRect">
+            <a:avLst>
+              <a:gd name="adj" fmla="val 4437"/>
+            </a:avLst>
+          </a:prstGeom>
+          <a:solidFill>
+            <a:srgbClr val="EDEDED"/>
+          </a:solidFill>
+          <a:ln>
+            <a:solidFill>
+              <a:srgbClr val="000000"/>
+            </a:solidFill>
+          </a:ln>
+          <a:effectLst/>
+        </p:spPr>
+        <p:style>
+          <a:lnRef idx="1">
+            <a:schemeClr val="accent1"/>
+          </a:lnRef>
+          <a:fillRef idx="3">
+            <a:schemeClr val="accent1"/>
+          </a:fillRef>
+          <a:effectRef idx="2">
+            <a:schemeClr val="accent1"/>
+          </a:effectRef>
+          <a:fontRef idx="minor">
+            <a:schemeClr val="lt1"/>
+          </a:fontRef>
+        </p:style>
+        <p:txBody>
+          <a:bodyPr rtlCol="0" anchor="ctr"/>
+          <a:lstStyle/>
+          <a:p>
+            <a:pPr algn="ctr"/>
+            <a:endParaRPr lang="en-US"/>
+          </a:p>
+        </p:txBody>
+      </p:sp>
+      <p:sp>
+        <p:nvSpPr>
+          <p:cNvPr id="26" name="Rectangle 25"/>
+          <p:cNvSpPr/>
+          <p:nvPr/>
+        </p:nvSpPr>
+        <p:spPr>
+          <a:xfrm>
+            <a:off x="863980" y="855015"/>
+            <a:ext cx="7213708" cy="1754327"/>
+          </a:xfrm>
+          <a:prstGeom prst="rect">
+            <a:avLst/>
+          </a:prstGeom>
+        </p:spPr>
+        <p:txBody>
+          <a:bodyPr wrap="square">
+            <a:spAutoFit/>
+          </a:bodyPr>
+          <a:lstStyle/>
+          <a:p>
+            <a:pPr algn="ctr"/>
+            <a:r>
+              <a:rPr lang="en-US" sz="5400" b="1" dirty="0">
+                <a:solidFill>
+                  <a:srgbClr val="052B48"/>
+                </a:solidFill>
+                <a:latin typeface="Calibri"/>
+                <a:cs typeface="Calibri"/>
+              </a:rPr>
+              <a:t>Exploratory Data Analysis with NWB</a:t>
+            </a:r>
+          </a:p>
+        </p:txBody>
+      </p:sp>
+      <p:sp>
+        <p:nvSpPr>
+          <p:cNvPr id="13" name="Folded Corner 12"/>
+          <p:cNvSpPr/>
+          <p:nvPr/>
+        </p:nvSpPr>
+        <p:spPr>
+          <a:xfrm rot="10800000" flipH="1">
+            <a:off x="3223450" y="2690195"/>
+            <a:ext cx="2526317" cy="2896081"/>
+          </a:xfrm>
+          <a:prstGeom prst="foldedCorner">
+            <a:avLst>
+              <a:gd name="adj" fmla="val 26556"/>
+            </a:avLst>
+          </a:prstGeom>
+          <a:solidFill>
+            <a:srgbClr val="052A48"/>
+          </a:solidFill>
+          <a:ln w="38100" cmpd="sng">
+            <a:solidFill>
+              <a:schemeClr val="bg1"/>
+            </a:solidFill>
+          </a:ln>
+          <a:effectLst/>
+        </p:spPr>
+        <p:style>
+          <a:lnRef idx="1">
+            <a:schemeClr val="accent1"/>
+          </a:lnRef>
+          <a:fillRef idx="3">
+            <a:schemeClr val="accent1"/>
+          </a:fillRef>
+          <a:effectRef idx="2">
+            <a:schemeClr val="accent1"/>
+          </a:effectRef>
+          <a:fontRef idx="minor">
+            <a:schemeClr val="lt1"/>
+          </a:fontRef>
+        </p:style>
+        <p:txBody>
+          <a:bodyPr rtlCol="0" anchor="ctr"/>
+          <a:lstStyle/>
+          <a:p>
+            <a:pPr algn="ctr"/>
+            <a:r>
+              <a:rPr lang="en-US" u="sng" dirty="0"/>
               <a:t>																					   </a:t>
             </a:r>
-            <a:endParaRPr lang="en-US" u="sng" dirty="0"/>
           </a:p>
         </p:txBody>
       </p:sp>
@@ -8106,7 +8596,7 @@
           <a:lstStyle/>
           <a:p>
             <a:r>
-              <a:rPr lang="en-US" sz="3800" b="1" dirty="0" smtClean="0">
+              <a:rPr lang="en-US" sz="3800" b="1" dirty="0">
                 <a:solidFill>
                   <a:schemeClr val="bg1"/>
                 </a:solidFill>
@@ -8115,13 +8605,6 @@
               </a:rPr>
               <a:t>/scratch</a:t>
             </a:r>
-            <a:endParaRPr lang="en-US" sz="3800" b="1" dirty="0">
-              <a:solidFill>
-                <a:schemeClr val="bg1"/>
-              </a:solidFill>
-              <a:latin typeface="Courier"/>
-              <a:cs typeface="Courier"/>
-            </a:endParaRPr>
           </a:p>
         </p:txBody>
       </p:sp>
@@ -8227,7 +8710,7 @@
           <a:p>
             <a:pPr algn="ctr"/>
             <a:r>
-              <a:rPr lang="en-US" sz="5400" b="1" dirty="0" smtClean="0">
+              <a:rPr lang="en-US" sz="5400" b="1" dirty="0">
                 <a:solidFill>
                   <a:srgbClr val="052B48"/>
                 </a:solidFill>
@@ -8236,13 +8719,6 @@
               </a:rPr>
               <a:t>Query Intracellular Electrophysiology Metadata</a:t>
             </a:r>
-            <a:endParaRPr lang="en-US" sz="5400" b="1" dirty="0">
-              <a:solidFill>
-                <a:srgbClr val="052B48"/>
-              </a:solidFill>
-              <a:latin typeface="Calibri"/>
-              <a:cs typeface="Calibri"/>
-            </a:endParaRPr>
           </a:p>
         </p:txBody>
       </p:sp>
@@ -8378,7 +8854,7 @@
           <a:p>
             <a:pPr algn="ctr"/>
             <a:r>
-              <a:rPr lang="en-US" sz="5400" b="1" dirty="0" smtClean="0">
+              <a:rPr lang="en-US" sz="5400" b="1" dirty="0">
                 <a:solidFill>
                   <a:srgbClr val="052B48"/>
                 </a:solidFill>
@@ -8388,7 +8864,7 @@
               <a:t>Intracellular Electrophysiology Data using </a:t>
             </a:r>
             <a:r>
-              <a:rPr lang="en-US" sz="5400" b="1" dirty="0" err="1" smtClean="0">
+              <a:rPr lang="en-US" sz="5400" b="1" dirty="0" err="1">
                 <a:solidFill>
                   <a:srgbClr val="052B48"/>
                 </a:solidFill>
@@ -8450,18 +8926,13 @@
           <a:p>
             <a:pPr algn="ctr"/>
             <a:r>
-              <a:rPr lang="en-US" sz="5400" b="1" dirty="0" smtClean="0">
+              <a:rPr lang="en-US" sz="5400" b="1" dirty="0">
                 <a:solidFill>
                   <a:srgbClr val="FF0000"/>
                 </a:solidFill>
               </a:rPr>
               <a:t>DEPRECATED</a:t>
             </a:r>
-            <a:endParaRPr lang="en-US" sz="5400" b="1" dirty="0">
-              <a:solidFill>
-                <a:srgbClr val="FF0000"/>
-              </a:solidFill>
-            </a:endParaRPr>
           </a:p>
         </p:txBody>
       </p:sp>
@@ -8567,7 +9038,7 @@
           <a:p>
             <a:pPr algn="ctr"/>
             <a:r>
-              <a:rPr lang="en-US" sz="5400" b="1" dirty="0" smtClean="0">
+              <a:rPr lang="en-US" sz="5400" b="1" dirty="0">
                 <a:solidFill>
                   <a:srgbClr val="052B48"/>
                 </a:solidFill>
@@ -8576,13 +9047,6 @@
               </a:rPr>
               <a:t>Allen Brain Observatory</a:t>
             </a:r>
-            <a:endParaRPr lang="en-US" sz="5400" b="1" dirty="0">
-              <a:solidFill>
-                <a:srgbClr val="052B48"/>
-              </a:solidFill>
-              <a:latin typeface="Calibri"/>
-              <a:cs typeface="Calibri"/>
-            </a:endParaRPr>
           </a:p>
         </p:txBody>
       </p:sp>
@@ -8609,33 +9073,18 @@
           <a:p>
             <a:r>
               <a:rPr lang="en-US" sz="1400" dirty="0"/>
-              <a:t> </a:t>
-            </a:r>
-            <a:r>
-              <a:rPr lang="en-US" sz="1400" dirty="0" smtClean="0"/>
-              <a:t>(figure source</a:t>
-            </a:r>
-            <a:r>
-              <a:rPr lang="en-US" sz="1400" dirty="0"/>
-              <a:t>: </a:t>
+              <a:t> (figure source: </a:t>
             </a:r>
             <a:r>
               <a:rPr lang="en-US" sz="1400" dirty="0">
                 <a:hlinkClick r:id="rId2"/>
               </a:rPr>
-              <a:t>https://observatory.brain-</a:t>
+              <a:t>https://observatory.brain-map.org</a:t>
             </a:r>
             <a:r>
-              <a:rPr lang="en-US" sz="1400" dirty="0" smtClean="0">
-                <a:hlinkClick r:id="rId2"/>
-              </a:rPr>
-              <a:t>map.org</a:t>
-            </a:r>
-            <a:r>
-              <a:rPr lang="en-US" sz="1400" dirty="0" smtClean="0"/>
+              <a:rPr lang="en-US" sz="1400" dirty="0"/>
               <a:t>)</a:t>
             </a:r>
-            <a:endParaRPr lang="en-US" sz="1400" dirty="0"/>
           </a:p>
         </p:txBody>
       </p:sp>
@@ -8770,7 +9219,7 @@
           <a:p>
             <a:pPr algn="ctr"/>
             <a:r>
-              <a:rPr lang="en-US" sz="5400" b="1" dirty="0" smtClean="0">
+              <a:rPr lang="en-US" sz="5400" b="1" dirty="0">
                 <a:solidFill>
                   <a:srgbClr val="052B48"/>
                 </a:solidFill>
@@ -8779,13 +9228,6 @@
               </a:rPr>
               <a:t>Extracellular Electrophysiology</a:t>
             </a:r>
-            <a:endParaRPr lang="en-US" sz="5400" b="1" dirty="0">
-              <a:solidFill>
-                <a:srgbClr val="052B48"/>
-              </a:solidFill>
-              <a:latin typeface="Calibri"/>
-              <a:cs typeface="Calibri"/>
-            </a:endParaRPr>
           </a:p>
         </p:txBody>
       </p:sp>
@@ -8961,7 +9403,7 @@
           <a:p>
             <a:pPr algn="ctr"/>
             <a:r>
-              <a:rPr lang="en-US" sz="5400" b="1" dirty="0" smtClean="0">
+              <a:rPr lang="en-US" sz="5400" b="1" dirty="0">
                 <a:solidFill>
                   <a:srgbClr val="052B48"/>
                 </a:solidFill>
@@ -8970,13 +9412,6 @@
               </a:rPr>
               <a:t>Calcium Imaging Data</a:t>
             </a:r>
-            <a:endParaRPr lang="en-US" sz="5400" b="1" dirty="0">
-              <a:solidFill>
-                <a:srgbClr val="052B48"/>
-              </a:solidFill>
-              <a:latin typeface="Calibri"/>
-              <a:cs typeface="Calibri"/>
-            </a:endParaRPr>
           </a:p>
         </p:txBody>
       </p:sp>
@@ -9111,7 +9546,237 @@
           <a:p>
             <a:pPr algn="ctr"/>
             <a:r>
-              <a:rPr lang="en-US" sz="5400" b="1" dirty="0" smtClean="0">
+              <a:rPr lang="en-US" sz="5400" b="1" dirty="0">
+                <a:solidFill>
+                  <a:srgbClr val="052B48"/>
+                </a:solidFill>
+                <a:latin typeface="Calibri"/>
+                <a:cs typeface="Calibri"/>
+              </a:rPr>
+              <a:t>Optogenetics</a:t>
+            </a:r>
+          </a:p>
+        </p:txBody>
+      </p:sp>
+      <p:pic>
+        <p:nvPicPr>
+          <p:cNvPr id="1026" name="Picture 2">
+            <a:extLst>
+              <a:ext uri="{FF2B5EF4-FFF2-40B4-BE49-F238E27FC236}">
+                <a16:creationId xmlns:a16="http://schemas.microsoft.com/office/drawing/2014/main" id="{C71F5062-FF10-FA65-6602-2D9AC73D6BCD}"/>
+              </a:ext>
+            </a:extLst>
+          </p:cNvPr>
+          <p:cNvPicPr>
+            <a:picLocks noChangeAspect="1" noChangeArrowheads="1"/>
+          </p:cNvPicPr>
+          <p:nvPr/>
+        </p:nvPicPr>
+        <p:blipFill rotWithShape="1">
+          <a:blip r:embed="rId2">
+            <a:duotone>
+              <a:schemeClr val="accent1">
+                <a:shade val="45000"/>
+                <a:satMod val="135000"/>
+              </a:schemeClr>
+              <a:prstClr val="white"/>
+            </a:duotone>
+            <a:extLst>
+              <a:ext uri="{28A0092B-C50C-407E-A947-70E740481C1C}">
+                <a14:useLocalDpi xmlns:a14="http://schemas.microsoft.com/office/drawing/2010/main" val="0"/>
+              </a:ext>
+            </a:extLst>
+          </a:blip>
+          <a:srcRect l="48608" t="31624"/>
+          <a:stretch/>
+        </p:blipFill>
+        <p:spPr bwMode="auto">
+          <a:xfrm>
+            <a:off x="1134319" y="2361236"/>
+            <a:ext cx="6265762" cy="3197808"/>
+          </a:xfrm>
+          <a:prstGeom prst="rect">
+            <a:avLst/>
+          </a:prstGeom>
+          <a:noFill/>
+          <a:extLst>
+            <a:ext uri="{909E8E84-426E-40DD-AFC4-6F175D3DCCD1}">
+              <a14:hiddenFill xmlns:a14="http://schemas.microsoft.com/office/drawing/2010/main">
+                <a:solidFill>
+                  <a:srgbClr val="FFFFFF"/>
+                </a:solidFill>
+              </a14:hiddenFill>
+            </a:ext>
+          </a:extLst>
+        </p:spPr>
+      </p:pic>
+      <p:sp>
+        <p:nvSpPr>
+          <p:cNvPr id="7" name="Triangle 6">
+            <a:extLst>
+              <a:ext uri="{FF2B5EF4-FFF2-40B4-BE49-F238E27FC236}">
+                <a16:creationId xmlns:a16="http://schemas.microsoft.com/office/drawing/2014/main" id="{235B78DD-4768-BEB1-B76F-D0A97ABD7E07}"/>
+              </a:ext>
+            </a:extLst>
+          </p:cNvPr>
+          <p:cNvSpPr/>
+          <p:nvPr/>
+        </p:nvSpPr>
+        <p:spPr>
+          <a:xfrm rot="3970847">
+            <a:off x="4710421" y="269472"/>
+            <a:ext cx="731152" cy="4808783"/>
+          </a:xfrm>
+          <a:prstGeom prst="triangle">
+            <a:avLst>
+              <a:gd name="adj" fmla="val 52427"/>
+            </a:avLst>
+          </a:prstGeom>
+          <a:gradFill>
+            <a:gsLst>
+              <a:gs pos="100000">
+                <a:srgbClr val="92D050">
+                  <a:alpha val="0"/>
+                </a:srgbClr>
+              </a:gs>
+              <a:gs pos="0">
+                <a:srgbClr val="00B050"/>
+              </a:gs>
+            </a:gsLst>
+            <a:lin ang="3960000" scaled="0"/>
+          </a:gradFill>
+          <a:ln>
+            <a:noFill/>
+          </a:ln>
+        </p:spPr>
+        <p:style>
+          <a:lnRef idx="2">
+            <a:schemeClr val="accent1">
+              <a:shade val="15000"/>
+            </a:schemeClr>
+          </a:lnRef>
+          <a:fillRef idx="1">
+            <a:schemeClr val="accent1"/>
+          </a:fillRef>
+          <a:effectRef idx="0">
+            <a:schemeClr val="accent1"/>
+          </a:effectRef>
+          <a:fontRef idx="minor">
+            <a:schemeClr val="lt1"/>
+          </a:fontRef>
+        </p:style>
+        <p:txBody>
+          <a:bodyPr rtlCol="0" anchor="ctr"/>
+          <a:lstStyle/>
+          <a:p>
+            <a:pPr algn="ctr"/>
+            <a:endParaRPr lang="en-US" dirty="0"/>
+          </a:p>
+        </p:txBody>
+      </p:sp>
+    </p:spTree>
+    <p:extLst>
+      <p:ext uri="{BB962C8B-B14F-4D97-AF65-F5344CB8AC3E}">
+        <p14:creationId xmlns:p14="http://schemas.microsoft.com/office/powerpoint/2010/main" val="24017208"/>
+      </p:ext>
+    </p:extLst>
+  </p:cSld>
+  <p:clrMapOvr>
+    <a:masterClrMapping/>
+  </p:clrMapOvr>
+</p:sld>
+</file>
+
+<file path=ppt/slides/slide8.xml><?xml version="1.0" encoding="utf-8"?>
+<p:sld xmlns:a="http://schemas.openxmlformats.org/drawingml/2006/main" xmlns:r="http://schemas.openxmlformats.org/officeDocument/2006/relationships" xmlns:p="http://schemas.openxmlformats.org/presentationml/2006/main">
+  <p:cSld>
+    <p:spTree>
+      <p:nvGrpSpPr>
+        <p:cNvPr id="1" name=""/>
+        <p:cNvGrpSpPr/>
+        <p:nvPr/>
+      </p:nvGrpSpPr>
+      <p:grpSpPr>
+        <a:xfrm>
+          <a:off x="0" y="0"/>
+          <a:ext cx="0" cy="0"/>
+          <a:chOff x="0" y="0"/>
+          <a:chExt cx="0" cy="0"/>
+        </a:xfrm>
+      </p:grpSpPr>
+      <p:sp>
+        <p:nvSpPr>
+          <p:cNvPr id="27" name="Rounded Rectangle 26"/>
+          <p:cNvSpPr/>
+          <p:nvPr/>
+        </p:nvSpPr>
+        <p:spPr>
+          <a:xfrm>
+            <a:off x="853570" y="853671"/>
+            <a:ext cx="7234527" cy="4851352"/>
+          </a:xfrm>
+          <a:prstGeom prst="roundRect">
+            <a:avLst>
+              <a:gd name="adj" fmla="val 4437"/>
+            </a:avLst>
+          </a:prstGeom>
+          <a:solidFill>
+            <a:srgbClr val="EDEDED"/>
+          </a:solidFill>
+          <a:ln>
+            <a:solidFill>
+              <a:srgbClr val="000000"/>
+            </a:solidFill>
+          </a:ln>
+          <a:effectLst/>
+        </p:spPr>
+        <p:style>
+          <a:lnRef idx="1">
+            <a:schemeClr val="accent1"/>
+          </a:lnRef>
+          <a:fillRef idx="3">
+            <a:schemeClr val="accent1"/>
+          </a:fillRef>
+          <a:effectRef idx="2">
+            <a:schemeClr val="accent1"/>
+          </a:effectRef>
+          <a:fontRef idx="minor">
+            <a:schemeClr val="lt1"/>
+          </a:fontRef>
+        </p:style>
+        <p:txBody>
+          <a:bodyPr rtlCol="0" anchor="ctr"/>
+          <a:lstStyle/>
+          <a:p>
+            <a:pPr algn="ctr"/>
+            <a:endParaRPr lang="en-US"/>
+          </a:p>
+        </p:txBody>
+      </p:sp>
+      <p:sp>
+        <p:nvSpPr>
+          <p:cNvPr id="26" name="Rectangle 25"/>
+          <p:cNvSpPr/>
+          <p:nvPr/>
+        </p:nvSpPr>
+        <p:spPr>
+          <a:xfrm>
+            <a:off x="863980" y="855015"/>
+            <a:ext cx="7213708" cy="923330"/>
+          </a:xfrm>
+          <a:prstGeom prst="rect">
+            <a:avLst/>
+          </a:prstGeom>
+        </p:spPr>
+        <p:txBody>
+          <a:bodyPr wrap="square">
+            <a:spAutoFit/>
+          </a:bodyPr>
+          <a:lstStyle/>
+          <a:p>
+            <a:pPr algn="ctr"/>
+            <a:r>
+              <a:rPr lang="en-US" sz="5400" b="1" dirty="0">
                 <a:solidFill>
                   <a:srgbClr val="052B48"/>
                 </a:solidFill>
@@ -9120,13 +9785,6 @@
               </a:rPr>
               <a:t>Iterative Data Write</a:t>
             </a:r>
-            <a:endParaRPr lang="en-US" sz="5400" b="1" dirty="0">
-              <a:solidFill>
-                <a:srgbClr val="052B48"/>
-              </a:solidFill>
-              <a:latin typeface="Calibri"/>
-              <a:cs typeface="Calibri"/>
-            </a:endParaRPr>
           </a:p>
         </p:txBody>
       </p:sp>
@@ -9320,7 +9978,7 @@
 </p:sld>
 </file>
 
-<file path=ppt/slides/slide8.xml><?xml version="1.0" encoding="utf-8"?>
+<file path=ppt/slides/slide9.xml><?xml version="1.0" encoding="utf-8"?>
 <p:sld xmlns:a="http://schemas.openxmlformats.org/drawingml/2006/main" xmlns:r="http://schemas.openxmlformats.org/officeDocument/2006/relationships" xmlns:p="http://schemas.openxmlformats.org/presentationml/2006/main">
   <p:cSld>
     <p:spTree>
@@ -9409,7 +10067,7 @@
           <a:p>
             <a:pPr algn="ctr"/>
             <a:r>
-              <a:rPr lang="en-US" sz="5400" b="1" dirty="0" smtClean="0">
+              <a:rPr lang="en-US" sz="5400" b="1" dirty="0">
                 <a:solidFill>
                   <a:srgbClr val="052B48"/>
                 </a:solidFill>
@@ -9418,13 +10076,6 @@
               </a:rPr>
               <a:t>HDF5 Dataset I/O</a:t>
             </a:r>
-            <a:endParaRPr lang="en-US" sz="5400" b="1" dirty="0">
-              <a:solidFill>
-                <a:srgbClr val="052B48"/>
-              </a:solidFill>
-              <a:latin typeface="Calibri"/>
-              <a:cs typeface="Calibri"/>
-            </a:endParaRPr>
           </a:p>
         </p:txBody>
       </p:sp>
@@ -9936,597 +10587,6 @@
     <p:extLst>
       <p:ext uri="{BB962C8B-B14F-4D97-AF65-F5344CB8AC3E}">
         <p14:creationId xmlns:p14="http://schemas.microsoft.com/office/powerpoint/2010/main" val="782906587"/>
-      </p:ext>
-    </p:extLst>
-  </p:cSld>
-  <p:clrMapOvr>
-    <a:masterClrMapping/>
-  </p:clrMapOvr>
-</p:sld>
-</file>
-
-<file path=ppt/slides/slide9.xml><?xml version="1.0" encoding="utf-8"?>
-<p:sld xmlns:a="http://schemas.openxmlformats.org/drawingml/2006/main" xmlns:r="http://schemas.openxmlformats.org/officeDocument/2006/relationships" xmlns:p="http://schemas.openxmlformats.org/presentationml/2006/main">
-  <p:cSld>
-    <p:spTree>
-      <p:nvGrpSpPr>
-        <p:cNvPr id="1" name=""/>
-        <p:cNvGrpSpPr/>
-        <p:nvPr/>
-      </p:nvGrpSpPr>
-      <p:grpSpPr>
-        <a:xfrm>
-          <a:off x="0" y="0"/>
-          <a:ext cx="0" cy="0"/>
-          <a:chOff x="0" y="0"/>
-          <a:chExt cx="0" cy="0"/>
-        </a:xfrm>
-      </p:grpSpPr>
-      <p:sp>
-        <p:nvSpPr>
-          <p:cNvPr id="27" name="Rounded Rectangle 26"/>
-          <p:cNvSpPr/>
-          <p:nvPr/>
-        </p:nvSpPr>
-        <p:spPr>
-          <a:xfrm>
-            <a:off x="853570" y="853671"/>
-            <a:ext cx="7234527" cy="4851352"/>
-          </a:xfrm>
-          <a:prstGeom prst="roundRect">
-            <a:avLst>
-              <a:gd name="adj" fmla="val 4437"/>
-            </a:avLst>
-          </a:prstGeom>
-          <a:solidFill>
-            <a:srgbClr val="EDEDED"/>
-          </a:solidFill>
-          <a:ln>
-            <a:solidFill>
-              <a:srgbClr val="000000"/>
-            </a:solidFill>
-          </a:ln>
-          <a:effectLst/>
-        </p:spPr>
-        <p:style>
-          <a:lnRef idx="1">
-            <a:schemeClr val="accent1"/>
-          </a:lnRef>
-          <a:fillRef idx="3">
-            <a:schemeClr val="accent1"/>
-          </a:fillRef>
-          <a:effectRef idx="2">
-            <a:schemeClr val="accent1"/>
-          </a:effectRef>
-          <a:fontRef idx="minor">
-            <a:schemeClr val="lt1"/>
-          </a:fontRef>
-        </p:style>
-        <p:txBody>
-          <a:bodyPr rtlCol="0" anchor="ctr"/>
-          <a:lstStyle/>
-          <a:p>
-            <a:pPr algn="ctr"/>
-            <a:endParaRPr lang="en-US"/>
-          </a:p>
-        </p:txBody>
-      </p:sp>
-      <p:sp>
-        <p:nvSpPr>
-          <p:cNvPr id="26" name="Rectangle 25"/>
-          <p:cNvSpPr/>
-          <p:nvPr/>
-        </p:nvSpPr>
-        <p:spPr>
-          <a:xfrm>
-            <a:off x="863980" y="855015"/>
-            <a:ext cx="7213708" cy="1754327"/>
-          </a:xfrm>
-          <a:prstGeom prst="rect">
-            <a:avLst/>
-          </a:prstGeom>
-        </p:spPr>
-        <p:txBody>
-          <a:bodyPr wrap="square">
-            <a:spAutoFit/>
-          </a:bodyPr>
-          <a:lstStyle/>
-          <a:p>
-            <a:pPr algn="ctr"/>
-            <a:r>
-              <a:rPr lang="en-US" sz="5400" b="1" dirty="0" smtClean="0">
-                <a:solidFill>
-                  <a:srgbClr val="052B48"/>
-                </a:solidFill>
-                <a:latin typeface="Calibri"/>
-                <a:cs typeface="Calibri"/>
-              </a:rPr>
-              <a:t>Modular Data Storage using External Files</a:t>
-            </a:r>
-            <a:endParaRPr lang="en-US" sz="5400" b="1" dirty="0">
-              <a:solidFill>
-                <a:srgbClr val="052B48"/>
-              </a:solidFill>
-              <a:latin typeface="Calibri"/>
-              <a:cs typeface="Calibri"/>
-            </a:endParaRPr>
-          </a:p>
-        </p:txBody>
-      </p:sp>
-      <p:sp>
-        <p:nvSpPr>
-          <p:cNvPr id="15" name="Left Arrow 14"/>
-          <p:cNvSpPr/>
-          <p:nvPr/>
-        </p:nvSpPr>
-        <p:spPr>
-          <a:xfrm rot="5400000" flipV="1">
-            <a:off x="4274700" y="3528909"/>
-            <a:ext cx="550232" cy="279992"/>
-          </a:xfrm>
-          <a:prstGeom prst="leftArrow">
-            <a:avLst>
-              <a:gd name="adj1" fmla="val 60000"/>
-              <a:gd name="adj2" fmla="val 50000"/>
-            </a:avLst>
-          </a:prstGeom>
-          <a:solidFill>
-            <a:srgbClr val="052A48"/>
-          </a:solidFill>
-          <a:ln w="38100" cmpd="sng">
-            <a:solidFill>
-              <a:srgbClr val="FFFFFF"/>
-            </a:solidFill>
-          </a:ln>
-        </p:spPr>
-        <p:style>
-          <a:lnRef idx="0">
-            <a:schemeClr val="accent1">
-              <a:tint val="60000"/>
-              <a:hueOff val="0"/>
-              <a:satOff val="0"/>
-              <a:lumOff val="0"/>
-              <a:alphaOff val="0"/>
-            </a:schemeClr>
-          </a:lnRef>
-          <a:fillRef idx="1">
-            <a:schemeClr val="accent1">
-              <a:tint val="60000"/>
-              <a:hueOff val="0"/>
-              <a:satOff val="0"/>
-              <a:lumOff val="0"/>
-              <a:alphaOff val="0"/>
-            </a:schemeClr>
-          </a:fillRef>
-          <a:effectRef idx="0">
-            <a:schemeClr val="accent1">
-              <a:tint val="60000"/>
-              <a:hueOff val="0"/>
-              <a:satOff val="0"/>
-              <a:lumOff val="0"/>
-              <a:alphaOff val="0"/>
-            </a:schemeClr>
-          </a:effectRef>
-          <a:fontRef idx="minor">
-            <a:schemeClr val="lt1"/>
-          </a:fontRef>
-        </p:style>
-      </p:sp>
-      <p:sp>
-        <p:nvSpPr>
-          <p:cNvPr id="16" name="Left Arrow 15"/>
-          <p:cNvSpPr/>
-          <p:nvPr/>
-        </p:nvSpPr>
-        <p:spPr>
-          <a:xfrm rot="2734356">
-            <a:off x="3061789" y="4549986"/>
-            <a:ext cx="1096849" cy="425306"/>
-          </a:xfrm>
-          <a:prstGeom prst="leftArrow">
-            <a:avLst>
-              <a:gd name="adj1" fmla="val 60000"/>
-              <a:gd name="adj2" fmla="val 50000"/>
-            </a:avLst>
-          </a:prstGeom>
-          <a:solidFill>
-            <a:srgbClr val="052A48"/>
-          </a:solidFill>
-          <a:ln w="38100" cmpd="sng">
-            <a:solidFill>
-              <a:srgbClr val="FFFFFF"/>
-            </a:solidFill>
-          </a:ln>
-        </p:spPr>
-        <p:style>
-          <a:lnRef idx="0">
-            <a:schemeClr val="accent1">
-              <a:tint val="60000"/>
-              <a:hueOff val="0"/>
-              <a:satOff val="0"/>
-              <a:lumOff val="0"/>
-              <a:alphaOff val="0"/>
-            </a:schemeClr>
-          </a:lnRef>
-          <a:fillRef idx="1">
-            <a:schemeClr val="accent1">
-              <a:tint val="60000"/>
-              <a:hueOff val="0"/>
-              <a:satOff val="0"/>
-              <a:lumOff val="0"/>
-              <a:alphaOff val="0"/>
-            </a:schemeClr>
-          </a:fillRef>
-          <a:effectRef idx="0">
-            <a:schemeClr val="accent1">
-              <a:tint val="60000"/>
-              <a:hueOff val="0"/>
-              <a:satOff val="0"/>
-              <a:lumOff val="0"/>
-              <a:alphaOff val="0"/>
-            </a:schemeClr>
-          </a:effectRef>
-          <a:fontRef idx="minor">
-            <a:schemeClr val="lt1"/>
-          </a:fontRef>
-        </p:style>
-      </p:sp>
-      <p:sp>
-        <p:nvSpPr>
-          <p:cNvPr id="12" name="Folded Corner 11"/>
-          <p:cNvSpPr/>
-          <p:nvPr/>
-        </p:nvSpPr>
-        <p:spPr>
-          <a:xfrm rot="10800000" flipH="1">
-            <a:off x="2182317" y="3072614"/>
-            <a:ext cx="1037552" cy="1327710"/>
-          </a:xfrm>
-          <a:prstGeom prst="foldedCorner">
-            <a:avLst>
-              <a:gd name="adj" fmla="val 26556"/>
-            </a:avLst>
-          </a:prstGeom>
-          <a:solidFill>
-            <a:srgbClr val="052A48"/>
-          </a:solidFill>
-          <a:ln w="28575" cmpd="sng">
-            <a:solidFill>
-              <a:schemeClr val="bg1"/>
-            </a:solidFill>
-          </a:ln>
-          <a:effectLst/>
-        </p:spPr>
-        <p:style>
-          <a:lnRef idx="1">
-            <a:schemeClr val="accent1"/>
-          </a:lnRef>
-          <a:fillRef idx="3">
-            <a:schemeClr val="accent1"/>
-          </a:fillRef>
-          <a:effectRef idx="2">
-            <a:schemeClr val="accent1"/>
-          </a:effectRef>
-          <a:fontRef idx="minor">
-            <a:schemeClr val="lt1"/>
-          </a:fontRef>
-        </p:style>
-        <p:txBody>
-          <a:bodyPr rtlCol="0" anchor="ctr"/>
-          <a:lstStyle/>
-          <a:p>
-            <a:pPr algn="ctr"/>
-            <a:endParaRPr lang="en-US" sz="1000" u="sng" dirty="0"/>
-          </a:p>
-        </p:txBody>
-      </p:sp>
-      <p:sp>
-        <p:nvSpPr>
-          <p:cNvPr id="14" name="Folded Corner 13"/>
-          <p:cNvSpPr/>
-          <p:nvPr/>
-        </p:nvSpPr>
-        <p:spPr>
-          <a:xfrm rot="10800000" flipH="1">
-            <a:off x="4267044" y="2617358"/>
-            <a:ext cx="572757" cy="762891"/>
-          </a:xfrm>
-          <a:prstGeom prst="foldedCorner">
-            <a:avLst>
-              <a:gd name="adj" fmla="val 26556"/>
-            </a:avLst>
-          </a:prstGeom>
-          <a:solidFill>
-            <a:srgbClr val="052A48"/>
-          </a:solidFill>
-          <a:ln w="28575" cmpd="sng">
-            <a:solidFill>
-              <a:schemeClr val="bg1"/>
-            </a:solidFill>
-          </a:ln>
-          <a:effectLst/>
-        </p:spPr>
-        <p:style>
-          <a:lnRef idx="1">
-            <a:schemeClr val="accent1"/>
-          </a:lnRef>
-          <a:fillRef idx="3">
-            <a:schemeClr val="accent1"/>
-          </a:fillRef>
-          <a:effectRef idx="2">
-            <a:schemeClr val="accent1"/>
-          </a:effectRef>
-          <a:fontRef idx="minor">
-            <a:schemeClr val="lt1"/>
-          </a:fontRef>
-        </p:style>
-        <p:txBody>
-          <a:bodyPr rtlCol="0" anchor="ctr"/>
-          <a:lstStyle/>
-          <a:p>
-            <a:pPr algn="ctr"/>
-            <a:endParaRPr lang="en-US" sz="1000" u="sng" dirty="0"/>
-          </a:p>
-        </p:txBody>
-      </p:sp>
-      <p:sp>
-        <p:nvSpPr>
-          <p:cNvPr id="20" name="Left Arrow 19"/>
-          <p:cNvSpPr/>
-          <p:nvPr/>
-        </p:nvSpPr>
-        <p:spPr>
-          <a:xfrm rot="18865644" flipH="1">
-            <a:off x="5072927" y="4550292"/>
-            <a:ext cx="1096849" cy="425306"/>
-          </a:xfrm>
-          <a:prstGeom prst="leftArrow">
-            <a:avLst>
-              <a:gd name="adj1" fmla="val 60000"/>
-              <a:gd name="adj2" fmla="val 50000"/>
-            </a:avLst>
-          </a:prstGeom>
-          <a:solidFill>
-            <a:srgbClr val="052A48"/>
-          </a:solidFill>
-          <a:ln w="38100" cmpd="sng">
-            <a:solidFill>
-              <a:srgbClr val="FFFFFF"/>
-            </a:solidFill>
-          </a:ln>
-        </p:spPr>
-        <p:style>
-          <a:lnRef idx="0">
-            <a:schemeClr val="accent1">
-              <a:tint val="60000"/>
-              <a:hueOff val="0"/>
-              <a:satOff val="0"/>
-              <a:lumOff val="0"/>
-              <a:alphaOff val="0"/>
-            </a:schemeClr>
-          </a:lnRef>
-          <a:fillRef idx="1">
-            <a:schemeClr val="accent1">
-              <a:tint val="60000"/>
-              <a:hueOff val="0"/>
-              <a:satOff val="0"/>
-              <a:lumOff val="0"/>
-              <a:alphaOff val="0"/>
-            </a:schemeClr>
-          </a:fillRef>
-          <a:effectRef idx="0">
-            <a:schemeClr val="accent1">
-              <a:tint val="60000"/>
-              <a:hueOff val="0"/>
-              <a:satOff val="0"/>
-              <a:lumOff val="0"/>
-              <a:alphaOff val="0"/>
-            </a:schemeClr>
-          </a:effectRef>
-          <a:fontRef idx="minor">
-            <a:schemeClr val="lt1"/>
-          </a:fontRef>
-        </p:style>
-      </p:sp>
-      <p:sp>
-        <p:nvSpPr>
-          <p:cNvPr id="8" name="Folded Corner 7"/>
-          <p:cNvSpPr/>
-          <p:nvPr/>
-        </p:nvSpPr>
-        <p:spPr>
-          <a:xfrm rot="10800000" flipH="1">
-            <a:off x="3899840" y="3720272"/>
-            <a:ext cx="1419941" cy="1900138"/>
-          </a:xfrm>
-          <a:prstGeom prst="foldedCorner">
-            <a:avLst>
-              <a:gd name="adj" fmla="val 26556"/>
-            </a:avLst>
-          </a:prstGeom>
-          <a:solidFill>
-            <a:srgbClr val="052A48"/>
-          </a:solidFill>
-          <a:ln w="28575" cmpd="sng">
-            <a:solidFill>
-              <a:schemeClr val="bg1"/>
-            </a:solidFill>
-          </a:ln>
-          <a:effectLst/>
-        </p:spPr>
-        <p:style>
-          <a:lnRef idx="1">
-            <a:schemeClr val="accent1"/>
-          </a:lnRef>
-          <a:fillRef idx="3">
-            <a:schemeClr val="accent1"/>
-          </a:fillRef>
-          <a:effectRef idx="2">
-            <a:schemeClr val="accent1"/>
-          </a:effectRef>
-          <a:fontRef idx="minor">
-            <a:schemeClr val="lt1"/>
-          </a:fontRef>
-        </p:style>
-        <p:txBody>
-          <a:bodyPr rtlCol="0" anchor="ctr"/>
-          <a:lstStyle/>
-          <a:p>
-            <a:pPr algn="ctr"/>
-            <a:r>
-              <a:rPr lang="en-US" u="sng" dirty="0" smtClean="0"/>
-              <a:t>																			   </a:t>
-            </a:r>
-            <a:endParaRPr lang="en-US" u="sng" dirty="0"/>
-          </a:p>
-        </p:txBody>
-      </p:sp>
-      <p:grpSp>
-        <p:nvGrpSpPr>
-          <p:cNvPr id="11" name="Group 10"/>
-          <p:cNvGrpSpPr>
-            <a:grpSpLocks noChangeAspect="1"/>
-          </p:cNvGrpSpPr>
-          <p:nvPr/>
-        </p:nvGrpSpPr>
-        <p:grpSpPr>
-          <a:xfrm>
-            <a:off x="3606582" y="3649328"/>
-            <a:ext cx="947929" cy="947929"/>
-            <a:chOff x="2259923" y="2660201"/>
-            <a:chExt cx="1959561" cy="1962561"/>
-          </a:xfrm>
-        </p:grpSpPr>
-        <p:sp>
-          <p:nvSpPr>
-            <p:cNvPr id="18" name="Oval 17"/>
-            <p:cNvSpPr/>
-            <p:nvPr/>
-          </p:nvSpPr>
-          <p:spPr>
-            <a:xfrm>
-              <a:off x="2259923" y="2660201"/>
-              <a:ext cx="1959561" cy="1962561"/>
-            </a:xfrm>
-            <a:prstGeom prst="ellipse">
-              <a:avLst/>
-            </a:prstGeom>
-            <a:solidFill>
-              <a:schemeClr val="bg1"/>
-            </a:solidFill>
-            <a:ln w="76200" cmpd="sng">
-              <a:solidFill>
-                <a:srgbClr val="052A48"/>
-              </a:solidFill>
-            </a:ln>
-            <a:effectLst/>
-          </p:spPr>
-          <p:style>
-            <a:lnRef idx="1">
-              <a:schemeClr val="accent1"/>
-            </a:lnRef>
-            <a:fillRef idx="3">
-              <a:schemeClr val="accent1"/>
-            </a:fillRef>
-            <a:effectRef idx="2">
-              <a:schemeClr val="accent1"/>
-            </a:effectRef>
-            <a:fontRef idx="minor">
-              <a:schemeClr val="lt1"/>
-            </a:fontRef>
-          </p:style>
-          <p:txBody>
-            <a:bodyPr rtlCol="0" anchor="ctr"/>
-            <a:lstStyle/>
-            <a:p>
-              <a:endParaRPr lang="en-US" sz="4400" dirty="0"/>
-            </a:p>
-          </p:txBody>
-        </p:sp>
-        <p:pic>
-          <p:nvPicPr>
-            <p:cNvPr id="19" name="Picture 18" descr="logo_brain_transp_512x512.png"/>
-            <p:cNvPicPr>
-              <a:picLocks noChangeAspect="1"/>
-            </p:cNvPicPr>
-            <p:nvPr/>
-          </p:nvPicPr>
-          <p:blipFill>
-            <a:blip r:embed="rId2">
-              <a:extLst>
-                <a:ext uri="{28A0092B-C50C-407E-A947-70E740481C1C}">
-                  <a14:useLocalDpi xmlns:a14="http://schemas.microsoft.com/office/drawing/2010/main" val="0"/>
-                </a:ext>
-              </a:extLst>
-            </a:blip>
-            <a:stretch>
-              <a:fillRect/>
-            </a:stretch>
-          </p:blipFill>
-          <p:spPr>
-            <a:xfrm>
-              <a:off x="2393887" y="2838486"/>
-              <a:ext cx="1703898" cy="1703898"/>
-            </a:xfrm>
-            <a:prstGeom prst="rect">
-              <a:avLst/>
-            </a:prstGeom>
-          </p:spPr>
-        </p:pic>
-      </p:grpSp>
-      <p:sp>
-        <p:nvSpPr>
-          <p:cNvPr id="13" name="Folded Corner 12"/>
-          <p:cNvSpPr/>
-          <p:nvPr/>
-        </p:nvSpPr>
-        <p:spPr>
-          <a:xfrm rot="10800000" flipH="1">
-            <a:off x="6002435" y="3075348"/>
-            <a:ext cx="1037552" cy="1327710"/>
-          </a:xfrm>
-          <a:prstGeom prst="foldedCorner">
-            <a:avLst>
-              <a:gd name="adj" fmla="val 26556"/>
-            </a:avLst>
-          </a:prstGeom>
-          <a:solidFill>
-            <a:srgbClr val="052A48"/>
-          </a:solidFill>
-          <a:ln w="28575" cmpd="sng">
-            <a:solidFill>
-              <a:schemeClr val="bg1"/>
-            </a:solidFill>
-          </a:ln>
-          <a:effectLst/>
-        </p:spPr>
-        <p:style>
-          <a:lnRef idx="1">
-            <a:schemeClr val="accent1"/>
-          </a:lnRef>
-          <a:fillRef idx="3">
-            <a:schemeClr val="accent1"/>
-          </a:fillRef>
-          <a:effectRef idx="2">
-            <a:schemeClr val="accent1"/>
-          </a:effectRef>
-          <a:fontRef idx="minor">
-            <a:schemeClr val="lt1"/>
-          </a:fontRef>
-        </p:style>
-        <p:txBody>
-          <a:bodyPr rtlCol="0" anchor="ctr"/>
-          <a:lstStyle/>
-          <a:p>
-            <a:pPr algn="ctr"/>
-            <a:endParaRPr lang="en-US" sz="1000" u="sng" dirty="0"/>
-          </a:p>
-        </p:txBody>
-      </p:sp>
-    </p:spTree>
-    <p:extLst>
-      <p:ext uri="{BB962C8B-B14F-4D97-AF65-F5344CB8AC3E}">
-        <p14:creationId xmlns:p14="http://schemas.microsoft.com/office/powerpoint/2010/main" val="1333564583"/>
       </p:ext>
     </p:extLst>
   </p:cSld>
@@ -11106,7 +11166,7 @@
   <a:extraClrSchemeLst/>
   <a:extLst>
     <a:ext uri="{05A4C25C-085E-4340-85A3-A5531E510DB2}">
-      <thm15:themeFamily xmlns:thm15="http://schemas.microsoft.com/office/thememl/2012/main" xmlns="" name="Office Theme" id="{62F939B6-93AF-4DB8-9C6B-D6C7DFDC589F}" vid="{4A3C46E8-61CC-4603-A589-7422A47A8E4A}"/>
+      <thm15:themeFamily xmlns:thm15="http://schemas.microsoft.com/office/thememl/2012/main" name="Office Theme" id="{62F939B6-93AF-4DB8-9C6B-D6C7DFDC589F}" vid="{4A3C46E8-61CC-4603-A589-7422A47A8E4A}"/>
     </a:ext>
   </a:extLst>
 </a:theme>

</xml_diff>

<commit_message>
Add a thumbnail for the Optogenitcs gallery tutorial (#1729)
* Add a thumbnail for the Optogenitcs gallery tutorial

* Update Changelog
</commit_message>
<xml_diff>
--- a/docs/source/figures/gallery_thumbnails.pptx
+++ b/docs/source/figures/gallery_thumbnails.pptx
@@ -5,7 +5,7 @@
     <p:sldMasterId id="2147483660" r:id="rId1"/>
   </p:sldMasterIdLst>
   <p:notesMasterIdLst>
-    <p:notesMasterId r:id="rId19"/>
+    <p:notesMasterId r:id="rId20"/>
   </p:notesMasterIdLst>
   <p:sldIdLst>
     <p:sldId id="342" r:id="rId2"/>
@@ -14,17 +14,18 @@
     <p:sldId id="346" r:id="rId5"/>
     <p:sldId id="348" r:id="rId6"/>
     <p:sldId id="349" r:id="rId7"/>
-    <p:sldId id="350" r:id="rId8"/>
-    <p:sldId id="357" r:id="rId9"/>
-    <p:sldId id="352" r:id="rId10"/>
-    <p:sldId id="361" r:id="rId11"/>
-    <p:sldId id="363" r:id="rId12"/>
-    <p:sldId id="353" r:id="rId13"/>
-    <p:sldId id="364" r:id="rId14"/>
-    <p:sldId id="354" r:id="rId15"/>
-    <p:sldId id="355" r:id="rId16"/>
-    <p:sldId id="358" r:id="rId17"/>
-    <p:sldId id="359" r:id="rId18"/>
+    <p:sldId id="365" r:id="rId8"/>
+    <p:sldId id="350" r:id="rId9"/>
+    <p:sldId id="357" r:id="rId10"/>
+    <p:sldId id="352" r:id="rId11"/>
+    <p:sldId id="361" r:id="rId12"/>
+    <p:sldId id="363" r:id="rId13"/>
+    <p:sldId id="353" r:id="rId14"/>
+    <p:sldId id="364" r:id="rId15"/>
+    <p:sldId id="354" r:id="rId16"/>
+    <p:sldId id="355" r:id="rId17"/>
+    <p:sldId id="358" r:id="rId18"/>
+    <p:sldId id="359" r:id="rId19"/>
   </p:sldIdLst>
   <p:sldSz cx="12192000" cy="6858000"/>
   <p:notesSz cx="6858000" cy="9144000"/>
@@ -125,7 +126,18 @@
   </p:defaultTextStyle>
   <p:extLst>
     <p:ext uri="{EFAFB233-063F-42B5-8137-9DF3F51BA10A}">
-      <p15:sldGuideLst xmlns:p15="http://schemas.microsoft.com/office/powerpoint/2012/main" xmlns=""/>
+      <p15:sldGuideLst xmlns:p15="http://schemas.microsoft.com/office/powerpoint/2012/main">
+        <p15:guide id="1" orient="horz" pos="3405">
+          <p15:clr>
+            <a:srgbClr val="A4A3A4"/>
+          </p15:clr>
+        </p15:guide>
+        <p15:guide id="2" pos="4184">
+          <p15:clr>
+            <a:srgbClr val="A4A3A4"/>
+          </p15:clr>
+        </p15:guide>
+      </p15:sldGuideLst>
     </p:ext>
   </p:extLst>
 </p:presentation>
@@ -213,7 +225,7 @@
           <a:p>
             <a:fld id="{4D6A40B9-902A-4E0E-AF39-1C357549AEE0}" type="datetimeFigureOut">
               <a:rPr lang="en-US" smtClean="0"/>
-              <a:t>8/12/21</a:t>
+              <a:t>7/19/23</a:t>
             </a:fld>
             <a:endParaRPr lang="en-US"/>
           </a:p>
@@ -545,7 +557,7 @@
           <a:p>
             <a:fld id="{88156F16-9966-4EDC-933D-6170A05B6017}" type="slidenum">
               <a:rPr lang="en-US" smtClean="0"/>
-              <a:t>10</a:t>
+              <a:t>11</a:t>
             </a:fld>
             <a:endParaRPr lang="en-US"/>
           </a:p>
@@ -629,7 +641,7 @@
           <a:p>
             <a:fld id="{88156F16-9966-4EDC-933D-6170A05B6017}" type="slidenum">
               <a:rPr lang="en-US" smtClean="0"/>
-              <a:t>11</a:t>
+              <a:t>12</a:t>
             </a:fld>
             <a:endParaRPr lang="en-US"/>
           </a:p>
@@ -713,7 +725,7 @@
           <a:p>
             <a:fld id="{88156F16-9966-4EDC-933D-6170A05B6017}" type="slidenum">
               <a:rPr lang="en-US" smtClean="0"/>
-              <a:t>13</a:t>
+              <a:t>14</a:t>
             </a:fld>
             <a:endParaRPr lang="en-US"/>
           </a:p>
@@ -797,7 +809,7 @@
           <a:p>
             <a:fld id="{88156F16-9966-4EDC-933D-6170A05B6017}" type="slidenum">
               <a:rPr lang="en-US" smtClean="0"/>
-              <a:t>17</a:t>
+              <a:t>18</a:t>
             </a:fld>
             <a:endParaRPr lang="en-US"/>
           </a:p>
@@ -1629,7 +1641,7 @@
           <p:cNvPr id="4" name="Text Placeholder 3">
             <a:extLst>
               <a:ext uri="{FF2B5EF4-FFF2-40B4-BE49-F238E27FC236}">
-                <a16:creationId xmlns:a16="http://schemas.microsoft.com/office/drawing/2014/main" xmlns="" id="{8850B379-F419-41FB-9123-96081B074583}"/>
+                <a16:creationId xmlns:a16="http://schemas.microsoft.com/office/drawing/2014/main" id="{8850B379-F419-41FB-9123-96081B074583}"/>
               </a:ext>
             </a:extLst>
           </p:cNvPr>
@@ -1920,7 +1932,7 @@
           <p:cNvPr id="5" name="Picture 4">
             <a:extLst>
               <a:ext uri="{FF2B5EF4-FFF2-40B4-BE49-F238E27FC236}">
-                <a16:creationId xmlns:a16="http://schemas.microsoft.com/office/drawing/2014/main" xmlns="" id="{A5059957-9534-4FB9-8820-2343C3BF0E8F}"/>
+                <a16:creationId xmlns:a16="http://schemas.microsoft.com/office/drawing/2014/main" id="{A5059957-9534-4FB9-8820-2343C3BF0E8F}"/>
               </a:ext>
             </a:extLst>
           </p:cNvPr>
@@ -1950,7 +1962,7 @@
           <p:cNvPr id="4" name="Text Placeholder 3">
             <a:extLst>
               <a:ext uri="{FF2B5EF4-FFF2-40B4-BE49-F238E27FC236}">
-                <a16:creationId xmlns:a16="http://schemas.microsoft.com/office/drawing/2014/main" xmlns="" id="{8850B379-F419-41FB-9123-96081B074583}"/>
+                <a16:creationId xmlns:a16="http://schemas.microsoft.com/office/drawing/2014/main" id="{8850B379-F419-41FB-9123-96081B074583}"/>
               </a:ext>
             </a:extLst>
           </p:cNvPr>
@@ -2307,7 +2319,7 @@
           <p:cNvPr id="7" name="Google Shape;20;p4">
             <a:extLst>
               <a:ext uri="{FF2B5EF4-FFF2-40B4-BE49-F238E27FC236}">
-                <a16:creationId xmlns:a16="http://schemas.microsoft.com/office/drawing/2014/main" xmlns="" id="{537643E4-B983-42CC-9421-9C4C107A5DA4}"/>
+                <a16:creationId xmlns:a16="http://schemas.microsoft.com/office/drawing/2014/main" id="{537643E4-B983-42CC-9421-9C4C107A5DA4}"/>
               </a:ext>
             </a:extLst>
           </p:cNvPr>
@@ -3712,7 +3724,7 @@
           <a:p>
             <a:pPr algn="ctr"/>
             <a:r>
-              <a:rPr lang="en-US" sz="5400" b="1" dirty="0" smtClean="0">
+              <a:rPr lang="en-US" sz="5400" b="1" dirty="0">
                 <a:solidFill>
                   <a:srgbClr val="052B48"/>
                 </a:solidFill>
@@ -3721,13 +3733,6 @@
               </a:rPr>
               <a:t>Intracellular Electrophysiology</a:t>
             </a:r>
-            <a:endParaRPr lang="en-US" sz="5400" b="1" dirty="0">
-              <a:solidFill>
-                <a:srgbClr val="052B48"/>
-              </a:solidFill>
-              <a:latin typeface="Calibri"/>
-              <a:cs typeface="Calibri"/>
-            </a:endParaRPr>
           </a:p>
         </p:txBody>
       </p:sp>
@@ -3736,7 +3741,7 @@
           <p:cNvPr id="5" name="Picture 4" descr="A screenshot of a cell phone&#10;&#10;Description automatically generated">
             <a:extLst>
               <a:ext uri="{FF2B5EF4-FFF2-40B4-BE49-F238E27FC236}">
-                <a16:creationId xmlns="" xmlns:a16="http://schemas.microsoft.com/office/drawing/2014/main" id="{8C303482-C4AE-E049-A13A-50CE832D1F2A}"/>
+                <a16:creationId xmlns:a16="http://schemas.microsoft.com/office/drawing/2014/main" id="{8C303482-C4AE-E049-A13A-50CE832D1F2A}"/>
               </a:ext>
             </a:extLst>
           </p:cNvPr>
@@ -3789,33 +3794,18 @@
           <a:p>
             <a:r>
               <a:rPr lang="en-US" sz="1400" dirty="0"/>
-              <a:t> </a:t>
-            </a:r>
-            <a:r>
-              <a:rPr lang="en-US" sz="1400" dirty="0" smtClean="0"/>
-              <a:t>(figure source</a:t>
-            </a:r>
-            <a:r>
-              <a:rPr lang="en-US" sz="1400" dirty="0"/>
-              <a:t>: </a:t>
+              <a:t> (figure source: </a:t>
             </a:r>
             <a:r>
               <a:rPr lang="en-US" sz="1400" dirty="0">
                 <a:hlinkClick r:id="rId3"/>
               </a:rPr>
-              <a:t>celltypes.brain-</a:t>
+              <a:t>celltypes.brain-map.org</a:t>
             </a:r>
             <a:r>
-              <a:rPr lang="en-US" sz="1400" dirty="0" smtClean="0">
-                <a:hlinkClick r:id="rId3"/>
-              </a:rPr>
-              <a:t>map.org</a:t>
-            </a:r>
-            <a:r>
-              <a:rPr lang="en-US" sz="1400" dirty="0" smtClean="0"/>
+              <a:rPr lang="en-US" sz="1400" dirty="0"/>
               <a:t>)</a:t>
             </a:r>
-            <a:endParaRPr lang="en-US" sz="1400" dirty="0"/>
           </a:p>
         </p:txBody>
       </p:sp>
@@ -3907,7 +3897,7 @@
         <p:spPr>
           <a:xfrm>
             <a:off x="863980" y="855015"/>
-            <a:ext cx="7213708" cy="923330"/>
+            <a:ext cx="7213708" cy="1754327"/>
           </a:xfrm>
           <a:prstGeom prst="rect">
             <a:avLst/>
@@ -3921,35 +3911,146 @@
           <a:p>
             <a:pPr algn="ctr"/>
             <a:r>
-              <a:rPr lang="en-US" sz="5400" b="1" dirty="0" smtClean="0">
+              <a:rPr lang="en-US" sz="5400" b="1" dirty="0">
                 <a:solidFill>
                   <a:srgbClr val="052B48"/>
                 </a:solidFill>
                 <a:latin typeface="Calibri"/>
                 <a:cs typeface="Calibri"/>
               </a:rPr>
-              <a:t>Parallel I/O using MPI</a:t>
+              <a:t>Modular Data Storage using External Files</a:t>
             </a:r>
-            <a:endParaRPr lang="en-US" sz="5400" b="1" dirty="0">
-              <a:solidFill>
-                <a:srgbClr val="052B48"/>
-              </a:solidFill>
-              <a:latin typeface="Calibri"/>
-              <a:cs typeface="Calibri"/>
-            </a:endParaRPr>
           </a:p>
         </p:txBody>
       </p:sp>
       <p:sp>
         <p:nvSpPr>
-          <p:cNvPr id="8" name="Folded Corner 7"/>
+          <p:cNvPr id="15" name="Left Arrow 14"/>
           <p:cNvSpPr/>
           <p:nvPr/>
         </p:nvSpPr>
         <p:spPr>
+          <a:xfrm rot="5400000" flipV="1">
+            <a:off x="4274700" y="3528909"/>
+            <a:ext cx="550232" cy="279992"/>
+          </a:xfrm>
+          <a:prstGeom prst="leftArrow">
+            <a:avLst>
+              <a:gd name="adj1" fmla="val 60000"/>
+              <a:gd name="adj2" fmla="val 50000"/>
+            </a:avLst>
+          </a:prstGeom>
+          <a:solidFill>
+            <a:srgbClr val="052A48"/>
+          </a:solidFill>
+          <a:ln w="38100" cmpd="sng">
+            <a:solidFill>
+              <a:srgbClr val="FFFFFF"/>
+            </a:solidFill>
+          </a:ln>
+        </p:spPr>
+        <p:style>
+          <a:lnRef idx="0">
+            <a:schemeClr val="accent1">
+              <a:tint val="60000"/>
+              <a:hueOff val="0"/>
+              <a:satOff val="0"/>
+              <a:lumOff val="0"/>
+              <a:alphaOff val="0"/>
+            </a:schemeClr>
+          </a:lnRef>
+          <a:fillRef idx="1">
+            <a:schemeClr val="accent1">
+              <a:tint val="60000"/>
+              <a:hueOff val="0"/>
+              <a:satOff val="0"/>
+              <a:lumOff val="0"/>
+              <a:alphaOff val="0"/>
+            </a:schemeClr>
+          </a:fillRef>
+          <a:effectRef idx="0">
+            <a:schemeClr val="accent1">
+              <a:tint val="60000"/>
+              <a:hueOff val="0"/>
+              <a:satOff val="0"/>
+              <a:lumOff val="0"/>
+              <a:alphaOff val="0"/>
+            </a:schemeClr>
+          </a:effectRef>
+          <a:fontRef idx="minor">
+            <a:schemeClr val="lt1"/>
+          </a:fontRef>
+        </p:style>
+      </p:sp>
+      <p:sp>
+        <p:nvSpPr>
+          <p:cNvPr id="16" name="Left Arrow 15"/>
+          <p:cNvSpPr/>
+          <p:nvPr/>
+        </p:nvSpPr>
+        <p:spPr>
+          <a:xfrm rot="2734356">
+            <a:off x="3061789" y="4549986"/>
+            <a:ext cx="1096849" cy="425306"/>
+          </a:xfrm>
+          <a:prstGeom prst="leftArrow">
+            <a:avLst>
+              <a:gd name="adj1" fmla="val 60000"/>
+              <a:gd name="adj2" fmla="val 50000"/>
+            </a:avLst>
+          </a:prstGeom>
+          <a:solidFill>
+            <a:srgbClr val="052A48"/>
+          </a:solidFill>
+          <a:ln w="38100" cmpd="sng">
+            <a:solidFill>
+              <a:srgbClr val="FFFFFF"/>
+            </a:solidFill>
+          </a:ln>
+        </p:spPr>
+        <p:style>
+          <a:lnRef idx="0">
+            <a:schemeClr val="accent1">
+              <a:tint val="60000"/>
+              <a:hueOff val="0"/>
+              <a:satOff val="0"/>
+              <a:lumOff val="0"/>
+              <a:alphaOff val="0"/>
+            </a:schemeClr>
+          </a:lnRef>
+          <a:fillRef idx="1">
+            <a:schemeClr val="accent1">
+              <a:tint val="60000"/>
+              <a:hueOff val="0"/>
+              <a:satOff val="0"/>
+              <a:lumOff val="0"/>
+              <a:alphaOff val="0"/>
+            </a:schemeClr>
+          </a:fillRef>
+          <a:effectRef idx="0">
+            <a:schemeClr val="accent1">
+              <a:tint val="60000"/>
+              <a:hueOff val="0"/>
+              <a:satOff val="0"/>
+              <a:lumOff val="0"/>
+              <a:alphaOff val="0"/>
+            </a:schemeClr>
+          </a:effectRef>
+          <a:fontRef idx="minor">
+            <a:schemeClr val="lt1"/>
+          </a:fontRef>
+        </p:style>
+      </p:sp>
+      <p:sp>
+        <p:nvSpPr>
+          <p:cNvPr id="12" name="Folded Corner 11"/>
+          <p:cNvSpPr/>
+          <p:nvPr/>
+        </p:nvSpPr>
+        <p:spPr>
           <a:xfrm rot="10800000" flipH="1">
-            <a:off x="3767562" y="2807415"/>
-            <a:ext cx="1419941" cy="1900138"/>
+            <a:off x="2182317" y="3072614"/>
+            <a:ext cx="1037552" cy="1327710"/>
           </a:xfrm>
           <a:prstGeom prst="foldedCorner">
             <a:avLst>
@@ -3985,11 +4086,475 @@
           <a:lstStyle/>
           <a:p>
             <a:pPr algn="ctr"/>
+            <a:endParaRPr lang="en-US" sz="1000" u="sng" dirty="0"/>
+          </a:p>
+        </p:txBody>
+      </p:sp>
+      <p:sp>
+        <p:nvSpPr>
+          <p:cNvPr id="14" name="Folded Corner 13"/>
+          <p:cNvSpPr/>
+          <p:nvPr/>
+        </p:nvSpPr>
+        <p:spPr>
+          <a:xfrm rot="10800000" flipH="1">
+            <a:off x="4267044" y="2617358"/>
+            <a:ext cx="572757" cy="762891"/>
+          </a:xfrm>
+          <a:prstGeom prst="foldedCorner">
+            <a:avLst>
+              <a:gd name="adj" fmla="val 26556"/>
+            </a:avLst>
+          </a:prstGeom>
+          <a:solidFill>
+            <a:srgbClr val="052A48"/>
+          </a:solidFill>
+          <a:ln w="28575" cmpd="sng">
+            <a:solidFill>
+              <a:schemeClr val="bg1"/>
+            </a:solidFill>
+          </a:ln>
+          <a:effectLst/>
+        </p:spPr>
+        <p:style>
+          <a:lnRef idx="1">
+            <a:schemeClr val="accent1"/>
+          </a:lnRef>
+          <a:fillRef idx="3">
+            <a:schemeClr val="accent1"/>
+          </a:fillRef>
+          <a:effectRef idx="2">
+            <a:schemeClr val="accent1"/>
+          </a:effectRef>
+          <a:fontRef idx="minor">
+            <a:schemeClr val="lt1"/>
+          </a:fontRef>
+        </p:style>
+        <p:txBody>
+          <a:bodyPr rtlCol="0" anchor="ctr"/>
+          <a:lstStyle/>
+          <a:p>
+            <a:pPr algn="ctr"/>
+            <a:endParaRPr lang="en-US" sz="1000" u="sng" dirty="0"/>
+          </a:p>
+        </p:txBody>
+      </p:sp>
+      <p:sp>
+        <p:nvSpPr>
+          <p:cNvPr id="20" name="Left Arrow 19"/>
+          <p:cNvSpPr/>
+          <p:nvPr/>
+        </p:nvSpPr>
+        <p:spPr>
+          <a:xfrm rot="18865644" flipH="1">
+            <a:off x="5072927" y="4550292"/>
+            <a:ext cx="1096849" cy="425306"/>
+          </a:xfrm>
+          <a:prstGeom prst="leftArrow">
+            <a:avLst>
+              <a:gd name="adj1" fmla="val 60000"/>
+              <a:gd name="adj2" fmla="val 50000"/>
+            </a:avLst>
+          </a:prstGeom>
+          <a:solidFill>
+            <a:srgbClr val="052A48"/>
+          </a:solidFill>
+          <a:ln w="38100" cmpd="sng">
+            <a:solidFill>
+              <a:srgbClr val="FFFFFF"/>
+            </a:solidFill>
+          </a:ln>
+        </p:spPr>
+        <p:style>
+          <a:lnRef idx="0">
+            <a:schemeClr val="accent1">
+              <a:tint val="60000"/>
+              <a:hueOff val="0"/>
+              <a:satOff val="0"/>
+              <a:lumOff val="0"/>
+              <a:alphaOff val="0"/>
+            </a:schemeClr>
+          </a:lnRef>
+          <a:fillRef idx="1">
+            <a:schemeClr val="accent1">
+              <a:tint val="60000"/>
+              <a:hueOff val="0"/>
+              <a:satOff val="0"/>
+              <a:lumOff val="0"/>
+              <a:alphaOff val="0"/>
+            </a:schemeClr>
+          </a:fillRef>
+          <a:effectRef idx="0">
+            <a:schemeClr val="accent1">
+              <a:tint val="60000"/>
+              <a:hueOff val="0"/>
+              <a:satOff val="0"/>
+              <a:lumOff val="0"/>
+              <a:alphaOff val="0"/>
+            </a:schemeClr>
+          </a:effectRef>
+          <a:fontRef idx="minor">
+            <a:schemeClr val="lt1"/>
+          </a:fontRef>
+        </p:style>
+      </p:sp>
+      <p:sp>
+        <p:nvSpPr>
+          <p:cNvPr id="8" name="Folded Corner 7"/>
+          <p:cNvSpPr/>
+          <p:nvPr/>
+        </p:nvSpPr>
+        <p:spPr>
+          <a:xfrm rot="10800000" flipH="1">
+            <a:off x="3899840" y="3720272"/>
+            <a:ext cx="1419941" cy="1900138"/>
+          </a:xfrm>
+          <a:prstGeom prst="foldedCorner">
+            <a:avLst>
+              <a:gd name="adj" fmla="val 26556"/>
+            </a:avLst>
+          </a:prstGeom>
+          <a:solidFill>
+            <a:srgbClr val="052A48"/>
+          </a:solidFill>
+          <a:ln w="28575" cmpd="sng">
+            <a:solidFill>
+              <a:schemeClr val="bg1"/>
+            </a:solidFill>
+          </a:ln>
+          <a:effectLst/>
+        </p:spPr>
+        <p:style>
+          <a:lnRef idx="1">
+            <a:schemeClr val="accent1"/>
+          </a:lnRef>
+          <a:fillRef idx="3">
+            <a:schemeClr val="accent1"/>
+          </a:fillRef>
+          <a:effectRef idx="2">
+            <a:schemeClr val="accent1"/>
+          </a:effectRef>
+          <a:fontRef idx="minor">
+            <a:schemeClr val="lt1"/>
+          </a:fontRef>
+        </p:style>
+        <p:txBody>
+          <a:bodyPr rtlCol="0" anchor="ctr"/>
+          <a:lstStyle/>
+          <a:p>
+            <a:pPr algn="ctr"/>
             <a:r>
-              <a:rPr lang="en-US" u="sng" dirty="0" smtClean="0"/>
+              <a:rPr lang="en-US" u="sng" dirty="0"/>
               <a:t>																			   </a:t>
             </a:r>
-            <a:endParaRPr lang="en-US" u="sng" dirty="0"/>
+          </a:p>
+        </p:txBody>
+      </p:sp>
+      <p:grpSp>
+        <p:nvGrpSpPr>
+          <p:cNvPr id="11" name="Group 10"/>
+          <p:cNvGrpSpPr>
+            <a:grpSpLocks noChangeAspect="1"/>
+          </p:cNvGrpSpPr>
+          <p:nvPr/>
+        </p:nvGrpSpPr>
+        <p:grpSpPr>
+          <a:xfrm>
+            <a:off x="3606582" y="3649328"/>
+            <a:ext cx="947929" cy="947929"/>
+            <a:chOff x="2259923" y="2660201"/>
+            <a:chExt cx="1959561" cy="1962561"/>
+          </a:xfrm>
+        </p:grpSpPr>
+        <p:sp>
+          <p:nvSpPr>
+            <p:cNvPr id="18" name="Oval 17"/>
+            <p:cNvSpPr/>
+            <p:nvPr/>
+          </p:nvSpPr>
+          <p:spPr>
+            <a:xfrm>
+              <a:off x="2259923" y="2660201"/>
+              <a:ext cx="1959561" cy="1962561"/>
+            </a:xfrm>
+            <a:prstGeom prst="ellipse">
+              <a:avLst/>
+            </a:prstGeom>
+            <a:solidFill>
+              <a:schemeClr val="bg1"/>
+            </a:solidFill>
+            <a:ln w="76200" cmpd="sng">
+              <a:solidFill>
+                <a:srgbClr val="052A48"/>
+              </a:solidFill>
+            </a:ln>
+            <a:effectLst/>
+          </p:spPr>
+          <p:style>
+            <a:lnRef idx="1">
+              <a:schemeClr val="accent1"/>
+            </a:lnRef>
+            <a:fillRef idx="3">
+              <a:schemeClr val="accent1"/>
+            </a:fillRef>
+            <a:effectRef idx="2">
+              <a:schemeClr val="accent1"/>
+            </a:effectRef>
+            <a:fontRef idx="minor">
+              <a:schemeClr val="lt1"/>
+            </a:fontRef>
+          </p:style>
+          <p:txBody>
+            <a:bodyPr rtlCol="0" anchor="ctr"/>
+            <a:lstStyle/>
+            <a:p>
+              <a:endParaRPr lang="en-US" sz="4400" dirty="0"/>
+            </a:p>
+          </p:txBody>
+        </p:sp>
+        <p:pic>
+          <p:nvPicPr>
+            <p:cNvPr id="19" name="Picture 18" descr="logo_brain_transp_512x512.png"/>
+            <p:cNvPicPr>
+              <a:picLocks noChangeAspect="1"/>
+            </p:cNvPicPr>
+            <p:nvPr/>
+          </p:nvPicPr>
+          <p:blipFill>
+            <a:blip r:embed="rId2">
+              <a:extLst>
+                <a:ext uri="{28A0092B-C50C-407E-A947-70E740481C1C}">
+                  <a14:useLocalDpi xmlns:a14="http://schemas.microsoft.com/office/drawing/2010/main" val="0"/>
+                </a:ext>
+              </a:extLst>
+            </a:blip>
+            <a:stretch>
+              <a:fillRect/>
+            </a:stretch>
+          </p:blipFill>
+          <p:spPr>
+            <a:xfrm>
+              <a:off x="2393887" y="2838486"/>
+              <a:ext cx="1703898" cy="1703898"/>
+            </a:xfrm>
+            <a:prstGeom prst="rect">
+              <a:avLst/>
+            </a:prstGeom>
+          </p:spPr>
+        </p:pic>
+      </p:grpSp>
+      <p:sp>
+        <p:nvSpPr>
+          <p:cNvPr id="13" name="Folded Corner 12"/>
+          <p:cNvSpPr/>
+          <p:nvPr/>
+        </p:nvSpPr>
+        <p:spPr>
+          <a:xfrm rot="10800000" flipH="1">
+            <a:off x="6002435" y="3075348"/>
+            <a:ext cx="1037552" cy="1327710"/>
+          </a:xfrm>
+          <a:prstGeom prst="foldedCorner">
+            <a:avLst>
+              <a:gd name="adj" fmla="val 26556"/>
+            </a:avLst>
+          </a:prstGeom>
+          <a:solidFill>
+            <a:srgbClr val="052A48"/>
+          </a:solidFill>
+          <a:ln w="28575" cmpd="sng">
+            <a:solidFill>
+              <a:schemeClr val="bg1"/>
+            </a:solidFill>
+          </a:ln>
+          <a:effectLst/>
+        </p:spPr>
+        <p:style>
+          <a:lnRef idx="1">
+            <a:schemeClr val="accent1"/>
+          </a:lnRef>
+          <a:fillRef idx="3">
+            <a:schemeClr val="accent1"/>
+          </a:fillRef>
+          <a:effectRef idx="2">
+            <a:schemeClr val="accent1"/>
+          </a:effectRef>
+          <a:fontRef idx="minor">
+            <a:schemeClr val="lt1"/>
+          </a:fontRef>
+        </p:style>
+        <p:txBody>
+          <a:bodyPr rtlCol="0" anchor="ctr"/>
+          <a:lstStyle/>
+          <a:p>
+            <a:pPr algn="ctr"/>
+            <a:endParaRPr lang="en-US" sz="1000" u="sng" dirty="0"/>
+          </a:p>
+        </p:txBody>
+      </p:sp>
+    </p:spTree>
+    <p:extLst>
+      <p:ext uri="{BB962C8B-B14F-4D97-AF65-F5344CB8AC3E}">
+        <p14:creationId xmlns:p14="http://schemas.microsoft.com/office/powerpoint/2010/main" val="1333564583"/>
+      </p:ext>
+    </p:extLst>
+  </p:cSld>
+  <p:clrMapOvr>
+    <a:masterClrMapping/>
+  </p:clrMapOvr>
+</p:sld>
+</file>
+
+<file path=ppt/slides/slide11.xml><?xml version="1.0" encoding="utf-8"?>
+<p:sld xmlns:a="http://schemas.openxmlformats.org/drawingml/2006/main" xmlns:r="http://schemas.openxmlformats.org/officeDocument/2006/relationships" xmlns:p="http://schemas.openxmlformats.org/presentationml/2006/main">
+  <p:cSld>
+    <p:spTree>
+      <p:nvGrpSpPr>
+        <p:cNvPr id="1" name=""/>
+        <p:cNvGrpSpPr/>
+        <p:nvPr/>
+      </p:nvGrpSpPr>
+      <p:grpSpPr>
+        <a:xfrm>
+          <a:off x="0" y="0"/>
+          <a:ext cx="0" cy="0"/>
+          <a:chOff x="0" y="0"/>
+          <a:chExt cx="0" cy="0"/>
+        </a:xfrm>
+      </p:grpSpPr>
+      <p:sp>
+        <p:nvSpPr>
+          <p:cNvPr id="27" name="Rounded Rectangle 26"/>
+          <p:cNvSpPr/>
+          <p:nvPr/>
+        </p:nvSpPr>
+        <p:spPr>
+          <a:xfrm>
+            <a:off x="853570" y="853671"/>
+            <a:ext cx="7234527" cy="4851352"/>
+          </a:xfrm>
+          <a:prstGeom prst="roundRect">
+            <a:avLst>
+              <a:gd name="adj" fmla="val 4437"/>
+            </a:avLst>
+          </a:prstGeom>
+          <a:solidFill>
+            <a:srgbClr val="EDEDED"/>
+          </a:solidFill>
+          <a:ln>
+            <a:solidFill>
+              <a:srgbClr val="000000"/>
+            </a:solidFill>
+          </a:ln>
+          <a:effectLst/>
+        </p:spPr>
+        <p:style>
+          <a:lnRef idx="1">
+            <a:schemeClr val="accent1"/>
+          </a:lnRef>
+          <a:fillRef idx="3">
+            <a:schemeClr val="accent1"/>
+          </a:fillRef>
+          <a:effectRef idx="2">
+            <a:schemeClr val="accent1"/>
+          </a:effectRef>
+          <a:fontRef idx="minor">
+            <a:schemeClr val="lt1"/>
+          </a:fontRef>
+        </p:style>
+        <p:txBody>
+          <a:bodyPr rtlCol="0" anchor="ctr"/>
+          <a:lstStyle/>
+          <a:p>
+            <a:pPr algn="ctr"/>
+            <a:endParaRPr lang="en-US"/>
+          </a:p>
+        </p:txBody>
+      </p:sp>
+      <p:sp>
+        <p:nvSpPr>
+          <p:cNvPr id="26" name="Rectangle 25"/>
+          <p:cNvSpPr/>
+          <p:nvPr/>
+        </p:nvSpPr>
+        <p:spPr>
+          <a:xfrm>
+            <a:off x="863980" y="855015"/>
+            <a:ext cx="7213708" cy="923330"/>
+          </a:xfrm>
+          <a:prstGeom prst="rect">
+            <a:avLst/>
+          </a:prstGeom>
+        </p:spPr>
+        <p:txBody>
+          <a:bodyPr wrap="square">
+            <a:spAutoFit/>
+          </a:bodyPr>
+          <a:lstStyle/>
+          <a:p>
+            <a:pPr algn="ctr"/>
+            <a:r>
+              <a:rPr lang="en-US" sz="5400" b="1" dirty="0">
+                <a:solidFill>
+                  <a:srgbClr val="052B48"/>
+                </a:solidFill>
+                <a:latin typeface="Calibri"/>
+                <a:cs typeface="Calibri"/>
+              </a:rPr>
+              <a:t>Parallel I/O using MPI</a:t>
+            </a:r>
+          </a:p>
+        </p:txBody>
+      </p:sp>
+      <p:sp>
+        <p:nvSpPr>
+          <p:cNvPr id="8" name="Folded Corner 7"/>
+          <p:cNvSpPr/>
+          <p:nvPr/>
+        </p:nvSpPr>
+        <p:spPr>
+          <a:xfrm rot="10800000" flipH="1">
+            <a:off x="3767562" y="2807415"/>
+            <a:ext cx="1419941" cy="1900138"/>
+          </a:xfrm>
+          <a:prstGeom prst="foldedCorner">
+            <a:avLst>
+              <a:gd name="adj" fmla="val 26556"/>
+            </a:avLst>
+          </a:prstGeom>
+          <a:solidFill>
+            <a:srgbClr val="052A48"/>
+          </a:solidFill>
+          <a:ln w="28575" cmpd="sng">
+            <a:solidFill>
+              <a:schemeClr val="bg1"/>
+            </a:solidFill>
+          </a:ln>
+          <a:effectLst/>
+        </p:spPr>
+        <p:style>
+          <a:lnRef idx="1">
+            <a:schemeClr val="accent1"/>
+          </a:lnRef>
+          <a:fillRef idx="3">
+            <a:schemeClr val="accent1"/>
+          </a:fillRef>
+          <a:effectRef idx="2">
+            <a:schemeClr val="accent1"/>
+          </a:effectRef>
+          <a:fontRef idx="minor">
+            <a:schemeClr val="lt1"/>
+          </a:fontRef>
+        </p:style>
+        <p:txBody>
+          <a:bodyPr rtlCol="0" anchor="ctr"/>
+          <a:lstStyle/>
+          <a:p>
+            <a:pPr algn="ctr"/>
+            <a:r>
+              <a:rPr lang="en-US" u="sng" dirty="0"/>
+              <a:t>																			   </a:t>
+            </a:r>
           </a:p>
         </p:txBody>
       </p:sp>
@@ -4135,7 +4700,7 @@
               <a:defRPr/>
             </a:pPr>
             <a:r>
-              <a:rPr kumimoji="0" lang="en-US" sz="1800" i="0" u="none" strike="noStrike" kern="0" cap="none" spc="0" normalizeH="0" baseline="0" noProof="0" dirty="0" err="1" smtClean="0">
+              <a:rPr kumimoji="0" lang="en-US" sz="1800" i="0" u="none" strike="noStrike" kern="0" cap="none" spc="0" normalizeH="0" baseline="0" noProof="0" dirty="0" err="1">
                 <a:ln>
                   <a:noFill/>
                 </a:ln>
@@ -4221,7 +4786,7 @@
               <a:defRPr/>
             </a:pPr>
             <a:r>
-              <a:rPr kumimoji="0" lang="en-US" sz="1800" i="0" u="none" strike="noStrike" kern="0" cap="none" spc="0" normalizeH="0" baseline="0" noProof="0" dirty="0" err="1" smtClean="0">
+              <a:rPr kumimoji="0" lang="en-US" sz="1800" i="0" u="none" strike="noStrike" kern="0" cap="none" spc="0" normalizeH="0" baseline="0" noProof="0" dirty="0" err="1">
                 <a:ln>
                   <a:noFill/>
                 </a:ln>
@@ -4307,7 +4872,7 @@
               <a:defRPr/>
             </a:pPr>
             <a:r>
-              <a:rPr kumimoji="0" lang="en-US" sz="1800" i="0" u="none" strike="noStrike" kern="0" cap="none" spc="0" normalizeH="0" baseline="0" noProof="0" dirty="0" err="1" smtClean="0">
+              <a:rPr kumimoji="0" lang="en-US" sz="1800" i="0" u="none" strike="noStrike" kern="0" cap="none" spc="0" normalizeH="0" baseline="0" noProof="0" dirty="0" err="1">
                 <a:ln>
                   <a:noFill/>
                 </a:ln>
@@ -4393,7 +4958,7 @@
               <a:defRPr/>
             </a:pPr>
             <a:r>
-              <a:rPr kumimoji="0" lang="en-US" sz="1800" i="0" u="none" strike="noStrike" kern="0" cap="none" spc="0" normalizeH="0" baseline="0" noProof="0" dirty="0" err="1" smtClean="0">
+              <a:rPr kumimoji="0" lang="en-US" sz="1800" i="0" u="none" strike="noStrike" kern="0" cap="none" spc="0" normalizeH="0" baseline="0" noProof="0" dirty="0" err="1">
                 <a:ln>
                   <a:noFill/>
                 </a:ln>
@@ -4774,7 +5339,7 @@
               <a:defRPr/>
             </a:pPr>
             <a:r>
-              <a:rPr kumimoji="0" lang="en-US" sz="1800" i="0" u="none" strike="noStrike" kern="0" cap="none" spc="0" normalizeH="0" baseline="0" noProof="0" dirty="0" err="1" smtClean="0">
+              <a:rPr kumimoji="0" lang="en-US" sz="1800" i="0" u="none" strike="noStrike" kern="0" cap="none" spc="0" normalizeH="0" baseline="0" noProof="0" dirty="0" err="1">
                 <a:ln>
                   <a:noFill/>
                 </a:ln>
@@ -4919,7 +5484,7 @@
               <a:defRPr/>
             </a:pPr>
             <a:r>
-              <a:rPr kumimoji="0" lang="en-US" sz="1800" i="0" u="none" strike="noStrike" kern="0" cap="none" spc="0" normalizeH="0" baseline="0" noProof="0" dirty="0" err="1" smtClean="0">
+              <a:rPr kumimoji="0" lang="en-US" sz="1800" i="0" u="none" strike="noStrike" kern="0" cap="none" spc="0" normalizeH="0" baseline="0" noProof="0" dirty="0" err="1">
                 <a:ln>
                   <a:noFill/>
                 </a:ln>
@@ -5064,7 +5629,7 @@
               <a:defRPr/>
             </a:pPr>
             <a:r>
-              <a:rPr kumimoji="0" lang="en-US" sz="1800" i="0" u="none" strike="noStrike" kern="0" cap="none" spc="0" normalizeH="0" baseline="0" noProof="0" dirty="0" err="1" smtClean="0">
+              <a:rPr kumimoji="0" lang="en-US" sz="1800" i="0" u="none" strike="noStrike" kern="0" cap="none" spc="0" normalizeH="0" baseline="0" noProof="0" dirty="0" err="1">
                 <a:ln>
                   <a:noFill/>
                 </a:ln>
@@ -5209,7 +5774,7 @@
               <a:defRPr/>
             </a:pPr>
             <a:r>
-              <a:rPr kumimoji="0" lang="en-US" sz="1800" i="0" u="none" strike="noStrike" kern="0" cap="none" spc="0" normalizeH="0" baseline="0" noProof="0" dirty="0" err="1" smtClean="0">
+              <a:rPr kumimoji="0" lang="en-US" sz="1800" i="0" u="none" strike="noStrike" kern="0" cap="none" spc="0" normalizeH="0" baseline="0" noProof="0" dirty="0" err="1">
                 <a:ln>
                   <a:noFill/>
                 </a:ln>
@@ -5259,7 +5824,7 @@
 </p:sld>
 </file>
 
-<file path=ppt/slides/slide11.xml><?xml version="1.0" encoding="utf-8"?>
+<file path=ppt/slides/slide12.xml><?xml version="1.0" encoding="utf-8"?>
 <p:sld xmlns:a="http://schemas.openxmlformats.org/drawingml/2006/main" xmlns:r="http://schemas.openxmlformats.org/officeDocument/2006/relationships" xmlns:p="http://schemas.openxmlformats.org/presentationml/2006/main">
   <p:cSld>
     <p:spTree>
@@ -5348,7 +5913,7 @@
           <a:p>
             <a:pPr algn="ctr"/>
             <a:r>
-              <a:rPr lang="en-US" sz="5400" b="1" dirty="0" smtClean="0">
+              <a:rPr lang="en-US" sz="5400" b="1" dirty="0">
                 <a:solidFill>
                   <a:srgbClr val="052B48"/>
                 </a:solidFill>
@@ -5361,7 +5926,7 @@
           <a:p>
             <a:pPr algn="ctr"/>
             <a:r>
-              <a:rPr lang="en-US" sz="5400" b="1" dirty="0" smtClean="0">
+              <a:rPr lang="en-US" sz="5400" b="1" dirty="0">
                 <a:solidFill>
                   <a:srgbClr val="052B48"/>
                 </a:solidFill>
@@ -5370,13 +5935,6 @@
               </a:rPr>
               <a:t>S3 Bucket</a:t>
             </a:r>
-            <a:endParaRPr lang="en-US" sz="5400" b="1" dirty="0">
-              <a:solidFill>
-                <a:srgbClr val="052B48"/>
-              </a:solidFill>
-              <a:latin typeface="Calibri"/>
-              <a:cs typeface="Calibri"/>
-            </a:endParaRPr>
           </a:p>
         </p:txBody>
       </p:sp>
@@ -5537,10 +6095,9 @@
             <a:p>
               <a:pPr algn="ctr"/>
               <a:r>
-                <a:rPr lang="en-US" u="sng" dirty="0" smtClean="0"/>
+                <a:rPr lang="en-US" u="sng" dirty="0"/>
                 <a:t>												   </a:t>
               </a:r>
-              <a:endParaRPr lang="en-US" u="sng" dirty="0"/>
             </a:p>
           </p:txBody>
         </p:sp>
@@ -5918,14 +6475,14 @@
           <a:p>
             <a:pPr algn="ctr"/>
             <a:r>
-              <a:rPr lang="en-US" sz="1200" dirty="0" smtClean="0">
+              <a:rPr lang="en-US" sz="1200" dirty="0">
                 <a:latin typeface="Courier"/>
                 <a:cs typeface="Courier"/>
               </a:rPr>
               <a:t>010011101000101011101</a:t>
             </a:r>
             <a:r>
-              <a:rPr lang="mr-IN" sz="1200" dirty="0" smtClean="0">
+              <a:rPr lang="mr-IN" sz="1200" dirty="0">
                 <a:latin typeface="Courier"/>
                 <a:cs typeface="Courier"/>
               </a:rPr>
@@ -5981,7 +6538,7 @@
 </p:sld>
 </file>
 
-<file path=ppt/slides/slide12.xml><?xml version="1.0" encoding="utf-8"?>
+<file path=ppt/slides/slide13.xml><?xml version="1.0" encoding="utf-8"?>
 <p:sld xmlns:a="http://schemas.openxmlformats.org/drawingml/2006/main" xmlns:r="http://schemas.openxmlformats.org/officeDocument/2006/relationships" xmlns:p="http://schemas.openxmlformats.org/presentationml/2006/main">
   <p:cSld>
     <p:spTree>
@@ -6070,7 +6627,7 @@
           <a:p>
             <a:pPr algn="ctr"/>
             <a:r>
-              <a:rPr lang="en-US" sz="5400" b="1" dirty="0" smtClean="0">
+              <a:rPr lang="en-US" sz="5400" b="1" dirty="0">
                 <a:solidFill>
                   <a:srgbClr val="052B48"/>
                 </a:solidFill>
@@ -6079,13 +6636,6 @@
               </a:rPr>
               <a:t>Object IDs in NWB</a:t>
             </a:r>
-            <a:endParaRPr lang="en-US" sz="5400" b="1" dirty="0">
-              <a:solidFill>
-                <a:srgbClr val="052B48"/>
-              </a:solidFill>
-              <a:latin typeface="Calibri"/>
-              <a:cs typeface="Calibri"/>
-            </a:endParaRPr>
           </a:p>
         </p:txBody>
       </p:sp>
@@ -6201,7 +6751,7 @@
 </p:sld>
 </file>
 
-<file path=ppt/slides/slide13.xml><?xml version="1.0" encoding="utf-8"?>
+<file path=ppt/slides/slide14.xml><?xml version="1.0" encoding="utf-8"?>
 <p:sld xmlns:a="http://schemas.openxmlformats.org/drawingml/2006/main" xmlns:r="http://schemas.openxmlformats.org/officeDocument/2006/relationships" xmlns:p="http://schemas.openxmlformats.org/presentationml/2006/main">
   <p:cSld>
     <p:spTree>
@@ -6290,7 +6840,7 @@
           <a:p>
             <a:pPr algn="ctr"/>
             <a:r>
-              <a:rPr lang="en-US" sz="5400" b="1" dirty="0" smtClean="0">
+              <a:rPr lang="en-US" sz="5400" b="1" dirty="0">
                 <a:solidFill>
                   <a:srgbClr val="052B48"/>
                 </a:solidFill>
@@ -6299,13 +6849,6 @@
               </a:rPr>
               <a:t>Annotating Time Intervals</a:t>
             </a:r>
-            <a:endParaRPr lang="en-US" sz="5400" b="1" dirty="0">
-              <a:solidFill>
-                <a:srgbClr val="052B48"/>
-              </a:solidFill>
-              <a:latin typeface="Calibri"/>
-              <a:cs typeface="Calibri"/>
-            </a:endParaRPr>
           </a:p>
         </p:txBody>
       </p:sp>
@@ -6713,7 +7256,7 @@
           <a:lstStyle/>
           <a:p>
             <a:r>
-              <a:rPr lang="en-US" b="1" dirty="0" smtClean="0">
+              <a:rPr lang="en-US" b="1" dirty="0">
                 <a:solidFill>
                   <a:srgbClr val="052B48"/>
                 </a:solidFill>
@@ -6757,19 +7300,7 @@
                 <a:latin typeface="Calibri"/>
                 <a:cs typeface="Calibri"/>
               </a:rPr>
-              <a:t>e</a:t>
-            </a:r>
-            <a:r>
-              <a:rPr lang="en-US" sz="2800" b="1" dirty="0" smtClean="0">
-                <a:solidFill>
-                  <a:schemeClr val="accent5">
-                    <a:lumMod val="75000"/>
-                  </a:schemeClr>
-                </a:solidFill>
-                <a:latin typeface="Calibri"/>
-                <a:cs typeface="Calibri"/>
-              </a:rPr>
-              <a:t>poch 1</a:t>
+              <a:t>epoch 1</a:t>
             </a:r>
             <a:endParaRPr lang="en-US" sz="2800" dirty="0">
               <a:solidFill>
@@ -6810,17 +7341,7 @@
                 <a:latin typeface="Calibri"/>
                 <a:cs typeface="Calibri"/>
               </a:rPr>
-              <a:t>e</a:t>
-            </a:r>
-            <a:r>
-              <a:rPr lang="en-US" sz="2800" b="1" dirty="0" smtClean="0">
-                <a:solidFill>
-                  <a:schemeClr val="accent6"/>
-                </a:solidFill>
-                <a:latin typeface="Calibri"/>
-                <a:cs typeface="Calibri"/>
-              </a:rPr>
-              <a:t>poch n</a:t>
+              <a:t>epoch n</a:t>
             </a:r>
             <a:endParaRPr lang="en-US" sz="2800" dirty="0">
               <a:solidFill>
@@ -7011,7 +7532,7 @@
           <a:lstStyle/>
           <a:p>
             <a:r>
-              <a:rPr lang="en-US" sz="2800" b="1" dirty="0" smtClean="0">
+              <a:rPr lang="en-US" sz="2800" b="1" dirty="0">
                 <a:solidFill>
                   <a:srgbClr val="FF0000"/>
                 </a:solidFill>
@@ -7098,7 +7619,7 @@
 </p:sld>
 </file>
 
-<file path=ppt/slides/slide14.xml><?xml version="1.0" encoding="utf-8"?>
+<file path=ppt/slides/slide15.xml><?xml version="1.0" encoding="utf-8"?>
 <p:sld xmlns:a="http://schemas.openxmlformats.org/drawingml/2006/main" xmlns:r="http://schemas.openxmlformats.org/officeDocument/2006/relationships" xmlns:p="http://schemas.openxmlformats.org/presentationml/2006/main">
   <p:cSld>
     <p:spTree>
@@ -7187,7 +7708,7 @@
           <a:p>
             <a:pPr algn="ctr"/>
             <a:r>
-              <a:rPr lang="en-US" sz="5400" b="1" dirty="0" smtClean="0">
+              <a:rPr lang="en-US" sz="5400" b="1" dirty="0">
                 <a:solidFill>
                   <a:srgbClr val="052B48"/>
                 </a:solidFill>
@@ -7196,13 +7717,6 @@
               </a:rPr>
               <a:t>Extending NWB</a:t>
             </a:r>
-            <a:endParaRPr lang="en-US" sz="5400" b="1" dirty="0">
-              <a:solidFill>
-                <a:srgbClr val="052B48"/>
-              </a:solidFill>
-              <a:latin typeface="Calibri"/>
-              <a:cs typeface="Calibri"/>
-            </a:endParaRPr>
           </a:p>
         </p:txBody>
       </p:sp>
@@ -7238,338 +7752,6 @@
     <p:extLst>
       <p:ext uri="{BB962C8B-B14F-4D97-AF65-F5344CB8AC3E}">
         <p14:creationId xmlns:p14="http://schemas.microsoft.com/office/powerpoint/2010/main" val="3305643027"/>
-      </p:ext>
-    </p:extLst>
-  </p:cSld>
-  <p:clrMapOvr>
-    <a:masterClrMapping/>
-  </p:clrMapOvr>
-</p:sld>
-</file>
-
-<file path=ppt/slides/slide15.xml><?xml version="1.0" encoding="utf-8"?>
-<p:sld xmlns:a="http://schemas.openxmlformats.org/drawingml/2006/main" xmlns:r="http://schemas.openxmlformats.org/officeDocument/2006/relationships" xmlns:p="http://schemas.openxmlformats.org/presentationml/2006/main">
-  <p:cSld>
-    <p:spTree>
-      <p:nvGrpSpPr>
-        <p:cNvPr id="1" name=""/>
-        <p:cNvGrpSpPr/>
-        <p:nvPr/>
-      </p:nvGrpSpPr>
-      <p:grpSpPr>
-        <a:xfrm>
-          <a:off x="0" y="0"/>
-          <a:ext cx="0" cy="0"/>
-          <a:chOff x="0" y="0"/>
-          <a:chExt cx="0" cy="0"/>
-        </a:xfrm>
-      </p:grpSpPr>
-      <p:sp>
-        <p:nvSpPr>
-          <p:cNvPr id="27" name="Rounded Rectangle 26"/>
-          <p:cNvSpPr/>
-          <p:nvPr/>
-        </p:nvSpPr>
-        <p:spPr>
-          <a:xfrm>
-            <a:off x="853570" y="853671"/>
-            <a:ext cx="7234527" cy="4851352"/>
-          </a:xfrm>
-          <a:prstGeom prst="roundRect">
-            <a:avLst>
-              <a:gd name="adj" fmla="val 4437"/>
-            </a:avLst>
-          </a:prstGeom>
-          <a:solidFill>
-            <a:srgbClr val="EDEDED"/>
-          </a:solidFill>
-          <a:ln>
-            <a:solidFill>
-              <a:srgbClr val="000000"/>
-            </a:solidFill>
-          </a:ln>
-          <a:effectLst/>
-        </p:spPr>
-        <p:style>
-          <a:lnRef idx="1">
-            <a:schemeClr val="accent1"/>
-          </a:lnRef>
-          <a:fillRef idx="3">
-            <a:schemeClr val="accent1"/>
-          </a:fillRef>
-          <a:effectRef idx="2">
-            <a:schemeClr val="accent1"/>
-          </a:effectRef>
-          <a:fontRef idx="minor">
-            <a:schemeClr val="lt1"/>
-          </a:fontRef>
-        </p:style>
-        <p:txBody>
-          <a:bodyPr rtlCol="0" anchor="ctr"/>
-          <a:lstStyle/>
-          <a:p>
-            <a:pPr algn="ctr"/>
-            <a:endParaRPr lang="en-US"/>
-          </a:p>
-        </p:txBody>
-      </p:sp>
-      <p:sp>
-        <p:nvSpPr>
-          <p:cNvPr id="26" name="Rectangle 25"/>
-          <p:cNvSpPr/>
-          <p:nvPr/>
-        </p:nvSpPr>
-        <p:spPr>
-          <a:xfrm>
-            <a:off x="863980" y="855015"/>
-            <a:ext cx="7213708" cy="2585323"/>
-          </a:xfrm>
-          <a:prstGeom prst="rect">
-            <a:avLst/>
-          </a:prstGeom>
-        </p:spPr>
-        <p:txBody>
-          <a:bodyPr wrap="square">
-            <a:spAutoFit/>
-          </a:bodyPr>
-          <a:lstStyle/>
-          <a:p>
-            <a:pPr algn="ctr"/>
-            <a:r>
-              <a:rPr lang="en-US" sz="5400" b="1" dirty="0" smtClean="0">
-                <a:solidFill>
-                  <a:srgbClr val="052B48"/>
-                </a:solidFill>
-                <a:latin typeface="Calibri"/>
-                <a:cs typeface="Calibri"/>
-              </a:rPr>
-              <a:t>Adding/Removing Containers from an NWB File </a:t>
-            </a:r>
-            <a:endParaRPr lang="en-US" sz="5400" b="1" dirty="0">
-              <a:solidFill>
-                <a:srgbClr val="052B48"/>
-              </a:solidFill>
-              <a:latin typeface="Calibri"/>
-              <a:cs typeface="Calibri"/>
-            </a:endParaRPr>
-          </a:p>
-        </p:txBody>
-      </p:sp>
-      <p:sp>
-        <p:nvSpPr>
-          <p:cNvPr id="3" name="Folded Corner 2"/>
-          <p:cNvSpPr/>
-          <p:nvPr/>
-        </p:nvSpPr>
-        <p:spPr>
-          <a:xfrm rot="10800000" flipH="1">
-            <a:off x="3839842" y="3460251"/>
-            <a:ext cx="1419941" cy="1900138"/>
-          </a:xfrm>
-          <a:prstGeom prst="foldedCorner">
-            <a:avLst>
-              <a:gd name="adj" fmla="val 26556"/>
-            </a:avLst>
-          </a:prstGeom>
-          <a:solidFill>
-            <a:srgbClr val="052A48"/>
-          </a:solidFill>
-          <a:ln w="28575" cmpd="sng">
-            <a:solidFill>
-              <a:schemeClr val="bg1"/>
-            </a:solidFill>
-          </a:ln>
-          <a:effectLst/>
-        </p:spPr>
-        <p:style>
-          <a:lnRef idx="1">
-            <a:schemeClr val="accent1"/>
-          </a:lnRef>
-          <a:fillRef idx="3">
-            <a:schemeClr val="accent1"/>
-          </a:fillRef>
-          <a:effectRef idx="2">
-            <a:schemeClr val="accent1"/>
-          </a:effectRef>
-          <a:fontRef idx="minor">
-            <a:schemeClr val="lt1"/>
-          </a:fontRef>
-        </p:style>
-        <p:txBody>
-          <a:bodyPr rtlCol="0" anchor="ctr"/>
-          <a:lstStyle/>
-          <a:p>
-            <a:pPr algn="ctr"/>
-            <a:r>
-              <a:rPr lang="en-US" u="sng" dirty="0" smtClean="0"/>
-              <a:t>																			   </a:t>
-            </a:r>
-            <a:endParaRPr lang="en-US" u="sng" dirty="0"/>
-          </a:p>
-        </p:txBody>
-      </p:sp>
-      <p:sp>
-        <p:nvSpPr>
-          <p:cNvPr id="4" name="Oval 3"/>
-          <p:cNvSpPr/>
-          <p:nvPr/>
-        </p:nvSpPr>
-        <p:spPr>
-          <a:xfrm>
-            <a:off x="4939826" y="5048168"/>
-            <a:ext cx="579977" cy="601510"/>
-          </a:xfrm>
-          <a:prstGeom prst="ellipse">
-            <a:avLst/>
-          </a:prstGeom>
-          <a:solidFill>
-            <a:srgbClr val="052A48"/>
-          </a:solidFill>
-          <a:ln w="76200" cmpd="sng">
-            <a:solidFill>
-              <a:srgbClr val="FFFFFF"/>
-            </a:solidFill>
-          </a:ln>
-          <a:effectLst/>
-        </p:spPr>
-        <p:style>
-          <a:lnRef idx="1">
-            <a:schemeClr val="accent1"/>
-          </a:lnRef>
-          <a:fillRef idx="3">
-            <a:schemeClr val="accent1"/>
-          </a:fillRef>
-          <a:effectRef idx="2">
-            <a:schemeClr val="accent1"/>
-          </a:effectRef>
-          <a:fontRef idx="minor">
-            <a:schemeClr val="lt1"/>
-          </a:fontRef>
-        </p:style>
-        <p:txBody>
-          <a:bodyPr rtlCol="0" anchor="ctr"/>
-          <a:lstStyle/>
-          <a:p>
-            <a:endParaRPr lang="en-US" sz="4400" dirty="0"/>
-          </a:p>
-        </p:txBody>
-      </p:sp>
-      <p:sp>
-        <p:nvSpPr>
-          <p:cNvPr id="5" name="Rectangle 4"/>
-          <p:cNvSpPr/>
-          <p:nvPr/>
-        </p:nvSpPr>
-        <p:spPr>
-          <a:xfrm>
-            <a:off x="5013201" y="4804441"/>
-            <a:ext cx="415273" cy="923330"/>
-          </a:xfrm>
-          <a:prstGeom prst="rect">
-            <a:avLst/>
-          </a:prstGeom>
-          <a:effectLst/>
-        </p:spPr>
-        <p:txBody>
-          <a:bodyPr wrap="none">
-            <a:spAutoFit/>
-          </a:bodyPr>
-          <a:lstStyle/>
-          <a:p>
-            <a:r>
-              <a:rPr lang="en-US" sz="5400" b="1" dirty="0">
-                <a:solidFill>
-                  <a:schemeClr val="bg1"/>
-                </a:solidFill>
-              </a:rPr>
-              <a:t>-</a:t>
-            </a:r>
-          </a:p>
-        </p:txBody>
-      </p:sp>
-      <p:sp>
-        <p:nvSpPr>
-          <p:cNvPr id="8" name="Oval 7"/>
-          <p:cNvSpPr/>
-          <p:nvPr/>
-        </p:nvSpPr>
-        <p:spPr>
-          <a:xfrm>
-            <a:off x="4942253" y="4360489"/>
-            <a:ext cx="579977" cy="601510"/>
-          </a:xfrm>
-          <a:prstGeom prst="ellipse">
-            <a:avLst/>
-          </a:prstGeom>
-          <a:solidFill>
-            <a:srgbClr val="052A48"/>
-          </a:solidFill>
-          <a:ln w="76200" cmpd="sng">
-            <a:solidFill>
-              <a:srgbClr val="FFFFFF"/>
-            </a:solidFill>
-          </a:ln>
-          <a:effectLst/>
-        </p:spPr>
-        <p:style>
-          <a:lnRef idx="1">
-            <a:schemeClr val="accent1"/>
-          </a:lnRef>
-          <a:fillRef idx="3">
-            <a:schemeClr val="accent1"/>
-          </a:fillRef>
-          <a:effectRef idx="2">
-            <a:schemeClr val="accent1"/>
-          </a:effectRef>
-          <a:fontRef idx="minor">
-            <a:schemeClr val="lt1"/>
-          </a:fontRef>
-        </p:style>
-        <p:txBody>
-          <a:bodyPr rtlCol="0" anchor="ctr"/>
-          <a:lstStyle/>
-          <a:p>
-            <a:endParaRPr lang="en-US" sz="4400" dirty="0"/>
-          </a:p>
-        </p:txBody>
-      </p:sp>
-      <p:sp>
-        <p:nvSpPr>
-          <p:cNvPr id="9" name="Rectangle 8"/>
-          <p:cNvSpPr/>
-          <p:nvPr/>
-        </p:nvSpPr>
-        <p:spPr>
-          <a:xfrm>
-            <a:off x="4975628" y="4256776"/>
-            <a:ext cx="514183" cy="769441"/>
-          </a:xfrm>
-          <a:prstGeom prst="rect">
-            <a:avLst/>
-          </a:prstGeom>
-          <a:effectLst/>
-        </p:spPr>
-        <p:txBody>
-          <a:bodyPr wrap="none">
-            <a:spAutoFit/>
-          </a:bodyPr>
-          <a:lstStyle/>
-          <a:p>
-            <a:r>
-              <a:rPr lang="en-US" sz="4400" b="1" dirty="0">
-                <a:solidFill>
-                  <a:schemeClr val="bg1"/>
-                </a:solidFill>
-              </a:rPr>
-              <a:t>+</a:t>
-            </a:r>
-          </a:p>
-        </p:txBody>
-      </p:sp>
-    </p:spTree>
-    <p:extLst>
-      <p:ext uri="{BB962C8B-B14F-4D97-AF65-F5344CB8AC3E}">
-        <p14:creationId xmlns:p14="http://schemas.microsoft.com/office/powerpoint/2010/main" val="3909940052"/>
       </p:ext>
     </p:extLst>
   </p:cSld>
@@ -7654,7 +7836,7 @@
         <p:spPr>
           <a:xfrm>
             <a:off x="863980" y="855015"/>
-            <a:ext cx="7213708" cy="923330"/>
+            <a:ext cx="7213708" cy="2585323"/>
           </a:xfrm>
           <a:prstGeom prst="rect">
             <a:avLst/>
@@ -7668,35 +7850,28 @@
           <a:p>
             <a:pPr algn="ctr"/>
             <a:r>
-              <a:rPr lang="en-US" sz="5400" b="1" dirty="0" smtClean="0">
+              <a:rPr lang="en-US" sz="5400" b="1" dirty="0">
                 <a:solidFill>
                   <a:srgbClr val="052B48"/>
                 </a:solidFill>
                 <a:latin typeface="Calibri"/>
                 <a:cs typeface="Calibri"/>
               </a:rPr>
-              <a:t>NWB File Basics</a:t>
+              <a:t>Adding/Removing Containers from an NWB File </a:t>
             </a:r>
-            <a:endParaRPr lang="en-US" sz="5400" b="1" dirty="0">
-              <a:solidFill>
-                <a:srgbClr val="052B48"/>
-              </a:solidFill>
-              <a:latin typeface="Calibri"/>
-              <a:cs typeface="Calibri"/>
-            </a:endParaRPr>
           </a:p>
         </p:txBody>
       </p:sp>
       <p:sp>
         <p:nvSpPr>
-          <p:cNvPr id="13" name="Folded Corner 12"/>
+          <p:cNvPr id="3" name="Folded Corner 2"/>
           <p:cNvSpPr/>
           <p:nvPr/>
         </p:nvSpPr>
         <p:spPr>
           <a:xfrm rot="10800000" flipH="1">
-            <a:off x="3539854" y="2150156"/>
-            <a:ext cx="2489899" cy="3390248"/>
+            <a:off x="3839842" y="3460251"/>
+            <a:ext cx="1419941" cy="1900138"/>
           </a:xfrm>
           <a:prstGeom prst="foldedCorner">
             <a:avLst>
@@ -7706,7 +7881,7 @@
           <a:solidFill>
             <a:srgbClr val="052A48"/>
           </a:solidFill>
-          <a:ln w="38100" cmpd="sng">
+          <a:ln w="28575" cmpd="sng">
             <a:solidFill>
               <a:schemeClr val="bg1"/>
             </a:solidFill>
@@ -7733,33 +7908,32 @@
           <a:p>
             <a:pPr algn="ctr"/>
             <a:r>
-              <a:rPr lang="en-US" sz="2400" u="sng" dirty="0" smtClean="0"/>
-              <a:t>																														   </a:t>
+              <a:rPr lang="en-US" u="sng" dirty="0"/>
+              <a:t>																			   </a:t>
             </a:r>
-            <a:endParaRPr lang="en-US" sz="2400" u="sng" dirty="0"/>
           </a:p>
         </p:txBody>
       </p:sp>
       <p:sp>
         <p:nvSpPr>
-          <p:cNvPr id="15" name="Oval 14"/>
+          <p:cNvPr id="4" name="Oval 3"/>
           <p:cNvSpPr/>
           <p:nvPr/>
         </p:nvSpPr>
         <p:spPr>
           <a:xfrm>
-            <a:off x="2409917" y="1840138"/>
-            <a:ext cx="2478024" cy="2481818"/>
+            <a:off x="4939826" y="5048168"/>
+            <a:ext cx="579977" cy="601510"/>
           </a:xfrm>
           <a:prstGeom prst="ellipse">
             <a:avLst/>
           </a:prstGeom>
           <a:solidFill>
-            <a:schemeClr val="bg1"/>
+            <a:srgbClr val="052A48"/>
           </a:solidFill>
           <a:ln w="76200" cmpd="sng">
             <a:solidFill>
-              <a:srgbClr val="052A48"/>
+              <a:srgbClr val="FFFFFF"/>
             </a:solidFill>
           </a:ln>
           <a:effectLst/>
@@ -7786,40 +7960,122 @@
           </a:p>
         </p:txBody>
       </p:sp>
-      <p:pic>
-        <p:nvPicPr>
-          <p:cNvPr id="3" name="Picture 2" descr="logo_brain_transp_512x512.png"/>
-          <p:cNvPicPr>
-            <a:picLocks noChangeAspect="1"/>
-          </p:cNvPicPr>
-          <p:nvPr/>
-        </p:nvPicPr>
-        <p:blipFill>
-          <a:blip r:embed="rId2">
-            <a:extLst>
-              <a:ext uri="{28A0092B-C50C-407E-A947-70E740481C1C}">
-                <a14:useLocalDpi xmlns:a14="http://schemas.microsoft.com/office/drawing/2010/main" val="0"/>
-              </a:ext>
-            </a:extLst>
-          </a:blip>
-          <a:stretch>
-            <a:fillRect/>
-          </a:stretch>
-        </p:blipFill>
+      <p:sp>
+        <p:nvSpPr>
+          <p:cNvPr id="5" name="Rectangle 4"/>
+          <p:cNvSpPr/>
+          <p:nvPr/>
+        </p:nvSpPr>
         <p:spPr>
           <a:xfrm>
-            <a:off x="2642554" y="2065594"/>
-            <a:ext cx="2154717" cy="2154717"/>
+            <a:off x="5013201" y="4804441"/>
+            <a:ext cx="415273" cy="923330"/>
           </a:xfrm>
           <a:prstGeom prst="rect">
             <a:avLst/>
           </a:prstGeom>
-        </p:spPr>
-      </p:pic>
+          <a:effectLst/>
+        </p:spPr>
+        <p:txBody>
+          <a:bodyPr wrap="none">
+            <a:spAutoFit/>
+          </a:bodyPr>
+          <a:lstStyle/>
+          <a:p>
+            <a:r>
+              <a:rPr lang="en-US" sz="5400" b="1" dirty="0">
+                <a:solidFill>
+                  <a:schemeClr val="bg1"/>
+                </a:solidFill>
+              </a:rPr>
+              <a:t>-</a:t>
+            </a:r>
+          </a:p>
+        </p:txBody>
+      </p:sp>
+      <p:sp>
+        <p:nvSpPr>
+          <p:cNvPr id="8" name="Oval 7"/>
+          <p:cNvSpPr/>
+          <p:nvPr/>
+        </p:nvSpPr>
+        <p:spPr>
+          <a:xfrm>
+            <a:off x="4942253" y="4360489"/>
+            <a:ext cx="579977" cy="601510"/>
+          </a:xfrm>
+          <a:prstGeom prst="ellipse">
+            <a:avLst/>
+          </a:prstGeom>
+          <a:solidFill>
+            <a:srgbClr val="052A48"/>
+          </a:solidFill>
+          <a:ln w="76200" cmpd="sng">
+            <a:solidFill>
+              <a:srgbClr val="FFFFFF"/>
+            </a:solidFill>
+          </a:ln>
+          <a:effectLst/>
+        </p:spPr>
+        <p:style>
+          <a:lnRef idx="1">
+            <a:schemeClr val="accent1"/>
+          </a:lnRef>
+          <a:fillRef idx="3">
+            <a:schemeClr val="accent1"/>
+          </a:fillRef>
+          <a:effectRef idx="2">
+            <a:schemeClr val="accent1"/>
+          </a:effectRef>
+          <a:fontRef idx="minor">
+            <a:schemeClr val="lt1"/>
+          </a:fontRef>
+        </p:style>
+        <p:txBody>
+          <a:bodyPr rtlCol="0" anchor="ctr"/>
+          <a:lstStyle/>
+          <a:p>
+            <a:endParaRPr lang="en-US" sz="4400" dirty="0"/>
+          </a:p>
+        </p:txBody>
+      </p:sp>
+      <p:sp>
+        <p:nvSpPr>
+          <p:cNvPr id="9" name="Rectangle 8"/>
+          <p:cNvSpPr/>
+          <p:nvPr/>
+        </p:nvSpPr>
+        <p:spPr>
+          <a:xfrm>
+            <a:off x="4975628" y="4256776"/>
+            <a:ext cx="514183" cy="769441"/>
+          </a:xfrm>
+          <a:prstGeom prst="rect">
+            <a:avLst/>
+          </a:prstGeom>
+          <a:effectLst/>
+        </p:spPr>
+        <p:txBody>
+          <a:bodyPr wrap="none">
+            <a:spAutoFit/>
+          </a:bodyPr>
+          <a:lstStyle/>
+          <a:p>
+            <a:r>
+              <a:rPr lang="en-US" sz="4400" b="1" dirty="0">
+                <a:solidFill>
+                  <a:schemeClr val="bg1"/>
+                </a:solidFill>
+              </a:rPr>
+              <a:t>+</a:t>
+            </a:r>
+          </a:p>
+        </p:txBody>
+      </p:sp>
     </p:spTree>
     <p:extLst>
       <p:ext uri="{BB962C8B-B14F-4D97-AF65-F5344CB8AC3E}">
-        <p14:creationId xmlns:p14="http://schemas.microsoft.com/office/powerpoint/2010/main" val="1847033829"/>
+        <p14:creationId xmlns:p14="http://schemas.microsoft.com/office/powerpoint/2010/main" val="3909940052"/>
       </p:ext>
     </p:extLst>
   </p:cSld>
@@ -7904,7 +8160,7 @@
         <p:spPr>
           <a:xfrm>
             <a:off x="863980" y="855015"/>
-            <a:ext cx="7213708" cy="1754327"/>
+            <a:ext cx="7213708" cy="923330"/>
           </a:xfrm>
           <a:prstGeom prst="rect">
             <a:avLst/>
@@ -7918,22 +8174,15 @@
           <a:p>
             <a:pPr algn="ctr"/>
             <a:r>
-              <a:rPr lang="en-US" sz="5400" b="1" dirty="0" smtClean="0">
+              <a:rPr lang="en-US" sz="5400" b="1" dirty="0">
                 <a:solidFill>
                   <a:srgbClr val="052B48"/>
                 </a:solidFill>
                 <a:latin typeface="Calibri"/>
                 <a:cs typeface="Calibri"/>
               </a:rPr>
-              <a:t>Exploratory Data Analysis with NWB</a:t>
+              <a:t>NWB File Basics</a:t>
             </a:r>
-            <a:endParaRPr lang="en-US" sz="5400" b="1" dirty="0">
-              <a:solidFill>
-                <a:srgbClr val="052B48"/>
-              </a:solidFill>
-              <a:latin typeface="Calibri"/>
-              <a:cs typeface="Calibri"/>
-            </a:endParaRPr>
           </a:p>
         </p:txBody>
       </p:sp>
@@ -7945,8 +8194,8 @@
         </p:nvSpPr>
         <p:spPr>
           <a:xfrm rot="10800000" flipH="1">
-            <a:off x="3223450" y="2690195"/>
-            <a:ext cx="2526317" cy="2896081"/>
+            <a:off x="3539854" y="2150156"/>
+            <a:ext cx="2489899" cy="3390248"/>
           </a:xfrm>
           <a:prstGeom prst="foldedCorner">
             <a:avLst>
@@ -7983,10 +8232,251 @@
           <a:p>
             <a:pPr algn="ctr"/>
             <a:r>
-              <a:rPr lang="en-US" u="sng" dirty="0" smtClean="0"/>
+              <a:rPr lang="en-US" sz="2400" u="sng" dirty="0"/>
+              <a:t>																														   </a:t>
+            </a:r>
+          </a:p>
+        </p:txBody>
+      </p:sp>
+      <p:sp>
+        <p:nvSpPr>
+          <p:cNvPr id="15" name="Oval 14"/>
+          <p:cNvSpPr/>
+          <p:nvPr/>
+        </p:nvSpPr>
+        <p:spPr>
+          <a:xfrm>
+            <a:off x="2409917" y="1840138"/>
+            <a:ext cx="2478024" cy="2481818"/>
+          </a:xfrm>
+          <a:prstGeom prst="ellipse">
+            <a:avLst/>
+          </a:prstGeom>
+          <a:solidFill>
+            <a:schemeClr val="bg1"/>
+          </a:solidFill>
+          <a:ln w="76200" cmpd="sng">
+            <a:solidFill>
+              <a:srgbClr val="052A48"/>
+            </a:solidFill>
+          </a:ln>
+          <a:effectLst/>
+        </p:spPr>
+        <p:style>
+          <a:lnRef idx="1">
+            <a:schemeClr val="accent1"/>
+          </a:lnRef>
+          <a:fillRef idx="3">
+            <a:schemeClr val="accent1"/>
+          </a:fillRef>
+          <a:effectRef idx="2">
+            <a:schemeClr val="accent1"/>
+          </a:effectRef>
+          <a:fontRef idx="minor">
+            <a:schemeClr val="lt1"/>
+          </a:fontRef>
+        </p:style>
+        <p:txBody>
+          <a:bodyPr rtlCol="0" anchor="ctr"/>
+          <a:lstStyle/>
+          <a:p>
+            <a:endParaRPr lang="en-US" sz="4400" dirty="0"/>
+          </a:p>
+        </p:txBody>
+      </p:sp>
+      <p:pic>
+        <p:nvPicPr>
+          <p:cNvPr id="3" name="Picture 2" descr="logo_brain_transp_512x512.png"/>
+          <p:cNvPicPr>
+            <a:picLocks noChangeAspect="1"/>
+          </p:cNvPicPr>
+          <p:nvPr/>
+        </p:nvPicPr>
+        <p:blipFill>
+          <a:blip r:embed="rId2">
+            <a:extLst>
+              <a:ext uri="{28A0092B-C50C-407E-A947-70E740481C1C}">
+                <a14:useLocalDpi xmlns:a14="http://schemas.microsoft.com/office/drawing/2010/main" val="0"/>
+              </a:ext>
+            </a:extLst>
+          </a:blip>
+          <a:stretch>
+            <a:fillRect/>
+          </a:stretch>
+        </p:blipFill>
+        <p:spPr>
+          <a:xfrm>
+            <a:off x="2642554" y="2065594"/>
+            <a:ext cx="2154717" cy="2154717"/>
+          </a:xfrm>
+          <a:prstGeom prst="rect">
+            <a:avLst/>
+          </a:prstGeom>
+        </p:spPr>
+      </p:pic>
+    </p:spTree>
+    <p:extLst>
+      <p:ext uri="{BB962C8B-B14F-4D97-AF65-F5344CB8AC3E}">
+        <p14:creationId xmlns:p14="http://schemas.microsoft.com/office/powerpoint/2010/main" val="1847033829"/>
+      </p:ext>
+    </p:extLst>
+  </p:cSld>
+  <p:clrMapOvr>
+    <a:masterClrMapping/>
+  </p:clrMapOvr>
+</p:sld>
+</file>
+
+<file path=ppt/slides/slide18.xml><?xml version="1.0" encoding="utf-8"?>
+<p:sld xmlns:a="http://schemas.openxmlformats.org/drawingml/2006/main" xmlns:r="http://schemas.openxmlformats.org/officeDocument/2006/relationships" xmlns:p="http://schemas.openxmlformats.org/presentationml/2006/main">
+  <p:cSld>
+    <p:spTree>
+      <p:nvGrpSpPr>
+        <p:cNvPr id="1" name=""/>
+        <p:cNvGrpSpPr/>
+        <p:nvPr/>
+      </p:nvGrpSpPr>
+      <p:grpSpPr>
+        <a:xfrm>
+          <a:off x="0" y="0"/>
+          <a:ext cx="0" cy="0"/>
+          <a:chOff x="0" y="0"/>
+          <a:chExt cx="0" cy="0"/>
+        </a:xfrm>
+      </p:grpSpPr>
+      <p:sp>
+        <p:nvSpPr>
+          <p:cNvPr id="27" name="Rounded Rectangle 26"/>
+          <p:cNvSpPr/>
+          <p:nvPr/>
+        </p:nvSpPr>
+        <p:spPr>
+          <a:xfrm>
+            <a:off x="853570" y="853671"/>
+            <a:ext cx="7234527" cy="4851352"/>
+          </a:xfrm>
+          <a:prstGeom prst="roundRect">
+            <a:avLst>
+              <a:gd name="adj" fmla="val 4437"/>
+            </a:avLst>
+          </a:prstGeom>
+          <a:solidFill>
+            <a:srgbClr val="EDEDED"/>
+          </a:solidFill>
+          <a:ln>
+            <a:solidFill>
+              <a:srgbClr val="000000"/>
+            </a:solidFill>
+          </a:ln>
+          <a:effectLst/>
+        </p:spPr>
+        <p:style>
+          <a:lnRef idx="1">
+            <a:schemeClr val="accent1"/>
+          </a:lnRef>
+          <a:fillRef idx="3">
+            <a:schemeClr val="accent1"/>
+          </a:fillRef>
+          <a:effectRef idx="2">
+            <a:schemeClr val="accent1"/>
+          </a:effectRef>
+          <a:fontRef idx="minor">
+            <a:schemeClr val="lt1"/>
+          </a:fontRef>
+        </p:style>
+        <p:txBody>
+          <a:bodyPr rtlCol="0" anchor="ctr"/>
+          <a:lstStyle/>
+          <a:p>
+            <a:pPr algn="ctr"/>
+            <a:endParaRPr lang="en-US"/>
+          </a:p>
+        </p:txBody>
+      </p:sp>
+      <p:sp>
+        <p:nvSpPr>
+          <p:cNvPr id="26" name="Rectangle 25"/>
+          <p:cNvSpPr/>
+          <p:nvPr/>
+        </p:nvSpPr>
+        <p:spPr>
+          <a:xfrm>
+            <a:off x="863980" y="855015"/>
+            <a:ext cx="7213708" cy="1754327"/>
+          </a:xfrm>
+          <a:prstGeom prst="rect">
+            <a:avLst/>
+          </a:prstGeom>
+        </p:spPr>
+        <p:txBody>
+          <a:bodyPr wrap="square">
+            <a:spAutoFit/>
+          </a:bodyPr>
+          <a:lstStyle/>
+          <a:p>
+            <a:pPr algn="ctr"/>
+            <a:r>
+              <a:rPr lang="en-US" sz="5400" b="1" dirty="0">
+                <a:solidFill>
+                  <a:srgbClr val="052B48"/>
+                </a:solidFill>
+                <a:latin typeface="Calibri"/>
+                <a:cs typeface="Calibri"/>
+              </a:rPr>
+              <a:t>Exploratory Data Analysis with NWB</a:t>
+            </a:r>
+          </a:p>
+        </p:txBody>
+      </p:sp>
+      <p:sp>
+        <p:nvSpPr>
+          <p:cNvPr id="13" name="Folded Corner 12"/>
+          <p:cNvSpPr/>
+          <p:nvPr/>
+        </p:nvSpPr>
+        <p:spPr>
+          <a:xfrm rot="10800000" flipH="1">
+            <a:off x="3223450" y="2690195"/>
+            <a:ext cx="2526317" cy="2896081"/>
+          </a:xfrm>
+          <a:prstGeom prst="foldedCorner">
+            <a:avLst>
+              <a:gd name="adj" fmla="val 26556"/>
+            </a:avLst>
+          </a:prstGeom>
+          <a:solidFill>
+            <a:srgbClr val="052A48"/>
+          </a:solidFill>
+          <a:ln w="38100" cmpd="sng">
+            <a:solidFill>
+              <a:schemeClr val="bg1"/>
+            </a:solidFill>
+          </a:ln>
+          <a:effectLst/>
+        </p:spPr>
+        <p:style>
+          <a:lnRef idx="1">
+            <a:schemeClr val="accent1"/>
+          </a:lnRef>
+          <a:fillRef idx="3">
+            <a:schemeClr val="accent1"/>
+          </a:fillRef>
+          <a:effectRef idx="2">
+            <a:schemeClr val="accent1"/>
+          </a:effectRef>
+          <a:fontRef idx="minor">
+            <a:schemeClr val="lt1"/>
+          </a:fontRef>
+        </p:style>
+        <p:txBody>
+          <a:bodyPr rtlCol="0" anchor="ctr"/>
+          <a:lstStyle/>
+          <a:p>
+            <a:pPr algn="ctr"/>
+            <a:r>
+              <a:rPr lang="en-US" u="sng" dirty="0"/>
               <a:t>																					   </a:t>
             </a:r>
-            <a:endParaRPr lang="en-US" u="sng" dirty="0"/>
           </a:p>
         </p:txBody>
       </p:sp>
@@ -8106,7 +8596,7 @@
           <a:lstStyle/>
           <a:p>
             <a:r>
-              <a:rPr lang="en-US" sz="3800" b="1" dirty="0" smtClean="0">
+              <a:rPr lang="en-US" sz="3800" b="1" dirty="0">
                 <a:solidFill>
                   <a:schemeClr val="bg1"/>
                 </a:solidFill>
@@ -8115,13 +8605,6 @@
               </a:rPr>
               <a:t>/scratch</a:t>
             </a:r>
-            <a:endParaRPr lang="en-US" sz="3800" b="1" dirty="0">
-              <a:solidFill>
-                <a:schemeClr val="bg1"/>
-              </a:solidFill>
-              <a:latin typeface="Courier"/>
-              <a:cs typeface="Courier"/>
-            </a:endParaRPr>
           </a:p>
         </p:txBody>
       </p:sp>
@@ -8227,7 +8710,7 @@
           <a:p>
             <a:pPr algn="ctr"/>
             <a:r>
-              <a:rPr lang="en-US" sz="5400" b="1" dirty="0" smtClean="0">
+              <a:rPr lang="en-US" sz="5400" b="1" dirty="0">
                 <a:solidFill>
                   <a:srgbClr val="052B48"/>
                 </a:solidFill>
@@ -8236,13 +8719,6 @@
               </a:rPr>
               <a:t>Query Intracellular Electrophysiology Metadata</a:t>
             </a:r>
-            <a:endParaRPr lang="en-US" sz="5400" b="1" dirty="0">
-              <a:solidFill>
-                <a:srgbClr val="052B48"/>
-              </a:solidFill>
-              <a:latin typeface="Calibri"/>
-              <a:cs typeface="Calibri"/>
-            </a:endParaRPr>
           </a:p>
         </p:txBody>
       </p:sp>
@@ -8378,7 +8854,7 @@
           <a:p>
             <a:pPr algn="ctr"/>
             <a:r>
-              <a:rPr lang="en-US" sz="5400" b="1" dirty="0" smtClean="0">
+              <a:rPr lang="en-US" sz="5400" b="1" dirty="0">
                 <a:solidFill>
                   <a:srgbClr val="052B48"/>
                 </a:solidFill>
@@ -8388,7 +8864,7 @@
               <a:t>Intracellular Electrophysiology Data using </a:t>
             </a:r>
             <a:r>
-              <a:rPr lang="en-US" sz="5400" b="1" dirty="0" err="1" smtClean="0">
+              <a:rPr lang="en-US" sz="5400" b="1" dirty="0" err="1">
                 <a:solidFill>
                   <a:srgbClr val="052B48"/>
                 </a:solidFill>
@@ -8450,18 +8926,13 @@
           <a:p>
             <a:pPr algn="ctr"/>
             <a:r>
-              <a:rPr lang="en-US" sz="5400" b="1" dirty="0" smtClean="0">
+              <a:rPr lang="en-US" sz="5400" b="1" dirty="0">
                 <a:solidFill>
                   <a:srgbClr val="FF0000"/>
                 </a:solidFill>
               </a:rPr>
               <a:t>DEPRECATED</a:t>
             </a:r>
-            <a:endParaRPr lang="en-US" sz="5400" b="1" dirty="0">
-              <a:solidFill>
-                <a:srgbClr val="FF0000"/>
-              </a:solidFill>
-            </a:endParaRPr>
           </a:p>
         </p:txBody>
       </p:sp>
@@ -8567,7 +9038,7 @@
           <a:p>
             <a:pPr algn="ctr"/>
             <a:r>
-              <a:rPr lang="en-US" sz="5400" b="1" dirty="0" smtClean="0">
+              <a:rPr lang="en-US" sz="5400" b="1" dirty="0">
                 <a:solidFill>
                   <a:srgbClr val="052B48"/>
                 </a:solidFill>
@@ -8576,13 +9047,6 @@
               </a:rPr>
               <a:t>Allen Brain Observatory</a:t>
             </a:r>
-            <a:endParaRPr lang="en-US" sz="5400" b="1" dirty="0">
-              <a:solidFill>
-                <a:srgbClr val="052B48"/>
-              </a:solidFill>
-              <a:latin typeface="Calibri"/>
-              <a:cs typeface="Calibri"/>
-            </a:endParaRPr>
           </a:p>
         </p:txBody>
       </p:sp>
@@ -8609,33 +9073,18 @@
           <a:p>
             <a:r>
               <a:rPr lang="en-US" sz="1400" dirty="0"/>
-              <a:t> </a:t>
-            </a:r>
-            <a:r>
-              <a:rPr lang="en-US" sz="1400" dirty="0" smtClean="0"/>
-              <a:t>(figure source</a:t>
-            </a:r>
-            <a:r>
-              <a:rPr lang="en-US" sz="1400" dirty="0"/>
-              <a:t>: </a:t>
+              <a:t> (figure source: </a:t>
             </a:r>
             <a:r>
               <a:rPr lang="en-US" sz="1400" dirty="0">
                 <a:hlinkClick r:id="rId2"/>
               </a:rPr>
-              <a:t>https://observatory.brain-</a:t>
+              <a:t>https://observatory.brain-map.org</a:t>
             </a:r>
             <a:r>
-              <a:rPr lang="en-US" sz="1400" dirty="0" smtClean="0">
-                <a:hlinkClick r:id="rId2"/>
-              </a:rPr>
-              <a:t>map.org</a:t>
-            </a:r>
-            <a:r>
-              <a:rPr lang="en-US" sz="1400" dirty="0" smtClean="0"/>
+              <a:rPr lang="en-US" sz="1400" dirty="0"/>
               <a:t>)</a:t>
             </a:r>
-            <a:endParaRPr lang="en-US" sz="1400" dirty="0"/>
           </a:p>
         </p:txBody>
       </p:sp>
@@ -8770,7 +9219,7 @@
           <a:p>
             <a:pPr algn="ctr"/>
             <a:r>
-              <a:rPr lang="en-US" sz="5400" b="1" dirty="0" smtClean="0">
+              <a:rPr lang="en-US" sz="5400" b="1" dirty="0">
                 <a:solidFill>
                   <a:srgbClr val="052B48"/>
                 </a:solidFill>
@@ -8779,13 +9228,6 @@
               </a:rPr>
               <a:t>Extracellular Electrophysiology</a:t>
             </a:r>
-            <a:endParaRPr lang="en-US" sz="5400" b="1" dirty="0">
-              <a:solidFill>
-                <a:srgbClr val="052B48"/>
-              </a:solidFill>
-              <a:latin typeface="Calibri"/>
-              <a:cs typeface="Calibri"/>
-            </a:endParaRPr>
           </a:p>
         </p:txBody>
       </p:sp>
@@ -8961,7 +9403,7 @@
           <a:p>
             <a:pPr algn="ctr"/>
             <a:r>
-              <a:rPr lang="en-US" sz="5400" b="1" dirty="0" smtClean="0">
+              <a:rPr lang="en-US" sz="5400" b="1" dirty="0">
                 <a:solidFill>
                   <a:srgbClr val="052B48"/>
                 </a:solidFill>
@@ -8970,13 +9412,6 @@
               </a:rPr>
               <a:t>Calcium Imaging Data</a:t>
             </a:r>
-            <a:endParaRPr lang="en-US" sz="5400" b="1" dirty="0">
-              <a:solidFill>
-                <a:srgbClr val="052B48"/>
-              </a:solidFill>
-              <a:latin typeface="Calibri"/>
-              <a:cs typeface="Calibri"/>
-            </a:endParaRPr>
           </a:p>
         </p:txBody>
       </p:sp>
@@ -9111,7 +9546,237 @@
           <a:p>
             <a:pPr algn="ctr"/>
             <a:r>
-              <a:rPr lang="en-US" sz="5400" b="1" dirty="0" smtClean="0">
+              <a:rPr lang="en-US" sz="5400" b="1" dirty="0">
+                <a:solidFill>
+                  <a:srgbClr val="052B48"/>
+                </a:solidFill>
+                <a:latin typeface="Calibri"/>
+                <a:cs typeface="Calibri"/>
+              </a:rPr>
+              <a:t>Optogenetics</a:t>
+            </a:r>
+          </a:p>
+        </p:txBody>
+      </p:sp>
+      <p:pic>
+        <p:nvPicPr>
+          <p:cNvPr id="1026" name="Picture 2">
+            <a:extLst>
+              <a:ext uri="{FF2B5EF4-FFF2-40B4-BE49-F238E27FC236}">
+                <a16:creationId xmlns:a16="http://schemas.microsoft.com/office/drawing/2014/main" id="{C71F5062-FF10-FA65-6602-2D9AC73D6BCD}"/>
+              </a:ext>
+            </a:extLst>
+          </p:cNvPr>
+          <p:cNvPicPr>
+            <a:picLocks noChangeAspect="1" noChangeArrowheads="1"/>
+          </p:cNvPicPr>
+          <p:nvPr/>
+        </p:nvPicPr>
+        <p:blipFill rotWithShape="1">
+          <a:blip r:embed="rId2">
+            <a:duotone>
+              <a:schemeClr val="accent1">
+                <a:shade val="45000"/>
+                <a:satMod val="135000"/>
+              </a:schemeClr>
+              <a:prstClr val="white"/>
+            </a:duotone>
+            <a:extLst>
+              <a:ext uri="{28A0092B-C50C-407E-A947-70E740481C1C}">
+                <a14:useLocalDpi xmlns:a14="http://schemas.microsoft.com/office/drawing/2010/main" val="0"/>
+              </a:ext>
+            </a:extLst>
+          </a:blip>
+          <a:srcRect l="48608" t="31624"/>
+          <a:stretch/>
+        </p:blipFill>
+        <p:spPr bwMode="auto">
+          <a:xfrm>
+            <a:off x="1134319" y="2361236"/>
+            <a:ext cx="6265762" cy="3197808"/>
+          </a:xfrm>
+          <a:prstGeom prst="rect">
+            <a:avLst/>
+          </a:prstGeom>
+          <a:noFill/>
+          <a:extLst>
+            <a:ext uri="{909E8E84-426E-40DD-AFC4-6F175D3DCCD1}">
+              <a14:hiddenFill xmlns:a14="http://schemas.microsoft.com/office/drawing/2010/main">
+                <a:solidFill>
+                  <a:srgbClr val="FFFFFF"/>
+                </a:solidFill>
+              </a14:hiddenFill>
+            </a:ext>
+          </a:extLst>
+        </p:spPr>
+      </p:pic>
+      <p:sp>
+        <p:nvSpPr>
+          <p:cNvPr id="7" name="Triangle 6">
+            <a:extLst>
+              <a:ext uri="{FF2B5EF4-FFF2-40B4-BE49-F238E27FC236}">
+                <a16:creationId xmlns:a16="http://schemas.microsoft.com/office/drawing/2014/main" id="{235B78DD-4768-BEB1-B76F-D0A97ABD7E07}"/>
+              </a:ext>
+            </a:extLst>
+          </p:cNvPr>
+          <p:cNvSpPr/>
+          <p:nvPr/>
+        </p:nvSpPr>
+        <p:spPr>
+          <a:xfrm rot="3970847">
+            <a:off x="4710421" y="269472"/>
+            <a:ext cx="731152" cy="4808783"/>
+          </a:xfrm>
+          <a:prstGeom prst="triangle">
+            <a:avLst>
+              <a:gd name="adj" fmla="val 52427"/>
+            </a:avLst>
+          </a:prstGeom>
+          <a:gradFill>
+            <a:gsLst>
+              <a:gs pos="100000">
+                <a:srgbClr val="92D050">
+                  <a:alpha val="0"/>
+                </a:srgbClr>
+              </a:gs>
+              <a:gs pos="0">
+                <a:srgbClr val="00B050"/>
+              </a:gs>
+            </a:gsLst>
+            <a:lin ang="3960000" scaled="0"/>
+          </a:gradFill>
+          <a:ln>
+            <a:noFill/>
+          </a:ln>
+        </p:spPr>
+        <p:style>
+          <a:lnRef idx="2">
+            <a:schemeClr val="accent1">
+              <a:shade val="15000"/>
+            </a:schemeClr>
+          </a:lnRef>
+          <a:fillRef idx="1">
+            <a:schemeClr val="accent1"/>
+          </a:fillRef>
+          <a:effectRef idx="0">
+            <a:schemeClr val="accent1"/>
+          </a:effectRef>
+          <a:fontRef idx="minor">
+            <a:schemeClr val="lt1"/>
+          </a:fontRef>
+        </p:style>
+        <p:txBody>
+          <a:bodyPr rtlCol="0" anchor="ctr"/>
+          <a:lstStyle/>
+          <a:p>
+            <a:pPr algn="ctr"/>
+            <a:endParaRPr lang="en-US" dirty="0"/>
+          </a:p>
+        </p:txBody>
+      </p:sp>
+    </p:spTree>
+    <p:extLst>
+      <p:ext uri="{BB962C8B-B14F-4D97-AF65-F5344CB8AC3E}">
+        <p14:creationId xmlns:p14="http://schemas.microsoft.com/office/powerpoint/2010/main" val="24017208"/>
+      </p:ext>
+    </p:extLst>
+  </p:cSld>
+  <p:clrMapOvr>
+    <a:masterClrMapping/>
+  </p:clrMapOvr>
+</p:sld>
+</file>
+
+<file path=ppt/slides/slide8.xml><?xml version="1.0" encoding="utf-8"?>
+<p:sld xmlns:a="http://schemas.openxmlformats.org/drawingml/2006/main" xmlns:r="http://schemas.openxmlformats.org/officeDocument/2006/relationships" xmlns:p="http://schemas.openxmlformats.org/presentationml/2006/main">
+  <p:cSld>
+    <p:spTree>
+      <p:nvGrpSpPr>
+        <p:cNvPr id="1" name=""/>
+        <p:cNvGrpSpPr/>
+        <p:nvPr/>
+      </p:nvGrpSpPr>
+      <p:grpSpPr>
+        <a:xfrm>
+          <a:off x="0" y="0"/>
+          <a:ext cx="0" cy="0"/>
+          <a:chOff x="0" y="0"/>
+          <a:chExt cx="0" cy="0"/>
+        </a:xfrm>
+      </p:grpSpPr>
+      <p:sp>
+        <p:nvSpPr>
+          <p:cNvPr id="27" name="Rounded Rectangle 26"/>
+          <p:cNvSpPr/>
+          <p:nvPr/>
+        </p:nvSpPr>
+        <p:spPr>
+          <a:xfrm>
+            <a:off x="853570" y="853671"/>
+            <a:ext cx="7234527" cy="4851352"/>
+          </a:xfrm>
+          <a:prstGeom prst="roundRect">
+            <a:avLst>
+              <a:gd name="adj" fmla="val 4437"/>
+            </a:avLst>
+          </a:prstGeom>
+          <a:solidFill>
+            <a:srgbClr val="EDEDED"/>
+          </a:solidFill>
+          <a:ln>
+            <a:solidFill>
+              <a:srgbClr val="000000"/>
+            </a:solidFill>
+          </a:ln>
+          <a:effectLst/>
+        </p:spPr>
+        <p:style>
+          <a:lnRef idx="1">
+            <a:schemeClr val="accent1"/>
+          </a:lnRef>
+          <a:fillRef idx="3">
+            <a:schemeClr val="accent1"/>
+          </a:fillRef>
+          <a:effectRef idx="2">
+            <a:schemeClr val="accent1"/>
+          </a:effectRef>
+          <a:fontRef idx="minor">
+            <a:schemeClr val="lt1"/>
+          </a:fontRef>
+        </p:style>
+        <p:txBody>
+          <a:bodyPr rtlCol="0" anchor="ctr"/>
+          <a:lstStyle/>
+          <a:p>
+            <a:pPr algn="ctr"/>
+            <a:endParaRPr lang="en-US"/>
+          </a:p>
+        </p:txBody>
+      </p:sp>
+      <p:sp>
+        <p:nvSpPr>
+          <p:cNvPr id="26" name="Rectangle 25"/>
+          <p:cNvSpPr/>
+          <p:nvPr/>
+        </p:nvSpPr>
+        <p:spPr>
+          <a:xfrm>
+            <a:off x="863980" y="855015"/>
+            <a:ext cx="7213708" cy="923330"/>
+          </a:xfrm>
+          <a:prstGeom prst="rect">
+            <a:avLst/>
+          </a:prstGeom>
+        </p:spPr>
+        <p:txBody>
+          <a:bodyPr wrap="square">
+            <a:spAutoFit/>
+          </a:bodyPr>
+          <a:lstStyle/>
+          <a:p>
+            <a:pPr algn="ctr"/>
+            <a:r>
+              <a:rPr lang="en-US" sz="5400" b="1" dirty="0">
                 <a:solidFill>
                   <a:srgbClr val="052B48"/>
                 </a:solidFill>
@@ -9120,13 +9785,6 @@
               </a:rPr>
               <a:t>Iterative Data Write</a:t>
             </a:r>
-            <a:endParaRPr lang="en-US" sz="5400" b="1" dirty="0">
-              <a:solidFill>
-                <a:srgbClr val="052B48"/>
-              </a:solidFill>
-              <a:latin typeface="Calibri"/>
-              <a:cs typeface="Calibri"/>
-            </a:endParaRPr>
           </a:p>
         </p:txBody>
       </p:sp>
@@ -9320,7 +9978,7 @@
 </p:sld>
 </file>
 
-<file path=ppt/slides/slide8.xml><?xml version="1.0" encoding="utf-8"?>
+<file path=ppt/slides/slide9.xml><?xml version="1.0" encoding="utf-8"?>
 <p:sld xmlns:a="http://schemas.openxmlformats.org/drawingml/2006/main" xmlns:r="http://schemas.openxmlformats.org/officeDocument/2006/relationships" xmlns:p="http://schemas.openxmlformats.org/presentationml/2006/main">
   <p:cSld>
     <p:spTree>
@@ -9409,7 +10067,7 @@
           <a:p>
             <a:pPr algn="ctr"/>
             <a:r>
-              <a:rPr lang="en-US" sz="5400" b="1" dirty="0" smtClean="0">
+              <a:rPr lang="en-US" sz="5400" b="1" dirty="0">
                 <a:solidFill>
                   <a:srgbClr val="052B48"/>
                 </a:solidFill>
@@ -9418,13 +10076,6 @@
               </a:rPr>
               <a:t>HDF5 Dataset I/O</a:t>
             </a:r>
-            <a:endParaRPr lang="en-US" sz="5400" b="1" dirty="0">
-              <a:solidFill>
-                <a:srgbClr val="052B48"/>
-              </a:solidFill>
-              <a:latin typeface="Calibri"/>
-              <a:cs typeface="Calibri"/>
-            </a:endParaRPr>
           </a:p>
         </p:txBody>
       </p:sp>
@@ -9936,597 +10587,6 @@
     <p:extLst>
       <p:ext uri="{BB962C8B-B14F-4D97-AF65-F5344CB8AC3E}">
         <p14:creationId xmlns:p14="http://schemas.microsoft.com/office/powerpoint/2010/main" val="782906587"/>
-      </p:ext>
-    </p:extLst>
-  </p:cSld>
-  <p:clrMapOvr>
-    <a:masterClrMapping/>
-  </p:clrMapOvr>
-</p:sld>
-</file>
-
-<file path=ppt/slides/slide9.xml><?xml version="1.0" encoding="utf-8"?>
-<p:sld xmlns:a="http://schemas.openxmlformats.org/drawingml/2006/main" xmlns:r="http://schemas.openxmlformats.org/officeDocument/2006/relationships" xmlns:p="http://schemas.openxmlformats.org/presentationml/2006/main">
-  <p:cSld>
-    <p:spTree>
-      <p:nvGrpSpPr>
-        <p:cNvPr id="1" name=""/>
-        <p:cNvGrpSpPr/>
-        <p:nvPr/>
-      </p:nvGrpSpPr>
-      <p:grpSpPr>
-        <a:xfrm>
-          <a:off x="0" y="0"/>
-          <a:ext cx="0" cy="0"/>
-          <a:chOff x="0" y="0"/>
-          <a:chExt cx="0" cy="0"/>
-        </a:xfrm>
-      </p:grpSpPr>
-      <p:sp>
-        <p:nvSpPr>
-          <p:cNvPr id="27" name="Rounded Rectangle 26"/>
-          <p:cNvSpPr/>
-          <p:nvPr/>
-        </p:nvSpPr>
-        <p:spPr>
-          <a:xfrm>
-            <a:off x="853570" y="853671"/>
-            <a:ext cx="7234527" cy="4851352"/>
-          </a:xfrm>
-          <a:prstGeom prst="roundRect">
-            <a:avLst>
-              <a:gd name="adj" fmla="val 4437"/>
-            </a:avLst>
-          </a:prstGeom>
-          <a:solidFill>
-            <a:srgbClr val="EDEDED"/>
-          </a:solidFill>
-          <a:ln>
-            <a:solidFill>
-              <a:srgbClr val="000000"/>
-            </a:solidFill>
-          </a:ln>
-          <a:effectLst/>
-        </p:spPr>
-        <p:style>
-          <a:lnRef idx="1">
-            <a:schemeClr val="accent1"/>
-          </a:lnRef>
-          <a:fillRef idx="3">
-            <a:schemeClr val="accent1"/>
-          </a:fillRef>
-          <a:effectRef idx="2">
-            <a:schemeClr val="accent1"/>
-          </a:effectRef>
-          <a:fontRef idx="minor">
-            <a:schemeClr val="lt1"/>
-          </a:fontRef>
-        </p:style>
-        <p:txBody>
-          <a:bodyPr rtlCol="0" anchor="ctr"/>
-          <a:lstStyle/>
-          <a:p>
-            <a:pPr algn="ctr"/>
-            <a:endParaRPr lang="en-US"/>
-          </a:p>
-        </p:txBody>
-      </p:sp>
-      <p:sp>
-        <p:nvSpPr>
-          <p:cNvPr id="26" name="Rectangle 25"/>
-          <p:cNvSpPr/>
-          <p:nvPr/>
-        </p:nvSpPr>
-        <p:spPr>
-          <a:xfrm>
-            <a:off x="863980" y="855015"/>
-            <a:ext cx="7213708" cy="1754327"/>
-          </a:xfrm>
-          <a:prstGeom prst="rect">
-            <a:avLst/>
-          </a:prstGeom>
-        </p:spPr>
-        <p:txBody>
-          <a:bodyPr wrap="square">
-            <a:spAutoFit/>
-          </a:bodyPr>
-          <a:lstStyle/>
-          <a:p>
-            <a:pPr algn="ctr"/>
-            <a:r>
-              <a:rPr lang="en-US" sz="5400" b="1" dirty="0" smtClean="0">
-                <a:solidFill>
-                  <a:srgbClr val="052B48"/>
-                </a:solidFill>
-                <a:latin typeface="Calibri"/>
-                <a:cs typeface="Calibri"/>
-              </a:rPr>
-              <a:t>Modular Data Storage using External Files</a:t>
-            </a:r>
-            <a:endParaRPr lang="en-US" sz="5400" b="1" dirty="0">
-              <a:solidFill>
-                <a:srgbClr val="052B48"/>
-              </a:solidFill>
-              <a:latin typeface="Calibri"/>
-              <a:cs typeface="Calibri"/>
-            </a:endParaRPr>
-          </a:p>
-        </p:txBody>
-      </p:sp>
-      <p:sp>
-        <p:nvSpPr>
-          <p:cNvPr id="15" name="Left Arrow 14"/>
-          <p:cNvSpPr/>
-          <p:nvPr/>
-        </p:nvSpPr>
-        <p:spPr>
-          <a:xfrm rot="5400000" flipV="1">
-            <a:off x="4274700" y="3528909"/>
-            <a:ext cx="550232" cy="279992"/>
-          </a:xfrm>
-          <a:prstGeom prst="leftArrow">
-            <a:avLst>
-              <a:gd name="adj1" fmla="val 60000"/>
-              <a:gd name="adj2" fmla="val 50000"/>
-            </a:avLst>
-          </a:prstGeom>
-          <a:solidFill>
-            <a:srgbClr val="052A48"/>
-          </a:solidFill>
-          <a:ln w="38100" cmpd="sng">
-            <a:solidFill>
-              <a:srgbClr val="FFFFFF"/>
-            </a:solidFill>
-          </a:ln>
-        </p:spPr>
-        <p:style>
-          <a:lnRef idx="0">
-            <a:schemeClr val="accent1">
-              <a:tint val="60000"/>
-              <a:hueOff val="0"/>
-              <a:satOff val="0"/>
-              <a:lumOff val="0"/>
-              <a:alphaOff val="0"/>
-            </a:schemeClr>
-          </a:lnRef>
-          <a:fillRef idx="1">
-            <a:schemeClr val="accent1">
-              <a:tint val="60000"/>
-              <a:hueOff val="0"/>
-              <a:satOff val="0"/>
-              <a:lumOff val="0"/>
-              <a:alphaOff val="0"/>
-            </a:schemeClr>
-          </a:fillRef>
-          <a:effectRef idx="0">
-            <a:schemeClr val="accent1">
-              <a:tint val="60000"/>
-              <a:hueOff val="0"/>
-              <a:satOff val="0"/>
-              <a:lumOff val="0"/>
-              <a:alphaOff val="0"/>
-            </a:schemeClr>
-          </a:effectRef>
-          <a:fontRef idx="minor">
-            <a:schemeClr val="lt1"/>
-          </a:fontRef>
-        </p:style>
-      </p:sp>
-      <p:sp>
-        <p:nvSpPr>
-          <p:cNvPr id="16" name="Left Arrow 15"/>
-          <p:cNvSpPr/>
-          <p:nvPr/>
-        </p:nvSpPr>
-        <p:spPr>
-          <a:xfrm rot="2734356">
-            <a:off x="3061789" y="4549986"/>
-            <a:ext cx="1096849" cy="425306"/>
-          </a:xfrm>
-          <a:prstGeom prst="leftArrow">
-            <a:avLst>
-              <a:gd name="adj1" fmla="val 60000"/>
-              <a:gd name="adj2" fmla="val 50000"/>
-            </a:avLst>
-          </a:prstGeom>
-          <a:solidFill>
-            <a:srgbClr val="052A48"/>
-          </a:solidFill>
-          <a:ln w="38100" cmpd="sng">
-            <a:solidFill>
-              <a:srgbClr val="FFFFFF"/>
-            </a:solidFill>
-          </a:ln>
-        </p:spPr>
-        <p:style>
-          <a:lnRef idx="0">
-            <a:schemeClr val="accent1">
-              <a:tint val="60000"/>
-              <a:hueOff val="0"/>
-              <a:satOff val="0"/>
-              <a:lumOff val="0"/>
-              <a:alphaOff val="0"/>
-            </a:schemeClr>
-          </a:lnRef>
-          <a:fillRef idx="1">
-            <a:schemeClr val="accent1">
-              <a:tint val="60000"/>
-              <a:hueOff val="0"/>
-              <a:satOff val="0"/>
-              <a:lumOff val="0"/>
-              <a:alphaOff val="0"/>
-            </a:schemeClr>
-          </a:fillRef>
-          <a:effectRef idx="0">
-            <a:schemeClr val="accent1">
-              <a:tint val="60000"/>
-              <a:hueOff val="0"/>
-              <a:satOff val="0"/>
-              <a:lumOff val="0"/>
-              <a:alphaOff val="0"/>
-            </a:schemeClr>
-          </a:effectRef>
-          <a:fontRef idx="minor">
-            <a:schemeClr val="lt1"/>
-          </a:fontRef>
-        </p:style>
-      </p:sp>
-      <p:sp>
-        <p:nvSpPr>
-          <p:cNvPr id="12" name="Folded Corner 11"/>
-          <p:cNvSpPr/>
-          <p:nvPr/>
-        </p:nvSpPr>
-        <p:spPr>
-          <a:xfrm rot="10800000" flipH="1">
-            <a:off x="2182317" y="3072614"/>
-            <a:ext cx="1037552" cy="1327710"/>
-          </a:xfrm>
-          <a:prstGeom prst="foldedCorner">
-            <a:avLst>
-              <a:gd name="adj" fmla="val 26556"/>
-            </a:avLst>
-          </a:prstGeom>
-          <a:solidFill>
-            <a:srgbClr val="052A48"/>
-          </a:solidFill>
-          <a:ln w="28575" cmpd="sng">
-            <a:solidFill>
-              <a:schemeClr val="bg1"/>
-            </a:solidFill>
-          </a:ln>
-          <a:effectLst/>
-        </p:spPr>
-        <p:style>
-          <a:lnRef idx="1">
-            <a:schemeClr val="accent1"/>
-          </a:lnRef>
-          <a:fillRef idx="3">
-            <a:schemeClr val="accent1"/>
-          </a:fillRef>
-          <a:effectRef idx="2">
-            <a:schemeClr val="accent1"/>
-          </a:effectRef>
-          <a:fontRef idx="minor">
-            <a:schemeClr val="lt1"/>
-          </a:fontRef>
-        </p:style>
-        <p:txBody>
-          <a:bodyPr rtlCol="0" anchor="ctr"/>
-          <a:lstStyle/>
-          <a:p>
-            <a:pPr algn="ctr"/>
-            <a:endParaRPr lang="en-US" sz="1000" u="sng" dirty="0"/>
-          </a:p>
-        </p:txBody>
-      </p:sp>
-      <p:sp>
-        <p:nvSpPr>
-          <p:cNvPr id="14" name="Folded Corner 13"/>
-          <p:cNvSpPr/>
-          <p:nvPr/>
-        </p:nvSpPr>
-        <p:spPr>
-          <a:xfrm rot="10800000" flipH="1">
-            <a:off x="4267044" y="2617358"/>
-            <a:ext cx="572757" cy="762891"/>
-          </a:xfrm>
-          <a:prstGeom prst="foldedCorner">
-            <a:avLst>
-              <a:gd name="adj" fmla="val 26556"/>
-            </a:avLst>
-          </a:prstGeom>
-          <a:solidFill>
-            <a:srgbClr val="052A48"/>
-          </a:solidFill>
-          <a:ln w="28575" cmpd="sng">
-            <a:solidFill>
-              <a:schemeClr val="bg1"/>
-            </a:solidFill>
-          </a:ln>
-          <a:effectLst/>
-        </p:spPr>
-        <p:style>
-          <a:lnRef idx="1">
-            <a:schemeClr val="accent1"/>
-          </a:lnRef>
-          <a:fillRef idx="3">
-            <a:schemeClr val="accent1"/>
-          </a:fillRef>
-          <a:effectRef idx="2">
-            <a:schemeClr val="accent1"/>
-          </a:effectRef>
-          <a:fontRef idx="minor">
-            <a:schemeClr val="lt1"/>
-          </a:fontRef>
-        </p:style>
-        <p:txBody>
-          <a:bodyPr rtlCol="0" anchor="ctr"/>
-          <a:lstStyle/>
-          <a:p>
-            <a:pPr algn="ctr"/>
-            <a:endParaRPr lang="en-US" sz="1000" u="sng" dirty="0"/>
-          </a:p>
-        </p:txBody>
-      </p:sp>
-      <p:sp>
-        <p:nvSpPr>
-          <p:cNvPr id="20" name="Left Arrow 19"/>
-          <p:cNvSpPr/>
-          <p:nvPr/>
-        </p:nvSpPr>
-        <p:spPr>
-          <a:xfrm rot="18865644" flipH="1">
-            <a:off x="5072927" y="4550292"/>
-            <a:ext cx="1096849" cy="425306"/>
-          </a:xfrm>
-          <a:prstGeom prst="leftArrow">
-            <a:avLst>
-              <a:gd name="adj1" fmla="val 60000"/>
-              <a:gd name="adj2" fmla="val 50000"/>
-            </a:avLst>
-          </a:prstGeom>
-          <a:solidFill>
-            <a:srgbClr val="052A48"/>
-          </a:solidFill>
-          <a:ln w="38100" cmpd="sng">
-            <a:solidFill>
-              <a:srgbClr val="FFFFFF"/>
-            </a:solidFill>
-          </a:ln>
-        </p:spPr>
-        <p:style>
-          <a:lnRef idx="0">
-            <a:schemeClr val="accent1">
-              <a:tint val="60000"/>
-              <a:hueOff val="0"/>
-              <a:satOff val="0"/>
-              <a:lumOff val="0"/>
-              <a:alphaOff val="0"/>
-            </a:schemeClr>
-          </a:lnRef>
-          <a:fillRef idx="1">
-            <a:schemeClr val="accent1">
-              <a:tint val="60000"/>
-              <a:hueOff val="0"/>
-              <a:satOff val="0"/>
-              <a:lumOff val="0"/>
-              <a:alphaOff val="0"/>
-            </a:schemeClr>
-          </a:fillRef>
-          <a:effectRef idx="0">
-            <a:schemeClr val="accent1">
-              <a:tint val="60000"/>
-              <a:hueOff val="0"/>
-              <a:satOff val="0"/>
-              <a:lumOff val="0"/>
-              <a:alphaOff val="0"/>
-            </a:schemeClr>
-          </a:effectRef>
-          <a:fontRef idx="minor">
-            <a:schemeClr val="lt1"/>
-          </a:fontRef>
-        </p:style>
-      </p:sp>
-      <p:sp>
-        <p:nvSpPr>
-          <p:cNvPr id="8" name="Folded Corner 7"/>
-          <p:cNvSpPr/>
-          <p:nvPr/>
-        </p:nvSpPr>
-        <p:spPr>
-          <a:xfrm rot="10800000" flipH="1">
-            <a:off x="3899840" y="3720272"/>
-            <a:ext cx="1419941" cy="1900138"/>
-          </a:xfrm>
-          <a:prstGeom prst="foldedCorner">
-            <a:avLst>
-              <a:gd name="adj" fmla="val 26556"/>
-            </a:avLst>
-          </a:prstGeom>
-          <a:solidFill>
-            <a:srgbClr val="052A48"/>
-          </a:solidFill>
-          <a:ln w="28575" cmpd="sng">
-            <a:solidFill>
-              <a:schemeClr val="bg1"/>
-            </a:solidFill>
-          </a:ln>
-          <a:effectLst/>
-        </p:spPr>
-        <p:style>
-          <a:lnRef idx="1">
-            <a:schemeClr val="accent1"/>
-          </a:lnRef>
-          <a:fillRef idx="3">
-            <a:schemeClr val="accent1"/>
-          </a:fillRef>
-          <a:effectRef idx="2">
-            <a:schemeClr val="accent1"/>
-          </a:effectRef>
-          <a:fontRef idx="minor">
-            <a:schemeClr val="lt1"/>
-          </a:fontRef>
-        </p:style>
-        <p:txBody>
-          <a:bodyPr rtlCol="0" anchor="ctr"/>
-          <a:lstStyle/>
-          <a:p>
-            <a:pPr algn="ctr"/>
-            <a:r>
-              <a:rPr lang="en-US" u="sng" dirty="0" smtClean="0"/>
-              <a:t>																			   </a:t>
-            </a:r>
-            <a:endParaRPr lang="en-US" u="sng" dirty="0"/>
-          </a:p>
-        </p:txBody>
-      </p:sp>
-      <p:grpSp>
-        <p:nvGrpSpPr>
-          <p:cNvPr id="11" name="Group 10"/>
-          <p:cNvGrpSpPr>
-            <a:grpSpLocks noChangeAspect="1"/>
-          </p:cNvGrpSpPr>
-          <p:nvPr/>
-        </p:nvGrpSpPr>
-        <p:grpSpPr>
-          <a:xfrm>
-            <a:off x="3606582" y="3649328"/>
-            <a:ext cx="947929" cy="947929"/>
-            <a:chOff x="2259923" y="2660201"/>
-            <a:chExt cx="1959561" cy="1962561"/>
-          </a:xfrm>
-        </p:grpSpPr>
-        <p:sp>
-          <p:nvSpPr>
-            <p:cNvPr id="18" name="Oval 17"/>
-            <p:cNvSpPr/>
-            <p:nvPr/>
-          </p:nvSpPr>
-          <p:spPr>
-            <a:xfrm>
-              <a:off x="2259923" y="2660201"/>
-              <a:ext cx="1959561" cy="1962561"/>
-            </a:xfrm>
-            <a:prstGeom prst="ellipse">
-              <a:avLst/>
-            </a:prstGeom>
-            <a:solidFill>
-              <a:schemeClr val="bg1"/>
-            </a:solidFill>
-            <a:ln w="76200" cmpd="sng">
-              <a:solidFill>
-                <a:srgbClr val="052A48"/>
-              </a:solidFill>
-            </a:ln>
-            <a:effectLst/>
-          </p:spPr>
-          <p:style>
-            <a:lnRef idx="1">
-              <a:schemeClr val="accent1"/>
-            </a:lnRef>
-            <a:fillRef idx="3">
-              <a:schemeClr val="accent1"/>
-            </a:fillRef>
-            <a:effectRef idx="2">
-              <a:schemeClr val="accent1"/>
-            </a:effectRef>
-            <a:fontRef idx="minor">
-              <a:schemeClr val="lt1"/>
-            </a:fontRef>
-          </p:style>
-          <p:txBody>
-            <a:bodyPr rtlCol="0" anchor="ctr"/>
-            <a:lstStyle/>
-            <a:p>
-              <a:endParaRPr lang="en-US" sz="4400" dirty="0"/>
-            </a:p>
-          </p:txBody>
-        </p:sp>
-        <p:pic>
-          <p:nvPicPr>
-            <p:cNvPr id="19" name="Picture 18" descr="logo_brain_transp_512x512.png"/>
-            <p:cNvPicPr>
-              <a:picLocks noChangeAspect="1"/>
-            </p:cNvPicPr>
-            <p:nvPr/>
-          </p:nvPicPr>
-          <p:blipFill>
-            <a:blip r:embed="rId2">
-              <a:extLst>
-                <a:ext uri="{28A0092B-C50C-407E-A947-70E740481C1C}">
-                  <a14:useLocalDpi xmlns:a14="http://schemas.microsoft.com/office/drawing/2010/main" val="0"/>
-                </a:ext>
-              </a:extLst>
-            </a:blip>
-            <a:stretch>
-              <a:fillRect/>
-            </a:stretch>
-          </p:blipFill>
-          <p:spPr>
-            <a:xfrm>
-              <a:off x="2393887" y="2838486"/>
-              <a:ext cx="1703898" cy="1703898"/>
-            </a:xfrm>
-            <a:prstGeom prst="rect">
-              <a:avLst/>
-            </a:prstGeom>
-          </p:spPr>
-        </p:pic>
-      </p:grpSp>
-      <p:sp>
-        <p:nvSpPr>
-          <p:cNvPr id="13" name="Folded Corner 12"/>
-          <p:cNvSpPr/>
-          <p:nvPr/>
-        </p:nvSpPr>
-        <p:spPr>
-          <a:xfrm rot="10800000" flipH="1">
-            <a:off x="6002435" y="3075348"/>
-            <a:ext cx="1037552" cy="1327710"/>
-          </a:xfrm>
-          <a:prstGeom prst="foldedCorner">
-            <a:avLst>
-              <a:gd name="adj" fmla="val 26556"/>
-            </a:avLst>
-          </a:prstGeom>
-          <a:solidFill>
-            <a:srgbClr val="052A48"/>
-          </a:solidFill>
-          <a:ln w="28575" cmpd="sng">
-            <a:solidFill>
-              <a:schemeClr val="bg1"/>
-            </a:solidFill>
-          </a:ln>
-          <a:effectLst/>
-        </p:spPr>
-        <p:style>
-          <a:lnRef idx="1">
-            <a:schemeClr val="accent1"/>
-          </a:lnRef>
-          <a:fillRef idx="3">
-            <a:schemeClr val="accent1"/>
-          </a:fillRef>
-          <a:effectRef idx="2">
-            <a:schemeClr val="accent1"/>
-          </a:effectRef>
-          <a:fontRef idx="minor">
-            <a:schemeClr val="lt1"/>
-          </a:fontRef>
-        </p:style>
-        <p:txBody>
-          <a:bodyPr rtlCol="0" anchor="ctr"/>
-          <a:lstStyle/>
-          <a:p>
-            <a:pPr algn="ctr"/>
-            <a:endParaRPr lang="en-US" sz="1000" u="sng" dirty="0"/>
-          </a:p>
-        </p:txBody>
-      </p:sp>
-    </p:spTree>
-    <p:extLst>
-      <p:ext uri="{BB962C8B-B14F-4D97-AF65-F5344CB8AC3E}">
-        <p14:creationId xmlns:p14="http://schemas.microsoft.com/office/powerpoint/2010/main" val="1333564583"/>
       </p:ext>
     </p:extLst>
   </p:cSld>
@@ -11106,7 +11166,7 @@
   <a:extraClrSchemeLst/>
   <a:extLst>
     <a:ext uri="{05A4C25C-085E-4340-85A3-A5531E510DB2}">
-      <thm15:themeFamily xmlns:thm15="http://schemas.microsoft.com/office/thememl/2012/main" xmlns="" name="Office Theme" id="{62F939B6-93AF-4DB8-9C6B-D6C7DFDC589F}" vid="{4A3C46E8-61CC-4603-A589-7422A47A8E4A}"/>
+      <thm15:themeFamily xmlns:thm15="http://schemas.microsoft.com/office/thememl/2012/main" name="Office Theme" id="{62F939B6-93AF-4DB8-9C6B-D6C7DFDC589F}" vid="{4A3C46E8-61CC-4603-A589-7422A47A8E4A}"/>
     </a:ext>
   </a:extLst>
 </a:theme>

</xml_diff>